<commit_message>
Added an illustration for negative scenarios
</commit_message>
<xml_diff>
--- a/writing/images/train.pptx
+++ b/writing/images/train.pptx
@@ -290,7 +290,7 @@
             <a:fld id="{68BDF4EC-5B70-45D8-B718-E56EB4C6B13E}" type="datetimeFigureOut">
               <a:rPr lang="fr-BE" smtClean="0"/>
               <a:pPr/>
-              <a:t>16/05/2011</a:t>
+              <a:t>17/05/2011</a:t>
             </a:fld>
             <a:endParaRPr lang="fr-BE"/>
           </a:p>
@@ -457,7 +457,7 @@
             <a:fld id="{68BDF4EC-5B70-45D8-B718-E56EB4C6B13E}" type="datetimeFigureOut">
               <a:rPr lang="fr-BE" smtClean="0"/>
               <a:pPr/>
-              <a:t>16/05/2011</a:t>
+              <a:t>17/05/2011</a:t>
             </a:fld>
             <a:endParaRPr lang="fr-BE"/>
           </a:p>
@@ -634,7 +634,7 @@
             <a:fld id="{68BDF4EC-5B70-45D8-B718-E56EB4C6B13E}" type="datetimeFigureOut">
               <a:rPr lang="fr-BE" smtClean="0"/>
               <a:pPr/>
-              <a:t>16/05/2011</a:t>
+              <a:t>17/05/2011</a:t>
             </a:fld>
             <a:endParaRPr lang="fr-BE"/>
           </a:p>
@@ -801,7 +801,7 @@
             <a:fld id="{68BDF4EC-5B70-45D8-B718-E56EB4C6B13E}" type="datetimeFigureOut">
               <a:rPr lang="fr-BE" smtClean="0"/>
               <a:pPr/>
-              <a:t>16/05/2011</a:t>
+              <a:t>17/05/2011</a:t>
             </a:fld>
             <a:endParaRPr lang="fr-BE"/>
           </a:p>
@@ -1044,7 +1044,7 @@
             <a:fld id="{68BDF4EC-5B70-45D8-B718-E56EB4C6B13E}" type="datetimeFigureOut">
               <a:rPr lang="fr-BE" smtClean="0"/>
               <a:pPr/>
-              <a:t>16/05/2011</a:t>
+              <a:t>17/05/2011</a:t>
             </a:fld>
             <a:endParaRPr lang="fr-BE"/>
           </a:p>
@@ -1329,7 +1329,7 @@
             <a:fld id="{68BDF4EC-5B70-45D8-B718-E56EB4C6B13E}" type="datetimeFigureOut">
               <a:rPr lang="fr-BE" smtClean="0"/>
               <a:pPr/>
-              <a:t>16/05/2011</a:t>
+              <a:t>17/05/2011</a:t>
             </a:fld>
             <a:endParaRPr lang="fr-BE"/>
           </a:p>
@@ -1748,7 +1748,7 @@
             <a:fld id="{68BDF4EC-5B70-45D8-B718-E56EB4C6B13E}" type="datetimeFigureOut">
               <a:rPr lang="fr-BE" smtClean="0"/>
               <a:pPr/>
-              <a:t>16/05/2011</a:t>
+              <a:t>17/05/2011</a:t>
             </a:fld>
             <a:endParaRPr lang="fr-BE"/>
           </a:p>
@@ -1863,7 +1863,7 @@
             <a:fld id="{68BDF4EC-5B70-45D8-B718-E56EB4C6B13E}" type="datetimeFigureOut">
               <a:rPr lang="fr-BE" smtClean="0"/>
               <a:pPr/>
-              <a:t>16/05/2011</a:t>
+              <a:t>17/05/2011</a:t>
             </a:fld>
             <a:endParaRPr lang="fr-BE"/>
           </a:p>
@@ -1955,7 +1955,7 @@
             <a:fld id="{68BDF4EC-5B70-45D8-B718-E56EB4C6B13E}" type="datetimeFigureOut">
               <a:rPr lang="fr-BE" smtClean="0"/>
               <a:pPr/>
-              <a:t>16/05/2011</a:t>
+              <a:t>17/05/2011</a:t>
             </a:fld>
             <a:endParaRPr lang="fr-BE"/>
           </a:p>
@@ -2229,7 +2229,7 @@
             <a:fld id="{68BDF4EC-5B70-45D8-B718-E56EB4C6B13E}" type="datetimeFigureOut">
               <a:rPr lang="fr-BE" smtClean="0"/>
               <a:pPr/>
-              <a:t>16/05/2011</a:t>
+              <a:t>17/05/2011</a:t>
             </a:fld>
             <a:endParaRPr lang="fr-BE"/>
           </a:p>
@@ -2479,7 +2479,7 @@
             <a:fld id="{68BDF4EC-5B70-45D8-B718-E56EB4C6B13E}" type="datetimeFigureOut">
               <a:rPr lang="fr-BE" smtClean="0"/>
               <a:pPr/>
-              <a:t>16/05/2011</a:t>
+              <a:t>17/05/2011</a:t>
             </a:fld>
             <a:endParaRPr lang="fr-BE"/>
           </a:p>
@@ -2689,7 +2689,7 @@
             <a:fld id="{68BDF4EC-5B70-45D8-B718-E56EB4C6B13E}" type="datetimeFigureOut">
               <a:rPr lang="fr-BE" smtClean="0"/>
               <a:pPr/>
-              <a:t>16/05/2011</a:t>
+              <a:t>17/05/2011</a:t>
             </a:fld>
             <a:endParaRPr lang="fr-BE"/>
           </a:p>
@@ -4350,27 +4350,73 @@
       </p:grpSpPr>
       <p:grpSp>
         <p:nvGrpSpPr>
-          <p:cNvPr id="73" name="Groupe 72"/>
+          <p:cNvPr id="122" name="Groupe 121"/>
           <p:cNvGrpSpPr/>
           <p:nvPr/>
         </p:nvGrpSpPr>
         <p:grpSpPr>
           <a:xfrm>
-            <a:off x="179512" y="332656"/>
-            <a:ext cx="5578524" cy="2532980"/>
-            <a:chOff x="937692" y="1111788"/>
-            <a:chExt cx="5578524" cy="2532980"/>
+            <a:off x="107504" y="288206"/>
+            <a:ext cx="5760640" cy="2736304"/>
+            <a:chOff x="107504" y="288206"/>
+            <a:chExt cx="5760640" cy="2736304"/>
           </a:xfrm>
         </p:grpSpPr>
         <p:sp>
           <p:nvSpPr>
+            <p:cNvPr id="120" name="Rectangle 119"/>
+            <p:cNvSpPr/>
+            <p:nvPr/>
+          </p:nvSpPr>
+          <p:spPr>
+            <a:xfrm>
+              <a:off x="107504" y="288206"/>
+              <a:ext cx="5760640" cy="2736304"/>
+            </a:xfrm>
+            <a:prstGeom prst="rect">
+              <a:avLst/>
+            </a:prstGeom>
+            <a:solidFill>
+              <a:schemeClr val="bg1"/>
+            </a:solidFill>
+            <a:ln>
+              <a:noFill/>
+            </a:ln>
+          </p:spPr>
+          <p:style>
+            <a:lnRef idx="2">
+              <a:schemeClr val="accent1">
+                <a:shade val="50000"/>
+              </a:schemeClr>
+            </a:lnRef>
+            <a:fillRef idx="1">
+              <a:schemeClr val="accent1"/>
+            </a:fillRef>
+            <a:effectRef idx="0">
+              <a:schemeClr val="accent1"/>
+            </a:effectRef>
+            <a:fontRef idx="minor">
+              <a:schemeClr val="lt1"/>
+            </a:fontRef>
+          </p:style>
+          <p:txBody>
+            <a:bodyPr rtlCol="0" anchor="ctr"/>
+            <a:lstStyle/>
+            <a:p>
+              <a:pPr algn="ctr"/>
+              <a:endParaRPr lang="fr-BE"/>
+            </a:p>
+          </p:txBody>
+        </p:sp>
+        <p:sp>
+          <p:nvSpPr>
             <p:cNvPr id="72" name="Rectangle 71"/>
             <p:cNvSpPr/>
             <p:nvPr/>
           </p:nvSpPr>
           <p:spPr>
             <a:xfrm>
-              <a:off x="1717080" y="1111788"/>
+              <a:off x="958900" y="332656"/>
               <a:ext cx="720080" cy="216024"/>
             </a:xfrm>
             <a:prstGeom prst="rect">
@@ -4415,7 +4461,7 @@
           </p:nvSpPr>
           <p:spPr>
             <a:xfrm>
-              <a:off x="1835696" y="1340768"/>
+              <a:off x="1077516" y="561636"/>
               <a:ext cx="2952328" cy="2304000"/>
             </a:xfrm>
             <a:prstGeom prst="rect">
@@ -4456,7 +4502,7 @@
           </p:nvSpPr>
           <p:spPr>
             <a:xfrm>
-              <a:off x="937692" y="1484785"/>
+              <a:off x="179512" y="705653"/>
               <a:ext cx="720080" cy="324000"/>
             </a:xfrm>
             <a:prstGeom prst="rect">
@@ -4498,7 +4544,7 @@
           </p:nvSpPr>
           <p:spPr>
             <a:xfrm>
-              <a:off x="2843808" y="1484785"/>
+              <a:off x="2085628" y="705653"/>
               <a:ext cx="864096" cy="324000"/>
             </a:xfrm>
             <a:prstGeom prst="rect">
@@ -4540,7 +4586,7 @@
           </p:nvSpPr>
           <p:spPr>
             <a:xfrm>
-              <a:off x="3923928" y="1484785"/>
+              <a:off x="3165748" y="705653"/>
               <a:ext cx="720080" cy="324000"/>
             </a:xfrm>
             <a:prstGeom prst="rect">
@@ -4582,7 +4628,7 @@
           </p:nvSpPr>
           <p:spPr>
             <a:xfrm>
-              <a:off x="5796136" y="1484785"/>
+              <a:off x="5037956" y="705653"/>
               <a:ext cx="720080" cy="324000"/>
             </a:xfrm>
             <a:prstGeom prst="rect">
@@ -4623,7 +4669,7 @@
           </p:nvSpPr>
           <p:spPr>
             <a:xfrm>
-              <a:off x="4932040" y="1484785"/>
+              <a:off x="4173860" y="705653"/>
               <a:ext cx="720080" cy="324000"/>
             </a:xfrm>
             <a:prstGeom prst="rect">
@@ -4664,7 +4710,7 @@
           </p:nvSpPr>
           <p:spPr>
             <a:xfrm>
-              <a:off x="1957968" y="1484785"/>
+              <a:off x="1199788" y="705653"/>
               <a:ext cx="720080" cy="324000"/>
             </a:xfrm>
             <a:prstGeom prst="rect">
@@ -4694,7 +4740,6 @@
                 <a:rPr lang="fr-BE" sz="1100" smtClean="0"/>
                 <a:t>Sensors</a:t>
               </a:r>
-              <a:endParaRPr lang="fr-BE" sz="1100" smtClean="0"/>
             </a:p>
           </p:txBody>
         </p:sp>
@@ -4708,7 +4753,7 @@
           </p:nvCxnSpPr>
           <p:spPr>
             <a:xfrm rot="5400000">
-              <a:off x="2411459" y="2672388"/>
+              <a:off x="1653279" y="1893256"/>
               <a:ext cx="1728000" cy="794"/>
             </a:xfrm>
             <a:prstGeom prst="straightConnector1">
@@ -4743,7 +4788,7 @@
           </p:nvCxnSpPr>
           <p:spPr>
             <a:xfrm rot="5400000">
-              <a:off x="433335" y="2672388"/>
+              <a:off x="-324845" y="1893256"/>
               <a:ext cx="1728000" cy="794"/>
             </a:xfrm>
             <a:prstGeom prst="straightConnector1">
@@ -4778,7 +4823,7 @@
           </p:nvCxnSpPr>
           <p:spPr>
             <a:xfrm rot="5400000">
-              <a:off x="3419571" y="2672388"/>
+              <a:off x="2661391" y="1893256"/>
               <a:ext cx="1728000" cy="794"/>
             </a:xfrm>
             <a:prstGeom prst="straightConnector1">
@@ -4813,7 +4858,7 @@
           </p:nvCxnSpPr>
           <p:spPr>
             <a:xfrm rot="5400000">
-              <a:off x="1453611" y="2672388"/>
+              <a:off x="695431" y="1893256"/>
               <a:ext cx="1728000" cy="794"/>
             </a:xfrm>
             <a:prstGeom prst="straightConnector1">
@@ -4848,7 +4893,7 @@
           </p:nvCxnSpPr>
           <p:spPr>
             <a:xfrm rot="5400000">
-              <a:off x="4427683" y="2672388"/>
+              <a:off x="3669503" y="1893256"/>
               <a:ext cx="1728000" cy="794"/>
             </a:xfrm>
             <a:prstGeom prst="straightConnector1">
@@ -4883,7 +4928,7 @@
           </p:nvCxnSpPr>
           <p:spPr>
             <a:xfrm rot="5400000">
-              <a:off x="5291779" y="2672388"/>
+              <a:off x="4533599" y="1893256"/>
               <a:ext cx="1728000" cy="794"/>
             </a:xfrm>
             <a:prstGeom prst="straightConnector1">
@@ -4916,7 +4961,7 @@
           </p:nvCxnSpPr>
           <p:spPr>
             <a:xfrm>
-              <a:off x="1297732" y="2451884"/>
+              <a:off x="539552" y="1672752"/>
               <a:ext cx="1008112" cy="1588"/>
             </a:xfrm>
             <a:prstGeom prst="straightConnector1">
@@ -4949,7 +4994,7 @@
           </p:nvSpPr>
           <p:spPr>
             <a:xfrm>
-              <a:off x="1321424" y="2350533"/>
+              <a:off x="563244" y="1571401"/>
               <a:ext cx="864000" cy="180000"/>
             </a:xfrm>
             <a:prstGeom prst="rect">
@@ -4985,7 +5030,7 @@
           </p:nvCxnSpPr>
           <p:spPr>
             <a:xfrm>
-              <a:off x="3275856" y="2083842"/>
+              <a:off x="2517676" y="1304710"/>
               <a:ext cx="1005025" cy="0"/>
             </a:xfrm>
             <a:prstGeom prst="straightConnector1">
@@ -5018,7 +5063,7 @@
           </p:nvSpPr>
           <p:spPr>
             <a:xfrm>
-              <a:off x="3375725" y="1983890"/>
+              <a:off x="2617545" y="1204758"/>
               <a:ext cx="720000" cy="169277"/>
             </a:xfrm>
             <a:prstGeom prst="rect">
@@ -5054,7 +5099,7 @@
           </p:nvCxnSpPr>
           <p:spPr>
             <a:xfrm>
-              <a:off x="4283968" y="2231556"/>
+              <a:off x="3525788" y="1452424"/>
               <a:ext cx="1872208" cy="1588"/>
             </a:xfrm>
             <a:prstGeom prst="straightConnector1">
@@ -5087,7 +5132,7 @@
           </p:nvSpPr>
           <p:spPr>
             <a:xfrm>
-              <a:off x="5122550" y="2136300"/>
+              <a:off x="4364370" y="1357168"/>
               <a:ext cx="324000" cy="169277"/>
             </a:xfrm>
             <a:prstGeom prst="rect">
@@ -5123,7 +5168,7 @@
           </p:nvCxnSpPr>
           <p:spPr>
             <a:xfrm>
-              <a:off x="3275856" y="2803922"/>
+              <a:off x="2517676" y="2024790"/>
               <a:ext cx="1008112" cy="1588"/>
             </a:xfrm>
             <a:prstGeom prst="straightConnector1">
@@ -5156,7 +5201,7 @@
           </p:nvSpPr>
           <p:spPr>
             <a:xfrm>
-              <a:off x="3375725" y="2708921"/>
+              <a:off x="2617545" y="1929789"/>
               <a:ext cx="720000" cy="169277"/>
             </a:xfrm>
             <a:prstGeom prst="rect">
@@ -5192,7 +5237,7 @@
           </p:nvCxnSpPr>
           <p:spPr>
             <a:xfrm>
-              <a:off x="4283968" y="2986938"/>
+              <a:off x="3525788" y="2207806"/>
               <a:ext cx="1872208" cy="1588"/>
             </a:xfrm>
             <a:prstGeom prst="straightConnector1">
@@ -5225,7 +5270,7 @@
           </p:nvSpPr>
           <p:spPr>
             <a:xfrm>
-              <a:off x="5122550" y="2891682"/>
+              <a:off x="4364370" y="2112550"/>
               <a:ext cx="324000" cy="169277"/>
             </a:xfrm>
             <a:prstGeom prst="rect">
@@ -5261,7 +5306,7 @@
           </p:nvCxnSpPr>
           <p:spPr>
             <a:xfrm flipV="1">
-              <a:off x="3275856" y="3145588"/>
+              <a:off x="2517676" y="2366456"/>
               <a:ext cx="1008000" cy="862"/>
             </a:xfrm>
             <a:prstGeom prst="straightConnector1">
@@ -5294,7 +5339,7 @@
           </p:nvSpPr>
           <p:spPr>
             <a:xfrm>
-              <a:off x="3375725" y="3051449"/>
+              <a:off x="2617545" y="2272317"/>
               <a:ext cx="720000" cy="169277"/>
             </a:xfrm>
             <a:prstGeom prst="rect">
@@ -5330,7 +5375,7 @@
           </p:nvCxnSpPr>
           <p:spPr>
             <a:xfrm>
-              <a:off x="4283968" y="3289604"/>
+              <a:off x="3525788" y="2510472"/>
               <a:ext cx="1008112" cy="3130"/>
             </a:xfrm>
             <a:prstGeom prst="straightConnector1">
@@ -5363,7 +5408,7 @@
           </p:nvSpPr>
           <p:spPr>
             <a:xfrm>
-              <a:off x="4618534" y="3187716"/>
+              <a:off x="3860354" y="2408584"/>
               <a:ext cx="360000" cy="169277"/>
             </a:xfrm>
             <a:prstGeom prst="rect">
@@ -5399,7 +5444,7 @@
           </p:nvCxnSpPr>
           <p:spPr>
             <a:xfrm>
-              <a:off x="2333506" y="2626896"/>
+              <a:off x="1575326" y="1847764"/>
               <a:ext cx="936000" cy="1588"/>
             </a:xfrm>
             <a:prstGeom prst="straightConnector1">
@@ -5432,7 +5477,7 @@
           </p:nvSpPr>
           <p:spPr>
             <a:xfrm>
-              <a:off x="2383053" y="2533294"/>
+              <a:off x="1624873" y="1754162"/>
               <a:ext cx="756000" cy="169277"/>
             </a:xfrm>
             <a:prstGeom prst="rect">
@@ -5457,6 +5502,643 @@
                 <a:t>alarm-signal</a:t>
               </a:r>
               <a:endParaRPr lang="fr-BE" sz="1100"/>
+            </a:p>
+          </p:txBody>
+        </p:sp>
+      </p:grpSp>
+      <p:grpSp>
+        <p:nvGrpSpPr>
+          <p:cNvPr id="123" name="Groupe 122"/>
+          <p:cNvGrpSpPr/>
+          <p:nvPr/>
+        </p:nvGrpSpPr>
+        <p:grpSpPr>
+          <a:xfrm>
+            <a:off x="2051720" y="3356992"/>
+            <a:ext cx="3888432" cy="1728192"/>
+            <a:chOff x="2051720" y="3356992"/>
+            <a:chExt cx="3888432" cy="1728192"/>
+          </a:xfrm>
+        </p:grpSpPr>
+        <p:sp>
+          <p:nvSpPr>
+            <p:cNvPr id="121" name="Rectangle 120"/>
+            <p:cNvSpPr/>
+            <p:nvPr/>
+          </p:nvSpPr>
+          <p:spPr>
+            <a:xfrm>
+              <a:off x="2051720" y="3356992"/>
+              <a:ext cx="3888432" cy="1728192"/>
+            </a:xfrm>
+            <a:prstGeom prst="rect">
+              <a:avLst/>
+            </a:prstGeom>
+            <a:solidFill>
+              <a:schemeClr val="bg1"/>
+            </a:solidFill>
+            <a:ln>
+              <a:noFill/>
+            </a:ln>
+          </p:spPr>
+          <p:style>
+            <a:lnRef idx="2">
+              <a:schemeClr val="accent1">
+                <a:shade val="50000"/>
+              </a:schemeClr>
+            </a:lnRef>
+            <a:fillRef idx="1">
+              <a:schemeClr val="accent1"/>
+            </a:fillRef>
+            <a:effectRef idx="0">
+              <a:schemeClr val="accent1"/>
+            </a:effectRef>
+            <a:fontRef idx="minor">
+              <a:schemeClr val="lt1"/>
+            </a:fontRef>
+          </p:style>
+          <p:txBody>
+            <a:bodyPr rtlCol="0" anchor="ctr"/>
+            <a:lstStyle/>
+            <a:p>
+              <a:pPr algn="ctr"/>
+              <a:endParaRPr lang="fr-BE"/>
+            </a:p>
+          </p:txBody>
+        </p:sp>
+        <p:cxnSp>
+          <p:nvCxnSpPr>
+            <p:cNvPr id="81" name="Connecteur droit 80"/>
+            <p:cNvCxnSpPr/>
+            <p:nvPr/>
+          </p:nvCxnSpPr>
+          <p:spPr>
+            <a:xfrm>
+              <a:off x="2346102" y="4462512"/>
+              <a:ext cx="3348000" cy="0"/>
+            </a:xfrm>
+            <a:prstGeom prst="line">
+              <a:avLst/>
+            </a:prstGeom>
+            <a:ln>
+              <a:prstDash val="sysDash"/>
+            </a:ln>
+          </p:spPr>
+          <p:style>
+            <a:lnRef idx="2">
+              <a:schemeClr val="dk1"/>
+            </a:lnRef>
+            <a:fillRef idx="0">
+              <a:schemeClr val="dk1"/>
+            </a:fillRef>
+            <a:effectRef idx="1">
+              <a:schemeClr val="dk1"/>
+            </a:effectRef>
+            <a:fontRef idx="minor">
+              <a:schemeClr val="tx1"/>
+            </a:fontRef>
+          </p:style>
+        </p:cxnSp>
+        <p:sp>
+          <p:nvSpPr>
+            <p:cNvPr id="90" name="Rectangle 89"/>
+            <p:cNvSpPr/>
+            <p:nvPr/>
+          </p:nvSpPr>
+          <p:spPr>
+            <a:xfrm>
+              <a:off x="2157636" y="3513965"/>
+              <a:ext cx="864096" cy="324000"/>
+            </a:xfrm>
+            <a:prstGeom prst="rect">
+              <a:avLst/>
+            </a:prstGeom>
+          </p:spPr>
+          <p:style>
+            <a:lnRef idx="2">
+              <a:schemeClr val="dk1"/>
+            </a:lnRef>
+            <a:fillRef idx="1">
+              <a:schemeClr val="lt1"/>
+            </a:fillRef>
+            <a:effectRef idx="0">
+              <a:schemeClr val="dk1"/>
+            </a:effectRef>
+            <a:fontRef idx="minor">
+              <a:schemeClr val="dk1"/>
+            </a:fontRef>
+          </p:style>
+          <p:txBody>
+            <a:bodyPr lIns="36000" tIns="36000" rIns="36000" bIns="36000" rtlCol="0" anchor="ctr" anchorCtr="0"/>
+            <a:lstStyle/>
+            <a:p>
+              <a:pPr algn="ctr"/>
+              <a:r>
+                <a:rPr lang="fr-BE" sz="1100" smtClean="0"/>
+                <a:t>Controller</a:t>
+              </a:r>
+              <a:endParaRPr lang="fr-BE" sz="1100"/>
+            </a:p>
+          </p:txBody>
+        </p:sp>
+        <p:sp>
+          <p:nvSpPr>
+            <p:cNvPr id="91" name="Rectangle 90"/>
+            <p:cNvSpPr/>
+            <p:nvPr/>
+          </p:nvSpPr>
+          <p:spPr>
+            <a:xfrm>
+              <a:off x="3347864" y="3513965"/>
+              <a:ext cx="720080" cy="324000"/>
+            </a:xfrm>
+            <a:prstGeom prst="rect">
+              <a:avLst/>
+            </a:prstGeom>
+          </p:spPr>
+          <p:style>
+            <a:lnRef idx="2">
+              <a:schemeClr val="dk1"/>
+            </a:lnRef>
+            <a:fillRef idx="1">
+              <a:schemeClr val="lt1"/>
+            </a:fillRef>
+            <a:effectRef idx="0">
+              <a:schemeClr val="dk1"/>
+            </a:effectRef>
+            <a:fontRef idx="minor">
+              <a:schemeClr val="dk1"/>
+            </a:fontRef>
+          </p:style>
+          <p:txBody>
+            <a:bodyPr lIns="36000" tIns="36000" rIns="36000" bIns="36000" rtlCol="0" anchor="ctr"/>
+            <a:lstStyle/>
+            <a:p>
+              <a:pPr algn="ctr"/>
+              <a:r>
+                <a:rPr lang="fr-BE" sz="1100" smtClean="0"/>
+                <a:t>Actuators</a:t>
+              </a:r>
+              <a:endParaRPr lang="fr-BE" sz="1100"/>
+            </a:p>
+          </p:txBody>
+        </p:sp>
+        <p:sp>
+          <p:nvSpPr>
+            <p:cNvPr id="92" name="Rectangle 91"/>
+            <p:cNvSpPr/>
+            <p:nvPr/>
+          </p:nvSpPr>
+          <p:spPr>
+            <a:xfrm>
+              <a:off x="5109964" y="3513965"/>
+              <a:ext cx="720080" cy="324000"/>
+            </a:xfrm>
+            <a:prstGeom prst="rect">
+              <a:avLst/>
+            </a:prstGeom>
+          </p:spPr>
+          <p:style>
+            <a:lnRef idx="2">
+              <a:schemeClr val="dk1"/>
+            </a:lnRef>
+            <a:fillRef idx="1">
+              <a:schemeClr val="lt1"/>
+            </a:fillRef>
+            <a:effectRef idx="0">
+              <a:schemeClr val="dk1"/>
+            </a:effectRef>
+            <a:fontRef idx="minor">
+              <a:schemeClr val="dk1"/>
+            </a:fontRef>
+          </p:style>
+          <p:txBody>
+            <a:bodyPr lIns="36000" tIns="36000" rIns="36000" bIns="36000" rtlCol="0" anchor="ctr"/>
+            <a:lstStyle/>
+            <a:p>
+              <a:pPr algn="ctr"/>
+              <a:r>
+                <a:rPr lang="fr-BE" sz="1100" smtClean="0"/>
+                <a:t>Engine</a:t>
+              </a:r>
+            </a:p>
+          </p:txBody>
+        </p:sp>
+        <p:sp>
+          <p:nvSpPr>
+            <p:cNvPr id="93" name="Rectangle 92"/>
+            <p:cNvSpPr/>
+            <p:nvPr/>
+          </p:nvSpPr>
+          <p:spPr>
+            <a:xfrm>
+              <a:off x="4245868" y="3513965"/>
+              <a:ext cx="720080" cy="324000"/>
+            </a:xfrm>
+            <a:prstGeom prst="rect">
+              <a:avLst/>
+            </a:prstGeom>
+          </p:spPr>
+          <p:style>
+            <a:lnRef idx="2">
+              <a:schemeClr val="dk1"/>
+            </a:lnRef>
+            <a:fillRef idx="1">
+              <a:schemeClr val="lt1"/>
+            </a:fillRef>
+            <a:effectRef idx="0">
+              <a:schemeClr val="dk1"/>
+            </a:effectRef>
+            <a:fontRef idx="minor">
+              <a:schemeClr val="dk1"/>
+            </a:fontRef>
+          </p:style>
+          <p:txBody>
+            <a:bodyPr lIns="36000" tIns="36000" rIns="36000" bIns="36000" rtlCol="0" anchor="ctr"/>
+            <a:lstStyle/>
+            <a:p>
+              <a:pPr algn="ctr"/>
+              <a:r>
+                <a:rPr lang="fr-BE" sz="1100" smtClean="0"/>
+                <a:t>Doors</a:t>
+              </a:r>
+            </a:p>
+          </p:txBody>
+        </p:sp>
+        <p:cxnSp>
+          <p:nvCxnSpPr>
+            <p:cNvPr id="95" name="Connecteur droit avec flèche 94"/>
+            <p:cNvCxnSpPr>
+              <a:stCxn id="90" idx="2"/>
+            </p:cNvCxnSpPr>
+            <p:nvPr/>
+          </p:nvCxnSpPr>
+          <p:spPr>
+            <a:xfrm rot="5400000">
+              <a:off x="2013287" y="4413568"/>
+              <a:ext cx="1152000" cy="794"/>
+            </a:xfrm>
+            <a:prstGeom prst="straightConnector1">
+              <a:avLst/>
+            </a:prstGeom>
+            <a:ln>
+              <a:tailEnd type="triangle"/>
+            </a:ln>
+          </p:spPr>
+          <p:style>
+            <a:lnRef idx="2">
+              <a:schemeClr val="dk1"/>
+            </a:lnRef>
+            <a:fillRef idx="0">
+              <a:schemeClr val="dk1"/>
+            </a:fillRef>
+            <a:effectRef idx="1">
+              <a:schemeClr val="dk1"/>
+            </a:effectRef>
+            <a:fontRef idx="minor">
+              <a:schemeClr val="tx1"/>
+            </a:fontRef>
+          </p:style>
+        </p:cxnSp>
+        <p:cxnSp>
+          <p:nvCxnSpPr>
+            <p:cNvPr id="97" name="Connecteur droit avec flèche 96"/>
+            <p:cNvCxnSpPr>
+              <a:stCxn id="91" idx="2"/>
+            </p:cNvCxnSpPr>
+            <p:nvPr/>
+          </p:nvCxnSpPr>
+          <p:spPr>
+            <a:xfrm rot="5400000">
+              <a:off x="3131507" y="4413568"/>
+              <a:ext cx="1152000" cy="794"/>
+            </a:xfrm>
+            <a:prstGeom prst="straightConnector1">
+              <a:avLst/>
+            </a:prstGeom>
+            <a:ln>
+              <a:tailEnd type="triangle"/>
+            </a:ln>
+          </p:spPr>
+          <p:style>
+            <a:lnRef idx="2">
+              <a:schemeClr val="dk1"/>
+            </a:lnRef>
+            <a:fillRef idx="0">
+              <a:schemeClr val="dk1"/>
+            </a:fillRef>
+            <a:effectRef idx="1">
+              <a:schemeClr val="dk1"/>
+            </a:effectRef>
+            <a:fontRef idx="minor">
+              <a:schemeClr val="tx1"/>
+            </a:fontRef>
+          </p:style>
+        </p:cxnSp>
+        <p:cxnSp>
+          <p:nvCxnSpPr>
+            <p:cNvPr id="99" name="Connecteur droit avec flèche 98"/>
+            <p:cNvCxnSpPr>
+              <a:stCxn id="93" idx="2"/>
+            </p:cNvCxnSpPr>
+            <p:nvPr/>
+          </p:nvCxnSpPr>
+          <p:spPr>
+            <a:xfrm rot="5400000">
+              <a:off x="4029511" y="4413568"/>
+              <a:ext cx="1152000" cy="794"/>
+            </a:xfrm>
+            <a:prstGeom prst="straightConnector1">
+              <a:avLst/>
+            </a:prstGeom>
+            <a:ln>
+              <a:tailEnd type="triangle"/>
+            </a:ln>
+          </p:spPr>
+          <p:style>
+            <a:lnRef idx="2">
+              <a:schemeClr val="dk1"/>
+            </a:lnRef>
+            <a:fillRef idx="0">
+              <a:schemeClr val="dk1"/>
+            </a:fillRef>
+            <a:effectRef idx="1">
+              <a:schemeClr val="dk1"/>
+            </a:effectRef>
+            <a:fontRef idx="minor">
+              <a:schemeClr val="tx1"/>
+            </a:fontRef>
+          </p:style>
+        </p:cxnSp>
+        <p:cxnSp>
+          <p:nvCxnSpPr>
+            <p:cNvPr id="100" name="Connecteur droit avec flèche 99"/>
+            <p:cNvCxnSpPr>
+              <a:stCxn id="92" idx="2"/>
+            </p:cNvCxnSpPr>
+            <p:nvPr/>
+          </p:nvCxnSpPr>
+          <p:spPr>
+            <a:xfrm rot="5400000">
+              <a:off x="4893607" y="4413568"/>
+              <a:ext cx="1152000" cy="794"/>
+            </a:xfrm>
+            <a:prstGeom prst="straightConnector1">
+              <a:avLst/>
+            </a:prstGeom>
+            <a:ln>
+              <a:tailEnd type="triangle"/>
+            </a:ln>
+          </p:spPr>
+          <p:style>
+            <a:lnRef idx="2">
+              <a:schemeClr val="dk1"/>
+            </a:lnRef>
+            <a:fillRef idx="0">
+              <a:schemeClr val="dk1"/>
+            </a:fillRef>
+            <a:effectRef idx="1">
+              <a:schemeClr val="dk1"/>
+            </a:effectRef>
+            <a:fontRef idx="minor">
+              <a:schemeClr val="tx1"/>
+            </a:fontRef>
+          </p:style>
+        </p:cxnSp>
+        <p:cxnSp>
+          <p:nvCxnSpPr>
+            <p:cNvPr id="103" name="Connecteur droit avec flèche 102"/>
+            <p:cNvCxnSpPr/>
+            <p:nvPr/>
+          </p:nvCxnSpPr>
+          <p:spPr>
+            <a:xfrm>
+              <a:off x="2589684" y="4113022"/>
+              <a:ext cx="1116000" cy="0"/>
+            </a:xfrm>
+            <a:prstGeom prst="straightConnector1">
+              <a:avLst/>
+            </a:prstGeom>
+            <a:ln>
+              <a:tailEnd type="triangle"/>
+            </a:ln>
+          </p:spPr>
+          <p:style>
+            <a:lnRef idx="1">
+              <a:schemeClr val="dk1"/>
+            </a:lnRef>
+            <a:fillRef idx="0">
+              <a:schemeClr val="dk1"/>
+            </a:fillRef>
+            <a:effectRef idx="0">
+              <a:schemeClr val="dk1"/>
+            </a:effectRef>
+            <a:fontRef idx="minor">
+              <a:schemeClr val="tx1"/>
+            </a:fontRef>
+          </p:style>
+        </p:cxnSp>
+        <p:sp>
+          <p:nvSpPr>
+            <p:cNvPr id="104" name="ZoneTexte 103"/>
+            <p:cNvSpPr txBox="1"/>
+            <p:nvPr/>
+          </p:nvSpPr>
+          <p:spPr>
+            <a:xfrm>
+              <a:off x="2689553" y="4013070"/>
+              <a:ext cx="720000" cy="169277"/>
+            </a:xfrm>
+            <a:prstGeom prst="rect">
+              <a:avLst/>
+            </a:prstGeom>
+            <a:solidFill>
+              <a:schemeClr val="lt1"/>
+            </a:solidFill>
+            <a:ln>
+              <a:noFill/>
+            </a:ln>
+          </p:spPr>
+          <p:txBody>
+            <a:bodyPr wrap="square" lIns="18000" tIns="0" rIns="18000" bIns="0" rtlCol="0">
+              <a:spAutoFit/>
+            </a:bodyPr>
+            <a:lstStyle/>
+            <a:p>
+              <a:pPr algn="ctr"/>
+              <a:r>
+                <a:rPr lang="fr-BE" sz="1100" smtClean="0"/>
+                <a:t>start-signal</a:t>
+              </a:r>
+              <a:endParaRPr lang="fr-BE" sz="1100"/>
+            </a:p>
+          </p:txBody>
+        </p:sp>
+        <p:cxnSp>
+          <p:nvCxnSpPr>
+            <p:cNvPr id="105" name="Connecteur droit avec flèche 104"/>
+            <p:cNvCxnSpPr/>
+            <p:nvPr/>
+          </p:nvCxnSpPr>
+          <p:spPr>
+            <a:xfrm>
+              <a:off x="3708096" y="4260736"/>
+              <a:ext cx="1764000" cy="1588"/>
+            </a:xfrm>
+            <a:prstGeom prst="straightConnector1">
+              <a:avLst/>
+            </a:prstGeom>
+            <a:ln>
+              <a:tailEnd type="triangle"/>
+            </a:ln>
+          </p:spPr>
+          <p:style>
+            <a:lnRef idx="1">
+              <a:schemeClr val="dk1"/>
+            </a:lnRef>
+            <a:fillRef idx="0">
+              <a:schemeClr val="dk1"/>
+            </a:fillRef>
+            <a:effectRef idx="0">
+              <a:schemeClr val="dk1"/>
+            </a:effectRef>
+            <a:fontRef idx="minor">
+              <a:schemeClr val="tx1"/>
+            </a:fontRef>
+          </p:style>
+        </p:cxnSp>
+        <p:sp>
+          <p:nvSpPr>
+            <p:cNvPr id="106" name="ZoneTexte 105"/>
+            <p:cNvSpPr txBox="1"/>
+            <p:nvPr/>
+          </p:nvSpPr>
+          <p:spPr>
+            <a:xfrm>
+              <a:off x="4436378" y="4165480"/>
+              <a:ext cx="324000" cy="169277"/>
+            </a:xfrm>
+            <a:prstGeom prst="rect">
+              <a:avLst/>
+            </a:prstGeom>
+            <a:solidFill>
+              <a:schemeClr val="lt1"/>
+            </a:solidFill>
+            <a:ln>
+              <a:noFill/>
+            </a:ln>
+          </p:spPr>
+          <p:txBody>
+            <a:bodyPr wrap="square" lIns="18000" tIns="0" rIns="18000" bIns="0" rtlCol="0">
+              <a:spAutoFit/>
+            </a:bodyPr>
+            <a:lstStyle/>
+            <a:p>
+              <a:pPr algn="ctr"/>
+              <a:r>
+                <a:rPr lang="fr-BE" sz="1100" smtClean="0"/>
+                <a:t>start</a:t>
+              </a:r>
+              <a:endParaRPr lang="fr-BE" sz="1100"/>
+            </a:p>
+          </p:txBody>
+        </p:sp>
+        <p:cxnSp>
+          <p:nvCxnSpPr>
+            <p:cNvPr id="117" name="Connecteur droit avec flèche 116"/>
+            <p:cNvCxnSpPr/>
+            <p:nvPr/>
+          </p:nvCxnSpPr>
+          <p:spPr>
+            <a:xfrm flipV="1">
+              <a:off x="2589684" y="4731494"/>
+              <a:ext cx="1116000" cy="862"/>
+            </a:xfrm>
+            <a:prstGeom prst="straightConnector1">
+              <a:avLst/>
+            </a:prstGeom>
+            <a:ln>
+              <a:tailEnd type="triangle"/>
+            </a:ln>
+          </p:spPr>
+          <p:style>
+            <a:lnRef idx="1">
+              <a:schemeClr val="dk1"/>
+            </a:lnRef>
+            <a:fillRef idx="0">
+              <a:schemeClr val="dk1"/>
+            </a:fillRef>
+            <a:effectRef idx="0">
+              <a:schemeClr val="dk1"/>
+            </a:effectRef>
+            <a:fontRef idx="minor">
+              <a:schemeClr val="tx1"/>
+            </a:fontRef>
+          </p:style>
+        </p:cxnSp>
+        <p:sp>
+          <p:nvSpPr>
+            <p:cNvPr id="118" name="ZoneTexte 117"/>
+            <p:cNvSpPr txBox="1"/>
+            <p:nvPr/>
+          </p:nvSpPr>
+          <p:spPr>
+            <a:xfrm>
+              <a:off x="2843808" y="4637355"/>
+              <a:ext cx="720000" cy="169277"/>
+            </a:xfrm>
+            <a:prstGeom prst="rect">
+              <a:avLst/>
+            </a:prstGeom>
+            <a:solidFill>
+              <a:schemeClr val="lt1"/>
+            </a:solidFill>
+            <a:ln>
+              <a:noFill/>
+            </a:ln>
+          </p:spPr>
+          <p:txBody>
+            <a:bodyPr wrap="square" lIns="18000" tIns="0" rIns="18000" bIns="0" rtlCol="0">
+              <a:spAutoFit/>
+            </a:bodyPr>
+            <a:lstStyle/>
+            <a:p>
+              <a:pPr algn="ctr"/>
+              <a:r>
+                <a:rPr lang="fr-BE" sz="1100" smtClean="0"/>
+                <a:t>open-signal</a:t>
+              </a:r>
+              <a:endParaRPr lang="fr-BE" sz="1100"/>
+            </a:p>
+          </p:txBody>
+        </p:sp>
+        <p:sp>
+          <p:nvSpPr>
+            <p:cNvPr id="119" name="ZoneTexte 118"/>
+            <p:cNvSpPr txBox="1"/>
+            <p:nvPr/>
+          </p:nvSpPr>
+          <p:spPr>
+            <a:xfrm>
+              <a:off x="2570850" y="4502770"/>
+              <a:ext cx="344966" cy="461665"/>
+            </a:xfrm>
+            <a:prstGeom prst="rect">
+              <a:avLst/>
+            </a:prstGeom>
+            <a:noFill/>
+          </p:spPr>
+          <p:txBody>
+            <a:bodyPr wrap="none" rtlCol="0">
+              <a:spAutoFit/>
+            </a:bodyPr>
+            <a:lstStyle/>
+            <a:p>
+              <a:r>
+                <a:rPr lang="fr-BE" sz="2400" smtClean="0"/>
+                <a:t>X</a:t>
+              </a:r>
+              <a:endParaRPr lang="fr-BE" sz="2400"/>
             </a:p>
           </p:txBody>
         </p:sp>

</xml_diff>

<commit_message>
Added an image illustrating hMSCs
</commit_message>
<xml_diff>
--- a/writing/images/train.pptx
+++ b/writing/images/train.pptx
@@ -7,6 +7,7 @@
   <p:sldIdLst>
     <p:sldId id="256" r:id="rId2"/>
     <p:sldId id="257" r:id="rId3"/>
+    <p:sldId id="258" r:id="rId4"/>
   </p:sldIdLst>
   <p:sldSz cx="9144000" cy="6858000" type="screen4x3"/>
   <p:notesSz cx="6858000" cy="9144000"/>
@@ -6151,6 +6152,3544 @@
 </p:sld>
 </file>
 
+<file path=ppt/slides/slide3.xml><?xml version="1.0" encoding="utf-8"?>
+<p:sld xmlns:a="http://schemas.openxmlformats.org/drawingml/2006/main" xmlns:r="http://schemas.openxmlformats.org/officeDocument/2006/relationships" xmlns:p="http://schemas.openxmlformats.org/presentationml/2006/main">
+  <p:cSld>
+    <p:spTree>
+      <p:nvGrpSpPr>
+        <p:cNvPr id="1" name=""/>
+        <p:cNvGrpSpPr/>
+        <p:nvPr/>
+      </p:nvGrpSpPr>
+      <p:grpSpPr>
+        <a:xfrm>
+          <a:off x="0" y="0"/>
+          <a:ext cx="0" cy="0"/>
+          <a:chOff x="0" y="0"/>
+          <a:chExt cx="0" cy="0"/>
+        </a:xfrm>
+      </p:grpSpPr>
+      <p:grpSp>
+        <p:nvGrpSpPr>
+          <p:cNvPr id="166" name="Groupe 165"/>
+          <p:cNvGrpSpPr/>
+          <p:nvPr/>
+        </p:nvGrpSpPr>
+        <p:grpSpPr>
+          <a:xfrm>
+            <a:off x="3995936" y="6741368"/>
+            <a:ext cx="5578524" cy="2052000"/>
+            <a:chOff x="240150" y="3249016"/>
+            <a:chExt cx="5578524" cy="2052000"/>
+          </a:xfrm>
+        </p:grpSpPr>
+        <p:sp>
+          <p:nvSpPr>
+            <p:cNvPr id="52" name="Rectangle 51"/>
+            <p:cNvSpPr/>
+            <p:nvPr/>
+          </p:nvSpPr>
+          <p:spPr>
+            <a:xfrm>
+              <a:off x="240150" y="3249016"/>
+              <a:ext cx="720080" cy="324000"/>
+            </a:xfrm>
+            <a:prstGeom prst="rect">
+              <a:avLst/>
+            </a:prstGeom>
+          </p:spPr>
+          <p:style>
+            <a:lnRef idx="2">
+              <a:schemeClr val="dk1"/>
+            </a:lnRef>
+            <a:fillRef idx="1">
+              <a:schemeClr val="lt1"/>
+            </a:fillRef>
+            <a:effectRef idx="0">
+              <a:schemeClr val="dk1"/>
+            </a:effectRef>
+            <a:fontRef idx="minor">
+              <a:schemeClr val="dk1"/>
+            </a:fontRef>
+          </p:style>
+          <p:txBody>
+            <a:bodyPr lIns="36000" tIns="36000" rIns="36000" bIns="36000" rtlCol="0" anchor="ctr"/>
+            <a:lstStyle/>
+            <a:p>
+              <a:pPr algn="ctr"/>
+              <a:r>
+                <a:rPr lang="fr-BE" sz="1100" smtClean="0"/>
+                <a:t>Passenger</a:t>
+              </a:r>
+              <a:endParaRPr lang="fr-BE" sz="1100"/>
+            </a:p>
+          </p:txBody>
+        </p:sp>
+        <p:sp>
+          <p:nvSpPr>
+            <p:cNvPr id="53" name="Rectangle 52"/>
+            <p:cNvSpPr/>
+            <p:nvPr/>
+          </p:nvSpPr>
+          <p:spPr>
+            <a:xfrm>
+              <a:off x="2146266" y="3249016"/>
+              <a:ext cx="864096" cy="324000"/>
+            </a:xfrm>
+            <a:prstGeom prst="rect">
+              <a:avLst/>
+            </a:prstGeom>
+          </p:spPr>
+          <p:style>
+            <a:lnRef idx="2">
+              <a:schemeClr val="dk1"/>
+            </a:lnRef>
+            <a:fillRef idx="1">
+              <a:schemeClr val="lt1"/>
+            </a:fillRef>
+            <a:effectRef idx="0">
+              <a:schemeClr val="dk1"/>
+            </a:effectRef>
+            <a:fontRef idx="minor">
+              <a:schemeClr val="dk1"/>
+            </a:fontRef>
+          </p:style>
+          <p:txBody>
+            <a:bodyPr lIns="36000" tIns="36000" rIns="36000" bIns="36000" rtlCol="0" anchor="ctr" anchorCtr="0"/>
+            <a:lstStyle/>
+            <a:p>
+              <a:pPr algn="ctr"/>
+              <a:r>
+                <a:rPr lang="fr-BE" sz="1100" smtClean="0"/>
+                <a:t>Controller</a:t>
+              </a:r>
+              <a:endParaRPr lang="fr-BE" sz="1100"/>
+            </a:p>
+          </p:txBody>
+        </p:sp>
+        <p:sp>
+          <p:nvSpPr>
+            <p:cNvPr id="56" name="Rectangle 55"/>
+            <p:cNvSpPr/>
+            <p:nvPr/>
+          </p:nvSpPr>
+          <p:spPr>
+            <a:xfrm>
+              <a:off x="3226386" y="3249016"/>
+              <a:ext cx="720080" cy="324000"/>
+            </a:xfrm>
+            <a:prstGeom prst="rect">
+              <a:avLst/>
+            </a:prstGeom>
+          </p:spPr>
+          <p:style>
+            <a:lnRef idx="2">
+              <a:schemeClr val="dk1"/>
+            </a:lnRef>
+            <a:fillRef idx="1">
+              <a:schemeClr val="lt1"/>
+            </a:fillRef>
+            <a:effectRef idx="0">
+              <a:schemeClr val="dk1"/>
+            </a:effectRef>
+            <a:fontRef idx="minor">
+              <a:schemeClr val="dk1"/>
+            </a:fontRef>
+          </p:style>
+          <p:txBody>
+            <a:bodyPr lIns="36000" tIns="36000" rIns="36000" bIns="36000" rtlCol="0" anchor="ctr"/>
+            <a:lstStyle/>
+            <a:p>
+              <a:pPr algn="ctr"/>
+              <a:r>
+                <a:rPr lang="fr-BE" sz="1100" smtClean="0"/>
+                <a:t>Actuators</a:t>
+              </a:r>
+              <a:endParaRPr lang="fr-BE" sz="1100"/>
+            </a:p>
+          </p:txBody>
+        </p:sp>
+        <p:sp>
+          <p:nvSpPr>
+            <p:cNvPr id="60" name="Rectangle 59"/>
+            <p:cNvSpPr/>
+            <p:nvPr/>
+          </p:nvSpPr>
+          <p:spPr>
+            <a:xfrm>
+              <a:off x="5098594" y="3249016"/>
+              <a:ext cx="720080" cy="324000"/>
+            </a:xfrm>
+            <a:prstGeom prst="rect">
+              <a:avLst/>
+            </a:prstGeom>
+          </p:spPr>
+          <p:style>
+            <a:lnRef idx="2">
+              <a:schemeClr val="dk1"/>
+            </a:lnRef>
+            <a:fillRef idx="1">
+              <a:schemeClr val="lt1"/>
+            </a:fillRef>
+            <a:effectRef idx="0">
+              <a:schemeClr val="dk1"/>
+            </a:effectRef>
+            <a:fontRef idx="minor">
+              <a:schemeClr val="dk1"/>
+            </a:fontRef>
+          </p:style>
+          <p:txBody>
+            <a:bodyPr lIns="36000" tIns="36000" rIns="36000" bIns="36000" rtlCol="0" anchor="ctr"/>
+            <a:lstStyle/>
+            <a:p>
+              <a:pPr algn="ctr"/>
+              <a:r>
+                <a:rPr lang="fr-BE" sz="1100" smtClean="0"/>
+                <a:t>Engine</a:t>
+              </a:r>
+            </a:p>
+          </p:txBody>
+        </p:sp>
+        <p:sp>
+          <p:nvSpPr>
+            <p:cNvPr id="61" name="Rectangle 60"/>
+            <p:cNvSpPr/>
+            <p:nvPr/>
+          </p:nvSpPr>
+          <p:spPr>
+            <a:xfrm>
+              <a:off x="4234498" y="3249016"/>
+              <a:ext cx="720080" cy="324000"/>
+            </a:xfrm>
+            <a:prstGeom prst="rect">
+              <a:avLst/>
+            </a:prstGeom>
+          </p:spPr>
+          <p:style>
+            <a:lnRef idx="2">
+              <a:schemeClr val="dk1"/>
+            </a:lnRef>
+            <a:fillRef idx="1">
+              <a:schemeClr val="lt1"/>
+            </a:fillRef>
+            <a:effectRef idx="0">
+              <a:schemeClr val="dk1"/>
+            </a:effectRef>
+            <a:fontRef idx="minor">
+              <a:schemeClr val="dk1"/>
+            </a:fontRef>
+          </p:style>
+          <p:txBody>
+            <a:bodyPr lIns="36000" tIns="36000" rIns="36000" bIns="36000" rtlCol="0" anchor="ctr"/>
+            <a:lstStyle/>
+            <a:p>
+              <a:pPr algn="ctr"/>
+              <a:r>
+                <a:rPr lang="fr-BE" sz="1100" smtClean="0"/>
+                <a:t>Doors</a:t>
+              </a:r>
+            </a:p>
+          </p:txBody>
+        </p:sp>
+        <p:sp>
+          <p:nvSpPr>
+            <p:cNvPr id="62" name="Rectangle 61"/>
+            <p:cNvSpPr/>
+            <p:nvPr/>
+          </p:nvSpPr>
+          <p:spPr>
+            <a:xfrm>
+              <a:off x="1260426" y="3249016"/>
+              <a:ext cx="720080" cy="324000"/>
+            </a:xfrm>
+            <a:prstGeom prst="rect">
+              <a:avLst/>
+            </a:prstGeom>
+          </p:spPr>
+          <p:style>
+            <a:lnRef idx="2">
+              <a:schemeClr val="dk1"/>
+            </a:lnRef>
+            <a:fillRef idx="1">
+              <a:schemeClr val="lt1"/>
+            </a:fillRef>
+            <a:effectRef idx="0">
+              <a:schemeClr val="dk1"/>
+            </a:effectRef>
+            <a:fontRef idx="minor">
+              <a:schemeClr val="dk1"/>
+            </a:fontRef>
+          </p:style>
+          <p:txBody>
+            <a:bodyPr lIns="36000" tIns="36000" rIns="36000" bIns="36000" rtlCol="0" anchor="ctr"/>
+            <a:lstStyle/>
+            <a:p>
+              <a:pPr algn="ctr"/>
+              <a:r>
+                <a:rPr lang="fr-BE" sz="1100" smtClean="0"/>
+                <a:t>Sensors</a:t>
+              </a:r>
+            </a:p>
+          </p:txBody>
+        </p:sp>
+        <p:cxnSp>
+          <p:nvCxnSpPr>
+            <p:cNvPr id="63" name="Connecteur droit avec flèche 62"/>
+            <p:cNvCxnSpPr>
+              <a:stCxn id="53" idx="2"/>
+            </p:cNvCxnSpPr>
+            <p:nvPr/>
+          </p:nvCxnSpPr>
+          <p:spPr>
+            <a:xfrm rot="5400000">
+              <a:off x="1713917" y="4436619"/>
+              <a:ext cx="1728000" cy="794"/>
+            </a:xfrm>
+            <a:prstGeom prst="straightConnector1">
+              <a:avLst/>
+            </a:prstGeom>
+            <a:ln>
+              <a:tailEnd type="triangle"/>
+            </a:ln>
+          </p:spPr>
+          <p:style>
+            <a:lnRef idx="2">
+              <a:schemeClr val="dk1"/>
+            </a:lnRef>
+            <a:fillRef idx="0">
+              <a:schemeClr val="dk1"/>
+            </a:fillRef>
+            <a:effectRef idx="1">
+              <a:schemeClr val="dk1"/>
+            </a:effectRef>
+            <a:fontRef idx="minor">
+              <a:schemeClr val="tx1"/>
+            </a:fontRef>
+          </p:style>
+        </p:cxnSp>
+        <p:cxnSp>
+          <p:nvCxnSpPr>
+            <p:cNvPr id="64" name="Connecteur droit avec flèche 63"/>
+            <p:cNvCxnSpPr>
+              <a:stCxn id="52" idx="2"/>
+            </p:cNvCxnSpPr>
+            <p:nvPr/>
+          </p:nvCxnSpPr>
+          <p:spPr>
+            <a:xfrm rot="5400000">
+              <a:off x="-264207" y="4436619"/>
+              <a:ext cx="1728000" cy="794"/>
+            </a:xfrm>
+            <a:prstGeom prst="straightConnector1">
+              <a:avLst/>
+            </a:prstGeom>
+            <a:ln>
+              <a:tailEnd type="triangle"/>
+            </a:ln>
+          </p:spPr>
+          <p:style>
+            <a:lnRef idx="2">
+              <a:schemeClr val="dk1"/>
+            </a:lnRef>
+            <a:fillRef idx="0">
+              <a:schemeClr val="dk1"/>
+            </a:fillRef>
+            <a:effectRef idx="1">
+              <a:schemeClr val="dk1"/>
+            </a:effectRef>
+            <a:fontRef idx="minor">
+              <a:schemeClr val="tx1"/>
+            </a:fontRef>
+          </p:style>
+        </p:cxnSp>
+        <p:cxnSp>
+          <p:nvCxnSpPr>
+            <p:cNvPr id="65" name="Connecteur droit avec flèche 64"/>
+            <p:cNvCxnSpPr>
+              <a:stCxn id="56" idx="2"/>
+            </p:cNvCxnSpPr>
+            <p:nvPr/>
+          </p:nvCxnSpPr>
+          <p:spPr>
+            <a:xfrm rot="5400000">
+              <a:off x="2722029" y="4436619"/>
+              <a:ext cx="1728000" cy="794"/>
+            </a:xfrm>
+            <a:prstGeom prst="straightConnector1">
+              <a:avLst/>
+            </a:prstGeom>
+            <a:ln>
+              <a:tailEnd type="triangle"/>
+            </a:ln>
+          </p:spPr>
+          <p:style>
+            <a:lnRef idx="2">
+              <a:schemeClr val="dk1"/>
+            </a:lnRef>
+            <a:fillRef idx="0">
+              <a:schemeClr val="dk1"/>
+            </a:fillRef>
+            <a:effectRef idx="1">
+              <a:schemeClr val="dk1"/>
+            </a:effectRef>
+            <a:fontRef idx="minor">
+              <a:schemeClr val="tx1"/>
+            </a:fontRef>
+          </p:style>
+        </p:cxnSp>
+        <p:cxnSp>
+          <p:nvCxnSpPr>
+            <p:cNvPr id="68" name="Connecteur droit avec flèche 67"/>
+            <p:cNvCxnSpPr>
+              <a:stCxn id="62" idx="2"/>
+            </p:cNvCxnSpPr>
+            <p:nvPr/>
+          </p:nvCxnSpPr>
+          <p:spPr>
+            <a:xfrm rot="5400000">
+              <a:off x="756069" y="4436619"/>
+              <a:ext cx="1728000" cy="794"/>
+            </a:xfrm>
+            <a:prstGeom prst="straightConnector1">
+              <a:avLst/>
+            </a:prstGeom>
+            <a:ln>
+              <a:tailEnd type="triangle"/>
+            </a:ln>
+          </p:spPr>
+          <p:style>
+            <a:lnRef idx="2">
+              <a:schemeClr val="dk1"/>
+            </a:lnRef>
+            <a:fillRef idx="0">
+              <a:schemeClr val="dk1"/>
+            </a:fillRef>
+            <a:effectRef idx="1">
+              <a:schemeClr val="dk1"/>
+            </a:effectRef>
+            <a:fontRef idx="minor">
+              <a:schemeClr val="tx1"/>
+            </a:fontRef>
+          </p:style>
+        </p:cxnSp>
+        <p:cxnSp>
+          <p:nvCxnSpPr>
+            <p:cNvPr id="69" name="Connecteur droit avec flèche 68"/>
+            <p:cNvCxnSpPr>
+              <a:stCxn id="61" idx="2"/>
+            </p:cNvCxnSpPr>
+            <p:nvPr/>
+          </p:nvCxnSpPr>
+          <p:spPr>
+            <a:xfrm rot="5400000">
+              <a:off x="3730141" y="4436619"/>
+              <a:ext cx="1728000" cy="794"/>
+            </a:xfrm>
+            <a:prstGeom prst="straightConnector1">
+              <a:avLst/>
+            </a:prstGeom>
+            <a:ln>
+              <a:tailEnd type="triangle"/>
+            </a:ln>
+          </p:spPr>
+          <p:style>
+            <a:lnRef idx="2">
+              <a:schemeClr val="dk1"/>
+            </a:lnRef>
+            <a:fillRef idx="0">
+              <a:schemeClr val="dk1"/>
+            </a:fillRef>
+            <a:effectRef idx="1">
+              <a:schemeClr val="dk1"/>
+            </a:effectRef>
+            <a:fontRef idx="minor">
+              <a:schemeClr val="tx1"/>
+            </a:fontRef>
+          </p:style>
+        </p:cxnSp>
+        <p:cxnSp>
+          <p:nvCxnSpPr>
+            <p:cNvPr id="70" name="Connecteur droit avec flèche 69"/>
+            <p:cNvCxnSpPr>
+              <a:stCxn id="60" idx="2"/>
+            </p:cNvCxnSpPr>
+            <p:nvPr/>
+          </p:nvCxnSpPr>
+          <p:spPr>
+            <a:xfrm rot="5400000">
+              <a:off x="4594237" y="4436619"/>
+              <a:ext cx="1728000" cy="794"/>
+            </a:xfrm>
+            <a:prstGeom prst="straightConnector1">
+              <a:avLst/>
+            </a:prstGeom>
+            <a:ln>
+              <a:tailEnd type="triangle"/>
+            </a:ln>
+          </p:spPr>
+          <p:style>
+            <a:lnRef idx="2">
+              <a:schemeClr val="dk1"/>
+            </a:lnRef>
+            <a:fillRef idx="0">
+              <a:schemeClr val="dk1"/>
+            </a:fillRef>
+            <a:effectRef idx="1">
+              <a:schemeClr val="dk1"/>
+            </a:effectRef>
+            <a:fontRef idx="minor">
+              <a:schemeClr val="tx1"/>
+            </a:fontRef>
+          </p:style>
+        </p:cxnSp>
+        <p:cxnSp>
+          <p:nvCxnSpPr>
+            <p:cNvPr id="71" name="Connecteur droit avec flèche 70"/>
+            <p:cNvCxnSpPr/>
+            <p:nvPr/>
+          </p:nvCxnSpPr>
+          <p:spPr>
+            <a:xfrm>
+              <a:off x="600190" y="4216115"/>
+              <a:ext cx="1008112" cy="1588"/>
+            </a:xfrm>
+            <a:prstGeom prst="straightConnector1">
+              <a:avLst/>
+            </a:prstGeom>
+            <a:ln>
+              <a:tailEnd type="triangle"/>
+            </a:ln>
+          </p:spPr>
+          <p:style>
+            <a:lnRef idx="1">
+              <a:schemeClr val="dk1"/>
+            </a:lnRef>
+            <a:fillRef idx="0">
+              <a:schemeClr val="dk1"/>
+            </a:fillRef>
+            <a:effectRef idx="0">
+              <a:schemeClr val="dk1"/>
+            </a:effectRef>
+            <a:fontRef idx="minor">
+              <a:schemeClr val="tx1"/>
+            </a:fontRef>
+          </p:style>
+        </p:cxnSp>
+        <p:sp>
+          <p:nvSpPr>
+            <p:cNvPr id="73" name="ZoneTexte 72"/>
+            <p:cNvSpPr txBox="1"/>
+            <p:nvPr/>
+          </p:nvSpPr>
+          <p:spPr>
+            <a:xfrm>
+              <a:off x="623882" y="4114764"/>
+              <a:ext cx="864000" cy="180000"/>
+            </a:xfrm>
+            <a:prstGeom prst="rect">
+              <a:avLst/>
+            </a:prstGeom>
+            <a:solidFill>
+              <a:schemeClr val="lt1"/>
+            </a:solidFill>
+            <a:ln>
+              <a:noFill/>
+            </a:ln>
+          </p:spPr>
+          <p:txBody>
+            <a:bodyPr wrap="square" lIns="18000" tIns="0" rIns="18000" bIns="0" rtlCol="0">
+              <a:spAutoFit/>
+            </a:bodyPr>
+            <a:lstStyle/>
+            <a:p>
+              <a:pPr algn="ctr"/>
+              <a:r>
+                <a:rPr lang="fr-BE" sz="1100" smtClean="0"/>
+                <a:t>alarm-pressed</a:t>
+              </a:r>
+              <a:endParaRPr lang="fr-BE" sz="1100"/>
+            </a:p>
+          </p:txBody>
+        </p:sp>
+        <p:cxnSp>
+          <p:nvCxnSpPr>
+            <p:cNvPr id="74" name="Connecteur droit avec flèche 73"/>
+            <p:cNvCxnSpPr/>
+            <p:nvPr/>
+          </p:nvCxnSpPr>
+          <p:spPr>
+            <a:xfrm>
+              <a:off x="2578314" y="3848073"/>
+              <a:ext cx="1005025" cy="0"/>
+            </a:xfrm>
+            <a:prstGeom prst="straightConnector1">
+              <a:avLst/>
+            </a:prstGeom>
+            <a:ln>
+              <a:tailEnd type="triangle"/>
+            </a:ln>
+          </p:spPr>
+          <p:style>
+            <a:lnRef idx="1">
+              <a:schemeClr val="dk1"/>
+            </a:lnRef>
+            <a:fillRef idx="0">
+              <a:schemeClr val="dk1"/>
+            </a:fillRef>
+            <a:effectRef idx="0">
+              <a:schemeClr val="dk1"/>
+            </a:effectRef>
+            <a:fontRef idx="minor">
+              <a:schemeClr val="tx1"/>
+            </a:fontRef>
+          </p:style>
+        </p:cxnSp>
+        <p:sp>
+          <p:nvSpPr>
+            <p:cNvPr id="75" name="ZoneTexte 74"/>
+            <p:cNvSpPr txBox="1"/>
+            <p:nvPr/>
+          </p:nvSpPr>
+          <p:spPr>
+            <a:xfrm>
+              <a:off x="2678183" y="3748121"/>
+              <a:ext cx="720000" cy="169277"/>
+            </a:xfrm>
+            <a:prstGeom prst="rect">
+              <a:avLst/>
+            </a:prstGeom>
+            <a:solidFill>
+              <a:schemeClr val="lt1"/>
+            </a:solidFill>
+            <a:ln>
+              <a:noFill/>
+            </a:ln>
+          </p:spPr>
+          <p:txBody>
+            <a:bodyPr wrap="square" lIns="18000" tIns="0" rIns="18000" bIns="0" rtlCol="0">
+              <a:spAutoFit/>
+            </a:bodyPr>
+            <a:lstStyle/>
+            <a:p>
+              <a:pPr algn="ctr"/>
+              <a:r>
+                <a:rPr lang="fr-BE" sz="1100" smtClean="0"/>
+                <a:t>start-signal</a:t>
+              </a:r>
+              <a:endParaRPr lang="fr-BE" sz="1100"/>
+            </a:p>
+          </p:txBody>
+        </p:sp>
+        <p:cxnSp>
+          <p:nvCxnSpPr>
+            <p:cNvPr id="76" name="Connecteur droit avec flèche 75"/>
+            <p:cNvCxnSpPr/>
+            <p:nvPr/>
+          </p:nvCxnSpPr>
+          <p:spPr>
+            <a:xfrm>
+              <a:off x="3586426" y="3995787"/>
+              <a:ext cx="1872208" cy="1588"/>
+            </a:xfrm>
+            <a:prstGeom prst="straightConnector1">
+              <a:avLst/>
+            </a:prstGeom>
+            <a:ln>
+              <a:tailEnd type="triangle"/>
+            </a:ln>
+          </p:spPr>
+          <p:style>
+            <a:lnRef idx="1">
+              <a:schemeClr val="dk1"/>
+            </a:lnRef>
+            <a:fillRef idx="0">
+              <a:schemeClr val="dk1"/>
+            </a:fillRef>
+            <a:effectRef idx="0">
+              <a:schemeClr val="dk1"/>
+            </a:effectRef>
+            <a:fontRef idx="minor">
+              <a:schemeClr val="tx1"/>
+            </a:fontRef>
+          </p:style>
+        </p:cxnSp>
+        <p:sp>
+          <p:nvSpPr>
+            <p:cNvPr id="77" name="ZoneTexte 76"/>
+            <p:cNvSpPr txBox="1"/>
+            <p:nvPr/>
+          </p:nvSpPr>
+          <p:spPr>
+            <a:xfrm>
+              <a:off x="4425008" y="3900531"/>
+              <a:ext cx="324000" cy="169277"/>
+            </a:xfrm>
+            <a:prstGeom prst="rect">
+              <a:avLst/>
+            </a:prstGeom>
+            <a:solidFill>
+              <a:schemeClr val="lt1"/>
+            </a:solidFill>
+            <a:ln>
+              <a:noFill/>
+            </a:ln>
+          </p:spPr>
+          <p:txBody>
+            <a:bodyPr wrap="square" lIns="18000" tIns="0" rIns="18000" bIns="0" rtlCol="0">
+              <a:spAutoFit/>
+            </a:bodyPr>
+            <a:lstStyle/>
+            <a:p>
+              <a:pPr algn="ctr"/>
+              <a:r>
+                <a:rPr lang="fr-BE" sz="1100" smtClean="0"/>
+                <a:t>start</a:t>
+              </a:r>
+              <a:endParaRPr lang="fr-BE" sz="1100"/>
+            </a:p>
+          </p:txBody>
+        </p:sp>
+        <p:cxnSp>
+          <p:nvCxnSpPr>
+            <p:cNvPr id="78" name="Connecteur droit avec flèche 77"/>
+            <p:cNvCxnSpPr/>
+            <p:nvPr/>
+          </p:nvCxnSpPr>
+          <p:spPr>
+            <a:xfrm>
+              <a:off x="2578314" y="4568153"/>
+              <a:ext cx="1008112" cy="1588"/>
+            </a:xfrm>
+            <a:prstGeom prst="straightConnector1">
+              <a:avLst/>
+            </a:prstGeom>
+            <a:ln>
+              <a:tailEnd type="triangle"/>
+            </a:ln>
+          </p:spPr>
+          <p:style>
+            <a:lnRef idx="1">
+              <a:schemeClr val="dk1"/>
+            </a:lnRef>
+            <a:fillRef idx="0">
+              <a:schemeClr val="dk1"/>
+            </a:fillRef>
+            <a:effectRef idx="0">
+              <a:schemeClr val="dk1"/>
+            </a:effectRef>
+            <a:fontRef idx="minor">
+              <a:schemeClr val="tx1"/>
+            </a:fontRef>
+          </p:style>
+        </p:cxnSp>
+        <p:sp>
+          <p:nvSpPr>
+            <p:cNvPr id="79" name="ZoneTexte 78"/>
+            <p:cNvSpPr txBox="1"/>
+            <p:nvPr/>
+          </p:nvSpPr>
+          <p:spPr>
+            <a:xfrm>
+              <a:off x="2678183" y="4473152"/>
+              <a:ext cx="720000" cy="169277"/>
+            </a:xfrm>
+            <a:prstGeom prst="rect">
+              <a:avLst/>
+            </a:prstGeom>
+            <a:solidFill>
+              <a:schemeClr val="lt1"/>
+            </a:solidFill>
+            <a:ln>
+              <a:noFill/>
+            </a:ln>
+          </p:spPr>
+          <p:txBody>
+            <a:bodyPr wrap="square" lIns="18000" tIns="0" rIns="18000" bIns="0" rtlCol="0">
+              <a:spAutoFit/>
+            </a:bodyPr>
+            <a:lstStyle/>
+            <a:p>
+              <a:pPr algn="ctr"/>
+              <a:r>
+                <a:rPr lang="fr-BE" sz="1100" smtClean="0"/>
+                <a:t>stop-signal</a:t>
+              </a:r>
+              <a:endParaRPr lang="fr-BE" sz="1100"/>
+            </a:p>
+          </p:txBody>
+        </p:sp>
+        <p:cxnSp>
+          <p:nvCxnSpPr>
+            <p:cNvPr id="80" name="Connecteur droit avec flèche 79"/>
+            <p:cNvCxnSpPr/>
+            <p:nvPr/>
+          </p:nvCxnSpPr>
+          <p:spPr>
+            <a:xfrm>
+              <a:off x="3586426" y="4751169"/>
+              <a:ext cx="1872208" cy="1588"/>
+            </a:xfrm>
+            <a:prstGeom prst="straightConnector1">
+              <a:avLst/>
+            </a:prstGeom>
+            <a:ln>
+              <a:tailEnd type="triangle"/>
+            </a:ln>
+          </p:spPr>
+          <p:style>
+            <a:lnRef idx="1">
+              <a:schemeClr val="dk1"/>
+            </a:lnRef>
+            <a:fillRef idx="0">
+              <a:schemeClr val="dk1"/>
+            </a:fillRef>
+            <a:effectRef idx="0">
+              <a:schemeClr val="dk1"/>
+            </a:effectRef>
+            <a:fontRef idx="minor">
+              <a:schemeClr val="tx1"/>
+            </a:fontRef>
+          </p:style>
+        </p:cxnSp>
+        <p:sp>
+          <p:nvSpPr>
+            <p:cNvPr id="82" name="ZoneTexte 81"/>
+            <p:cNvSpPr txBox="1"/>
+            <p:nvPr/>
+          </p:nvSpPr>
+          <p:spPr>
+            <a:xfrm>
+              <a:off x="4425008" y="4655913"/>
+              <a:ext cx="324000" cy="169277"/>
+            </a:xfrm>
+            <a:prstGeom prst="rect">
+              <a:avLst/>
+            </a:prstGeom>
+            <a:solidFill>
+              <a:schemeClr val="lt1"/>
+            </a:solidFill>
+            <a:ln>
+              <a:noFill/>
+            </a:ln>
+          </p:spPr>
+          <p:txBody>
+            <a:bodyPr wrap="square" lIns="18000" tIns="0" rIns="18000" bIns="0" rtlCol="0">
+              <a:spAutoFit/>
+            </a:bodyPr>
+            <a:lstStyle/>
+            <a:p>
+              <a:pPr algn="ctr"/>
+              <a:r>
+                <a:rPr lang="fr-BE" sz="1100" smtClean="0"/>
+                <a:t>stop</a:t>
+              </a:r>
+              <a:endParaRPr lang="fr-BE" sz="1100"/>
+            </a:p>
+          </p:txBody>
+        </p:sp>
+        <p:cxnSp>
+          <p:nvCxnSpPr>
+            <p:cNvPr id="83" name="Connecteur droit avec flèche 82"/>
+            <p:cNvCxnSpPr/>
+            <p:nvPr/>
+          </p:nvCxnSpPr>
+          <p:spPr>
+            <a:xfrm flipV="1">
+              <a:off x="2578314" y="4909819"/>
+              <a:ext cx="1008000" cy="862"/>
+            </a:xfrm>
+            <a:prstGeom prst="straightConnector1">
+              <a:avLst/>
+            </a:prstGeom>
+            <a:ln>
+              <a:tailEnd type="triangle"/>
+            </a:ln>
+          </p:spPr>
+          <p:style>
+            <a:lnRef idx="1">
+              <a:schemeClr val="dk1"/>
+            </a:lnRef>
+            <a:fillRef idx="0">
+              <a:schemeClr val="dk1"/>
+            </a:fillRef>
+            <a:effectRef idx="0">
+              <a:schemeClr val="dk1"/>
+            </a:effectRef>
+            <a:fontRef idx="minor">
+              <a:schemeClr val="tx1"/>
+            </a:fontRef>
+          </p:style>
+        </p:cxnSp>
+        <p:sp>
+          <p:nvSpPr>
+            <p:cNvPr id="84" name="ZoneTexte 83"/>
+            <p:cNvSpPr txBox="1"/>
+            <p:nvPr/>
+          </p:nvSpPr>
+          <p:spPr>
+            <a:xfrm>
+              <a:off x="2678183" y="4815680"/>
+              <a:ext cx="720000" cy="169277"/>
+            </a:xfrm>
+            <a:prstGeom prst="rect">
+              <a:avLst/>
+            </a:prstGeom>
+            <a:solidFill>
+              <a:schemeClr val="lt1"/>
+            </a:solidFill>
+            <a:ln>
+              <a:noFill/>
+            </a:ln>
+          </p:spPr>
+          <p:txBody>
+            <a:bodyPr wrap="square" lIns="18000" tIns="0" rIns="18000" bIns="0" rtlCol="0">
+              <a:spAutoFit/>
+            </a:bodyPr>
+            <a:lstStyle/>
+            <a:p>
+              <a:pPr algn="ctr"/>
+              <a:r>
+                <a:rPr lang="fr-BE" sz="1100" smtClean="0"/>
+                <a:t>open-signal</a:t>
+              </a:r>
+              <a:endParaRPr lang="fr-BE" sz="1100"/>
+            </a:p>
+          </p:txBody>
+        </p:sp>
+        <p:cxnSp>
+          <p:nvCxnSpPr>
+            <p:cNvPr id="85" name="Connecteur droit avec flèche 84"/>
+            <p:cNvCxnSpPr/>
+            <p:nvPr/>
+          </p:nvCxnSpPr>
+          <p:spPr>
+            <a:xfrm>
+              <a:off x="3586426" y="5053835"/>
+              <a:ext cx="1008112" cy="3130"/>
+            </a:xfrm>
+            <a:prstGeom prst="straightConnector1">
+              <a:avLst/>
+            </a:prstGeom>
+            <a:ln>
+              <a:tailEnd type="triangle"/>
+            </a:ln>
+          </p:spPr>
+          <p:style>
+            <a:lnRef idx="1">
+              <a:schemeClr val="dk1"/>
+            </a:lnRef>
+            <a:fillRef idx="0">
+              <a:schemeClr val="dk1"/>
+            </a:fillRef>
+            <a:effectRef idx="0">
+              <a:schemeClr val="dk1"/>
+            </a:effectRef>
+            <a:fontRef idx="minor">
+              <a:schemeClr val="tx1"/>
+            </a:fontRef>
+          </p:style>
+        </p:cxnSp>
+        <p:sp>
+          <p:nvSpPr>
+            <p:cNvPr id="86" name="ZoneTexte 85"/>
+            <p:cNvSpPr txBox="1"/>
+            <p:nvPr/>
+          </p:nvSpPr>
+          <p:spPr>
+            <a:xfrm>
+              <a:off x="3920992" y="4951947"/>
+              <a:ext cx="360000" cy="169277"/>
+            </a:xfrm>
+            <a:prstGeom prst="rect">
+              <a:avLst/>
+            </a:prstGeom>
+            <a:solidFill>
+              <a:schemeClr val="lt1"/>
+            </a:solidFill>
+            <a:ln>
+              <a:noFill/>
+            </a:ln>
+          </p:spPr>
+          <p:txBody>
+            <a:bodyPr wrap="square" lIns="18000" tIns="0" rIns="18000" bIns="0" rtlCol="0">
+              <a:spAutoFit/>
+            </a:bodyPr>
+            <a:lstStyle/>
+            <a:p>
+              <a:pPr algn="ctr"/>
+              <a:r>
+                <a:rPr lang="fr-BE" sz="1100" smtClean="0"/>
+                <a:t>open</a:t>
+              </a:r>
+              <a:endParaRPr lang="fr-BE" sz="1100"/>
+            </a:p>
+          </p:txBody>
+        </p:sp>
+        <p:cxnSp>
+          <p:nvCxnSpPr>
+            <p:cNvPr id="87" name="Connecteur droit avec flèche 86"/>
+            <p:cNvCxnSpPr/>
+            <p:nvPr/>
+          </p:nvCxnSpPr>
+          <p:spPr>
+            <a:xfrm>
+              <a:off x="1635964" y="4391127"/>
+              <a:ext cx="936000" cy="1588"/>
+            </a:xfrm>
+            <a:prstGeom prst="straightConnector1">
+              <a:avLst/>
+            </a:prstGeom>
+            <a:ln>
+              <a:tailEnd type="triangle"/>
+            </a:ln>
+          </p:spPr>
+          <p:style>
+            <a:lnRef idx="1">
+              <a:schemeClr val="dk1"/>
+            </a:lnRef>
+            <a:fillRef idx="0">
+              <a:schemeClr val="dk1"/>
+            </a:fillRef>
+            <a:effectRef idx="0">
+              <a:schemeClr val="dk1"/>
+            </a:effectRef>
+            <a:fontRef idx="minor">
+              <a:schemeClr val="tx1"/>
+            </a:fontRef>
+          </p:style>
+        </p:cxnSp>
+        <p:sp>
+          <p:nvSpPr>
+            <p:cNvPr id="88" name="ZoneTexte 87"/>
+            <p:cNvSpPr txBox="1"/>
+            <p:nvPr/>
+          </p:nvSpPr>
+          <p:spPr>
+            <a:xfrm>
+              <a:off x="1685511" y="4297525"/>
+              <a:ext cx="756000" cy="169277"/>
+            </a:xfrm>
+            <a:prstGeom prst="rect">
+              <a:avLst/>
+            </a:prstGeom>
+            <a:solidFill>
+              <a:schemeClr val="lt1"/>
+            </a:solidFill>
+            <a:ln>
+              <a:noFill/>
+            </a:ln>
+          </p:spPr>
+          <p:txBody>
+            <a:bodyPr wrap="square" lIns="18000" tIns="0" rIns="18000" bIns="0" rtlCol="0">
+              <a:spAutoFit/>
+            </a:bodyPr>
+            <a:lstStyle/>
+            <a:p>
+              <a:pPr algn="ctr"/>
+              <a:r>
+                <a:rPr lang="fr-BE" sz="1100" smtClean="0"/>
+                <a:t>alarm-signal</a:t>
+              </a:r>
+              <a:endParaRPr lang="fr-BE" sz="1100"/>
+            </a:p>
+          </p:txBody>
+        </p:sp>
+      </p:grpSp>
+      <p:grpSp>
+        <p:nvGrpSpPr>
+          <p:cNvPr id="307" name="Groupe 306"/>
+          <p:cNvGrpSpPr/>
+          <p:nvPr/>
+        </p:nvGrpSpPr>
+        <p:grpSpPr>
+          <a:xfrm>
+            <a:off x="1115616" y="908720"/>
+            <a:ext cx="6912768" cy="4032448"/>
+            <a:chOff x="1115616" y="908720"/>
+            <a:chExt cx="6912768" cy="4032448"/>
+          </a:xfrm>
+        </p:grpSpPr>
+        <p:sp>
+          <p:nvSpPr>
+            <p:cNvPr id="306" name="Rectangle 305"/>
+            <p:cNvSpPr/>
+            <p:nvPr/>
+          </p:nvSpPr>
+          <p:spPr>
+            <a:xfrm>
+              <a:off x="1115616" y="908720"/>
+              <a:ext cx="6912768" cy="4032448"/>
+            </a:xfrm>
+            <a:prstGeom prst="rect">
+              <a:avLst/>
+            </a:prstGeom>
+            <a:ln w="3175"/>
+          </p:spPr>
+          <p:style>
+            <a:lnRef idx="2">
+              <a:schemeClr val="dk1"/>
+            </a:lnRef>
+            <a:fillRef idx="1">
+              <a:schemeClr val="lt1"/>
+            </a:fillRef>
+            <a:effectRef idx="0">
+              <a:schemeClr val="dk1"/>
+            </a:effectRef>
+            <a:fontRef idx="minor">
+              <a:schemeClr val="dk1"/>
+            </a:fontRef>
+          </p:style>
+          <p:txBody>
+            <a:bodyPr rtlCol="0" anchor="ctr"/>
+            <a:lstStyle/>
+            <a:p>
+              <a:pPr algn="ctr"/>
+              <a:endParaRPr lang="fr-BE"/>
+            </a:p>
+          </p:txBody>
+        </p:sp>
+        <p:grpSp>
+          <p:nvGrpSpPr>
+            <p:cNvPr id="305" name="Groupe 304"/>
+            <p:cNvGrpSpPr/>
+            <p:nvPr/>
+          </p:nvGrpSpPr>
+          <p:grpSpPr>
+            <a:xfrm>
+              <a:off x="1187624" y="986781"/>
+              <a:ext cx="6768752" cy="3882082"/>
+              <a:chOff x="179512" y="188640"/>
+              <a:chExt cx="6768752" cy="3882082"/>
+            </a:xfrm>
+          </p:grpSpPr>
+          <p:grpSp>
+            <p:nvGrpSpPr>
+              <p:cNvPr id="301" name="Groupe 300"/>
+              <p:cNvGrpSpPr/>
+              <p:nvPr/>
+            </p:nvGrpSpPr>
+            <p:grpSpPr>
+              <a:xfrm>
+                <a:off x="232470" y="204168"/>
+                <a:ext cx="2736304" cy="1136600"/>
+                <a:chOff x="232470" y="204168"/>
+                <a:chExt cx="2736304" cy="1136600"/>
+              </a:xfrm>
+            </p:grpSpPr>
+            <p:grpSp>
+              <p:nvGrpSpPr>
+                <p:cNvPr id="144" name="Groupe 143"/>
+                <p:cNvGrpSpPr/>
+                <p:nvPr/>
+              </p:nvGrpSpPr>
+              <p:grpSpPr>
+                <a:xfrm>
+                  <a:off x="232470" y="204168"/>
+                  <a:ext cx="2736304" cy="936000"/>
+                  <a:chOff x="2123728" y="296688"/>
+                  <a:chExt cx="2736304" cy="936000"/>
+                </a:xfrm>
+              </p:grpSpPr>
+              <p:sp>
+                <p:nvSpPr>
+                  <p:cNvPr id="145" name="Rectangle 144"/>
+                  <p:cNvSpPr/>
+                  <p:nvPr/>
+                </p:nvSpPr>
+                <p:spPr>
+                  <a:xfrm>
+                    <a:off x="2123728" y="296688"/>
+                    <a:ext cx="864096" cy="324000"/>
+                  </a:xfrm>
+                  <a:prstGeom prst="rect">
+                    <a:avLst/>
+                  </a:prstGeom>
+                </p:spPr>
+                <p:style>
+                  <a:lnRef idx="2">
+                    <a:schemeClr val="dk1"/>
+                  </a:lnRef>
+                  <a:fillRef idx="1">
+                    <a:schemeClr val="lt1"/>
+                  </a:fillRef>
+                  <a:effectRef idx="0">
+                    <a:schemeClr val="dk1"/>
+                  </a:effectRef>
+                  <a:fontRef idx="minor">
+                    <a:schemeClr val="dk1"/>
+                  </a:fontRef>
+                </p:style>
+                <p:txBody>
+                  <a:bodyPr lIns="36000" tIns="36000" rIns="36000" bIns="36000" rtlCol="0" anchor="ctr" anchorCtr="0"/>
+                  <a:lstStyle/>
+                  <a:p>
+                    <a:pPr algn="ctr"/>
+                    <a:r>
+                      <a:rPr lang="fr-BE" sz="1100" smtClean="0"/>
+                      <a:t>Controller</a:t>
+                    </a:r>
+                    <a:endParaRPr lang="fr-BE" sz="1100"/>
+                  </a:p>
+                </p:txBody>
+              </p:sp>
+              <p:sp>
+                <p:nvSpPr>
+                  <p:cNvPr id="146" name="Rectangle 145"/>
+                  <p:cNvSpPr/>
+                  <p:nvPr/>
+                </p:nvSpPr>
+                <p:spPr>
+                  <a:xfrm>
+                    <a:off x="3203848" y="296688"/>
+                    <a:ext cx="720080" cy="324000"/>
+                  </a:xfrm>
+                  <a:prstGeom prst="rect">
+                    <a:avLst/>
+                  </a:prstGeom>
+                </p:spPr>
+                <p:style>
+                  <a:lnRef idx="2">
+                    <a:schemeClr val="dk1"/>
+                  </a:lnRef>
+                  <a:fillRef idx="1">
+                    <a:schemeClr val="lt1"/>
+                  </a:fillRef>
+                  <a:effectRef idx="0">
+                    <a:schemeClr val="dk1"/>
+                  </a:effectRef>
+                  <a:fontRef idx="minor">
+                    <a:schemeClr val="dk1"/>
+                  </a:fontRef>
+                </p:style>
+                <p:txBody>
+                  <a:bodyPr lIns="36000" tIns="36000" rIns="36000" bIns="36000" rtlCol="0" anchor="ctr"/>
+                  <a:lstStyle/>
+                  <a:p>
+                    <a:pPr algn="ctr"/>
+                    <a:r>
+                      <a:rPr lang="fr-BE" sz="1100" smtClean="0"/>
+                      <a:t>Actuators</a:t>
+                    </a:r>
+                    <a:endParaRPr lang="fr-BE" sz="1100"/>
+                  </a:p>
+                </p:txBody>
+              </p:sp>
+              <p:sp>
+                <p:nvSpPr>
+                  <p:cNvPr id="147" name="Rectangle 146"/>
+                  <p:cNvSpPr/>
+                  <p:nvPr/>
+                </p:nvSpPr>
+                <p:spPr>
+                  <a:xfrm>
+                    <a:off x="4139952" y="296688"/>
+                    <a:ext cx="720080" cy="324000"/>
+                  </a:xfrm>
+                  <a:prstGeom prst="rect">
+                    <a:avLst/>
+                  </a:prstGeom>
+                </p:spPr>
+                <p:style>
+                  <a:lnRef idx="2">
+                    <a:schemeClr val="dk1"/>
+                  </a:lnRef>
+                  <a:fillRef idx="1">
+                    <a:schemeClr val="lt1"/>
+                  </a:fillRef>
+                  <a:effectRef idx="0">
+                    <a:schemeClr val="dk1"/>
+                  </a:effectRef>
+                  <a:fontRef idx="minor">
+                    <a:schemeClr val="dk1"/>
+                  </a:fontRef>
+                </p:style>
+                <p:txBody>
+                  <a:bodyPr lIns="36000" tIns="36000" rIns="36000" bIns="36000" rtlCol="0" anchor="ctr"/>
+                  <a:lstStyle/>
+                  <a:p>
+                    <a:pPr algn="ctr"/>
+                    <a:r>
+                      <a:rPr lang="fr-BE" sz="1100" smtClean="0"/>
+                      <a:t>Engine</a:t>
+                    </a:r>
+                    <a:endParaRPr lang="fr-BE" sz="1100" smtClean="0"/>
+                  </a:p>
+                </p:txBody>
+              </p:sp>
+              <p:cxnSp>
+                <p:nvCxnSpPr>
+                  <p:cNvPr id="148" name="Connecteur droit avec flèche 147"/>
+                  <p:cNvCxnSpPr>
+                    <a:stCxn id="145" idx="2"/>
+                  </p:cNvCxnSpPr>
+                  <p:nvPr/>
+                </p:nvCxnSpPr>
+                <p:spPr>
+                  <a:xfrm rot="5400000">
+                    <a:off x="2249379" y="926291"/>
+                    <a:ext cx="612000" cy="794"/>
+                  </a:xfrm>
+                  <a:prstGeom prst="straightConnector1">
+                    <a:avLst/>
+                  </a:prstGeom>
+                  <a:ln>
+                    <a:tailEnd type="triangle"/>
+                  </a:ln>
+                </p:spPr>
+                <p:style>
+                  <a:lnRef idx="2">
+                    <a:schemeClr val="dk1"/>
+                  </a:lnRef>
+                  <a:fillRef idx="0">
+                    <a:schemeClr val="dk1"/>
+                  </a:fillRef>
+                  <a:effectRef idx="1">
+                    <a:schemeClr val="dk1"/>
+                  </a:effectRef>
+                  <a:fontRef idx="minor">
+                    <a:schemeClr val="tx1"/>
+                  </a:fontRef>
+                </p:style>
+              </p:cxnSp>
+              <p:cxnSp>
+                <p:nvCxnSpPr>
+                  <p:cNvPr id="149" name="Connecteur droit avec flèche 148"/>
+                  <p:cNvCxnSpPr>
+                    <a:stCxn id="146" idx="2"/>
+                  </p:cNvCxnSpPr>
+                  <p:nvPr/>
+                </p:nvCxnSpPr>
+                <p:spPr>
+                  <a:xfrm rot="5400000">
+                    <a:off x="3257491" y="926291"/>
+                    <a:ext cx="612000" cy="794"/>
+                  </a:xfrm>
+                  <a:prstGeom prst="straightConnector1">
+                    <a:avLst/>
+                  </a:prstGeom>
+                  <a:ln>
+                    <a:tailEnd type="triangle"/>
+                  </a:ln>
+                </p:spPr>
+                <p:style>
+                  <a:lnRef idx="2">
+                    <a:schemeClr val="dk1"/>
+                  </a:lnRef>
+                  <a:fillRef idx="0">
+                    <a:schemeClr val="dk1"/>
+                  </a:fillRef>
+                  <a:effectRef idx="1">
+                    <a:schemeClr val="dk1"/>
+                  </a:effectRef>
+                  <a:fontRef idx="minor">
+                    <a:schemeClr val="tx1"/>
+                  </a:fontRef>
+                </p:style>
+              </p:cxnSp>
+              <p:cxnSp>
+                <p:nvCxnSpPr>
+                  <p:cNvPr id="150" name="Connecteur droit avec flèche 149"/>
+                  <p:cNvCxnSpPr>
+                    <a:stCxn id="147" idx="2"/>
+                  </p:cNvCxnSpPr>
+                  <p:nvPr/>
+                </p:nvCxnSpPr>
+                <p:spPr>
+                  <a:xfrm rot="5400000">
+                    <a:off x="4193595" y="926291"/>
+                    <a:ext cx="612000" cy="794"/>
+                  </a:xfrm>
+                  <a:prstGeom prst="straightConnector1">
+                    <a:avLst/>
+                  </a:prstGeom>
+                  <a:ln>
+                    <a:tailEnd type="triangle"/>
+                  </a:ln>
+                </p:spPr>
+                <p:style>
+                  <a:lnRef idx="2">
+                    <a:schemeClr val="dk1"/>
+                  </a:lnRef>
+                  <a:fillRef idx="0">
+                    <a:schemeClr val="dk1"/>
+                  </a:fillRef>
+                  <a:effectRef idx="1">
+                    <a:schemeClr val="dk1"/>
+                  </a:effectRef>
+                  <a:fontRef idx="minor">
+                    <a:schemeClr val="tx1"/>
+                  </a:fontRef>
+                </p:style>
+              </p:cxnSp>
+              <p:cxnSp>
+                <p:nvCxnSpPr>
+                  <p:cNvPr id="151" name="Connecteur droit avec flèche 150"/>
+                  <p:cNvCxnSpPr/>
+                  <p:nvPr/>
+                </p:nvCxnSpPr>
+                <p:spPr>
+                  <a:xfrm>
+                    <a:off x="2555776" y="828688"/>
+                    <a:ext cx="1005025" cy="0"/>
+                  </a:xfrm>
+                  <a:prstGeom prst="straightConnector1">
+                    <a:avLst/>
+                  </a:prstGeom>
+                  <a:ln>
+                    <a:tailEnd type="triangle"/>
+                  </a:ln>
+                </p:spPr>
+                <p:style>
+                  <a:lnRef idx="1">
+                    <a:schemeClr val="dk1"/>
+                  </a:lnRef>
+                  <a:fillRef idx="0">
+                    <a:schemeClr val="dk1"/>
+                  </a:fillRef>
+                  <a:effectRef idx="0">
+                    <a:schemeClr val="dk1"/>
+                  </a:effectRef>
+                  <a:fontRef idx="minor">
+                    <a:schemeClr val="tx1"/>
+                  </a:fontRef>
+                </p:style>
+              </p:cxnSp>
+              <p:sp>
+                <p:nvSpPr>
+                  <p:cNvPr id="152" name="ZoneTexte 151"/>
+                  <p:cNvSpPr txBox="1"/>
+                  <p:nvPr/>
+                </p:nvSpPr>
+                <p:spPr>
+                  <a:xfrm>
+                    <a:off x="2655645" y="728736"/>
+                    <a:ext cx="720000" cy="169277"/>
+                  </a:xfrm>
+                  <a:prstGeom prst="rect">
+                    <a:avLst/>
+                  </a:prstGeom>
+                  <a:solidFill>
+                    <a:schemeClr val="lt1"/>
+                  </a:solidFill>
+                  <a:ln>
+                    <a:noFill/>
+                  </a:ln>
+                </p:spPr>
+                <p:txBody>
+                  <a:bodyPr wrap="square" lIns="18000" tIns="0" rIns="18000" bIns="0" rtlCol="0">
+                    <a:spAutoFit/>
+                  </a:bodyPr>
+                  <a:lstStyle/>
+                  <a:p>
+                    <a:pPr algn="ctr"/>
+                    <a:r>
+                      <a:rPr lang="fr-BE" sz="1100" smtClean="0"/>
+                      <a:t>start-signal</a:t>
+                    </a:r>
+                    <a:endParaRPr lang="fr-BE" sz="1100"/>
+                  </a:p>
+                </p:txBody>
+              </p:sp>
+              <p:cxnSp>
+                <p:nvCxnSpPr>
+                  <p:cNvPr id="153" name="Connecteur droit avec flèche 152"/>
+                  <p:cNvCxnSpPr/>
+                  <p:nvPr/>
+                </p:nvCxnSpPr>
+                <p:spPr>
+                  <a:xfrm>
+                    <a:off x="3563888" y="976402"/>
+                    <a:ext cx="936000" cy="1588"/>
+                  </a:xfrm>
+                  <a:prstGeom prst="straightConnector1">
+                    <a:avLst/>
+                  </a:prstGeom>
+                  <a:ln>
+                    <a:tailEnd type="triangle"/>
+                  </a:ln>
+                </p:spPr>
+                <p:style>
+                  <a:lnRef idx="1">
+                    <a:schemeClr val="dk1"/>
+                  </a:lnRef>
+                  <a:fillRef idx="0">
+                    <a:schemeClr val="dk1"/>
+                  </a:fillRef>
+                  <a:effectRef idx="0">
+                    <a:schemeClr val="dk1"/>
+                  </a:effectRef>
+                  <a:fontRef idx="minor">
+                    <a:schemeClr val="tx1"/>
+                  </a:fontRef>
+                </p:style>
+              </p:cxnSp>
+              <p:sp>
+                <p:nvSpPr>
+                  <p:cNvPr id="154" name="ZoneTexte 153"/>
+                  <p:cNvSpPr txBox="1"/>
+                  <p:nvPr/>
+                </p:nvSpPr>
+                <p:spPr>
+                  <a:xfrm>
+                    <a:off x="3851920" y="881146"/>
+                    <a:ext cx="385554" cy="169277"/>
+                  </a:xfrm>
+                  <a:prstGeom prst="rect">
+                    <a:avLst/>
+                  </a:prstGeom>
+                  <a:solidFill>
+                    <a:schemeClr val="lt1"/>
+                  </a:solidFill>
+                  <a:ln>
+                    <a:noFill/>
+                  </a:ln>
+                </p:spPr>
+                <p:txBody>
+                  <a:bodyPr wrap="square" lIns="18000" tIns="0" rIns="18000" bIns="0" rtlCol="0">
+                    <a:spAutoFit/>
+                  </a:bodyPr>
+                  <a:lstStyle/>
+                  <a:p>
+                    <a:pPr algn="ctr"/>
+                    <a:r>
+                      <a:rPr lang="fr-BE" sz="1100" smtClean="0"/>
+                      <a:t>start</a:t>
+                    </a:r>
+                    <a:endParaRPr lang="fr-BE" sz="1100"/>
+                  </a:p>
+                </p:txBody>
+              </p:sp>
+            </p:grpSp>
+            <p:sp>
+              <p:nvSpPr>
+                <p:cNvPr id="256" name="ZoneTexte 255"/>
+                <p:cNvSpPr txBox="1"/>
+                <p:nvPr/>
+              </p:nvSpPr>
+              <p:spPr>
+                <a:xfrm>
+                  <a:off x="1220969" y="1186880"/>
+                  <a:ext cx="759306" cy="153888"/>
+                </a:xfrm>
+                <a:prstGeom prst="rect">
+                  <a:avLst/>
+                </a:prstGeom>
+                <a:solidFill>
+                  <a:schemeClr val="lt1"/>
+                </a:solidFill>
+                <a:ln>
+                  <a:noFill/>
+                </a:ln>
+              </p:spPr>
+              <p:txBody>
+                <a:bodyPr wrap="none" lIns="18000" tIns="0" rIns="18000" bIns="0" rtlCol="0">
+                  <a:spAutoFit/>
+                </a:bodyPr>
+                <a:lstStyle/>
+                <a:p>
+                  <a:r>
+                    <a:rPr lang="fr-BE" sz="1000" smtClean="0">
+                      <a:latin typeface="Arial" pitchFamily="34" charset="0"/>
+                      <a:cs typeface="Arial" pitchFamily="34" charset="0"/>
+                    </a:rPr>
+                    <a:t>Starting train</a:t>
+                  </a:r>
+                  <a:endParaRPr lang="fr-BE" sz="1000">
+                    <a:latin typeface="Arial" pitchFamily="34" charset="0"/>
+                    <a:cs typeface="Arial" pitchFamily="34" charset="0"/>
+                  </a:endParaRPr>
+                </a:p>
+              </p:txBody>
+            </p:sp>
+          </p:grpSp>
+          <p:grpSp>
+            <p:nvGrpSpPr>
+              <p:cNvPr id="295" name="Groupe 294"/>
+              <p:cNvGrpSpPr/>
+              <p:nvPr/>
+            </p:nvGrpSpPr>
+            <p:grpSpPr>
+              <a:xfrm>
+                <a:off x="3563888" y="1772816"/>
+                <a:ext cx="2449860" cy="2094582"/>
+                <a:chOff x="3059832" y="254298"/>
+                <a:chExt cx="2449860" cy="2094582"/>
+              </a:xfrm>
+            </p:grpSpPr>
+            <p:sp>
+              <p:nvSpPr>
+                <p:cNvPr id="263" name="Rectangle à coins arrondis 262"/>
+                <p:cNvSpPr/>
+                <p:nvPr/>
+              </p:nvSpPr>
+              <p:spPr>
+                <a:xfrm>
+                  <a:off x="4427984" y="548680"/>
+                  <a:ext cx="1080120" cy="360040"/>
+                </a:xfrm>
+                <a:prstGeom prst="roundRect">
+                  <a:avLst/>
+                </a:prstGeom>
+              </p:spPr>
+              <p:style>
+                <a:lnRef idx="2">
+                  <a:schemeClr val="dk1"/>
+                </a:lnRef>
+                <a:fillRef idx="1">
+                  <a:schemeClr val="lt1"/>
+                </a:fillRef>
+                <a:effectRef idx="0">
+                  <a:schemeClr val="dk1"/>
+                </a:effectRef>
+                <a:fontRef idx="minor">
+                  <a:schemeClr val="dk1"/>
+                </a:fontRef>
+              </p:style>
+              <p:txBody>
+                <a:bodyPr wrap="none" rtlCol="0" anchor="ctr"/>
+                <a:lstStyle/>
+                <a:p>
+                  <a:pPr algn="ctr"/>
+                  <a:r>
+                    <a:rPr lang="fr-BE" sz="1200" smtClean="0"/>
+                    <a:t>Starting train</a:t>
+                  </a:r>
+                  <a:endParaRPr lang="fr-BE" sz="1200"/>
+                </a:p>
+              </p:txBody>
+            </p:sp>
+            <p:sp>
+              <p:nvSpPr>
+                <p:cNvPr id="264" name="Rectangle à coins arrondis 263"/>
+                <p:cNvSpPr/>
+                <p:nvPr/>
+              </p:nvSpPr>
+              <p:spPr>
+                <a:xfrm>
+                  <a:off x="3059832" y="1268760"/>
+                  <a:ext cx="1080120" cy="360040"/>
+                </a:xfrm>
+                <a:prstGeom prst="roundRect">
+                  <a:avLst/>
+                </a:prstGeom>
+              </p:spPr>
+              <p:style>
+                <a:lnRef idx="2">
+                  <a:schemeClr val="dk1"/>
+                </a:lnRef>
+                <a:fillRef idx="1">
+                  <a:schemeClr val="lt1"/>
+                </a:fillRef>
+                <a:effectRef idx="0">
+                  <a:schemeClr val="dk1"/>
+                </a:effectRef>
+                <a:fontRef idx="minor">
+                  <a:schemeClr val="dk1"/>
+                </a:fontRef>
+              </p:style>
+              <p:txBody>
+                <a:bodyPr wrap="none" rtlCol="0" anchor="ctr"/>
+                <a:lstStyle/>
+                <a:p>
+                  <a:pPr algn="ctr"/>
+                  <a:r>
+                    <a:rPr lang="fr-BE" sz="1200" smtClean="0"/>
+                    <a:t>Pressing alarm</a:t>
+                  </a:r>
+                  <a:endParaRPr lang="fr-BE" sz="1200"/>
+                </a:p>
+              </p:txBody>
+            </p:sp>
+            <p:sp>
+              <p:nvSpPr>
+                <p:cNvPr id="265" name="Rectangle à coins arrondis 264"/>
+                <p:cNvSpPr/>
+                <p:nvPr/>
+              </p:nvSpPr>
+              <p:spPr>
+                <a:xfrm>
+                  <a:off x="4427984" y="1196752"/>
+                  <a:ext cx="1080120" cy="504056"/>
+                </a:xfrm>
+                <a:prstGeom prst="roundRect">
+                  <a:avLst/>
+                </a:prstGeom>
+              </p:spPr>
+              <p:style>
+                <a:lnRef idx="2">
+                  <a:schemeClr val="dk1"/>
+                </a:lnRef>
+                <a:fillRef idx="1">
+                  <a:schemeClr val="lt1"/>
+                </a:fillRef>
+                <a:effectRef idx="0">
+                  <a:schemeClr val="dk1"/>
+                </a:effectRef>
+                <a:fontRef idx="minor">
+                  <a:schemeClr val="dk1"/>
+                </a:fontRef>
+              </p:style>
+              <p:txBody>
+                <a:bodyPr wrap="none" rtlCol="0" anchor="ctr"/>
+                <a:lstStyle/>
+                <a:p>
+                  <a:pPr algn="ctr"/>
+                  <a:r>
+                    <a:rPr lang="fr-BE" sz="1200" smtClean="0"/>
+                    <a:t>Stopping &amp; </a:t>
+                  </a:r>
+                  <a:br>
+                    <a:rPr lang="fr-BE" sz="1200" smtClean="0"/>
+                  </a:br>
+                  <a:r>
+                    <a:rPr lang="fr-BE" sz="1200" smtClean="0"/>
+                    <a:t>Opening doors</a:t>
+                  </a:r>
+                </a:p>
+              </p:txBody>
+            </p:sp>
+            <p:sp>
+              <p:nvSpPr>
+                <p:cNvPr id="266" name="Rectangle à coins arrondis 265"/>
+                <p:cNvSpPr/>
+                <p:nvPr/>
+              </p:nvSpPr>
+              <p:spPr>
+                <a:xfrm>
+                  <a:off x="4427984" y="1988840"/>
+                  <a:ext cx="1080120" cy="360040"/>
+                </a:xfrm>
+                <a:prstGeom prst="roundRect">
+                  <a:avLst/>
+                </a:prstGeom>
+              </p:spPr>
+              <p:style>
+                <a:lnRef idx="2">
+                  <a:schemeClr val="dk1"/>
+                </a:lnRef>
+                <a:fillRef idx="1">
+                  <a:schemeClr val="lt1"/>
+                </a:fillRef>
+                <a:effectRef idx="0">
+                  <a:schemeClr val="dk1"/>
+                </a:effectRef>
+                <a:fontRef idx="minor">
+                  <a:schemeClr val="dk1"/>
+                </a:fontRef>
+              </p:style>
+              <p:txBody>
+                <a:bodyPr wrap="none" rtlCol="0" anchor="ctr"/>
+                <a:lstStyle/>
+                <a:p>
+                  <a:pPr algn="ctr"/>
+                  <a:r>
+                    <a:rPr lang="fr-BE" sz="1200" smtClean="0"/>
+                    <a:t>Closing doors</a:t>
+                  </a:r>
+                  <a:endParaRPr lang="fr-BE" sz="1200"/>
+                </a:p>
+              </p:txBody>
+            </p:sp>
+            <p:cxnSp>
+              <p:nvCxnSpPr>
+                <p:cNvPr id="268" name="Connecteur droit avec flèche 267"/>
+                <p:cNvCxnSpPr>
+                  <a:stCxn id="263" idx="2"/>
+                  <a:endCxn id="265" idx="0"/>
+                </p:cNvCxnSpPr>
+                <p:nvPr/>
+              </p:nvCxnSpPr>
+              <p:spPr>
+                <a:xfrm rot="5400000">
+                  <a:off x="4824028" y="1052736"/>
+                  <a:ext cx="288032" cy="1588"/>
+                </a:xfrm>
+                <a:prstGeom prst="straightConnector1">
+                  <a:avLst/>
+                </a:prstGeom>
+                <a:ln>
+                  <a:tailEnd type="arrow"/>
+                </a:ln>
+              </p:spPr>
+              <p:style>
+                <a:lnRef idx="2">
+                  <a:schemeClr val="dk1"/>
+                </a:lnRef>
+                <a:fillRef idx="0">
+                  <a:schemeClr val="dk1"/>
+                </a:fillRef>
+                <a:effectRef idx="1">
+                  <a:schemeClr val="dk1"/>
+                </a:effectRef>
+                <a:fontRef idx="minor">
+                  <a:schemeClr val="tx1"/>
+                </a:fontRef>
+              </p:style>
+            </p:cxnSp>
+            <p:cxnSp>
+              <p:nvCxnSpPr>
+                <p:cNvPr id="269" name="Connecteur droit avec flèche 268"/>
+                <p:cNvCxnSpPr>
+                  <a:stCxn id="265" idx="2"/>
+                  <a:endCxn id="266" idx="0"/>
+                </p:cNvCxnSpPr>
+                <p:nvPr/>
+              </p:nvCxnSpPr>
+              <p:spPr>
+                <a:xfrm rot="5400000">
+                  <a:off x="4824028" y="1844824"/>
+                  <a:ext cx="288032" cy="1588"/>
+                </a:xfrm>
+                <a:prstGeom prst="straightConnector1">
+                  <a:avLst/>
+                </a:prstGeom>
+                <a:ln>
+                  <a:tailEnd type="arrow"/>
+                </a:ln>
+              </p:spPr>
+              <p:style>
+                <a:lnRef idx="2">
+                  <a:schemeClr val="dk1"/>
+                </a:lnRef>
+                <a:fillRef idx="0">
+                  <a:schemeClr val="dk1"/>
+                </a:fillRef>
+                <a:effectRef idx="1">
+                  <a:schemeClr val="dk1"/>
+                </a:effectRef>
+                <a:fontRef idx="minor">
+                  <a:schemeClr val="tx1"/>
+                </a:fontRef>
+              </p:style>
+            </p:cxnSp>
+            <p:cxnSp>
+              <p:nvCxnSpPr>
+                <p:cNvPr id="272" name="Connecteur droit avec flèche 271"/>
+                <p:cNvCxnSpPr>
+                  <a:stCxn id="264" idx="3"/>
+                  <a:endCxn id="265" idx="1"/>
+                </p:cNvCxnSpPr>
+                <p:nvPr/>
+              </p:nvCxnSpPr>
+              <p:spPr>
+                <a:xfrm>
+                  <a:off x="4139952" y="1448780"/>
+                  <a:ext cx="288032" cy="1588"/>
+                </a:xfrm>
+                <a:prstGeom prst="straightConnector1">
+                  <a:avLst/>
+                </a:prstGeom>
+                <a:ln>
+                  <a:tailEnd type="arrow"/>
+                </a:ln>
+              </p:spPr>
+              <p:style>
+                <a:lnRef idx="2">
+                  <a:schemeClr val="dk1"/>
+                </a:lnRef>
+                <a:fillRef idx="0">
+                  <a:schemeClr val="dk1"/>
+                </a:fillRef>
+                <a:effectRef idx="1">
+                  <a:schemeClr val="dk1"/>
+                </a:effectRef>
+                <a:fontRef idx="minor">
+                  <a:schemeClr val="tx1"/>
+                </a:fontRef>
+              </p:style>
+            </p:cxnSp>
+            <p:cxnSp>
+              <p:nvCxnSpPr>
+                <p:cNvPr id="280" name="Connecteur en angle 279"/>
+                <p:cNvCxnSpPr>
+                  <a:stCxn id="266" idx="3"/>
+                  <a:endCxn id="263" idx="3"/>
+                </p:cNvCxnSpPr>
+                <p:nvPr/>
+              </p:nvCxnSpPr>
+              <p:spPr>
+                <a:xfrm flipV="1">
+                  <a:off x="5508104" y="728700"/>
+                  <a:ext cx="1588" cy="1440160"/>
+                </a:xfrm>
+                <a:prstGeom prst="bentConnector3">
+                  <a:avLst>
+                    <a:gd name="adj1" fmla="val 21193332"/>
+                  </a:avLst>
+                </a:prstGeom>
+                <a:ln>
+                  <a:tailEnd type="arrow"/>
+                </a:ln>
+              </p:spPr>
+              <p:style>
+                <a:lnRef idx="2">
+                  <a:schemeClr val="dk1"/>
+                </a:lnRef>
+                <a:fillRef idx="0">
+                  <a:schemeClr val="dk1"/>
+                </a:fillRef>
+                <a:effectRef idx="1">
+                  <a:schemeClr val="dk1"/>
+                </a:effectRef>
+                <a:fontRef idx="minor">
+                  <a:schemeClr val="tx1"/>
+                </a:fontRef>
+              </p:style>
+            </p:cxnSp>
+            <p:cxnSp>
+              <p:nvCxnSpPr>
+                <p:cNvPr id="282" name="Connecteur en angle 281"/>
+                <p:cNvCxnSpPr>
+                  <a:stCxn id="263" idx="1"/>
+                  <a:endCxn id="264" idx="0"/>
+                </p:cNvCxnSpPr>
+                <p:nvPr/>
+              </p:nvCxnSpPr>
+              <p:spPr>
+                <a:xfrm rot="10800000" flipV="1">
+                  <a:off x="3599892" y="728700"/>
+                  <a:ext cx="828092" cy="540060"/>
+                </a:xfrm>
+                <a:prstGeom prst="bentConnector2">
+                  <a:avLst/>
+                </a:prstGeom>
+                <a:ln>
+                  <a:tailEnd type="arrow"/>
+                </a:ln>
+              </p:spPr>
+              <p:style>
+                <a:lnRef idx="2">
+                  <a:schemeClr val="dk1"/>
+                </a:lnRef>
+                <a:fillRef idx="0">
+                  <a:schemeClr val="dk1"/>
+                </a:fillRef>
+                <a:effectRef idx="1">
+                  <a:schemeClr val="dk1"/>
+                </a:effectRef>
+                <a:fontRef idx="minor">
+                  <a:schemeClr val="tx1"/>
+                </a:fontRef>
+              </p:style>
+            </p:cxnSp>
+            <p:sp>
+              <p:nvSpPr>
+                <p:cNvPr id="291" name="Ellipse 290"/>
+                <p:cNvSpPr/>
+                <p:nvPr/>
+              </p:nvSpPr>
+              <p:spPr>
+                <a:xfrm>
+                  <a:off x="4932040" y="254298"/>
+                  <a:ext cx="72000" cy="72000"/>
+                </a:xfrm>
+                <a:prstGeom prst="ellipse">
+                  <a:avLst/>
+                </a:prstGeom>
+              </p:spPr>
+              <p:style>
+                <a:lnRef idx="2">
+                  <a:schemeClr val="dk1">
+                    <a:shade val="50000"/>
+                  </a:schemeClr>
+                </a:lnRef>
+                <a:fillRef idx="1">
+                  <a:schemeClr val="dk1"/>
+                </a:fillRef>
+                <a:effectRef idx="0">
+                  <a:schemeClr val="dk1"/>
+                </a:effectRef>
+                <a:fontRef idx="minor">
+                  <a:schemeClr val="lt1"/>
+                </a:fontRef>
+              </p:style>
+              <p:txBody>
+                <a:bodyPr rtlCol="0" anchor="ctr"/>
+                <a:lstStyle/>
+                <a:p>
+                  <a:pPr algn="ctr"/>
+                  <a:endParaRPr lang="fr-BE"/>
+                </a:p>
+              </p:txBody>
+            </p:sp>
+            <p:cxnSp>
+              <p:nvCxnSpPr>
+                <p:cNvPr id="292" name="Connecteur droit avec flèche 291"/>
+                <p:cNvCxnSpPr>
+                  <a:stCxn id="291" idx="4"/>
+                  <a:endCxn id="263" idx="0"/>
+                </p:cNvCxnSpPr>
+                <p:nvPr/>
+              </p:nvCxnSpPr>
+              <p:spPr>
+                <a:xfrm rot="16200000" flipH="1">
+                  <a:off x="4856851" y="437487"/>
+                  <a:ext cx="222382" cy="4"/>
+                </a:xfrm>
+                <a:prstGeom prst="straightConnector1">
+                  <a:avLst/>
+                </a:prstGeom>
+                <a:ln>
+                  <a:tailEnd type="arrow"/>
+                </a:ln>
+              </p:spPr>
+              <p:style>
+                <a:lnRef idx="2">
+                  <a:schemeClr val="dk1"/>
+                </a:lnRef>
+                <a:fillRef idx="0">
+                  <a:schemeClr val="dk1"/>
+                </a:fillRef>
+                <a:effectRef idx="1">
+                  <a:schemeClr val="dk1"/>
+                </a:effectRef>
+                <a:fontRef idx="minor">
+                  <a:schemeClr val="tx1"/>
+                </a:fontRef>
+              </p:style>
+            </p:cxnSp>
+          </p:grpSp>
+          <p:grpSp>
+            <p:nvGrpSpPr>
+              <p:cNvPr id="302" name="Groupe 301"/>
+              <p:cNvGrpSpPr/>
+              <p:nvPr/>
+            </p:nvGrpSpPr>
+            <p:grpSpPr>
+              <a:xfrm>
+                <a:off x="179512" y="1556792"/>
+                <a:ext cx="2842220" cy="1152128"/>
+                <a:chOff x="179512" y="1556792"/>
+                <a:chExt cx="2842220" cy="1152128"/>
+              </a:xfrm>
+            </p:grpSpPr>
+            <p:grpSp>
+              <p:nvGrpSpPr>
+                <p:cNvPr id="297" name="Groupe 296"/>
+                <p:cNvGrpSpPr/>
+                <p:nvPr/>
+              </p:nvGrpSpPr>
+              <p:grpSpPr>
+                <a:xfrm>
+                  <a:off x="179512" y="1556792"/>
+                  <a:ext cx="2842220" cy="972000"/>
+                  <a:chOff x="251520" y="2276872"/>
+                  <a:chExt cx="2842220" cy="972000"/>
+                </a:xfrm>
+              </p:grpSpPr>
+              <p:sp>
+                <p:nvSpPr>
+                  <p:cNvPr id="197" name="Rectangle 196"/>
+                  <p:cNvSpPr/>
+                  <p:nvPr/>
+                </p:nvSpPr>
+                <p:spPr>
+                  <a:xfrm>
+                    <a:off x="251520" y="2276872"/>
+                    <a:ext cx="720080" cy="324000"/>
+                  </a:xfrm>
+                  <a:prstGeom prst="rect">
+                    <a:avLst/>
+                  </a:prstGeom>
+                </p:spPr>
+                <p:style>
+                  <a:lnRef idx="2">
+                    <a:schemeClr val="dk1"/>
+                  </a:lnRef>
+                  <a:fillRef idx="1">
+                    <a:schemeClr val="lt1"/>
+                  </a:fillRef>
+                  <a:effectRef idx="0">
+                    <a:schemeClr val="dk1"/>
+                  </a:effectRef>
+                  <a:fontRef idx="minor">
+                    <a:schemeClr val="dk1"/>
+                  </a:fontRef>
+                </p:style>
+                <p:txBody>
+                  <a:bodyPr lIns="36000" tIns="36000" rIns="36000" bIns="36000" rtlCol="0" anchor="ctr"/>
+                  <a:lstStyle/>
+                  <a:p>
+                    <a:pPr algn="ctr"/>
+                    <a:r>
+                      <a:rPr lang="fr-BE" sz="1100" smtClean="0"/>
+                      <a:t>Passenger</a:t>
+                    </a:r>
+                    <a:endParaRPr lang="fr-BE" sz="1100"/>
+                  </a:p>
+                </p:txBody>
+              </p:sp>
+              <p:sp>
+                <p:nvSpPr>
+                  <p:cNvPr id="198" name="Rectangle 197"/>
+                  <p:cNvSpPr/>
+                  <p:nvPr/>
+                </p:nvSpPr>
+                <p:spPr>
+                  <a:xfrm>
+                    <a:off x="2229644" y="2276872"/>
+                    <a:ext cx="864096" cy="324000"/>
+                  </a:xfrm>
+                  <a:prstGeom prst="rect">
+                    <a:avLst/>
+                  </a:prstGeom>
+                </p:spPr>
+                <p:style>
+                  <a:lnRef idx="2">
+                    <a:schemeClr val="dk1"/>
+                  </a:lnRef>
+                  <a:fillRef idx="1">
+                    <a:schemeClr val="lt1"/>
+                  </a:fillRef>
+                  <a:effectRef idx="0">
+                    <a:schemeClr val="dk1"/>
+                  </a:effectRef>
+                  <a:fontRef idx="minor">
+                    <a:schemeClr val="dk1"/>
+                  </a:fontRef>
+                </p:style>
+                <p:txBody>
+                  <a:bodyPr lIns="36000" tIns="36000" rIns="36000" bIns="36000" rtlCol="0" anchor="ctr" anchorCtr="0"/>
+                  <a:lstStyle/>
+                  <a:p>
+                    <a:pPr algn="ctr"/>
+                    <a:r>
+                      <a:rPr lang="fr-BE" sz="1100" smtClean="0"/>
+                      <a:t>Controller</a:t>
+                    </a:r>
+                    <a:endParaRPr lang="fr-BE" sz="1100"/>
+                  </a:p>
+                </p:txBody>
+              </p:sp>
+              <p:sp>
+                <p:nvSpPr>
+                  <p:cNvPr id="202" name="Rectangle 201"/>
+                  <p:cNvSpPr/>
+                  <p:nvPr/>
+                </p:nvSpPr>
+                <p:spPr>
+                  <a:xfrm>
+                    <a:off x="1343804" y="2276872"/>
+                    <a:ext cx="720080" cy="324000"/>
+                  </a:xfrm>
+                  <a:prstGeom prst="rect">
+                    <a:avLst/>
+                  </a:prstGeom>
+                </p:spPr>
+                <p:style>
+                  <a:lnRef idx="2">
+                    <a:schemeClr val="dk1"/>
+                  </a:lnRef>
+                  <a:fillRef idx="1">
+                    <a:schemeClr val="lt1"/>
+                  </a:fillRef>
+                  <a:effectRef idx="0">
+                    <a:schemeClr val="dk1"/>
+                  </a:effectRef>
+                  <a:fontRef idx="minor">
+                    <a:schemeClr val="dk1"/>
+                  </a:fontRef>
+                </p:style>
+                <p:txBody>
+                  <a:bodyPr lIns="36000" tIns="36000" rIns="36000" bIns="36000" rtlCol="0" anchor="ctr"/>
+                  <a:lstStyle/>
+                  <a:p>
+                    <a:pPr algn="ctr"/>
+                    <a:r>
+                      <a:rPr lang="fr-BE" sz="1100" smtClean="0"/>
+                      <a:t>Sensors</a:t>
+                    </a:r>
+                  </a:p>
+                </p:txBody>
+              </p:sp>
+              <p:cxnSp>
+                <p:nvCxnSpPr>
+                  <p:cNvPr id="203" name="Connecteur droit avec flèche 202"/>
+                  <p:cNvCxnSpPr>
+                    <a:stCxn id="198" idx="2"/>
+                  </p:cNvCxnSpPr>
+                  <p:nvPr/>
+                </p:nvCxnSpPr>
+                <p:spPr>
+                  <a:xfrm rot="5400000">
+                    <a:off x="2337295" y="2924475"/>
+                    <a:ext cx="648000" cy="794"/>
+                  </a:xfrm>
+                  <a:prstGeom prst="straightConnector1">
+                    <a:avLst/>
+                  </a:prstGeom>
+                  <a:ln>
+                    <a:tailEnd type="triangle"/>
+                  </a:ln>
+                </p:spPr>
+                <p:style>
+                  <a:lnRef idx="2">
+                    <a:schemeClr val="dk1"/>
+                  </a:lnRef>
+                  <a:fillRef idx="0">
+                    <a:schemeClr val="dk1"/>
+                  </a:fillRef>
+                  <a:effectRef idx="1">
+                    <a:schemeClr val="dk1"/>
+                  </a:effectRef>
+                  <a:fontRef idx="minor">
+                    <a:schemeClr val="tx1"/>
+                  </a:fontRef>
+                </p:style>
+              </p:cxnSp>
+              <p:cxnSp>
+                <p:nvCxnSpPr>
+                  <p:cNvPr id="204" name="Connecteur droit avec flèche 203"/>
+                  <p:cNvCxnSpPr>
+                    <a:stCxn id="197" idx="2"/>
+                  </p:cNvCxnSpPr>
+                  <p:nvPr/>
+                </p:nvCxnSpPr>
+                <p:spPr>
+                  <a:xfrm rot="5400000">
+                    <a:off x="287163" y="2924475"/>
+                    <a:ext cx="648000" cy="794"/>
+                  </a:xfrm>
+                  <a:prstGeom prst="straightConnector1">
+                    <a:avLst/>
+                  </a:prstGeom>
+                  <a:ln>
+                    <a:tailEnd type="triangle"/>
+                  </a:ln>
+                </p:spPr>
+                <p:style>
+                  <a:lnRef idx="2">
+                    <a:schemeClr val="dk1"/>
+                  </a:lnRef>
+                  <a:fillRef idx="0">
+                    <a:schemeClr val="dk1"/>
+                  </a:fillRef>
+                  <a:effectRef idx="1">
+                    <a:schemeClr val="dk1"/>
+                  </a:effectRef>
+                  <a:fontRef idx="minor">
+                    <a:schemeClr val="tx1"/>
+                  </a:fontRef>
+                </p:style>
+              </p:cxnSp>
+              <p:cxnSp>
+                <p:nvCxnSpPr>
+                  <p:cNvPr id="206" name="Connecteur droit avec flèche 205"/>
+                  <p:cNvCxnSpPr>
+                    <a:stCxn id="202" idx="2"/>
+                  </p:cNvCxnSpPr>
+                  <p:nvPr/>
+                </p:nvCxnSpPr>
+                <p:spPr>
+                  <a:xfrm rot="5400000">
+                    <a:off x="1379447" y="2924475"/>
+                    <a:ext cx="648000" cy="794"/>
+                  </a:xfrm>
+                  <a:prstGeom prst="straightConnector1">
+                    <a:avLst/>
+                  </a:prstGeom>
+                  <a:ln>
+                    <a:tailEnd type="triangle"/>
+                  </a:ln>
+                </p:spPr>
+                <p:style>
+                  <a:lnRef idx="2">
+                    <a:schemeClr val="dk1"/>
+                  </a:lnRef>
+                  <a:fillRef idx="0">
+                    <a:schemeClr val="dk1"/>
+                  </a:fillRef>
+                  <a:effectRef idx="1">
+                    <a:schemeClr val="dk1"/>
+                  </a:effectRef>
+                  <a:fontRef idx="minor">
+                    <a:schemeClr val="tx1"/>
+                  </a:fontRef>
+                </p:style>
+              </p:cxnSp>
+              <p:cxnSp>
+                <p:nvCxnSpPr>
+                  <p:cNvPr id="209" name="Connecteur droit avec flèche 208"/>
+                  <p:cNvCxnSpPr/>
+                  <p:nvPr/>
+                </p:nvCxnSpPr>
+                <p:spPr>
+                  <a:xfrm>
+                    <a:off x="611560" y="2818273"/>
+                    <a:ext cx="1080000" cy="1588"/>
+                  </a:xfrm>
+                  <a:prstGeom prst="straightConnector1">
+                    <a:avLst/>
+                  </a:prstGeom>
+                  <a:ln>
+                    <a:tailEnd type="triangle"/>
+                  </a:ln>
+                </p:spPr>
+                <p:style>
+                  <a:lnRef idx="1">
+                    <a:schemeClr val="dk1"/>
+                  </a:lnRef>
+                  <a:fillRef idx="0">
+                    <a:schemeClr val="dk1"/>
+                  </a:fillRef>
+                  <a:effectRef idx="0">
+                    <a:schemeClr val="dk1"/>
+                  </a:effectRef>
+                  <a:fontRef idx="minor">
+                    <a:schemeClr val="tx1"/>
+                  </a:fontRef>
+                </p:style>
+              </p:cxnSp>
+              <p:sp>
+                <p:nvSpPr>
+                  <p:cNvPr id="210" name="ZoneTexte 209"/>
+                  <p:cNvSpPr txBox="1"/>
+                  <p:nvPr/>
+                </p:nvSpPr>
+                <p:spPr>
+                  <a:xfrm>
+                    <a:off x="707260" y="2716922"/>
+                    <a:ext cx="864000" cy="180000"/>
+                  </a:xfrm>
+                  <a:prstGeom prst="rect">
+                    <a:avLst/>
+                  </a:prstGeom>
+                  <a:solidFill>
+                    <a:schemeClr val="lt1"/>
+                  </a:solidFill>
+                  <a:ln>
+                    <a:noFill/>
+                  </a:ln>
+                </p:spPr>
+                <p:txBody>
+                  <a:bodyPr wrap="square" lIns="18000" tIns="0" rIns="18000" bIns="0" rtlCol="0">
+                    <a:spAutoFit/>
+                  </a:bodyPr>
+                  <a:lstStyle/>
+                  <a:p>
+                    <a:pPr algn="ctr"/>
+                    <a:r>
+                      <a:rPr lang="fr-BE" sz="1100" smtClean="0"/>
+                      <a:t>alarm-pressed</a:t>
+                    </a:r>
+                    <a:endParaRPr lang="fr-BE" sz="1100"/>
+                  </a:p>
+                </p:txBody>
+              </p:sp>
+              <p:cxnSp>
+                <p:nvCxnSpPr>
+                  <p:cNvPr id="223" name="Connecteur droit avec flèche 222"/>
+                  <p:cNvCxnSpPr/>
+                  <p:nvPr/>
+                </p:nvCxnSpPr>
+                <p:spPr>
+                  <a:xfrm>
+                    <a:off x="1719342" y="2993285"/>
+                    <a:ext cx="936000" cy="1588"/>
+                  </a:xfrm>
+                  <a:prstGeom prst="straightConnector1">
+                    <a:avLst/>
+                  </a:prstGeom>
+                  <a:ln>
+                    <a:tailEnd type="triangle"/>
+                  </a:ln>
+                </p:spPr>
+                <p:style>
+                  <a:lnRef idx="1">
+                    <a:schemeClr val="dk1"/>
+                  </a:lnRef>
+                  <a:fillRef idx="0">
+                    <a:schemeClr val="dk1"/>
+                  </a:fillRef>
+                  <a:effectRef idx="0">
+                    <a:schemeClr val="dk1"/>
+                  </a:effectRef>
+                  <a:fontRef idx="minor">
+                    <a:schemeClr val="tx1"/>
+                  </a:fontRef>
+                </p:style>
+              </p:cxnSp>
+              <p:sp>
+                <p:nvSpPr>
+                  <p:cNvPr id="224" name="ZoneTexte 223"/>
+                  <p:cNvSpPr txBox="1"/>
+                  <p:nvPr/>
+                </p:nvSpPr>
+                <p:spPr>
+                  <a:xfrm>
+                    <a:off x="1768889" y="2899683"/>
+                    <a:ext cx="756000" cy="169277"/>
+                  </a:xfrm>
+                  <a:prstGeom prst="rect">
+                    <a:avLst/>
+                  </a:prstGeom>
+                  <a:solidFill>
+                    <a:schemeClr val="lt1"/>
+                  </a:solidFill>
+                  <a:ln>
+                    <a:noFill/>
+                  </a:ln>
+                </p:spPr>
+                <p:txBody>
+                  <a:bodyPr wrap="square" lIns="18000" tIns="0" rIns="18000" bIns="0" rtlCol="0">
+                    <a:spAutoFit/>
+                  </a:bodyPr>
+                  <a:lstStyle/>
+                  <a:p>
+                    <a:pPr algn="ctr"/>
+                    <a:r>
+                      <a:rPr lang="fr-BE" sz="1100" smtClean="0"/>
+                      <a:t>alarm-signal</a:t>
+                    </a:r>
+                    <a:endParaRPr lang="fr-BE" sz="1100"/>
+                  </a:p>
+                </p:txBody>
+              </p:sp>
+            </p:grpSp>
+            <p:sp>
+              <p:nvSpPr>
+                <p:cNvPr id="296" name="ZoneTexte 295"/>
+                <p:cNvSpPr txBox="1"/>
+                <p:nvPr/>
+              </p:nvSpPr>
+              <p:spPr>
+                <a:xfrm>
+                  <a:off x="1156048" y="2555032"/>
+                  <a:ext cx="889149" cy="153888"/>
+                </a:xfrm>
+                <a:prstGeom prst="rect">
+                  <a:avLst/>
+                </a:prstGeom>
+                <a:solidFill>
+                  <a:schemeClr val="lt1"/>
+                </a:solidFill>
+                <a:ln>
+                  <a:noFill/>
+                </a:ln>
+              </p:spPr>
+              <p:txBody>
+                <a:bodyPr wrap="none" lIns="18000" tIns="0" rIns="18000" bIns="0" rtlCol="0">
+                  <a:spAutoFit/>
+                </a:bodyPr>
+                <a:lstStyle/>
+                <a:p>
+                  <a:r>
+                    <a:rPr lang="fr-BE" sz="1000" smtClean="0">
+                      <a:latin typeface="Arial" pitchFamily="34" charset="0"/>
+                      <a:cs typeface="Arial" pitchFamily="34" charset="0"/>
+                    </a:rPr>
+                    <a:t>Pressing alarm</a:t>
+                  </a:r>
+                  <a:endParaRPr lang="fr-BE" sz="1000">
+                    <a:latin typeface="Arial" pitchFamily="34" charset="0"/>
+                    <a:cs typeface="Arial" pitchFamily="34" charset="0"/>
+                  </a:endParaRPr>
+                </a:p>
+              </p:txBody>
+            </p:sp>
+          </p:grpSp>
+          <p:grpSp>
+            <p:nvGrpSpPr>
+              <p:cNvPr id="300" name="Groupe 299"/>
+              <p:cNvGrpSpPr/>
+              <p:nvPr/>
+            </p:nvGrpSpPr>
+            <p:grpSpPr>
+              <a:xfrm>
+                <a:off x="232470" y="2940472"/>
+                <a:ext cx="2736304" cy="1130250"/>
+                <a:chOff x="232470" y="2940472"/>
+                <a:chExt cx="2736304" cy="1130250"/>
+              </a:xfrm>
+            </p:grpSpPr>
+            <p:grpSp>
+              <p:nvGrpSpPr>
+                <p:cNvPr id="298" name="Groupe 297"/>
+                <p:cNvGrpSpPr/>
+                <p:nvPr/>
+              </p:nvGrpSpPr>
+              <p:grpSpPr>
+                <a:xfrm>
+                  <a:off x="232470" y="2940472"/>
+                  <a:ext cx="2736304" cy="936000"/>
+                  <a:chOff x="329878" y="3679036"/>
+                  <a:chExt cx="2736304" cy="936000"/>
+                </a:xfrm>
+              </p:grpSpPr>
+              <p:sp>
+                <p:nvSpPr>
+                  <p:cNvPr id="134" name="Rectangle 133"/>
+                  <p:cNvSpPr/>
+                  <p:nvPr/>
+                </p:nvSpPr>
+                <p:spPr>
+                  <a:xfrm>
+                    <a:off x="329878" y="3679036"/>
+                    <a:ext cx="864096" cy="324000"/>
+                  </a:xfrm>
+                  <a:prstGeom prst="rect">
+                    <a:avLst/>
+                  </a:prstGeom>
+                </p:spPr>
+                <p:style>
+                  <a:lnRef idx="2">
+                    <a:schemeClr val="dk1"/>
+                  </a:lnRef>
+                  <a:fillRef idx="1">
+                    <a:schemeClr val="lt1"/>
+                  </a:fillRef>
+                  <a:effectRef idx="0">
+                    <a:schemeClr val="dk1"/>
+                  </a:effectRef>
+                  <a:fontRef idx="minor">
+                    <a:schemeClr val="dk1"/>
+                  </a:fontRef>
+                </p:style>
+                <p:txBody>
+                  <a:bodyPr lIns="36000" tIns="36000" rIns="36000" bIns="36000" rtlCol="0" anchor="ctr" anchorCtr="0"/>
+                  <a:lstStyle/>
+                  <a:p>
+                    <a:pPr algn="ctr"/>
+                    <a:r>
+                      <a:rPr lang="fr-BE" sz="1100" smtClean="0"/>
+                      <a:t>Controller</a:t>
+                    </a:r>
+                    <a:endParaRPr lang="fr-BE" sz="1100"/>
+                  </a:p>
+                </p:txBody>
+              </p:sp>
+              <p:sp>
+                <p:nvSpPr>
+                  <p:cNvPr id="135" name="Rectangle 134"/>
+                  <p:cNvSpPr/>
+                  <p:nvPr/>
+                </p:nvSpPr>
+                <p:spPr>
+                  <a:xfrm>
+                    <a:off x="1409998" y="3679036"/>
+                    <a:ext cx="720080" cy="324000"/>
+                  </a:xfrm>
+                  <a:prstGeom prst="rect">
+                    <a:avLst/>
+                  </a:prstGeom>
+                </p:spPr>
+                <p:style>
+                  <a:lnRef idx="2">
+                    <a:schemeClr val="dk1"/>
+                  </a:lnRef>
+                  <a:fillRef idx="1">
+                    <a:schemeClr val="lt1"/>
+                  </a:fillRef>
+                  <a:effectRef idx="0">
+                    <a:schemeClr val="dk1"/>
+                  </a:effectRef>
+                  <a:fontRef idx="minor">
+                    <a:schemeClr val="dk1"/>
+                  </a:fontRef>
+                </p:style>
+                <p:txBody>
+                  <a:bodyPr lIns="36000" tIns="36000" rIns="36000" bIns="36000" rtlCol="0" anchor="ctr"/>
+                  <a:lstStyle/>
+                  <a:p>
+                    <a:pPr algn="ctr"/>
+                    <a:r>
+                      <a:rPr lang="fr-BE" sz="1100" smtClean="0"/>
+                      <a:t>Actuators</a:t>
+                    </a:r>
+                    <a:endParaRPr lang="fr-BE" sz="1100"/>
+                  </a:p>
+                </p:txBody>
+              </p:sp>
+              <p:sp>
+                <p:nvSpPr>
+                  <p:cNvPr id="136" name="Rectangle 135"/>
+                  <p:cNvSpPr/>
+                  <p:nvPr/>
+                </p:nvSpPr>
+                <p:spPr>
+                  <a:xfrm>
+                    <a:off x="2346102" y="3679036"/>
+                    <a:ext cx="720080" cy="324000"/>
+                  </a:xfrm>
+                  <a:prstGeom prst="rect">
+                    <a:avLst/>
+                  </a:prstGeom>
+                </p:spPr>
+                <p:style>
+                  <a:lnRef idx="2">
+                    <a:schemeClr val="dk1"/>
+                  </a:lnRef>
+                  <a:fillRef idx="1">
+                    <a:schemeClr val="lt1"/>
+                  </a:fillRef>
+                  <a:effectRef idx="0">
+                    <a:schemeClr val="dk1"/>
+                  </a:effectRef>
+                  <a:fontRef idx="minor">
+                    <a:schemeClr val="dk1"/>
+                  </a:fontRef>
+                </p:style>
+                <p:txBody>
+                  <a:bodyPr lIns="36000" tIns="36000" rIns="36000" bIns="36000" rtlCol="0" anchor="ctr"/>
+                  <a:lstStyle/>
+                  <a:p>
+                    <a:pPr algn="ctr"/>
+                    <a:r>
+                      <a:rPr lang="fr-BE" sz="1100" smtClean="0"/>
+                      <a:t>Doors</a:t>
+                    </a:r>
+                  </a:p>
+                </p:txBody>
+              </p:sp>
+              <p:cxnSp>
+                <p:nvCxnSpPr>
+                  <p:cNvPr id="137" name="Connecteur droit avec flèche 136"/>
+                  <p:cNvCxnSpPr>
+                    <a:stCxn id="134" idx="2"/>
+                  </p:cNvCxnSpPr>
+                  <p:nvPr/>
+                </p:nvCxnSpPr>
+                <p:spPr>
+                  <a:xfrm rot="5400000">
+                    <a:off x="455529" y="4308639"/>
+                    <a:ext cx="612000" cy="794"/>
+                  </a:xfrm>
+                  <a:prstGeom prst="straightConnector1">
+                    <a:avLst/>
+                  </a:prstGeom>
+                  <a:ln>
+                    <a:tailEnd type="triangle"/>
+                  </a:ln>
+                </p:spPr>
+                <p:style>
+                  <a:lnRef idx="2">
+                    <a:schemeClr val="dk1"/>
+                  </a:lnRef>
+                  <a:fillRef idx="0">
+                    <a:schemeClr val="dk1"/>
+                  </a:fillRef>
+                  <a:effectRef idx="1">
+                    <a:schemeClr val="dk1"/>
+                  </a:effectRef>
+                  <a:fontRef idx="minor">
+                    <a:schemeClr val="tx1"/>
+                  </a:fontRef>
+                </p:style>
+              </p:cxnSp>
+              <p:cxnSp>
+                <p:nvCxnSpPr>
+                  <p:cNvPr id="138" name="Connecteur droit avec flèche 137"/>
+                  <p:cNvCxnSpPr>
+                    <a:stCxn id="135" idx="2"/>
+                  </p:cNvCxnSpPr>
+                  <p:nvPr/>
+                </p:nvCxnSpPr>
+                <p:spPr>
+                  <a:xfrm rot="5400000">
+                    <a:off x="1463641" y="4308639"/>
+                    <a:ext cx="612000" cy="794"/>
+                  </a:xfrm>
+                  <a:prstGeom prst="straightConnector1">
+                    <a:avLst/>
+                  </a:prstGeom>
+                  <a:ln>
+                    <a:tailEnd type="triangle"/>
+                  </a:ln>
+                </p:spPr>
+                <p:style>
+                  <a:lnRef idx="2">
+                    <a:schemeClr val="dk1"/>
+                  </a:lnRef>
+                  <a:fillRef idx="0">
+                    <a:schemeClr val="dk1"/>
+                  </a:fillRef>
+                  <a:effectRef idx="1">
+                    <a:schemeClr val="dk1"/>
+                  </a:effectRef>
+                  <a:fontRef idx="minor">
+                    <a:schemeClr val="tx1"/>
+                  </a:fontRef>
+                </p:style>
+              </p:cxnSp>
+              <p:cxnSp>
+                <p:nvCxnSpPr>
+                  <p:cNvPr id="139" name="Connecteur droit avec flèche 138"/>
+                  <p:cNvCxnSpPr>
+                    <a:stCxn id="136" idx="2"/>
+                  </p:cNvCxnSpPr>
+                  <p:nvPr/>
+                </p:nvCxnSpPr>
+                <p:spPr>
+                  <a:xfrm rot="5400000">
+                    <a:off x="2399745" y="4308639"/>
+                    <a:ext cx="612000" cy="794"/>
+                  </a:xfrm>
+                  <a:prstGeom prst="straightConnector1">
+                    <a:avLst/>
+                  </a:prstGeom>
+                  <a:ln>
+                    <a:tailEnd type="triangle"/>
+                  </a:ln>
+                </p:spPr>
+                <p:style>
+                  <a:lnRef idx="2">
+                    <a:schemeClr val="dk1"/>
+                  </a:lnRef>
+                  <a:fillRef idx="0">
+                    <a:schemeClr val="dk1"/>
+                  </a:fillRef>
+                  <a:effectRef idx="1">
+                    <a:schemeClr val="dk1"/>
+                  </a:effectRef>
+                  <a:fontRef idx="minor">
+                    <a:schemeClr val="tx1"/>
+                  </a:fontRef>
+                </p:style>
+              </p:cxnSp>
+              <p:cxnSp>
+                <p:nvCxnSpPr>
+                  <p:cNvPr id="140" name="Connecteur droit avec flèche 139"/>
+                  <p:cNvCxnSpPr/>
+                  <p:nvPr/>
+                </p:nvCxnSpPr>
+                <p:spPr>
+                  <a:xfrm>
+                    <a:off x="761926" y="4211036"/>
+                    <a:ext cx="1005025" cy="0"/>
+                  </a:xfrm>
+                  <a:prstGeom prst="straightConnector1">
+                    <a:avLst/>
+                  </a:prstGeom>
+                  <a:ln>
+                    <a:tailEnd type="triangle"/>
+                  </a:ln>
+                </p:spPr>
+                <p:style>
+                  <a:lnRef idx="1">
+                    <a:schemeClr val="dk1"/>
+                  </a:lnRef>
+                  <a:fillRef idx="0">
+                    <a:schemeClr val="dk1"/>
+                  </a:fillRef>
+                  <a:effectRef idx="0">
+                    <a:schemeClr val="dk1"/>
+                  </a:effectRef>
+                  <a:fontRef idx="minor">
+                    <a:schemeClr val="tx1"/>
+                  </a:fontRef>
+                </p:style>
+              </p:cxnSp>
+              <p:sp>
+                <p:nvSpPr>
+                  <p:cNvPr id="141" name="ZoneTexte 140"/>
+                  <p:cNvSpPr txBox="1"/>
+                  <p:nvPr/>
+                </p:nvSpPr>
+                <p:spPr>
+                  <a:xfrm>
+                    <a:off x="861795" y="4111084"/>
+                    <a:ext cx="720000" cy="169277"/>
+                  </a:xfrm>
+                  <a:prstGeom prst="rect">
+                    <a:avLst/>
+                  </a:prstGeom>
+                  <a:solidFill>
+                    <a:schemeClr val="lt1"/>
+                  </a:solidFill>
+                  <a:ln>
+                    <a:noFill/>
+                  </a:ln>
+                </p:spPr>
+                <p:txBody>
+                  <a:bodyPr wrap="square" lIns="18000" tIns="0" rIns="18000" bIns="0" rtlCol="0">
+                    <a:spAutoFit/>
+                  </a:bodyPr>
+                  <a:lstStyle/>
+                  <a:p>
+                    <a:pPr algn="ctr"/>
+                    <a:r>
+                      <a:rPr lang="fr-BE" sz="1100" smtClean="0"/>
+                      <a:t>close-signal</a:t>
+                    </a:r>
+                    <a:endParaRPr lang="fr-BE" sz="1100"/>
+                  </a:p>
+                </p:txBody>
+              </p:sp>
+              <p:cxnSp>
+                <p:nvCxnSpPr>
+                  <p:cNvPr id="142" name="Connecteur droit avec flèche 141"/>
+                  <p:cNvCxnSpPr/>
+                  <p:nvPr/>
+                </p:nvCxnSpPr>
+                <p:spPr>
+                  <a:xfrm>
+                    <a:off x="1770038" y="4358750"/>
+                    <a:ext cx="936000" cy="1588"/>
+                  </a:xfrm>
+                  <a:prstGeom prst="straightConnector1">
+                    <a:avLst/>
+                  </a:prstGeom>
+                  <a:ln>
+                    <a:tailEnd type="triangle"/>
+                  </a:ln>
+                </p:spPr>
+                <p:style>
+                  <a:lnRef idx="1">
+                    <a:schemeClr val="dk1"/>
+                  </a:lnRef>
+                  <a:fillRef idx="0">
+                    <a:schemeClr val="dk1"/>
+                  </a:fillRef>
+                  <a:effectRef idx="0">
+                    <a:schemeClr val="dk1"/>
+                  </a:effectRef>
+                  <a:fontRef idx="minor">
+                    <a:schemeClr val="tx1"/>
+                  </a:fontRef>
+                </p:style>
+              </p:cxnSp>
+              <p:sp>
+                <p:nvSpPr>
+                  <p:cNvPr id="143" name="ZoneTexte 142"/>
+                  <p:cNvSpPr txBox="1"/>
+                  <p:nvPr/>
+                </p:nvSpPr>
+                <p:spPr>
+                  <a:xfrm>
+                    <a:off x="2058070" y="4263494"/>
+                    <a:ext cx="385554" cy="169277"/>
+                  </a:xfrm>
+                  <a:prstGeom prst="rect">
+                    <a:avLst/>
+                  </a:prstGeom>
+                  <a:solidFill>
+                    <a:schemeClr val="lt1"/>
+                  </a:solidFill>
+                  <a:ln>
+                    <a:noFill/>
+                  </a:ln>
+                </p:spPr>
+                <p:txBody>
+                  <a:bodyPr wrap="square" lIns="18000" tIns="0" rIns="18000" bIns="0" rtlCol="0">
+                    <a:spAutoFit/>
+                  </a:bodyPr>
+                  <a:lstStyle/>
+                  <a:p>
+                    <a:pPr algn="ctr"/>
+                    <a:r>
+                      <a:rPr lang="fr-BE" sz="1100" smtClean="0"/>
+                      <a:t>close</a:t>
+                    </a:r>
+                    <a:endParaRPr lang="fr-BE" sz="1100"/>
+                  </a:p>
+                </p:txBody>
+              </p:sp>
+            </p:grpSp>
+            <p:sp>
+              <p:nvSpPr>
+                <p:cNvPr id="299" name="ZoneTexte 298"/>
+                <p:cNvSpPr txBox="1"/>
+                <p:nvPr/>
+              </p:nvSpPr>
+              <p:spPr>
+                <a:xfrm>
+                  <a:off x="1192115" y="3916834"/>
+                  <a:ext cx="817014" cy="153888"/>
+                </a:xfrm>
+                <a:prstGeom prst="rect">
+                  <a:avLst/>
+                </a:prstGeom>
+                <a:solidFill>
+                  <a:schemeClr val="lt1"/>
+                </a:solidFill>
+                <a:ln>
+                  <a:noFill/>
+                </a:ln>
+              </p:spPr>
+              <p:txBody>
+                <a:bodyPr wrap="none" lIns="18000" tIns="0" rIns="18000" bIns="0" rtlCol="0">
+                  <a:spAutoFit/>
+                </a:bodyPr>
+                <a:lstStyle/>
+                <a:p>
+                  <a:r>
+                    <a:rPr lang="fr-BE" sz="1000" smtClean="0">
+                      <a:latin typeface="Arial" pitchFamily="34" charset="0"/>
+                      <a:cs typeface="Arial" pitchFamily="34" charset="0"/>
+                    </a:rPr>
+                    <a:t>Closing doors</a:t>
+                  </a:r>
+                  <a:endParaRPr lang="fr-BE" sz="1000">
+                    <a:latin typeface="Arial" pitchFamily="34" charset="0"/>
+                    <a:cs typeface="Arial" pitchFamily="34" charset="0"/>
+                  </a:endParaRPr>
+                </a:p>
+              </p:txBody>
+            </p:sp>
+          </p:grpSp>
+          <p:grpSp>
+            <p:nvGrpSpPr>
+              <p:cNvPr id="304" name="Groupe 303"/>
+              <p:cNvGrpSpPr/>
+              <p:nvPr/>
+            </p:nvGrpSpPr>
+            <p:grpSpPr>
+              <a:xfrm>
+                <a:off x="3275856" y="188640"/>
+                <a:ext cx="3672408" cy="1450032"/>
+                <a:chOff x="3419872" y="188640"/>
+                <a:chExt cx="3672408" cy="1450032"/>
+              </a:xfrm>
+            </p:grpSpPr>
+            <p:grpSp>
+              <p:nvGrpSpPr>
+                <p:cNvPr id="226" name="Groupe 225"/>
+                <p:cNvGrpSpPr/>
+                <p:nvPr/>
+              </p:nvGrpSpPr>
+              <p:grpSpPr>
+                <a:xfrm>
+                  <a:off x="3419872" y="188640"/>
+                  <a:ext cx="3672408" cy="1224000"/>
+                  <a:chOff x="2146266" y="3249016"/>
+                  <a:chExt cx="3672408" cy="1224000"/>
+                </a:xfrm>
+              </p:grpSpPr>
+              <p:sp>
+                <p:nvSpPr>
+                  <p:cNvPr id="228" name="Rectangle 227"/>
+                  <p:cNvSpPr/>
+                  <p:nvPr/>
+                </p:nvSpPr>
+                <p:spPr>
+                  <a:xfrm>
+                    <a:off x="2146266" y="3249016"/>
+                    <a:ext cx="864096" cy="324000"/>
+                  </a:xfrm>
+                  <a:prstGeom prst="rect">
+                    <a:avLst/>
+                  </a:prstGeom>
+                </p:spPr>
+                <p:style>
+                  <a:lnRef idx="2">
+                    <a:schemeClr val="dk1"/>
+                  </a:lnRef>
+                  <a:fillRef idx="1">
+                    <a:schemeClr val="lt1"/>
+                  </a:fillRef>
+                  <a:effectRef idx="0">
+                    <a:schemeClr val="dk1"/>
+                  </a:effectRef>
+                  <a:fontRef idx="minor">
+                    <a:schemeClr val="dk1"/>
+                  </a:fontRef>
+                </p:style>
+                <p:txBody>
+                  <a:bodyPr lIns="36000" tIns="36000" rIns="36000" bIns="36000" rtlCol="0" anchor="ctr" anchorCtr="0"/>
+                  <a:lstStyle/>
+                  <a:p>
+                    <a:pPr algn="ctr"/>
+                    <a:r>
+                      <a:rPr lang="fr-BE" sz="1100" smtClean="0"/>
+                      <a:t>Controller</a:t>
+                    </a:r>
+                    <a:endParaRPr lang="fr-BE" sz="1100"/>
+                  </a:p>
+                </p:txBody>
+              </p:sp>
+              <p:sp>
+                <p:nvSpPr>
+                  <p:cNvPr id="229" name="Rectangle 228"/>
+                  <p:cNvSpPr/>
+                  <p:nvPr/>
+                </p:nvSpPr>
+                <p:spPr>
+                  <a:xfrm>
+                    <a:off x="3226386" y="3249016"/>
+                    <a:ext cx="720080" cy="324000"/>
+                  </a:xfrm>
+                  <a:prstGeom prst="rect">
+                    <a:avLst/>
+                  </a:prstGeom>
+                </p:spPr>
+                <p:style>
+                  <a:lnRef idx="2">
+                    <a:schemeClr val="dk1"/>
+                  </a:lnRef>
+                  <a:fillRef idx="1">
+                    <a:schemeClr val="lt1"/>
+                  </a:fillRef>
+                  <a:effectRef idx="0">
+                    <a:schemeClr val="dk1"/>
+                  </a:effectRef>
+                  <a:fontRef idx="minor">
+                    <a:schemeClr val="dk1"/>
+                  </a:fontRef>
+                </p:style>
+                <p:txBody>
+                  <a:bodyPr lIns="36000" tIns="36000" rIns="36000" bIns="36000" rtlCol="0" anchor="ctr"/>
+                  <a:lstStyle/>
+                  <a:p>
+                    <a:pPr algn="ctr"/>
+                    <a:r>
+                      <a:rPr lang="fr-BE" sz="1100" smtClean="0"/>
+                      <a:t>Actuators</a:t>
+                    </a:r>
+                    <a:endParaRPr lang="fr-BE" sz="1100"/>
+                  </a:p>
+                </p:txBody>
+              </p:sp>
+              <p:sp>
+                <p:nvSpPr>
+                  <p:cNvPr id="230" name="Rectangle 229"/>
+                  <p:cNvSpPr/>
+                  <p:nvPr/>
+                </p:nvSpPr>
+                <p:spPr>
+                  <a:xfrm>
+                    <a:off x="5098594" y="3249016"/>
+                    <a:ext cx="720080" cy="324000"/>
+                  </a:xfrm>
+                  <a:prstGeom prst="rect">
+                    <a:avLst/>
+                  </a:prstGeom>
+                </p:spPr>
+                <p:style>
+                  <a:lnRef idx="2">
+                    <a:schemeClr val="dk1"/>
+                  </a:lnRef>
+                  <a:fillRef idx="1">
+                    <a:schemeClr val="lt1"/>
+                  </a:fillRef>
+                  <a:effectRef idx="0">
+                    <a:schemeClr val="dk1"/>
+                  </a:effectRef>
+                  <a:fontRef idx="minor">
+                    <a:schemeClr val="dk1"/>
+                  </a:fontRef>
+                </p:style>
+                <p:txBody>
+                  <a:bodyPr lIns="36000" tIns="36000" rIns="36000" bIns="36000" rtlCol="0" anchor="ctr"/>
+                  <a:lstStyle/>
+                  <a:p>
+                    <a:pPr algn="ctr"/>
+                    <a:r>
+                      <a:rPr lang="fr-BE" sz="1100" smtClean="0"/>
+                      <a:t>Engine</a:t>
+                    </a:r>
+                  </a:p>
+                </p:txBody>
+              </p:sp>
+              <p:sp>
+                <p:nvSpPr>
+                  <p:cNvPr id="231" name="Rectangle 230"/>
+                  <p:cNvSpPr/>
+                  <p:nvPr/>
+                </p:nvSpPr>
+                <p:spPr>
+                  <a:xfrm>
+                    <a:off x="4234498" y="3249016"/>
+                    <a:ext cx="720080" cy="324000"/>
+                  </a:xfrm>
+                  <a:prstGeom prst="rect">
+                    <a:avLst/>
+                  </a:prstGeom>
+                </p:spPr>
+                <p:style>
+                  <a:lnRef idx="2">
+                    <a:schemeClr val="dk1"/>
+                  </a:lnRef>
+                  <a:fillRef idx="1">
+                    <a:schemeClr val="lt1"/>
+                  </a:fillRef>
+                  <a:effectRef idx="0">
+                    <a:schemeClr val="dk1"/>
+                  </a:effectRef>
+                  <a:fontRef idx="minor">
+                    <a:schemeClr val="dk1"/>
+                  </a:fontRef>
+                </p:style>
+                <p:txBody>
+                  <a:bodyPr lIns="36000" tIns="36000" rIns="36000" bIns="36000" rtlCol="0" anchor="ctr"/>
+                  <a:lstStyle/>
+                  <a:p>
+                    <a:pPr algn="ctr"/>
+                    <a:r>
+                      <a:rPr lang="fr-BE" sz="1100" smtClean="0"/>
+                      <a:t>Doors</a:t>
+                    </a:r>
+                  </a:p>
+                </p:txBody>
+              </p:sp>
+              <p:cxnSp>
+                <p:nvCxnSpPr>
+                  <p:cNvPr id="233" name="Connecteur droit avec flèche 232"/>
+                  <p:cNvCxnSpPr>
+                    <a:stCxn id="228" idx="2"/>
+                  </p:cNvCxnSpPr>
+                  <p:nvPr/>
+                </p:nvCxnSpPr>
+                <p:spPr>
+                  <a:xfrm rot="5400000">
+                    <a:off x="2127917" y="4022619"/>
+                    <a:ext cx="900000" cy="794"/>
+                  </a:xfrm>
+                  <a:prstGeom prst="straightConnector1">
+                    <a:avLst/>
+                  </a:prstGeom>
+                  <a:ln>
+                    <a:tailEnd type="triangle"/>
+                  </a:ln>
+                </p:spPr>
+                <p:style>
+                  <a:lnRef idx="2">
+                    <a:schemeClr val="dk1"/>
+                  </a:lnRef>
+                  <a:fillRef idx="0">
+                    <a:schemeClr val="dk1"/>
+                  </a:fillRef>
+                  <a:effectRef idx="1">
+                    <a:schemeClr val="dk1"/>
+                  </a:effectRef>
+                  <a:fontRef idx="minor">
+                    <a:schemeClr val="tx1"/>
+                  </a:fontRef>
+                </p:style>
+              </p:cxnSp>
+              <p:cxnSp>
+                <p:nvCxnSpPr>
+                  <p:cNvPr id="235" name="Connecteur droit avec flèche 234"/>
+                  <p:cNvCxnSpPr>
+                    <a:stCxn id="229" idx="2"/>
+                  </p:cNvCxnSpPr>
+                  <p:nvPr/>
+                </p:nvCxnSpPr>
+                <p:spPr>
+                  <a:xfrm rot="5400000">
+                    <a:off x="3136029" y="4022619"/>
+                    <a:ext cx="900000" cy="794"/>
+                  </a:xfrm>
+                  <a:prstGeom prst="straightConnector1">
+                    <a:avLst/>
+                  </a:prstGeom>
+                  <a:ln>
+                    <a:tailEnd type="triangle"/>
+                  </a:ln>
+                </p:spPr>
+                <p:style>
+                  <a:lnRef idx="2">
+                    <a:schemeClr val="dk1"/>
+                  </a:lnRef>
+                  <a:fillRef idx="0">
+                    <a:schemeClr val="dk1"/>
+                  </a:fillRef>
+                  <a:effectRef idx="1">
+                    <a:schemeClr val="dk1"/>
+                  </a:effectRef>
+                  <a:fontRef idx="minor">
+                    <a:schemeClr val="tx1"/>
+                  </a:fontRef>
+                </p:style>
+              </p:cxnSp>
+              <p:cxnSp>
+                <p:nvCxnSpPr>
+                  <p:cNvPr id="237" name="Connecteur droit avec flèche 236"/>
+                  <p:cNvCxnSpPr>
+                    <a:stCxn id="231" idx="2"/>
+                  </p:cNvCxnSpPr>
+                  <p:nvPr/>
+                </p:nvCxnSpPr>
+                <p:spPr>
+                  <a:xfrm rot="5400000">
+                    <a:off x="4144141" y="4022619"/>
+                    <a:ext cx="900000" cy="794"/>
+                  </a:xfrm>
+                  <a:prstGeom prst="straightConnector1">
+                    <a:avLst/>
+                  </a:prstGeom>
+                  <a:ln>
+                    <a:tailEnd type="triangle"/>
+                  </a:ln>
+                </p:spPr>
+                <p:style>
+                  <a:lnRef idx="2">
+                    <a:schemeClr val="dk1"/>
+                  </a:lnRef>
+                  <a:fillRef idx="0">
+                    <a:schemeClr val="dk1"/>
+                  </a:fillRef>
+                  <a:effectRef idx="1">
+                    <a:schemeClr val="dk1"/>
+                  </a:effectRef>
+                  <a:fontRef idx="minor">
+                    <a:schemeClr val="tx1"/>
+                  </a:fontRef>
+                </p:style>
+              </p:cxnSp>
+              <p:cxnSp>
+                <p:nvCxnSpPr>
+                  <p:cNvPr id="238" name="Connecteur droit avec flèche 237"/>
+                  <p:cNvCxnSpPr>
+                    <a:stCxn id="230" idx="2"/>
+                  </p:cNvCxnSpPr>
+                  <p:nvPr/>
+                </p:nvCxnSpPr>
+                <p:spPr>
+                  <a:xfrm rot="5400000">
+                    <a:off x="5008237" y="4022619"/>
+                    <a:ext cx="900000" cy="794"/>
+                  </a:xfrm>
+                  <a:prstGeom prst="straightConnector1">
+                    <a:avLst/>
+                  </a:prstGeom>
+                  <a:ln>
+                    <a:tailEnd type="triangle"/>
+                  </a:ln>
+                </p:spPr>
+                <p:style>
+                  <a:lnRef idx="2">
+                    <a:schemeClr val="dk1"/>
+                  </a:lnRef>
+                  <a:fillRef idx="0">
+                    <a:schemeClr val="dk1"/>
+                  </a:fillRef>
+                  <a:effectRef idx="1">
+                    <a:schemeClr val="dk1"/>
+                  </a:effectRef>
+                  <a:fontRef idx="minor">
+                    <a:schemeClr val="tx1"/>
+                  </a:fontRef>
+                </p:style>
+              </p:cxnSp>
+              <p:cxnSp>
+                <p:nvCxnSpPr>
+                  <p:cNvPr id="245" name="Connecteur droit avec flèche 244"/>
+                  <p:cNvCxnSpPr/>
+                  <p:nvPr/>
+                </p:nvCxnSpPr>
+                <p:spPr>
+                  <a:xfrm>
+                    <a:off x="2578314" y="3776065"/>
+                    <a:ext cx="1008112" cy="1588"/>
+                  </a:xfrm>
+                  <a:prstGeom prst="straightConnector1">
+                    <a:avLst/>
+                  </a:prstGeom>
+                  <a:ln>
+                    <a:tailEnd type="triangle"/>
+                  </a:ln>
+                </p:spPr>
+                <p:style>
+                  <a:lnRef idx="1">
+                    <a:schemeClr val="dk1"/>
+                  </a:lnRef>
+                  <a:fillRef idx="0">
+                    <a:schemeClr val="dk1"/>
+                  </a:fillRef>
+                  <a:effectRef idx="0">
+                    <a:schemeClr val="dk1"/>
+                  </a:effectRef>
+                  <a:fontRef idx="minor">
+                    <a:schemeClr val="tx1"/>
+                  </a:fontRef>
+                </p:style>
+              </p:cxnSp>
+              <p:sp>
+                <p:nvSpPr>
+                  <p:cNvPr id="246" name="ZoneTexte 245"/>
+                  <p:cNvSpPr txBox="1"/>
+                  <p:nvPr/>
+                </p:nvSpPr>
+                <p:spPr>
+                  <a:xfrm>
+                    <a:off x="2678183" y="3681064"/>
+                    <a:ext cx="720000" cy="169277"/>
+                  </a:xfrm>
+                  <a:prstGeom prst="rect">
+                    <a:avLst/>
+                  </a:prstGeom>
+                  <a:solidFill>
+                    <a:schemeClr val="lt1"/>
+                  </a:solidFill>
+                  <a:ln>
+                    <a:noFill/>
+                  </a:ln>
+                </p:spPr>
+                <p:txBody>
+                  <a:bodyPr wrap="square" lIns="18000" tIns="0" rIns="18000" bIns="0" rtlCol="0">
+                    <a:spAutoFit/>
+                  </a:bodyPr>
+                  <a:lstStyle/>
+                  <a:p>
+                    <a:pPr algn="ctr"/>
+                    <a:r>
+                      <a:rPr lang="fr-BE" sz="1100" smtClean="0"/>
+                      <a:t>stop-signal</a:t>
+                    </a:r>
+                    <a:endParaRPr lang="fr-BE" sz="1100"/>
+                  </a:p>
+                </p:txBody>
+              </p:sp>
+              <p:cxnSp>
+                <p:nvCxnSpPr>
+                  <p:cNvPr id="247" name="Connecteur droit avec flèche 246"/>
+                  <p:cNvCxnSpPr/>
+                  <p:nvPr/>
+                </p:nvCxnSpPr>
+                <p:spPr>
+                  <a:xfrm>
+                    <a:off x="3586426" y="3959081"/>
+                    <a:ext cx="1872208" cy="1588"/>
+                  </a:xfrm>
+                  <a:prstGeom prst="straightConnector1">
+                    <a:avLst/>
+                  </a:prstGeom>
+                  <a:ln>
+                    <a:tailEnd type="triangle"/>
+                  </a:ln>
+                </p:spPr>
+                <p:style>
+                  <a:lnRef idx="1">
+                    <a:schemeClr val="dk1"/>
+                  </a:lnRef>
+                  <a:fillRef idx="0">
+                    <a:schemeClr val="dk1"/>
+                  </a:fillRef>
+                  <a:effectRef idx="0">
+                    <a:schemeClr val="dk1"/>
+                  </a:effectRef>
+                  <a:fontRef idx="minor">
+                    <a:schemeClr val="tx1"/>
+                  </a:fontRef>
+                </p:style>
+              </p:cxnSp>
+              <p:sp>
+                <p:nvSpPr>
+                  <p:cNvPr id="248" name="ZoneTexte 247"/>
+                  <p:cNvSpPr txBox="1"/>
+                  <p:nvPr/>
+                </p:nvSpPr>
+                <p:spPr>
+                  <a:xfrm>
+                    <a:off x="4425008" y="3863825"/>
+                    <a:ext cx="324000" cy="169277"/>
+                  </a:xfrm>
+                  <a:prstGeom prst="rect">
+                    <a:avLst/>
+                  </a:prstGeom>
+                  <a:solidFill>
+                    <a:schemeClr val="lt1"/>
+                  </a:solidFill>
+                  <a:ln>
+                    <a:noFill/>
+                  </a:ln>
+                </p:spPr>
+                <p:txBody>
+                  <a:bodyPr wrap="square" lIns="18000" tIns="0" rIns="18000" bIns="0" rtlCol="0">
+                    <a:spAutoFit/>
+                  </a:bodyPr>
+                  <a:lstStyle/>
+                  <a:p>
+                    <a:pPr algn="ctr"/>
+                    <a:r>
+                      <a:rPr lang="fr-BE" sz="1100" smtClean="0"/>
+                      <a:t>stop</a:t>
+                    </a:r>
+                    <a:endParaRPr lang="fr-BE" sz="1100"/>
+                  </a:p>
+                </p:txBody>
+              </p:sp>
+              <p:cxnSp>
+                <p:nvCxnSpPr>
+                  <p:cNvPr id="249" name="Connecteur droit avec flèche 248"/>
+                  <p:cNvCxnSpPr/>
+                  <p:nvPr/>
+                </p:nvCxnSpPr>
+                <p:spPr>
+                  <a:xfrm flipV="1">
+                    <a:off x="2578314" y="4117731"/>
+                    <a:ext cx="1008000" cy="862"/>
+                  </a:xfrm>
+                  <a:prstGeom prst="straightConnector1">
+                    <a:avLst/>
+                  </a:prstGeom>
+                  <a:ln>
+                    <a:tailEnd type="triangle"/>
+                  </a:ln>
+                </p:spPr>
+                <p:style>
+                  <a:lnRef idx="1">
+                    <a:schemeClr val="dk1"/>
+                  </a:lnRef>
+                  <a:fillRef idx="0">
+                    <a:schemeClr val="dk1"/>
+                  </a:fillRef>
+                  <a:effectRef idx="0">
+                    <a:schemeClr val="dk1"/>
+                  </a:effectRef>
+                  <a:fontRef idx="minor">
+                    <a:schemeClr val="tx1"/>
+                  </a:fontRef>
+                </p:style>
+              </p:cxnSp>
+              <p:sp>
+                <p:nvSpPr>
+                  <p:cNvPr id="250" name="ZoneTexte 249"/>
+                  <p:cNvSpPr txBox="1"/>
+                  <p:nvPr/>
+                </p:nvSpPr>
+                <p:spPr>
+                  <a:xfrm>
+                    <a:off x="2678183" y="4023592"/>
+                    <a:ext cx="720000" cy="169277"/>
+                  </a:xfrm>
+                  <a:prstGeom prst="rect">
+                    <a:avLst/>
+                  </a:prstGeom>
+                  <a:solidFill>
+                    <a:schemeClr val="lt1"/>
+                  </a:solidFill>
+                  <a:ln>
+                    <a:noFill/>
+                  </a:ln>
+                </p:spPr>
+                <p:txBody>
+                  <a:bodyPr wrap="square" lIns="18000" tIns="0" rIns="18000" bIns="0" rtlCol="0">
+                    <a:spAutoFit/>
+                  </a:bodyPr>
+                  <a:lstStyle/>
+                  <a:p>
+                    <a:pPr algn="ctr"/>
+                    <a:r>
+                      <a:rPr lang="fr-BE" sz="1100" smtClean="0"/>
+                      <a:t>open-signal</a:t>
+                    </a:r>
+                    <a:endParaRPr lang="fr-BE" sz="1100"/>
+                  </a:p>
+                </p:txBody>
+              </p:sp>
+              <p:cxnSp>
+                <p:nvCxnSpPr>
+                  <p:cNvPr id="251" name="Connecteur droit avec flèche 250"/>
+                  <p:cNvCxnSpPr/>
+                  <p:nvPr/>
+                </p:nvCxnSpPr>
+                <p:spPr>
+                  <a:xfrm>
+                    <a:off x="3586426" y="4261747"/>
+                    <a:ext cx="1008112" cy="3130"/>
+                  </a:xfrm>
+                  <a:prstGeom prst="straightConnector1">
+                    <a:avLst/>
+                  </a:prstGeom>
+                  <a:ln>
+                    <a:tailEnd type="triangle"/>
+                  </a:ln>
+                </p:spPr>
+                <p:style>
+                  <a:lnRef idx="1">
+                    <a:schemeClr val="dk1"/>
+                  </a:lnRef>
+                  <a:fillRef idx="0">
+                    <a:schemeClr val="dk1"/>
+                  </a:fillRef>
+                  <a:effectRef idx="0">
+                    <a:schemeClr val="dk1"/>
+                  </a:effectRef>
+                  <a:fontRef idx="minor">
+                    <a:schemeClr val="tx1"/>
+                  </a:fontRef>
+                </p:style>
+              </p:cxnSp>
+              <p:sp>
+                <p:nvSpPr>
+                  <p:cNvPr id="252" name="ZoneTexte 251"/>
+                  <p:cNvSpPr txBox="1"/>
+                  <p:nvPr/>
+                </p:nvSpPr>
+                <p:spPr>
+                  <a:xfrm>
+                    <a:off x="3920992" y="4159859"/>
+                    <a:ext cx="360000" cy="169277"/>
+                  </a:xfrm>
+                  <a:prstGeom prst="rect">
+                    <a:avLst/>
+                  </a:prstGeom>
+                  <a:solidFill>
+                    <a:schemeClr val="lt1"/>
+                  </a:solidFill>
+                  <a:ln>
+                    <a:noFill/>
+                  </a:ln>
+                </p:spPr>
+                <p:txBody>
+                  <a:bodyPr wrap="square" lIns="18000" tIns="0" rIns="18000" bIns="0" rtlCol="0">
+                    <a:spAutoFit/>
+                  </a:bodyPr>
+                  <a:lstStyle/>
+                  <a:p>
+                    <a:pPr algn="ctr"/>
+                    <a:r>
+                      <a:rPr lang="fr-BE" sz="1100" smtClean="0"/>
+                      <a:t>open</a:t>
+                    </a:r>
+                    <a:endParaRPr lang="fr-BE" sz="1100"/>
+                  </a:p>
+                </p:txBody>
+              </p:sp>
+            </p:grpSp>
+            <p:sp>
+              <p:nvSpPr>
+                <p:cNvPr id="303" name="ZoneTexte 302"/>
+                <p:cNvSpPr txBox="1"/>
+                <p:nvPr/>
+              </p:nvSpPr>
+              <p:spPr>
+                <a:xfrm>
+                  <a:off x="4491702" y="1484784"/>
+                  <a:ext cx="1528748" cy="153888"/>
+                </a:xfrm>
+                <a:prstGeom prst="rect">
+                  <a:avLst/>
+                </a:prstGeom>
+                <a:solidFill>
+                  <a:schemeClr val="lt1"/>
+                </a:solidFill>
+                <a:ln>
+                  <a:noFill/>
+                </a:ln>
+              </p:spPr>
+              <p:txBody>
+                <a:bodyPr wrap="none" lIns="18000" tIns="0" rIns="18000" bIns="0" rtlCol="0">
+                  <a:spAutoFit/>
+                </a:bodyPr>
+                <a:lstStyle/>
+                <a:p>
+                  <a:r>
+                    <a:rPr lang="fr-BE" sz="1000" smtClean="0">
+                      <a:latin typeface="Arial" pitchFamily="34" charset="0"/>
+                      <a:cs typeface="Arial" pitchFamily="34" charset="0"/>
+                    </a:rPr>
+                    <a:t>Stopping &amp; Opening doors</a:t>
+                  </a:r>
+                  <a:endParaRPr lang="fr-BE" sz="1000">
+                    <a:latin typeface="Arial" pitchFamily="34" charset="0"/>
+                    <a:cs typeface="Arial" pitchFamily="34" charset="0"/>
+                  </a:endParaRPr>
+                </a:p>
+              </p:txBody>
+            </p:sp>
+          </p:grpSp>
+        </p:grpSp>
+      </p:grpSp>
+    </p:spTree>
+  </p:cSld>
+  <p:clrMapOvr>
+    <a:masterClrMapping/>
+  </p:clrMapOvr>
+</p:sld>
+</file>
+
 <file path=ppt/theme/theme1.xml><?xml version="1.0" encoding="utf-8"?>
 <a:theme xmlns:a="http://schemas.openxmlformats.org/drawingml/2006/main" name="Thème Office">
   <a:themeElements>

</xml_diff>

<commit_message>
Prepare background's future work
</commit_message>
<xml_diff>
--- a/writing/images/train.pptx
+++ b/writing/images/train.pptx
@@ -294,7 +294,7 @@
             <a:fld id="{68BDF4EC-5B70-45D8-B718-E56EB4C6B13E}" type="datetimeFigureOut">
               <a:rPr lang="fr-BE" smtClean="0"/>
               <a:pPr/>
-              <a:t>20/05/2011</a:t>
+              <a:t>23/05/2011</a:t>
             </a:fld>
             <a:endParaRPr lang="fr-BE"/>
           </a:p>
@@ -461,7 +461,7 @@
             <a:fld id="{68BDF4EC-5B70-45D8-B718-E56EB4C6B13E}" type="datetimeFigureOut">
               <a:rPr lang="fr-BE" smtClean="0"/>
               <a:pPr/>
-              <a:t>20/05/2011</a:t>
+              <a:t>23/05/2011</a:t>
             </a:fld>
             <a:endParaRPr lang="fr-BE"/>
           </a:p>
@@ -638,7 +638,7 @@
             <a:fld id="{68BDF4EC-5B70-45D8-B718-E56EB4C6B13E}" type="datetimeFigureOut">
               <a:rPr lang="fr-BE" smtClean="0"/>
               <a:pPr/>
-              <a:t>20/05/2011</a:t>
+              <a:t>23/05/2011</a:t>
             </a:fld>
             <a:endParaRPr lang="fr-BE"/>
           </a:p>
@@ -805,7 +805,7 @@
             <a:fld id="{68BDF4EC-5B70-45D8-B718-E56EB4C6B13E}" type="datetimeFigureOut">
               <a:rPr lang="fr-BE" smtClean="0"/>
               <a:pPr/>
-              <a:t>20/05/2011</a:t>
+              <a:t>23/05/2011</a:t>
             </a:fld>
             <a:endParaRPr lang="fr-BE"/>
           </a:p>
@@ -1048,7 +1048,7 @@
             <a:fld id="{68BDF4EC-5B70-45D8-B718-E56EB4C6B13E}" type="datetimeFigureOut">
               <a:rPr lang="fr-BE" smtClean="0"/>
               <a:pPr/>
-              <a:t>20/05/2011</a:t>
+              <a:t>23/05/2011</a:t>
             </a:fld>
             <a:endParaRPr lang="fr-BE"/>
           </a:p>
@@ -1333,7 +1333,7 @@
             <a:fld id="{68BDF4EC-5B70-45D8-B718-E56EB4C6B13E}" type="datetimeFigureOut">
               <a:rPr lang="fr-BE" smtClean="0"/>
               <a:pPr/>
-              <a:t>20/05/2011</a:t>
+              <a:t>23/05/2011</a:t>
             </a:fld>
             <a:endParaRPr lang="fr-BE"/>
           </a:p>
@@ -1752,7 +1752,7 @@
             <a:fld id="{68BDF4EC-5B70-45D8-B718-E56EB4C6B13E}" type="datetimeFigureOut">
               <a:rPr lang="fr-BE" smtClean="0"/>
               <a:pPr/>
-              <a:t>20/05/2011</a:t>
+              <a:t>23/05/2011</a:t>
             </a:fld>
             <a:endParaRPr lang="fr-BE"/>
           </a:p>
@@ -1867,7 +1867,7 @@
             <a:fld id="{68BDF4EC-5B70-45D8-B718-E56EB4C6B13E}" type="datetimeFigureOut">
               <a:rPr lang="fr-BE" smtClean="0"/>
               <a:pPr/>
-              <a:t>20/05/2011</a:t>
+              <a:t>23/05/2011</a:t>
             </a:fld>
             <a:endParaRPr lang="fr-BE"/>
           </a:p>
@@ -1959,7 +1959,7 @@
             <a:fld id="{68BDF4EC-5B70-45D8-B718-E56EB4C6B13E}" type="datetimeFigureOut">
               <a:rPr lang="fr-BE" smtClean="0"/>
               <a:pPr/>
-              <a:t>20/05/2011</a:t>
+              <a:t>23/05/2011</a:t>
             </a:fld>
             <a:endParaRPr lang="fr-BE"/>
           </a:p>
@@ -2233,7 +2233,7 @@
             <a:fld id="{68BDF4EC-5B70-45D8-B718-E56EB4C6B13E}" type="datetimeFigureOut">
               <a:rPr lang="fr-BE" smtClean="0"/>
               <a:pPr/>
-              <a:t>20/05/2011</a:t>
+              <a:t>23/05/2011</a:t>
             </a:fld>
             <a:endParaRPr lang="fr-BE"/>
           </a:p>
@@ -2483,7 +2483,7 @@
             <a:fld id="{68BDF4EC-5B70-45D8-B718-E56EB4C6B13E}" type="datetimeFigureOut">
               <a:rPr lang="fr-BE" smtClean="0"/>
               <a:pPr/>
-              <a:t>20/05/2011</a:t>
+              <a:t>23/05/2011</a:t>
             </a:fld>
             <a:endParaRPr lang="fr-BE"/>
           </a:p>
@@ -2693,7 +2693,7 @@
             <a:fld id="{68BDF4EC-5B70-45D8-B718-E56EB4C6B13E}" type="datetimeFigureOut">
               <a:rPr lang="fr-BE" smtClean="0"/>
               <a:pPr/>
-              <a:t>20/05/2011</a:t>
+              <a:t>23/05/2011</a:t>
             </a:fld>
             <a:endParaRPr lang="fr-BE"/>
           </a:p>
@@ -12087,237 +12087,554 @@
           <a:chExt cx="0" cy="0"/>
         </a:xfrm>
       </p:grpSpPr>
-      <p:sp>
-        <p:nvSpPr>
-          <p:cNvPr id="40" name="Rectangle 39"/>
-          <p:cNvSpPr/>
-          <p:nvPr/>
-        </p:nvSpPr>
-        <p:spPr>
-          <a:xfrm>
-            <a:off x="251520" y="620688"/>
-            <a:ext cx="8280920" cy="5616624"/>
-          </a:xfrm>
-          <a:prstGeom prst="rect">
-            <a:avLst/>
-          </a:prstGeom>
-          <a:ln w="3175"/>
-        </p:spPr>
-        <p:style>
-          <a:lnRef idx="2">
-            <a:schemeClr val="dk1"/>
-          </a:lnRef>
-          <a:fillRef idx="1">
-            <a:schemeClr val="lt1"/>
-          </a:fillRef>
-          <a:effectRef idx="0">
-            <a:schemeClr val="dk1"/>
-          </a:effectRef>
-          <a:fontRef idx="minor">
-            <a:schemeClr val="dk1"/>
-          </a:fontRef>
-        </p:style>
-        <p:txBody>
-          <a:bodyPr rtlCol="0" anchor="ctr"/>
-          <a:lstStyle/>
-          <a:p>
-            <a:pPr algn="ctr"/>
-            <a:endParaRPr lang="fr-BE"/>
-          </a:p>
-        </p:txBody>
-      </p:sp>
       <p:grpSp>
         <p:nvGrpSpPr>
-          <p:cNvPr id="47" name="Groupe 46"/>
+          <p:cNvPr id="48" name="Groupe 47"/>
           <p:cNvGrpSpPr/>
           <p:nvPr/>
         </p:nvGrpSpPr>
         <p:grpSpPr>
           <a:xfrm>
-            <a:off x="251520" y="644203"/>
-            <a:ext cx="8280920" cy="5530393"/>
-            <a:chOff x="251520" y="644203"/>
-            <a:chExt cx="8280920" cy="5530393"/>
+            <a:off x="251520" y="144016"/>
+            <a:ext cx="8541867" cy="6525344"/>
+            <a:chOff x="251520" y="144016"/>
+            <a:chExt cx="8541867" cy="6525344"/>
           </a:xfrm>
         </p:grpSpPr>
+        <p:sp>
+          <p:nvSpPr>
+            <p:cNvPr id="40" name="Rectangle 39"/>
+            <p:cNvSpPr/>
+            <p:nvPr/>
+          </p:nvSpPr>
+          <p:spPr>
+            <a:xfrm>
+              <a:off x="251520" y="144016"/>
+              <a:ext cx="8496944" cy="6497960"/>
+            </a:xfrm>
+            <a:prstGeom prst="rect">
+              <a:avLst/>
+            </a:prstGeom>
+            <a:ln w="3175"/>
+          </p:spPr>
+          <p:style>
+            <a:lnRef idx="2">
+              <a:schemeClr val="dk1"/>
+            </a:lnRef>
+            <a:fillRef idx="1">
+              <a:schemeClr val="lt1"/>
+            </a:fillRef>
+            <a:effectRef idx="0">
+              <a:schemeClr val="dk1"/>
+            </a:effectRef>
+            <a:fontRef idx="minor">
+              <a:schemeClr val="dk1"/>
+            </a:fontRef>
+          </p:style>
+          <p:txBody>
+            <a:bodyPr rtlCol="0" anchor="ctr"/>
+            <a:lstStyle/>
+            <a:p>
+              <a:pPr algn="ctr"/>
+              <a:endParaRPr lang="fr-BE"/>
+            </a:p>
+          </p:txBody>
+        </p:sp>
+        <p:sp>
+          <p:nvSpPr>
+            <p:cNvPr id="33" name="Ellipse 32"/>
+            <p:cNvSpPr/>
+            <p:nvPr/>
+          </p:nvSpPr>
+          <p:spPr>
+            <a:xfrm>
+              <a:off x="2339752" y="1196752"/>
+              <a:ext cx="4464496" cy="4248472"/>
+            </a:xfrm>
+            <a:prstGeom prst="ellipse">
+              <a:avLst/>
+            </a:prstGeom>
+            <a:ln w="50800">
+              <a:solidFill>
+                <a:srgbClr val="00B050"/>
+              </a:solidFill>
+              <a:prstDash val="dash"/>
+            </a:ln>
+          </p:spPr>
+          <p:style>
+            <a:lnRef idx="2">
+              <a:schemeClr val="dk1"/>
+            </a:lnRef>
+            <a:fillRef idx="1">
+              <a:schemeClr val="lt1"/>
+            </a:fillRef>
+            <a:effectRef idx="0">
+              <a:schemeClr val="dk1"/>
+            </a:effectRef>
+            <a:fontRef idx="minor">
+              <a:schemeClr val="dk1"/>
+            </a:fontRef>
+          </p:style>
+          <p:txBody>
+            <a:bodyPr rtlCol="0" anchor="ctr"/>
+            <a:lstStyle/>
+            <a:p>
+              <a:pPr algn="ctr"/>
+              <a:endParaRPr lang="fr-BE"/>
+            </a:p>
+          </p:txBody>
+        </p:sp>
+        <p:sp>
+          <p:nvSpPr>
+            <p:cNvPr id="37" name="Rectangle 36"/>
+            <p:cNvSpPr/>
+            <p:nvPr/>
+          </p:nvSpPr>
+          <p:spPr>
+            <a:xfrm>
+              <a:off x="2339752" y="476672"/>
+              <a:ext cx="4104456" cy="1080120"/>
+            </a:xfrm>
+            <a:prstGeom prst="rect">
+              <a:avLst/>
+            </a:prstGeom>
+            <a:solidFill>
+              <a:schemeClr val="bg1"/>
+            </a:solidFill>
+            <a:ln>
+              <a:noFill/>
+            </a:ln>
+          </p:spPr>
+          <p:style>
+            <a:lnRef idx="2">
+              <a:schemeClr val="accent1">
+                <a:shade val="50000"/>
+              </a:schemeClr>
+            </a:lnRef>
+            <a:fillRef idx="1">
+              <a:schemeClr val="accent1"/>
+            </a:fillRef>
+            <a:effectRef idx="0">
+              <a:schemeClr val="accent1"/>
+            </a:effectRef>
+            <a:fontRef idx="minor">
+              <a:schemeClr val="lt1"/>
+            </a:fontRef>
+          </p:style>
+          <p:txBody>
+            <a:bodyPr rtlCol="0" anchor="ctr"/>
+            <a:lstStyle/>
+            <a:p>
+              <a:pPr algn="ctr"/>
+              <a:endParaRPr lang="fr-BE"/>
+            </a:p>
+          </p:txBody>
+        </p:sp>
+        <p:sp>
+          <p:nvSpPr>
+            <p:cNvPr id="36" name="Rectangle 35"/>
+            <p:cNvSpPr/>
+            <p:nvPr/>
+          </p:nvSpPr>
+          <p:spPr>
+            <a:xfrm>
+              <a:off x="3419872" y="4797152"/>
+              <a:ext cx="2160240" cy="936104"/>
+            </a:xfrm>
+            <a:prstGeom prst="rect">
+              <a:avLst/>
+            </a:prstGeom>
+            <a:solidFill>
+              <a:schemeClr val="bg1"/>
+            </a:solidFill>
+            <a:ln>
+              <a:noFill/>
+            </a:ln>
+          </p:spPr>
+          <p:style>
+            <a:lnRef idx="2">
+              <a:schemeClr val="accent1">
+                <a:shade val="50000"/>
+              </a:schemeClr>
+            </a:lnRef>
+            <a:fillRef idx="1">
+              <a:schemeClr val="accent1"/>
+            </a:fillRef>
+            <a:effectRef idx="0">
+              <a:schemeClr val="accent1"/>
+            </a:effectRef>
+            <a:fontRef idx="minor">
+              <a:schemeClr val="lt1"/>
+            </a:fontRef>
+          </p:style>
+          <p:txBody>
+            <a:bodyPr rtlCol="0" anchor="ctr"/>
+            <a:lstStyle/>
+            <a:p>
+              <a:pPr algn="ctr"/>
+              <a:endParaRPr lang="fr-BE"/>
+            </a:p>
+          </p:txBody>
+        </p:sp>
         <p:grpSp>
           <p:nvGrpSpPr>
-            <p:cNvPr id="38" name="Groupe 37"/>
+            <p:cNvPr id="31" name="Groupe 30"/>
             <p:cNvGrpSpPr/>
             <p:nvPr/>
           </p:nvGrpSpPr>
           <p:grpSpPr>
             <a:xfrm>
-              <a:off x="251520" y="644203"/>
-              <a:ext cx="8280920" cy="5530393"/>
-              <a:chOff x="251520" y="644203"/>
-              <a:chExt cx="8280920" cy="5530393"/>
+              <a:off x="3196227" y="4590420"/>
+              <a:ext cx="2803386" cy="2078940"/>
+              <a:chOff x="5254729" y="2420888"/>
+              <a:chExt cx="2803386" cy="2078940"/>
             </a:xfrm>
           </p:grpSpPr>
+          <p:pic>
+            <p:nvPicPr>
+              <p:cNvPr id="2053" name="Picture 5" descr="D:\blambeau\Work\ucl\thesis\writing\src\2-framework\images\train-hmsc-single.png"/>
+              <p:cNvPicPr>
+                <a:picLocks noChangeAspect="1" noChangeArrowheads="1"/>
+              </p:cNvPicPr>
+              <p:nvPr/>
+            </p:nvPicPr>
+            <p:blipFill>
+              <a:blip r:embed="rId2" cstate="print"/>
+              <a:srcRect/>
+              <a:stretch>
+                <a:fillRect/>
+              </a:stretch>
+            </p:blipFill>
+            <p:spPr bwMode="auto">
+              <a:xfrm>
+                <a:off x="5254729" y="2420888"/>
+                <a:ext cx="2320972" cy="1728192"/>
+              </a:xfrm>
+              <a:prstGeom prst="rect">
+                <a:avLst/>
+              </a:prstGeom>
+              <a:noFill/>
+            </p:spPr>
+          </p:pic>
           <p:sp>
             <p:nvSpPr>
-              <p:cNvPr id="33" name="Ellipse 32"/>
-              <p:cNvSpPr/>
+              <p:cNvPr id="26" name="ZoneTexte 25"/>
+              <p:cNvSpPr txBox="1"/>
               <p:nvPr/>
             </p:nvSpPr>
             <p:spPr>
               <a:xfrm>
-                <a:off x="2339752" y="1412776"/>
-                <a:ext cx="4464496" cy="4248472"/>
+                <a:off x="5262350" y="4130496"/>
+                <a:ext cx="2795765" cy="369332"/>
               </a:xfrm>
-              <a:prstGeom prst="ellipse">
+              <a:prstGeom prst="rect">
                 <a:avLst/>
               </a:prstGeom>
-              <a:ln w="50800">
-                <a:solidFill>
-                  <a:srgbClr val="00B050"/>
-                </a:solidFill>
-                <a:prstDash val="dash"/>
-              </a:ln>
+              <a:noFill/>
             </p:spPr>
-            <p:style>
-              <a:lnRef idx="2">
-                <a:schemeClr val="dk1"/>
-              </a:lnRef>
-              <a:fillRef idx="1">
-                <a:schemeClr val="lt1"/>
-              </a:fillRef>
-              <a:effectRef idx="0">
-                <a:schemeClr val="dk1"/>
-              </a:effectRef>
-              <a:fontRef idx="minor">
-                <a:schemeClr val="dk1"/>
-              </a:fontRef>
-            </p:style>
             <p:txBody>
-              <a:bodyPr rtlCol="0" anchor="ctr"/>
+              <a:bodyPr wrap="none" rtlCol="0">
+                <a:spAutoFit/>
+              </a:bodyPr>
               <a:lstStyle/>
               <a:p>
-                <a:pPr algn="ctr"/>
+                <a:pPr algn="r"/>
+                <a:r>
+                  <a:rPr lang="fr-BE" smtClean="0"/>
+                  <a:t>High-level </a:t>
+                </a:r>
+                <a:r>
+                  <a:rPr lang="fr-BE" smtClean="0"/>
+                  <a:t>scenarios (hMSC)</a:t>
+                </a:r>
+                <a:endParaRPr lang="fr-BE" smtClean="0"/>
+              </a:p>
+            </p:txBody>
+          </p:sp>
+        </p:grpSp>
+        <p:sp>
+          <p:nvSpPr>
+            <p:cNvPr id="35" name="Rectangle 34"/>
+            <p:cNvSpPr/>
+            <p:nvPr/>
+          </p:nvSpPr>
+          <p:spPr>
+            <a:xfrm>
+              <a:off x="5652120" y="2428508"/>
+              <a:ext cx="2016224" cy="1368152"/>
+            </a:xfrm>
+            <a:prstGeom prst="rect">
+              <a:avLst/>
+            </a:prstGeom>
+            <a:solidFill>
+              <a:schemeClr val="bg1"/>
+            </a:solidFill>
+            <a:ln>
+              <a:noFill/>
+            </a:ln>
+          </p:spPr>
+          <p:style>
+            <a:lnRef idx="2">
+              <a:schemeClr val="accent1">
+                <a:shade val="50000"/>
+              </a:schemeClr>
+            </a:lnRef>
+            <a:fillRef idx="1">
+              <a:schemeClr val="accent1"/>
+            </a:fillRef>
+            <a:effectRef idx="0">
+              <a:schemeClr val="accent1"/>
+            </a:effectRef>
+            <a:fontRef idx="minor">
+              <a:schemeClr val="lt1"/>
+            </a:fontRef>
+          </p:style>
+          <p:txBody>
+            <a:bodyPr rtlCol="0" anchor="ctr"/>
+            <a:lstStyle/>
+            <a:p>
+              <a:pPr algn="ctr"/>
+              <a:endParaRPr lang="fr-BE"/>
+            </a:p>
+          </p:txBody>
+        </p:sp>
+        <p:sp>
+          <p:nvSpPr>
+            <p:cNvPr id="34" name="Rectangle 33"/>
+            <p:cNvSpPr/>
+            <p:nvPr/>
+          </p:nvSpPr>
+          <p:spPr>
+            <a:xfrm>
+              <a:off x="1187624" y="2348880"/>
+              <a:ext cx="2016224" cy="2016224"/>
+            </a:xfrm>
+            <a:prstGeom prst="rect">
+              <a:avLst/>
+            </a:prstGeom>
+            <a:solidFill>
+              <a:schemeClr val="bg1"/>
+            </a:solidFill>
+            <a:ln>
+              <a:noFill/>
+            </a:ln>
+          </p:spPr>
+          <p:style>
+            <a:lnRef idx="2">
+              <a:schemeClr val="accent1">
+                <a:shade val="50000"/>
+              </a:schemeClr>
+            </a:lnRef>
+            <a:fillRef idx="1">
+              <a:schemeClr val="accent1"/>
+            </a:fillRef>
+            <a:effectRef idx="0">
+              <a:schemeClr val="accent1"/>
+            </a:effectRef>
+            <a:fontRef idx="minor">
+              <a:schemeClr val="lt1"/>
+            </a:fontRef>
+          </p:style>
+          <p:txBody>
+            <a:bodyPr rtlCol="0" anchor="ctr"/>
+            <a:lstStyle/>
+            <a:p>
+              <a:pPr algn="ctr"/>
+              <a:endParaRPr lang="fr-BE"/>
+            </a:p>
+          </p:txBody>
+        </p:sp>
+        <p:grpSp>
+          <p:nvGrpSpPr>
+            <p:cNvPr id="29" name="Groupe 28"/>
+            <p:cNvGrpSpPr/>
+            <p:nvPr/>
+          </p:nvGrpSpPr>
+          <p:grpSpPr>
+            <a:xfrm>
+              <a:off x="5733790" y="2091328"/>
+              <a:ext cx="3059597" cy="1737484"/>
+              <a:chOff x="2323036" y="481896"/>
+              <a:chExt cx="3059597" cy="1737484"/>
+            </a:xfrm>
+          </p:grpSpPr>
+          <p:pic>
+            <p:nvPicPr>
+              <p:cNvPr id="3077" name="Picture 5" descr="D:\blambeau\Work\ucl\thesis\writing\src\2-framework\images\simple-scenario.png"/>
+              <p:cNvPicPr>
+                <a:picLocks noChangeAspect="1" noChangeArrowheads="1"/>
+              </p:cNvPicPr>
+              <p:nvPr/>
+            </p:nvPicPr>
+            <p:blipFill>
+              <a:blip r:embed="rId3" cstate="print"/>
+              <a:srcRect/>
+              <a:stretch>
+                <a:fillRect/>
+              </a:stretch>
+            </p:blipFill>
+            <p:spPr bwMode="auto">
+              <a:xfrm>
+                <a:off x="2323036" y="874743"/>
+                <a:ext cx="2942666" cy="1344637"/>
+              </a:xfrm>
+              <a:prstGeom prst="rect">
+                <a:avLst/>
+              </a:prstGeom>
+              <a:noFill/>
+            </p:spPr>
+          </p:pic>
+          <p:sp>
+            <p:nvSpPr>
+              <p:cNvPr id="23" name="ZoneTexte 22"/>
+              <p:cNvSpPr txBox="1"/>
+              <p:nvPr/>
+            </p:nvSpPr>
+            <p:spPr>
+              <a:xfrm>
+                <a:off x="3681526" y="481896"/>
+                <a:ext cx="1701107" cy="369332"/>
+              </a:xfrm>
+              <a:prstGeom prst="rect">
+                <a:avLst/>
+              </a:prstGeom>
+              <a:noFill/>
+            </p:spPr>
+            <p:txBody>
+              <a:bodyPr wrap="none" rtlCol="0">
+                <a:spAutoFit/>
+              </a:bodyPr>
+              <a:lstStyle/>
+              <a:p>
+                <a:r>
+                  <a:rPr lang="fr-BE" smtClean="0"/>
+                  <a:t>Scenarios (MSC)</a:t>
+                </a:r>
                 <a:endParaRPr lang="fr-BE"/>
               </a:p>
             </p:txBody>
           </p:sp>
+        </p:grpSp>
+        <p:grpSp>
+          <p:nvGrpSpPr>
+            <p:cNvPr id="30" name="Groupe 29"/>
+            <p:cNvGrpSpPr/>
+            <p:nvPr/>
+          </p:nvGrpSpPr>
+          <p:grpSpPr>
+            <a:xfrm>
+              <a:off x="323528" y="2564904"/>
+              <a:ext cx="2877148" cy="1656184"/>
+              <a:chOff x="182684" y="2707179"/>
+              <a:chExt cx="2877148" cy="1656184"/>
+            </a:xfrm>
+          </p:grpSpPr>
+          <p:pic>
+            <p:nvPicPr>
+              <p:cNvPr id="3074" name="Picture 2" descr="D:\blambeau\Work\ucl\thesis\writing\src\2-framework\images\goal-graph.png"/>
+              <p:cNvPicPr>
+                <a:picLocks noChangeAspect="1" noChangeArrowheads="1"/>
+              </p:cNvPicPr>
+              <p:nvPr/>
+            </p:nvPicPr>
+            <p:blipFill>
+              <a:blip r:embed="rId4" cstate="print"/>
+              <a:srcRect/>
+              <a:stretch>
+                <a:fillRect/>
+              </a:stretch>
+            </p:blipFill>
+            <p:spPr bwMode="auto">
+              <a:xfrm>
+                <a:off x="1072282" y="2707179"/>
+                <a:ext cx="1987550" cy="1249363"/>
+              </a:xfrm>
+              <a:prstGeom prst="rect">
+                <a:avLst/>
+              </a:prstGeom>
+              <a:noFill/>
+            </p:spPr>
+          </p:pic>
           <p:sp>
             <p:nvSpPr>
-              <p:cNvPr id="37" name="Rectangle 36"/>
-              <p:cNvSpPr/>
+              <p:cNvPr id="24" name="ZoneTexte 23"/>
+              <p:cNvSpPr txBox="1"/>
               <p:nvPr/>
             </p:nvSpPr>
             <p:spPr>
               <a:xfrm>
-                <a:off x="2195736" y="4725144"/>
-                <a:ext cx="4104456" cy="1080120"/>
+                <a:off x="182684" y="3717032"/>
+                <a:ext cx="2531655" cy="646331"/>
               </a:xfrm>
               <a:prstGeom prst="rect">
                 <a:avLst/>
               </a:prstGeom>
-              <a:solidFill>
-                <a:schemeClr val="bg1">
-                  <a:alpha val="69000"/>
-                </a:schemeClr>
-              </a:solidFill>
-              <a:ln>
-                <a:noFill/>
-              </a:ln>
+              <a:noFill/>
             </p:spPr>
-            <p:style>
-              <a:lnRef idx="2">
-                <a:schemeClr val="accent1">
-                  <a:shade val="50000"/>
-                </a:schemeClr>
-              </a:lnRef>
-              <a:fillRef idx="1">
-                <a:schemeClr val="accent1"/>
-              </a:fillRef>
-              <a:effectRef idx="0">
-                <a:schemeClr val="accent1"/>
-              </a:effectRef>
-              <a:fontRef idx="minor">
-                <a:schemeClr val="lt1"/>
-              </a:fontRef>
-            </p:style>
             <p:txBody>
-              <a:bodyPr rtlCol="0" anchor="ctr"/>
+              <a:bodyPr wrap="none" rtlCol="0">
+                <a:spAutoFit/>
+              </a:bodyPr>
               <a:lstStyle/>
               <a:p>
-                <a:pPr algn="ctr"/>
+                <a:r>
+                  <a:rPr lang="fr-BE" smtClean="0"/>
+                  <a:t>Goals &amp; </a:t>
+                </a:r>
+                <a:br>
+                  <a:rPr lang="fr-BE" smtClean="0"/>
+                </a:br>
+                <a:r>
+                  <a:rPr lang="fr-BE" smtClean="0"/>
+                  <a:t>Domain </a:t>
+                </a:r>
+                <a:r>
+                  <a:rPr lang="fr-BE" smtClean="0"/>
+                  <a:t>Properties (FLTL)</a:t>
+                </a:r>
                 <a:endParaRPr lang="fr-BE"/>
               </a:p>
             </p:txBody>
           </p:sp>
-          <p:sp>
-            <p:nvSpPr>
-              <p:cNvPr id="36" name="Rectangle 35"/>
-              <p:cNvSpPr/>
-              <p:nvPr/>
-            </p:nvSpPr>
-            <p:spPr>
-              <a:xfrm>
-                <a:off x="5652120" y="2492896"/>
-                <a:ext cx="2736304" cy="1584176"/>
-              </a:xfrm>
-              <a:prstGeom prst="rect">
-                <a:avLst/>
-              </a:prstGeom>
-              <a:solidFill>
-                <a:schemeClr val="bg1">
-                  <a:alpha val="69000"/>
-                </a:schemeClr>
-              </a:solidFill>
-              <a:ln>
-                <a:noFill/>
-              </a:ln>
-            </p:spPr>
-            <p:style>
-              <a:lnRef idx="2">
-                <a:schemeClr val="accent1">
-                  <a:shade val="50000"/>
-                </a:schemeClr>
-              </a:lnRef>
-              <a:fillRef idx="1">
-                <a:schemeClr val="accent1"/>
-              </a:fillRef>
-              <a:effectRef idx="0">
-                <a:schemeClr val="accent1"/>
-              </a:effectRef>
-              <a:fontRef idx="minor">
-                <a:schemeClr val="lt1"/>
-              </a:fontRef>
-            </p:style>
-            <p:txBody>
-              <a:bodyPr rtlCol="0" anchor="ctr"/>
-              <a:lstStyle/>
-              <a:p>
-                <a:pPr algn="ctr"/>
-                <a:endParaRPr lang="fr-BE"/>
-              </a:p>
-            </p:txBody>
-          </p:sp>
+        </p:grpSp>
+        <p:grpSp>
+          <p:nvGrpSpPr>
+            <p:cNvPr id="32" name="Groupe 31"/>
+            <p:cNvGrpSpPr/>
+            <p:nvPr/>
+          </p:nvGrpSpPr>
+          <p:grpSpPr>
+            <a:xfrm>
+              <a:off x="2423550" y="173776"/>
+              <a:ext cx="4162583" cy="1311008"/>
+              <a:chOff x="1547664" y="4077072"/>
+              <a:chExt cx="4162583" cy="1311008"/>
+            </a:xfrm>
+          </p:grpSpPr>
           <p:grpSp>
             <p:nvGrpSpPr>
-              <p:cNvPr id="31" name="Groupe 30"/>
+              <p:cNvPr id="22" name="Groupe 21"/>
               <p:cNvGrpSpPr/>
               <p:nvPr/>
             </p:nvGrpSpPr>
             <p:grpSpPr>
               <a:xfrm>
-                <a:off x="5758785" y="1916832"/>
-                <a:ext cx="2773655" cy="2376264"/>
-                <a:chOff x="5254729" y="1772816"/>
-                <a:chExt cx="2773655" cy="2376264"/>
+                <a:off x="1547664" y="4509120"/>
+                <a:ext cx="3960440" cy="878960"/>
+                <a:chOff x="1458940" y="4653136"/>
+                <a:chExt cx="3960440" cy="878960"/>
               </a:xfrm>
             </p:grpSpPr>
             <p:pic>
               <p:nvPicPr>
-                <p:cNvPr id="2053" name="Picture 5" descr="D:\blambeau\Work\ucl\thesis\writing\src\2-framework\images\train-hmsc-single.png"/>
+                <p:cNvPr id="3078" name="Picture 6" descr="D:\blambeau\Work\ucl\thesis\writing\src\2-framework\images\controller.png"/>
                 <p:cNvPicPr>
                   <a:picLocks noChangeAspect="1" noChangeArrowheads="1"/>
                 </p:cNvPicPr>
                 <p:nvPr/>
               </p:nvPicPr>
               <p:blipFill>
-                <a:blip r:embed="rId2" cstate="print"/>
+                <a:blip r:embed="rId5" cstate="print"/>
                 <a:srcRect/>
                 <a:stretch>
                   <a:fillRect/>
@@ -12325,8 +12642,60 @@
               </p:blipFill>
               <p:spPr bwMode="auto">
                 <a:xfrm>
-                  <a:off x="5254729" y="2420888"/>
-                  <a:ext cx="2320972" cy="1728192"/>
+                  <a:off x="1458940" y="4653136"/>
+                  <a:ext cx="2658618" cy="859536"/>
+                </a:xfrm>
+                <a:prstGeom prst="rect">
+                  <a:avLst/>
+                </a:prstGeom>
+                <a:noFill/>
+              </p:spPr>
+            </p:pic>
+            <p:pic>
+              <p:nvPicPr>
+                <p:cNvPr id="3081" name="Picture 9" descr="D:\blambeau\Work\ucl\thesis\writing\src\2-framework\images\open-close.png"/>
+                <p:cNvPicPr>
+                  <a:picLocks noChangeAspect="1" noChangeArrowheads="1"/>
+                </p:cNvPicPr>
+                <p:nvPr/>
+              </p:nvPicPr>
+              <p:blipFill>
+                <a:blip r:embed="rId6" cstate="print"/>
+                <a:srcRect/>
+                <a:stretch>
+                  <a:fillRect/>
+                </a:stretch>
+              </p:blipFill>
+              <p:spPr bwMode="auto">
+                <a:xfrm>
+                  <a:off x="4589562" y="5157192"/>
+                  <a:ext cx="829818" cy="374904"/>
+                </a:xfrm>
+                <a:prstGeom prst="rect">
+                  <a:avLst/>
+                </a:prstGeom>
+                <a:noFill/>
+              </p:spPr>
+            </p:pic>
+            <p:pic>
+              <p:nvPicPr>
+                <p:cNvPr id="3082" name="Picture 10" descr="D:\blambeau\Work\ucl\thesis\writing\src\2-framework\images\start-stop-2.png"/>
+                <p:cNvPicPr>
+                  <a:picLocks noChangeAspect="1" noChangeArrowheads="1"/>
+                </p:cNvPicPr>
+                <p:nvPr/>
+              </p:nvPicPr>
+              <p:blipFill>
+                <a:blip r:embed="rId7" cstate="print"/>
+                <a:srcRect/>
+                <a:stretch>
+                  <a:fillRect/>
+                </a:stretch>
+              </p:blipFill>
+              <p:spPr bwMode="auto">
+                <a:xfrm>
+                  <a:off x="4604802" y="4684840"/>
+                  <a:ext cx="786384" cy="368046"/>
                 </a:xfrm>
                 <a:prstGeom prst="rect">
                   <a:avLst/>
@@ -12336,188 +12705,14 @@
             </p:pic>
             <p:sp>
               <p:nvSpPr>
-                <p:cNvPr id="26" name="ZoneTexte 25"/>
+                <p:cNvPr id="21" name="ZoneTexte 20"/>
                 <p:cNvSpPr txBox="1"/>
                 <p:nvPr/>
               </p:nvSpPr>
               <p:spPr>
                 <a:xfrm>
-                  <a:off x="5974745" y="1772816"/>
-                  <a:ext cx="2053639" cy="646331"/>
-                </a:xfrm>
-                <a:prstGeom prst="rect">
-                  <a:avLst/>
-                </a:prstGeom>
-                <a:noFill/>
-              </p:spPr>
-              <p:txBody>
-                <a:bodyPr wrap="none" rtlCol="0">
-                  <a:spAutoFit/>
-                </a:bodyPr>
-                <a:lstStyle/>
-                <a:p>
-                  <a:pPr algn="r"/>
-                  <a:r>
-                    <a:rPr lang="fr-BE" smtClean="0"/>
-                    <a:t>High-level scenarios</a:t>
-                  </a:r>
-                </a:p>
-                <a:p>
-                  <a:pPr algn="r"/>
-                  <a:r>
-                    <a:rPr lang="fr-BE" smtClean="0"/>
-                    <a:t>&amp; Task models</a:t>
-                  </a:r>
-                </a:p>
-              </p:txBody>
-            </p:sp>
-          </p:grpSp>
-          <p:sp>
-            <p:nvSpPr>
-              <p:cNvPr id="35" name="Rectangle 34"/>
-              <p:cNvSpPr/>
-              <p:nvPr/>
-            </p:nvSpPr>
-            <p:spPr>
-              <a:xfrm>
-                <a:off x="1187624" y="2708920"/>
-                <a:ext cx="2016224" cy="1368152"/>
-              </a:xfrm>
-              <a:prstGeom prst="rect">
-                <a:avLst/>
-              </a:prstGeom>
-              <a:solidFill>
-                <a:schemeClr val="bg1">
-                  <a:alpha val="69000"/>
-                </a:schemeClr>
-              </a:solidFill>
-              <a:ln>
-                <a:noFill/>
-              </a:ln>
-            </p:spPr>
-            <p:style>
-              <a:lnRef idx="2">
-                <a:schemeClr val="accent1">
-                  <a:shade val="50000"/>
-                </a:schemeClr>
-              </a:lnRef>
-              <a:fillRef idx="1">
-                <a:schemeClr val="accent1"/>
-              </a:fillRef>
-              <a:effectRef idx="0">
-                <a:schemeClr val="accent1"/>
-              </a:effectRef>
-              <a:fontRef idx="minor">
-                <a:schemeClr val="lt1"/>
-              </a:fontRef>
-            </p:style>
-            <p:txBody>
-              <a:bodyPr rtlCol="0" anchor="ctr"/>
-              <a:lstStyle/>
-              <a:p>
-                <a:pPr algn="ctr"/>
-                <a:endParaRPr lang="fr-BE"/>
-              </a:p>
-            </p:txBody>
-          </p:sp>
-          <p:sp>
-            <p:nvSpPr>
-              <p:cNvPr id="34" name="Rectangle 33"/>
-              <p:cNvSpPr/>
-              <p:nvPr/>
-            </p:nvSpPr>
-            <p:spPr>
-              <a:xfrm>
-                <a:off x="3203848" y="908720"/>
-                <a:ext cx="2736304" cy="1368152"/>
-              </a:xfrm>
-              <a:prstGeom prst="rect">
-                <a:avLst/>
-              </a:prstGeom>
-              <a:solidFill>
-                <a:schemeClr val="bg1">
-                  <a:alpha val="69000"/>
-                </a:schemeClr>
-              </a:solidFill>
-              <a:ln>
-                <a:noFill/>
-              </a:ln>
-            </p:spPr>
-            <p:style>
-              <a:lnRef idx="2">
-                <a:schemeClr val="accent1">
-                  <a:shade val="50000"/>
-                </a:schemeClr>
-              </a:lnRef>
-              <a:fillRef idx="1">
-                <a:schemeClr val="accent1"/>
-              </a:fillRef>
-              <a:effectRef idx="0">
-                <a:schemeClr val="accent1"/>
-              </a:effectRef>
-              <a:fontRef idx="minor">
-                <a:schemeClr val="lt1"/>
-              </a:fontRef>
-            </p:style>
-            <p:txBody>
-              <a:bodyPr rtlCol="0" anchor="ctr"/>
-              <a:lstStyle/>
-              <a:p>
-                <a:pPr algn="ctr"/>
-                <a:endParaRPr lang="fr-BE"/>
-              </a:p>
-            </p:txBody>
-          </p:sp>
-          <p:grpSp>
-            <p:nvGrpSpPr>
-              <p:cNvPr id="29" name="Groupe 28"/>
-              <p:cNvGrpSpPr/>
-              <p:nvPr/>
-            </p:nvGrpSpPr>
-            <p:grpSpPr>
-              <a:xfrm>
-                <a:off x="2699792" y="644203"/>
-                <a:ext cx="3213982" cy="1704677"/>
-                <a:chOff x="2051720" y="620688"/>
-                <a:chExt cx="3213982" cy="1704677"/>
-              </a:xfrm>
-            </p:grpSpPr>
-            <p:pic>
-              <p:nvPicPr>
-                <p:cNvPr id="3077" name="Picture 5" descr="D:\blambeau\Work\ucl\thesis\writing\src\2-framework\images\simple-scenario.png"/>
-                <p:cNvPicPr>
-                  <a:picLocks noChangeAspect="1" noChangeArrowheads="1"/>
-                </p:cNvPicPr>
-                <p:nvPr/>
-              </p:nvPicPr>
-              <p:blipFill>
-                <a:blip r:embed="rId3" cstate="print"/>
-                <a:srcRect/>
-                <a:stretch>
-                  <a:fillRect/>
-                </a:stretch>
-              </p:blipFill>
-              <p:spPr bwMode="auto">
-                <a:xfrm>
-                  <a:off x="2323036" y="980728"/>
-                  <a:ext cx="2942666" cy="1344637"/>
-                </a:xfrm>
-                <a:prstGeom prst="rect">
-                  <a:avLst/>
-                </a:prstGeom>
-                <a:noFill/>
-              </p:spPr>
-            </p:pic>
-            <p:sp>
-              <p:nvSpPr>
-                <p:cNvPr id="23" name="ZoneTexte 22"/>
-                <p:cNvSpPr txBox="1"/>
-                <p:nvPr/>
-              </p:nvSpPr>
-              <p:spPr>
-                <a:xfrm>
-                  <a:off x="2051720" y="620688"/>
-                  <a:ext cx="1080745" cy="369332"/>
+                  <a:off x="4164764" y="4868863"/>
+                  <a:ext cx="428322" cy="400110"/>
                 </a:xfrm>
                 <a:prstGeom prst="rect">
                   <a:avLst/>
@@ -12531,320 +12726,108 @@
                 <a:lstStyle/>
                 <a:p>
                   <a:r>
-                    <a:rPr lang="fr-BE" smtClean="0"/>
-                    <a:t>Scenarios</a:t>
+                    <a:rPr lang="fr-BE" sz="2000" b="1" smtClean="0"/>
+                    <a:t>||</a:t>
                   </a:r>
-                  <a:endParaRPr lang="fr-BE"/>
-                </a:p>
-              </p:txBody>
-            </p:sp>
-          </p:grpSp>
-          <p:grpSp>
-            <p:nvGrpSpPr>
-              <p:cNvPr id="30" name="Groupe 29"/>
-              <p:cNvGrpSpPr/>
-              <p:nvPr/>
-            </p:nvGrpSpPr>
-            <p:grpSpPr>
-              <a:xfrm>
-                <a:off x="251520" y="2780928"/>
-                <a:ext cx="2949156" cy="1584176"/>
-                <a:chOff x="110676" y="2780928"/>
-                <a:chExt cx="2949156" cy="1584176"/>
-              </a:xfrm>
-            </p:grpSpPr>
-            <p:pic>
-              <p:nvPicPr>
-                <p:cNvPr id="3074" name="Picture 2" descr="D:\blambeau\Work\ucl\thesis\writing\src\2-framework\images\goal-graph.png"/>
-                <p:cNvPicPr>
-                  <a:picLocks noChangeAspect="1" noChangeArrowheads="1"/>
-                </p:cNvPicPr>
-                <p:nvPr/>
-              </p:nvPicPr>
-              <p:blipFill>
-                <a:blip r:embed="rId4" cstate="print"/>
-                <a:srcRect/>
-                <a:stretch>
-                  <a:fillRect/>
-                </a:stretch>
-              </p:blipFill>
-              <p:spPr bwMode="auto">
-                <a:xfrm>
-                  <a:off x="1072282" y="2780928"/>
-                  <a:ext cx="1987550" cy="1249363"/>
-                </a:xfrm>
-                <a:prstGeom prst="rect">
-                  <a:avLst/>
-                </a:prstGeom>
-                <a:noFill/>
-              </p:spPr>
-            </p:pic>
-            <p:sp>
-              <p:nvSpPr>
-                <p:cNvPr id="24" name="ZoneTexte 23"/>
-                <p:cNvSpPr txBox="1"/>
-                <p:nvPr/>
-              </p:nvSpPr>
-              <p:spPr>
-                <a:xfrm>
-                  <a:off x="110676" y="3718773"/>
-                  <a:ext cx="1941044" cy="646331"/>
-                </a:xfrm>
-                <a:prstGeom prst="rect">
-                  <a:avLst/>
-                </a:prstGeom>
-                <a:noFill/>
-              </p:spPr>
-              <p:txBody>
-                <a:bodyPr wrap="none" rtlCol="0">
-                  <a:spAutoFit/>
-                </a:bodyPr>
-                <a:lstStyle/>
-                <a:p>
-                  <a:r>
-                    <a:rPr lang="fr-BE" smtClean="0"/>
-                    <a:t>Goals &amp; </a:t>
-                  </a:r>
-                  <a:br>
-                    <a:rPr lang="fr-BE" smtClean="0"/>
-                  </a:br>
-                  <a:r>
-                    <a:rPr lang="fr-BE" smtClean="0"/>
-                    <a:t>Domain Properties</a:t>
-                  </a:r>
-                  <a:endParaRPr lang="fr-BE"/>
-                </a:p>
-              </p:txBody>
-            </p:sp>
-          </p:grpSp>
-          <p:grpSp>
-            <p:nvGrpSpPr>
-              <p:cNvPr id="32" name="Groupe 31"/>
-              <p:cNvGrpSpPr/>
-              <p:nvPr/>
-            </p:nvGrpSpPr>
-            <p:grpSpPr>
-              <a:xfrm>
-                <a:off x="2267744" y="4797152"/>
-                <a:ext cx="4296900" cy="1377444"/>
-                <a:chOff x="1547664" y="4509120"/>
-                <a:chExt cx="4296900" cy="1377444"/>
-              </a:xfrm>
-            </p:grpSpPr>
-            <p:grpSp>
-              <p:nvGrpSpPr>
-                <p:cNvPr id="22" name="Groupe 21"/>
-                <p:cNvGrpSpPr/>
-                <p:nvPr/>
-              </p:nvGrpSpPr>
-              <p:grpSpPr>
-                <a:xfrm>
-                  <a:off x="1547664" y="4509120"/>
-                  <a:ext cx="3960440" cy="878960"/>
-                  <a:chOff x="1458940" y="4653136"/>
-                  <a:chExt cx="3960440" cy="878960"/>
-                </a:xfrm>
-              </p:grpSpPr>
-              <p:pic>
-                <p:nvPicPr>
-                  <p:cNvPr id="3078" name="Picture 6" descr="D:\blambeau\Work\ucl\thesis\writing\src\2-framework\images\controller.png"/>
-                  <p:cNvPicPr>
-                    <a:picLocks noChangeAspect="1" noChangeArrowheads="1"/>
-                  </p:cNvPicPr>
-                  <p:nvPr/>
-                </p:nvPicPr>
-                <p:blipFill>
-                  <a:blip r:embed="rId5" cstate="print"/>
-                  <a:srcRect/>
-                  <a:stretch>
-                    <a:fillRect/>
-                  </a:stretch>
-                </p:blipFill>
-                <p:spPr bwMode="auto">
-                  <a:xfrm>
-                    <a:off x="1458940" y="4653136"/>
-                    <a:ext cx="2658618" cy="859536"/>
-                  </a:xfrm>
-                  <a:prstGeom prst="rect">
-                    <a:avLst/>
-                  </a:prstGeom>
-                  <a:noFill/>
-                </p:spPr>
-              </p:pic>
-              <p:pic>
-                <p:nvPicPr>
-                  <p:cNvPr id="3081" name="Picture 9" descr="D:\blambeau\Work\ucl\thesis\writing\src\2-framework\images\open-close.png"/>
-                  <p:cNvPicPr>
-                    <a:picLocks noChangeAspect="1" noChangeArrowheads="1"/>
-                  </p:cNvPicPr>
-                  <p:nvPr/>
-                </p:nvPicPr>
-                <p:blipFill>
-                  <a:blip r:embed="rId6" cstate="print"/>
-                  <a:srcRect/>
-                  <a:stretch>
-                    <a:fillRect/>
-                  </a:stretch>
-                </p:blipFill>
-                <p:spPr bwMode="auto">
-                  <a:xfrm>
-                    <a:off x="4589562" y="5157192"/>
-                    <a:ext cx="829818" cy="374904"/>
-                  </a:xfrm>
-                  <a:prstGeom prst="rect">
-                    <a:avLst/>
-                  </a:prstGeom>
-                  <a:noFill/>
-                </p:spPr>
-              </p:pic>
-              <p:pic>
-                <p:nvPicPr>
-                  <p:cNvPr id="3082" name="Picture 10" descr="D:\blambeau\Work\ucl\thesis\writing\src\2-framework\images\start-stop-2.png"/>
-                  <p:cNvPicPr>
-                    <a:picLocks noChangeAspect="1" noChangeArrowheads="1"/>
-                  </p:cNvPicPr>
-                  <p:nvPr/>
-                </p:nvPicPr>
-                <p:blipFill>
-                  <a:blip r:embed="rId7" cstate="print"/>
-                  <a:srcRect/>
-                  <a:stretch>
-                    <a:fillRect/>
-                  </a:stretch>
-                </p:blipFill>
-                <p:spPr bwMode="auto">
-                  <a:xfrm>
-                    <a:off x="4604802" y="4684840"/>
-                    <a:ext cx="786384" cy="368046"/>
-                  </a:xfrm>
-                  <a:prstGeom prst="rect">
-                    <a:avLst/>
-                  </a:prstGeom>
-                  <a:noFill/>
-                </p:spPr>
-              </p:pic>
-              <p:sp>
-                <p:nvSpPr>
-                  <p:cNvPr id="21" name="ZoneTexte 20"/>
-                  <p:cNvSpPr txBox="1"/>
-                  <p:nvPr/>
-                </p:nvSpPr>
-                <p:spPr>
-                  <a:xfrm>
-                    <a:off x="4164764" y="4868863"/>
-                    <a:ext cx="428322" cy="400110"/>
-                  </a:xfrm>
-                  <a:prstGeom prst="rect">
-                    <a:avLst/>
-                  </a:prstGeom>
-                  <a:noFill/>
-                </p:spPr>
-                <p:txBody>
-                  <a:bodyPr wrap="none" rtlCol="0">
-                    <a:spAutoFit/>
-                  </a:bodyPr>
-                  <a:lstStyle/>
-                  <a:p>
-                    <a:r>
-                      <a:rPr lang="fr-BE" sz="2000" b="1" smtClean="0"/>
-                      <a:t>||</a:t>
-                    </a:r>
-                    <a:endParaRPr lang="fr-BE" sz="2000" b="1"/>
-                  </a:p>
-                </p:txBody>
-              </p:sp>
-            </p:grpSp>
-            <p:sp>
-              <p:nvSpPr>
-                <p:cNvPr id="25" name="ZoneTexte 24"/>
-                <p:cNvSpPr txBox="1"/>
-                <p:nvPr/>
-              </p:nvSpPr>
-              <p:spPr>
-                <a:xfrm>
-                  <a:off x="2699792" y="5517232"/>
-                  <a:ext cx="3144772" cy="369332"/>
-                </a:xfrm>
-                <a:prstGeom prst="rect">
-                  <a:avLst/>
-                </a:prstGeom>
-                <a:noFill/>
-              </p:spPr>
-              <p:txBody>
-                <a:bodyPr wrap="none" rtlCol="0">
-                  <a:spAutoFit/>
-                </a:bodyPr>
-                <a:lstStyle/>
-                <a:p>
-                  <a:r>
-                    <a:rPr lang="fr-BE" smtClean="0"/>
-                    <a:t>Agent &amp; System State machines</a:t>
-                  </a:r>
-                  <a:endParaRPr lang="fr-BE"/>
+                  <a:endParaRPr lang="fr-BE" sz="2000" b="1"/>
                 </a:p>
               </p:txBody>
             </p:sp>
           </p:grpSp>
           <p:sp>
             <p:nvSpPr>
-              <p:cNvPr id="28" name="Nuage 27"/>
-              <p:cNvSpPr/>
+              <p:cNvPr id="25" name="ZoneTexte 24"/>
+              <p:cNvSpPr txBox="1"/>
               <p:nvPr/>
             </p:nvSpPr>
             <p:spPr>
               <a:xfrm>
-                <a:off x="3419872" y="3212976"/>
-                <a:ext cx="2160240" cy="792088"/>
+                <a:off x="3021754" y="4077072"/>
+                <a:ext cx="2688493" cy="369332"/>
               </a:xfrm>
-              <a:prstGeom prst="cloud">
+              <a:prstGeom prst="rect">
                 <a:avLst/>
               </a:prstGeom>
+              <a:noFill/>
             </p:spPr>
-            <p:style>
-              <a:lnRef idx="2">
-                <a:schemeClr val="dk1"/>
-              </a:lnRef>
-              <a:fillRef idx="1">
-                <a:schemeClr val="lt1"/>
-              </a:fillRef>
-              <a:effectRef idx="0">
-                <a:schemeClr val="dk1"/>
-              </a:effectRef>
-              <a:fontRef idx="minor">
-                <a:schemeClr val="dk1"/>
-              </a:fontRef>
-            </p:style>
             <p:txBody>
-              <a:bodyPr wrap="none" tIns="108000" rtlCol="0" anchor="ctr" anchorCtr="1"/>
+              <a:bodyPr wrap="none" rtlCol="0">
+                <a:spAutoFit/>
+              </a:bodyPr>
               <a:lstStyle/>
               <a:p>
-                <a:pPr algn="ctr"/>
                 <a:r>
-                  <a:rPr lang="fr-BE" sz="1600" smtClean="0"/>
-                  <a:t>        Event traces (LTS) </a:t>
+                  <a:rPr lang="fr-BE" smtClean="0"/>
+                  <a:t>Agent state machines (LTS)</a:t>
                 </a:r>
-                <a:br>
-                  <a:rPr lang="fr-BE" sz="1600" smtClean="0"/>
-                </a:br>
-                <a:r>
-                  <a:rPr lang="fr-BE" sz="1600" smtClean="0"/>
-                  <a:t>+ Fluents</a:t>
-                </a:r>
-                <a:endParaRPr lang="fr-BE" sz="1600"/>
+                <a:endParaRPr lang="fr-BE"/>
               </a:p>
             </p:txBody>
           </p:sp>
         </p:grpSp>
         <p:sp>
           <p:nvSpPr>
+            <p:cNvPr id="28" name="Nuage 27"/>
+            <p:cNvSpPr/>
+            <p:nvPr/>
+          </p:nvSpPr>
+          <p:spPr>
+            <a:xfrm>
+              <a:off x="3347864" y="2996952"/>
+              <a:ext cx="2304256" cy="792088"/>
+            </a:xfrm>
+            <a:prstGeom prst="cloud">
+              <a:avLst/>
+            </a:prstGeom>
+          </p:spPr>
+          <p:style>
+            <a:lnRef idx="2">
+              <a:schemeClr val="dk1"/>
+            </a:lnRef>
+            <a:fillRef idx="1">
+              <a:schemeClr val="lt1"/>
+            </a:fillRef>
+            <a:effectRef idx="0">
+              <a:schemeClr val="dk1"/>
+            </a:effectRef>
+            <a:fontRef idx="minor">
+              <a:schemeClr val="dk1"/>
+            </a:fontRef>
+          </p:style>
+          <p:txBody>
+            <a:bodyPr wrap="none" tIns="108000" rtlCol="0" anchor="ctr" anchorCtr="1"/>
+            <a:lstStyle/>
+            <a:p>
+              <a:pPr algn="ctr"/>
+              <a:r>
+                <a:rPr lang="fr-BE" sz="1600" smtClean="0"/>
+                <a:t>       Trace semantics </a:t>
+              </a:r>
+              <a:r>
+                <a:rPr lang="fr-BE" sz="1600" smtClean="0"/>
+                <a:t>(LTS) </a:t>
+              </a:r>
+              <a:br>
+                <a:rPr lang="fr-BE" sz="1600" smtClean="0"/>
+              </a:br>
+              <a:r>
+                <a:rPr lang="fr-BE" sz="1600" smtClean="0"/>
+                <a:t>+ Fluents</a:t>
+              </a:r>
+              <a:endParaRPr lang="fr-BE" sz="1600"/>
+            </a:p>
+          </p:txBody>
+        </p:sp>
+        <p:sp>
+          <p:nvSpPr>
             <p:cNvPr id="39" name="Forme libre 38"/>
             <p:cNvSpPr/>
             <p:nvPr/>
           </p:nvSpPr>
           <p:spPr>
             <a:xfrm>
-              <a:off x="4427220" y="2286000"/>
-              <a:ext cx="243840" cy="762000"/>
+              <a:off x="4427220" y="1628800"/>
+              <a:ext cx="243840" cy="1224136"/>
             </a:xfrm>
             <a:custGeom>
               <a:avLst/>
@@ -12925,7 +12908,7 @@
           </p:nvSpPr>
           <p:spPr>
             <a:xfrm>
-              <a:off x="3055620" y="2933700"/>
+              <a:off x="3055620" y="2717676"/>
               <a:ext cx="655320" cy="274320"/>
             </a:xfrm>
             <a:custGeom>
@@ -13007,7 +12990,7 @@
           </p:nvSpPr>
           <p:spPr>
             <a:xfrm>
-              <a:off x="5280660" y="3962400"/>
+              <a:off x="5280660" y="3746376"/>
               <a:ext cx="914400" cy="229870"/>
             </a:xfrm>
             <a:custGeom>
@@ -13089,8 +13072,8 @@
           </p:nvSpPr>
           <p:spPr>
             <a:xfrm>
-              <a:off x="4212590" y="4152900"/>
-              <a:ext cx="306070" cy="678180"/>
+              <a:off x="4212590" y="3933056"/>
+              <a:ext cx="306070" cy="682000"/>
             </a:xfrm>
             <a:custGeom>
               <a:avLst/>
@@ -13171,8 +13154,8 @@
           </p:nvSpPr>
           <p:spPr>
             <a:xfrm>
-              <a:off x="4011045" y="2500516"/>
-              <a:ext cx="1139543" cy="276999"/>
+              <a:off x="3656785" y="1938898"/>
+              <a:ext cx="1830436" cy="553998"/>
             </a:xfrm>
             <a:prstGeom prst="rect">
               <a:avLst/>
@@ -13187,9 +13170,17 @@
             </a:bodyPr>
             <a:lstStyle/>
             <a:p>
+              <a:pPr algn="ctr"/>
               <a:r>
                 <a:rPr lang="fr-BE" b="1" i="1" smtClean="0"/>
-                <a:t>semantics</a:t>
+                <a:t>Semantics-driven</a:t>
+              </a:r>
+              <a:br>
+                <a:rPr lang="fr-BE" b="1" i="1" smtClean="0"/>
+              </a:br>
+              <a:r>
+                <a:rPr lang="fr-BE" b="1" i="1" smtClean="0"/>
+                <a:t>model synthesis</a:t>
               </a:r>
               <a:endParaRPr lang="fr-BE" b="1" i="1"/>
             </a:p>
@@ -13203,8 +13194,8 @@
           </p:nvSpPr>
           <p:spPr>
             <a:xfrm>
-              <a:off x="6876256" y="4891226"/>
-              <a:ext cx="1304203" cy="553998"/>
+              <a:off x="6876256" y="4675202"/>
+              <a:ext cx="1872436" cy="553998"/>
             </a:xfrm>
             <a:prstGeom prst="rect">
               <a:avLst/>
@@ -13219,15 +13210,18 @@
             </a:bodyPr>
             <a:lstStyle/>
             <a:p>
+              <a:pPr algn="ctr"/>
               <a:r>
                 <a:rPr lang="fr-BE" b="1" i="1" smtClean="0"/>
-                <a:t>inter-model</a:t>
+                <a:t>Multi-view model</a:t>
               </a:r>
+              <a:endParaRPr lang="fr-BE" b="1" i="1" smtClean="0"/>
             </a:p>
             <a:p>
+              <a:pPr algn="ctr"/>
               <a:r>
                 <a:rPr lang="fr-BE" b="1" i="1" smtClean="0"/>
-                <a:t>consistency</a:t>
+                <a:t>synthesis</a:t>
               </a:r>
               <a:endParaRPr lang="fr-BE" b="1" i="1"/>
             </a:p>
@@ -13241,7 +13235,7 @@
           </p:nvSpPr>
           <p:spPr>
             <a:xfrm>
-              <a:off x="6515100" y="4587240"/>
+              <a:off x="6515100" y="4371216"/>
               <a:ext cx="861060" cy="327660"/>
             </a:xfrm>
             <a:custGeom>

</xml_diff>

<commit_message>
Added lot of images for chapter 4
</commit_message>
<xml_diff>
--- a/writing/images/train.pptx
+++ b/writing/images/train.pptx
@@ -4,6 +4,9 @@
   <p:sldMasterIdLst>
     <p:sldMasterId id="2147483648" r:id="rId1"/>
   </p:sldMasterIdLst>
+  <p:notesMasterIdLst>
+    <p:notesMasterId r:id="rId9"/>
+  </p:notesMasterIdLst>
   <p:sldIdLst>
     <p:sldId id="256" r:id="rId2"/>
     <p:sldId id="257" r:id="rId3"/>
@@ -11,6 +14,7 @@
     <p:sldId id="259" r:id="rId5"/>
     <p:sldId id="260" r:id="rId6"/>
     <p:sldId id="261" r:id="rId7"/>
+    <p:sldId id="262" r:id="rId8"/>
   </p:sldIdLst>
   <p:sldSz cx="9144000" cy="6858000" type="screen4x3"/>
   <p:notesSz cx="6858000" cy="9144000"/>
@@ -110,6 +114,434 @@
     </a:lvl9pPr>
   </p:defaultTextStyle>
 </p:presentation>
+</file>
+
+<file path=ppt/notesMasters/notesMaster1.xml><?xml version="1.0" encoding="utf-8"?>
+<p:notesMaster xmlns:a="http://schemas.openxmlformats.org/drawingml/2006/main" xmlns:r="http://schemas.openxmlformats.org/officeDocument/2006/relationships" xmlns:p="http://schemas.openxmlformats.org/presentationml/2006/main">
+  <p:cSld>
+    <p:bg>
+      <p:bgRef idx="1001">
+        <a:schemeClr val="bg1"/>
+      </p:bgRef>
+    </p:bg>
+    <p:spTree>
+      <p:nvGrpSpPr>
+        <p:cNvPr id="1" name=""/>
+        <p:cNvGrpSpPr/>
+        <p:nvPr/>
+      </p:nvGrpSpPr>
+      <p:grpSpPr>
+        <a:xfrm>
+          <a:off x="0" y="0"/>
+          <a:ext cx="0" cy="0"/>
+          <a:chOff x="0" y="0"/>
+          <a:chExt cx="0" cy="0"/>
+        </a:xfrm>
+      </p:grpSpPr>
+      <p:sp>
+        <p:nvSpPr>
+          <p:cNvPr id="2" name="Espace réservé de l'en-tête 1"/>
+          <p:cNvSpPr>
+            <a:spLocks noGrp="1"/>
+          </p:cNvSpPr>
+          <p:nvPr>
+            <p:ph type="hdr" sz="quarter"/>
+          </p:nvPr>
+        </p:nvSpPr>
+        <p:spPr>
+          <a:xfrm>
+            <a:off x="0" y="0"/>
+            <a:ext cx="2971800" cy="457200"/>
+          </a:xfrm>
+          <a:prstGeom prst="rect">
+            <a:avLst/>
+          </a:prstGeom>
+        </p:spPr>
+        <p:txBody>
+          <a:bodyPr vert="horz" lIns="91440" tIns="45720" rIns="91440" bIns="45720" rtlCol="0"/>
+          <a:lstStyle>
+            <a:lvl1pPr algn="l">
+              <a:defRPr sz="1200"/>
+            </a:lvl1pPr>
+          </a:lstStyle>
+          <a:p>
+            <a:endParaRPr lang="fr-BE"/>
+          </a:p>
+        </p:txBody>
+      </p:sp>
+      <p:sp>
+        <p:nvSpPr>
+          <p:cNvPr id="3" name="Espace réservé de la date 2"/>
+          <p:cNvSpPr>
+            <a:spLocks noGrp="1"/>
+          </p:cNvSpPr>
+          <p:nvPr>
+            <p:ph type="dt" idx="1"/>
+          </p:nvPr>
+        </p:nvSpPr>
+        <p:spPr>
+          <a:xfrm>
+            <a:off x="3884613" y="0"/>
+            <a:ext cx="2971800" cy="457200"/>
+          </a:xfrm>
+          <a:prstGeom prst="rect">
+            <a:avLst/>
+          </a:prstGeom>
+        </p:spPr>
+        <p:txBody>
+          <a:bodyPr vert="horz" lIns="91440" tIns="45720" rIns="91440" bIns="45720" rtlCol="0"/>
+          <a:lstStyle>
+            <a:lvl1pPr algn="r">
+              <a:defRPr sz="1200"/>
+            </a:lvl1pPr>
+          </a:lstStyle>
+          <a:p>
+            <a:fld id="{1A5CA47D-05BA-47C5-ACE1-040A60204EDF}" type="datetimeFigureOut">
+              <a:rPr lang="fr-FR" smtClean="0"/>
+              <a:t>28/06/2011</a:t>
+            </a:fld>
+            <a:endParaRPr lang="fr-BE"/>
+          </a:p>
+        </p:txBody>
+      </p:sp>
+      <p:sp>
+        <p:nvSpPr>
+          <p:cNvPr id="4" name="Espace réservé de l'image des diapositives 3"/>
+          <p:cNvSpPr>
+            <a:spLocks noGrp="1" noRot="1" noChangeAspect="1"/>
+          </p:cNvSpPr>
+          <p:nvPr>
+            <p:ph type="sldImg" idx="2"/>
+          </p:nvPr>
+        </p:nvSpPr>
+        <p:spPr>
+          <a:xfrm>
+            <a:off x="1143000" y="685800"/>
+            <a:ext cx="4572000" cy="3429000"/>
+          </a:xfrm>
+          <a:prstGeom prst="rect">
+            <a:avLst/>
+          </a:prstGeom>
+          <a:noFill/>
+          <a:ln w="12700">
+            <a:solidFill>
+              <a:prstClr val="black"/>
+            </a:solidFill>
+          </a:ln>
+        </p:spPr>
+        <p:txBody>
+          <a:bodyPr vert="horz" lIns="91440" tIns="45720" rIns="91440" bIns="45720" rtlCol="0" anchor="ctr"/>
+          <a:lstStyle/>
+          <a:p>
+            <a:endParaRPr lang="fr-BE"/>
+          </a:p>
+        </p:txBody>
+      </p:sp>
+      <p:sp>
+        <p:nvSpPr>
+          <p:cNvPr id="5" name="Espace réservé des commentaires 4"/>
+          <p:cNvSpPr>
+            <a:spLocks noGrp="1"/>
+          </p:cNvSpPr>
+          <p:nvPr>
+            <p:ph type="body" sz="quarter" idx="3"/>
+          </p:nvPr>
+        </p:nvSpPr>
+        <p:spPr>
+          <a:xfrm>
+            <a:off x="685800" y="4343400"/>
+            <a:ext cx="5486400" cy="4114800"/>
+          </a:xfrm>
+          <a:prstGeom prst="rect">
+            <a:avLst/>
+          </a:prstGeom>
+        </p:spPr>
+        <p:txBody>
+          <a:bodyPr vert="horz" lIns="91440" tIns="45720" rIns="91440" bIns="45720" rtlCol="0">
+            <a:normAutofit/>
+          </a:bodyPr>
+          <a:lstStyle/>
+          <a:p>
+            <a:pPr lvl="0"/>
+            <a:r>
+              <a:rPr lang="fr-FR" smtClean="0"/>
+              <a:t>Cliquez pour modifier les styles du texte du masque</a:t>
+            </a:r>
+          </a:p>
+          <a:p>
+            <a:pPr lvl="1"/>
+            <a:r>
+              <a:rPr lang="fr-FR" smtClean="0"/>
+              <a:t>Deuxième niveau</a:t>
+            </a:r>
+          </a:p>
+          <a:p>
+            <a:pPr lvl="2"/>
+            <a:r>
+              <a:rPr lang="fr-FR" smtClean="0"/>
+              <a:t>Troisième niveau</a:t>
+            </a:r>
+          </a:p>
+          <a:p>
+            <a:pPr lvl="3"/>
+            <a:r>
+              <a:rPr lang="fr-FR" smtClean="0"/>
+              <a:t>Quatrième niveau</a:t>
+            </a:r>
+          </a:p>
+          <a:p>
+            <a:pPr lvl="4"/>
+            <a:r>
+              <a:rPr lang="fr-FR" smtClean="0"/>
+              <a:t>Cinquième niveau</a:t>
+            </a:r>
+            <a:endParaRPr lang="fr-BE"/>
+          </a:p>
+        </p:txBody>
+      </p:sp>
+      <p:sp>
+        <p:nvSpPr>
+          <p:cNvPr id="6" name="Espace réservé du pied de page 5"/>
+          <p:cNvSpPr>
+            <a:spLocks noGrp="1"/>
+          </p:cNvSpPr>
+          <p:nvPr>
+            <p:ph type="ftr" sz="quarter" idx="4"/>
+          </p:nvPr>
+        </p:nvSpPr>
+        <p:spPr>
+          <a:xfrm>
+            <a:off x="0" y="8685213"/>
+            <a:ext cx="2971800" cy="457200"/>
+          </a:xfrm>
+          <a:prstGeom prst="rect">
+            <a:avLst/>
+          </a:prstGeom>
+        </p:spPr>
+        <p:txBody>
+          <a:bodyPr vert="horz" lIns="91440" tIns="45720" rIns="91440" bIns="45720" rtlCol="0" anchor="b"/>
+          <a:lstStyle>
+            <a:lvl1pPr algn="l">
+              <a:defRPr sz="1200"/>
+            </a:lvl1pPr>
+          </a:lstStyle>
+          <a:p>
+            <a:endParaRPr lang="fr-BE"/>
+          </a:p>
+        </p:txBody>
+      </p:sp>
+      <p:sp>
+        <p:nvSpPr>
+          <p:cNvPr id="7" name="Espace réservé du numéro de diapositive 6"/>
+          <p:cNvSpPr>
+            <a:spLocks noGrp="1"/>
+          </p:cNvSpPr>
+          <p:nvPr>
+            <p:ph type="sldNum" sz="quarter" idx="5"/>
+          </p:nvPr>
+        </p:nvSpPr>
+        <p:spPr>
+          <a:xfrm>
+            <a:off x="3884613" y="8685213"/>
+            <a:ext cx="2971800" cy="457200"/>
+          </a:xfrm>
+          <a:prstGeom prst="rect">
+            <a:avLst/>
+          </a:prstGeom>
+        </p:spPr>
+        <p:txBody>
+          <a:bodyPr vert="horz" lIns="91440" tIns="45720" rIns="91440" bIns="45720" rtlCol="0" anchor="b"/>
+          <a:lstStyle>
+            <a:lvl1pPr algn="r">
+              <a:defRPr sz="1200"/>
+            </a:lvl1pPr>
+          </a:lstStyle>
+          <a:p>
+            <a:fld id="{09EA9A28-56FF-4105-ABFC-73B3B1163A97}" type="slidenum">
+              <a:rPr lang="fr-BE" smtClean="0"/>
+              <a:t>‹N°›</a:t>
+            </a:fld>
+            <a:endParaRPr lang="fr-BE"/>
+          </a:p>
+        </p:txBody>
+      </p:sp>
+    </p:spTree>
+  </p:cSld>
+  <p:clrMap bg1="lt1" tx1="dk1" bg2="lt2" tx2="dk2" accent1="accent1" accent2="accent2" accent3="accent3" accent4="accent4" accent5="accent5" accent6="accent6" hlink="hlink" folHlink="folHlink"/>
+  <p:notesStyle>
+    <a:lvl1pPr marL="0" algn="l" defTabSz="914400" rtl="0" eaLnBrk="1" latinLnBrk="0" hangingPunct="1">
+      <a:defRPr sz="1200" kern="1200">
+        <a:solidFill>
+          <a:schemeClr val="tx1"/>
+        </a:solidFill>
+        <a:latin typeface="+mn-lt"/>
+        <a:ea typeface="+mn-ea"/>
+        <a:cs typeface="+mn-cs"/>
+      </a:defRPr>
+    </a:lvl1pPr>
+    <a:lvl2pPr marL="457200" algn="l" defTabSz="914400" rtl="0" eaLnBrk="1" latinLnBrk="0" hangingPunct="1">
+      <a:defRPr sz="1200" kern="1200">
+        <a:solidFill>
+          <a:schemeClr val="tx1"/>
+        </a:solidFill>
+        <a:latin typeface="+mn-lt"/>
+        <a:ea typeface="+mn-ea"/>
+        <a:cs typeface="+mn-cs"/>
+      </a:defRPr>
+    </a:lvl2pPr>
+    <a:lvl3pPr marL="914400" algn="l" defTabSz="914400" rtl="0" eaLnBrk="1" latinLnBrk="0" hangingPunct="1">
+      <a:defRPr sz="1200" kern="1200">
+        <a:solidFill>
+          <a:schemeClr val="tx1"/>
+        </a:solidFill>
+        <a:latin typeface="+mn-lt"/>
+        <a:ea typeface="+mn-ea"/>
+        <a:cs typeface="+mn-cs"/>
+      </a:defRPr>
+    </a:lvl3pPr>
+    <a:lvl4pPr marL="1371600" algn="l" defTabSz="914400" rtl="0" eaLnBrk="1" latinLnBrk="0" hangingPunct="1">
+      <a:defRPr sz="1200" kern="1200">
+        <a:solidFill>
+          <a:schemeClr val="tx1"/>
+        </a:solidFill>
+        <a:latin typeface="+mn-lt"/>
+        <a:ea typeface="+mn-ea"/>
+        <a:cs typeface="+mn-cs"/>
+      </a:defRPr>
+    </a:lvl4pPr>
+    <a:lvl5pPr marL="1828800" algn="l" defTabSz="914400" rtl="0" eaLnBrk="1" latinLnBrk="0" hangingPunct="1">
+      <a:defRPr sz="1200" kern="1200">
+        <a:solidFill>
+          <a:schemeClr val="tx1"/>
+        </a:solidFill>
+        <a:latin typeface="+mn-lt"/>
+        <a:ea typeface="+mn-ea"/>
+        <a:cs typeface="+mn-cs"/>
+      </a:defRPr>
+    </a:lvl5pPr>
+    <a:lvl6pPr marL="2286000" algn="l" defTabSz="914400" rtl="0" eaLnBrk="1" latinLnBrk="0" hangingPunct="1">
+      <a:defRPr sz="1200" kern="1200">
+        <a:solidFill>
+          <a:schemeClr val="tx1"/>
+        </a:solidFill>
+        <a:latin typeface="+mn-lt"/>
+        <a:ea typeface="+mn-ea"/>
+        <a:cs typeface="+mn-cs"/>
+      </a:defRPr>
+    </a:lvl6pPr>
+    <a:lvl7pPr marL="2743200" algn="l" defTabSz="914400" rtl="0" eaLnBrk="1" latinLnBrk="0" hangingPunct="1">
+      <a:defRPr sz="1200" kern="1200">
+        <a:solidFill>
+          <a:schemeClr val="tx1"/>
+        </a:solidFill>
+        <a:latin typeface="+mn-lt"/>
+        <a:ea typeface="+mn-ea"/>
+        <a:cs typeface="+mn-cs"/>
+      </a:defRPr>
+    </a:lvl7pPr>
+    <a:lvl8pPr marL="3200400" algn="l" defTabSz="914400" rtl="0" eaLnBrk="1" latinLnBrk="0" hangingPunct="1">
+      <a:defRPr sz="1200" kern="1200">
+        <a:solidFill>
+          <a:schemeClr val="tx1"/>
+        </a:solidFill>
+        <a:latin typeface="+mn-lt"/>
+        <a:ea typeface="+mn-ea"/>
+        <a:cs typeface="+mn-cs"/>
+      </a:defRPr>
+    </a:lvl8pPr>
+    <a:lvl9pPr marL="3657600" algn="l" defTabSz="914400" rtl="0" eaLnBrk="1" latinLnBrk="0" hangingPunct="1">
+      <a:defRPr sz="1200" kern="1200">
+        <a:solidFill>
+          <a:schemeClr val="tx1"/>
+        </a:solidFill>
+        <a:latin typeface="+mn-lt"/>
+        <a:ea typeface="+mn-ea"/>
+        <a:cs typeface="+mn-cs"/>
+      </a:defRPr>
+    </a:lvl9pPr>
+  </p:notesStyle>
+</p:notesMaster>
+</file>
+
+<file path=ppt/notesSlides/notesSlide1.xml><?xml version="1.0" encoding="utf-8"?>
+<p:notes xmlns:a="http://schemas.openxmlformats.org/drawingml/2006/main" xmlns:r="http://schemas.openxmlformats.org/officeDocument/2006/relationships" xmlns:p="http://schemas.openxmlformats.org/presentationml/2006/main">
+  <p:cSld>
+    <p:spTree>
+      <p:nvGrpSpPr>
+        <p:cNvPr id="1" name=""/>
+        <p:cNvGrpSpPr/>
+        <p:nvPr/>
+      </p:nvGrpSpPr>
+      <p:grpSpPr>
+        <a:xfrm>
+          <a:off x="0" y="0"/>
+          <a:ext cx="0" cy="0"/>
+          <a:chOff x="0" y="0"/>
+          <a:chExt cx="0" cy="0"/>
+        </a:xfrm>
+      </p:grpSpPr>
+      <p:sp>
+        <p:nvSpPr>
+          <p:cNvPr id="2" name="Espace réservé de l'image des diapositives 1"/>
+          <p:cNvSpPr>
+            <a:spLocks noGrp="1" noRot="1" noChangeAspect="1"/>
+          </p:cNvSpPr>
+          <p:nvPr>
+            <p:ph type="sldImg"/>
+          </p:nvPr>
+        </p:nvSpPr>
+        <p:spPr/>
+      </p:sp>
+      <p:sp>
+        <p:nvSpPr>
+          <p:cNvPr id="3" name="Espace réservé des commentaires 2"/>
+          <p:cNvSpPr>
+            <a:spLocks noGrp="1"/>
+          </p:cNvSpPr>
+          <p:nvPr>
+            <p:ph type="body" idx="1"/>
+          </p:nvPr>
+        </p:nvSpPr>
+        <p:spPr/>
+        <p:txBody>
+          <a:bodyPr>
+            <a:normAutofit/>
+          </a:bodyPr>
+          <a:lstStyle/>
+          <a:p>
+            <a:endParaRPr lang="fr-BE" dirty="0"/>
+          </a:p>
+        </p:txBody>
+      </p:sp>
+      <p:sp>
+        <p:nvSpPr>
+          <p:cNvPr id="4" name="Espace réservé du numéro de diapositive 3"/>
+          <p:cNvSpPr>
+            <a:spLocks noGrp="1"/>
+          </p:cNvSpPr>
+          <p:nvPr>
+            <p:ph type="sldNum" sz="quarter" idx="10"/>
+          </p:nvPr>
+        </p:nvSpPr>
+        <p:spPr/>
+        <p:txBody>
+          <a:bodyPr/>
+          <a:lstStyle/>
+          <a:p>
+            <a:fld id="{09EA9A28-56FF-4105-ABFC-73B3B1163A97}" type="slidenum">
+              <a:rPr lang="fr-BE" smtClean="0"/>
+              <a:t>6</a:t>
+            </a:fld>
+            <a:endParaRPr lang="fr-BE"/>
+          </a:p>
+        </p:txBody>
+      </p:sp>
+    </p:spTree>
+  </p:cSld>
+  <p:clrMapOvr>
+    <a:masterClrMapping/>
+  </p:clrMapOvr>
+</p:notes>
 </file>
 
 <file path=ppt/slideLayouts/slideLayout1.xml><?xml version="1.0" encoding="utf-8"?>
@@ -294,7 +726,7 @@
             <a:fld id="{68BDF4EC-5B70-45D8-B718-E56EB4C6B13E}" type="datetimeFigureOut">
               <a:rPr lang="fr-BE" smtClean="0"/>
               <a:pPr/>
-              <a:t>23/05/2011</a:t>
+              <a:t>28/06/2011</a:t>
             </a:fld>
             <a:endParaRPr lang="fr-BE"/>
           </a:p>
@@ -461,7 +893,7 @@
             <a:fld id="{68BDF4EC-5B70-45D8-B718-E56EB4C6B13E}" type="datetimeFigureOut">
               <a:rPr lang="fr-BE" smtClean="0"/>
               <a:pPr/>
-              <a:t>23/05/2011</a:t>
+              <a:t>28/06/2011</a:t>
             </a:fld>
             <a:endParaRPr lang="fr-BE"/>
           </a:p>
@@ -638,7 +1070,7 @@
             <a:fld id="{68BDF4EC-5B70-45D8-B718-E56EB4C6B13E}" type="datetimeFigureOut">
               <a:rPr lang="fr-BE" smtClean="0"/>
               <a:pPr/>
-              <a:t>23/05/2011</a:t>
+              <a:t>28/06/2011</a:t>
             </a:fld>
             <a:endParaRPr lang="fr-BE"/>
           </a:p>
@@ -805,7 +1237,7 @@
             <a:fld id="{68BDF4EC-5B70-45D8-B718-E56EB4C6B13E}" type="datetimeFigureOut">
               <a:rPr lang="fr-BE" smtClean="0"/>
               <a:pPr/>
-              <a:t>23/05/2011</a:t>
+              <a:t>28/06/2011</a:t>
             </a:fld>
             <a:endParaRPr lang="fr-BE"/>
           </a:p>
@@ -1048,7 +1480,7 @@
             <a:fld id="{68BDF4EC-5B70-45D8-B718-E56EB4C6B13E}" type="datetimeFigureOut">
               <a:rPr lang="fr-BE" smtClean="0"/>
               <a:pPr/>
-              <a:t>23/05/2011</a:t>
+              <a:t>28/06/2011</a:t>
             </a:fld>
             <a:endParaRPr lang="fr-BE"/>
           </a:p>
@@ -1333,7 +1765,7 @@
             <a:fld id="{68BDF4EC-5B70-45D8-B718-E56EB4C6B13E}" type="datetimeFigureOut">
               <a:rPr lang="fr-BE" smtClean="0"/>
               <a:pPr/>
-              <a:t>23/05/2011</a:t>
+              <a:t>28/06/2011</a:t>
             </a:fld>
             <a:endParaRPr lang="fr-BE"/>
           </a:p>
@@ -1752,7 +2184,7 @@
             <a:fld id="{68BDF4EC-5B70-45D8-B718-E56EB4C6B13E}" type="datetimeFigureOut">
               <a:rPr lang="fr-BE" smtClean="0"/>
               <a:pPr/>
-              <a:t>23/05/2011</a:t>
+              <a:t>28/06/2011</a:t>
             </a:fld>
             <a:endParaRPr lang="fr-BE"/>
           </a:p>
@@ -1867,7 +2299,7 @@
             <a:fld id="{68BDF4EC-5B70-45D8-B718-E56EB4C6B13E}" type="datetimeFigureOut">
               <a:rPr lang="fr-BE" smtClean="0"/>
               <a:pPr/>
-              <a:t>23/05/2011</a:t>
+              <a:t>28/06/2011</a:t>
             </a:fld>
             <a:endParaRPr lang="fr-BE"/>
           </a:p>
@@ -1959,7 +2391,7 @@
             <a:fld id="{68BDF4EC-5B70-45D8-B718-E56EB4C6B13E}" type="datetimeFigureOut">
               <a:rPr lang="fr-BE" smtClean="0"/>
               <a:pPr/>
-              <a:t>23/05/2011</a:t>
+              <a:t>28/06/2011</a:t>
             </a:fld>
             <a:endParaRPr lang="fr-BE"/>
           </a:p>
@@ -2233,7 +2665,7 @@
             <a:fld id="{68BDF4EC-5B70-45D8-B718-E56EB4C6B13E}" type="datetimeFigureOut">
               <a:rPr lang="fr-BE" smtClean="0"/>
               <a:pPr/>
-              <a:t>23/05/2011</a:t>
+              <a:t>28/06/2011</a:t>
             </a:fld>
             <a:endParaRPr lang="fr-BE"/>
           </a:p>
@@ -2483,7 +2915,7 @@
             <a:fld id="{68BDF4EC-5B70-45D8-B718-E56EB4C6B13E}" type="datetimeFigureOut">
               <a:rPr lang="fr-BE" smtClean="0"/>
               <a:pPr/>
-              <a:t>23/05/2011</a:t>
+              <a:t>28/06/2011</a:t>
             </a:fld>
             <a:endParaRPr lang="fr-BE"/>
           </a:p>
@@ -2693,7 +3125,7 @@
             <a:fld id="{68BDF4EC-5B70-45D8-B718-E56EB4C6B13E}" type="datetimeFigureOut">
               <a:rPr lang="fr-BE" smtClean="0"/>
               <a:pPr/>
-              <a:t>23/05/2011</a:t>
+              <a:t>28/06/2011</a:t>
             </a:fld>
             <a:endParaRPr lang="fr-BE"/>
           </a:p>
@@ -8732,10 +9164,14 @@
             <a:p>
               <a:pPr algn="ctr"/>
               <a:r>
-                <a:rPr lang="fr-BE" sz="1200" smtClean="0"/>
-                <a:t>Starting train</a:t>
+                <a:rPr lang="fr-BE" sz="1200" dirty="0" err="1" smtClean="0"/>
+                <a:t>Starting</a:t>
               </a:r>
-              <a:endParaRPr lang="fr-BE" sz="1200"/>
+              <a:r>
+                <a:rPr lang="fr-BE" sz="1200" dirty="0" smtClean="0"/>
+                <a:t> train</a:t>
+              </a:r>
+              <a:endParaRPr lang="fr-BE" sz="1200" dirty="0"/>
             </a:p>
           </p:txBody>
         </p:sp>
@@ -9138,7 +9574,7 @@
         </p:nvGrpSpPr>
         <p:grpSpPr>
           <a:xfrm>
-            <a:off x="1448857" y="1147895"/>
+            <a:off x="357158" y="357166"/>
             <a:ext cx="4949082" cy="2713153"/>
             <a:chOff x="1448857" y="1147895"/>
             <a:chExt cx="4949082" cy="2713153"/>
@@ -11160,12 +11596,24 @@
             <a:p>
               <a:pPr algn="ctr"/>
               <a:r>
-                <a:rPr lang="fr-BE" sz="1000" b="1" smtClean="0">
+                <a:rPr lang="fr-BE" sz="1000" b="1" dirty="0" err="1" smtClean="0">
                   <a:latin typeface="+mj-lt"/>
                 </a:rPr>
-                <a:t>Closing doors</a:t>
+                <a:t>Closing</a:t>
               </a:r>
-              <a:endParaRPr lang="fr-BE" sz="1000" b="1">
+              <a:r>
+                <a:rPr lang="fr-BE" sz="1000" b="1" dirty="0" smtClean="0">
+                  <a:latin typeface="+mj-lt"/>
+                </a:rPr>
+                <a:t> </a:t>
+              </a:r>
+              <a:r>
+                <a:rPr lang="fr-BE" sz="1000" b="1" dirty="0" err="1" smtClean="0">
+                  <a:latin typeface="+mj-lt"/>
+                </a:rPr>
+                <a:t>doors</a:t>
+              </a:r>
+              <a:endParaRPr lang="fr-BE" sz="1000" b="1" dirty="0">
                 <a:latin typeface="+mj-lt"/>
               </a:endParaRPr>
             </a:p>
@@ -11483,12 +11931,12 @@
             <a:p>
               <a:pPr algn="ctr"/>
               <a:r>
-                <a:rPr lang="fr-BE" sz="1000" b="1" smtClean="0">
+                <a:rPr lang="fr-BE" sz="1000" b="1" dirty="0" err="1" smtClean="0">
                   <a:latin typeface="+mj-lt"/>
                 </a:rPr>
                 <a:t>Passenger</a:t>
               </a:r>
-              <a:endParaRPr lang="fr-BE" sz="1000" b="1">
+              <a:endParaRPr lang="fr-BE" sz="1000" b="1" dirty="0">
                 <a:latin typeface="+mj-lt"/>
               </a:endParaRPr>
             </a:p>
@@ -12061,6 +12509,609 @@
             </a:p>
           </p:txBody>
         </p:sp>
+      </p:grpSp>
+      <p:grpSp>
+        <p:nvGrpSpPr>
+          <p:cNvPr id="112" name="Groupe 111"/>
+          <p:cNvGrpSpPr/>
+          <p:nvPr/>
+        </p:nvGrpSpPr>
+        <p:grpSpPr>
+          <a:xfrm>
+            <a:off x="1142976" y="2928934"/>
+            <a:ext cx="2286016" cy="2394578"/>
+            <a:chOff x="1134426" y="3929066"/>
+            <a:chExt cx="2286016" cy="2394578"/>
+          </a:xfrm>
+        </p:grpSpPr>
+        <p:sp>
+          <p:nvSpPr>
+            <p:cNvPr id="113" name="Rectangle à coins arrondis 112"/>
+            <p:cNvSpPr/>
+            <p:nvPr/>
+          </p:nvSpPr>
+          <p:spPr>
+            <a:xfrm>
+              <a:off x="2376802" y="4214818"/>
+              <a:ext cx="1043640" cy="396000"/>
+            </a:xfrm>
+            <a:prstGeom prst="roundRect">
+              <a:avLst/>
+            </a:prstGeom>
+            <a:ln w="22225"/>
+          </p:spPr>
+          <p:style>
+            <a:lnRef idx="2">
+              <a:schemeClr val="dk1"/>
+            </a:lnRef>
+            <a:fillRef idx="1">
+              <a:schemeClr val="lt1"/>
+            </a:fillRef>
+            <a:effectRef idx="0">
+              <a:schemeClr val="dk1"/>
+            </a:effectRef>
+            <a:fontRef idx="minor">
+              <a:schemeClr val="dk1"/>
+            </a:fontRef>
+          </p:style>
+          <p:txBody>
+            <a:bodyPr wrap="none" rtlCol="0" anchor="ctr"/>
+            <a:lstStyle/>
+            <a:p>
+              <a:pPr algn="ctr"/>
+              <a:r>
+                <a:rPr lang="fr-BE" sz="1200" dirty="0" err="1" smtClean="0">
+                  <a:latin typeface="+mj-lt"/>
+                </a:rPr>
+                <a:t>Collect</a:t>
+              </a:r>
+              <a:r>
+                <a:rPr lang="fr-BE" sz="1200" dirty="0" smtClean="0">
+                  <a:latin typeface="+mj-lt"/>
+                </a:rPr>
+                <a:t> </a:t>
+              </a:r>
+              <a:br>
+                <a:rPr lang="fr-BE" sz="1200" dirty="0" smtClean="0">
+                  <a:latin typeface="+mj-lt"/>
+                </a:rPr>
+              </a:br>
+              <a:r>
+                <a:rPr lang="fr-BE" sz="1200" dirty="0" err="1" smtClean="0">
+                  <a:latin typeface="+mj-lt"/>
+                </a:rPr>
+                <a:t>Constraints</a:t>
+              </a:r>
+              <a:endParaRPr lang="fr-BE" sz="1200" dirty="0">
+                <a:latin typeface="+mj-lt"/>
+              </a:endParaRPr>
+            </a:p>
+          </p:txBody>
+        </p:sp>
+        <p:sp>
+          <p:nvSpPr>
+            <p:cNvPr id="114" name="Rectangle à coins arrondis 113"/>
+            <p:cNvSpPr/>
+            <p:nvPr/>
+          </p:nvSpPr>
+          <p:spPr>
+            <a:xfrm>
+              <a:off x="1134426" y="4909793"/>
+              <a:ext cx="984448" cy="396000"/>
+            </a:xfrm>
+            <a:prstGeom prst="roundRect">
+              <a:avLst/>
+            </a:prstGeom>
+            <a:ln w="22225"/>
+          </p:spPr>
+          <p:style>
+            <a:lnRef idx="2">
+              <a:schemeClr val="dk1"/>
+            </a:lnRef>
+            <a:fillRef idx="1">
+              <a:schemeClr val="lt1"/>
+            </a:fillRef>
+            <a:effectRef idx="0">
+              <a:schemeClr val="dk1"/>
+            </a:effectRef>
+            <a:fontRef idx="minor">
+              <a:schemeClr val="dk1"/>
+            </a:fontRef>
+          </p:style>
+          <p:txBody>
+            <a:bodyPr wrap="none" rtlCol="0" anchor="ctr"/>
+            <a:lstStyle/>
+            <a:p>
+              <a:pPr algn="ctr"/>
+              <a:r>
+                <a:rPr lang="fr-BE" sz="1200" dirty="0" err="1" smtClean="0">
+                  <a:latin typeface="+mj-lt"/>
+                </a:rPr>
+                <a:t>Weaken</a:t>
+              </a:r>
+              <a:r>
+                <a:rPr lang="fr-BE" sz="1200" dirty="0" smtClean="0">
+                  <a:latin typeface="+mj-lt"/>
+                </a:rPr>
+                <a:t> </a:t>
+              </a:r>
+              <a:br>
+                <a:rPr lang="fr-BE" sz="1200" dirty="0" smtClean="0">
+                  <a:latin typeface="+mj-lt"/>
+                </a:rPr>
+              </a:br>
+              <a:r>
+                <a:rPr lang="fr-BE" sz="1200" dirty="0" err="1" smtClean="0">
+                  <a:latin typeface="+mj-lt"/>
+                </a:rPr>
+                <a:t>Request</a:t>
+              </a:r>
+              <a:endParaRPr lang="fr-BE" sz="1200" dirty="0">
+                <a:latin typeface="+mj-lt"/>
+              </a:endParaRPr>
+            </a:p>
+          </p:txBody>
+        </p:sp>
+        <p:sp>
+          <p:nvSpPr>
+            <p:cNvPr id="115" name="Rectangle à coins arrondis 114"/>
+            <p:cNvSpPr/>
+            <p:nvPr/>
+          </p:nvSpPr>
+          <p:spPr>
+            <a:xfrm>
+              <a:off x="2376802" y="5533330"/>
+              <a:ext cx="1043640" cy="396000"/>
+            </a:xfrm>
+            <a:prstGeom prst="roundRect">
+              <a:avLst/>
+            </a:prstGeom>
+            <a:ln w="22225"/>
+          </p:spPr>
+          <p:style>
+            <a:lnRef idx="2">
+              <a:schemeClr val="dk1"/>
+            </a:lnRef>
+            <a:fillRef idx="1">
+              <a:schemeClr val="lt1"/>
+            </a:fillRef>
+            <a:effectRef idx="0">
+              <a:schemeClr val="dk1"/>
+            </a:effectRef>
+            <a:fontRef idx="minor">
+              <a:schemeClr val="dk1"/>
+            </a:fontRef>
+          </p:style>
+          <p:txBody>
+            <a:bodyPr wrap="none" rtlCol="0" anchor="ctr"/>
+            <a:lstStyle/>
+            <a:p>
+              <a:pPr algn="ctr"/>
+              <a:r>
+                <a:rPr lang="fr-BE" sz="1200" dirty="0" smtClean="0">
+                  <a:latin typeface="+mj-lt"/>
+                </a:rPr>
+                <a:t>Schedule</a:t>
+              </a:r>
+              <a:endParaRPr lang="fr-BE" sz="1200" dirty="0" smtClean="0">
+                <a:latin typeface="+mj-lt"/>
+              </a:endParaRPr>
+            </a:p>
+          </p:txBody>
+        </p:sp>
+        <p:cxnSp>
+          <p:nvCxnSpPr>
+            <p:cNvPr id="116" name="Connecteur droit avec flèche 115"/>
+            <p:cNvCxnSpPr>
+              <a:stCxn id="113" idx="2"/>
+              <a:endCxn id="122" idx="0"/>
+            </p:cNvCxnSpPr>
+            <p:nvPr/>
+          </p:nvCxnSpPr>
+          <p:spPr>
+            <a:xfrm rot="5400000">
+              <a:off x="2775151" y="4734289"/>
+              <a:ext cx="246942" cy="1588"/>
+            </a:xfrm>
+            <a:prstGeom prst="straightConnector1">
+              <a:avLst/>
+            </a:prstGeom>
+            <a:ln w="22225">
+              <a:tailEnd type="arrow"/>
+            </a:ln>
+          </p:spPr>
+          <p:style>
+            <a:lnRef idx="2">
+              <a:schemeClr val="dk1"/>
+            </a:lnRef>
+            <a:fillRef idx="0">
+              <a:schemeClr val="dk1"/>
+            </a:fillRef>
+            <a:effectRef idx="1">
+              <a:schemeClr val="dk1"/>
+            </a:effectRef>
+            <a:fontRef idx="minor">
+              <a:schemeClr val="tx1"/>
+            </a:fontRef>
+          </p:style>
+        </p:cxnSp>
+        <p:cxnSp>
+          <p:nvCxnSpPr>
+            <p:cNvPr id="117" name="Connecteur droit avec flèche 116"/>
+            <p:cNvCxnSpPr>
+              <a:stCxn id="115" idx="2"/>
+              <a:endCxn id="125" idx="0"/>
+            </p:cNvCxnSpPr>
+            <p:nvPr/>
+          </p:nvCxnSpPr>
+          <p:spPr>
+            <a:xfrm rot="5400000">
+              <a:off x="2791465" y="6036487"/>
+              <a:ext cx="214314" cy="1588"/>
+            </a:xfrm>
+            <a:prstGeom prst="straightConnector1">
+              <a:avLst/>
+            </a:prstGeom>
+            <a:ln w="22225">
+              <a:tailEnd type="arrow"/>
+            </a:ln>
+          </p:spPr>
+          <p:style>
+            <a:lnRef idx="2">
+              <a:schemeClr val="dk1"/>
+            </a:lnRef>
+            <a:fillRef idx="0">
+              <a:schemeClr val="dk1"/>
+            </a:fillRef>
+            <a:effectRef idx="1">
+              <a:schemeClr val="dk1"/>
+            </a:effectRef>
+            <a:fontRef idx="minor">
+              <a:schemeClr val="tx1"/>
+            </a:fontRef>
+          </p:style>
+        </p:cxnSp>
+        <p:cxnSp>
+          <p:nvCxnSpPr>
+            <p:cNvPr id="118" name="Connecteur droit avec flèche 117"/>
+            <p:cNvCxnSpPr>
+              <a:stCxn id="122" idx="2"/>
+              <a:endCxn id="115" idx="0"/>
+            </p:cNvCxnSpPr>
+            <p:nvPr/>
+          </p:nvCxnSpPr>
+          <p:spPr>
+            <a:xfrm rot="5400000">
+              <a:off x="2810870" y="5445578"/>
+              <a:ext cx="175504" cy="1588"/>
+            </a:xfrm>
+            <a:prstGeom prst="straightConnector1">
+              <a:avLst/>
+            </a:prstGeom>
+            <a:ln w="22225">
+              <a:tailEnd type="arrow"/>
+            </a:ln>
+          </p:spPr>
+          <p:style>
+            <a:lnRef idx="2">
+              <a:schemeClr val="dk1"/>
+            </a:lnRef>
+            <a:fillRef idx="0">
+              <a:schemeClr val="dk1"/>
+            </a:fillRef>
+            <a:effectRef idx="1">
+              <a:schemeClr val="dk1"/>
+            </a:effectRef>
+            <a:fontRef idx="minor">
+              <a:schemeClr val="tx1"/>
+            </a:fontRef>
+          </p:style>
+        </p:cxnSp>
+        <p:cxnSp>
+          <p:nvCxnSpPr>
+            <p:cNvPr id="119" name="Connecteur en angle 281"/>
+            <p:cNvCxnSpPr>
+              <a:stCxn id="122" idx="1"/>
+              <a:endCxn id="114" idx="3"/>
+            </p:cNvCxnSpPr>
+            <p:nvPr/>
+          </p:nvCxnSpPr>
+          <p:spPr>
+            <a:xfrm rot="10800000">
+              <a:off x="2118874" y="5107793"/>
+              <a:ext cx="400804" cy="1588"/>
+            </a:xfrm>
+            <a:prstGeom prst="bentConnector3">
+              <a:avLst>
+                <a:gd name="adj1" fmla="val 50000"/>
+              </a:avLst>
+            </a:prstGeom>
+            <a:ln w="22225">
+              <a:tailEnd type="arrow"/>
+            </a:ln>
+          </p:spPr>
+          <p:style>
+            <a:lnRef idx="2">
+              <a:schemeClr val="dk1"/>
+            </a:lnRef>
+            <a:fillRef idx="0">
+              <a:schemeClr val="dk1"/>
+            </a:fillRef>
+            <a:effectRef idx="1">
+              <a:schemeClr val="dk1"/>
+            </a:effectRef>
+            <a:fontRef idx="minor">
+              <a:schemeClr val="tx1"/>
+            </a:fontRef>
+          </p:style>
+        </p:cxnSp>
+        <p:sp>
+          <p:nvSpPr>
+            <p:cNvPr id="120" name="Ellipse 119"/>
+            <p:cNvSpPr/>
+            <p:nvPr/>
+          </p:nvSpPr>
+          <p:spPr>
+            <a:xfrm>
+              <a:off x="2862622" y="3929066"/>
+              <a:ext cx="72000" cy="72000"/>
+            </a:xfrm>
+            <a:prstGeom prst="ellipse">
+              <a:avLst/>
+            </a:prstGeom>
+            <a:ln w="22225"/>
+          </p:spPr>
+          <p:style>
+            <a:lnRef idx="2">
+              <a:schemeClr val="dk1">
+                <a:shade val="50000"/>
+              </a:schemeClr>
+            </a:lnRef>
+            <a:fillRef idx="1">
+              <a:schemeClr val="dk1"/>
+            </a:fillRef>
+            <a:effectRef idx="0">
+              <a:schemeClr val="dk1"/>
+            </a:effectRef>
+            <a:fontRef idx="minor">
+              <a:schemeClr val="lt1"/>
+            </a:fontRef>
+          </p:style>
+          <p:txBody>
+            <a:bodyPr rtlCol="0" anchor="ctr"/>
+            <a:lstStyle/>
+            <a:p>
+              <a:pPr algn="ctr"/>
+              <a:endParaRPr lang="fr-BE" sz="1200">
+                <a:latin typeface="+mj-lt"/>
+              </a:endParaRPr>
+            </a:p>
+          </p:txBody>
+        </p:sp>
+        <p:cxnSp>
+          <p:nvCxnSpPr>
+            <p:cNvPr id="121" name="Connecteur droit avec flèche 120"/>
+            <p:cNvCxnSpPr>
+              <a:stCxn id="120" idx="4"/>
+              <a:endCxn id="113" idx="0"/>
+            </p:cNvCxnSpPr>
+            <p:nvPr/>
+          </p:nvCxnSpPr>
+          <p:spPr>
+            <a:xfrm rot="5400000">
+              <a:off x="2791746" y="4107942"/>
+              <a:ext cx="213752" cy="1588"/>
+            </a:xfrm>
+            <a:prstGeom prst="straightConnector1">
+              <a:avLst/>
+            </a:prstGeom>
+            <a:ln w="22225">
+              <a:tailEnd type="arrow"/>
+            </a:ln>
+          </p:spPr>
+          <p:style>
+            <a:lnRef idx="2">
+              <a:schemeClr val="dk1"/>
+            </a:lnRef>
+            <a:fillRef idx="0">
+              <a:schemeClr val="dk1"/>
+            </a:fillRef>
+            <a:effectRef idx="1">
+              <a:schemeClr val="dk1"/>
+            </a:effectRef>
+            <a:fontRef idx="minor">
+              <a:schemeClr val="tx1"/>
+            </a:fontRef>
+          </p:style>
+        </p:cxnSp>
+        <p:sp>
+          <p:nvSpPr>
+            <p:cNvPr id="122" name="Losange 121"/>
+            <p:cNvSpPr/>
+            <p:nvPr/>
+          </p:nvSpPr>
+          <p:spPr>
+            <a:xfrm>
+              <a:off x="2519678" y="4857760"/>
+              <a:ext cx="757888" cy="500066"/>
+            </a:xfrm>
+            <a:prstGeom prst="diamond">
+              <a:avLst/>
+            </a:prstGeom>
+          </p:spPr>
+          <p:style>
+            <a:lnRef idx="2">
+              <a:schemeClr val="dk1"/>
+            </a:lnRef>
+            <a:fillRef idx="1">
+              <a:schemeClr val="lt1"/>
+            </a:fillRef>
+            <a:effectRef idx="0">
+              <a:schemeClr val="dk1"/>
+            </a:effectRef>
+            <a:fontRef idx="minor">
+              <a:schemeClr val="dk1"/>
+            </a:fontRef>
+          </p:style>
+          <p:txBody>
+            <a:bodyPr wrap="none" rtlCol="0" anchor="ctr">
+              <a:noAutofit/>
+            </a:bodyPr>
+            <a:lstStyle/>
+            <a:p>
+              <a:pPr algn="ctr"/>
+              <a:r>
+                <a:rPr lang="fr-BE" sz="1200" dirty="0" err="1" smtClean="0">
+                  <a:latin typeface="+mj-lt"/>
+                </a:rPr>
+                <a:t>Conflict</a:t>
+              </a:r>
+              <a:r>
+                <a:rPr lang="fr-BE" sz="1200" dirty="0" smtClean="0">
+                  <a:latin typeface="+mj-lt"/>
+                </a:rPr>
+                <a:t>?</a:t>
+              </a:r>
+              <a:endParaRPr lang="fr-BE" sz="1200" dirty="0">
+                <a:latin typeface="+mj-lt"/>
+              </a:endParaRPr>
+            </a:p>
+          </p:txBody>
+        </p:sp>
+        <p:cxnSp>
+          <p:nvCxnSpPr>
+            <p:cNvPr id="123" name="Connecteur droit avec flèche 74"/>
+            <p:cNvCxnSpPr>
+              <a:stCxn id="114" idx="0"/>
+              <a:endCxn id="113" idx="1"/>
+            </p:cNvCxnSpPr>
+            <p:nvPr/>
+          </p:nvCxnSpPr>
+          <p:spPr>
+            <a:xfrm rot="5400000" flipH="1" flipV="1">
+              <a:off x="1753239" y="4286230"/>
+              <a:ext cx="496975" cy="750152"/>
+            </a:xfrm>
+            <a:prstGeom prst="bentConnector2">
+              <a:avLst/>
+            </a:prstGeom>
+            <a:ln w="22225">
+              <a:tailEnd type="arrow"/>
+            </a:ln>
+          </p:spPr>
+          <p:style>
+            <a:lnRef idx="2">
+              <a:schemeClr val="dk1"/>
+            </a:lnRef>
+            <a:fillRef idx="0">
+              <a:schemeClr val="dk1"/>
+            </a:fillRef>
+            <a:effectRef idx="1">
+              <a:schemeClr val="dk1"/>
+            </a:effectRef>
+            <a:fontRef idx="minor">
+              <a:schemeClr val="tx1"/>
+            </a:fontRef>
+          </p:style>
+        </p:cxnSp>
+        <p:grpSp>
+          <p:nvGrpSpPr>
+            <p:cNvPr id="124" name="Groupe 109"/>
+            <p:cNvGrpSpPr/>
+            <p:nvPr/>
+          </p:nvGrpSpPr>
+          <p:grpSpPr>
+            <a:xfrm>
+              <a:off x="2808622" y="6143644"/>
+              <a:ext cx="180000" cy="180000"/>
+              <a:chOff x="2786050" y="6143644"/>
+              <a:chExt cx="180000" cy="180000"/>
+            </a:xfrm>
+          </p:grpSpPr>
+          <p:sp>
+            <p:nvSpPr>
+              <p:cNvPr id="125" name="Ellipse 124"/>
+              <p:cNvSpPr/>
+              <p:nvPr/>
+            </p:nvSpPr>
+            <p:spPr>
+              <a:xfrm>
+                <a:off x="2786050" y="6143644"/>
+                <a:ext cx="180000" cy="180000"/>
+              </a:xfrm>
+              <a:prstGeom prst="ellipse">
+                <a:avLst/>
+              </a:prstGeom>
+            </p:spPr>
+            <p:style>
+              <a:lnRef idx="2">
+                <a:schemeClr val="dk1"/>
+              </a:lnRef>
+              <a:fillRef idx="1">
+                <a:schemeClr val="lt1"/>
+              </a:fillRef>
+              <a:effectRef idx="0">
+                <a:schemeClr val="dk1"/>
+              </a:effectRef>
+              <a:fontRef idx="minor">
+                <a:schemeClr val="dk1"/>
+              </a:fontRef>
+            </p:style>
+            <p:txBody>
+              <a:bodyPr rtlCol="0" anchor="ctr"/>
+              <a:lstStyle/>
+              <a:p>
+                <a:pPr algn="ctr"/>
+                <a:endParaRPr lang="fr-BE" sz="1200">
+                  <a:latin typeface="+mj-lt"/>
+                </a:endParaRPr>
+              </a:p>
+            </p:txBody>
+          </p:sp>
+          <p:sp>
+            <p:nvSpPr>
+              <p:cNvPr id="126" name="Ellipse 125"/>
+              <p:cNvSpPr/>
+              <p:nvPr/>
+            </p:nvSpPr>
+            <p:spPr>
+              <a:xfrm>
+                <a:off x="2840050" y="6197644"/>
+                <a:ext cx="72000" cy="72000"/>
+              </a:xfrm>
+              <a:prstGeom prst="ellipse">
+                <a:avLst/>
+              </a:prstGeom>
+              <a:ln w="22225"/>
+            </p:spPr>
+            <p:style>
+              <a:lnRef idx="2">
+                <a:schemeClr val="dk1">
+                  <a:shade val="50000"/>
+                </a:schemeClr>
+              </a:lnRef>
+              <a:fillRef idx="1">
+                <a:schemeClr val="dk1"/>
+              </a:fillRef>
+              <a:effectRef idx="0">
+                <a:schemeClr val="dk1"/>
+              </a:effectRef>
+              <a:fontRef idx="minor">
+                <a:schemeClr val="lt1"/>
+              </a:fontRef>
+            </p:style>
+            <p:txBody>
+              <a:bodyPr rtlCol="0" anchor="ctr"/>
+              <a:lstStyle/>
+              <a:p>
+                <a:pPr algn="ctr"/>
+                <a:endParaRPr lang="fr-BE" sz="1200">
+                  <a:latin typeface="+mj-lt"/>
+                </a:endParaRPr>
+              </a:p>
+            </p:txBody>
+          </p:sp>
+        </p:grpSp>
       </p:grpSp>
     </p:spTree>
   </p:cSld>
@@ -12089,16 +13140,16 @@
       </p:grpSpPr>
       <p:grpSp>
         <p:nvGrpSpPr>
-          <p:cNvPr id="48" name="Groupe 47"/>
+          <p:cNvPr id="89" name="Groupe 88"/>
           <p:cNvGrpSpPr/>
           <p:nvPr/>
         </p:nvGrpSpPr>
         <p:grpSpPr>
           <a:xfrm>
-            <a:off x="251520" y="144016"/>
-            <a:ext cx="8541867" cy="6525344"/>
-            <a:chOff x="251520" y="144016"/>
-            <a:chExt cx="8541867" cy="6525344"/>
+            <a:off x="142844" y="144016"/>
+            <a:ext cx="8929750" cy="6497960"/>
+            <a:chOff x="142844" y="144016"/>
+            <a:chExt cx="8929750" cy="6497960"/>
           </a:xfrm>
         </p:grpSpPr>
         <p:sp>
@@ -12109,8 +13160,8 @@
           </p:nvSpPr>
           <p:spPr>
             <a:xfrm>
-              <a:off x="251520" y="144016"/>
-              <a:ext cx="8496944" cy="6497960"/>
+              <a:off x="142844" y="144016"/>
+              <a:ext cx="8858312" cy="6497960"/>
             </a:xfrm>
             <a:prstGeom prst="rect">
               <a:avLst/>
@@ -12186,13 +13237,59 @@
         </p:sp>
         <p:sp>
           <p:nvSpPr>
+            <p:cNvPr id="82" name="Rectangle 81"/>
+            <p:cNvSpPr/>
+            <p:nvPr/>
+          </p:nvSpPr>
+          <p:spPr>
+            <a:xfrm>
+              <a:off x="1857356" y="2214554"/>
+              <a:ext cx="1285884" cy="1714512"/>
+            </a:xfrm>
+            <a:prstGeom prst="rect">
+              <a:avLst/>
+            </a:prstGeom>
+            <a:solidFill>
+              <a:schemeClr val="bg1"/>
+            </a:solidFill>
+            <a:ln>
+              <a:noFill/>
+            </a:ln>
+          </p:spPr>
+          <p:style>
+            <a:lnRef idx="2">
+              <a:schemeClr val="accent1">
+                <a:shade val="50000"/>
+              </a:schemeClr>
+            </a:lnRef>
+            <a:fillRef idx="1">
+              <a:schemeClr val="accent1"/>
+            </a:fillRef>
+            <a:effectRef idx="0">
+              <a:schemeClr val="accent1"/>
+            </a:effectRef>
+            <a:fontRef idx="minor">
+              <a:schemeClr val="lt1"/>
+            </a:fontRef>
+          </p:style>
+          <p:txBody>
+            <a:bodyPr rtlCol="0" anchor="ctr"/>
+            <a:lstStyle/>
+            <a:p>
+              <a:pPr algn="ctr"/>
+              <a:endParaRPr lang="fr-BE"/>
+            </a:p>
+          </p:txBody>
+        </p:sp>
+        <p:sp>
+          <p:nvSpPr>
             <p:cNvPr id="37" name="Rectangle 36"/>
             <p:cNvSpPr/>
             <p:nvPr/>
           </p:nvSpPr>
           <p:spPr>
             <a:xfrm>
-              <a:off x="2339752" y="476672"/>
+              <a:off x="2339752" y="550230"/>
               <a:ext cx="4104456" cy="1080120"/>
             </a:xfrm>
             <a:prstGeom prst="rect">
@@ -12238,8 +13335,8 @@
           </p:nvSpPr>
           <p:spPr>
             <a:xfrm>
-              <a:off x="3419872" y="4797152"/>
-              <a:ext cx="2160240" cy="936104"/>
+              <a:off x="5269076" y="4187108"/>
+              <a:ext cx="1731612" cy="1285884"/>
             </a:xfrm>
             <a:prstGeom prst="rect">
               <a:avLst/>
@@ -12284,7 +13381,7 @@
           </p:nvGrpSpPr>
           <p:grpSpPr>
             <a:xfrm>
-              <a:off x="3196227" y="4590420"/>
+              <a:off x="4911886" y="4108432"/>
               <a:ext cx="2803386" cy="2078940"/>
               <a:chOff x="5254729" y="2420888"/>
               <a:chExt cx="2803386" cy="2078940"/>
@@ -12299,7 +13396,7 @@
               <p:nvPr/>
             </p:nvPicPr>
             <p:blipFill>
-              <a:blip r:embed="rId2" cstate="print"/>
+              <a:blip r:embed="rId3" cstate="print"/>
               <a:srcRect/>
               <a:stretch>
                 <a:fillRect/>
@@ -12341,13 +13438,8 @@
                 <a:pPr algn="r"/>
                 <a:r>
                   <a:rPr lang="fr-BE" smtClean="0"/>
-                  <a:t>High-level </a:t>
+                  <a:t>High-level scenarios (hMSC)</a:t>
                 </a:r>
-                <a:r>
-                  <a:rPr lang="fr-BE" smtClean="0"/>
-                  <a:t>scenarios (hMSC)</a:t>
-                </a:r>
-                <a:endParaRPr lang="fr-BE" smtClean="0"/>
               </a:p>
             </p:txBody>
           </p:sp>
@@ -12360,8 +13452,8 @@
           </p:nvSpPr>
           <p:spPr>
             <a:xfrm>
-              <a:off x="5652120" y="2428508"/>
-              <a:ext cx="2016224" cy="1368152"/>
+              <a:off x="5929322" y="2203724"/>
+              <a:ext cx="2016224" cy="1511028"/>
             </a:xfrm>
             <a:prstGeom prst="rect">
               <a:avLst/>
@@ -12406,8 +13498,8 @@
           </p:nvSpPr>
           <p:spPr>
             <a:xfrm>
-              <a:off x="1187624" y="2348880"/>
-              <a:ext cx="2016224" cy="2016224"/>
+              <a:off x="2786050" y="4429132"/>
+              <a:ext cx="1285884" cy="1143008"/>
             </a:xfrm>
             <a:prstGeom prst="rect">
               <a:avLst/>
@@ -12452,7 +13544,7 @@
           </p:nvGrpSpPr>
           <p:grpSpPr>
             <a:xfrm>
-              <a:off x="5733790" y="2091328"/>
+              <a:off x="6012997" y="1977268"/>
               <a:ext cx="3059597" cy="1737484"/>
               <a:chOff x="2323036" y="481896"/>
               <a:chExt cx="3059597" cy="1737484"/>
@@ -12467,7 +13559,7 @@
               <p:nvPr/>
             </p:nvPicPr>
             <p:blipFill>
-              <a:blip r:embed="rId3" cstate="print"/>
+              <a:blip r:embed="rId4" cstate="print"/>
               <a:srcRect/>
               <a:stretch>
                 <a:fillRect/>
@@ -12523,7 +13615,7 @@
           </p:nvGrpSpPr>
           <p:grpSpPr>
             <a:xfrm>
-              <a:off x="323528" y="2564904"/>
+              <a:off x="194654" y="2272882"/>
               <a:ext cx="2877148" cy="1656184"/>
               <a:chOff x="182684" y="2707179"/>
               <a:chExt cx="2877148" cy="1656184"/>
@@ -12538,7 +13630,7 @@
               <p:nvPr/>
             </p:nvPicPr>
             <p:blipFill>
-              <a:blip r:embed="rId4" cstate="print"/>
+              <a:blip r:embed="rId5" cstate="print"/>
               <a:srcRect/>
               <a:stretch>
                 <a:fillRect/>
@@ -12578,21 +13670,25 @@
               <a:lstStyle/>
               <a:p>
                 <a:r>
-                  <a:rPr lang="fr-BE" smtClean="0"/>
+                  <a:rPr lang="fr-BE" dirty="0" smtClean="0"/>
                   <a:t>Goals &amp; </a:t>
                 </a:r>
                 <a:br>
-                  <a:rPr lang="fr-BE" smtClean="0"/>
+                  <a:rPr lang="fr-BE" dirty="0" smtClean="0"/>
                 </a:br>
                 <a:r>
-                  <a:rPr lang="fr-BE" smtClean="0"/>
+                  <a:rPr lang="fr-BE" dirty="0" smtClean="0"/>
                   <a:t>Domain </a:t>
                 </a:r>
                 <a:r>
-                  <a:rPr lang="fr-BE" smtClean="0"/>
-                  <a:t>Properties (FLTL)</a:t>
+                  <a:rPr lang="fr-BE" dirty="0" err="1" smtClean="0"/>
+                  <a:t>Properties</a:t>
                 </a:r>
-                <a:endParaRPr lang="fr-BE"/>
+                <a:r>
+                  <a:rPr lang="fr-BE" dirty="0" smtClean="0"/>
+                  <a:t> (FLTL)</a:t>
+                </a:r>
+                <a:endParaRPr lang="fr-BE" dirty="0"/>
               </a:p>
             </p:txBody>
           </p:sp>
@@ -12605,10 +13701,10 @@
           </p:nvGrpSpPr>
           <p:grpSpPr>
             <a:xfrm>
-              <a:off x="2423550" y="173776"/>
-              <a:ext cx="4162583" cy="1311008"/>
-              <a:chOff x="1547664" y="4077072"/>
-              <a:chExt cx="4162583" cy="1311008"/>
+              <a:off x="2643174" y="285728"/>
+              <a:ext cx="4214842" cy="1285884"/>
+              <a:chOff x="1547664" y="4102196"/>
+              <a:chExt cx="4214842" cy="1285884"/>
             </a:xfrm>
           </p:grpSpPr>
           <p:grpSp>
@@ -12634,7 +13730,7 @@
                 <p:nvPr/>
               </p:nvPicPr>
               <p:blipFill>
-                <a:blip r:embed="rId5" cstate="print"/>
+                <a:blip r:embed="rId6" cstate="print"/>
                 <a:srcRect/>
                 <a:stretch>
                   <a:fillRect/>
@@ -12660,7 +13756,7 @@
                 <p:nvPr/>
               </p:nvPicPr>
               <p:blipFill>
-                <a:blip r:embed="rId6" cstate="print"/>
+                <a:blip r:embed="rId7" cstate="print"/>
                 <a:srcRect/>
                 <a:stretch>
                   <a:fillRect/>
@@ -12686,7 +13782,7 @@
                 <p:nvPr/>
               </p:nvPicPr>
               <p:blipFill>
-                <a:blip r:embed="rId7" cstate="print"/>
+                <a:blip r:embed="rId8" cstate="print"/>
                 <a:srcRect/>
                 <a:stretch>
                   <a:fillRect/>
@@ -12726,10 +13822,10 @@
                 <a:lstStyle/>
                 <a:p>
                   <a:r>
-                    <a:rPr lang="fr-BE" sz="2000" b="1" smtClean="0"/>
+                    <a:rPr lang="fr-BE" sz="2000" b="1" dirty="0" smtClean="0"/>
                     <a:t>||</a:t>
                   </a:r>
-                  <a:endParaRPr lang="fr-BE" sz="2000" b="1"/>
+                  <a:endParaRPr lang="fr-BE" sz="2000" b="1" dirty="0"/>
                 </a:p>
               </p:txBody>
             </p:sp>
@@ -12742,7 +13838,7 @@
             </p:nvSpPr>
             <p:spPr>
               <a:xfrm>
-                <a:off x="3021754" y="4077072"/>
+                <a:off x="3074013" y="4102196"/>
                 <a:ext cx="2688493" cy="369332"/>
               </a:xfrm>
               <a:prstGeom prst="rect">
@@ -12757,87 +13853,725 @@
               <a:lstStyle/>
               <a:p>
                 <a:r>
-                  <a:rPr lang="fr-BE" smtClean="0"/>
+                  <a:rPr lang="fr-BE" dirty="0" smtClean="0"/>
                   <a:t>Agent state machines (LTS)</a:t>
                 </a:r>
-                <a:endParaRPr lang="fr-BE"/>
+                <a:endParaRPr lang="fr-BE" dirty="0"/>
+              </a:p>
+            </p:txBody>
+          </p:sp>
+        </p:grpSp>
+        <p:grpSp>
+          <p:nvGrpSpPr>
+            <p:cNvPr id="84" name="Groupe 83"/>
+            <p:cNvGrpSpPr/>
+            <p:nvPr/>
+          </p:nvGrpSpPr>
+          <p:grpSpPr>
+            <a:xfrm>
+              <a:off x="1357290" y="4286256"/>
+              <a:ext cx="2643206" cy="1944990"/>
+              <a:chOff x="142844" y="1857364"/>
+              <a:chExt cx="2643206" cy="1944990"/>
+            </a:xfrm>
+          </p:grpSpPr>
+          <p:pic>
+            <p:nvPicPr>
+              <p:cNvPr id="1032" name="Picture 8" descr="C:\Users\blambeau\Documents\thesis\writing\images\process.png"/>
+              <p:cNvPicPr>
+                <a:picLocks noChangeAspect="1" noChangeArrowheads="1"/>
+              </p:cNvPicPr>
+              <p:nvPr/>
+            </p:nvPicPr>
+            <p:blipFill>
+              <a:blip r:embed="rId9"/>
+              <a:srcRect/>
+              <a:stretch>
+                <a:fillRect/>
+              </a:stretch>
+            </p:blipFill>
+            <p:spPr bwMode="auto">
+              <a:xfrm>
+                <a:off x="928662" y="1857364"/>
+                <a:ext cx="1857388" cy="1944990"/>
+              </a:xfrm>
+              <a:prstGeom prst="rect">
+                <a:avLst/>
+              </a:prstGeom>
+              <a:noFill/>
+            </p:spPr>
+          </p:pic>
+          <p:sp>
+            <p:nvSpPr>
+              <p:cNvPr id="83" name="ZoneTexte 82"/>
+              <p:cNvSpPr txBox="1"/>
+              <p:nvPr/>
+            </p:nvSpPr>
+            <p:spPr>
+              <a:xfrm>
+                <a:off x="142844" y="3143248"/>
+                <a:ext cx="1686167" cy="646331"/>
+              </a:xfrm>
+              <a:prstGeom prst="rect">
+                <a:avLst/>
+              </a:prstGeom>
+              <a:noFill/>
+            </p:spPr>
+            <p:txBody>
+              <a:bodyPr wrap="none" rtlCol="0">
+                <a:spAutoFit/>
+              </a:bodyPr>
+              <a:lstStyle/>
+              <a:p>
+                <a:r>
+                  <a:rPr lang="fr-BE" dirty="0" err="1" smtClean="0"/>
+                  <a:t>Process</a:t>
+                </a:r>
+                <a:r>
+                  <a:rPr lang="fr-BE" dirty="0" smtClean="0"/>
+                  <a:t> </a:t>
+                </a:r>
+                <a:r>
+                  <a:rPr lang="fr-BE" dirty="0" err="1" smtClean="0"/>
+                  <a:t>models</a:t>
+                </a:r>
+                <a:r>
+                  <a:rPr lang="fr-BE" dirty="0" smtClean="0"/>
+                  <a:t> </a:t>
+                </a:r>
+                <a:br>
+                  <a:rPr lang="fr-BE" dirty="0" smtClean="0"/>
+                </a:br>
+                <a:r>
+                  <a:rPr lang="fr-BE" dirty="0" smtClean="0"/>
+                  <a:t>(g-</a:t>
+                </a:r>
+                <a:r>
+                  <a:rPr lang="fr-BE" dirty="0" err="1" smtClean="0"/>
+                  <a:t>hMSC</a:t>
+                </a:r>
+                <a:r>
+                  <a:rPr lang="fr-BE" dirty="0" smtClean="0"/>
+                  <a:t>)</a:t>
+                </a:r>
+                <a:endParaRPr lang="fr-BE" dirty="0"/>
+              </a:p>
+            </p:txBody>
+          </p:sp>
+        </p:grpSp>
+        <p:grpSp>
+          <p:nvGrpSpPr>
+            <p:cNvPr id="88" name="Groupe 87"/>
+            <p:cNvGrpSpPr/>
+            <p:nvPr/>
+          </p:nvGrpSpPr>
+          <p:grpSpPr>
+            <a:xfrm>
+              <a:off x="3286116" y="2571744"/>
+              <a:ext cx="2510020" cy="1214446"/>
+              <a:chOff x="3286116" y="2571744"/>
+              <a:chExt cx="2510020" cy="1214446"/>
+            </a:xfrm>
+          </p:grpSpPr>
+          <p:grpSp>
+            <p:nvGrpSpPr>
+              <p:cNvPr id="87" name="Groupe 86"/>
+              <p:cNvGrpSpPr/>
+              <p:nvPr/>
+            </p:nvGrpSpPr>
+            <p:grpSpPr>
+              <a:xfrm>
+                <a:off x="3286116" y="2571744"/>
+                <a:ext cx="2510020" cy="1214446"/>
+                <a:chOff x="3286116" y="2571744"/>
+                <a:chExt cx="2510020" cy="1214446"/>
+              </a:xfrm>
+            </p:grpSpPr>
+            <p:sp>
+              <p:nvSpPr>
+                <p:cNvPr id="28" name="Nuage 27"/>
+                <p:cNvSpPr/>
+                <p:nvPr/>
+              </p:nvSpPr>
+              <p:spPr>
+                <a:xfrm>
+                  <a:off x="3286116" y="2571744"/>
+                  <a:ext cx="2510020" cy="1214446"/>
+                </a:xfrm>
+                <a:prstGeom prst="cloud">
+                  <a:avLst/>
+                </a:prstGeom>
+              </p:spPr>
+              <p:style>
+                <a:lnRef idx="2">
+                  <a:schemeClr val="dk1"/>
+                </a:lnRef>
+                <a:fillRef idx="1">
+                  <a:schemeClr val="lt1"/>
+                </a:fillRef>
+                <a:effectRef idx="0">
+                  <a:schemeClr val="dk1"/>
+                </a:effectRef>
+                <a:fontRef idx="minor">
+                  <a:schemeClr val="dk1"/>
+                </a:fontRef>
+              </p:style>
+              <p:txBody>
+                <a:bodyPr wrap="none" tIns="108000" rtlCol="0" anchor="ctr" anchorCtr="1"/>
+                <a:lstStyle/>
+                <a:p>
+                  <a:pPr algn="ctr"/>
+                  <a:endParaRPr lang="fr-BE" dirty="0"/>
+                </a:p>
+              </p:txBody>
+            </p:sp>
+            <p:sp>
+              <p:nvSpPr>
+                <p:cNvPr id="86" name="Rectangle à coins arrondis 85"/>
+                <p:cNvSpPr/>
+                <p:nvPr/>
+              </p:nvSpPr>
+              <p:spPr>
+                <a:xfrm>
+                  <a:off x="5000628" y="3000372"/>
+                  <a:ext cx="500066" cy="357190"/>
+                </a:xfrm>
+                <a:prstGeom prst="roundRect">
+                  <a:avLst/>
+                </a:prstGeom>
+                <a:solidFill>
+                  <a:schemeClr val="bg1"/>
+                </a:solidFill>
+                <a:ln>
+                  <a:noFill/>
+                </a:ln>
+              </p:spPr>
+              <p:style>
+                <a:lnRef idx="2">
+                  <a:schemeClr val="accent1">
+                    <a:shade val="50000"/>
+                  </a:schemeClr>
+                </a:lnRef>
+                <a:fillRef idx="1">
+                  <a:schemeClr val="accent1"/>
+                </a:fillRef>
+                <a:effectRef idx="0">
+                  <a:schemeClr val="accent1"/>
+                </a:effectRef>
+                <a:fontRef idx="minor">
+                  <a:schemeClr val="lt1"/>
+                </a:fontRef>
+              </p:style>
+              <p:txBody>
+                <a:bodyPr rtlCol="0" anchor="ctr"/>
+                <a:lstStyle/>
+                <a:p>
+                  <a:pPr algn="ctr"/>
+                  <a:endParaRPr lang="fr-BE"/>
+                </a:p>
+              </p:txBody>
+            </p:sp>
+          </p:grpSp>
+          <p:sp>
+            <p:nvSpPr>
+              <p:cNvPr id="38" name="ZoneTexte 37"/>
+              <p:cNvSpPr txBox="1"/>
+              <p:nvPr/>
+            </p:nvSpPr>
+            <p:spPr>
+              <a:xfrm>
+                <a:off x="3500430" y="2714620"/>
+                <a:ext cx="2070247" cy="923330"/>
+              </a:xfrm>
+              <a:prstGeom prst="rect">
+                <a:avLst/>
+              </a:prstGeom>
+              <a:noFill/>
+            </p:spPr>
+            <p:txBody>
+              <a:bodyPr wrap="none" rtlCol="0">
+                <a:spAutoFit/>
+              </a:bodyPr>
+              <a:lstStyle/>
+              <a:p>
+                <a:pPr algn="ctr">
+                  <a:tabLst>
+                    <a:tab pos="177800" algn="l"/>
+                  </a:tabLst>
+                </a:pPr>
+                <a:r>
+                  <a:rPr lang="fr-BE" dirty="0" smtClean="0"/>
+                  <a:t> </a:t>
+                </a:r>
+                <a:r>
+                  <a:rPr lang="fr-BE" dirty="0" smtClean="0"/>
+                  <a:t>	Event </a:t>
+                </a:r>
+                <a:r>
+                  <a:rPr lang="fr-BE" dirty="0" smtClean="0"/>
+                  <a:t>traces (LTS) </a:t>
+                </a:r>
+                <a:br>
+                  <a:rPr lang="fr-BE" dirty="0" smtClean="0"/>
+                </a:br>
+                <a:r>
+                  <a:rPr lang="fr-BE" dirty="0" smtClean="0"/>
+                  <a:t>+ </a:t>
+                </a:r>
+                <a:r>
+                  <a:rPr lang="fr-BE" dirty="0" smtClean="0"/>
+                  <a:t>	State </a:t>
+                </a:r>
+                <a:r>
+                  <a:rPr lang="fr-BE" dirty="0" smtClean="0"/>
+                  <a:t>annotations </a:t>
+                </a:r>
+                <a:r>
+                  <a:rPr lang="fr-BE" dirty="0" smtClean="0"/>
+                  <a:t/>
+                </a:r>
+                <a:br>
+                  <a:rPr lang="fr-BE" dirty="0" smtClean="0"/>
+                </a:br>
+                <a:r>
+                  <a:rPr lang="fr-BE" dirty="0" smtClean="0"/>
+                  <a:t>(</a:t>
+                </a:r>
+                <a:r>
+                  <a:rPr lang="fr-BE" dirty="0" smtClean="0"/>
+                  <a:t>fluents)</a:t>
+                </a:r>
+                <a:endParaRPr lang="fr-BE" dirty="0"/>
+              </a:p>
+            </p:txBody>
+          </p:sp>
+        </p:grpSp>
+      </p:grpSp>
+    </p:spTree>
+  </p:cSld>
+  <p:clrMapOvr>
+    <a:masterClrMapping/>
+  </p:clrMapOvr>
+</p:sld>
+</file>
+
+<file path=ppt/slides/slide7.xml><?xml version="1.0" encoding="utf-8"?>
+<p:sld xmlns:a="http://schemas.openxmlformats.org/drawingml/2006/main" xmlns:r="http://schemas.openxmlformats.org/officeDocument/2006/relationships" xmlns:p="http://schemas.openxmlformats.org/presentationml/2006/main">
+  <p:cSld>
+    <p:spTree>
+      <p:nvGrpSpPr>
+        <p:cNvPr id="1" name=""/>
+        <p:cNvGrpSpPr/>
+        <p:nvPr/>
+      </p:nvGrpSpPr>
+      <p:grpSpPr>
+        <a:xfrm>
+          <a:off x="0" y="0"/>
+          <a:ext cx="0" cy="0"/>
+          <a:chOff x="0" y="0"/>
+          <a:chExt cx="0" cy="0"/>
+        </a:xfrm>
+      </p:grpSpPr>
+      <p:sp>
+        <p:nvSpPr>
+          <p:cNvPr id="28" name="Rectangle 27"/>
+          <p:cNvSpPr/>
+          <p:nvPr/>
+        </p:nvSpPr>
+        <p:spPr>
+          <a:xfrm>
+            <a:off x="500034" y="214290"/>
+            <a:ext cx="7929618" cy="5857916"/>
+          </a:xfrm>
+          <a:prstGeom prst="rect">
+            <a:avLst/>
+          </a:prstGeom>
+          <a:ln w="3175"/>
+        </p:spPr>
+        <p:style>
+          <a:lnRef idx="2">
+            <a:schemeClr val="dk1"/>
+          </a:lnRef>
+          <a:fillRef idx="1">
+            <a:schemeClr val="lt1"/>
+          </a:fillRef>
+          <a:effectRef idx="0">
+            <a:schemeClr val="dk1"/>
+          </a:effectRef>
+          <a:fontRef idx="minor">
+            <a:schemeClr val="dk1"/>
+          </a:fontRef>
+        </p:style>
+        <p:txBody>
+          <a:bodyPr rtlCol="0" anchor="ctr"/>
+          <a:lstStyle/>
+          <a:p>
+            <a:pPr algn="ctr"/>
+            <a:endParaRPr lang="fr-BE"/>
+          </a:p>
+        </p:txBody>
+      </p:sp>
+      <p:grpSp>
+        <p:nvGrpSpPr>
+          <p:cNvPr id="27" name="Groupe 26"/>
+          <p:cNvGrpSpPr/>
+          <p:nvPr/>
+        </p:nvGrpSpPr>
+        <p:grpSpPr>
+          <a:xfrm>
+            <a:off x="677289" y="500042"/>
+            <a:ext cx="7585782" cy="5304122"/>
+            <a:chOff x="677289" y="500042"/>
+            <a:chExt cx="7585782" cy="5304122"/>
+          </a:xfrm>
+        </p:grpSpPr>
+        <p:sp>
+          <p:nvSpPr>
+            <p:cNvPr id="5" name="ZoneTexte 4"/>
+            <p:cNvSpPr txBox="1"/>
+            <p:nvPr/>
+          </p:nvSpPr>
+          <p:spPr>
+            <a:xfrm>
+              <a:off x="838549" y="500042"/>
+              <a:ext cx="1378903" cy="461665"/>
+            </a:xfrm>
+            <a:prstGeom prst="rect">
+              <a:avLst/>
+            </a:prstGeom>
+            <a:noFill/>
+          </p:spPr>
+          <p:txBody>
+            <a:bodyPr wrap="none" rtlCol="0">
+              <a:spAutoFit/>
+            </a:bodyPr>
+            <a:lstStyle/>
+            <a:p>
+              <a:pPr algn="r"/>
+              <a:r>
+                <a:rPr lang="fr-BE" sz="2400" dirty="0" smtClean="0"/>
+                <a:t>Scenarios</a:t>
+              </a:r>
+            </a:p>
+          </p:txBody>
+        </p:sp>
+        <p:pic>
+          <p:nvPicPr>
+            <p:cNvPr id="6" name="Picture 5" descr="D:\blambeau\Work\ucl\thesis\writing\src\2-framework\images\simple-scenario.png"/>
+            <p:cNvPicPr>
+              <a:picLocks noChangeAspect="1" noChangeArrowheads="1"/>
+            </p:cNvPicPr>
+            <p:nvPr/>
+          </p:nvPicPr>
+          <p:blipFill>
+            <a:blip r:embed="rId2" cstate="print"/>
+            <a:srcRect/>
+            <a:stretch>
+              <a:fillRect/>
+            </a:stretch>
+          </p:blipFill>
+          <p:spPr bwMode="auto">
+            <a:xfrm>
+              <a:off x="2784967" y="527752"/>
+              <a:ext cx="2501413" cy="1143008"/>
+            </a:xfrm>
+            <a:prstGeom prst="rect">
+              <a:avLst/>
+            </a:prstGeom>
+            <a:noFill/>
+          </p:spPr>
+        </p:pic>
+        <p:pic>
+          <p:nvPicPr>
+            <p:cNvPr id="2050" name="Picture 2" descr="C:\Users\blambeau\Documents\thesis\writing\src\4-inductive\images\train-pta.png"/>
+            <p:cNvPicPr>
+              <a:picLocks noChangeAspect="1" noChangeArrowheads="1"/>
+            </p:cNvPicPr>
+            <p:nvPr/>
+          </p:nvPicPr>
+          <p:blipFill>
+            <a:blip r:embed="rId3"/>
+            <a:srcRect/>
+            <a:stretch>
+              <a:fillRect/>
+            </a:stretch>
+          </p:blipFill>
+          <p:spPr bwMode="auto">
+            <a:xfrm>
+              <a:off x="2360328" y="1986385"/>
+              <a:ext cx="3071834" cy="886536"/>
+            </a:xfrm>
+            <a:prstGeom prst="rect">
+              <a:avLst/>
+            </a:prstGeom>
+            <a:noFill/>
+          </p:spPr>
+        </p:pic>
+        <p:pic>
+          <p:nvPicPr>
+            <p:cNvPr id="2051" name="Picture 3" descr="C:\Users\blambeau\Documents\thesis\writing\src\4-inductive\images\composed.png"/>
+            <p:cNvPicPr>
+              <a:picLocks noChangeAspect="1" noChangeArrowheads="1"/>
+            </p:cNvPicPr>
+            <p:nvPr/>
+          </p:nvPicPr>
+          <p:blipFill>
+            <a:blip r:embed="rId4" cstate="print"/>
+            <a:srcRect/>
+            <a:stretch>
+              <a:fillRect/>
+            </a:stretch>
+          </p:blipFill>
+          <p:spPr bwMode="auto">
+            <a:xfrm>
+              <a:off x="2360328" y="3429001"/>
+              <a:ext cx="3250331" cy="857255"/>
+            </a:xfrm>
+            <a:prstGeom prst="rect">
+              <a:avLst/>
+            </a:prstGeom>
+            <a:noFill/>
+          </p:spPr>
+        </p:pic>
+        <p:grpSp>
+          <p:nvGrpSpPr>
+            <p:cNvPr id="15" name="Groupe 14"/>
+            <p:cNvGrpSpPr/>
+            <p:nvPr/>
+          </p:nvGrpSpPr>
+          <p:grpSpPr>
+            <a:xfrm>
+              <a:off x="2346473" y="4956908"/>
+              <a:ext cx="3151217" cy="847256"/>
+              <a:chOff x="1828089" y="5405409"/>
+              <a:chExt cx="3151217" cy="847256"/>
+            </a:xfrm>
+          </p:grpSpPr>
+          <p:pic>
+            <p:nvPicPr>
+              <p:cNvPr id="10" name="Picture 6" descr="D:\blambeau\Work\ucl\thesis\writing\src\2-framework\images\controller.png"/>
+              <p:cNvPicPr>
+                <a:picLocks noChangeAspect="1" noChangeArrowheads="1"/>
+              </p:cNvPicPr>
+              <p:nvPr/>
+            </p:nvPicPr>
+            <p:blipFill>
+              <a:blip r:embed="rId5" cstate="print"/>
+              <a:srcRect/>
+              <a:stretch>
+                <a:fillRect/>
+              </a:stretch>
+            </p:blipFill>
+            <p:spPr bwMode="auto">
+              <a:xfrm>
+                <a:off x="1828089" y="5462992"/>
+                <a:ext cx="1985491" cy="662815"/>
+              </a:xfrm>
+              <a:prstGeom prst="rect">
+                <a:avLst/>
+              </a:prstGeom>
+              <a:noFill/>
+            </p:spPr>
+          </p:pic>
+          <p:pic>
+            <p:nvPicPr>
+              <p:cNvPr id="12" name="Picture 9" descr="D:\blambeau\Work\ucl\thesis\writing\src\2-framework\images\open-close.png"/>
+              <p:cNvPicPr>
+                <a:picLocks noChangeAspect="1" noChangeArrowheads="1"/>
+              </p:cNvPicPr>
+              <p:nvPr/>
+            </p:nvPicPr>
+            <p:blipFill>
+              <a:blip r:embed="rId6" cstate="print"/>
+              <a:srcRect/>
+              <a:stretch>
+                <a:fillRect/>
+              </a:stretch>
+            </p:blipFill>
+            <p:spPr bwMode="auto">
+              <a:xfrm>
+                <a:off x="4149488" y="5877761"/>
+                <a:ext cx="829818" cy="374904"/>
+              </a:xfrm>
+              <a:prstGeom prst="rect">
+                <a:avLst/>
+              </a:prstGeom>
+              <a:noFill/>
+            </p:spPr>
+          </p:pic>
+          <p:pic>
+            <p:nvPicPr>
+              <p:cNvPr id="13" name="Picture 10" descr="D:\blambeau\Work\ucl\thesis\writing\src\2-framework\images\start-stop-2.png"/>
+              <p:cNvPicPr>
+                <a:picLocks noChangeAspect="1" noChangeArrowheads="1"/>
+              </p:cNvPicPr>
+              <p:nvPr/>
+            </p:nvPicPr>
+            <p:blipFill>
+              <a:blip r:embed="rId7" cstate="print"/>
+              <a:srcRect/>
+              <a:stretch>
+                <a:fillRect/>
+              </a:stretch>
+            </p:blipFill>
+            <p:spPr bwMode="auto">
+              <a:xfrm>
+                <a:off x="4164728" y="5405409"/>
+                <a:ext cx="786384" cy="368046"/>
+              </a:xfrm>
+              <a:prstGeom prst="rect">
+                <a:avLst/>
+              </a:prstGeom>
+              <a:noFill/>
+            </p:spPr>
+          </p:pic>
+          <p:sp>
+            <p:nvSpPr>
+              <p:cNvPr id="14" name="ZoneTexte 13"/>
+              <p:cNvSpPr txBox="1"/>
+              <p:nvPr/>
+            </p:nvSpPr>
+            <p:spPr>
+              <a:xfrm>
+                <a:off x="3781719" y="5602013"/>
+                <a:ext cx="428322" cy="400110"/>
+              </a:xfrm>
+              <a:prstGeom prst="rect">
+                <a:avLst/>
+              </a:prstGeom>
+              <a:noFill/>
+            </p:spPr>
+            <p:txBody>
+              <a:bodyPr wrap="none" rtlCol="0">
+                <a:spAutoFit/>
+              </a:bodyPr>
+              <a:lstStyle/>
+              <a:p>
+                <a:r>
+                  <a:rPr lang="fr-BE" sz="2000" b="1" dirty="0" smtClean="0"/>
+                  <a:t>||</a:t>
+                </a:r>
+                <a:endParaRPr lang="fr-BE" sz="2000" b="1" dirty="0"/>
               </a:p>
             </p:txBody>
           </p:sp>
         </p:grpSp>
         <p:sp>
           <p:nvSpPr>
-            <p:cNvPr id="28" name="Nuage 27"/>
-            <p:cNvSpPr/>
+            <p:cNvPr id="17" name="ZoneTexte 16"/>
+            <p:cNvSpPr txBox="1"/>
             <p:nvPr/>
           </p:nvSpPr>
           <p:spPr>
             <a:xfrm>
-              <a:off x="3347864" y="2996952"/>
-              <a:ext cx="2304256" cy="792088"/>
-            </a:xfrm>
-            <a:prstGeom prst="cloud">
-              <a:avLst/>
-            </a:prstGeom>
-          </p:spPr>
-          <p:style>
-            <a:lnRef idx="2">
-              <a:schemeClr val="dk1"/>
-            </a:lnRef>
-            <a:fillRef idx="1">
-              <a:schemeClr val="lt1"/>
-            </a:fillRef>
-            <a:effectRef idx="0">
-              <a:schemeClr val="dk1"/>
-            </a:effectRef>
-            <a:fontRef idx="minor">
-              <a:schemeClr val="dk1"/>
-            </a:fontRef>
-          </p:style>
+              <a:off x="1248661" y="1986385"/>
+              <a:ext cx="968791" cy="461665"/>
+            </a:xfrm>
+            <a:prstGeom prst="rect">
+              <a:avLst/>
+            </a:prstGeom>
+            <a:noFill/>
+          </p:spPr>
           <p:txBody>
-            <a:bodyPr wrap="none" tIns="108000" rtlCol="0" anchor="ctr" anchorCtr="1"/>
+            <a:bodyPr wrap="none" rtlCol="0">
+              <a:spAutoFit/>
+            </a:bodyPr>
             <a:lstStyle/>
             <a:p>
-              <a:pPr algn="ctr"/>
+              <a:pPr algn="r"/>
               <a:r>
-                <a:rPr lang="fr-BE" sz="1600" smtClean="0"/>
-                <a:t>       Trace semantics </a:t>
+                <a:rPr lang="fr-BE" sz="2400" dirty="0" smtClean="0"/>
+                <a:t>Traces</a:t>
               </a:r>
-              <a:r>
-                <a:rPr lang="fr-BE" sz="1600" smtClean="0"/>
-                <a:t>(LTS) </a:t>
-              </a:r>
-              <a:br>
-                <a:rPr lang="fr-BE" sz="1600" smtClean="0"/>
-              </a:br>
-              <a:r>
-                <a:rPr lang="fr-BE" sz="1600" smtClean="0"/>
-                <a:t>+ Fluents</a:t>
-              </a:r>
-              <a:endParaRPr lang="fr-BE" sz="1600"/>
             </a:p>
           </p:txBody>
         </p:sp>
         <p:sp>
           <p:nvSpPr>
-            <p:cNvPr id="39" name="Forme libre 38"/>
+            <p:cNvPr id="18" name="ZoneTexte 17"/>
+            <p:cNvSpPr txBox="1"/>
+            <p:nvPr/>
+          </p:nvSpPr>
+          <p:spPr>
+            <a:xfrm>
+              <a:off x="677289" y="3429001"/>
+              <a:ext cx="1540165" cy="461665"/>
+            </a:xfrm>
+            <a:prstGeom prst="rect">
+              <a:avLst/>
+            </a:prstGeom>
+            <a:noFill/>
+          </p:spPr>
+          <p:txBody>
+            <a:bodyPr wrap="none" rtlCol="0">
+              <a:spAutoFit/>
+            </a:bodyPr>
+            <a:lstStyle/>
+            <a:p>
+              <a:pPr algn="r"/>
+              <a:r>
+                <a:rPr lang="fr-BE" sz="2400" dirty="0" smtClean="0"/>
+                <a:t>System LTS</a:t>
+              </a:r>
+              <a:endParaRPr lang="fr-BE" sz="2400" dirty="0" smtClean="0"/>
+            </a:p>
+          </p:txBody>
+        </p:sp>
+        <p:sp>
+          <p:nvSpPr>
+            <p:cNvPr id="19" name="ZoneTexte 18"/>
+            <p:cNvSpPr txBox="1"/>
+            <p:nvPr/>
+          </p:nvSpPr>
+          <p:spPr>
+            <a:xfrm>
+              <a:off x="714348" y="4980763"/>
+              <a:ext cx="1503105" cy="461665"/>
+            </a:xfrm>
+            <a:prstGeom prst="rect">
+              <a:avLst/>
+            </a:prstGeom>
+            <a:noFill/>
+          </p:spPr>
+          <p:txBody>
+            <a:bodyPr wrap="square" rtlCol="0">
+              <a:spAutoFit/>
+            </a:bodyPr>
+            <a:lstStyle/>
+            <a:p>
+              <a:pPr algn="r"/>
+              <a:r>
+                <a:rPr lang="fr-BE" sz="2400" dirty="0" smtClean="0"/>
+                <a:t>Agent </a:t>
+              </a:r>
+              <a:r>
+                <a:rPr lang="fr-BE" sz="2400" dirty="0" err="1" smtClean="0"/>
+                <a:t>LTSs</a:t>
+              </a:r>
+              <a:endParaRPr lang="fr-BE" sz="2400" dirty="0" smtClean="0"/>
+            </a:p>
+          </p:txBody>
+        </p:sp>
+        <p:sp>
+          <p:nvSpPr>
+            <p:cNvPr id="20" name="Forme libre 19"/>
             <p:cNvSpPr/>
             <p:nvPr/>
           </p:nvSpPr>
           <p:spPr>
             <a:xfrm>
-              <a:off x="4427220" y="1628800"/>
-              <a:ext cx="243840" cy="1224136"/>
+              <a:off x="5715008" y="831273"/>
+              <a:ext cx="417945" cy="1311843"/>
             </a:xfrm>
             <a:custGeom>
               <a:avLst/>
               <a:gdLst>
-                <a:gd name="connsiteX0" fmla="*/ 0 w 243840"/>
-                <a:gd name="connsiteY0" fmla="*/ 0 h 762000"/>
-                <a:gd name="connsiteX1" fmla="*/ 228600 w 243840"/>
-                <a:gd name="connsiteY1" fmla="*/ 365760 h 762000"/>
-                <a:gd name="connsiteX2" fmla="*/ 91440 w 243840"/>
-                <a:gd name="connsiteY2" fmla="*/ 762000 h 762000"/>
+                <a:gd name="connsiteX0" fmla="*/ 13855 w 417945"/>
+                <a:gd name="connsiteY0" fmla="*/ 0 h 1731818"/>
+                <a:gd name="connsiteX1" fmla="*/ 415636 w 417945"/>
+                <a:gd name="connsiteY1" fmla="*/ 831272 h 1731818"/>
+                <a:gd name="connsiteX2" fmla="*/ 0 w 417945"/>
+                <a:gd name="connsiteY2" fmla="*/ 1731818 h 1731818"/>
               </a:gdLst>
               <a:ahLst/>
               <a:cxnLst>
@@ -12853,39 +14587,36 @@
               </a:cxnLst>
               <a:rect l="l" t="t" r="r" b="b"/>
               <a:pathLst>
-                <a:path w="243840" h="762000">
+                <a:path w="417945" h="1731818">
                   <a:moveTo>
-                    <a:pt x="0" y="0"/>
+                    <a:pt x="13855" y="0"/>
                   </a:moveTo>
                   <a:cubicBezTo>
-                    <a:pt x="106680" y="119380"/>
-                    <a:pt x="213360" y="238760"/>
-                    <a:pt x="228600" y="365760"/>
+                    <a:pt x="215900" y="271318"/>
+                    <a:pt x="417945" y="542636"/>
+                    <a:pt x="415636" y="831272"/>
                   </a:cubicBezTo>
                   <a:cubicBezTo>
-                    <a:pt x="243840" y="492760"/>
-                    <a:pt x="167640" y="627380"/>
-                    <a:pt x="91440" y="762000"/>
+                    <a:pt x="413327" y="1119908"/>
+                    <a:pt x="206663" y="1425863"/>
+                    <a:pt x="0" y="1731818"/>
                   </a:cubicBezTo>
                 </a:path>
               </a:pathLst>
             </a:custGeom>
-            <a:ln>
-              <a:solidFill>
-                <a:srgbClr val="00B050"/>
-              </a:solidFill>
-              <a:tailEnd type="triangle" w="lg" len="lg"/>
+            <a:ln w="38100">
+              <a:tailEnd type="triangle" w="med" len="lg"/>
             </a:ln>
           </p:spPr>
           <p:style>
             <a:lnRef idx="2">
-              <a:schemeClr val="accent3"/>
+              <a:schemeClr val="dk1"/>
             </a:lnRef>
             <a:fillRef idx="0">
-              <a:schemeClr val="accent3"/>
+              <a:schemeClr val="dk1"/>
             </a:fillRef>
             <a:effectRef idx="1">
-              <a:schemeClr val="accent3"/>
+              <a:schemeClr val="dk1"/>
             </a:effectRef>
             <a:fontRef idx="minor">
               <a:schemeClr val="tx1"/>
@@ -12902,24 +14633,24 @@
         </p:sp>
         <p:sp>
           <p:nvSpPr>
-            <p:cNvPr id="41" name="Forme libre 40"/>
+            <p:cNvPr id="22" name="Forme libre 21"/>
             <p:cNvSpPr/>
             <p:nvPr/>
           </p:nvSpPr>
           <p:spPr>
             <a:xfrm>
-              <a:off x="3055620" y="2717676"/>
-              <a:ext cx="655320" cy="274320"/>
+              <a:off x="5715008" y="2428868"/>
+              <a:ext cx="417945" cy="1311843"/>
             </a:xfrm>
             <a:custGeom>
               <a:avLst/>
               <a:gdLst>
-                <a:gd name="connsiteX0" fmla="*/ 0 w 655320"/>
-                <a:gd name="connsiteY0" fmla="*/ 91440 h 274320"/>
-                <a:gd name="connsiteX1" fmla="*/ 289560 w 655320"/>
-                <a:gd name="connsiteY1" fmla="*/ 30480 h 274320"/>
-                <a:gd name="connsiteX2" fmla="*/ 655320 w 655320"/>
-                <a:gd name="connsiteY2" fmla="*/ 274320 h 274320"/>
+                <a:gd name="connsiteX0" fmla="*/ 13855 w 417945"/>
+                <a:gd name="connsiteY0" fmla="*/ 0 h 1731818"/>
+                <a:gd name="connsiteX1" fmla="*/ 415636 w 417945"/>
+                <a:gd name="connsiteY1" fmla="*/ 831272 h 1731818"/>
+                <a:gd name="connsiteX2" fmla="*/ 0 w 417945"/>
+                <a:gd name="connsiteY2" fmla="*/ 1731818 h 1731818"/>
               </a:gdLst>
               <a:ahLst/>
               <a:cxnLst>
@@ -12935,39 +14666,36 @@
               </a:cxnLst>
               <a:rect l="l" t="t" r="r" b="b"/>
               <a:pathLst>
-                <a:path w="655320" h="274320">
+                <a:path w="417945" h="1731818">
                   <a:moveTo>
-                    <a:pt x="0" y="91440"/>
+                    <a:pt x="13855" y="0"/>
                   </a:moveTo>
                   <a:cubicBezTo>
-                    <a:pt x="90170" y="45720"/>
-                    <a:pt x="180340" y="0"/>
-                    <a:pt x="289560" y="30480"/>
+                    <a:pt x="215900" y="271318"/>
+                    <a:pt x="417945" y="542636"/>
+                    <a:pt x="415636" y="831272"/>
                   </a:cubicBezTo>
                   <a:cubicBezTo>
-                    <a:pt x="398780" y="60960"/>
-                    <a:pt x="527050" y="167640"/>
-                    <a:pt x="655320" y="274320"/>
+                    <a:pt x="413327" y="1119908"/>
+                    <a:pt x="206663" y="1425863"/>
+                    <a:pt x="0" y="1731818"/>
                   </a:cubicBezTo>
                 </a:path>
               </a:pathLst>
             </a:custGeom>
-            <a:ln>
-              <a:solidFill>
-                <a:srgbClr val="00B050"/>
-              </a:solidFill>
-              <a:tailEnd type="triangle" w="lg" len="lg"/>
+            <a:ln w="38100">
+              <a:tailEnd type="triangle" w="med" len="lg"/>
             </a:ln>
           </p:spPr>
           <p:style>
             <a:lnRef idx="2">
-              <a:schemeClr val="accent3"/>
+              <a:schemeClr val="dk1"/>
             </a:lnRef>
             <a:fillRef idx="0">
-              <a:schemeClr val="accent3"/>
+              <a:schemeClr val="dk1"/>
             </a:fillRef>
             <a:effectRef idx="1">
-              <a:schemeClr val="accent3"/>
+              <a:schemeClr val="dk1"/>
             </a:effectRef>
             <a:fontRef idx="minor">
               <a:schemeClr val="tx1"/>
@@ -12984,24 +14712,24 @@
         </p:sp>
         <p:sp>
           <p:nvSpPr>
-            <p:cNvPr id="42" name="Forme libre 41"/>
+            <p:cNvPr id="23" name="Forme libre 22"/>
             <p:cNvSpPr/>
             <p:nvPr/>
           </p:nvSpPr>
           <p:spPr>
             <a:xfrm>
-              <a:off x="5280660" y="3746376"/>
-              <a:ext cx="914400" cy="229870"/>
+              <a:off x="5715008" y="3929066"/>
+              <a:ext cx="417945" cy="1311843"/>
             </a:xfrm>
             <a:custGeom>
               <a:avLst/>
               <a:gdLst>
-                <a:gd name="connsiteX0" fmla="*/ 914400 w 914400"/>
-                <a:gd name="connsiteY0" fmla="*/ 99060 h 229870"/>
-                <a:gd name="connsiteX1" fmla="*/ 327660 w 914400"/>
-                <a:gd name="connsiteY1" fmla="*/ 213360 h 229870"/>
-                <a:gd name="connsiteX2" fmla="*/ 0 w 914400"/>
-                <a:gd name="connsiteY2" fmla="*/ 0 h 229870"/>
+                <a:gd name="connsiteX0" fmla="*/ 13855 w 417945"/>
+                <a:gd name="connsiteY0" fmla="*/ 0 h 1731818"/>
+                <a:gd name="connsiteX1" fmla="*/ 415636 w 417945"/>
+                <a:gd name="connsiteY1" fmla="*/ 831272 h 1731818"/>
+                <a:gd name="connsiteX2" fmla="*/ 0 w 417945"/>
+                <a:gd name="connsiteY2" fmla="*/ 1731818 h 1731818"/>
               </a:gdLst>
               <a:ahLst/>
               <a:cxnLst>
@@ -13017,39 +14745,36 @@
               </a:cxnLst>
               <a:rect l="l" t="t" r="r" b="b"/>
               <a:pathLst>
-                <a:path w="914400" h="229870">
+                <a:path w="417945" h="1731818">
                   <a:moveTo>
-                    <a:pt x="914400" y="99060"/>
+                    <a:pt x="13855" y="0"/>
                   </a:moveTo>
                   <a:cubicBezTo>
-                    <a:pt x="697230" y="164465"/>
-                    <a:pt x="480060" y="229870"/>
-                    <a:pt x="327660" y="213360"/>
+                    <a:pt x="215900" y="271318"/>
+                    <a:pt x="417945" y="542636"/>
+                    <a:pt x="415636" y="831272"/>
                   </a:cubicBezTo>
                   <a:cubicBezTo>
-                    <a:pt x="175260" y="196850"/>
-                    <a:pt x="87630" y="98425"/>
-                    <a:pt x="0" y="0"/>
+                    <a:pt x="413327" y="1119908"/>
+                    <a:pt x="206663" y="1425863"/>
+                    <a:pt x="0" y="1731818"/>
                   </a:cubicBezTo>
                 </a:path>
               </a:pathLst>
             </a:custGeom>
-            <a:ln>
-              <a:solidFill>
-                <a:srgbClr val="00B050"/>
-              </a:solidFill>
-              <a:tailEnd type="triangle" w="lg" len="lg"/>
+            <a:ln w="38100">
+              <a:tailEnd type="triangle" w="med" len="lg"/>
             </a:ln>
           </p:spPr>
           <p:style>
             <a:lnRef idx="2">
-              <a:schemeClr val="accent3"/>
+              <a:schemeClr val="dk1"/>
             </a:lnRef>
             <a:fillRef idx="0">
-              <a:schemeClr val="accent3"/>
+              <a:schemeClr val="dk1"/>
             </a:fillRef>
             <a:effectRef idx="1">
-              <a:schemeClr val="accent3"/>
+              <a:schemeClr val="dk1"/>
             </a:effectRef>
             <a:fontRef idx="minor">
               <a:schemeClr val="tx1"/>
@@ -13066,256 +14791,91 @@
         </p:sp>
         <p:sp>
           <p:nvSpPr>
-            <p:cNvPr id="43" name="Forme libre 42"/>
-            <p:cNvSpPr/>
+            <p:cNvPr id="24" name="ZoneTexte 23"/>
+            <p:cNvSpPr txBox="1"/>
             <p:nvPr/>
           </p:nvSpPr>
           <p:spPr>
             <a:xfrm>
-              <a:off x="4212590" y="3933056"/>
-              <a:ext cx="306070" cy="682000"/>
-            </a:xfrm>
-            <a:custGeom>
-              <a:avLst/>
-              <a:gdLst>
-                <a:gd name="connsiteX0" fmla="*/ 306070 w 306070"/>
-                <a:gd name="connsiteY0" fmla="*/ 678180 h 678180"/>
-                <a:gd name="connsiteX1" fmla="*/ 31750 w 306070"/>
-                <a:gd name="connsiteY1" fmla="*/ 335280 h 678180"/>
-                <a:gd name="connsiteX2" fmla="*/ 115570 w 306070"/>
-                <a:gd name="connsiteY2" fmla="*/ 0 h 678180"/>
-              </a:gdLst>
-              <a:ahLst/>
-              <a:cxnLst>
-                <a:cxn ang="0">
-                  <a:pos x="connsiteX0" y="connsiteY0"/>
-                </a:cxn>
-                <a:cxn ang="0">
-                  <a:pos x="connsiteX1" y="connsiteY1"/>
-                </a:cxn>
-                <a:cxn ang="0">
-                  <a:pos x="connsiteX2" y="connsiteY2"/>
-                </a:cxn>
-              </a:cxnLst>
-              <a:rect l="l" t="t" r="r" b="b"/>
-              <a:pathLst>
-                <a:path w="306070" h="678180">
-                  <a:moveTo>
-                    <a:pt x="306070" y="678180"/>
-                  </a:moveTo>
-                  <a:cubicBezTo>
-                    <a:pt x="184785" y="563245"/>
-                    <a:pt x="63500" y="448310"/>
-                    <a:pt x="31750" y="335280"/>
-                  </a:cubicBezTo>
-                  <a:cubicBezTo>
-                    <a:pt x="0" y="222250"/>
-                    <a:pt x="57785" y="111125"/>
-                    <a:pt x="115570" y="0"/>
-                  </a:cubicBezTo>
-                </a:path>
-              </a:pathLst>
-            </a:custGeom>
-            <a:ln>
-              <a:solidFill>
-                <a:srgbClr val="00B050"/>
-              </a:solidFill>
-              <a:tailEnd type="triangle" w="lg" len="lg"/>
-            </a:ln>
-          </p:spPr>
-          <p:style>
-            <a:lnRef idx="2">
-              <a:schemeClr val="accent3"/>
-            </a:lnRef>
-            <a:fillRef idx="0">
-              <a:schemeClr val="accent3"/>
-            </a:fillRef>
-            <a:effectRef idx="1">
-              <a:schemeClr val="accent3"/>
-            </a:effectRef>
-            <a:fontRef idx="minor">
-              <a:schemeClr val="tx1"/>
-            </a:fontRef>
-          </p:style>
+              <a:off x="6215074" y="1142984"/>
+              <a:ext cx="1455142" cy="461665"/>
+            </a:xfrm>
+            <a:prstGeom prst="rect">
+              <a:avLst/>
+            </a:prstGeom>
+            <a:noFill/>
+          </p:spPr>
           <p:txBody>
-            <a:bodyPr rtlCol="0" anchor="ctr"/>
+            <a:bodyPr wrap="none" rtlCol="0">
+              <a:spAutoFit/>
+            </a:bodyPr>
             <a:lstStyle/>
             <a:p>
-              <a:pPr algn="ctr"/>
-              <a:endParaRPr lang="fr-BE"/>
+              <a:r>
+                <a:rPr lang="fr-BE" sz="2400" i="1" dirty="0" smtClean="0"/>
+                <a:t>Extraction</a:t>
+              </a:r>
+              <a:endParaRPr lang="fr-BE" sz="2400" i="1" dirty="0"/>
             </a:p>
           </p:txBody>
         </p:sp>
         <p:sp>
           <p:nvSpPr>
-            <p:cNvPr id="44" name="ZoneTexte 43"/>
+            <p:cNvPr id="25" name="ZoneTexte 24"/>
             <p:cNvSpPr txBox="1"/>
             <p:nvPr/>
           </p:nvSpPr>
           <p:spPr>
             <a:xfrm>
-              <a:off x="3656785" y="1938898"/>
-              <a:ext cx="1830436" cy="553998"/>
+              <a:off x="6215074" y="2714620"/>
+              <a:ext cx="2003305" cy="461665"/>
             </a:xfrm>
             <a:prstGeom prst="rect">
               <a:avLst/>
             </a:prstGeom>
-            <a:solidFill>
-              <a:schemeClr val="bg1"/>
-            </a:solidFill>
+            <a:noFill/>
           </p:spPr>
           <p:txBody>
-            <a:bodyPr wrap="none" tIns="0" bIns="0" rtlCol="0">
+            <a:bodyPr wrap="none" rtlCol="0">
               <a:spAutoFit/>
             </a:bodyPr>
             <a:lstStyle/>
             <a:p>
-              <a:pPr algn="ctr"/>
               <a:r>
-                <a:rPr lang="fr-BE" b="1" i="1" smtClean="0"/>
-                <a:t>Semantics-driven</a:t>
+                <a:rPr lang="fr-BE" sz="2400" i="1" dirty="0" err="1" smtClean="0"/>
+                <a:t>Generalization</a:t>
               </a:r>
-              <a:br>
-                <a:rPr lang="fr-BE" b="1" i="1" smtClean="0"/>
-              </a:br>
-              <a:r>
-                <a:rPr lang="fr-BE" b="1" i="1" smtClean="0"/>
-                <a:t>model synthesis</a:t>
-              </a:r>
-              <a:endParaRPr lang="fr-BE" b="1" i="1"/>
+              <a:endParaRPr lang="fr-BE" sz="2400" i="1" dirty="0"/>
             </a:p>
           </p:txBody>
         </p:sp>
         <p:sp>
           <p:nvSpPr>
-            <p:cNvPr id="45" name="ZoneTexte 44"/>
+            <p:cNvPr id="26" name="ZoneTexte 25"/>
             <p:cNvSpPr txBox="1"/>
             <p:nvPr/>
           </p:nvSpPr>
           <p:spPr>
             <a:xfrm>
-              <a:off x="6876256" y="4675202"/>
-              <a:ext cx="1872436" cy="553998"/>
+              <a:off x="6215074" y="4286256"/>
+              <a:ext cx="2047997" cy="461665"/>
             </a:xfrm>
             <a:prstGeom prst="rect">
               <a:avLst/>
             </a:prstGeom>
-            <a:solidFill>
-              <a:schemeClr val="bg1"/>
-            </a:solidFill>
+            <a:noFill/>
           </p:spPr>
           <p:txBody>
-            <a:bodyPr wrap="none" tIns="0" bIns="0" rtlCol="0">
+            <a:bodyPr wrap="none" rtlCol="0">
               <a:spAutoFit/>
             </a:bodyPr>
             <a:lstStyle/>
             <a:p>
-              <a:pPr algn="ctr"/>
               <a:r>
-                <a:rPr lang="fr-BE" b="1" i="1" smtClean="0"/>
-                <a:t>Multi-view model</a:t>
+                <a:rPr lang="fr-BE" sz="2400" i="1" dirty="0" err="1" smtClean="0"/>
+                <a:t>Decomposition</a:t>
               </a:r>
-              <a:endParaRPr lang="fr-BE" b="1" i="1" smtClean="0"/>
-            </a:p>
-            <a:p>
-              <a:pPr algn="ctr"/>
-              <a:r>
-                <a:rPr lang="fr-BE" b="1" i="1" smtClean="0"/>
-                <a:t>synthesis</a:t>
-              </a:r>
-              <a:endParaRPr lang="fr-BE" b="1" i="1"/>
-            </a:p>
-          </p:txBody>
-        </p:sp>
-        <p:sp>
-          <p:nvSpPr>
-            <p:cNvPr id="46" name="Forme libre 45"/>
-            <p:cNvSpPr/>
-            <p:nvPr/>
-          </p:nvSpPr>
-          <p:spPr>
-            <a:xfrm>
-              <a:off x="6515100" y="4371216"/>
-              <a:ext cx="861060" cy="327660"/>
-            </a:xfrm>
-            <a:custGeom>
-              <a:avLst/>
-              <a:gdLst>
-                <a:gd name="connsiteX0" fmla="*/ 0 w 861060"/>
-                <a:gd name="connsiteY0" fmla="*/ 0 h 327660"/>
-                <a:gd name="connsiteX1" fmla="*/ 312420 w 861060"/>
-                <a:gd name="connsiteY1" fmla="*/ 114300 h 327660"/>
-                <a:gd name="connsiteX2" fmla="*/ 662940 w 861060"/>
-                <a:gd name="connsiteY2" fmla="*/ 83820 h 327660"/>
-                <a:gd name="connsiteX3" fmla="*/ 861060 w 861060"/>
-                <a:gd name="connsiteY3" fmla="*/ 327660 h 327660"/>
-              </a:gdLst>
-              <a:ahLst/>
-              <a:cxnLst>
-                <a:cxn ang="0">
-                  <a:pos x="connsiteX0" y="connsiteY0"/>
-                </a:cxn>
-                <a:cxn ang="0">
-                  <a:pos x="connsiteX1" y="connsiteY1"/>
-                </a:cxn>
-                <a:cxn ang="0">
-                  <a:pos x="connsiteX2" y="connsiteY2"/>
-                </a:cxn>
-                <a:cxn ang="0">
-                  <a:pos x="connsiteX3" y="connsiteY3"/>
-                </a:cxn>
-              </a:cxnLst>
-              <a:rect l="l" t="t" r="r" b="b"/>
-              <a:pathLst>
-                <a:path w="861060" h="327660">
-                  <a:moveTo>
-                    <a:pt x="0" y="0"/>
-                  </a:moveTo>
-                  <a:cubicBezTo>
-                    <a:pt x="100965" y="50165"/>
-                    <a:pt x="201930" y="100330"/>
-                    <a:pt x="312420" y="114300"/>
-                  </a:cubicBezTo>
-                  <a:cubicBezTo>
-                    <a:pt x="422910" y="128270"/>
-                    <a:pt x="571500" y="48260"/>
-                    <a:pt x="662940" y="83820"/>
-                  </a:cubicBezTo>
-                  <a:cubicBezTo>
-                    <a:pt x="754380" y="119380"/>
-                    <a:pt x="807720" y="223520"/>
-                    <a:pt x="861060" y="327660"/>
-                  </a:cubicBezTo>
-                </a:path>
-              </a:pathLst>
-            </a:custGeom>
-            <a:ln w="50800">
-              <a:solidFill>
-                <a:srgbClr val="00B050"/>
-              </a:solidFill>
-              <a:prstDash val="dash"/>
-            </a:ln>
-          </p:spPr>
-          <p:style>
-            <a:lnRef idx="1">
-              <a:schemeClr val="accent1"/>
-            </a:lnRef>
-            <a:fillRef idx="0">
-              <a:schemeClr val="accent1"/>
-            </a:fillRef>
-            <a:effectRef idx="0">
-              <a:schemeClr val="accent1"/>
-            </a:effectRef>
-            <a:fontRef idx="minor">
-              <a:schemeClr val="tx1"/>
-            </a:fontRef>
-          </p:style>
-          <p:txBody>
-            <a:bodyPr rtlCol="0" anchor="ctr"/>
-            <a:lstStyle/>
-            <a:p>
-              <a:pPr algn="ctr"/>
-              <a:endParaRPr lang="fr-BE"/>
+              <a:endParaRPr lang="fr-BE" sz="2400" i="1" dirty="0"/>
             </a:p>
           </p:txBody>
         </p:sp>
@@ -13609,4 +15169,287 @@
   <a:objectDefaults/>
   <a:extraClrSchemeLst/>
 </a:theme>
+</file>
+
+<file path=ppt/theme/theme2.xml><?xml version="1.0" encoding="utf-8"?>
+<a:theme xmlns:a="http://schemas.openxmlformats.org/drawingml/2006/main" name="Thème Office">
+  <a:themeElements>
+    <a:clrScheme name="Office">
+      <a:dk1>
+        <a:sysClr val="windowText" lastClr="000000"/>
+      </a:dk1>
+      <a:lt1>
+        <a:sysClr val="window" lastClr="FFFFFF"/>
+      </a:lt1>
+      <a:dk2>
+        <a:srgbClr val="1F497D"/>
+      </a:dk2>
+      <a:lt2>
+        <a:srgbClr val="EEECE1"/>
+      </a:lt2>
+      <a:accent1>
+        <a:srgbClr val="4F81BD"/>
+      </a:accent1>
+      <a:accent2>
+        <a:srgbClr val="C0504D"/>
+      </a:accent2>
+      <a:accent3>
+        <a:srgbClr val="9BBB59"/>
+      </a:accent3>
+      <a:accent4>
+        <a:srgbClr val="8064A2"/>
+      </a:accent4>
+      <a:accent5>
+        <a:srgbClr val="4BACC6"/>
+      </a:accent5>
+      <a:accent6>
+        <a:srgbClr val="F79646"/>
+      </a:accent6>
+      <a:hlink>
+        <a:srgbClr val="0000FF"/>
+      </a:hlink>
+      <a:folHlink>
+        <a:srgbClr val="800080"/>
+      </a:folHlink>
+    </a:clrScheme>
+    <a:fontScheme name="Office">
+      <a:majorFont>
+        <a:latin typeface="Calibri"/>
+        <a:ea typeface=""/>
+        <a:cs typeface=""/>
+        <a:font script="Jpan" typeface="ＭＳ Ｐゴシック"/>
+        <a:font script="Hang" typeface="맑은 고딕"/>
+        <a:font script="Hans" typeface="宋体"/>
+        <a:font script="Hant" typeface="新細明體"/>
+        <a:font script="Arab" typeface="Times New Roman"/>
+        <a:font script="Hebr" typeface="Times New Roman"/>
+        <a:font script="Thai" typeface="Angsana New"/>
+        <a:font script="Ethi" typeface="Nyala"/>
+        <a:font script="Beng" typeface="Vrinda"/>
+        <a:font script="Gujr" typeface="Shruti"/>
+        <a:font script="Khmr" typeface="MoolBoran"/>
+        <a:font script="Knda" typeface="Tunga"/>
+        <a:font script="Guru" typeface="Raavi"/>
+        <a:font script="Cans" typeface="Euphemia"/>
+        <a:font script="Cher" typeface="Plantagenet Cherokee"/>
+        <a:font script="Yiii" typeface="Microsoft Yi Baiti"/>
+        <a:font script="Tibt" typeface="Microsoft Himalaya"/>
+        <a:font script="Thaa" typeface="MV Boli"/>
+        <a:font script="Deva" typeface="Mangal"/>
+        <a:font script="Telu" typeface="Gautami"/>
+        <a:font script="Taml" typeface="Latha"/>
+        <a:font script="Syrc" typeface="Estrangelo Edessa"/>
+        <a:font script="Orya" typeface="Kalinga"/>
+        <a:font script="Mlym" typeface="Kartika"/>
+        <a:font script="Laoo" typeface="DokChampa"/>
+        <a:font script="Sinh" typeface="Iskoola Pota"/>
+        <a:font script="Mong" typeface="Mongolian Baiti"/>
+        <a:font script="Viet" typeface="Times New Roman"/>
+        <a:font script="Uigh" typeface="Microsoft Uighur"/>
+      </a:majorFont>
+      <a:minorFont>
+        <a:latin typeface="Calibri"/>
+        <a:ea typeface=""/>
+        <a:cs typeface=""/>
+        <a:font script="Jpan" typeface="ＭＳ Ｐゴシック"/>
+        <a:font script="Hang" typeface="맑은 고딕"/>
+        <a:font script="Hans" typeface="宋体"/>
+        <a:font script="Hant" typeface="新細明體"/>
+        <a:font script="Arab" typeface="Arial"/>
+        <a:font script="Hebr" typeface="Arial"/>
+        <a:font script="Thai" typeface="Cordia New"/>
+        <a:font script="Ethi" typeface="Nyala"/>
+        <a:font script="Beng" typeface="Vrinda"/>
+        <a:font script="Gujr" typeface="Shruti"/>
+        <a:font script="Khmr" typeface="DaunPenh"/>
+        <a:font script="Knda" typeface="Tunga"/>
+        <a:font script="Guru" typeface="Raavi"/>
+        <a:font script="Cans" typeface="Euphemia"/>
+        <a:font script="Cher" typeface="Plantagenet Cherokee"/>
+        <a:font script="Yiii" typeface="Microsoft Yi Baiti"/>
+        <a:font script="Tibt" typeface="Microsoft Himalaya"/>
+        <a:font script="Thaa" typeface="MV Boli"/>
+        <a:font script="Deva" typeface="Mangal"/>
+        <a:font script="Telu" typeface="Gautami"/>
+        <a:font script="Taml" typeface="Latha"/>
+        <a:font script="Syrc" typeface="Estrangelo Edessa"/>
+        <a:font script="Orya" typeface="Kalinga"/>
+        <a:font script="Mlym" typeface="Kartika"/>
+        <a:font script="Laoo" typeface="DokChampa"/>
+        <a:font script="Sinh" typeface="Iskoola Pota"/>
+        <a:font script="Mong" typeface="Mongolian Baiti"/>
+        <a:font script="Viet" typeface="Arial"/>
+        <a:font script="Uigh" typeface="Microsoft Uighur"/>
+      </a:minorFont>
+    </a:fontScheme>
+    <a:fmtScheme name="Office">
+      <a:fillStyleLst>
+        <a:solidFill>
+          <a:schemeClr val="phClr"/>
+        </a:solidFill>
+        <a:gradFill rotWithShape="1">
+          <a:gsLst>
+            <a:gs pos="0">
+              <a:schemeClr val="phClr">
+                <a:tint val="50000"/>
+                <a:satMod val="300000"/>
+              </a:schemeClr>
+            </a:gs>
+            <a:gs pos="35000">
+              <a:schemeClr val="phClr">
+                <a:tint val="37000"/>
+                <a:satMod val="300000"/>
+              </a:schemeClr>
+            </a:gs>
+            <a:gs pos="100000">
+              <a:schemeClr val="phClr">
+                <a:tint val="15000"/>
+                <a:satMod val="350000"/>
+              </a:schemeClr>
+            </a:gs>
+          </a:gsLst>
+          <a:lin ang="16200000" scaled="1"/>
+        </a:gradFill>
+        <a:gradFill rotWithShape="1">
+          <a:gsLst>
+            <a:gs pos="0">
+              <a:schemeClr val="phClr">
+                <a:shade val="51000"/>
+                <a:satMod val="130000"/>
+              </a:schemeClr>
+            </a:gs>
+            <a:gs pos="80000">
+              <a:schemeClr val="phClr">
+                <a:shade val="93000"/>
+                <a:satMod val="130000"/>
+              </a:schemeClr>
+            </a:gs>
+            <a:gs pos="100000">
+              <a:schemeClr val="phClr">
+                <a:shade val="94000"/>
+                <a:satMod val="135000"/>
+              </a:schemeClr>
+            </a:gs>
+          </a:gsLst>
+          <a:lin ang="16200000" scaled="0"/>
+        </a:gradFill>
+      </a:fillStyleLst>
+      <a:lnStyleLst>
+        <a:ln w="9525" cap="flat" cmpd="sng" algn="ctr">
+          <a:solidFill>
+            <a:schemeClr val="phClr">
+              <a:shade val="95000"/>
+              <a:satMod val="105000"/>
+            </a:schemeClr>
+          </a:solidFill>
+          <a:prstDash val="solid"/>
+        </a:ln>
+        <a:ln w="25400" cap="flat" cmpd="sng" algn="ctr">
+          <a:solidFill>
+            <a:schemeClr val="phClr"/>
+          </a:solidFill>
+          <a:prstDash val="solid"/>
+        </a:ln>
+        <a:ln w="38100" cap="flat" cmpd="sng" algn="ctr">
+          <a:solidFill>
+            <a:schemeClr val="phClr"/>
+          </a:solidFill>
+          <a:prstDash val="solid"/>
+        </a:ln>
+      </a:lnStyleLst>
+      <a:effectStyleLst>
+        <a:effectStyle>
+          <a:effectLst>
+            <a:outerShdw blurRad="40000" dist="20000" dir="5400000" rotWithShape="0">
+              <a:srgbClr val="000000">
+                <a:alpha val="38000"/>
+              </a:srgbClr>
+            </a:outerShdw>
+          </a:effectLst>
+        </a:effectStyle>
+        <a:effectStyle>
+          <a:effectLst>
+            <a:outerShdw blurRad="40000" dist="23000" dir="5400000" rotWithShape="0">
+              <a:srgbClr val="000000">
+                <a:alpha val="35000"/>
+              </a:srgbClr>
+            </a:outerShdw>
+          </a:effectLst>
+        </a:effectStyle>
+        <a:effectStyle>
+          <a:effectLst>
+            <a:outerShdw blurRad="40000" dist="23000" dir="5400000" rotWithShape="0">
+              <a:srgbClr val="000000">
+                <a:alpha val="35000"/>
+              </a:srgbClr>
+            </a:outerShdw>
+          </a:effectLst>
+          <a:scene3d>
+            <a:camera prst="orthographicFront">
+              <a:rot lat="0" lon="0" rev="0"/>
+            </a:camera>
+            <a:lightRig rig="threePt" dir="t">
+              <a:rot lat="0" lon="0" rev="1200000"/>
+            </a:lightRig>
+          </a:scene3d>
+          <a:sp3d>
+            <a:bevelT w="63500" h="25400"/>
+          </a:sp3d>
+        </a:effectStyle>
+      </a:effectStyleLst>
+      <a:bgFillStyleLst>
+        <a:solidFill>
+          <a:schemeClr val="phClr"/>
+        </a:solidFill>
+        <a:gradFill rotWithShape="1">
+          <a:gsLst>
+            <a:gs pos="0">
+              <a:schemeClr val="phClr">
+                <a:tint val="40000"/>
+                <a:satMod val="350000"/>
+              </a:schemeClr>
+            </a:gs>
+            <a:gs pos="40000">
+              <a:schemeClr val="phClr">
+                <a:tint val="45000"/>
+                <a:shade val="99000"/>
+                <a:satMod val="350000"/>
+              </a:schemeClr>
+            </a:gs>
+            <a:gs pos="100000">
+              <a:schemeClr val="phClr">
+                <a:shade val="20000"/>
+                <a:satMod val="255000"/>
+              </a:schemeClr>
+            </a:gs>
+          </a:gsLst>
+          <a:path path="circle">
+            <a:fillToRect l="50000" t="-80000" r="50000" b="180000"/>
+          </a:path>
+        </a:gradFill>
+        <a:gradFill rotWithShape="1">
+          <a:gsLst>
+            <a:gs pos="0">
+              <a:schemeClr val="phClr">
+                <a:tint val="80000"/>
+                <a:satMod val="300000"/>
+              </a:schemeClr>
+            </a:gs>
+            <a:gs pos="100000">
+              <a:schemeClr val="phClr">
+                <a:shade val="30000"/>
+                <a:satMod val="200000"/>
+              </a:schemeClr>
+            </a:gs>
+          </a:gsLst>
+          <a:path path="circle">
+            <a:fillToRect l="50000" t="50000" r="50000" b="50000"/>
+          </a:path>
+        </a:gradFill>
+      </a:bgFillStyleLst>
+    </a:fmtScheme>
+  </a:themeElements>
+  <a:objectDefaults/>
+  <a:extraClrSchemeLst/>
+</a:theme>
 </file>
</xml_diff>

<commit_message>
Updated images for second_cycle fluent
</commit_message>
<xml_diff>
--- a/writing/images/train.pptx
+++ b/writing/images/train.pptx
@@ -4792,832 +4792,6 @@
       </p:grpSpPr>
       <p:grpSp>
         <p:nvGrpSpPr>
-          <p:cNvPr id="25" name="Groupe 24"/>
-          <p:cNvGrpSpPr/>
-          <p:nvPr/>
-        </p:nvGrpSpPr>
-        <p:grpSpPr>
-          <a:xfrm>
-            <a:off x="1619672" y="3429000"/>
-            <a:ext cx="4680520" cy="2088232"/>
-            <a:chOff x="1619672" y="999778"/>
-            <a:chExt cx="4680520" cy="2088232"/>
-          </a:xfrm>
-        </p:grpSpPr>
-        <p:sp>
-          <p:nvSpPr>
-            <p:cNvPr id="26" name="Rectangle 25"/>
-            <p:cNvSpPr/>
-            <p:nvPr/>
-          </p:nvSpPr>
-          <p:spPr>
-            <a:xfrm>
-              <a:off x="1619672" y="999778"/>
-              <a:ext cx="4680520" cy="2088232"/>
-            </a:xfrm>
-            <a:prstGeom prst="rect">
-              <a:avLst/>
-            </a:prstGeom>
-            <a:ln w="9525"/>
-          </p:spPr>
-          <p:style>
-            <a:lnRef idx="2">
-              <a:schemeClr val="dk1"/>
-            </a:lnRef>
-            <a:fillRef idx="1">
-              <a:schemeClr val="lt1"/>
-            </a:fillRef>
-            <a:effectRef idx="0">
-              <a:schemeClr val="dk1"/>
-            </a:effectRef>
-            <a:fontRef idx="minor">
-              <a:schemeClr val="dk1"/>
-            </a:fontRef>
-          </p:style>
-          <p:txBody>
-            <a:bodyPr rtlCol="0" anchor="ctr"/>
-            <a:lstStyle/>
-            <a:p>
-              <a:pPr algn="ctr"/>
-              <a:endParaRPr lang="fr-BE"/>
-            </a:p>
-          </p:txBody>
-        </p:sp>
-        <p:grpSp>
-          <p:nvGrpSpPr>
-            <p:cNvPr id="28" name="Groupe 122"/>
-            <p:cNvGrpSpPr/>
-            <p:nvPr/>
-          </p:nvGrpSpPr>
-          <p:grpSpPr>
-            <a:xfrm>
-              <a:off x="1700740" y="1168717"/>
-              <a:ext cx="4529459" cy="1748518"/>
-              <a:chOff x="1700740" y="1168717"/>
-              <a:chExt cx="4529459" cy="1748518"/>
-            </a:xfrm>
-          </p:grpSpPr>
-          <p:sp>
-            <p:nvSpPr>
-              <p:cNvPr id="29" name="Ellipse 3"/>
-              <p:cNvSpPr/>
-              <p:nvPr/>
-            </p:nvSpPr>
-            <p:spPr>
-              <a:xfrm>
-                <a:off x="3834994" y="1308783"/>
-                <a:ext cx="360000" cy="360000"/>
-              </a:xfrm>
-              <a:prstGeom prst="ellipse">
-                <a:avLst/>
-              </a:prstGeom>
-            </p:spPr>
-            <p:style>
-              <a:lnRef idx="2">
-                <a:schemeClr val="dk1"/>
-              </a:lnRef>
-              <a:fillRef idx="1">
-                <a:schemeClr val="lt1"/>
-              </a:fillRef>
-              <a:effectRef idx="0">
-                <a:schemeClr val="dk1"/>
-              </a:effectRef>
-              <a:fontRef idx="minor">
-                <a:schemeClr val="dk1"/>
-              </a:fontRef>
-            </p:style>
-            <p:txBody>
-              <a:bodyPr rtlCol="0" anchor="ctr"/>
-              <a:lstStyle/>
-              <a:p>
-                <a:pPr algn="ctr"/>
-                <a:endParaRPr lang="fr-BE" noProof="1"/>
-              </a:p>
-            </p:txBody>
-          </p:sp>
-          <p:sp>
-            <p:nvSpPr>
-              <p:cNvPr id="30" name="Ellipse 29"/>
-              <p:cNvSpPr/>
-              <p:nvPr/>
-            </p:nvSpPr>
-            <p:spPr>
-              <a:xfrm>
-                <a:off x="4715209" y="2335903"/>
-                <a:ext cx="360000" cy="360000"/>
-              </a:xfrm>
-              <a:prstGeom prst="ellipse">
-                <a:avLst/>
-              </a:prstGeom>
-            </p:spPr>
-            <p:style>
-              <a:lnRef idx="2">
-                <a:schemeClr val="dk1"/>
-              </a:lnRef>
-              <a:fillRef idx="1">
-                <a:schemeClr val="lt1"/>
-              </a:fillRef>
-              <a:effectRef idx="0">
-                <a:schemeClr val="dk1"/>
-              </a:effectRef>
-              <a:fontRef idx="minor">
-                <a:schemeClr val="dk1"/>
-              </a:fontRef>
-            </p:style>
-            <p:txBody>
-              <a:bodyPr wrap="none" rtlCol="0" anchor="ctr"/>
-              <a:lstStyle/>
-              <a:p>
-                <a:pPr algn="ctr"/>
-                <a:r>
-                  <a:rPr lang="fr-BE" sz="1400" noProof="1" smtClean="0"/>
-                  <a:t>q</a:t>
-                </a:r>
-                <a:r>
-                  <a:rPr lang="fr-BE" sz="1400" baseline="-25000" noProof="1" smtClean="0"/>
-                  <a:t>t</a:t>
-                </a:r>
-                <a:endParaRPr lang="fr-BE" sz="1400" baseline="-25000" noProof="1"/>
-              </a:p>
-            </p:txBody>
-          </p:sp>
-          <p:sp>
-            <p:nvSpPr>
-              <p:cNvPr id="32" name="Ellipse 31"/>
-              <p:cNvSpPr/>
-              <p:nvPr/>
-            </p:nvSpPr>
-            <p:spPr>
-              <a:xfrm>
-                <a:off x="2907399" y="2342253"/>
-                <a:ext cx="360000" cy="360000"/>
-              </a:xfrm>
-              <a:prstGeom prst="ellipse">
-                <a:avLst/>
-              </a:prstGeom>
-            </p:spPr>
-            <p:style>
-              <a:lnRef idx="2">
-                <a:schemeClr val="dk1"/>
-              </a:lnRef>
-              <a:fillRef idx="1">
-                <a:schemeClr val="lt1"/>
-              </a:fillRef>
-              <a:effectRef idx="0">
-                <a:schemeClr val="dk1"/>
-              </a:effectRef>
-              <a:fontRef idx="minor">
-                <a:schemeClr val="dk1"/>
-              </a:fontRef>
-            </p:style>
-            <p:txBody>
-              <a:bodyPr wrap="none" rtlCol="0" anchor="ctr"/>
-              <a:lstStyle/>
-              <a:p>
-                <a:pPr algn="ctr"/>
-                <a:r>
-                  <a:rPr lang="fr-BE" sz="1400" noProof="1" smtClean="0"/>
-                  <a:t>q</a:t>
-                </a:r>
-                <a:r>
-                  <a:rPr lang="fr-BE" sz="1400" baseline="-25000" noProof="1" smtClean="0"/>
-                  <a:t>f</a:t>
-                </a:r>
-                <a:endParaRPr lang="fr-BE" sz="1400" baseline="-25000" noProof="1"/>
-              </a:p>
-            </p:txBody>
-          </p:sp>
-          <p:cxnSp>
-            <p:nvCxnSpPr>
-              <p:cNvPr id="33" name="Connecteur droit avec flèche 7"/>
-              <p:cNvCxnSpPr>
-                <a:stCxn id="32" idx="7"/>
-                <a:endCxn id="30" idx="1"/>
-              </p:cNvCxnSpPr>
-              <p:nvPr/>
-            </p:nvCxnSpPr>
-            <p:spPr>
-              <a:xfrm rot="5400000" flipH="1" flipV="1">
-                <a:off x="3988129" y="1615173"/>
-                <a:ext cx="6350" cy="1553252"/>
-              </a:xfrm>
-              <a:prstGeom prst="curvedConnector3">
-                <a:avLst>
-                  <a:gd name="adj1" fmla="val 3330253"/>
-                </a:avLst>
-              </a:prstGeom>
-              <a:ln w="19050">
-                <a:tailEnd type="triangle" w="med" len="lg"/>
-              </a:ln>
-            </p:spPr>
-            <p:style>
-              <a:lnRef idx="1">
-                <a:schemeClr val="dk1"/>
-              </a:lnRef>
-              <a:fillRef idx="0">
-                <a:schemeClr val="dk1"/>
-              </a:fillRef>
-              <a:effectRef idx="0">
-                <a:schemeClr val="dk1"/>
-              </a:effectRef>
-              <a:fontRef idx="minor">
-                <a:schemeClr val="tx1"/>
-              </a:fontRef>
-            </p:style>
-          </p:cxnSp>
-          <p:cxnSp>
-            <p:nvCxnSpPr>
-              <p:cNvPr id="34" name="Connecteur droit avec flèche 7"/>
-              <p:cNvCxnSpPr>
-                <a:stCxn id="30" idx="3"/>
-                <a:endCxn id="32" idx="5"/>
-              </p:cNvCxnSpPr>
-              <p:nvPr/>
-            </p:nvCxnSpPr>
-            <p:spPr>
-              <a:xfrm rot="5400000">
-                <a:off x="3988129" y="1869731"/>
-                <a:ext cx="6350" cy="1553252"/>
-              </a:xfrm>
-              <a:prstGeom prst="curvedConnector3">
-                <a:avLst>
-                  <a:gd name="adj1" fmla="val 3730253"/>
-                </a:avLst>
-              </a:prstGeom>
-              <a:ln w="19050">
-                <a:tailEnd type="triangle" w="med" len="lg"/>
-              </a:ln>
-            </p:spPr>
-            <p:style>
-              <a:lnRef idx="1">
-                <a:schemeClr val="dk1"/>
-              </a:lnRef>
-              <a:fillRef idx="0">
-                <a:schemeClr val="dk1"/>
-              </a:fillRef>
-              <a:effectRef idx="0">
-                <a:schemeClr val="dk1"/>
-              </a:effectRef>
-              <a:fontRef idx="minor">
-                <a:schemeClr val="tx1"/>
-              </a:fontRef>
-            </p:style>
-          </p:cxnSp>
-          <p:cxnSp>
-            <p:nvCxnSpPr>
-              <p:cNvPr id="35" name="Connecteur droit avec flèche 7"/>
-              <p:cNvCxnSpPr>
-                <a:endCxn id="30" idx="0"/>
-              </p:cNvCxnSpPr>
-              <p:nvPr/>
-            </p:nvCxnSpPr>
-            <p:spPr>
-              <a:xfrm rot="16200000" flipH="1">
-                <a:off x="4158821" y="1599514"/>
-                <a:ext cx="719841" cy="752936"/>
-              </a:xfrm>
-              <a:prstGeom prst="straightConnector1">
-                <a:avLst/>
-              </a:prstGeom>
-              <a:ln w="19050">
-                <a:tailEnd type="triangle" w="med" len="lg"/>
-              </a:ln>
-            </p:spPr>
-            <p:style>
-              <a:lnRef idx="1">
-                <a:schemeClr val="dk1"/>
-              </a:lnRef>
-              <a:fillRef idx="0">
-                <a:schemeClr val="dk1"/>
-              </a:fillRef>
-              <a:effectRef idx="0">
-                <a:schemeClr val="dk1"/>
-              </a:effectRef>
-              <a:fontRef idx="minor">
-                <a:schemeClr val="tx1"/>
-              </a:fontRef>
-            </p:style>
-          </p:cxnSp>
-          <p:cxnSp>
-            <p:nvCxnSpPr>
-              <p:cNvPr id="36" name="Connecteur droit avec flèche 7"/>
-              <p:cNvCxnSpPr>
-                <a:endCxn id="32" idx="0"/>
-              </p:cNvCxnSpPr>
-              <p:nvPr/>
-            </p:nvCxnSpPr>
-            <p:spPr>
-              <a:xfrm rot="5400000">
-                <a:off x="3124462" y="1578999"/>
-                <a:ext cx="726191" cy="800316"/>
-              </a:xfrm>
-              <a:prstGeom prst="straightConnector1">
-                <a:avLst/>
-              </a:prstGeom>
-              <a:ln w="19050">
-                <a:tailEnd type="triangle" w="med" len="lg"/>
-              </a:ln>
-            </p:spPr>
-            <p:style>
-              <a:lnRef idx="1">
-                <a:schemeClr val="dk1"/>
-              </a:lnRef>
-              <a:fillRef idx="0">
-                <a:schemeClr val="dk1"/>
-              </a:fillRef>
-              <a:effectRef idx="0">
-                <a:schemeClr val="dk1"/>
-              </a:effectRef>
-              <a:fontRef idx="minor">
-                <a:schemeClr val="tx1"/>
-              </a:fontRef>
-            </p:style>
-          </p:cxnSp>
-          <p:cxnSp>
-            <p:nvCxnSpPr>
-              <p:cNvPr id="38" name="Connecteur droit avec flèche 7"/>
-              <p:cNvCxnSpPr>
-                <a:stCxn id="30" idx="4"/>
-                <a:endCxn id="30" idx="6"/>
-              </p:cNvCxnSpPr>
-              <p:nvPr/>
-            </p:nvCxnSpPr>
-            <p:spPr>
-              <a:xfrm rot="5400000" flipH="1" flipV="1">
-                <a:off x="4895209" y="2515903"/>
-                <a:ext cx="180000" cy="180000"/>
-              </a:xfrm>
-              <a:prstGeom prst="curvedConnector4">
-                <a:avLst>
-                  <a:gd name="adj1" fmla="val -127000"/>
-                  <a:gd name="adj2" fmla="val 227000"/>
-                </a:avLst>
-              </a:prstGeom>
-              <a:ln w="19050">
-                <a:tailEnd type="triangle" w="sm" len="lg"/>
-              </a:ln>
-            </p:spPr>
-            <p:style>
-              <a:lnRef idx="1">
-                <a:schemeClr val="dk1"/>
-              </a:lnRef>
-              <a:fillRef idx="0">
-                <a:schemeClr val="dk1"/>
-              </a:fillRef>
-              <a:effectRef idx="0">
-                <a:schemeClr val="dk1"/>
-              </a:effectRef>
-              <a:fontRef idx="minor">
-                <a:schemeClr val="tx1"/>
-              </a:fontRef>
-            </p:style>
-          </p:cxnSp>
-          <p:cxnSp>
-            <p:nvCxnSpPr>
-              <p:cNvPr id="39" name="Connecteur droit avec flèche 7"/>
-              <p:cNvCxnSpPr>
-                <a:stCxn id="30" idx="0"/>
-                <a:endCxn id="30" idx="6"/>
-              </p:cNvCxnSpPr>
-              <p:nvPr/>
-            </p:nvCxnSpPr>
-            <p:spPr>
-              <a:xfrm rot="16200000" flipH="1">
-                <a:off x="4895209" y="2335903"/>
-                <a:ext cx="180000" cy="180000"/>
-              </a:xfrm>
-              <a:prstGeom prst="curvedConnector4">
-                <a:avLst>
-                  <a:gd name="adj1" fmla="val -127000"/>
-                  <a:gd name="adj2" fmla="val 227000"/>
-                </a:avLst>
-              </a:prstGeom>
-              <a:ln w="19050">
-                <a:tailEnd type="triangle" w="sm" len="lg"/>
-              </a:ln>
-            </p:spPr>
-            <p:style>
-              <a:lnRef idx="1">
-                <a:schemeClr val="dk1"/>
-              </a:lnRef>
-              <a:fillRef idx="0">
-                <a:schemeClr val="dk1"/>
-              </a:fillRef>
-              <a:effectRef idx="0">
-                <a:schemeClr val="dk1"/>
-              </a:effectRef>
-              <a:fontRef idx="minor">
-                <a:schemeClr val="tx1"/>
-              </a:fontRef>
-            </p:style>
-          </p:cxnSp>
-          <p:cxnSp>
-            <p:nvCxnSpPr>
-              <p:cNvPr id="40" name="Connecteur droit avec flèche 7"/>
-              <p:cNvCxnSpPr>
-                <a:stCxn id="32" idx="0"/>
-                <a:endCxn id="32" idx="2"/>
-              </p:cNvCxnSpPr>
-              <p:nvPr/>
-            </p:nvCxnSpPr>
-            <p:spPr>
-              <a:xfrm rot="16200000" flipH="1" flipV="1">
-                <a:off x="2907399" y="2342253"/>
-                <a:ext cx="180000" cy="180000"/>
-              </a:xfrm>
-              <a:prstGeom prst="curvedConnector4">
-                <a:avLst>
-                  <a:gd name="adj1" fmla="val -127000"/>
-                  <a:gd name="adj2" fmla="val 227000"/>
-                </a:avLst>
-              </a:prstGeom>
-              <a:ln w="19050">
-                <a:tailEnd type="triangle" w="sm" len="lg"/>
-              </a:ln>
-            </p:spPr>
-            <p:style>
-              <a:lnRef idx="1">
-                <a:schemeClr val="dk1"/>
-              </a:lnRef>
-              <a:fillRef idx="0">
-                <a:schemeClr val="dk1"/>
-              </a:fillRef>
-              <a:effectRef idx="0">
-                <a:schemeClr val="dk1"/>
-              </a:effectRef>
-              <a:fontRef idx="minor">
-                <a:schemeClr val="tx1"/>
-              </a:fontRef>
-            </p:style>
-          </p:cxnSp>
-          <p:cxnSp>
-            <p:nvCxnSpPr>
-              <p:cNvPr id="41" name="Connecteur droit avec flèche 7"/>
-              <p:cNvCxnSpPr>
-                <a:stCxn id="32" idx="4"/>
-                <a:endCxn id="32" idx="2"/>
-              </p:cNvCxnSpPr>
-              <p:nvPr/>
-            </p:nvCxnSpPr>
-            <p:spPr>
-              <a:xfrm rot="5400000" flipH="1">
-                <a:off x="2907399" y="2522253"/>
-                <a:ext cx="180000" cy="180000"/>
-              </a:xfrm>
-              <a:prstGeom prst="curvedConnector4">
-                <a:avLst>
-                  <a:gd name="adj1" fmla="val -127000"/>
-                  <a:gd name="adj2" fmla="val 227000"/>
-                </a:avLst>
-              </a:prstGeom>
-              <a:ln w="19050">
-                <a:tailEnd type="triangle" w="sm" len="lg"/>
-              </a:ln>
-            </p:spPr>
-            <p:style>
-              <a:lnRef idx="1">
-                <a:schemeClr val="dk1"/>
-              </a:lnRef>
-              <a:fillRef idx="0">
-                <a:schemeClr val="dk1"/>
-              </a:fillRef>
-              <a:effectRef idx="0">
-                <a:schemeClr val="dk1"/>
-              </a:effectRef>
-              <a:fontRef idx="minor">
-                <a:schemeClr val="tx1"/>
-              </a:fontRef>
-            </p:style>
-          </p:cxnSp>
-          <p:cxnSp>
-            <p:nvCxnSpPr>
-              <p:cNvPr id="42" name="Connecteur droit avec flèche 7"/>
-              <p:cNvCxnSpPr/>
-              <p:nvPr/>
-            </p:nvCxnSpPr>
-            <p:spPr>
-              <a:xfrm>
-                <a:off x="3643639" y="1168717"/>
-                <a:ext cx="244076" cy="192787"/>
-              </a:xfrm>
-              <a:prstGeom prst="straightConnector1">
-                <a:avLst/>
-              </a:prstGeom>
-              <a:ln w="19050">
-                <a:tailEnd type="triangle" w="med" len="lg"/>
-              </a:ln>
-            </p:spPr>
-            <p:style>
-              <a:lnRef idx="1">
-                <a:schemeClr val="dk1"/>
-              </a:lnRef>
-              <a:fillRef idx="0">
-                <a:schemeClr val="dk1"/>
-              </a:fillRef>
-              <a:effectRef idx="0">
-                <a:schemeClr val="dk1"/>
-              </a:effectRef>
-              <a:fontRef idx="minor">
-                <a:schemeClr val="tx1"/>
-              </a:fontRef>
-            </p:style>
-          </p:cxnSp>
-          <p:sp>
-            <p:nvSpPr>
-              <p:cNvPr id="43" name="ZoneTexte 42"/>
-              <p:cNvSpPr txBox="1"/>
-              <p:nvPr/>
-            </p:nvSpPr>
-            <p:spPr>
-              <a:xfrm>
-                <a:off x="4143705" y="1811659"/>
-                <a:ext cx="1114088" cy="169277"/>
-              </a:xfrm>
-              <a:prstGeom prst="rect">
-                <a:avLst/>
-              </a:prstGeom>
-              <a:solidFill>
-                <a:schemeClr val="lt1"/>
-              </a:solidFill>
-            </p:spPr>
-            <p:txBody>
-              <a:bodyPr wrap="none" lIns="0" tIns="0" rIns="0" bIns="0" rtlCol="0">
-                <a:spAutoFit/>
-              </a:bodyPr>
-              <a:lstStyle/>
-              <a:p>
-                <a:r>
-                  <a:rPr lang="fr-BE" sz="1100" noProof="1" smtClean="0"/>
-                  <a:t>{[range_extended]}</a:t>
-                </a:r>
-                <a:endParaRPr lang="fr-BE" sz="1100" noProof="1"/>
-              </a:p>
-            </p:txBody>
-          </p:sp>
-          <p:sp>
-            <p:nvSpPr>
-              <p:cNvPr id="44" name="ZoneTexte 43"/>
-              <p:cNvSpPr txBox="1"/>
-              <p:nvPr/>
-            </p:nvSpPr>
-            <p:spPr>
-              <a:xfrm>
-                <a:off x="2643507" y="1811659"/>
-                <a:ext cx="1215076" cy="169277"/>
-              </a:xfrm>
-              <a:prstGeom prst="rect">
-                <a:avLst/>
-              </a:prstGeom>
-              <a:solidFill>
-                <a:schemeClr val="lt1"/>
-              </a:solidFill>
-            </p:spPr>
-            <p:txBody>
-              <a:bodyPr wrap="none" lIns="0" tIns="0" rIns="0" bIns="0" rtlCol="0">
-                <a:spAutoFit/>
-              </a:bodyPr>
-              <a:lstStyle/>
-              <a:p>
-                <a:r>
-                  <a:rPr lang="fr-BE" sz="1100" noProof="1" smtClean="0"/>
-                  <a:t>{[</a:t>
-                </a:r>
-                <a:r>
-                  <a:rPr lang="fr-BE" sz="1100" noProof="1" smtClean="0">
-                    <a:sym typeface="Symbol"/>
-                  </a:rPr>
-                  <a:t></a:t>
-                </a:r>
-                <a:r>
-                  <a:rPr lang="fr-BE" sz="1100" noProof="1" smtClean="0"/>
-                  <a:t>range_extended]}</a:t>
-                </a:r>
-                <a:endParaRPr lang="fr-BE" sz="1100" noProof="1"/>
-              </a:p>
-            </p:txBody>
-          </p:sp>
-          <p:sp>
-            <p:nvSpPr>
-              <p:cNvPr id="45" name="ZoneTexte 44"/>
-              <p:cNvSpPr txBox="1"/>
-              <p:nvPr/>
-            </p:nvSpPr>
-            <p:spPr>
-              <a:xfrm>
-                <a:off x="3528068" y="2123065"/>
-                <a:ext cx="967179" cy="169277"/>
-              </a:xfrm>
-              <a:prstGeom prst="rect">
-                <a:avLst/>
-              </a:prstGeom>
-              <a:solidFill>
-                <a:schemeClr val="lt1"/>
-              </a:solidFill>
-            </p:spPr>
-            <p:txBody>
-              <a:bodyPr wrap="none" lIns="36000" tIns="0" rIns="36000" bIns="0" rtlCol="0">
-                <a:spAutoFit/>
-              </a:bodyPr>
-              <a:lstStyle/>
-              <a:p>
-                <a:r>
-                  <a:rPr lang="fr-BE" sz="1100" noProof="1" smtClean="0"/>
-                  <a:t>ExtendRange</a:t>
-                </a:r>
-                <a:r>
-                  <a:rPr lang="fr-BE" sz="1100" baseline="-25000" noProof="1" smtClean="0"/>
-                  <a:t>end</a:t>
-                </a:r>
-                <a:endParaRPr lang="fr-BE" sz="1100" baseline="-25000" noProof="1"/>
-              </a:p>
-            </p:txBody>
-          </p:sp>
-          <p:sp>
-            <p:nvSpPr>
-              <p:cNvPr id="46" name="ZoneTexte 45"/>
-              <p:cNvSpPr txBox="1"/>
-              <p:nvPr/>
-            </p:nvSpPr>
-            <p:spPr>
-              <a:xfrm>
-                <a:off x="3460742" y="2747958"/>
-                <a:ext cx="1101831" cy="169277"/>
-              </a:xfrm>
-              <a:prstGeom prst="rect">
-                <a:avLst/>
-              </a:prstGeom>
-              <a:solidFill>
-                <a:schemeClr val="lt1"/>
-              </a:solidFill>
-            </p:spPr>
-            <p:txBody>
-              <a:bodyPr wrap="none" lIns="36000" tIns="0" rIns="36000" bIns="0" rtlCol="0">
-                <a:spAutoFit/>
-              </a:bodyPr>
-              <a:lstStyle/>
-              <a:p>
-                <a:r>
-                  <a:rPr lang="fr-BE" sz="1100" noProof="1" smtClean="0"/>
-                  <a:t>InitiateMeeting</a:t>
-                </a:r>
-                <a:r>
-                  <a:rPr lang="fr-BE" sz="1100" baseline="-25000" noProof="1" smtClean="0"/>
-                  <a:t>end</a:t>
-                </a:r>
-                <a:endParaRPr lang="fr-BE" sz="1100" baseline="-25000" noProof="1"/>
-              </a:p>
-            </p:txBody>
-          </p:sp>
-          <p:sp>
-            <p:nvSpPr>
-              <p:cNvPr id="47" name="ZoneTexte 46"/>
-              <p:cNvSpPr txBox="1"/>
-              <p:nvPr/>
-            </p:nvSpPr>
-            <p:spPr>
-              <a:xfrm>
-                <a:off x="5214942" y="2227719"/>
-                <a:ext cx="894476" cy="169277"/>
-              </a:xfrm>
-              <a:prstGeom prst="rect">
-                <a:avLst/>
-              </a:prstGeom>
-              <a:solidFill>
-                <a:schemeClr val="lt1"/>
-              </a:solidFill>
-            </p:spPr>
-            <p:txBody>
-              <a:bodyPr wrap="none" lIns="0" tIns="0" rIns="0" bIns="0" rtlCol="0">
-                <a:spAutoFit/>
-              </a:bodyPr>
-              <a:lstStyle/>
-              <a:p>
-                <a:r>
-                  <a:rPr lang="fr-BE" sz="1100" noProof="1" smtClean="0"/>
-                  <a:t>ExtendRange</a:t>
-                </a:r>
-                <a:r>
-                  <a:rPr lang="fr-BE" sz="1100" baseline="-25000" noProof="1" smtClean="0"/>
-                  <a:t>end</a:t>
-                </a:r>
-                <a:endParaRPr lang="fr-BE" sz="1100" baseline="-25000" noProof="1"/>
-              </a:p>
-            </p:txBody>
-          </p:sp>
-          <p:sp>
-            <p:nvSpPr>
-              <p:cNvPr id="49" name="ZoneTexte 48"/>
-              <p:cNvSpPr txBox="1"/>
-              <p:nvPr/>
-            </p:nvSpPr>
-            <p:spPr>
-              <a:xfrm>
-                <a:off x="1749302" y="2227719"/>
-                <a:ext cx="1029128" cy="169277"/>
-              </a:xfrm>
-              <a:prstGeom prst="rect">
-                <a:avLst/>
-              </a:prstGeom>
-              <a:solidFill>
-                <a:schemeClr val="lt1"/>
-              </a:solidFill>
-            </p:spPr>
-            <p:txBody>
-              <a:bodyPr wrap="none" lIns="0" tIns="0" rIns="0" bIns="0" rtlCol="0">
-                <a:spAutoFit/>
-              </a:bodyPr>
-              <a:lstStyle/>
-              <a:p>
-                <a:r>
-                  <a:rPr lang="fr-BE" sz="1100" noProof="1" smtClean="0"/>
-                  <a:t>InitiateMeeting</a:t>
-                </a:r>
-                <a:r>
-                  <a:rPr lang="fr-BE" sz="1100" baseline="-25000" noProof="1" smtClean="0"/>
-                  <a:t>end</a:t>
-                </a:r>
-                <a:endParaRPr lang="fr-BE" sz="1100" baseline="-25000" noProof="1"/>
-              </a:p>
-            </p:txBody>
-          </p:sp>
-          <p:sp>
-            <p:nvSpPr>
-              <p:cNvPr id="50" name="ZoneTexte 49"/>
-              <p:cNvSpPr txBox="1"/>
-              <p:nvPr/>
-            </p:nvSpPr>
-            <p:spPr>
-              <a:xfrm>
-                <a:off x="1700740" y="2708920"/>
-                <a:ext cx="1215076" cy="169277"/>
-              </a:xfrm>
-              <a:prstGeom prst="rect">
-                <a:avLst/>
-              </a:prstGeom>
-              <a:solidFill>
-                <a:schemeClr val="lt1"/>
-              </a:solidFill>
-            </p:spPr>
-            <p:txBody>
-              <a:bodyPr wrap="none" lIns="0" tIns="0" rIns="0" bIns="0" rtlCol="0">
-                <a:spAutoFit/>
-              </a:bodyPr>
-              <a:lstStyle/>
-              <a:p>
-                <a:r>
-                  <a:rPr lang="fr-BE" sz="1100" noProof="1" smtClean="0"/>
-                  <a:t>{[</a:t>
-                </a:r>
-                <a:r>
-                  <a:rPr lang="fr-BE" sz="1100" noProof="1" smtClean="0">
-                    <a:sym typeface="Symbol"/>
-                  </a:rPr>
-                  <a:t></a:t>
-                </a:r>
-                <a:r>
-                  <a:rPr lang="fr-BE" sz="1100" noProof="1" smtClean="0"/>
-                  <a:t>range_extended]}</a:t>
-                </a:r>
-                <a:endParaRPr lang="fr-BE" sz="1100" noProof="1"/>
-              </a:p>
-            </p:txBody>
-          </p:sp>
-          <p:sp>
-            <p:nvSpPr>
-              <p:cNvPr id="51" name="ZoneTexte 50"/>
-              <p:cNvSpPr txBox="1"/>
-              <p:nvPr/>
-            </p:nvSpPr>
-            <p:spPr>
-              <a:xfrm>
-                <a:off x="5116111" y="2688219"/>
-                <a:ext cx="1114088" cy="169277"/>
-              </a:xfrm>
-              <a:prstGeom prst="rect">
-                <a:avLst/>
-              </a:prstGeom>
-              <a:solidFill>
-                <a:schemeClr val="lt1"/>
-              </a:solidFill>
-            </p:spPr>
-            <p:txBody>
-              <a:bodyPr wrap="none" lIns="0" tIns="0" rIns="0" bIns="0" rtlCol="0">
-                <a:spAutoFit/>
-              </a:bodyPr>
-              <a:lstStyle/>
-              <a:p>
-                <a:r>
-                  <a:rPr lang="fr-BE" sz="1100" noProof="1" smtClean="0"/>
-                  <a:t>{[range_extended]}</a:t>
-                </a:r>
-                <a:endParaRPr lang="fr-BE" sz="1100" noProof="1"/>
-              </a:p>
-            </p:txBody>
-          </p:sp>
-        </p:grpSp>
-      </p:grpSp>
-      <p:grpSp>
-        <p:nvGrpSpPr>
           <p:cNvPr id="59" name="Groupe 58"/>
           <p:cNvGrpSpPr/>
           <p:nvPr/>
@@ -6443,6 +5617,909 @@
                 <a:t>Fl ]}</a:t>
               </a:r>
               <a:endParaRPr lang="fr-BE" sz="1400" noProof="1"/>
+            </a:p>
+          </p:txBody>
+        </p:sp>
+      </p:grpSp>
+      <p:grpSp>
+        <p:nvGrpSpPr>
+          <p:cNvPr id="73" name="Groupe 72"/>
+          <p:cNvGrpSpPr/>
+          <p:nvPr/>
+        </p:nvGrpSpPr>
+        <p:grpSpPr>
+          <a:xfrm>
+            <a:off x="1619672" y="3356992"/>
+            <a:ext cx="5256584" cy="2160240"/>
+            <a:chOff x="1619672" y="3356992"/>
+            <a:chExt cx="5256584" cy="2160240"/>
+          </a:xfrm>
+        </p:grpSpPr>
+        <p:sp>
+          <p:nvSpPr>
+            <p:cNvPr id="26" name="Rectangle 25"/>
+            <p:cNvSpPr/>
+            <p:nvPr/>
+          </p:nvSpPr>
+          <p:spPr>
+            <a:xfrm>
+              <a:off x="1619672" y="3356992"/>
+              <a:ext cx="5256584" cy="2160240"/>
+            </a:xfrm>
+            <a:prstGeom prst="rect">
+              <a:avLst/>
+            </a:prstGeom>
+            <a:ln w="9525"/>
+          </p:spPr>
+          <p:style>
+            <a:lnRef idx="2">
+              <a:schemeClr val="dk1"/>
+            </a:lnRef>
+            <a:fillRef idx="1">
+              <a:schemeClr val="lt1"/>
+            </a:fillRef>
+            <a:effectRef idx="0">
+              <a:schemeClr val="dk1"/>
+            </a:effectRef>
+            <a:fontRef idx="minor">
+              <a:schemeClr val="dk1"/>
+            </a:fontRef>
+          </p:style>
+          <p:txBody>
+            <a:bodyPr rtlCol="0" anchor="ctr"/>
+            <a:lstStyle/>
+            <a:p>
+              <a:pPr algn="ctr"/>
+              <a:endParaRPr lang="fr-BE"/>
+            </a:p>
+          </p:txBody>
+        </p:sp>
+        <p:sp>
+          <p:nvSpPr>
+            <p:cNvPr id="29" name="Ellipse 3"/>
+            <p:cNvSpPr/>
+            <p:nvPr/>
+          </p:nvSpPr>
+          <p:spPr>
+            <a:xfrm>
+              <a:off x="3939287" y="3573056"/>
+              <a:ext cx="360000" cy="360000"/>
+            </a:xfrm>
+            <a:prstGeom prst="ellipse">
+              <a:avLst/>
+            </a:prstGeom>
+          </p:spPr>
+          <p:style>
+            <a:lnRef idx="2">
+              <a:schemeClr val="dk1"/>
+            </a:lnRef>
+            <a:fillRef idx="1">
+              <a:schemeClr val="lt1"/>
+            </a:fillRef>
+            <a:effectRef idx="0">
+              <a:schemeClr val="dk1"/>
+            </a:effectRef>
+            <a:fontRef idx="minor">
+              <a:schemeClr val="dk1"/>
+            </a:fontRef>
+          </p:style>
+          <p:txBody>
+            <a:bodyPr rtlCol="0" anchor="ctr"/>
+            <a:lstStyle/>
+            <a:p>
+              <a:pPr algn="ctr"/>
+              <a:endParaRPr lang="fr-BE" noProof="1"/>
+            </a:p>
+          </p:txBody>
+        </p:sp>
+        <p:sp>
+          <p:nvSpPr>
+            <p:cNvPr id="30" name="Ellipse 29"/>
+            <p:cNvSpPr/>
+            <p:nvPr/>
+          </p:nvSpPr>
+          <p:spPr>
+            <a:xfrm>
+              <a:off x="5004048" y="4765125"/>
+              <a:ext cx="360000" cy="360000"/>
+            </a:xfrm>
+            <a:prstGeom prst="ellipse">
+              <a:avLst/>
+            </a:prstGeom>
+          </p:spPr>
+          <p:style>
+            <a:lnRef idx="2">
+              <a:schemeClr val="dk1"/>
+            </a:lnRef>
+            <a:fillRef idx="1">
+              <a:schemeClr val="lt1"/>
+            </a:fillRef>
+            <a:effectRef idx="0">
+              <a:schemeClr val="dk1"/>
+            </a:effectRef>
+            <a:fontRef idx="minor">
+              <a:schemeClr val="dk1"/>
+            </a:fontRef>
+          </p:style>
+          <p:txBody>
+            <a:bodyPr wrap="none" rtlCol="0" anchor="ctr"/>
+            <a:lstStyle/>
+            <a:p>
+              <a:pPr algn="ctr"/>
+              <a:r>
+                <a:rPr lang="fr-BE" sz="1400" noProof="1" smtClean="0"/>
+                <a:t>q</a:t>
+              </a:r>
+              <a:r>
+                <a:rPr lang="fr-BE" sz="1400" baseline="-25000" noProof="1" smtClean="0"/>
+                <a:t>t</a:t>
+              </a:r>
+              <a:endParaRPr lang="fr-BE" sz="1400" baseline="-25000" noProof="1"/>
+            </a:p>
+          </p:txBody>
+        </p:sp>
+        <p:sp>
+          <p:nvSpPr>
+            <p:cNvPr id="32" name="Ellipse 31"/>
+            <p:cNvSpPr/>
+            <p:nvPr/>
+          </p:nvSpPr>
+          <p:spPr>
+            <a:xfrm>
+              <a:off x="2907399" y="4771475"/>
+              <a:ext cx="360000" cy="360000"/>
+            </a:xfrm>
+            <a:prstGeom prst="ellipse">
+              <a:avLst/>
+            </a:prstGeom>
+          </p:spPr>
+          <p:style>
+            <a:lnRef idx="2">
+              <a:schemeClr val="dk1"/>
+            </a:lnRef>
+            <a:fillRef idx="1">
+              <a:schemeClr val="lt1"/>
+            </a:fillRef>
+            <a:effectRef idx="0">
+              <a:schemeClr val="dk1"/>
+            </a:effectRef>
+            <a:fontRef idx="minor">
+              <a:schemeClr val="dk1"/>
+            </a:fontRef>
+          </p:style>
+          <p:txBody>
+            <a:bodyPr wrap="none" rtlCol="0" anchor="ctr"/>
+            <a:lstStyle/>
+            <a:p>
+              <a:pPr algn="ctr"/>
+              <a:r>
+                <a:rPr lang="fr-BE" sz="1400" noProof="1" smtClean="0"/>
+                <a:t>q</a:t>
+              </a:r>
+              <a:r>
+                <a:rPr lang="fr-BE" sz="1400" baseline="-25000" noProof="1" smtClean="0"/>
+                <a:t>f</a:t>
+              </a:r>
+              <a:endParaRPr lang="fr-BE" sz="1400" baseline="-25000" noProof="1"/>
+            </a:p>
+          </p:txBody>
+        </p:sp>
+        <p:cxnSp>
+          <p:nvCxnSpPr>
+            <p:cNvPr id="33" name="Connecteur droit avec flèche 7"/>
+            <p:cNvCxnSpPr>
+              <a:stCxn id="32" idx="7"/>
+              <a:endCxn id="30" idx="1"/>
+            </p:cNvCxnSpPr>
+            <p:nvPr/>
+          </p:nvCxnSpPr>
+          <p:spPr>
+            <a:xfrm rot="5400000" flipH="1" flipV="1">
+              <a:off x="4132548" y="3899976"/>
+              <a:ext cx="6350" cy="1842091"/>
+            </a:xfrm>
+            <a:prstGeom prst="curvedConnector3">
+              <a:avLst>
+                <a:gd name="adj1" fmla="val 3690222"/>
+              </a:avLst>
+            </a:prstGeom>
+            <a:ln w="19050">
+              <a:tailEnd type="triangle" w="med" len="lg"/>
+            </a:ln>
+          </p:spPr>
+          <p:style>
+            <a:lnRef idx="1">
+              <a:schemeClr val="dk1"/>
+            </a:lnRef>
+            <a:fillRef idx="0">
+              <a:schemeClr val="dk1"/>
+            </a:fillRef>
+            <a:effectRef idx="0">
+              <a:schemeClr val="dk1"/>
+            </a:effectRef>
+            <a:fontRef idx="minor">
+              <a:schemeClr val="tx1"/>
+            </a:fontRef>
+          </p:style>
+        </p:cxnSp>
+        <p:cxnSp>
+          <p:nvCxnSpPr>
+            <p:cNvPr id="34" name="Connecteur droit avec flèche 7"/>
+            <p:cNvCxnSpPr>
+              <a:stCxn id="30" idx="3"/>
+              <a:endCxn id="32" idx="5"/>
+            </p:cNvCxnSpPr>
+            <p:nvPr/>
+          </p:nvCxnSpPr>
+          <p:spPr>
+            <a:xfrm rot="5400000">
+              <a:off x="4132549" y="4154534"/>
+              <a:ext cx="6350" cy="1842091"/>
+            </a:xfrm>
+            <a:prstGeom prst="curvedConnector3">
+              <a:avLst>
+                <a:gd name="adj1" fmla="val 3930253"/>
+              </a:avLst>
+            </a:prstGeom>
+            <a:ln w="19050">
+              <a:tailEnd type="triangle" w="med" len="lg"/>
+            </a:ln>
+          </p:spPr>
+          <p:style>
+            <a:lnRef idx="1">
+              <a:schemeClr val="dk1"/>
+            </a:lnRef>
+            <a:fillRef idx="0">
+              <a:schemeClr val="dk1"/>
+            </a:fillRef>
+            <a:effectRef idx="0">
+              <a:schemeClr val="dk1"/>
+            </a:effectRef>
+            <a:fontRef idx="minor">
+              <a:schemeClr val="tx1"/>
+            </a:fontRef>
+          </p:style>
+        </p:cxnSp>
+        <p:cxnSp>
+          <p:nvCxnSpPr>
+            <p:cNvPr id="35" name="Connecteur droit avec flèche 7"/>
+            <p:cNvCxnSpPr>
+              <a:stCxn id="29" idx="5"/>
+              <a:endCxn id="30" idx="0"/>
+            </p:cNvCxnSpPr>
+            <p:nvPr/>
+          </p:nvCxnSpPr>
+          <p:spPr>
+            <a:xfrm rot="16200000" flipH="1">
+              <a:off x="4272912" y="3853989"/>
+              <a:ext cx="884790" cy="937482"/>
+            </a:xfrm>
+            <a:prstGeom prst="straightConnector1">
+              <a:avLst/>
+            </a:prstGeom>
+            <a:ln w="19050">
+              <a:tailEnd type="triangle" w="med" len="lg"/>
+            </a:ln>
+          </p:spPr>
+          <p:style>
+            <a:lnRef idx="1">
+              <a:schemeClr val="dk1"/>
+            </a:lnRef>
+            <a:fillRef idx="0">
+              <a:schemeClr val="dk1"/>
+            </a:fillRef>
+            <a:effectRef idx="0">
+              <a:schemeClr val="dk1"/>
+            </a:effectRef>
+            <a:fontRef idx="minor">
+              <a:schemeClr val="tx1"/>
+            </a:fontRef>
+          </p:style>
+        </p:cxnSp>
+        <p:cxnSp>
+          <p:nvCxnSpPr>
+            <p:cNvPr id="36" name="Connecteur droit avec flèche 7"/>
+            <p:cNvCxnSpPr>
+              <a:stCxn id="29" idx="3"/>
+              <a:endCxn id="32" idx="0"/>
+            </p:cNvCxnSpPr>
+            <p:nvPr/>
+          </p:nvCxnSpPr>
+          <p:spPr>
+            <a:xfrm rot="5400000">
+              <a:off x="3094134" y="3873601"/>
+              <a:ext cx="891140" cy="904609"/>
+            </a:xfrm>
+            <a:prstGeom prst="straightConnector1">
+              <a:avLst/>
+            </a:prstGeom>
+            <a:ln w="19050">
+              <a:tailEnd type="triangle" w="med" len="lg"/>
+            </a:ln>
+          </p:spPr>
+          <p:style>
+            <a:lnRef idx="1">
+              <a:schemeClr val="dk1"/>
+            </a:lnRef>
+            <a:fillRef idx="0">
+              <a:schemeClr val="dk1"/>
+            </a:fillRef>
+            <a:effectRef idx="0">
+              <a:schemeClr val="dk1"/>
+            </a:effectRef>
+            <a:fontRef idx="minor">
+              <a:schemeClr val="tx1"/>
+            </a:fontRef>
+          </p:style>
+        </p:cxnSp>
+        <p:cxnSp>
+          <p:nvCxnSpPr>
+            <p:cNvPr id="38" name="Connecteur droit avec flèche 7"/>
+            <p:cNvCxnSpPr>
+              <a:stCxn id="30" idx="4"/>
+              <a:endCxn id="30" idx="6"/>
+            </p:cNvCxnSpPr>
+            <p:nvPr/>
+          </p:nvCxnSpPr>
+          <p:spPr>
+            <a:xfrm rot="5400000" flipH="1" flipV="1">
+              <a:off x="5184048" y="4945125"/>
+              <a:ext cx="180000" cy="180000"/>
+            </a:xfrm>
+            <a:prstGeom prst="curvedConnector4">
+              <a:avLst>
+                <a:gd name="adj1" fmla="val -127000"/>
+                <a:gd name="adj2" fmla="val 227000"/>
+              </a:avLst>
+            </a:prstGeom>
+            <a:ln w="19050">
+              <a:tailEnd type="triangle" w="sm" len="lg"/>
+            </a:ln>
+          </p:spPr>
+          <p:style>
+            <a:lnRef idx="1">
+              <a:schemeClr val="dk1"/>
+            </a:lnRef>
+            <a:fillRef idx="0">
+              <a:schemeClr val="dk1"/>
+            </a:fillRef>
+            <a:effectRef idx="0">
+              <a:schemeClr val="dk1"/>
+            </a:effectRef>
+            <a:fontRef idx="minor">
+              <a:schemeClr val="tx1"/>
+            </a:fontRef>
+          </p:style>
+        </p:cxnSp>
+        <p:cxnSp>
+          <p:nvCxnSpPr>
+            <p:cNvPr id="39" name="Connecteur droit avec flèche 7"/>
+            <p:cNvCxnSpPr>
+              <a:stCxn id="30" idx="0"/>
+              <a:endCxn id="30" idx="6"/>
+            </p:cNvCxnSpPr>
+            <p:nvPr/>
+          </p:nvCxnSpPr>
+          <p:spPr>
+            <a:xfrm rot="16200000" flipH="1">
+              <a:off x="5184048" y="4765125"/>
+              <a:ext cx="180000" cy="180000"/>
+            </a:xfrm>
+            <a:prstGeom prst="curvedConnector4">
+              <a:avLst>
+                <a:gd name="adj1" fmla="val -127000"/>
+                <a:gd name="adj2" fmla="val 227000"/>
+              </a:avLst>
+            </a:prstGeom>
+            <a:ln w="19050">
+              <a:tailEnd type="triangle" w="sm" len="lg"/>
+            </a:ln>
+          </p:spPr>
+          <p:style>
+            <a:lnRef idx="1">
+              <a:schemeClr val="dk1"/>
+            </a:lnRef>
+            <a:fillRef idx="0">
+              <a:schemeClr val="dk1"/>
+            </a:fillRef>
+            <a:effectRef idx="0">
+              <a:schemeClr val="dk1"/>
+            </a:effectRef>
+            <a:fontRef idx="minor">
+              <a:schemeClr val="tx1"/>
+            </a:fontRef>
+          </p:style>
+        </p:cxnSp>
+        <p:cxnSp>
+          <p:nvCxnSpPr>
+            <p:cNvPr id="40" name="Connecteur droit avec flèche 7"/>
+            <p:cNvCxnSpPr>
+              <a:stCxn id="32" idx="0"/>
+              <a:endCxn id="32" idx="2"/>
+            </p:cNvCxnSpPr>
+            <p:nvPr/>
+          </p:nvCxnSpPr>
+          <p:spPr>
+            <a:xfrm rot="16200000" flipH="1" flipV="1">
+              <a:off x="2907399" y="4771475"/>
+              <a:ext cx="180000" cy="180000"/>
+            </a:xfrm>
+            <a:prstGeom prst="curvedConnector4">
+              <a:avLst>
+                <a:gd name="adj1" fmla="val -127000"/>
+                <a:gd name="adj2" fmla="val 227000"/>
+              </a:avLst>
+            </a:prstGeom>
+            <a:ln w="19050">
+              <a:tailEnd type="triangle" w="sm" len="lg"/>
+            </a:ln>
+          </p:spPr>
+          <p:style>
+            <a:lnRef idx="1">
+              <a:schemeClr val="dk1"/>
+            </a:lnRef>
+            <a:fillRef idx="0">
+              <a:schemeClr val="dk1"/>
+            </a:fillRef>
+            <a:effectRef idx="0">
+              <a:schemeClr val="dk1"/>
+            </a:effectRef>
+            <a:fontRef idx="minor">
+              <a:schemeClr val="tx1"/>
+            </a:fontRef>
+          </p:style>
+        </p:cxnSp>
+        <p:cxnSp>
+          <p:nvCxnSpPr>
+            <p:cNvPr id="41" name="Connecteur droit avec flèche 7"/>
+            <p:cNvCxnSpPr>
+              <a:stCxn id="32" idx="4"/>
+              <a:endCxn id="32" idx="2"/>
+            </p:cNvCxnSpPr>
+            <p:nvPr/>
+          </p:nvCxnSpPr>
+          <p:spPr>
+            <a:xfrm rot="5400000" flipH="1">
+              <a:off x="2907399" y="4951475"/>
+              <a:ext cx="180000" cy="180000"/>
+            </a:xfrm>
+            <a:prstGeom prst="curvedConnector4">
+              <a:avLst>
+                <a:gd name="adj1" fmla="val -127000"/>
+                <a:gd name="adj2" fmla="val 227000"/>
+              </a:avLst>
+            </a:prstGeom>
+            <a:ln w="19050">
+              <a:tailEnd type="triangle" w="sm" len="lg"/>
+            </a:ln>
+          </p:spPr>
+          <p:style>
+            <a:lnRef idx="1">
+              <a:schemeClr val="dk1"/>
+            </a:lnRef>
+            <a:fillRef idx="0">
+              <a:schemeClr val="dk1"/>
+            </a:fillRef>
+            <a:effectRef idx="0">
+              <a:schemeClr val="dk1"/>
+            </a:effectRef>
+            <a:fontRef idx="minor">
+              <a:schemeClr val="tx1"/>
+            </a:fontRef>
+          </p:style>
+        </p:cxnSp>
+        <p:cxnSp>
+          <p:nvCxnSpPr>
+            <p:cNvPr id="42" name="Connecteur droit avec flèche 7"/>
+            <p:cNvCxnSpPr>
+              <a:endCxn id="29" idx="1"/>
+            </p:cNvCxnSpPr>
+            <p:nvPr/>
+          </p:nvCxnSpPr>
+          <p:spPr>
+            <a:xfrm>
+              <a:off x="3779912" y="3429000"/>
+              <a:ext cx="212096" cy="196777"/>
+            </a:xfrm>
+            <a:prstGeom prst="straightConnector1">
+              <a:avLst/>
+            </a:prstGeom>
+            <a:ln w="19050">
+              <a:tailEnd type="triangle" w="med" len="lg"/>
+            </a:ln>
+          </p:spPr>
+          <p:style>
+            <a:lnRef idx="1">
+              <a:schemeClr val="dk1"/>
+            </a:lnRef>
+            <a:fillRef idx="0">
+              <a:schemeClr val="dk1"/>
+            </a:fillRef>
+            <a:effectRef idx="0">
+              <a:schemeClr val="dk1"/>
+            </a:effectRef>
+            <a:fontRef idx="minor">
+              <a:schemeClr val="tx1"/>
+            </a:fontRef>
+          </p:style>
+        </p:cxnSp>
+        <p:sp>
+          <p:nvSpPr>
+            <p:cNvPr id="43" name="ZoneTexte 42"/>
+            <p:cNvSpPr txBox="1"/>
+            <p:nvPr/>
+          </p:nvSpPr>
+          <p:spPr>
+            <a:xfrm>
+              <a:off x="4355976" y="4149080"/>
+              <a:ext cx="937757" cy="169277"/>
+            </a:xfrm>
+            <a:prstGeom prst="rect">
+              <a:avLst/>
+            </a:prstGeom>
+            <a:solidFill>
+              <a:schemeClr val="lt1"/>
+            </a:solidFill>
+          </p:spPr>
+          <p:txBody>
+            <a:bodyPr wrap="none" lIns="0" tIns="0" rIns="0" bIns="0" rtlCol="0">
+              <a:spAutoFit/>
+            </a:bodyPr>
+            <a:lstStyle/>
+            <a:p>
+              <a:r>
+                <a:rPr lang="fr-BE" sz="1100" noProof="1" smtClean="0"/>
+                <a:t>{[second_cycle]}</a:t>
+              </a:r>
+              <a:endParaRPr lang="fr-BE" sz="1100" noProof="1"/>
+            </a:p>
+          </p:txBody>
+        </p:sp>
+        <p:sp>
+          <p:nvSpPr>
+            <p:cNvPr id="44" name="ZoneTexte 43"/>
+            <p:cNvSpPr txBox="1"/>
+            <p:nvPr/>
+          </p:nvSpPr>
+          <p:spPr>
+            <a:xfrm>
+              <a:off x="2915816" y="4149080"/>
+              <a:ext cx="1070806" cy="169277"/>
+            </a:xfrm>
+            <a:prstGeom prst="rect">
+              <a:avLst/>
+            </a:prstGeom>
+            <a:solidFill>
+              <a:schemeClr val="lt1"/>
+            </a:solidFill>
+          </p:spPr>
+          <p:txBody>
+            <a:bodyPr wrap="none" lIns="0" tIns="0" rIns="0" bIns="0" rtlCol="0">
+              <a:spAutoFit/>
+            </a:bodyPr>
+            <a:lstStyle/>
+            <a:p>
+              <a:r>
+                <a:rPr lang="fr-BE" sz="1100" noProof="1" smtClean="0"/>
+                <a:t>{[</a:t>
+              </a:r>
+              <a:r>
+                <a:rPr lang="fr-BE" sz="1100" noProof="1" smtClean="0">
+                  <a:sym typeface="Symbol"/>
+                </a:rPr>
+                <a:t> </a:t>
+              </a:r>
+              <a:r>
+                <a:rPr lang="fr-BE" sz="1100" noProof="1" smtClean="0"/>
+                <a:t>second_cycle]}</a:t>
+              </a:r>
+              <a:endParaRPr lang="fr-BE" sz="1100" noProof="1"/>
+            </a:p>
+          </p:txBody>
+        </p:sp>
+        <p:sp>
+          <p:nvSpPr>
+            <p:cNvPr id="45" name="ZoneTexte 44"/>
+            <p:cNvSpPr txBox="1"/>
+            <p:nvPr/>
+          </p:nvSpPr>
+          <p:spPr>
+            <a:xfrm>
+              <a:off x="3635698" y="4509120"/>
+              <a:ext cx="967179" cy="169277"/>
+            </a:xfrm>
+            <a:prstGeom prst="rect">
+              <a:avLst/>
+            </a:prstGeom>
+            <a:solidFill>
+              <a:schemeClr val="lt1"/>
+            </a:solidFill>
+          </p:spPr>
+          <p:txBody>
+            <a:bodyPr wrap="none" lIns="36000" tIns="0" rIns="36000" bIns="0" rtlCol="0">
+              <a:spAutoFit/>
+            </a:bodyPr>
+            <a:lstStyle/>
+            <a:p>
+              <a:r>
+                <a:rPr lang="fr-BE" sz="1100" noProof="1" smtClean="0"/>
+                <a:t>ExtendRange</a:t>
+              </a:r>
+              <a:r>
+                <a:rPr lang="fr-BE" sz="1100" baseline="-25000" noProof="1" smtClean="0"/>
+                <a:t>end</a:t>
+              </a:r>
+              <a:endParaRPr lang="fr-BE" sz="1100" baseline="-25000" noProof="1"/>
+            </a:p>
+          </p:txBody>
+        </p:sp>
+        <p:sp>
+          <p:nvSpPr>
+            <p:cNvPr id="46" name="ZoneTexte 45"/>
+            <p:cNvSpPr txBox="1"/>
+            <p:nvPr/>
+          </p:nvSpPr>
+          <p:spPr>
+            <a:xfrm>
+              <a:off x="3614185" y="5229200"/>
+              <a:ext cx="1101831" cy="169277"/>
+            </a:xfrm>
+            <a:prstGeom prst="rect">
+              <a:avLst/>
+            </a:prstGeom>
+            <a:solidFill>
+              <a:schemeClr val="lt1"/>
+            </a:solidFill>
+          </p:spPr>
+          <p:txBody>
+            <a:bodyPr wrap="none" lIns="36000" tIns="0" rIns="36000" bIns="0" rtlCol="0">
+              <a:spAutoFit/>
+            </a:bodyPr>
+            <a:lstStyle/>
+            <a:p>
+              <a:r>
+                <a:rPr lang="fr-BE" sz="1100" noProof="1" smtClean="0"/>
+                <a:t>InitiateMeeting</a:t>
+              </a:r>
+              <a:r>
+                <a:rPr lang="fr-BE" sz="1100" baseline="-25000" noProof="1" smtClean="0"/>
+                <a:t>end</a:t>
+              </a:r>
+              <a:endParaRPr lang="fr-BE" sz="1100" baseline="-25000" noProof="1"/>
+            </a:p>
+          </p:txBody>
+        </p:sp>
+        <p:sp>
+          <p:nvSpPr>
+            <p:cNvPr id="47" name="ZoneTexte 46"/>
+            <p:cNvSpPr txBox="1"/>
+            <p:nvPr/>
+          </p:nvSpPr>
+          <p:spPr>
+            <a:xfrm>
+              <a:off x="5436096" y="4437112"/>
+              <a:ext cx="1394613" cy="338554"/>
+            </a:xfrm>
+            <a:prstGeom prst="rect">
+              <a:avLst/>
+            </a:prstGeom>
+            <a:solidFill>
+              <a:schemeClr val="lt1"/>
+            </a:solidFill>
+          </p:spPr>
+          <p:txBody>
+            <a:bodyPr wrap="none" lIns="0" tIns="0" rIns="0" bIns="0" rtlCol="0">
+              <a:spAutoFit/>
+            </a:bodyPr>
+            <a:lstStyle/>
+            <a:p>
+              <a:r>
+                <a:rPr lang="fr-BE" sz="1100" noProof="1" smtClean="0"/>
+                <a:t>{ ExtendRange</a:t>
+              </a:r>
+              <a:r>
+                <a:rPr lang="fr-BE" sz="1100" baseline="-25000" noProof="1" smtClean="0"/>
+                <a:t>end,</a:t>
+              </a:r>
+            </a:p>
+            <a:p>
+              <a:r>
+                <a:rPr lang="fr-BE" sz="1100" noProof="1" smtClean="0"/>
+                <a:t>  WeakenConstraints</a:t>
+              </a:r>
+              <a:r>
+                <a:rPr lang="fr-BE" sz="1100" baseline="-25000" noProof="1" smtClean="0"/>
+                <a:t>end </a:t>
+              </a:r>
+              <a:r>
+                <a:rPr lang="fr-BE" sz="1100" noProof="1" smtClean="0"/>
+                <a:t>}</a:t>
+              </a:r>
+              <a:endParaRPr lang="fr-BE" sz="1100" noProof="1"/>
+            </a:p>
+          </p:txBody>
+        </p:sp>
+        <p:sp>
+          <p:nvSpPr>
+            <p:cNvPr id="49" name="ZoneTexte 48"/>
+            <p:cNvSpPr txBox="1"/>
+            <p:nvPr/>
+          </p:nvSpPr>
+          <p:spPr>
+            <a:xfrm>
+              <a:off x="1814680" y="4627875"/>
+              <a:ext cx="1029128" cy="169277"/>
+            </a:xfrm>
+            <a:prstGeom prst="rect">
+              <a:avLst/>
+            </a:prstGeom>
+            <a:solidFill>
+              <a:schemeClr val="lt1"/>
+            </a:solidFill>
+          </p:spPr>
+          <p:txBody>
+            <a:bodyPr wrap="none" lIns="0" tIns="0" rIns="0" bIns="0" rtlCol="0">
+              <a:spAutoFit/>
+            </a:bodyPr>
+            <a:lstStyle/>
+            <a:p>
+              <a:r>
+                <a:rPr lang="fr-BE" sz="1100" noProof="1" smtClean="0"/>
+                <a:t>InitiateMeeting</a:t>
+              </a:r>
+              <a:r>
+                <a:rPr lang="fr-BE" sz="1100" baseline="-25000" noProof="1" smtClean="0"/>
+                <a:t>end</a:t>
+              </a:r>
+              <a:endParaRPr lang="fr-BE" sz="1100" baseline="-25000" noProof="1"/>
+            </a:p>
+          </p:txBody>
+        </p:sp>
+        <p:sp>
+          <p:nvSpPr>
+            <p:cNvPr id="50" name="ZoneTexte 49"/>
+            <p:cNvSpPr txBox="1"/>
+            <p:nvPr/>
+          </p:nvSpPr>
+          <p:spPr>
+            <a:xfrm>
+              <a:off x="1700740" y="5138142"/>
+              <a:ext cx="1038746" cy="169277"/>
+            </a:xfrm>
+            <a:prstGeom prst="rect">
+              <a:avLst/>
+            </a:prstGeom>
+            <a:solidFill>
+              <a:schemeClr val="lt1"/>
+            </a:solidFill>
+          </p:spPr>
+          <p:txBody>
+            <a:bodyPr wrap="none" lIns="0" tIns="0" rIns="0" bIns="0" rtlCol="0">
+              <a:spAutoFit/>
+            </a:bodyPr>
+            <a:lstStyle/>
+            <a:p>
+              <a:r>
+                <a:rPr lang="fr-BE" sz="1100" noProof="1" smtClean="0"/>
+                <a:t>{[</a:t>
+              </a:r>
+              <a:r>
+                <a:rPr lang="fr-BE" sz="1100" noProof="1" smtClean="0">
+                  <a:sym typeface="Symbol"/>
+                </a:rPr>
+                <a:t></a:t>
+              </a:r>
+              <a:r>
+                <a:rPr lang="fr-BE" sz="1100" noProof="1" smtClean="0"/>
+                <a:t>second_cycle]}</a:t>
+              </a:r>
+              <a:endParaRPr lang="fr-BE" sz="1100" noProof="1"/>
+            </a:p>
+          </p:txBody>
+        </p:sp>
+        <p:sp>
+          <p:nvSpPr>
+            <p:cNvPr id="51" name="ZoneTexte 50"/>
+            <p:cNvSpPr txBox="1"/>
+            <p:nvPr/>
+          </p:nvSpPr>
+          <p:spPr>
+            <a:xfrm>
+              <a:off x="5404950" y="5117441"/>
+              <a:ext cx="937757" cy="169277"/>
+            </a:xfrm>
+            <a:prstGeom prst="rect">
+              <a:avLst/>
+            </a:prstGeom>
+            <a:solidFill>
+              <a:schemeClr val="lt1"/>
+            </a:solidFill>
+          </p:spPr>
+          <p:txBody>
+            <a:bodyPr wrap="none" lIns="0" tIns="0" rIns="0" bIns="0" rtlCol="0">
+              <a:spAutoFit/>
+            </a:bodyPr>
+            <a:lstStyle/>
+            <a:p>
+              <a:r>
+                <a:rPr lang="fr-BE" sz="1100" noProof="1" smtClean="0"/>
+                <a:t>{[second_cycle]}</a:t>
+              </a:r>
+              <a:endParaRPr lang="fr-BE" sz="1100" noProof="1"/>
+            </a:p>
+          </p:txBody>
+        </p:sp>
+        <p:cxnSp>
+          <p:nvCxnSpPr>
+            <p:cNvPr id="57" name="Connecteur droit avec flèche 7"/>
+            <p:cNvCxnSpPr>
+              <a:stCxn id="32" idx="6"/>
+              <a:endCxn id="30" idx="2"/>
+            </p:cNvCxnSpPr>
+            <p:nvPr/>
+          </p:nvCxnSpPr>
+          <p:spPr>
+            <a:xfrm flipV="1">
+              <a:off x="3267399" y="4945125"/>
+              <a:ext cx="1736649" cy="6350"/>
+            </a:xfrm>
+            <a:prstGeom prst="curvedConnector3">
+              <a:avLst>
+                <a:gd name="adj1" fmla="val 50000"/>
+              </a:avLst>
+            </a:prstGeom>
+            <a:ln w="19050">
+              <a:tailEnd type="triangle" w="med" len="lg"/>
+            </a:ln>
+          </p:spPr>
+          <p:style>
+            <a:lnRef idx="1">
+              <a:schemeClr val="dk1"/>
+            </a:lnRef>
+            <a:fillRef idx="0">
+              <a:schemeClr val="dk1"/>
+            </a:fillRef>
+            <a:effectRef idx="0">
+              <a:schemeClr val="dk1"/>
+            </a:effectRef>
+            <a:fontRef idx="minor">
+              <a:schemeClr val="tx1"/>
+            </a:fontRef>
+          </p:style>
+        </p:cxnSp>
+        <p:sp>
+          <p:nvSpPr>
+            <p:cNvPr id="62" name="ZoneTexte 61"/>
+            <p:cNvSpPr txBox="1"/>
+            <p:nvPr/>
+          </p:nvSpPr>
+          <p:spPr>
+            <a:xfrm>
+              <a:off x="3458171" y="4869160"/>
+              <a:ext cx="1337473" cy="169277"/>
+            </a:xfrm>
+            <a:prstGeom prst="rect">
+              <a:avLst/>
+            </a:prstGeom>
+            <a:solidFill>
+              <a:schemeClr val="lt1"/>
+            </a:solidFill>
+          </p:spPr>
+          <p:txBody>
+            <a:bodyPr wrap="none" lIns="36000" tIns="0" rIns="36000" bIns="0" rtlCol="0">
+              <a:spAutoFit/>
+            </a:bodyPr>
+            <a:lstStyle/>
+            <a:p>
+              <a:r>
+                <a:rPr lang="fr-BE" sz="1100" noProof="1" smtClean="0"/>
+                <a:t>WeakenConstraints</a:t>
+              </a:r>
+              <a:r>
+                <a:rPr lang="fr-BE" sz="1100" baseline="-25000" noProof="1" smtClean="0"/>
+                <a:t>end</a:t>
+              </a:r>
+              <a:endParaRPr lang="fr-BE" sz="1100" baseline="-25000" noProof="1"/>
             </a:p>
           </p:txBody>
         </p:sp>
@@ -16512,10 +16589,10 @@
         </p:nvGrpSpPr>
         <p:grpSpPr>
           <a:xfrm>
-            <a:off x="683568" y="260648"/>
-            <a:ext cx="7848872" cy="4392488"/>
-            <a:chOff x="179512" y="836712"/>
-            <a:chExt cx="7848872" cy="4392488"/>
+            <a:off x="827584" y="260648"/>
+            <a:ext cx="7704856" cy="4392488"/>
+            <a:chOff x="323528" y="836712"/>
+            <a:chExt cx="7704856" cy="4392488"/>
           </a:xfrm>
         </p:grpSpPr>
         <p:sp>
@@ -16526,8 +16603,8 @@
           </p:nvSpPr>
           <p:spPr>
             <a:xfrm>
-              <a:off x="179512" y="836712"/>
-              <a:ext cx="7848872" cy="4392488"/>
+              <a:off x="323528" y="836712"/>
+              <a:ext cx="7704856" cy="4392488"/>
             </a:xfrm>
             <a:prstGeom prst="rect">
               <a:avLst/>
@@ -16565,10 +16642,10 @@
           </p:nvGrpSpPr>
           <p:grpSpPr>
             <a:xfrm>
-              <a:off x="259873" y="1446811"/>
-              <a:ext cx="5460478" cy="3643338"/>
-              <a:chOff x="1040348" y="714356"/>
-              <a:chExt cx="5460478" cy="3643338"/>
+              <a:off x="416744" y="1446811"/>
+              <a:ext cx="5367662" cy="3643338"/>
+              <a:chOff x="1197219" y="714356"/>
+              <a:chExt cx="5367662" cy="3643338"/>
             </a:xfrm>
           </p:grpSpPr>
           <p:sp>
@@ -17509,14 +17586,14 @@
             <p:spPr>
               <a:xfrm>
                 <a:off x="2500298" y="2290755"/>
-                <a:ext cx="1170257" cy="369332"/>
+                <a:ext cx="1199046" cy="369332"/>
               </a:xfrm>
               <a:prstGeom prst="rect">
                 <a:avLst/>
               </a:prstGeom>
               <a:solidFill>
                 <a:schemeClr val="lt1">
-                  <a:alpha val="86000"/>
+                  <a:alpha val="90000"/>
                 </a:schemeClr>
               </a:solidFill>
             </p:spPr>
@@ -17545,7 +17622,7 @@
                   <a:rPr lang="fr-BE" sz="1200" noProof="1" smtClean="0">
                     <a:sym typeface="Symbol"/>
                   </a:rPr>
-                  <a:t>range_extended</a:t>
+                  <a:t>      second_cycle</a:t>
                 </a:r>
                 <a:r>
                   <a:rPr lang="fr-BE" sz="1200" noProof="1" smtClean="0"/>
@@ -17564,14 +17641,14 @@
             <p:spPr>
               <a:xfrm>
                 <a:off x="5311333" y="2290755"/>
-                <a:ext cx="1189493" cy="369332"/>
+                <a:ext cx="1253548" cy="369332"/>
               </a:xfrm>
               <a:prstGeom prst="rect">
                 <a:avLst/>
               </a:prstGeom>
               <a:solidFill>
                 <a:schemeClr val="lt1">
-                  <a:alpha val="86000"/>
+                  <a:alpha val="90000"/>
                 </a:schemeClr>
               </a:solidFill>
             </p:spPr>
@@ -17599,10 +17676,14 @@
                   <a:rPr lang="fr-BE" sz="1200" noProof="1" smtClean="0"/>
                 </a:br>
                 <a:r>
+                  <a:rPr lang="fr-BE" sz="1200" noProof="1" smtClean="0"/>
+                  <a:t>       </a:t>
+                </a:r>
+                <a:r>
                   <a:rPr lang="fr-BE" sz="1200" noProof="1" smtClean="0">
                     <a:sym typeface="Symbol"/>
                   </a:rPr>
-                  <a:t> range_extended</a:t>
+                  <a:t> second_cycle</a:t>
                 </a:r>
                 <a:r>
                   <a:rPr lang="fr-BE" sz="1200" noProof="1" smtClean="0"/>
@@ -17620,7 +17701,7 @@
             </p:nvSpPr>
             <p:spPr>
               <a:xfrm>
-                <a:off x="1040348" y="3815838"/>
+                <a:off x="1197219" y="3811930"/>
                 <a:ext cx="1659750" cy="184666"/>
               </a:xfrm>
               <a:prstGeom prst="rect">
@@ -17648,7 +17729,11 @@
                 </a:r>
                 <a:r>
                   <a:rPr lang="fr-BE" sz="1200" noProof="1" smtClean="0"/>
-                  <a:t>resolve_by_weakening]</a:t>
+                  <a:t>resolve_by_weakening</a:t>
+                </a:r>
+                <a:r>
+                  <a:rPr lang="fr-BE" sz="1200" noProof="1" smtClean="0"/>
+                  <a:t>]</a:t>
                 </a:r>
                 <a:endParaRPr lang="fr-BE" sz="1200" noProof="1"/>
               </a:p>
@@ -17662,7 +17747,7 @@
             </p:nvSpPr>
             <p:spPr>
               <a:xfrm>
-                <a:off x="3618500" y="3815838"/>
+                <a:off x="3618500" y="3811930"/>
                 <a:ext cx="1515479" cy="184666"/>
               </a:xfrm>
               <a:prstGeom prst="rect">
@@ -17953,9 +18038,6 @@
                   </a:rPr>
                   <a:t>Participant</a:t>
                 </a:r>
-                <a:endParaRPr lang="fr-BE" sz="1000" b="1" noProof="1" smtClean="0">
-                  <a:latin typeface="+mj-lt"/>
-                </a:endParaRPr>
               </a:p>
             </p:txBody>
           </p:sp>
@@ -18381,13 +18463,7 @@
                   <a:rPr lang="fr-BE" sz="1000" b="1" noProof="1" smtClean="0">
                     <a:latin typeface="+mj-lt"/>
                   </a:rPr>
-                  <a:t>m</a:t>
-                </a:r>
-                <a:r>
-                  <a:rPr lang="fr-BE" sz="1000" b="1" noProof="1" smtClean="0">
-                    <a:latin typeface="+mj-lt"/>
-                  </a:rPr>
-                  <a:t>eeting_initiated</a:t>
+                  <a:t>meeting_initiated</a:t>
                 </a:r>
                 <a:endParaRPr lang="fr-BE" sz="1000" b="1" noProof="1">
                   <a:latin typeface="+mj-lt"/>
@@ -18773,9 +18849,6 @@
                 </a:rPr>
                 <a:t>Weaken Constraints</a:t>
               </a:r>
-              <a:endParaRPr lang="fr-BE" sz="1200" noProof="1" smtClean="0">
-                <a:latin typeface="+mj-lt"/>
-              </a:endParaRPr>
             </a:p>
           </p:txBody>
         </p:sp>
@@ -18822,9 +18895,6 @@
                 </a:rPr>
                 <a:t>Schedule Meeting</a:t>
               </a:r>
-              <a:endParaRPr lang="fr-BE" sz="1200" noProof="1" smtClean="0">
-                <a:latin typeface="+mj-lt"/>
-              </a:endParaRPr>
             </a:p>
           </p:txBody>
         </p:sp>
@@ -18871,9 +18941,6 @@
                 </a:rPr>
                 <a:t>Extend Date Range</a:t>
               </a:r>
-              <a:endParaRPr lang="fr-BE" sz="1200" noProof="1" smtClean="0">
-                <a:latin typeface="+mj-lt"/>
-              </a:endParaRPr>
             </a:p>
           </p:txBody>
         </p:sp>
@@ -21210,7 +21277,7 @@
           </p:nvSpPr>
           <p:spPr>
             <a:xfrm>
-              <a:off x="6084168" y="3284984"/>
+              <a:off x="6012160" y="3284984"/>
               <a:ext cx="1224136" cy="369332"/>
             </a:xfrm>
             <a:prstGeom prst="rect">
@@ -21244,10 +21311,14 @@
                 <a:rPr lang="fr-BE" sz="1200" noProof="1" smtClean="0"/>
               </a:br>
               <a:r>
+                <a:rPr lang="fr-BE" sz="1200" noProof="1" smtClean="0"/>
+                <a:t>      </a:t>
+              </a:r>
+              <a:r>
                 <a:rPr lang="fr-BE" sz="1200" noProof="1" smtClean="0">
                   <a:sym typeface="Symbol"/>
                 </a:rPr>
-                <a:t> range_extended</a:t>
+                <a:t> second_cycle</a:t>
               </a:r>
               <a:r>
                 <a:rPr lang="fr-BE" sz="1200" noProof="1" smtClean="0"/>
@@ -21459,7 +21530,7 @@
                 <a:rPr lang="fr-BE" sz="1200" noProof="1" smtClean="0">
                   <a:sym typeface="Symbol"/>
                 </a:rPr>
-                <a:t>range_extended</a:t>
+                <a:t>     second_cycle</a:t>
               </a:r>
               <a:r>
                 <a:rPr lang="fr-BE" sz="1200" noProof="1" smtClean="0"/>

</xml_diff>

<commit_message>
Enhanced Chapter 3's images
</commit_message>
<xml_diff>
--- a/writing/images/train.pptx
+++ b/writing/images/train.pptx
@@ -202,7 +202,7 @@
             <a:fld id="{1A5CA47D-05BA-47C5-ACE1-040A60204EDF}" type="datetimeFigureOut">
               <a:rPr lang="fr-FR" smtClean="0"/>
               <a:pPr/>
-              <a:t>05/07/2011</a:t>
+              <a:t>06/07/2011</a:t>
             </a:fld>
             <a:endParaRPr lang="fr-BE"/>
           </a:p>
@@ -732,7 +732,7 @@
             <a:fld id="{68BDF4EC-5B70-45D8-B718-E56EB4C6B13E}" type="datetimeFigureOut">
               <a:rPr lang="fr-BE" smtClean="0"/>
               <a:pPr/>
-              <a:t>5/07/2011</a:t>
+              <a:t>6/07/2011</a:t>
             </a:fld>
             <a:endParaRPr lang="fr-BE"/>
           </a:p>
@@ -899,7 +899,7 @@
             <a:fld id="{68BDF4EC-5B70-45D8-B718-E56EB4C6B13E}" type="datetimeFigureOut">
               <a:rPr lang="fr-BE" smtClean="0"/>
               <a:pPr/>
-              <a:t>5/07/2011</a:t>
+              <a:t>6/07/2011</a:t>
             </a:fld>
             <a:endParaRPr lang="fr-BE"/>
           </a:p>
@@ -1076,7 +1076,7 @@
             <a:fld id="{68BDF4EC-5B70-45D8-B718-E56EB4C6B13E}" type="datetimeFigureOut">
               <a:rPr lang="fr-BE" smtClean="0"/>
               <a:pPr/>
-              <a:t>5/07/2011</a:t>
+              <a:t>6/07/2011</a:t>
             </a:fld>
             <a:endParaRPr lang="fr-BE"/>
           </a:p>
@@ -1243,7 +1243,7 @@
             <a:fld id="{68BDF4EC-5B70-45D8-B718-E56EB4C6B13E}" type="datetimeFigureOut">
               <a:rPr lang="fr-BE" smtClean="0"/>
               <a:pPr/>
-              <a:t>5/07/2011</a:t>
+              <a:t>6/07/2011</a:t>
             </a:fld>
             <a:endParaRPr lang="fr-BE"/>
           </a:p>
@@ -1486,7 +1486,7 @@
             <a:fld id="{68BDF4EC-5B70-45D8-B718-E56EB4C6B13E}" type="datetimeFigureOut">
               <a:rPr lang="fr-BE" smtClean="0"/>
               <a:pPr/>
-              <a:t>5/07/2011</a:t>
+              <a:t>6/07/2011</a:t>
             </a:fld>
             <a:endParaRPr lang="fr-BE"/>
           </a:p>
@@ -1771,7 +1771,7 @@
             <a:fld id="{68BDF4EC-5B70-45D8-B718-E56EB4C6B13E}" type="datetimeFigureOut">
               <a:rPr lang="fr-BE" smtClean="0"/>
               <a:pPr/>
-              <a:t>5/07/2011</a:t>
+              <a:t>6/07/2011</a:t>
             </a:fld>
             <a:endParaRPr lang="fr-BE"/>
           </a:p>
@@ -2190,7 +2190,7 @@
             <a:fld id="{68BDF4EC-5B70-45D8-B718-E56EB4C6B13E}" type="datetimeFigureOut">
               <a:rPr lang="fr-BE" smtClean="0"/>
               <a:pPr/>
-              <a:t>5/07/2011</a:t>
+              <a:t>6/07/2011</a:t>
             </a:fld>
             <a:endParaRPr lang="fr-BE"/>
           </a:p>
@@ -2305,7 +2305,7 @@
             <a:fld id="{68BDF4EC-5B70-45D8-B718-E56EB4C6B13E}" type="datetimeFigureOut">
               <a:rPr lang="fr-BE" smtClean="0"/>
               <a:pPr/>
-              <a:t>5/07/2011</a:t>
+              <a:t>6/07/2011</a:t>
             </a:fld>
             <a:endParaRPr lang="fr-BE"/>
           </a:p>
@@ -2397,7 +2397,7 @@
             <a:fld id="{68BDF4EC-5B70-45D8-B718-E56EB4C6B13E}" type="datetimeFigureOut">
               <a:rPr lang="fr-BE" smtClean="0"/>
               <a:pPr/>
-              <a:t>5/07/2011</a:t>
+              <a:t>6/07/2011</a:t>
             </a:fld>
             <a:endParaRPr lang="fr-BE"/>
           </a:p>
@@ -2671,7 +2671,7 @@
             <a:fld id="{68BDF4EC-5B70-45D8-B718-E56EB4C6B13E}" type="datetimeFigureOut">
               <a:rPr lang="fr-BE" smtClean="0"/>
               <a:pPr/>
-              <a:t>5/07/2011</a:t>
+              <a:t>6/07/2011</a:t>
             </a:fld>
             <a:endParaRPr lang="fr-BE"/>
           </a:p>
@@ -2921,7 +2921,7 @@
             <a:fld id="{68BDF4EC-5B70-45D8-B718-E56EB4C6B13E}" type="datetimeFigureOut">
               <a:rPr lang="fr-BE" smtClean="0"/>
               <a:pPr/>
-              <a:t>5/07/2011</a:t>
+              <a:t>6/07/2011</a:t>
             </a:fld>
             <a:endParaRPr lang="fr-BE"/>
           </a:p>
@@ -3131,7 +3131,7 @@
             <a:fld id="{68BDF4EC-5B70-45D8-B718-E56EB4C6B13E}" type="datetimeFigureOut">
               <a:rPr lang="fr-BE" smtClean="0"/>
               <a:pPr/>
-              <a:t>5/07/2011</a:t>
+              <a:t>6/07/2011</a:t>
             </a:fld>
             <a:endParaRPr lang="fr-BE"/>
           </a:p>
@@ -4873,11 +4873,19 @@
             </a:fontRef>
           </p:style>
           <p:txBody>
-            <a:bodyPr rtlCol="0" anchor="ctr"/>
+            <a:bodyPr wrap="none" bIns="108000" rtlCol="0" anchor="ctr"/>
             <a:lstStyle/>
             <a:p>
               <a:pPr algn="ctr"/>
-              <a:endParaRPr lang="fr-BE" sz="2400" noProof="1"/>
+              <a:r>
+                <a:rPr lang="fr-BE" noProof="1" smtClean="0"/>
+                <a:t>q</a:t>
+              </a:r>
+              <a:r>
+                <a:rPr lang="fr-BE" baseline="-25000" noProof="1" smtClean="0"/>
+                <a:t>u</a:t>
+              </a:r>
+              <a:endParaRPr lang="fr-BE" baseline="-25000" noProof="1"/>
             </a:p>
           </p:txBody>
         </p:sp>
@@ -4911,7 +4919,7 @@
             </a:fontRef>
           </p:style>
           <p:txBody>
-            <a:bodyPr wrap="none" rtlCol="0" anchor="ctr"/>
+            <a:bodyPr wrap="none" bIns="108000" rtlCol="0" anchor="ctr"/>
             <a:lstStyle/>
             <a:p>
               <a:pPr algn="ctr"/>
@@ -4957,7 +4965,7 @@
             </a:fontRef>
           </p:style>
           <p:txBody>
-            <a:bodyPr wrap="none" rtlCol="0" anchor="ctr"/>
+            <a:bodyPr wrap="none" bIns="108000" rtlCol="0" anchor="ctr"/>
             <a:lstStyle/>
             <a:p>
               <a:pPr algn="ctr"/>
@@ -5320,8 +5328,8 @@
           </p:nvSpPr>
           <p:spPr>
             <a:xfrm>
-              <a:off x="4317876" y="1360561"/>
-              <a:ext cx="424796" cy="215444"/>
+              <a:off x="4331422" y="1360561"/>
+              <a:ext cx="312586" cy="215444"/>
             </a:xfrm>
             <a:prstGeom prst="rect">
               <a:avLst/>
@@ -5338,7 +5346,15 @@
             <a:p>
               <a:r>
                 <a:rPr lang="fr-BE" sz="1400" noProof="1" smtClean="0"/>
-                <a:t>{[ Fl ]}</a:t>
+                <a:t>[ </a:t>
+              </a:r>
+              <a:r>
+                <a:rPr lang="fr-BE" sz="1400" noProof="1" smtClean="0"/>
+                <a:t>Fl </a:t>
+              </a:r>
+              <a:r>
+                <a:rPr lang="fr-BE" sz="1400" noProof="1" smtClean="0"/>
+                <a:t>]</a:t>
               </a:r>
               <a:endParaRPr lang="fr-BE" sz="1400" noProof="1"/>
             </a:p>
@@ -5352,8 +5368,8 @@
           </p:nvSpPr>
           <p:spPr>
             <a:xfrm>
-              <a:off x="3232804" y="1360561"/>
-              <a:ext cx="553037" cy="215444"/>
+              <a:off x="3316226" y="1360561"/>
+              <a:ext cx="440826" cy="215444"/>
             </a:xfrm>
             <a:prstGeom prst="rect">
               <a:avLst/>
@@ -5370,7 +5386,7 @@
             <a:p>
               <a:r>
                 <a:rPr lang="fr-BE" sz="1400" noProof="1" smtClean="0"/>
-                <a:t>{[ </a:t>
+                <a:t>[ </a:t>
               </a:r>
               <a:r>
                 <a:rPr lang="fr-BE" sz="1400" noProof="1" smtClean="0">
@@ -5380,7 +5396,7 @@
               </a:r>
               <a:r>
                 <a:rPr lang="fr-BE" sz="1400" noProof="1" smtClean="0"/>
-                <a:t>Fl ]}</a:t>
+                <a:t>Fl ]</a:t>
               </a:r>
               <a:endParaRPr lang="fr-BE" sz="1400" noProof="1"/>
             </a:p>
@@ -5555,7 +5571,7 @@
           <p:spPr>
             <a:xfrm>
               <a:off x="5199520" y="2204864"/>
-              <a:ext cx="424796" cy="215444"/>
+              <a:ext cx="312586" cy="215444"/>
             </a:xfrm>
             <a:prstGeom prst="rect">
               <a:avLst/>
@@ -5572,7 +5588,15 @@
             <a:p>
               <a:r>
                 <a:rPr lang="fr-BE" sz="1400" noProof="1" smtClean="0"/>
-                <a:t>{[ Fl ]}</a:t>
+                <a:t>[ </a:t>
+              </a:r>
+              <a:r>
+                <a:rPr lang="fr-BE" sz="1400" noProof="1" smtClean="0"/>
+                <a:t>Fl </a:t>
+              </a:r>
+              <a:r>
+                <a:rPr lang="fr-BE" sz="1400" noProof="1" smtClean="0"/>
+                <a:t>]</a:t>
               </a:r>
               <a:endParaRPr lang="fr-BE" sz="1400" noProof="1"/>
             </a:p>
@@ -5586,8 +5610,8 @@
           </p:nvSpPr>
           <p:spPr>
             <a:xfrm>
-              <a:off x="2255157" y="2204864"/>
-              <a:ext cx="553037" cy="215444"/>
+              <a:off x="2339752" y="2204864"/>
+              <a:ext cx="440826" cy="215444"/>
             </a:xfrm>
             <a:prstGeom prst="rect">
               <a:avLst/>
@@ -5604,7 +5628,7 @@
             <a:p>
               <a:r>
                 <a:rPr lang="fr-BE" sz="1400" noProof="1" smtClean="0"/>
-                <a:t>{[ </a:t>
+                <a:t>[ </a:t>
               </a:r>
               <a:r>
                 <a:rPr lang="fr-BE" sz="1400" noProof="1" smtClean="0">
@@ -5614,7 +5638,11 @@
               </a:r>
               <a:r>
                 <a:rPr lang="fr-BE" sz="1400" noProof="1" smtClean="0"/>
-                <a:t>Fl ]}</a:t>
+                <a:t>Fl </a:t>
+              </a:r>
+              <a:r>
+                <a:rPr lang="fr-BE" sz="1400" noProof="1" smtClean="0"/>
+                <a:t>]</a:t>
               </a:r>
               <a:endParaRPr lang="fr-BE" sz="1400" noProof="1"/>
             </a:p>
@@ -5704,10 +5732,18 @@
             </a:fontRef>
           </p:style>
           <p:txBody>
-            <a:bodyPr rtlCol="0" anchor="ctr"/>
+            <a:bodyPr wrap="none" bIns="108000" rtlCol="0" anchor="ctr"/>
             <a:lstStyle/>
             <a:p>
               <a:pPr algn="ctr"/>
+              <a:r>
+                <a:rPr lang="fr-BE" noProof="1" smtClean="0"/>
+                <a:t>q</a:t>
+              </a:r>
+              <a:r>
+                <a:rPr lang="fr-BE" baseline="-25000" noProof="1" smtClean="0"/>
+                <a:t>u</a:t>
+              </a:r>
               <a:endParaRPr lang="fr-BE" noProof="1"/>
             </a:p>
           </p:txBody>
@@ -5742,7 +5778,7 @@
             </a:fontRef>
           </p:style>
           <p:txBody>
-            <a:bodyPr wrap="none" rtlCol="0" anchor="ctr"/>
+            <a:bodyPr wrap="none" bIns="108000" rtlCol="0" anchor="ctr"/>
             <a:lstStyle/>
             <a:p>
               <a:pPr algn="ctr"/>
@@ -5788,7 +5824,7 @@
             </a:fontRef>
           </p:style>
           <p:txBody>
-            <a:bodyPr wrap="none" rtlCol="0" anchor="ctr"/>
+            <a:bodyPr wrap="none" bIns="108000" rtlCol="0" anchor="ctr"/>
             <a:lstStyle/>
             <a:p>
               <a:pPr algn="ctr"/>
@@ -6152,7 +6188,7 @@
           <p:spPr>
             <a:xfrm>
               <a:off x="4355976" y="4149080"/>
-              <a:ext cx="937757" cy="169277"/>
+              <a:ext cx="847989" cy="169277"/>
             </a:xfrm>
             <a:prstGeom prst="rect">
               <a:avLst/>
@@ -6169,7 +6205,15 @@
             <a:p>
               <a:r>
                 <a:rPr lang="fr-BE" sz="1100" noProof="1" smtClean="0"/>
-                <a:t>{[second_cycle]}</a:t>
+                <a:t>[</a:t>
+              </a:r>
+              <a:r>
+                <a:rPr lang="fr-BE" sz="1100" noProof="1" smtClean="0"/>
+                <a:t>second_cycle</a:t>
+              </a:r>
+              <a:r>
+                <a:rPr lang="fr-BE" sz="1100" noProof="1" smtClean="0"/>
+                <a:t>]</a:t>
               </a:r>
               <a:endParaRPr lang="fr-BE" sz="1100" noProof="1"/>
             </a:p>
@@ -6184,7 +6228,7 @@
           <p:spPr>
             <a:xfrm>
               <a:off x="2915816" y="4149080"/>
-              <a:ext cx="1070806" cy="169277"/>
+              <a:ext cx="981038" cy="169277"/>
             </a:xfrm>
             <a:prstGeom prst="rect">
               <a:avLst/>
@@ -6201,7 +6245,7 @@
             <a:p>
               <a:r>
                 <a:rPr lang="fr-BE" sz="1100" noProof="1" smtClean="0"/>
-                <a:t>{[</a:t>
+                <a:t>[</a:t>
               </a:r>
               <a:r>
                 <a:rPr lang="fr-BE" sz="1100" noProof="1" smtClean="0">
@@ -6211,7 +6255,11 @@
               </a:r>
               <a:r>
                 <a:rPr lang="fr-BE" sz="1100" noProof="1" smtClean="0"/>
-                <a:t>second_cycle]}</a:t>
+                <a:t>second_cycle</a:t>
+              </a:r>
+              <a:r>
+                <a:rPr lang="fr-BE" sz="1100" noProof="1" smtClean="0"/>
+                <a:t>]</a:t>
               </a:r>
               <a:endParaRPr lang="fr-BE" sz="1100" noProof="1"/>
             </a:p>
@@ -6383,8 +6431,8 @@
           </p:nvSpPr>
           <p:spPr>
             <a:xfrm>
-              <a:off x="1700740" y="5138142"/>
-              <a:ext cx="1038746" cy="169277"/>
+              <a:off x="1894830" y="5138142"/>
+              <a:ext cx="948978" cy="169277"/>
             </a:xfrm>
             <a:prstGeom prst="rect">
               <a:avLst/>
@@ -6401,7 +6449,7 @@
             <a:p>
               <a:r>
                 <a:rPr lang="fr-BE" sz="1100" noProof="1" smtClean="0"/>
-                <a:t>{[</a:t>
+                <a:t>[</a:t>
               </a:r>
               <a:r>
                 <a:rPr lang="fr-BE" sz="1100" noProof="1" smtClean="0">
@@ -6411,7 +6459,11 @@
               </a:r>
               <a:r>
                 <a:rPr lang="fr-BE" sz="1100" noProof="1" smtClean="0"/>
-                <a:t>second_cycle]}</a:t>
+                <a:t>second_cycle</a:t>
+              </a:r>
+              <a:r>
+                <a:rPr lang="fr-BE" sz="1100" noProof="1" smtClean="0"/>
+                <a:t>]</a:t>
               </a:r>
               <a:endParaRPr lang="fr-BE" sz="1100" noProof="1"/>
             </a:p>
@@ -6425,8 +6477,8 @@
           </p:nvSpPr>
           <p:spPr>
             <a:xfrm>
-              <a:off x="5404950" y="5117441"/>
-              <a:ext cx="937757" cy="169277"/>
+              <a:off x="5436096" y="5117441"/>
+              <a:ext cx="847989" cy="169277"/>
             </a:xfrm>
             <a:prstGeom prst="rect">
               <a:avLst/>
@@ -6443,7 +6495,15 @@
             <a:p>
               <a:r>
                 <a:rPr lang="fr-BE" sz="1100" noProof="1" smtClean="0"/>
-                <a:t>{[second_cycle]}</a:t>
+                <a:t>[</a:t>
+              </a:r>
+              <a:r>
+                <a:rPr lang="fr-BE" sz="1100" noProof="1" smtClean="0"/>
+                <a:t>second_cycle</a:t>
+              </a:r>
+              <a:r>
+                <a:rPr lang="fr-BE" sz="1100" noProof="1" smtClean="0"/>
+                <a:t>]</a:t>
               </a:r>
               <a:endParaRPr lang="fr-BE" sz="1100" noProof="1"/>
             </a:p>
@@ -17729,11 +17789,7 @@
                 </a:r>
                 <a:r>
                   <a:rPr lang="fr-BE" sz="1200" noProof="1" smtClean="0"/>
-                  <a:t>resolve_by_weakening</a:t>
-                </a:r>
-                <a:r>
-                  <a:rPr lang="fr-BE" sz="1200" noProof="1" smtClean="0"/>
-                  <a:t>]</a:t>
+                  <a:t>resolve_by_weakening]</a:t>
                 </a:r>
                 <a:endParaRPr lang="fr-BE" sz="1200" noProof="1"/>
               </a:p>
@@ -18479,8 +18535,8 @@
             </p:nvSpPr>
             <p:spPr>
               <a:xfrm>
-                <a:off x="7571053" y="2449032"/>
-                <a:ext cx="869913" cy="153888"/>
+                <a:off x="7539055" y="2442682"/>
+                <a:ext cx="921210" cy="153888"/>
               </a:xfrm>
               <a:prstGeom prst="rect">
                 <a:avLst/>
@@ -18503,7 +18559,7 @@
                   <a:rPr lang="fr-BE" sz="1000" b="1" noProof="1" smtClean="0">
                     <a:latin typeface="+mj-lt"/>
                   </a:rPr>
-                  <a:t>send_invitation</a:t>
+                  <a:t>send_invitations</a:t>
                 </a:r>
                 <a:endParaRPr lang="fr-BE" sz="1000" b="1" noProof="1">
                   <a:latin typeface="+mj-lt"/>
@@ -18606,16 +18662,16 @@
       </p:grpSpPr>
       <p:grpSp>
         <p:nvGrpSpPr>
-          <p:cNvPr id="249" name="Groupe 248"/>
+          <p:cNvPr id="207" name="Groupe 206"/>
           <p:cNvGrpSpPr/>
           <p:nvPr/>
         </p:nvGrpSpPr>
         <p:grpSpPr>
           <a:xfrm>
-            <a:off x="611560" y="836712"/>
-            <a:ext cx="8208912" cy="5184576"/>
-            <a:chOff x="611560" y="836712"/>
-            <a:chExt cx="8208912" cy="5184576"/>
+            <a:off x="611560" y="548680"/>
+            <a:ext cx="8208912" cy="5472608"/>
+            <a:chOff x="611560" y="548680"/>
+            <a:chExt cx="8208912" cy="5472608"/>
           </a:xfrm>
         </p:grpSpPr>
         <p:sp>
@@ -18626,8 +18682,8 @@
           </p:nvSpPr>
           <p:spPr>
             <a:xfrm>
-              <a:off x="611560" y="836712"/>
-              <a:ext cx="8208912" cy="5184576"/>
+              <a:off x="611560" y="548680"/>
+              <a:ext cx="8208912" cy="5472608"/>
             </a:xfrm>
             <a:prstGeom prst="rect">
               <a:avLst/>
@@ -18653,56 +18709,7 @@
             <a:lstStyle/>
             <a:p>
               <a:pPr algn="ctr"/>
-              <a:endParaRPr lang="fr-BE" sz="2400"/>
-            </a:p>
-          </p:txBody>
-        </p:sp>
-        <p:sp>
-          <p:nvSpPr>
-            <p:cNvPr id="20" name="Rectangle à coins arrondis 19"/>
-            <p:cNvSpPr/>
-            <p:nvPr/>
-          </p:nvSpPr>
-          <p:spPr>
-            <a:xfrm>
-              <a:off x="4171555" y="1075909"/>
-              <a:ext cx="2128638" cy="622434"/>
-            </a:xfrm>
-            <a:prstGeom prst="roundRect">
-              <a:avLst/>
-            </a:prstGeom>
-            <a:ln w="9525">
-              <a:prstDash val="sysDash"/>
-            </a:ln>
-          </p:spPr>
-          <p:style>
-            <a:lnRef idx="2">
-              <a:schemeClr val="dk1"/>
-            </a:lnRef>
-            <a:fillRef idx="1">
-              <a:schemeClr val="lt1"/>
-            </a:fillRef>
-            <a:effectRef idx="0">
-              <a:schemeClr val="dk1"/>
-            </a:effectRef>
-            <a:fontRef idx="minor">
-              <a:schemeClr val="dk1"/>
-            </a:fontRef>
-          </p:style>
-          <p:txBody>
-            <a:bodyPr wrap="none" lIns="36000" tIns="36000" rIns="36000" bIns="36000" rtlCol="0" anchor="t"/>
-            <a:lstStyle/>
-            <a:p>
-              <a:pPr algn="r"/>
-              <a:r>
-                <a:rPr lang="fr-BE" sz="1200" noProof="1" smtClean="0">
-                  <a:latin typeface="+mj-lt"/>
-                </a:rPr>
-                <a:t>Initiate Meeting</a:t>
-              </a:r>
-              <a:endParaRPr lang="fr-BE" sz="1200" noProof="1">
-                <a:latin typeface="+mj-lt"/>
-              </a:endParaRPr>
+              <a:endParaRPr lang="fr-BE" sz="2400" noProof="1"/>
             </a:p>
           </p:txBody>
         </p:sp>
@@ -19031,402 +19038,10 @@
             <a:lstStyle/>
             <a:p>
               <a:pPr algn="ctr"/>
-              <a:endParaRPr lang="fr-BE"/>
+              <a:endParaRPr lang="fr-BE" noProof="1"/>
             </a:p>
           </p:txBody>
         </p:sp>
-        <p:grpSp>
-          <p:nvGrpSpPr>
-            <p:cNvPr id="89" name="Groupe 88"/>
-            <p:cNvGrpSpPr/>
-            <p:nvPr/>
-          </p:nvGrpSpPr>
-          <p:grpSpPr>
-            <a:xfrm>
-              <a:off x="4240535" y="1399801"/>
-              <a:ext cx="1993364" cy="223354"/>
-              <a:chOff x="899592" y="897580"/>
-              <a:chExt cx="1993364" cy="223354"/>
-            </a:xfrm>
-          </p:grpSpPr>
-          <p:sp>
-            <p:nvSpPr>
-              <p:cNvPr id="56" name="Ellipse 55"/>
-              <p:cNvSpPr/>
-              <p:nvPr/>
-            </p:nvSpPr>
-            <p:spPr>
-              <a:xfrm>
-                <a:off x="899592" y="904910"/>
-                <a:ext cx="216024" cy="216024"/>
-              </a:xfrm>
-              <a:prstGeom prst="ellipse">
-                <a:avLst/>
-              </a:prstGeom>
-              <a:ln w="15875"/>
-            </p:spPr>
-            <p:style>
-              <a:lnRef idx="2">
-                <a:schemeClr val="dk1"/>
-              </a:lnRef>
-              <a:fillRef idx="1">
-                <a:schemeClr val="lt1"/>
-              </a:fillRef>
-              <a:effectRef idx="0">
-                <a:schemeClr val="dk1"/>
-              </a:effectRef>
-              <a:fontRef idx="minor">
-                <a:schemeClr val="dk1"/>
-              </a:fontRef>
-            </p:style>
-            <p:txBody>
-              <a:bodyPr rtlCol="0" anchor="ctr"/>
-              <a:lstStyle/>
-              <a:p>
-                <a:pPr algn="ctr"/>
-                <a:endParaRPr lang="fr-BE"/>
-              </a:p>
-            </p:txBody>
-          </p:sp>
-          <p:sp>
-            <p:nvSpPr>
-              <p:cNvPr id="59" name="Ellipse 58"/>
-              <p:cNvSpPr/>
-              <p:nvPr/>
-            </p:nvSpPr>
-            <p:spPr>
-              <a:xfrm>
-                <a:off x="1490896" y="904910"/>
-                <a:ext cx="216024" cy="216024"/>
-              </a:xfrm>
-              <a:prstGeom prst="ellipse">
-                <a:avLst/>
-              </a:prstGeom>
-              <a:ln w="15875"/>
-            </p:spPr>
-            <p:style>
-              <a:lnRef idx="2">
-                <a:schemeClr val="dk1"/>
-              </a:lnRef>
-              <a:fillRef idx="1">
-                <a:schemeClr val="lt1"/>
-              </a:fillRef>
-              <a:effectRef idx="0">
-                <a:schemeClr val="dk1"/>
-              </a:effectRef>
-              <a:fontRef idx="minor">
-                <a:schemeClr val="dk1"/>
-              </a:fontRef>
-            </p:style>
-            <p:txBody>
-              <a:bodyPr rtlCol="0" anchor="ctr"/>
-              <a:lstStyle/>
-              <a:p>
-                <a:pPr algn="ctr"/>
-                <a:endParaRPr lang="fr-BE"/>
-              </a:p>
-            </p:txBody>
-          </p:sp>
-          <p:sp>
-            <p:nvSpPr>
-              <p:cNvPr id="61" name="Ellipse 60"/>
-              <p:cNvSpPr/>
-              <p:nvPr/>
-            </p:nvSpPr>
-            <p:spPr>
-              <a:xfrm>
-                <a:off x="2107346" y="904910"/>
-                <a:ext cx="216024" cy="216024"/>
-              </a:xfrm>
-              <a:prstGeom prst="ellipse">
-                <a:avLst/>
-              </a:prstGeom>
-              <a:ln w="15875"/>
-            </p:spPr>
-            <p:style>
-              <a:lnRef idx="2">
-                <a:schemeClr val="dk1"/>
-              </a:lnRef>
-              <a:fillRef idx="1">
-                <a:schemeClr val="lt1"/>
-              </a:fillRef>
-              <a:effectRef idx="0">
-                <a:schemeClr val="dk1"/>
-              </a:effectRef>
-              <a:fontRef idx="minor">
-                <a:schemeClr val="dk1"/>
-              </a:fontRef>
-            </p:style>
-            <p:txBody>
-              <a:bodyPr rtlCol="0" anchor="ctr"/>
-              <a:lstStyle/>
-              <a:p>
-                <a:pPr algn="ctr"/>
-                <a:endParaRPr lang="fr-BE"/>
-              </a:p>
-            </p:txBody>
-          </p:sp>
-          <p:sp>
-            <p:nvSpPr>
-              <p:cNvPr id="62" name="Ellipse 61"/>
-              <p:cNvSpPr/>
-              <p:nvPr/>
-            </p:nvSpPr>
-            <p:spPr>
-              <a:xfrm>
-                <a:off x="2676932" y="904910"/>
-                <a:ext cx="216024" cy="216024"/>
-              </a:xfrm>
-              <a:prstGeom prst="ellipse">
-                <a:avLst/>
-              </a:prstGeom>
-              <a:ln w="15875"/>
-            </p:spPr>
-            <p:style>
-              <a:lnRef idx="2">
-                <a:schemeClr val="dk1"/>
-              </a:lnRef>
-              <a:fillRef idx="1">
-                <a:schemeClr val="lt1"/>
-              </a:fillRef>
-              <a:effectRef idx="0">
-                <a:schemeClr val="dk1"/>
-              </a:effectRef>
-              <a:fontRef idx="minor">
-                <a:schemeClr val="dk1"/>
-              </a:fontRef>
-            </p:style>
-            <p:txBody>
-              <a:bodyPr rtlCol="0" anchor="ctr"/>
-              <a:lstStyle/>
-              <a:p>
-                <a:pPr algn="ctr"/>
-                <a:endParaRPr lang="fr-BE"/>
-              </a:p>
-            </p:txBody>
-          </p:sp>
-          <p:cxnSp>
-            <p:nvCxnSpPr>
-              <p:cNvPr id="66" name="Connecteur droit avec flèche 65"/>
-              <p:cNvCxnSpPr>
-                <a:stCxn id="56" idx="6"/>
-                <a:endCxn id="59" idx="2"/>
-              </p:cNvCxnSpPr>
-              <p:nvPr/>
-            </p:nvCxnSpPr>
-            <p:spPr>
-              <a:xfrm>
-                <a:off x="1115616" y="1012922"/>
-                <a:ext cx="375280" cy="1588"/>
-              </a:xfrm>
-              <a:prstGeom prst="straightConnector1">
-                <a:avLst/>
-              </a:prstGeom>
-              <a:ln w="12700">
-                <a:solidFill>
-                  <a:schemeClr val="tx1"/>
-                </a:solidFill>
-                <a:tailEnd type="triangle" w="med" len="sm"/>
-              </a:ln>
-            </p:spPr>
-            <p:style>
-              <a:lnRef idx="1">
-                <a:schemeClr val="accent1"/>
-              </a:lnRef>
-              <a:fillRef idx="0">
-                <a:schemeClr val="accent1"/>
-              </a:fillRef>
-              <a:effectRef idx="0">
-                <a:schemeClr val="accent1"/>
-              </a:effectRef>
-              <a:fontRef idx="minor">
-                <a:schemeClr val="tx1"/>
-              </a:fontRef>
-            </p:style>
-          </p:cxnSp>
-          <p:cxnSp>
-            <p:nvCxnSpPr>
-              <p:cNvPr id="75" name="Connecteur droit avec flèche 74"/>
-              <p:cNvCxnSpPr>
-                <a:stCxn id="59" idx="6"/>
-                <a:endCxn id="61" idx="2"/>
-              </p:cNvCxnSpPr>
-              <p:nvPr/>
-            </p:nvCxnSpPr>
-            <p:spPr>
-              <a:xfrm>
-                <a:off x="1706920" y="1012922"/>
-                <a:ext cx="400426" cy="1588"/>
-              </a:xfrm>
-              <a:prstGeom prst="straightConnector1">
-                <a:avLst/>
-              </a:prstGeom>
-              <a:ln w="12700">
-                <a:solidFill>
-                  <a:schemeClr val="tx1"/>
-                </a:solidFill>
-                <a:tailEnd type="triangle" w="med" len="sm"/>
-              </a:ln>
-            </p:spPr>
-            <p:style>
-              <a:lnRef idx="1">
-                <a:schemeClr val="accent1"/>
-              </a:lnRef>
-              <a:fillRef idx="0">
-                <a:schemeClr val="accent1"/>
-              </a:fillRef>
-              <a:effectRef idx="0">
-                <a:schemeClr val="accent1"/>
-              </a:effectRef>
-              <a:fontRef idx="minor">
-                <a:schemeClr val="tx1"/>
-              </a:fontRef>
-            </p:style>
-          </p:cxnSp>
-          <p:cxnSp>
-            <p:nvCxnSpPr>
-              <p:cNvPr id="81" name="Connecteur droit avec flèche 80"/>
-              <p:cNvCxnSpPr>
-                <a:stCxn id="61" idx="6"/>
-                <a:endCxn id="62" idx="2"/>
-              </p:cNvCxnSpPr>
-              <p:nvPr/>
-            </p:nvCxnSpPr>
-            <p:spPr>
-              <a:xfrm>
-                <a:off x="2323370" y="1012922"/>
-                <a:ext cx="353562" cy="1588"/>
-              </a:xfrm>
-              <a:prstGeom prst="straightConnector1">
-                <a:avLst/>
-              </a:prstGeom>
-              <a:ln w="12700">
-                <a:solidFill>
-                  <a:schemeClr val="tx1"/>
-                </a:solidFill>
-                <a:tailEnd type="triangle" w="med" len="sm"/>
-              </a:ln>
-            </p:spPr>
-            <p:style>
-              <a:lnRef idx="1">
-                <a:schemeClr val="accent1"/>
-              </a:lnRef>
-              <a:fillRef idx="0">
-                <a:schemeClr val="accent1"/>
-              </a:fillRef>
-              <a:effectRef idx="0">
-                <a:schemeClr val="accent1"/>
-              </a:effectRef>
-              <a:fontRef idx="minor">
-                <a:schemeClr val="tx1"/>
-              </a:fontRef>
-            </p:style>
-          </p:cxnSp>
-          <p:sp>
-            <p:nvSpPr>
-              <p:cNvPr id="85" name="ZoneTexte 84"/>
-              <p:cNvSpPr txBox="1"/>
-              <p:nvPr/>
-            </p:nvSpPr>
-            <p:spPr>
-              <a:xfrm>
-                <a:off x="1745020" y="897580"/>
-                <a:ext cx="271993" cy="215444"/>
-              </a:xfrm>
-              <a:prstGeom prst="rect">
-                <a:avLst/>
-              </a:prstGeom>
-              <a:solidFill>
-                <a:schemeClr val="bg1"/>
-              </a:solidFill>
-            </p:spPr>
-            <p:txBody>
-              <a:bodyPr wrap="none" lIns="18000" tIns="0" rIns="18000" bIns="0" rtlCol="0">
-                <a:spAutoFit/>
-              </a:bodyPr>
-              <a:lstStyle/>
-              <a:p>
-                <a:r>
-                  <a:rPr lang="fr-BE" sz="1400" dirty="0" smtClean="0"/>
-                  <a:t>{…}</a:t>
-                </a:r>
-                <a:endParaRPr lang="fr-BE" sz="1400" dirty="0"/>
-              </a:p>
-            </p:txBody>
-          </p:sp>
-          <p:sp>
-            <p:nvSpPr>
-              <p:cNvPr id="86" name="ZoneTexte 85"/>
-              <p:cNvSpPr txBox="1"/>
-              <p:nvPr/>
-            </p:nvSpPr>
-            <p:spPr>
-              <a:xfrm>
-                <a:off x="1149861" y="916340"/>
-                <a:ext cx="253787" cy="184666"/>
-              </a:xfrm>
-              <a:prstGeom prst="rect">
-                <a:avLst/>
-              </a:prstGeom>
-              <a:solidFill>
-                <a:schemeClr val="bg1"/>
-              </a:solidFill>
-            </p:spPr>
-            <p:txBody>
-              <a:bodyPr wrap="none" lIns="0" tIns="0" rIns="0" bIns="0" rtlCol="0">
-                <a:spAutoFit/>
-              </a:bodyPr>
-              <a:lstStyle/>
-              <a:p>
-                <a:r>
-                  <a:rPr lang="fr-BE" sz="1200" dirty="0" err="1" smtClean="0"/>
-                  <a:t>T</a:t>
-                </a:r>
-                <a:r>
-                  <a:rPr lang="fr-BE" sz="1200" baseline="-25000" dirty="0" err="1" smtClean="0"/>
-                  <a:t>start</a:t>
-                </a:r>
-                <a:endParaRPr lang="fr-BE" sz="1200" baseline="-25000" dirty="0"/>
-              </a:p>
-            </p:txBody>
-          </p:sp>
-          <p:sp>
-            <p:nvSpPr>
-              <p:cNvPr id="88" name="ZoneTexte 87"/>
-              <p:cNvSpPr txBox="1"/>
-              <p:nvPr/>
-            </p:nvSpPr>
-            <p:spPr>
-              <a:xfrm>
-                <a:off x="2362612" y="916340"/>
-                <a:ext cx="221984" cy="184666"/>
-              </a:xfrm>
-              <a:prstGeom prst="rect">
-                <a:avLst/>
-              </a:prstGeom>
-              <a:solidFill>
-                <a:schemeClr val="bg1"/>
-              </a:solidFill>
-            </p:spPr>
-            <p:txBody>
-              <a:bodyPr wrap="none" lIns="0" tIns="0" rIns="0" bIns="0" rtlCol="0">
-                <a:spAutoFit/>
-              </a:bodyPr>
-              <a:lstStyle/>
-              <a:p>
-                <a:r>
-                  <a:rPr lang="fr-BE" sz="1200" dirty="0" smtClean="0"/>
-                  <a:t>T</a:t>
-                </a:r>
-                <a:r>
-                  <a:rPr lang="fr-BE" sz="1200" baseline="-25000" dirty="0" smtClean="0"/>
-                  <a:t>end</a:t>
-                </a:r>
-                <a:endParaRPr lang="fr-BE" sz="1200" baseline="-25000" dirty="0"/>
-              </a:p>
-            </p:txBody>
-          </p:sp>
-        </p:grpSp>
         <p:grpSp>
           <p:nvGrpSpPr>
             <p:cNvPr id="129" name="Groupe 128"/>
@@ -19476,7 +19091,7 @@
               <a:lstStyle/>
               <a:p>
                 <a:pPr algn="ctr"/>
-                <a:endParaRPr lang="fr-BE"/>
+                <a:endParaRPr lang="fr-BE" noProof="1"/>
               </a:p>
             </p:txBody>
           </p:sp>
@@ -19515,7 +19130,7 @@
               <a:lstStyle/>
               <a:p>
                 <a:pPr algn="ctr"/>
-                <a:endParaRPr lang="fr-BE"/>
+                <a:endParaRPr lang="fr-BE" noProof="1"/>
               </a:p>
             </p:txBody>
           </p:sp>
@@ -19554,7 +19169,7 @@
               <a:lstStyle/>
               <a:p>
                 <a:pPr algn="ctr"/>
-                <a:endParaRPr lang="fr-BE"/>
+                <a:endParaRPr lang="fr-BE" noProof="1"/>
               </a:p>
             </p:txBody>
           </p:sp>
@@ -19593,7 +19208,7 @@
               <a:lstStyle/>
               <a:p>
                 <a:pPr algn="ctr"/>
-                <a:endParaRPr lang="fr-BE"/>
+                <a:endParaRPr lang="fr-BE" noProof="1"/>
               </a:p>
             </p:txBody>
           </p:sp>
@@ -19739,10 +19354,10 @@
               <a:lstStyle/>
               <a:p>
                 <a:r>
-                  <a:rPr lang="fr-BE" sz="1400" dirty="0" smtClean="0"/>
+                  <a:rPr lang="fr-BE" sz="1400" noProof="1" smtClean="0"/>
                   <a:t>{…}</a:t>
                 </a:r>
-                <a:endParaRPr lang="fr-BE" sz="1400" dirty="0"/>
+                <a:endParaRPr lang="fr-BE" sz="1400" noProof="1"/>
               </a:p>
             </p:txBody>
           </p:sp>
@@ -19771,14 +19386,14 @@
               <a:lstStyle/>
               <a:p>
                 <a:r>
-                  <a:rPr lang="fr-BE" sz="1200" dirty="0" err="1" smtClean="0"/>
+                  <a:rPr lang="fr-BE" sz="1200" noProof="1" smtClean="0"/>
                   <a:t>T</a:t>
                 </a:r>
                 <a:r>
-                  <a:rPr lang="fr-BE" sz="1200" baseline="-25000" dirty="0" err="1" smtClean="0"/>
+                  <a:rPr lang="fr-BE" sz="1200" baseline="-25000" noProof="1" smtClean="0"/>
                   <a:t>start</a:t>
                 </a:r>
-                <a:endParaRPr lang="fr-BE" sz="1200" baseline="-25000" dirty="0"/>
+                <a:endParaRPr lang="fr-BE" sz="1200" baseline="-25000" noProof="1"/>
               </a:p>
             </p:txBody>
           </p:sp>
@@ -19807,14 +19422,14 @@
               <a:lstStyle/>
               <a:p>
                 <a:r>
-                  <a:rPr lang="fr-BE" sz="1200" dirty="0" smtClean="0"/>
+                  <a:rPr lang="fr-BE" sz="1200" noProof="1" smtClean="0"/>
                   <a:t>T</a:t>
                 </a:r>
                 <a:r>
-                  <a:rPr lang="fr-BE" sz="1200" baseline="-25000" dirty="0" smtClean="0"/>
+                  <a:rPr lang="fr-BE" sz="1200" baseline="-25000" noProof="1" smtClean="0"/>
                   <a:t>end</a:t>
                 </a:r>
-                <a:endParaRPr lang="fr-BE" sz="1200" baseline="-25000" dirty="0"/>
+                <a:endParaRPr lang="fr-BE" sz="1200" baseline="-25000" noProof="1"/>
               </a:p>
             </p:txBody>
           </p:sp>
@@ -19868,7 +19483,7 @@
               <a:lstStyle/>
               <a:p>
                 <a:pPr algn="ctr"/>
-                <a:endParaRPr lang="fr-BE"/>
+                <a:endParaRPr lang="fr-BE" noProof="1"/>
               </a:p>
             </p:txBody>
           </p:sp>
@@ -19907,7 +19522,7 @@
               <a:lstStyle/>
               <a:p>
                 <a:pPr algn="ctr"/>
-                <a:endParaRPr lang="fr-BE"/>
+                <a:endParaRPr lang="fr-BE" noProof="1"/>
               </a:p>
             </p:txBody>
           </p:sp>
@@ -19946,7 +19561,7 @@
               <a:lstStyle/>
               <a:p>
                 <a:pPr algn="ctr"/>
-                <a:endParaRPr lang="fr-BE"/>
+                <a:endParaRPr lang="fr-BE" noProof="1"/>
               </a:p>
             </p:txBody>
           </p:sp>
@@ -19985,7 +19600,7 @@
               <a:lstStyle/>
               <a:p>
                 <a:pPr algn="ctr"/>
-                <a:endParaRPr lang="fr-BE"/>
+                <a:endParaRPr lang="fr-BE" noProof="1"/>
               </a:p>
             </p:txBody>
           </p:sp>
@@ -20131,10 +19746,10 @@
               <a:lstStyle/>
               <a:p>
                 <a:r>
-                  <a:rPr lang="fr-BE" sz="1400" dirty="0" smtClean="0"/>
+                  <a:rPr lang="fr-BE" sz="1400" noProof="1" smtClean="0"/>
                   <a:t>{…}</a:t>
                 </a:r>
-                <a:endParaRPr lang="fr-BE" sz="1400" dirty="0"/>
+                <a:endParaRPr lang="fr-BE" sz="1400" noProof="1"/>
               </a:p>
             </p:txBody>
           </p:sp>
@@ -20163,14 +19778,14 @@
               <a:lstStyle/>
               <a:p>
                 <a:r>
-                  <a:rPr lang="fr-BE" sz="1200" dirty="0" err="1" smtClean="0"/>
+                  <a:rPr lang="fr-BE" sz="1200" noProof="1" smtClean="0"/>
                   <a:t>T</a:t>
                 </a:r>
                 <a:r>
-                  <a:rPr lang="fr-BE" sz="1200" baseline="-25000" dirty="0" err="1" smtClean="0"/>
+                  <a:rPr lang="fr-BE" sz="1200" baseline="-25000" noProof="1" smtClean="0"/>
                   <a:t>start</a:t>
                 </a:r>
-                <a:endParaRPr lang="fr-BE" sz="1200" baseline="-25000" dirty="0"/>
+                <a:endParaRPr lang="fr-BE" sz="1200" baseline="-25000" noProof="1"/>
               </a:p>
             </p:txBody>
           </p:sp>
@@ -20199,14 +19814,14 @@
               <a:lstStyle/>
               <a:p>
                 <a:r>
-                  <a:rPr lang="fr-BE" sz="1200" dirty="0" smtClean="0"/>
+                  <a:rPr lang="fr-BE" sz="1200" noProof="1" smtClean="0"/>
                   <a:t>T</a:t>
                 </a:r>
                 <a:r>
-                  <a:rPr lang="fr-BE" sz="1200" baseline="-25000" dirty="0" smtClean="0"/>
+                  <a:rPr lang="fr-BE" sz="1200" baseline="-25000" noProof="1" smtClean="0"/>
                   <a:t>end</a:t>
                 </a:r>
-                <a:endParaRPr lang="fr-BE" sz="1200" baseline="-25000" dirty="0"/>
+                <a:endParaRPr lang="fr-BE" sz="1200" baseline="-25000" noProof="1"/>
               </a:p>
             </p:txBody>
           </p:sp>
@@ -20260,7 +19875,7 @@
               <a:lstStyle/>
               <a:p>
                 <a:pPr algn="ctr"/>
-                <a:endParaRPr lang="fr-BE"/>
+                <a:endParaRPr lang="fr-BE" noProof="1"/>
               </a:p>
             </p:txBody>
           </p:sp>
@@ -20299,7 +19914,7 @@
               <a:lstStyle/>
               <a:p>
                 <a:pPr algn="ctr"/>
-                <a:endParaRPr lang="fr-BE"/>
+                <a:endParaRPr lang="fr-BE" noProof="1"/>
               </a:p>
             </p:txBody>
           </p:sp>
@@ -20338,7 +19953,7 @@
               <a:lstStyle/>
               <a:p>
                 <a:pPr algn="ctr"/>
-                <a:endParaRPr lang="fr-BE"/>
+                <a:endParaRPr lang="fr-BE" noProof="1"/>
               </a:p>
             </p:txBody>
           </p:sp>
@@ -20377,7 +19992,7 @@
               <a:lstStyle/>
               <a:p>
                 <a:pPr algn="ctr"/>
-                <a:endParaRPr lang="fr-BE"/>
+                <a:endParaRPr lang="fr-BE" noProof="1"/>
               </a:p>
             </p:txBody>
           </p:sp>
@@ -20523,10 +20138,10 @@
               <a:lstStyle/>
               <a:p>
                 <a:r>
-                  <a:rPr lang="fr-BE" sz="1400" dirty="0" smtClean="0"/>
+                  <a:rPr lang="fr-BE" sz="1400" noProof="1" smtClean="0"/>
                   <a:t>{…}</a:t>
                 </a:r>
-                <a:endParaRPr lang="fr-BE" sz="1400" dirty="0"/>
+                <a:endParaRPr lang="fr-BE" sz="1400" noProof="1"/>
               </a:p>
             </p:txBody>
           </p:sp>
@@ -20555,14 +20170,14 @@
               <a:lstStyle/>
               <a:p>
                 <a:r>
-                  <a:rPr lang="fr-BE" sz="1200" dirty="0" err="1" smtClean="0"/>
+                  <a:rPr lang="fr-BE" sz="1200" noProof="1" smtClean="0"/>
                   <a:t>T</a:t>
                 </a:r>
                 <a:r>
-                  <a:rPr lang="fr-BE" sz="1200" baseline="-25000" dirty="0" err="1" smtClean="0"/>
+                  <a:rPr lang="fr-BE" sz="1200" baseline="-25000" noProof="1" smtClean="0"/>
                   <a:t>start</a:t>
                 </a:r>
-                <a:endParaRPr lang="fr-BE" sz="1200" baseline="-25000" dirty="0"/>
+                <a:endParaRPr lang="fr-BE" sz="1200" baseline="-25000" noProof="1"/>
               </a:p>
             </p:txBody>
           </p:sp>
@@ -20591,14 +20206,14 @@
               <a:lstStyle/>
               <a:p>
                 <a:r>
-                  <a:rPr lang="fr-BE" sz="1200" dirty="0" smtClean="0"/>
+                  <a:rPr lang="fr-BE" sz="1200" noProof="1" smtClean="0"/>
                   <a:t>T</a:t>
                 </a:r>
                 <a:r>
-                  <a:rPr lang="fr-BE" sz="1200" baseline="-25000" dirty="0" smtClean="0"/>
+                  <a:rPr lang="fr-BE" sz="1200" baseline="-25000" noProof="1" smtClean="0"/>
                   <a:t>end</a:t>
                 </a:r>
-                <a:endParaRPr lang="fr-BE" sz="1200" baseline="-25000" dirty="0"/>
+                <a:endParaRPr lang="fr-BE" sz="1200" baseline="-25000" noProof="1"/>
               </a:p>
             </p:txBody>
           </p:sp>
@@ -20652,7 +20267,7 @@
               <a:lstStyle/>
               <a:p>
                 <a:pPr algn="ctr"/>
-                <a:endParaRPr lang="fr-BE"/>
+                <a:endParaRPr lang="fr-BE" noProof="1"/>
               </a:p>
             </p:txBody>
           </p:sp>
@@ -20691,7 +20306,7 @@
               <a:lstStyle/>
               <a:p>
                 <a:pPr algn="ctr"/>
-                <a:endParaRPr lang="fr-BE"/>
+                <a:endParaRPr lang="fr-BE" noProof="1"/>
               </a:p>
             </p:txBody>
           </p:sp>
@@ -20730,7 +20345,7 @@
               <a:lstStyle/>
               <a:p>
                 <a:pPr algn="ctr"/>
-                <a:endParaRPr lang="fr-BE"/>
+                <a:endParaRPr lang="fr-BE" noProof="1"/>
               </a:p>
             </p:txBody>
           </p:sp>
@@ -20769,7 +20384,7 @@
               <a:lstStyle/>
               <a:p>
                 <a:pPr algn="ctr"/>
-                <a:endParaRPr lang="fr-BE"/>
+                <a:endParaRPr lang="fr-BE" noProof="1"/>
               </a:p>
             </p:txBody>
           </p:sp>
@@ -20915,10 +20530,10 @@
               <a:lstStyle/>
               <a:p>
                 <a:r>
-                  <a:rPr lang="fr-BE" sz="1400" dirty="0" smtClean="0"/>
+                  <a:rPr lang="fr-BE" sz="1400" noProof="1" smtClean="0"/>
                   <a:t>{…}</a:t>
                 </a:r>
-                <a:endParaRPr lang="fr-BE" sz="1400" dirty="0"/>
+                <a:endParaRPr lang="fr-BE" sz="1400" noProof="1"/>
               </a:p>
             </p:txBody>
           </p:sp>
@@ -20947,14 +20562,14 @@
               <a:lstStyle/>
               <a:p>
                 <a:r>
-                  <a:rPr lang="fr-BE" sz="1200" dirty="0" err="1" smtClean="0"/>
+                  <a:rPr lang="fr-BE" sz="1200" noProof="1" smtClean="0"/>
                   <a:t>T</a:t>
                 </a:r>
                 <a:r>
-                  <a:rPr lang="fr-BE" sz="1200" baseline="-25000" dirty="0" err="1" smtClean="0"/>
+                  <a:rPr lang="fr-BE" sz="1200" baseline="-25000" noProof="1" smtClean="0"/>
                   <a:t>start</a:t>
                 </a:r>
-                <a:endParaRPr lang="fr-BE" sz="1200" baseline="-25000" dirty="0"/>
+                <a:endParaRPr lang="fr-BE" sz="1200" baseline="-25000" noProof="1"/>
               </a:p>
             </p:txBody>
           </p:sp>
@@ -20983,14 +20598,14 @@
               <a:lstStyle/>
               <a:p>
                 <a:r>
-                  <a:rPr lang="fr-BE" sz="1200" dirty="0" smtClean="0"/>
+                  <a:rPr lang="fr-BE" sz="1200" noProof="1" smtClean="0"/>
                   <a:t>T</a:t>
                 </a:r>
                 <a:r>
-                  <a:rPr lang="fr-BE" sz="1200" baseline="-25000" dirty="0" smtClean="0"/>
+                  <a:rPr lang="fr-BE" sz="1200" baseline="-25000" noProof="1" smtClean="0"/>
                   <a:t>end</a:t>
                 </a:r>
-                <a:endParaRPr lang="fr-BE" sz="1200" baseline="-25000" dirty="0"/>
+                <a:endParaRPr lang="fr-BE" sz="1200" baseline="-25000" noProof="1"/>
               </a:p>
             </p:txBody>
           </p:sp>
@@ -21003,7 +20618,7 @@
           </p:nvSpPr>
           <p:spPr>
             <a:xfrm>
-              <a:off x="3491880" y="1130819"/>
+              <a:off x="1187624" y="908720"/>
               <a:ext cx="216024" cy="216024"/>
             </a:xfrm>
             <a:prstGeom prst="ellipse">
@@ -21030,50 +20645,10 @@
             <a:lstStyle/>
             <a:p>
               <a:pPr algn="ctr"/>
-              <a:endParaRPr lang="fr-BE"/>
+              <a:endParaRPr lang="fr-BE" noProof="1"/>
             </a:p>
           </p:txBody>
         </p:sp>
-        <p:cxnSp>
-          <p:nvCxnSpPr>
-            <p:cNvPr id="178" name="Connecteur en arc 177"/>
-            <p:cNvCxnSpPr>
-              <a:stCxn id="173" idx="6"/>
-            </p:cNvCxnSpPr>
-            <p:nvPr/>
-          </p:nvCxnSpPr>
-          <p:spPr>
-            <a:xfrm>
-              <a:off x="3707904" y="1238831"/>
-              <a:ext cx="532631" cy="276312"/>
-            </a:xfrm>
-            <a:prstGeom prst="curvedConnector3">
-              <a:avLst>
-                <a:gd name="adj1" fmla="val 50000"/>
-              </a:avLst>
-            </a:prstGeom>
-            <a:ln w="15875">
-              <a:solidFill>
-                <a:schemeClr val="tx1"/>
-              </a:solidFill>
-              <a:tailEnd type="triangle" w="med" len="lg"/>
-            </a:ln>
-          </p:spPr>
-          <p:style>
-            <a:lnRef idx="1">
-              <a:schemeClr val="accent1"/>
-            </a:lnRef>
-            <a:fillRef idx="0">
-              <a:schemeClr val="accent1"/>
-            </a:fillRef>
-            <a:effectRef idx="0">
-              <a:schemeClr val="accent1"/>
-            </a:effectRef>
-            <a:fontRef idx="minor">
-              <a:schemeClr val="tx1"/>
-            </a:fontRef>
-          </p:style>
-        </p:cxnSp>
         <p:cxnSp>
           <p:nvCxnSpPr>
             <p:cNvPr id="192" name="Connecteur droit avec flèche 191"/>
@@ -21084,7 +20659,7 @@
           </p:nvCxnSpPr>
           <p:spPr>
             <a:xfrm>
-              <a:off x="3275856" y="986803"/>
+              <a:off x="971600" y="764704"/>
               <a:ext cx="247660" cy="175652"/>
             </a:xfrm>
             <a:prstGeom prst="straightConnector1">
@@ -21185,7 +20760,7 @@
             <a:lstStyle/>
             <a:p>
               <a:pPr algn="ctr"/>
-              <a:endParaRPr lang="fr-BE"/>
+              <a:endParaRPr lang="fr-BE" noProof="1"/>
             </a:p>
           </p:txBody>
         </p:sp>
@@ -21363,7 +20938,7 @@
             <a:lstStyle/>
             <a:p>
               <a:pPr algn="ctr"/>
-              <a:endParaRPr lang="fr-BE"/>
+              <a:endParaRPr lang="fr-BE" noProof="1"/>
             </a:p>
           </p:txBody>
         </p:sp>
@@ -21575,7 +21150,7 @@
             <a:lstStyle/>
             <a:p>
               <a:pPr algn="ctr"/>
-              <a:endParaRPr lang="fr-BE"/>
+              <a:endParaRPr lang="fr-BE" noProof="1"/>
             </a:p>
           </p:txBody>
         </p:sp>
@@ -21773,13 +21348,13 @@
         </p:sp>
         <p:sp>
           <p:nvSpPr>
-            <p:cNvPr id="241" name="ZoneTexte 240"/>
+            <p:cNvPr id="243" name="ZoneTexte 242"/>
             <p:cNvSpPr txBox="1"/>
             <p:nvPr/>
           </p:nvSpPr>
           <p:spPr>
             <a:xfrm>
-              <a:off x="3818012" y="1099344"/>
+              <a:off x="3275856" y="2348880"/>
               <a:ext cx="173693" cy="349702"/>
             </a:xfrm>
             <a:prstGeom prst="rect">
@@ -21796,24 +21371,24 @@
             <a:lstStyle/>
             <a:p>
               <a:r>
-                <a:rPr lang="fr-BE" dirty="0" smtClean="0">
+                <a:rPr lang="fr-BE" noProof="1" smtClean="0">
                   <a:sym typeface="Symbol"/>
                 </a:rPr>
                 <a:t></a:t>
               </a:r>
-              <a:endParaRPr lang="fr-BE" dirty="0"/>
+              <a:endParaRPr lang="fr-BE" noProof="1"/>
             </a:p>
           </p:txBody>
         </p:sp>
         <p:sp>
           <p:nvSpPr>
-            <p:cNvPr id="243" name="ZoneTexte 242"/>
+            <p:cNvPr id="244" name="ZoneTexte 243"/>
             <p:cNvSpPr txBox="1"/>
             <p:nvPr/>
           </p:nvSpPr>
           <p:spPr>
             <a:xfrm>
-              <a:off x="3275856" y="2348880"/>
+              <a:off x="5478427" y="3582541"/>
               <a:ext cx="173693" cy="349702"/>
             </a:xfrm>
             <a:prstGeom prst="rect">
@@ -21830,24 +21405,24 @@
             <a:lstStyle/>
             <a:p>
               <a:r>
-                <a:rPr lang="fr-BE" dirty="0" smtClean="0">
+                <a:rPr lang="fr-BE" noProof="1" smtClean="0">
                   <a:sym typeface="Symbol"/>
                 </a:rPr>
                 <a:t></a:t>
               </a:r>
-              <a:endParaRPr lang="fr-BE" dirty="0"/>
+              <a:endParaRPr lang="fr-BE" noProof="1"/>
             </a:p>
           </p:txBody>
         </p:sp>
         <p:sp>
           <p:nvSpPr>
-            <p:cNvPr id="244" name="ZoneTexte 243"/>
+            <p:cNvPr id="245" name="ZoneTexte 244"/>
             <p:cNvSpPr txBox="1"/>
             <p:nvPr/>
           </p:nvSpPr>
           <p:spPr>
             <a:xfrm>
-              <a:off x="5478427" y="3582541"/>
+              <a:off x="7884368" y="4797152"/>
               <a:ext cx="173693" cy="349702"/>
             </a:xfrm>
             <a:prstGeom prst="rect">
@@ -21864,24 +21439,24 @@
             <a:lstStyle/>
             <a:p>
               <a:r>
-                <a:rPr lang="fr-BE" dirty="0" smtClean="0">
+                <a:rPr lang="fr-BE" noProof="1" smtClean="0">
                   <a:sym typeface="Symbol"/>
                 </a:rPr>
                 <a:t></a:t>
               </a:r>
-              <a:endParaRPr lang="fr-BE" dirty="0"/>
+              <a:endParaRPr lang="fr-BE" noProof="1"/>
             </a:p>
           </p:txBody>
         </p:sp>
         <p:sp>
           <p:nvSpPr>
-            <p:cNvPr id="245" name="ZoneTexte 244"/>
+            <p:cNvPr id="246" name="ZoneTexte 245"/>
             <p:cNvSpPr txBox="1"/>
             <p:nvPr/>
           </p:nvSpPr>
           <p:spPr>
             <a:xfrm>
-              <a:off x="7884368" y="4797152"/>
+              <a:off x="3050307" y="4835252"/>
               <a:ext cx="173693" cy="349702"/>
             </a:xfrm>
             <a:prstGeom prst="rect">
@@ -21898,24 +21473,24 @@
             <a:lstStyle/>
             <a:p>
               <a:r>
-                <a:rPr lang="fr-BE" dirty="0" smtClean="0">
+                <a:rPr lang="fr-BE" noProof="1" smtClean="0">
                   <a:sym typeface="Symbol"/>
                 </a:rPr>
                 <a:t></a:t>
               </a:r>
-              <a:endParaRPr lang="fr-BE" dirty="0"/>
+              <a:endParaRPr lang="fr-BE" noProof="1"/>
             </a:p>
           </p:txBody>
         </p:sp>
         <p:sp>
           <p:nvSpPr>
-            <p:cNvPr id="246" name="ZoneTexte 245"/>
+            <p:cNvPr id="247" name="ZoneTexte 246"/>
             <p:cNvSpPr txBox="1"/>
             <p:nvPr/>
           </p:nvSpPr>
           <p:spPr>
             <a:xfrm>
-              <a:off x="3050307" y="4835252"/>
+              <a:off x="5652120" y="2683520"/>
               <a:ext cx="173693" cy="349702"/>
             </a:xfrm>
             <a:prstGeom prst="rect">
@@ -21932,46 +21507,12 @@
             <a:lstStyle/>
             <a:p>
               <a:r>
-                <a:rPr lang="fr-BE" dirty="0" smtClean="0">
+                <a:rPr lang="fr-BE" noProof="1" smtClean="0">
                   <a:sym typeface="Symbol"/>
                 </a:rPr>
                 <a:t></a:t>
               </a:r>
-              <a:endParaRPr lang="fr-BE" dirty="0"/>
-            </a:p>
-          </p:txBody>
-        </p:sp>
-        <p:sp>
-          <p:nvSpPr>
-            <p:cNvPr id="247" name="ZoneTexte 246"/>
-            <p:cNvSpPr txBox="1"/>
-            <p:nvPr/>
-          </p:nvSpPr>
-          <p:spPr>
-            <a:xfrm>
-              <a:off x="5652120" y="2683520"/>
-              <a:ext cx="173693" cy="349702"/>
-            </a:xfrm>
-            <a:prstGeom prst="rect">
-              <a:avLst/>
-            </a:prstGeom>
-            <a:solidFill>
-              <a:schemeClr val="bg1"/>
-            </a:solidFill>
-          </p:spPr>
-          <p:txBody>
-            <a:bodyPr wrap="none" lIns="36000" tIns="36000" rIns="36000" bIns="36000" rtlCol="0" anchor="t" anchorCtr="0">
-              <a:spAutoFit/>
-            </a:bodyPr>
-            <a:lstStyle/>
-            <a:p>
-              <a:r>
-                <a:rPr lang="fr-BE" dirty="0" smtClean="0">
-                  <a:sym typeface="Symbol"/>
-                </a:rPr>
-                <a:t></a:t>
-              </a:r>
-              <a:endParaRPr lang="fr-BE" dirty="0"/>
+              <a:endParaRPr lang="fr-BE" noProof="1"/>
             </a:p>
           </p:txBody>
         </p:sp>
@@ -22073,7 +21614,7 @@
               <a:lstStyle/>
               <a:p>
                 <a:pPr algn="ctr"/>
-                <a:endParaRPr lang="fr-BE"/>
+                <a:endParaRPr lang="fr-BE" noProof="1"/>
               </a:p>
             </p:txBody>
           </p:sp>
@@ -22112,7 +21653,7 @@
               <a:lstStyle/>
               <a:p>
                 <a:pPr algn="ctr"/>
-                <a:endParaRPr lang="fr-BE"/>
+                <a:endParaRPr lang="fr-BE" noProof="1"/>
               </a:p>
             </p:txBody>
           </p:sp>
@@ -22151,7 +21692,7 @@
               <a:lstStyle/>
               <a:p>
                 <a:pPr algn="ctr"/>
-                <a:endParaRPr lang="fr-BE"/>
+                <a:endParaRPr lang="fr-BE" noProof="1"/>
               </a:p>
             </p:txBody>
           </p:sp>
@@ -22190,7 +21731,7 @@
               <a:lstStyle/>
               <a:p>
                 <a:pPr algn="ctr"/>
-                <a:endParaRPr lang="fr-BE"/>
+                <a:endParaRPr lang="fr-BE" noProof="1"/>
               </a:p>
             </p:txBody>
           </p:sp>
@@ -22336,10 +21877,10 @@
               <a:lstStyle/>
               <a:p>
                 <a:r>
-                  <a:rPr lang="fr-BE" sz="1400" dirty="0" smtClean="0"/>
+                  <a:rPr lang="fr-BE" sz="1400" noProof="1" smtClean="0"/>
                   <a:t>{…}</a:t>
                 </a:r>
-                <a:endParaRPr lang="fr-BE" sz="1400" dirty="0"/>
+                <a:endParaRPr lang="fr-BE" sz="1400" noProof="1"/>
               </a:p>
             </p:txBody>
           </p:sp>
@@ -22368,14 +21909,14 @@
               <a:lstStyle/>
               <a:p>
                 <a:r>
-                  <a:rPr lang="fr-BE" sz="1200" dirty="0" err="1" smtClean="0"/>
+                  <a:rPr lang="fr-BE" sz="1200" noProof="1" smtClean="0"/>
                   <a:t>T</a:t>
                 </a:r>
                 <a:r>
-                  <a:rPr lang="fr-BE" sz="1200" baseline="-25000" dirty="0" err="1" smtClean="0"/>
+                  <a:rPr lang="fr-BE" sz="1200" baseline="-25000" noProof="1" smtClean="0"/>
                   <a:t>start</a:t>
                 </a:r>
-                <a:endParaRPr lang="fr-BE" sz="1200" baseline="-25000" dirty="0"/>
+                <a:endParaRPr lang="fr-BE" sz="1200" baseline="-25000" noProof="1"/>
               </a:p>
             </p:txBody>
           </p:sp>
@@ -22404,28 +21945,1009 @@
               <a:lstStyle/>
               <a:p>
                 <a:r>
-                  <a:rPr lang="fr-BE" sz="1200" dirty="0" smtClean="0"/>
+                  <a:rPr lang="fr-BE" sz="1200" noProof="1" smtClean="0"/>
                   <a:t>T</a:t>
                 </a:r>
                 <a:r>
-                  <a:rPr lang="fr-BE" sz="1200" baseline="-25000" dirty="0" smtClean="0"/>
+                  <a:rPr lang="fr-BE" sz="1200" baseline="-25000" noProof="1" smtClean="0"/>
                   <a:t>end</a:t>
                 </a:r>
-                <a:endParaRPr lang="fr-BE" sz="1200" baseline="-25000" dirty="0"/>
+                <a:endParaRPr lang="fr-BE" sz="1200" baseline="-25000" noProof="1"/>
+              </a:p>
+            </p:txBody>
+          </p:sp>
+        </p:grpSp>
+        <p:grpSp>
+          <p:nvGrpSpPr>
+            <p:cNvPr id="205" name="Groupe 204"/>
+            <p:cNvGrpSpPr/>
+            <p:nvPr/>
+          </p:nvGrpSpPr>
+          <p:grpSpPr>
+            <a:xfrm>
+              <a:off x="1835696" y="764704"/>
+              <a:ext cx="5040560" cy="1080119"/>
+              <a:chOff x="1547664" y="764704"/>
+              <a:chExt cx="5040560" cy="1080119"/>
+            </a:xfrm>
+          </p:grpSpPr>
+          <p:sp>
+            <p:nvSpPr>
+              <p:cNvPr id="20" name="Rectangle à coins arrondis 19"/>
+              <p:cNvSpPr/>
+              <p:nvPr/>
+            </p:nvSpPr>
+            <p:spPr>
+              <a:xfrm>
+                <a:off x="1547664" y="764704"/>
+                <a:ext cx="5040560" cy="1080119"/>
+              </a:xfrm>
+              <a:prstGeom prst="roundRect">
+                <a:avLst/>
+              </a:prstGeom>
+              <a:ln w="9525">
+                <a:prstDash val="sysDash"/>
+              </a:ln>
+            </p:spPr>
+            <p:style>
+              <a:lnRef idx="2">
+                <a:schemeClr val="dk1"/>
+              </a:lnRef>
+              <a:fillRef idx="1">
+                <a:schemeClr val="lt1"/>
+              </a:fillRef>
+              <a:effectRef idx="0">
+                <a:schemeClr val="dk1"/>
+              </a:effectRef>
+              <a:fontRef idx="minor">
+                <a:schemeClr val="dk1"/>
+              </a:fontRef>
+            </p:style>
+            <p:txBody>
+              <a:bodyPr wrap="none" lIns="36000" tIns="36000" rIns="36000" bIns="36000" rtlCol="0" anchor="t"/>
+              <a:lstStyle/>
+              <a:p>
+                <a:pPr algn="r"/>
+                <a:r>
+                  <a:rPr lang="fr-BE" sz="1200" noProof="1" smtClean="0">
+                    <a:latin typeface="+mj-lt"/>
+                  </a:rPr>
+                  <a:t>Initiate Meeting</a:t>
+                </a:r>
+                <a:endParaRPr lang="fr-BE" sz="1200" noProof="1">
+                  <a:latin typeface="+mj-lt"/>
+                </a:endParaRPr>
+              </a:p>
+            </p:txBody>
+          </p:sp>
+          <p:sp>
+            <p:nvSpPr>
+              <p:cNvPr id="56" name="Ellipse 55"/>
+              <p:cNvSpPr/>
+              <p:nvPr/>
+            </p:nvSpPr>
+            <p:spPr>
+              <a:xfrm>
+                <a:off x="1757973" y="1170620"/>
+                <a:ext cx="216024" cy="216024"/>
+              </a:xfrm>
+              <a:prstGeom prst="ellipse">
+                <a:avLst/>
+              </a:prstGeom>
+              <a:ln w="15875"/>
+            </p:spPr>
+            <p:style>
+              <a:lnRef idx="2">
+                <a:schemeClr val="dk1"/>
+              </a:lnRef>
+              <a:fillRef idx="1">
+                <a:schemeClr val="lt1"/>
+              </a:fillRef>
+              <a:effectRef idx="0">
+                <a:schemeClr val="dk1"/>
+              </a:effectRef>
+              <a:fontRef idx="minor">
+                <a:schemeClr val="dk1"/>
+              </a:fontRef>
+            </p:style>
+            <p:txBody>
+              <a:bodyPr rtlCol="0" anchor="ctr"/>
+              <a:lstStyle/>
+              <a:p>
+                <a:pPr algn="ctr"/>
+                <a:endParaRPr lang="fr-BE" noProof="1"/>
+              </a:p>
+            </p:txBody>
+          </p:sp>
+          <p:sp>
+            <p:nvSpPr>
+              <p:cNvPr id="59" name="Ellipse 58"/>
+              <p:cNvSpPr/>
+              <p:nvPr/>
+            </p:nvSpPr>
+            <p:spPr>
+              <a:xfrm>
+                <a:off x="2787040" y="1170620"/>
+                <a:ext cx="216024" cy="216024"/>
+              </a:xfrm>
+              <a:prstGeom prst="ellipse">
+                <a:avLst/>
+              </a:prstGeom>
+              <a:ln w="15875"/>
+            </p:spPr>
+            <p:style>
+              <a:lnRef idx="2">
+                <a:schemeClr val="dk1"/>
+              </a:lnRef>
+              <a:fillRef idx="1">
+                <a:schemeClr val="lt1"/>
+              </a:fillRef>
+              <a:effectRef idx="0">
+                <a:schemeClr val="dk1"/>
+              </a:effectRef>
+              <a:fontRef idx="minor">
+                <a:schemeClr val="dk1"/>
+              </a:fontRef>
+            </p:style>
+            <p:txBody>
+              <a:bodyPr rtlCol="0" anchor="ctr"/>
+              <a:lstStyle/>
+              <a:p>
+                <a:pPr algn="ctr"/>
+                <a:endParaRPr lang="fr-BE" noProof="1"/>
+              </a:p>
+            </p:txBody>
+          </p:sp>
+          <p:sp>
+            <p:nvSpPr>
+              <p:cNvPr id="61" name="Ellipse 60"/>
+              <p:cNvSpPr/>
+              <p:nvPr/>
+            </p:nvSpPr>
+            <p:spPr>
+              <a:xfrm>
+                <a:off x="4067944" y="1170620"/>
+                <a:ext cx="216024" cy="216024"/>
+              </a:xfrm>
+              <a:prstGeom prst="ellipse">
+                <a:avLst/>
+              </a:prstGeom>
+              <a:ln w="15875"/>
+            </p:spPr>
+            <p:style>
+              <a:lnRef idx="2">
+                <a:schemeClr val="dk1"/>
+              </a:lnRef>
+              <a:fillRef idx="1">
+                <a:schemeClr val="lt1"/>
+              </a:fillRef>
+              <a:effectRef idx="0">
+                <a:schemeClr val="dk1"/>
+              </a:effectRef>
+              <a:fontRef idx="minor">
+                <a:schemeClr val="dk1"/>
+              </a:fontRef>
+            </p:style>
+            <p:txBody>
+              <a:bodyPr rtlCol="0" anchor="ctr"/>
+              <a:lstStyle/>
+              <a:p>
+                <a:pPr algn="ctr"/>
+                <a:endParaRPr lang="fr-BE" noProof="1"/>
+              </a:p>
+            </p:txBody>
+          </p:sp>
+          <p:sp>
+            <p:nvSpPr>
+              <p:cNvPr id="62" name="Ellipse 61"/>
+              <p:cNvSpPr/>
+              <p:nvPr/>
+            </p:nvSpPr>
+            <p:spPr>
+              <a:xfrm>
+                <a:off x="5148064" y="1510915"/>
+                <a:ext cx="216024" cy="216024"/>
+              </a:xfrm>
+              <a:prstGeom prst="ellipse">
+                <a:avLst/>
+              </a:prstGeom>
+              <a:ln w="15875"/>
+            </p:spPr>
+            <p:style>
+              <a:lnRef idx="2">
+                <a:schemeClr val="dk1"/>
+              </a:lnRef>
+              <a:fillRef idx="1">
+                <a:schemeClr val="lt1"/>
+              </a:fillRef>
+              <a:effectRef idx="0">
+                <a:schemeClr val="dk1"/>
+              </a:effectRef>
+              <a:fontRef idx="minor">
+                <a:schemeClr val="dk1"/>
+              </a:fontRef>
+            </p:style>
+            <p:txBody>
+              <a:bodyPr rtlCol="0" anchor="ctr"/>
+              <a:lstStyle/>
+              <a:p>
+                <a:pPr algn="ctr"/>
+                <a:endParaRPr lang="fr-BE" noProof="1"/>
+              </a:p>
+            </p:txBody>
+          </p:sp>
+          <p:cxnSp>
+            <p:nvCxnSpPr>
+              <p:cNvPr id="66" name="Connecteur droit avec flèche 65"/>
+              <p:cNvCxnSpPr>
+                <a:stCxn id="56" idx="6"/>
+                <a:endCxn id="59" idx="2"/>
+              </p:cNvCxnSpPr>
+              <p:nvPr/>
+            </p:nvCxnSpPr>
+            <p:spPr>
+              <a:xfrm>
+                <a:off x="1973997" y="1278632"/>
+                <a:ext cx="813043" cy="1588"/>
+              </a:xfrm>
+              <a:prstGeom prst="straightConnector1">
+                <a:avLst/>
+              </a:prstGeom>
+              <a:ln w="12700">
+                <a:solidFill>
+                  <a:schemeClr val="tx1"/>
+                </a:solidFill>
+                <a:tailEnd type="triangle" w="med" len="sm"/>
+              </a:ln>
+            </p:spPr>
+            <p:style>
+              <a:lnRef idx="1">
+                <a:schemeClr val="accent1"/>
+              </a:lnRef>
+              <a:fillRef idx="0">
+                <a:schemeClr val="accent1"/>
+              </a:fillRef>
+              <a:effectRef idx="0">
+                <a:schemeClr val="accent1"/>
+              </a:effectRef>
+              <a:fontRef idx="minor">
+                <a:schemeClr val="tx1"/>
+              </a:fontRef>
+            </p:style>
+          </p:cxnSp>
+          <p:cxnSp>
+            <p:nvCxnSpPr>
+              <p:cNvPr id="75" name="Connecteur droit avec flèche 74"/>
+              <p:cNvCxnSpPr>
+                <a:stCxn id="59" idx="6"/>
+                <a:endCxn id="61" idx="2"/>
+              </p:cNvCxnSpPr>
+              <p:nvPr/>
+            </p:nvCxnSpPr>
+            <p:spPr>
+              <a:xfrm>
+                <a:off x="3003064" y="1278632"/>
+                <a:ext cx="1064880" cy="1588"/>
+              </a:xfrm>
+              <a:prstGeom prst="straightConnector1">
+                <a:avLst/>
+              </a:prstGeom>
+              <a:ln w="12700">
+                <a:solidFill>
+                  <a:schemeClr val="tx1"/>
+                </a:solidFill>
+                <a:tailEnd type="triangle" w="med" len="sm"/>
+              </a:ln>
+            </p:spPr>
+            <p:style>
+              <a:lnRef idx="1">
+                <a:schemeClr val="accent1"/>
+              </a:lnRef>
+              <a:fillRef idx="0">
+                <a:schemeClr val="accent1"/>
+              </a:fillRef>
+              <a:effectRef idx="0">
+                <a:schemeClr val="accent1"/>
+              </a:effectRef>
+              <a:fontRef idx="minor">
+                <a:schemeClr val="tx1"/>
+              </a:fontRef>
+            </p:style>
+          </p:cxnSp>
+          <p:cxnSp>
+            <p:nvCxnSpPr>
+              <p:cNvPr id="81" name="Connecteur droit avec flèche 80"/>
+              <p:cNvCxnSpPr>
+                <a:stCxn id="61" idx="6"/>
+                <a:endCxn id="107" idx="2"/>
+              </p:cNvCxnSpPr>
+              <p:nvPr/>
+            </p:nvCxnSpPr>
+            <p:spPr>
+              <a:xfrm>
+                <a:off x="4283968" y="1278632"/>
+                <a:ext cx="1080120" cy="1588"/>
+              </a:xfrm>
+              <a:prstGeom prst="straightConnector1">
+                <a:avLst/>
+              </a:prstGeom>
+              <a:ln w="12700">
+                <a:solidFill>
+                  <a:schemeClr val="tx1"/>
+                </a:solidFill>
+                <a:tailEnd type="triangle" w="med" len="sm"/>
+              </a:ln>
+            </p:spPr>
+            <p:style>
+              <a:lnRef idx="1">
+                <a:schemeClr val="accent1"/>
+              </a:lnRef>
+              <a:fillRef idx="0">
+                <a:schemeClr val="accent1"/>
+              </a:fillRef>
+              <a:effectRef idx="0">
+                <a:schemeClr val="accent1"/>
+              </a:effectRef>
+              <a:fontRef idx="minor">
+                <a:schemeClr val="tx1"/>
+              </a:fontRef>
+            </p:style>
+          </p:cxnSp>
+          <p:sp>
+            <p:nvSpPr>
+              <p:cNvPr id="85" name="ZoneTexte 84"/>
+              <p:cNvSpPr txBox="1"/>
+              <p:nvPr/>
+            </p:nvSpPr>
+            <p:spPr>
+              <a:xfrm>
+                <a:off x="3068441" y="1190258"/>
+                <a:ext cx="855487" cy="153888"/>
+              </a:xfrm>
+              <a:prstGeom prst="rect">
+                <a:avLst/>
+              </a:prstGeom>
+              <a:solidFill>
+                <a:schemeClr val="bg1"/>
+              </a:solidFill>
+            </p:spPr>
+            <p:txBody>
+              <a:bodyPr wrap="none" lIns="18000" tIns="0" rIns="18000" bIns="0" rtlCol="0">
+                <a:spAutoFit/>
+              </a:bodyPr>
+              <a:lstStyle/>
+              <a:p>
+                <a:r>
+                  <a:rPr lang="fr-BE" sz="1000" noProof="1" smtClean="0"/>
+                  <a:t>set_date_range</a:t>
+                </a:r>
+                <a:endParaRPr lang="fr-BE" sz="1000" noProof="1"/>
+              </a:p>
+            </p:txBody>
+          </p:sp>
+          <p:sp>
+            <p:nvSpPr>
+              <p:cNvPr id="86" name="ZoneTexte 85"/>
+              <p:cNvSpPr txBox="1"/>
+              <p:nvPr/>
+            </p:nvSpPr>
+            <p:spPr>
+              <a:xfrm>
+                <a:off x="2059340" y="1124744"/>
+                <a:ext cx="601127" cy="307777"/>
+              </a:xfrm>
+              <a:prstGeom prst="rect">
+                <a:avLst/>
+              </a:prstGeom>
+              <a:solidFill>
+                <a:schemeClr val="bg1"/>
+              </a:solidFill>
+            </p:spPr>
+            <p:txBody>
+              <a:bodyPr wrap="none" lIns="0" tIns="0" rIns="0" bIns="0" rtlCol="0">
+                <a:spAutoFit/>
+              </a:bodyPr>
+              <a:lstStyle/>
+              <a:p>
+                <a:r>
+                  <a:rPr lang="fr-BE" sz="1000" noProof="1" smtClean="0"/>
+                  <a:t>Initiate</a:t>
+                </a:r>
+                <a:r>
+                  <a:rPr lang="fr-BE" sz="1000" noProof="1" smtClean="0"/>
+                  <a:t/>
+                </a:r>
+                <a:br>
+                  <a:rPr lang="fr-BE" sz="1000" noProof="1" smtClean="0"/>
+                </a:br>
+                <a:r>
+                  <a:rPr lang="fr-BE" sz="1000" noProof="1" smtClean="0"/>
+                  <a:t>Meeting</a:t>
+                </a:r>
+                <a:r>
+                  <a:rPr lang="fr-BE" sz="1000" baseline="-25000" noProof="1" smtClean="0"/>
+                  <a:t>start</a:t>
+                </a:r>
+                <a:endParaRPr lang="fr-BE" sz="1000" baseline="-25000" noProof="1"/>
+              </a:p>
+            </p:txBody>
+          </p:sp>
+          <p:sp>
+            <p:nvSpPr>
+              <p:cNvPr id="107" name="Ellipse 106"/>
+              <p:cNvSpPr/>
+              <p:nvPr/>
+            </p:nvSpPr>
+            <p:spPr>
+              <a:xfrm>
+                <a:off x="5364088" y="1170620"/>
+                <a:ext cx="216024" cy="216024"/>
+              </a:xfrm>
+              <a:prstGeom prst="ellipse">
+                <a:avLst/>
+              </a:prstGeom>
+              <a:ln w="15875"/>
+            </p:spPr>
+            <p:style>
+              <a:lnRef idx="2">
+                <a:schemeClr val="dk1"/>
+              </a:lnRef>
+              <a:fillRef idx="1">
+                <a:schemeClr val="lt1"/>
+              </a:fillRef>
+              <a:effectRef idx="0">
+                <a:schemeClr val="dk1"/>
+              </a:effectRef>
+              <a:fontRef idx="minor">
+                <a:schemeClr val="dk1"/>
+              </a:fontRef>
+            </p:style>
+            <p:txBody>
+              <a:bodyPr rtlCol="0" anchor="ctr"/>
+              <a:lstStyle/>
+              <a:p>
+                <a:pPr algn="ctr"/>
+                <a:endParaRPr lang="fr-BE" noProof="1"/>
+              </a:p>
+            </p:txBody>
+          </p:sp>
+          <p:sp>
+            <p:nvSpPr>
+              <p:cNvPr id="111" name="Ellipse 110"/>
+              <p:cNvSpPr/>
+              <p:nvPr/>
+            </p:nvSpPr>
+            <p:spPr>
+              <a:xfrm>
+                <a:off x="6228184" y="1170620"/>
+                <a:ext cx="216024" cy="216024"/>
+              </a:xfrm>
+              <a:prstGeom prst="ellipse">
+                <a:avLst/>
+              </a:prstGeom>
+              <a:ln w="15875"/>
+            </p:spPr>
+            <p:style>
+              <a:lnRef idx="2">
+                <a:schemeClr val="dk1"/>
+              </a:lnRef>
+              <a:fillRef idx="1">
+                <a:schemeClr val="lt1"/>
+              </a:fillRef>
+              <a:effectRef idx="0">
+                <a:schemeClr val="dk1"/>
+              </a:effectRef>
+              <a:fontRef idx="minor">
+                <a:schemeClr val="dk1"/>
+              </a:fontRef>
+            </p:style>
+            <p:txBody>
+              <a:bodyPr rtlCol="0" anchor="ctr"/>
+              <a:lstStyle/>
+              <a:p>
+                <a:pPr algn="ctr"/>
+                <a:endParaRPr lang="fr-BE" noProof="1"/>
+              </a:p>
+            </p:txBody>
+          </p:sp>
+          <p:sp>
+            <p:nvSpPr>
+              <p:cNvPr id="112" name="ZoneTexte 111"/>
+              <p:cNvSpPr txBox="1"/>
+              <p:nvPr/>
+            </p:nvSpPr>
+            <p:spPr>
+              <a:xfrm>
+                <a:off x="4355976" y="1190258"/>
+                <a:ext cx="874723" cy="153888"/>
+              </a:xfrm>
+              <a:prstGeom prst="rect">
+                <a:avLst/>
+              </a:prstGeom>
+              <a:solidFill>
+                <a:schemeClr val="bg1"/>
+              </a:solidFill>
+            </p:spPr>
+            <p:txBody>
+              <a:bodyPr wrap="none" lIns="18000" tIns="0" rIns="18000" bIns="0" rtlCol="0">
+                <a:spAutoFit/>
+              </a:bodyPr>
+              <a:lstStyle/>
+              <a:p>
+                <a:r>
+                  <a:rPr lang="fr-BE" sz="1000" noProof="1" smtClean="0"/>
+                  <a:t>set_participants</a:t>
+                </a:r>
+                <a:endParaRPr lang="fr-BE" sz="1000" noProof="1"/>
+              </a:p>
+            </p:txBody>
+          </p:sp>
+          <p:cxnSp>
+            <p:nvCxnSpPr>
+              <p:cNvPr id="174" name="Connecteur droit avec flèche 173"/>
+              <p:cNvCxnSpPr>
+                <a:stCxn id="107" idx="6"/>
+                <a:endCxn id="111" idx="2"/>
+              </p:cNvCxnSpPr>
+              <p:nvPr/>
+            </p:nvCxnSpPr>
+            <p:spPr>
+              <a:xfrm>
+                <a:off x="5580112" y="1278632"/>
+                <a:ext cx="648072" cy="1588"/>
+              </a:xfrm>
+              <a:prstGeom prst="straightConnector1">
+                <a:avLst/>
+              </a:prstGeom>
+              <a:ln w="12700">
+                <a:solidFill>
+                  <a:schemeClr val="tx1"/>
+                </a:solidFill>
+                <a:tailEnd type="triangle" w="med" len="sm"/>
+              </a:ln>
+            </p:spPr>
+            <p:style>
+              <a:lnRef idx="1">
+                <a:schemeClr val="accent1"/>
+              </a:lnRef>
+              <a:fillRef idx="0">
+                <a:schemeClr val="accent1"/>
+              </a:fillRef>
+              <a:effectRef idx="0">
+                <a:schemeClr val="accent1"/>
+              </a:effectRef>
+              <a:fontRef idx="minor">
+                <a:schemeClr val="tx1"/>
+              </a:fontRef>
+            </p:style>
+          </p:cxnSp>
+          <p:sp>
+            <p:nvSpPr>
+              <p:cNvPr id="177" name="ZoneTexte 176"/>
+              <p:cNvSpPr txBox="1"/>
+              <p:nvPr/>
+            </p:nvSpPr>
+            <p:spPr>
+              <a:xfrm>
+                <a:off x="5652120" y="1190258"/>
+                <a:ext cx="440308" cy="153888"/>
+              </a:xfrm>
+              <a:prstGeom prst="rect">
+                <a:avLst/>
+              </a:prstGeom>
+              <a:solidFill>
+                <a:schemeClr val="bg1"/>
+              </a:solidFill>
+            </p:spPr>
+            <p:txBody>
+              <a:bodyPr wrap="none" lIns="18000" tIns="0" rIns="18000" bIns="0" rtlCol="0">
+                <a:spAutoFit/>
+              </a:bodyPr>
+              <a:lstStyle/>
+              <a:p>
+                <a:r>
+                  <a:rPr lang="fr-BE" sz="1000" noProof="1" smtClean="0"/>
+                  <a:t>confirm</a:t>
+                </a:r>
+                <a:endParaRPr lang="fr-BE" sz="1000" noProof="1"/>
+              </a:p>
+            </p:txBody>
+          </p:sp>
+          <p:cxnSp>
+            <p:nvCxnSpPr>
+              <p:cNvPr id="179" name="Connecteur droit avec flèche 178"/>
+              <p:cNvCxnSpPr>
+                <a:stCxn id="111" idx="4"/>
+                <a:endCxn id="62" idx="6"/>
+              </p:cNvCxnSpPr>
+              <p:nvPr/>
+            </p:nvCxnSpPr>
+            <p:spPr>
+              <a:xfrm rot="5400000">
+                <a:off x="5734001" y="1016731"/>
+                <a:ext cx="232283" cy="972108"/>
+              </a:xfrm>
+              <a:prstGeom prst="bentConnector2">
+                <a:avLst/>
+              </a:prstGeom>
+              <a:ln w="12700">
+                <a:solidFill>
+                  <a:schemeClr val="tx1"/>
+                </a:solidFill>
+                <a:tailEnd type="triangle" w="med" len="sm"/>
+              </a:ln>
+            </p:spPr>
+            <p:style>
+              <a:lnRef idx="1">
+                <a:schemeClr val="accent1"/>
+              </a:lnRef>
+              <a:fillRef idx="0">
+                <a:schemeClr val="accent1"/>
+              </a:fillRef>
+              <a:effectRef idx="0">
+                <a:schemeClr val="accent1"/>
+              </a:effectRef>
+              <a:fontRef idx="minor">
+                <a:schemeClr val="tx1"/>
+              </a:fontRef>
+            </p:style>
+          </p:cxnSp>
+          <p:sp>
+            <p:nvSpPr>
+              <p:cNvPr id="183" name="Ellipse 182"/>
+              <p:cNvSpPr/>
+              <p:nvPr/>
+            </p:nvSpPr>
+            <p:spPr>
+              <a:xfrm>
+                <a:off x="2699792" y="1510915"/>
+                <a:ext cx="216024" cy="216024"/>
+              </a:xfrm>
+              <a:prstGeom prst="ellipse">
+                <a:avLst/>
+              </a:prstGeom>
+              <a:ln w="15875"/>
+            </p:spPr>
+            <p:style>
+              <a:lnRef idx="2">
+                <a:schemeClr val="dk1"/>
+              </a:lnRef>
+              <a:fillRef idx="1">
+                <a:schemeClr val="lt1"/>
+              </a:fillRef>
+              <a:effectRef idx="0">
+                <a:schemeClr val="dk1"/>
+              </a:effectRef>
+              <a:fontRef idx="minor">
+                <a:schemeClr val="dk1"/>
+              </a:fontRef>
+            </p:style>
+            <p:txBody>
+              <a:bodyPr rtlCol="0" anchor="ctr"/>
+              <a:lstStyle/>
+              <a:p>
+                <a:pPr algn="ctr"/>
+                <a:endParaRPr lang="fr-BE" noProof="1"/>
+              </a:p>
+            </p:txBody>
+          </p:sp>
+          <p:cxnSp>
+            <p:nvCxnSpPr>
+              <p:cNvPr id="184" name="Connecteur droit avec flèche 183"/>
+              <p:cNvCxnSpPr>
+                <a:stCxn id="191" idx="2"/>
+                <a:endCxn id="183" idx="6"/>
+              </p:cNvCxnSpPr>
+              <p:nvPr/>
+            </p:nvCxnSpPr>
+            <p:spPr>
+              <a:xfrm rot="10800000">
+                <a:off x="2915816" y="1618927"/>
+                <a:ext cx="792088" cy="1588"/>
+              </a:xfrm>
+              <a:prstGeom prst="straightConnector1">
+                <a:avLst/>
+              </a:prstGeom>
+              <a:ln w="12700">
+                <a:solidFill>
+                  <a:schemeClr val="tx1"/>
+                </a:solidFill>
+                <a:tailEnd type="triangle" w="med" len="sm"/>
+              </a:ln>
+            </p:spPr>
+            <p:style>
+              <a:lnRef idx="1">
+                <a:schemeClr val="accent1"/>
+              </a:lnRef>
+              <a:fillRef idx="0">
+                <a:schemeClr val="accent1"/>
+              </a:fillRef>
+              <a:effectRef idx="0">
+                <a:schemeClr val="accent1"/>
+              </a:effectRef>
+              <a:fontRef idx="minor">
+                <a:schemeClr val="tx1"/>
+              </a:fontRef>
+            </p:style>
+          </p:cxnSp>
+          <p:sp>
+            <p:nvSpPr>
+              <p:cNvPr id="187" name="ZoneTexte 186"/>
+              <p:cNvSpPr txBox="1"/>
+              <p:nvPr/>
+            </p:nvSpPr>
+            <p:spPr>
+              <a:xfrm>
+                <a:off x="3064024" y="1449799"/>
+                <a:ext cx="570669" cy="307777"/>
+              </a:xfrm>
+              <a:prstGeom prst="rect">
+                <a:avLst/>
+              </a:prstGeom>
+              <a:solidFill>
+                <a:schemeClr val="bg1"/>
+              </a:solidFill>
+            </p:spPr>
+            <p:txBody>
+              <a:bodyPr wrap="none" lIns="0" tIns="0" rIns="0" bIns="0" rtlCol="0">
+                <a:spAutoFit/>
+              </a:bodyPr>
+              <a:lstStyle/>
+              <a:p>
+                <a:r>
+                  <a:rPr lang="fr-BE" sz="1000" noProof="1" smtClean="0"/>
+                  <a:t>Initiate</a:t>
+                </a:r>
+                <a:r>
+                  <a:rPr lang="fr-BE" sz="1000" noProof="1" smtClean="0"/>
+                  <a:t/>
+                </a:r>
+                <a:br>
+                  <a:rPr lang="fr-BE" sz="1000" noProof="1" smtClean="0"/>
+                </a:br>
+                <a:r>
+                  <a:rPr lang="fr-BE" sz="1000" noProof="1" smtClean="0"/>
+                  <a:t>Meeting</a:t>
+                </a:r>
+                <a:r>
+                  <a:rPr lang="fr-BE" sz="1000" baseline="-25000" noProof="1" smtClean="0"/>
+                  <a:t>end</a:t>
+                </a:r>
+                <a:endParaRPr lang="fr-BE" sz="1000" baseline="-25000" noProof="1"/>
+              </a:p>
+            </p:txBody>
+          </p:sp>
+          <p:sp>
+            <p:nvSpPr>
+              <p:cNvPr id="191" name="Ellipse 190"/>
+              <p:cNvSpPr/>
+              <p:nvPr/>
+            </p:nvSpPr>
+            <p:spPr>
+              <a:xfrm>
+                <a:off x="3707904" y="1510915"/>
+                <a:ext cx="216024" cy="216024"/>
+              </a:xfrm>
+              <a:prstGeom prst="ellipse">
+                <a:avLst/>
+              </a:prstGeom>
+              <a:ln w="15875"/>
+            </p:spPr>
+            <p:style>
+              <a:lnRef idx="2">
+                <a:schemeClr val="dk1"/>
+              </a:lnRef>
+              <a:fillRef idx="1">
+                <a:schemeClr val="lt1"/>
+              </a:fillRef>
+              <a:effectRef idx="0">
+                <a:schemeClr val="dk1"/>
+              </a:effectRef>
+              <a:fontRef idx="minor">
+                <a:schemeClr val="dk1"/>
+              </a:fontRef>
+            </p:style>
+            <p:txBody>
+              <a:bodyPr rtlCol="0" anchor="ctr"/>
+              <a:lstStyle/>
+              <a:p>
+                <a:pPr algn="ctr"/>
+                <a:endParaRPr lang="fr-BE" noProof="1"/>
+              </a:p>
+            </p:txBody>
+          </p:sp>
+          <p:cxnSp>
+            <p:nvCxnSpPr>
+              <p:cNvPr id="194" name="Connecteur droit avec flèche 193"/>
+              <p:cNvCxnSpPr>
+                <a:stCxn id="62" idx="2"/>
+                <a:endCxn id="191" idx="6"/>
+              </p:cNvCxnSpPr>
+              <p:nvPr/>
+            </p:nvCxnSpPr>
+            <p:spPr>
+              <a:xfrm rot="10800000">
+                <a:off x="3923928" y="1618927"/>
+                <a:ext cx="1224136" cy="1588"/>
+              </a:xfrm>
+              <a:prstGeom prst="straightConnector1">
+                <a:avLst/>
+              </a:prstGeom>
+              <a:ln w="12700">
+                <a:solidFill>
+                  <a:schemeClr val="tx1"/>
+                </a:solidFill>
+                <a:tailEnd type="triangle" w="med" len="sm"/>
+              </a:ln>
+            </p:spPr>
+            <p:style>
+              <a:lnRef idx="1">
+                <a:schemeClr val="accent1"/>
+              </a:lnRef>
+              <a:fillRef idx="0">
+                <a:schemeClr val="accent1"/>
+              </a:fillRef>
+              <a:effectRef idx="0">
+                <a:schemeClr val="accent1"/>
+              </a:effectRef>
+              <a:fontRef idx="minor">
+                <a:schemeClr val="tx1"/>
+              </a:fontRef>
+            </p:style>
+          </p:cxnSp>
+          <p:sp>
+            <p:nvSpPr>
+              <p:cNvPr id="190" name="ZoneTexte 189"/>
+              <p:cNvSpPr txBox="1"/>
+              <p:nvPr/>
+            </p:nvSpPr>
+            <p:spPr>
+              <a:xfrm>
+                <a:off x="4092515" y="1539443"/>
+                <a:ext cx="964491" cy="153888"/>
+              </a:xfrm>
+              <a:prstGeom prst="rect">
+                <a:avLst/>
+              </a:prstGeom>
+              <a:solidFill>
+                <a:schemeClr val="bg1"/>
+              </a:solidFill>
+            </p:spPr>
+            <p:txBody>
+              <a:bodyPr wrap="none" lIns="18000" tIns="0" rIns="18000" bIns="0" rtlCol="0">
+                <a:spAutoFit/>
+              </a:bodyPr>
+              <a:lstStyle/>
+              <a:p>
+                <a:r>
+                  <a:rPr lang="fr-BE" sz="1000" noProof="1" smtClean="0"/>
+                  <a:t>meeting_initiated</a:t>
+                </a:r>
+                <a:endParaRPr lang="fr-BE" sz="1000" noProof="1"/>
+              </a:p>
+            </p:txBody>
+          </p:sp>
+          <p:sp>
+            <p:nvSpPr>
+              <p:cNvPr id="204" name="ZoneTexte 203"/>
+              <p:cNvSpPr txBox="1"/>
+              <p:nvPr/>
+            </p:nvSpPr>
+            <p:spPr>
+              <a:xfrm>
+                <a:off x="5508104" y="1526743"/>
+                <a:ext cx="901973" cy="153888"/>
+              </a:xfrm>
+              <a:prstGeom prst="rect">
+                <a:avLst/>
+              </a:prstGeom>
+              <a:solidFill>
+                <a:schemeClr val="bg1"/>
+              </a:solidFill>
+            </p:spPr>
+            <p:txBody>
+              <a:bodyPr wrap="none" lIns="18000" tIns="0" rIns="18000" bIns="0" rtlCol="0">
+                <a:spAutoFit/>
+              </a:bodyPr>
+              <a:lstStyle/>
+              <a:p>
+                <a:r>
+                  <a:rPr lang="fr-BE" sz="1000" noProof="1" smtClean="0"/>
+                  <a:t>send_invitations</a:t>
+                </a:r>
+                <a:endParaRPr lang="fr-BE" sz="1000" noProof="1"/>
               </a:p>
             </p:txBody>
           </p:sp>
         </p:grpSp>
         <p:cxnSp>
           <p:nvCxnSpPr>
+            <p:cNvPr id="178" name="Connecteur en arc 177"/>
+            <p:cNvCxnSpPr>
+              <a:stCxn id="173" idx="6"/>
+              <a:endCxn id="56" idx="2"/>
+            </p:cNvCxnSpPr>
+            <p:nvPr/>
+          </p:nvCxnSpPr>
+          <p:spPr>
+            <a:xfrm>
+              <a:off x="1403648" y="1016732"/>
+              <a:ext cx="642357" cy="261900"/>
+            </a:xfrm>
+            <a:prstGeom prst="curvedConnector3">
+              <a:avLst>
+                <a:gd name="adj1" fmla="val 50000"/>
+              </a:avLst>
+            </a:prstGeom>
+            <a:ln w="15875">
+              <a:solidFill>
+                <a:schemeClr val="tx1"/>
+              </a:solidFill>
+              <a:tailEnd type="triangle" w="med" len="lg"/>
+            </a:ln>
+          </p:spPr>
+          <p:style>
+            <a:lnRef idx="1">
+              <a:schemeClr val="accent1"/>
+            </a:lnRef>
+            <a:fillRef idx="0">
+              <a:schemeClr val="accent1"/>
+            </a:fillRef>
+            <a:effectRef idx="0">
+              <a:schemeClr val="accent1"/>
+            </a:effectRef>
+            <a:fontRef idx="minor">
+              <a:schemeClr val="tx1"/>
+            </a:fontRef>
+          </p:style>
+        </p:cxnSp>
+        <p:sp>
+          <p:nvSpPr>
+            <p:cNvPr id="241" name="ZoneTexte 240"/>
+            <p:cNvSpPr txBox="1"/>
+            <p:nvPr/>
+          </p:nvSpPr>
+          <p:spPr>
+            <a:xfrm>
+              <a:off x="1513756" y="844332"/>
+              <a:ext cx="173693" cy="349702"/>
+            </a:xfrm>
+            <a:prstGeom prst="rect">
+              <a:avLst/>
+            </a:prstGeom>
+            <a:solidFill>
+              <a:schemeClr val="bg1"/>
+            </a:solidFill>
+          </p:spPr>
+          <p:txBody>
+            <a:bodyPr wrap="none" lIns="36000" tIns="36000" rIns="36000" bIns="36000" rtlCol="0" anchor="t" anchorCtr="0">
+              <a:spAutoFit/>
+            </a:bodyPr>
+            <a:lstStyle/>
+            <a:p>
+              <a:r>
+                <a:rPr lang="fr-BE" noProof="1" smtClean="0">
+                  <a:sym typeface="Symbol"/>
+                </a:rPr>
+                <a:t></a:t>
+              </a:r>
+              <a:endParaRPr lang="fr-BE" noProof="1"/>
+            </a:p>
+          </p:txBody>
+        </p:sp>
+        <p:cxnSp>
+          <p:nvCxnSpPr>
             <p:cNvPr id="182" name="Connecteur en arc 181"/>
-            <p:cNvCxnSpPr/>
+            <p:cNvCxnSpPr>
+              <a:stCxn id="183" idx="4"/>
+              <a:endCxn id="119" idx="0"/>
+            </p:cNvCxnSpPr>
             <p:nvPr/>
           </p:nvCxnSpPr>
           <p:spPr>
-            <a:xfrm rot="5400000">
-              <a:off x="4835935" y="1139577"/>
-              <a:ext cx="806375" cy="1773530"/>
+            <a:xfrm rot="16200000" flipH="1">
+              <a:off x="3372801" y="1449973"/>
+              <a:ext cx="702591" cy="1256521"/>
             </a:xfrm>
             <a:prstGeom prst="curvedConnector3">
               <a:avLst>
@@ -22462,7 +22984,7 @@
           </p:nvSpPr>
           <p:spPr>
             <a:xfrm>
-              <a:off x="5796136" y="1700808"/>
+              <a:off x="3779912" y="1927170"/>
               <a:ext cx="173693" cy="349702"/>
             </a:xfrm>
             <a:prstGeom prst="rect">
@@ -22479,12 +23001,12 @@
             <a:lstStyle/>
             <a:p>
               <a:r>
-                <a:rPr lang="fr-BE" dirty="0" smtClean="0">
+                <a:rPr lang="fr-BE" noProof="1" smtClean="0">
                   <a:sym typeface="Symbol"/>
                 </a:rPr>
                 <a:t></a:t>
               </a:r>
-              <a:endParaRPr lang="fr-BE" dirty="0"/>
+              <a:endParaRPr lang="fr-BE" noProof="1"/>
             </a:p>
           </p:txBody>
         </p:sp>

</xml_diff>

<commit_message>
Started an image for chap 3's outline
</commit_message>
<xml_diff>
--- a/writing/images/train.pptx
+++ b/writing/images/train.pptx
@@ -5,7 +5,7 @@
     <p:sldMasterId id="2147483648" r:id="rId1"/>
   </p:sldMasterIdLst>
   <p:notesMasterIdLst>
-    <p:notesMasterId r:id="rId12"/>
+    <p:notesMasterId r:id="rId13"/>
   </p:notesMasterIdLst>
   <p:sldIdLst>
     <p:sldId id="256" r:id="rId2"/>
@@ -18,6 +18,7 @@
     <p:sldId id="265" r:id="rId9"/>
     <p:sldId id="267" r:id="rId10"/>
     <p:sldId id="266" r:id="rId11"/>
+    <p:sldId id="268" r:id="rId12"/>
   </p:sldIdLst>
   <p:sldSz cx="9144000" cy="6858000" type="screen4x3"/>
   <p:notesSz cx="6858000" cy="9144000"/>
@@ -202,7 +203,7 @@
             <a:fld id="{1A5CA47D-05BA-47C5-ACE1-040A60204EDF}" type="datetimeFigureOut">
               <a:rPr lang="fr-FR" smtClean="0"/>
               <a:pPr/>
-              <a:t>06/07/2011</a:t>
+              <a:t>07/07/2011</a:t>
             </a:fld>
             <a:endParaRPr lang="fr-BE"/>
           </a:p>
@@ -732,7 +733,7 @@
             <a:fld id="{68BDF4EC-5B70-45D8-B718-E56EB4C6B13E}" type="datetimeFigureOut">
               <a:rPr lang="fr-BE" smtClean="0"/>
               <a:pPr/>
-              <a:t>6/07/2011</a:t>
+              <a:t>7/07/2011</a:t>
             </a:fld>
             <a:endParaRPr lang="fr-BE"/>
           </a:p>
@@ -899,7 +900,7 @@
             <a:fld id="{68BDF4EC-5B70-45D8-B718-E56EB4C6B13E}" type="datetimeFigureOut">
               <a:rPr lang="fr-BE" smtClean="0"/>
               <a:pPr/>
-              <a:t>6/07/2011</a:t>
+              <a:t>7/07/2011</a:t>
             </a:fld>
             <a:endParaRPr lang="fr-BE"/>
           </a:p>
@@ -1076,7 +1077,7 @@
             <a:fld id="{68BDF4EC-5B70-45D8-B718-E56EB4C6B13E}" type="datetimeFigureOut">
               <a:rPr lang="fr-BE" smtClean="0"/>
               <a:pPr/>
-              <a:t>6/07/2011</a:t>
+              <a:t>7/07/2011</a:t>
             </a:fld>
             <a:endParaRPr lang="fr-BE"/>
           </a:p>
@@ -1243,7 +1244,7 @@
             <a:fld id="{68BDF4EC-5B70-45D8-B718-E56EB4C6B13E}" type="datetimeFigureOut">
               <a:rPr lang="fr-BE" smtClean="0"/>
               <a:pPr/>
-              <a:t>6/07/2011</a:t>
+              <a:t>7/07/2011</a:t>
             </a:fld>
             <a:endParaRPr lang="fr-BE"/>
           </a:p>
@@ -1486,7 +1487,7 @@
             <a:fld id="{68BDF4EC-5B70-45D8-B718-E56EB4C6B13E}" type="datetimeFigureOut">
               <a:rPr lang="fr-BE" smtClean="0"/>
               <a:pPr/>
-              <a:t>6/07/2011</a:t>
+              <a:t>7/07/2011</a:t>
             </a:fld>
             <a:endParaRPr lang="fr-BE"/>
           </a:p>
@@ -1771,7 +1772,7 @@
             <a:fld id="{68BDF4EC-5B70-45D8-B718-E56EB4C6B13E}" type="datetimeFigureOut">
               <a:rPr lang="fr-BE" smtClean="0"/>
               <a:pPr/>
-              <a:t>6/07/2011</a:t>
+              <a:t>7/07/2011</a:t>
             </a:fld>
             <a:endParaRPr lang="fr-BE"/>
           </a:p>
@@ -2190,7 +2191,7 @@
             <a:fld id="{68BDF4EC-5B70-45D8-B718-E56EB4C6B13E}" type="datetimeFigureOut">
               <a:rPr lang="fr-BE" smtClean="0"/>
               <a:pPr/>
-              <a:t>6/07/2011</a:t>
+              <a:t>7/07/2011</a:t>
             </a:fld>
             <a:endParaRPr lang="fr-BE"/>
           </a:p>
@@ -2305,7 +2306,7 @@
             <a:fld id="{68BDF4EC-5B70-45D8-B718-E56EB4C6B13E}" type="datetimeFigureOut">
               <a:rPr lang="fr-BE" smtClean="0"/>
               <a:pPr/>
-              <a:t>6/07/2011</a:t>
+              <a:t>7/07/2011</a:t>
             </a:fld>
             <a:endParaRPr lang="fr-BE"/>
           </a:p>
@@ -2397,7 +2398,7 @@
             <a:fld id="{68BDF4EC-5B70-45D8-B718-E56EB4C6B13E}" type="datetimeFigureOut">
               <a:rPr lang="fr-BE" smtClean="0"/>
               <a:pPr/>
-              <a:t>6/07/2011</a:t>
+              <a:t>7/07/2011</a:t>
             </a:fld>
             <a:endParaRPr lang="fr-BE"/>
           </a:p>
@@ -2671,7 +2672,7 @@
             <a:fld id="{68BDF4EC-5B70-45D8-B718-E56EB4C6B13E}" type="datetimeFigureOut">
               <a:rPr lang="fr-BE" smtClean="0"/>
               <a:pPr/>
-              <a:t>6/07/2011</a:t>
+              <a:t>7/07/2011</a:t>
             </a:fld>
             <a:endParaRPr lang="fr-BE"/>
           </a:p>
@@ -2921,7 +2922,7 @@
             <a:fld id="{68BDF4EC-5B70-45D8-B718-E56EB4C6B13E}" type="datetimeFigureOut">
               <a:rPr lang="fr-BE" smtClean="0"/>
               <a:pPr/>
-              <a:t>6/07/2011</a:t>
+              <a:t>7/07/2011</a:t>
             </a:fld>
             <a:endParaRPr lang="fr-BE"/>
           </a:p>
@@ -3131,7 +3132,7 @@
             <a:fld id="{68BDF4EC-5B70-45D8-B718-E56EB4C6B13E}" type="datetimeFigureOut">
               <a:rPr lang="fr-BE" smtClean="0"/>
               <a:pPr/>
-              <a:t>6/07/2011</a:t>
+              <a:t>7/07/2011</a:t>
             </a:fld>
             <a:endParaRPr lang="fr-BE"/>
           </a:p>
@@ -5346,15 +5347,7 @@
             <a:p>
               <a:r>
                 <a:rPr lang="fr-BE" sz="1400" noProof="1" smtClean="0"/>
-                <a:t>[ </a:t>
-              </a:r>
-              <a:r>
-                <a:rPr lang="fr-BE" sz="1400" noProof="1" smtClean="0"/>
-                <a:t>Fl </a:t>
-              </a:r>
-              <a:r>
-                <a:rPr lang="fr-BE" sz="1400" noProof="1" smtClean="0"/>
-                <a:t>]</a:t>
+                <a:t>[ Fl ]</a:t>
               </a:r>
               <a:endParaRPr lang="fr-BE" sz="1400" noProof="1"/>
             </a:p>
@@ -5588,15 +5581,7 @@
             <a:p>
               <a:r>
                 <a:rPr lang="fr-BE" sz="1400" noProof="1" smtClean="0"/>
-                <a:t>[ </a:t>
-              </a:r>
-              <a:r>
-                <a:rPr lang="fr-BE" sz="1400" noProof="1" smtClean="0"/>
-                <a:t>Fl </a:t>
-              </a:r>
-              <a:r>
-                <a:rPr lang="fr-BE" sz="1400" noProof="1" smtClean="0"/>
-                <a:t>]</a:t>
+                <a:t>[ Fl ]</a:t>
               </a:r>
               <a:endParaRPr lang="fr-BE" sz="1400" noProof="1"/>
             </a:p>
@@ -5638,11 +5623,7 @@
               </a:r>
               <a:r>
                 <a:rPr lang="fr-BE" sz="1400" noProof="1" smtClean="0"/>
-                <a:t>Fl </a:t>
-              </a:r>
-              <a:r>
-                <a:rPr lang="fr-BE" sz="1400" noProof="1" smtClean="0"/>
-                <a:t>]</a:t>
+                <a:t>Fl ]</a:t>
               </a:r>
               <a:endParaRPr lang="fr-BE" sz="1400" noProof="1"/>
             </a:p>
@@ -6205,15 +6186,7 @@
             <a:p>
               <a:r>
                 <a:rPr lang="fr-BE" sz="1100" noProof="1" smtClean="0"/>
-                <a:t>[</a:t>
-              </a:r>
-              <a:r>
-                <a:rPr lang="fr-BE" sz="1100" noProof="1" smtClean="0"/>
-                <a:t>second_cycle</a:t>
-              </a:r>
-              <a:r>
-                <a:rPr lang="fr-BE" sz="1100" noProof="1" smtClean="0"/>
-                <a:t>]</a:t>
+                <a:t>[second_cycle]</a:t>
               </a:r>
               <a:endParaRPr lang="fr-BE" sz="1100" noProof="1"/>
             </a:p>
@@ -6255,11 +6228,7 @@
               </a:r>
               <a:r>
                 <a:rPr lang="fr-BE" sz="1100" noProof="1" smtClean="0"/>
-                <a:t>second_cycle</a:t>
-              </a:r>
-              <a:r>
-                <a:rPr lang="fr-BE" sz="1100" noProof="1" smtClean="0"/>
-                <a:t>]</a:t>
+                <a:t>second_cycle]</a:t>
               </a:r>
               <a:endParaRPr lang="fr-BE" sz="1100" noProof="1"/>
             </a:p>
@@ -6459,11 +6428,7 @@
               </a:r>
               <a:r>
                 <a:rPr lang="fr-BE" sz="1100" noProof="1" smtClean="0"/>
-                <a:t>second_cycle</a:t>
-              </a:r>
-              <a:r>
-                <a:rPr lang="fr-BE" sz="1100" noProof="1" smtClean="0"/>
-                <a:t>]</a:t>
+                <a:t>second_cycle]</a:t>
               </a:r>
               <a:endParaRPr lang="fr-BE" sz="1100" noProof="1"/>
             </a:p>
@@ -6495,15 +6460,7 @@
             <a:p>
               <a:r>
                 <a:rPr lang="fr-BE" sz="1100" noProof="1" smtClean="0"/>
-                <a:t>[</a:t>
-              </a:r>
-              <a:r>
-                <a:rPr lang="fr-BE" sz="1100" noProof="1" smtClean="0"/>
-                <a:t>second_cycle</a:t>
-              </a:r>
-              <a:r>
-                <a:rPr lang="fr-BE" sz="1100" noProof="1" smtClean="0"/>
-                <a:t>]</a:t>
+                <a:t>[second_cycle]</a:t>
               </a:r>
               <a:endParaRPr lang="fr-BE" sz="1100" noProof="1"/>
             </a:p>
@@ -6583,6 +6540,3027 @@
             </a:p>
           </p:txBody>
         </p:sp>
+      </p:grpSp>
+    </p:spTree>
+  </p:cSld>
+  <p:clrMapOvr>
+    <a:masterClrMapping/>
+  </p:clrMapOvr>
+</p:sld>
+</file>
+
+<file path=ppt/slides/slide11.xml><?xml version="1.0" encoding="utf-8"?>
+<p:sld xmlns:a="http://schemas.openxmlformats.org/drawingml/2006/main" xmlns:r="http://schemas.openxmlformats.org/officeDocument/2006/relationships" xmlns:p="http://schemas.openxmlformats.org/presentationml/2006/main">
+  <p:cSld>
+    <p:spTree>
+      <p:nvGrpSpPr>
+        <p:cNvPr id="1" name=""/>
+        <p:cNvGrpSpPr/>
+        <p:nvPr/>
+      </p:nvGrpSpPr>
+      <p:grpSpPr>
+        <a:xfrm>
+          <a:off x="0" y="0"/>
+          <a:ext cx="0" cy="0"/>
+          <a:chOff x="0" y="0"/>
+          <a:chExt cx="0" cy="0"/>
+        </a:xfrm>
+      </p:grpSpPr>
+      <p:grpSp>
+        <p:nvGrpSpPr>
+          <p:cNvPr id="158" name="Groupe 157"/>
+          <p:cNvGrpSpPr/>
+          <p:nvPr/>
+        </p:nvGrpSpPr>
+        <p:grpSpPr>
+          <a:xfrm>
+            <a:off x="2866033" y="476672"/>
+            <a:ext cx="3699966" cy="1728192"/>
+            <a:chOff x="2813855" y="476672"/>
+            <a:chExt cx="3699966" cy="1728192"/>
+          </a:xfrm>
+        </p:grpSpPr>
+        <p:sp>
+          <p:nvSpPr>
+            <p:cNvPr id="5" name="Rectangle à coins arrondis 4"/>
+            <p:cNvSpPr/>
+            <p:nvPr/>
+          </p:nvSpPr>
+          <p:spPr>
+            <a:xfrm>
+              <a:off x="4128239" y="762424"/>
+              <a:ext cx="1043640" cy="396000"/>
+            </a:xfrm>
+            <a:prstGeom prst="roundRect">
+              <a:avLst/>
+            </a:prstGeom>
+            <a:ln w="22225"/>
+          </p:spPr>
+          <p:style>
+            <a:lnRef idx="2">
+              <a:schemeClr val="dk1"/>
+            </a:lnRef>
+            <a:fillRef idx="1">
+              <a:schemeClr val="lt1"/>
+            </a:fillRef>
+            <a:effectRef idx="0">
+              <a:schemeClr val="dk1"/>
+            </a:effectRef>
+            <a:fontRef idx="minor">
+              <a:schemeClr val="dk1"/>
+            </a:fontRef>
+          </p:style>
+          <p:txBody>
+            <a:bodyPr wrap="none" rtlCol="0" anchor="ctr"/>
+            <a:lstStyle/>
+            <a:p>
+              <a:pPr algn="ctr"/>
+              <a:r>
+                <a:rPr lang="fr-BE" sz="1200" dirty="0" err="1" smtClean="0">
+                  <a:latin typeface="+mj-lt"/>
+                </a:rPr>
+                <a:t>Collect</a:t>
+              </a:r>
+              <a:r>
+                <a:rPr lang="fr-BE" sz="1200" dirty="0" smtClean="0">
+                  <a:latin typeface="+mj-lt"/>
+                </a:rPr>
+                <a:t> </a:t>
+              </a:r>
+              <a:endParaRPr lang="fr-BE" sz="1200" dirty="0">
+                <a:latin typeface="+mj-lt"/>
+              </a:endParaRPr>
+            </a:p>
+          </p:txBody>
+        </p:sp>
+        <p:sp>
+          <p:nvSpPr>
+            <p:cNvPr id="6" name="Rectangle à coins arrondis 5"/>
+            <p:cNvSpPr/>
+            <p:nvPr/>
+          </p:nvSpPr>
+          <p:spPr>
+            <a:xfrm>
+              <a:off x="2813855" y="1392801"/>
+              <a:ext cx="984448" cy="396000"/>
+            </a:xfrm>
+            <a:prstGeom prst="roundRect">
+              <a:avLst/>
+            </a:prstGeom>
+            <a:ln w="22225"/>
+          </p:spPr>
+          <p:style>
+            <a:lnRef idx="2">
+              <a:schemeClr val="dk1"/>
+            </a:lnRef>
+            <a:fillRef idx="1">
+              <a:schemeClr val="lt1"/>
+            </a:fillRef>
+            <a:effectRef idx="0">
+              <a:schemeClr val="dk1"/>
+            </a:effectRef>
+            <a:fontRef idx="minor">
+              <a:schemeClr val="dk1"/>
+            </a:fontRef>
+          </p:style>
+          <p:txBody>
+            <a:bodyPr wrap="none" rtlCol="0" anchor="ctr"/>
+            <a:lstStyle/>
+            <a:p>
+              <a:pPr algn="ctr"/>
+              <a:r>
+                <a:rPr lang="fr-BE" sz="1200" dirty="0" err="1" smtClean="0">
+                  <a:latin typeface="+mj-lt"/>
+                </a:rPr>
+                <a:t>Abritrate</a:t>
+              </a:r>
+              <a:endParaRPr lang="fr-BE" sz="1200" dirty="0">
+                <a:latin typeface="+mj-lt"/>
+              </a:endParaRPr>
+            </a:p>
+          </p:txBody>
+        </p:sp>
+        <p:sp>
+          <p:nvSpPr>
+            <p:cNvPr id="7" name="Rectangle à coins arrondis 6"/>
+            <p:cNvSpPr/>
+            <p:nvPr/>
+          </p:nvSpPr>
+          <p:spPr>
+            <a:xfrm>
+              <a:off x="5470181" y="1392801"/>
+              <a:ext cx="1043640" cy="396000"/>
+            </a:xfrm>
+            <a:prstGeom prst="roundRect">
+              <a:avLst/>
+            </a:prstGeom>
+            <a:ln w="22225"/>
+          </p:spPr>
+          <p:style>
+            <a:lnRef idx="2">
+              <a:schemeClr val="dk1"/>
+            </a:lnRef>
+            <a:fillRef idx="1">
+              <a:schemeClr val="lt1"/>
+            </a:fillRef>
+            <a:effectRef idx="0">
+              <a:schemeClr val="dk1"/>
+            </a:effectRef>
+            <a:fontRef idx="minor">
+              <a:schemeClr val="dk1"/>
+            </a:fontRef>
+          </p:style>
+          <p:txBody>
+            <a:bodyPr wrap="none" rtlCol="0" anchor="ctr"/>
+            <a:lstStyle/>
+            <a:p>
+              <a:pPr algn="ctr"/>
+              <a:r>
+                <a:rPr lang="fr-BE" sz="1200" dirty="0" smtClean="0">
+                  <a:latin typeface="+mj-lt"/>
+                </a:rPr>
+                <a:t>Schedule</a:t>
+              </a:r>
+            </a:p>
+          </p:txBody>
+        </p:sp>
+        <p:cxnSp>
+          <p:nvCxnSpPr>
+            <p:cNvPr id="8" name="Connecteur droit avec flèche 7"/>
+            <p:cNvCxnSpPr>
+              <a:stCxn id="5" idx="2"/>
+              <a:endCxn id="14" idx="0"/>
+            </p:cNvCxnSpPr>
+            <p:nvPr/>
+          </p:nvCxnSpPr>
+          <p:spPr>
+            <a:xfrm rot="5400000">
+              <a:off x="4558887" y="1249596"/>
+              <a:ext cx="182344" cy="1588"/>
+            </a:xfrm>
+            <a:prstGeom prst="straightConnector1">
+              <a:avLst/>
+            </a:prstGeom>
+            <a:ln w="22225">
+              <a:tailEnd type="arrow"/>
+            </a:ln>
+          </p:spPr>
+          <p:style>
+            <a:lnRef idx="2">
+              <a:schemeClr val="dk1"/>
+            </a:lnRef>
+            <a:fillRef idx="0">
+              <a:schemeClr val="dk1"/>
+            </a:fillRef>
+            <a:effectRef idx="1">
+              <a:schemeClr val="dk1"/>
+            </a:effectRef>
+            <a:fontRef idx="minor">
+              <a:schemeClr val="tx1"/>
+            </a:fontRef>
+          </p:style>
+        </p:cxnSp>
+        <p:cxnSp>
+          <p:nvCxnSpPr>
+            <p:cNvPr id="9" name="Connecteur droit avec flèche 8"/>
+            <p:cNvCxnSpPr>
+              <a:stCxn id="7" idx="2"/>
+            </p:cNvCxnSpPr>
+            <p:nvPr/>
+          </p:nvCxnSpPr>
+          <p:spPr>
+            <a:xfrm rot="5400000">
+              <a:off x="5873856" y="1906718"/>
+              <a:ext cx="236063" cy="228"/>
+            </a:xfrm>
+            <a:prstGeom prst="straightConnector1">
+              <a:avLst/>
+            </a:prstGeom>
+            <a:ln w="22225">
+              <a:tailEnd type="arrow"/>
+            </a:ln>
+          </p:spPr>
+          <p:style>
+            <a:lnRef idx="2">
+              <a:schemeClr val="dk1"/>
+            </a:lnRef>
+            <a:fillRef idx="0">
+              <a:schemeClr val="dk1"/>
+            </a:fillRef>
+            <a:effectRef idx="1">
+              <a:schemeClr val="dk1"/>
+            </a:effectRef>
+            <a:fontRef idx="minor">
+              <a:schemeClr val="tx1"/>
+            </a:fontRef>
+          </p:style>
+        </p:cxnSp>
+        <p:cxnSp>
+          <p:nvCxnSpPr>
+            <p:cNvPr id="10" name="Connecteur droit avec flèche 9"/>
+            <p:cNvCxnSpPr>
+              <a:stCxn id="14" idx="3"/>
+              <a:endCxn id="7" idx="1"/>
+            </p:cNvCxnSpPr>
+            <p:nvPr/>
+          </p:nvCxnSpPr>
+          <p:spPr>
+            <a:xfrm>
+              <a:off x="5029003" y="1590801"/>
+              <a:ext cx="441178" cy="1588"/>
+            </a:xfrm>
+            <a:prstGeom prst="straightConnector1">
+              <a:avLst/>
+            </a:prstGeom>
+            <a:ln w="22225">
+              <a:tailEnd type="arrow"/>
+            </a:ln>
+          </p:spPr>
+          <p:style>
+            <a:lnRef idx="2">
+              <a:schemeClr val="dk1"/>
+            </a:lnRef>
+            <a:fillRef idx="0">
+              <a:schemeClr val="dk1"/>
+            </a:fillRef>
+            <a:effectRef idx="1">
+              <a:schemeClr val="dk1"/>
+            </a:effectRef>
+            <a:fontRef idx="minor">
+              <a:schemeClr val="tx1"/>
+            </a:fontRef>
+          </p:style>
+        </p:cxnSp>
+        <p:cxnSp>
+          <p:nvCxnSpPr>
+            <p:cNvPr id="11" name="Connecteur en angle 281"/>
+            <p:cNvCxnSpPr>
+              <a:stCxn id="14" idx="1"/>
+              <a:endCxn id="6" idx="3"/>
+            </p:cNvCxnSpPr>
+            <p:nvPr/>
+          </p:nvCxnSpPr>
+          <p:spPr>
+            <a:xfrm rot="10800000">
+              <a:off x="3798303" y="1590801"/>
+              <a:ext cx="472812" cy="1588"/>
+            </a:xfrm>
+            <a:prstGeom prst="bentConnector3">
+              <a:avLst>
+                <a:gd name="adj1" fmla="val 50000"/>
+              </a:avLst>
+            </a:prstGeom>
+            <a:ln w="22225">
+              <a:tailEnd type="arrow"/>
+            </a:ln>
+          </p:spPr>
+          <p:style>
+            <a:lnRef idx="2">
+              <a:schemeClr val="dk1"/>
+            </a:lnRef>
+            <a:fillRef idx="0">
+              <a:schemeClr val="dk1"/>
+            </a:fillRef>
+            <a:effectRef idx="1">
+              <a:schemeClr val="dk1"/>
+            </a:effectRef>
+            <a:fontRef idx="minor">
+              <a:schemeClr val="tx1"/>
+            </a:fontRef>
+          </p:style>
+        </p:cxnSp>
+        <p:sp>
+          <p:nvSpPr>
+            <p:cNvPr id="12" name="Ellipse 11"/>
+            <p:cNvSpPr/>
+            <p:nvPr/>
+          </p:nvSpPr>
+          <p:spPr>
+            <a:xfrm>
+              <a:off x="4614059" y="476672"/>
+              <a:ext cx="72000" cy="72000"/>
+            </a:xfrm>
+            <a:prstGeom prst="ellipse">
+              <a:avLst/>
+            </a:prstGeom>
+            <a:ln w="22225"/>
+          </p:spPr>
+          <p:style>
+            <a:lnRef idx="2">
+              <a:schemeClr val="dk1">
+                <a:shade val="50000"/>
+              </a:schemeClr>
+            </a:lnRef>
+            <a:fillRef idx="1">
+              <a:schemeClr val="dk1"/>
+            </a:fillRef>
+            <a:effectRef idx="0">
+              <a:schemeClr val="dk1"/>
+            </a:effectRef>
+            <a:fontRef idx="minor">
+              <a:schemeClr val="lt1"/>
+            </a:fontRef>
+          </p:style>
+          <p:txBody>
+            <a:bodyPr rtlCol="0" anchor="ctr"/>
+            <a:lstStyle/>
+            <a:p>
+              <a:pPr algn="ctr"/>
+              <a:endParaRPr lang="fr-BE" sz="1200">
+                <a:latin typeface="+mj-lt"/>
+              </a:endParaRPr>
+            </a:p>
+          </p:txBody>
+        </p:sp>
+        <p:cxnSp>
+          <p:nvCxnSpPr>
+            <p:cNvPr id="13" name="Connecteur droit avec flèche 12"/>
+            <p:cNvCxnSpPr>
+              <a:stCxn id="12" idx="4"/>
+              <a:endCxn id="5" idx="0"/>
+            </p:cNvCxnSpPr>
+            <p:nvPr/>
+          </p:nvCxnSpPr>
+          <p:spPr>
+            <a:xfrm rot="5400000">
+              <a:off x="4543183" y="655548"/>
+              <a:ext cx="213752" cy="1588"/>
+            </a:xfrm>
+            <a:prstGeom prst="straightConnector1">
+              <a:avLst/>
+            </a:prstGeom>
+            <a:ln w="22225">
+              <a:tailEnd type="arrow"/>
+            </a:ln>
+          </p:spPr>
+          <p:style>
+            <a:lnRef idx="2">
+              <a:schemeClr val="dk1"/>
+            </a:lnRef>
+            <a:fillRef idx="0">
+              <a:schemeClr val="dk1"/>
+            </a:fillRef>
+            <a:effectRef idx="1">
+              <a:schemeClr val="dk1"/>
+            </a:effectRef>
+            <a:fontRef idx="minor">
+              <a:schemeClr val="tx1"/>
+            </a:fontRef>
+          </p:style>
+        </p:cxnSp>
+        <p:sp>
+          <p:nvSpPr>
+            <p:cNvPr id="14" name="Losange 13"/>
+            <p:cNvSpPr/>
+            <p:nvPr/>
+          </p:nvSpPr>
+          <p:spPr>
+            <a:xfrm>
+              <a:off x="4271115" y="1340768"/>
+              <a:ext cx="757888" cy="500066"/>
+            </a:xfrm>
+            <a:prstGeom prst="diamond">
+              <a:avLst/>
+            </a:prstGeom>
+            <a:ln w="22225"/>
+          </p:spPr>
+          <p:style>
+            <a:lnRef idx="2">
+              <a:schemeClr val="dk1"/>
+            </a:lnRef>
+            <a:fillRef idx="1">
+              <a:schemeClr val="lt1"/>
+            </a:fillRef>
+            <a:effectRef idx="0">
+              <a:schemeClr val="dk1"/>
+            </a:effectRef>
+            <a:fontRef idx="minor">
+              <a:schemeClr val="dk1"/>
+            </a:fontRef>
+          </p:style>
+          <p:txBody>
+            <a:bodyPr wrap="none" rtlCol="0" anchor="ctr">
+              <a:noAutofit/>
+            </a:bodyPr>
+            <a:lstStyle/>
+            <a:p>
+              <a:pPr algn="ctr"/>
+              <a:r>
+                <a:rPr lang="fr-BE" sz="1200" dirty="0" err="1" smtClean="0">
+                  <a:latin typeface="+mj-lt"/>
+                </a:rPr>
+                <a:t>Conflict</a:t>
+              </a:r>
+              <a:r>
+                <a:rPr lang="fr-BE" sz="1200" dirty="0" smtClean="0">
+                  <a:latin typeface="+mj-lt"/>
+                </a:rPr>
+                <a:t>?</a:t>
+              </a:r>
+              <a:endParaRPr lang="fr-BE" sz="1200" dirty="0">
+                <a:latin typeface="+mj-lt"/>
+              </a:endParaRPr>
+            </a:p>
+          </p:txBody>
+        </p:sp>
+        <p:cxnSp>
+          <p:nvCxnSpPr>
+            <p:cNvPr id="15" name="Connecteur droit avec flèche 74"/>
+            <p:cNvCxnSpPr>
+              <a:stCxn id="6" idx="0"/>
+              <a:endCxn id="5" idx="1"/>
+            </p:cNvCxnSpPr>
+            <p:nvPr/>
+          </p:nvCxnSpPr>
+          <p:spPr>
+            <a:xfrm rot="5400000" flipH="1" flipV="1">
+              <a:off x="3500971" y="765533"/>
+              <a:ext cx="432377" cy="822160"/>
+            </a:xfrm>
+            <a:prstGeom prst="bentConnector2">
+              <a:avLst/>
+            </a:prstGeom>
+            <a:ln w="22225">
+              <a:tailEnd type="arrow"/>
+            </a:ln>
+          </p:spPr>
+          <p:style>
+            <a:lnRef idx="2">
+              <a:schemeClr val="dk1"/>
+            </a:lnRef>
+            <a:fillRef idx="0">
+              <a:schemeClr val="dk1"/>
+            </a:fillRef>
+            <a:effectRef idx="1">
+              <a:schemeClr val="dk1"/>
+            </a:effectRef>
+            <a:fontRef idx="minor">
+              <a:schemeClr val="tx1"/>
+            </a:fontRef>
+          </p:style>
+        </p:cxnSp>
+        <p:grpSp>
+          <p:nvGrpSpPr>
+            <p:cNvPr id="16" name="Groupe 109"/>
+            <p:cNvGrpSpPr/>
+            <p:nvPr/>
+          </p:nvGrpSpPr>
+          <p:grpSpPr>
+            <a:xfrm>
+              <a:off x="5901773" y="2024864"/>
+              <a:ext cx="180000" cy="180000"/>
+              <a:chOff x="2786050" y="6143644"/>
+              <a:chExt cx="180000" cy="180000"/>
+            </a:xfrm>
+          </p:grpSpPr>
+          <p:sp>
+            <p:nvSpPr>
+              <p:cNvPr id="17" name="Ellipse 16"/>
+              <p:cNvSpPr/>
+              <p:nvPr/>
+            </p:nvSpPr>
+            <p:spPr>
+              <a:xfrm>
+                <a:off x="2786050" y="6143644"/>
+                <a:ext cx="180000" cy="180000"/>
+              </a:xfrm>
+              <a:prstGeom prst="ellipse">
+                <a:avLst/>
+              </a:prstGeom>
+            </p:spPr>
+            <p:style>
+              <a:lnRef idx="2">
+                <a:schemeClr val="dk1"/>
+              </a:lnRef>
+              <a:fillRef idx="1">
+                <a:schemeClr val="lt1"/>
+              </a:fillRef>
+              <a:effectRef idx="0">
+                <a:schemeClr val="dk1"/>
+              </a:effectRef>
+              <a:fontRef idx="minor">
+                <a:schemeClr val="dk1"/>
+              </a:fontRef>
+            </p:style>
+            <p:txBody>
+              <a:bodyPr rtlCol="0" anchor="ctr"/>
+              <a:lstStyle/>
+              <a:p>
+                <a:pPr algn="ctr"/>
+                <a:endParaRPr lang="fr-BE" sz="1200">
+                  <a:latin typeface="+mj-lt"/>
+                </a:endParaRPr>
+              </a:p>
+            </p:txBody>
+          </p:sp>
+          <p:sp>
+            <p:nvSpPr>
+              <p:cNvPr id="18" name="Ellipse 17"/>
+              <p:cNvSpPr/>
+              <p:nvPr/>
+            </p:nvSpPr>
+            <p:spPr>
+              <a:xfrm>
+                <a:off x="2840050" y="6197644"/>
+                <a:ext cx="72000" cy="72000"/>
+              </a:xfrm>
+              <a:prstGeom prst="ellipse">
+                <a:avLst/>
+              </a:prstGeom>
+              <a:ln w="22225"/>
+            </p:spPr>
+            <p:style>
+              <a:lnRef idx="2">
+                <a:schemeClr val="dk1">
+                  <a:shade val="50000"/>
+                </a:schemeClr>
+              </a:lnRef>
+              <a:fillRef idx="1">
+                <a:schemeClr val="dk1"/>
+              </a:fillRef>
+              <a:effectRef idx="0">
+                <a:schemeClr val="dk1"/>
+              </a:effectRef>
+              <a:fontRef idx="minor">
+                <a:schemeClr val="lt1"/>
+              </a:fontRef>
+            </p:style>
+            <p:txBody>
+              <a:bodyPr rtlCol="0" anchor="ctr"/>
+              <a:lstStyle/>
+              <a:p>
+                <a:pPr algn="ctr"/>
+                <a:endParaRPr lang="fr-BE" sz="1200">
+                  <a:latin typeface="+mj-lt"/>
+                </a:endParaRPr>
+              </a:p>
+            </p:txBody>
+          </p:sp>
+        </p:grpSp>
+        <p:sp>
+          <p:nvSpPr>
+            <p:cNvPr id="19" name="ZoneTexte 18"/>
+            <p:cNvSpPr txBox="1"/>
+            <p:nvPr/>
+          </p:nvSpPr>
+          <p:spPr>
+            <a:xfrm>
+              <a:off x="3981223" y="1498468"/>
+              <a:ext cx="241279" cy="184666"/>
+            </a:xfrm>
+            <a:prstGeom prst="rect">
+              <a:avLst/>
+            </a:prstGeom>
+            <a:solidFill>
+              <a:schemeClr val="bg1"/>
+            </a:solidFill>
+          </p:spPr>
+          <p:txBody>
+            <a:bodyPr wrap="none" lIns="18000" tIns="0" rIns="18000" bIns="0" rtlCol="0">
+              <a:spAutoFit/>
+            </a:bodyPr>
+            <a:lstStyle/>
+            <a:p>
+              <a:r>
+                <a:rPr lang="fr-BE" sz="1200" dirty="0" err="1" smtClean="0"/>
+                <a:t>yes</a:t>
+              </a:r>
+              <a:endParaRPr lang="fr-BE" sz="1200" dirty="0"/>
+            </a:p>
+          </p:txBody>
+        </p:sp>
+        <p:sp>
+          <p:nvSpPr>
+            <p:cNvPr id="25" name="ZoneTexte 24"/>
+            <p:cNvSpPr txBox="1"/>
+            <p:nvPr/>
+          </p:nvSpPr>
+          <p:spPr>
+            <a:xfrm>
+              <a:off x="5096031" y="1484784"/>
+              <a:ext cx="198255" cy="184666"/>
+            </a:xfrm>
+            <a:prstGeom prst="rect">
+              <a:avLst/>
+            </a:prstGeom>
+            <a:solidFill>
+              <a:schemeClr val="bg1"/>
+            </a:solidFill>
+          </p:spPr>
+          <p:txBody>
+            <a:bodyPr wrap="none" lIns="18000" tIns="0" rIns="18000" bIns="0" rtlCol="0">
+              <a:spAutoFit/>
+            </a:bodyPr>
+            <a:lstStyle/>
+            <a:p>
+              <a:r>
+                <a:rPr lang="fr-BE" sz="1200" dirty="0" smtClean="0"/>
+                <a:t>no</a:t>
+              </a:r>
+              <a:endParaRPr lang="fr-BE" sz="1200" dirty="0"/>
+            </a:p>
+          </p:txBody>
+        </p:sp>
+      </p:grpSp>
+      <p:grpSp>
+        <p:nvGrpSpPr>
+          <p:cNvPr id="91" name="Groupe 90"/>
+          <p:cNvGrpSpPr/>
+          <p:nvPr/>
+        </p:nvGrpSpPr>
+        <p:grpSpPr>
+          <a:xfrm>
+            <a:off x="2918937" y="2636912"/>
+            <a:ext cx="3594158" cy="2088232"/>
+            <a:chOff x="2706034" y="2132856"/>
+            <a:chExt cx="3594158" cy="2088232"/>
+          </a:xfrm>
+        </p:grpSpPr>
+        <p:sp>
+          <p:nvSpPr>
+            <p:cNvPr id="26" name="Ellipse 25"/>
+            <p:cNvSpPr/>
+            <p:nvPr/>
+          </p:nvSpPr>
+          <p:spPr>
+            <a:xfrm>
+              <a:off x="4067944" y="2265442"/>
+              <a:ext cx="216024" cy="216024"/>
+            </a:xfrm>
+            <a:prstGeom prst="ellipse">
+              <a:avLst/>
+            </a:prstGeom>
+            <a:ln w="22225"/>
+          </p:spPr>
+          <p:style>
+            <a:lnRef idx="2">
+              <a:schemeClr val="dk1"/>
+            </a:lnRef>
+            <a:fillRef idx="1">
+              <a:schemeClr val="lt1"/>
+            </a:fillRef>
+            <a:effectRef idx="0">
+              <a:schemeClr val="dk1"/>
+            </a:effectRef>
+            <a:fontRef idx="minor">
+              <a:schemeClr val="dk1"/>
+            </a:fontRef>
+          </p:style>
+          <p:txBody>
+            <a:bodyPr rtlCol="0" anchor="ctr"/>
+            <a:lstStyle/>
+            <a:p>
+              <a:pPr algn="ctr"/>
+              <a:endParaRPr lang="fr-BE" noProof="1"/>
+            </a:p>
+          </p:txBody>
+        </p:sp>
+        <p:sp>
+          <p:nvSpPr>
+            <p:cNvPr id="27" name="Ellipse 26"/>
+            <p:cNvSpPr/>
+            <p:nvPr/>
+          </p:nvSpPr>
+          <p:spPr>
+            <a:xfrm>
+              <a:off x="5645878" y="2265442"/>
+              <a:ext cx="216024" cy="216024"/>
+            </a:xfrm>
+            <a:prstGeom prst="ellipse">
+              <a:avLst/>
+            </a:prstGeom>
+            <a:ln w="22225"/>
+          </p:spPr>
+          <p:style>
+            <a:lnRef idx="2">
+              <a:schemeClr val="dk1"/>
+            </a:lnRef>
+            <a:fillRef idx="1">
+              <a:schemeClr val="lt1"/>
+            </a:fillRef>
+            <a:effectRef idx="0">
+              <a:schemeClr val="dk1"/>
+            </a:effectRef>
+            <a:fontRef idx="minor">
+              <a:schemeClr val="dk1"/>
+            </a:fontRef>
+          </p:style>
+          <p:txBody>
+            <a:bodyPr rtlCol="0" anchor="ctr"/>
+            <a:lstStyle/>
+            <a:p>
+              <a:pPr algn="ctr"/>
+              <a:endParaRPr lang="fr-BE" noProof="1"/>
+            </a:p>
+          </p:txBody>
+        </p:sp>
+        <p:sp>
+          <p:nvSpPr>
+            <p:cNvPr id="28" name="Ellipse 27"/>
+            <p:cNvSpPr/>
+            <p:nvPr/>
+          </p:nvSpPr>
+          <p:spPr>
+            <a:xfrm>
+              <a:off x="5645878" y="2708920"/>
+              <a:ext cx="216024" cy="216024"/>
+            </a:xfrm>
+            <a:prstGeom prst="ellipse">
+              <a:avLst/>
+            </a:prstGeom>
+            <a:ln w="22225"/>
+          </p:spPr>
+          <p:style>
+            <a:lnRef idx="2">
+              <a:schemeClr val="dk1"/>
+            </a:lnRef>
+            <a:fillRef idx="1">
+              <a:schemeClr val="lt1"/>
+            </a:fillRef>
+            <a:effectRef idx="0">
+              <a:schemeClr val="dk1"/>
+            </a:effectRef>
+            <a:fontRef idx="minor">
+              <a:schemeClr val="dk1"/>
+            </a:fontRef>
+          </p:style>
+          <p:txBody>
+            <a:bodyPr rtlCol="0" anchor="ctr"/>
+            <a:lstStyle/>
+            <a:p>
+              <a:pPr algn="ctr"/>
+              <a:endParaRPr lang="fr-BE" noProof="1"/>
+            </a:p>
+          </p:txBody>
+        </p:sp>
+        <p:sp>
+          <p:nvSpPr>
+            <p:cNvPr id="29" name="Ellipse 28"/>
+            <p:cNvSpPr/>
+            <p:nvPr/>
+          </p:nvSpPr>
+          <p:spPr>
+            <a:xfrm>
+              <a:off x="4386456" y="2708920"/>
+              <a:ext cx="216024" cy="216024"/>
+            </a:xfrm>
+            <a:prstGeom prst="ellipse">
+              <a:avLst/>
+            </a:prstGeom>
+            <a:ln w="22225"/>
+          </p:spPr>
+          <p:style>
+            <a:lnRef idx="2">
+              <a:schemeClr val="dk1"/>
+            </a:lnRef>
+            <a:fillRef idx="1">
+              <a:schemeClr val="lt1"/>
+            </a:fillRef>
+            <a:effectRef idx="0">
+              <a:schemeClr val="dk1"/>
+            </a:effectRef>
+            <a:fontRef idx="minor">
+              <a:schemeClr val="dk1"/>
+            </a:fontRef>
+          </p:style>
+          <p:txBody>
+            <a:bodyPr rtlCol="0" anchor="ctr"/>
+            <a:lstStyle/>
+            <a:p>
+              <a:pPr algn="ctr"/>
+              <a:endParaRPr lang="fr-BE" noProof="1"/>
+            </a:p>
+          </p:txBody>
+        </p:sp>
+        <p:cxnSp>
+          <p:nvCxnSpPr>
+            <p:cNvPr id="30" name="Connecteur droit avec flèche 29"/>
+            <p:cNvCxnSpPr>
+              <a:stCxn id="26" idx="6"/>
+              <a:endCxn id="27" idx="2"/>
+            </p:cNvCxnSpPr>
+            <p:nvPr/>
+          </p:nvCxnSpPr>
+          <p:spPr>
+            <a:xfrm>
+              <a:off x="4283968" y="2373454"/>
+              <a:ext cx="1361910" cy="1588"/>
+            </a:xfrm>
+            <a:prstGeom prst="straightConnector1">
+              <a:avLst/>
+            </a:prstGeom>
+            <a:ln w="22225">
+              <a:solidFill>
+                <a:schemeClr val="tx1"/>
+              </a:solidFill>
+              <a:tailEnd type="triangle" w="med" len="sm"/>
+            </a:ln>
+          </p:spPr>
+          <p:style>
+            <a:lnRef idx="1">
+              <a:schemeClr val="accent1"/>
+            </a:lnRef>
+            <a:fillRef idx="0">
+              <a:schemeClr val="accent1"/>
+            </a:fillRef>
+            <a:effectRef idx="0">
+              <a:schemeClr val="accent1"/>
+            </a:effectRef>
+            <a:fontRef idx="minor">
+              <a:schemeClr val="tx1"/>
+            </a:fontRef>
+          </p:style>
+        </p:cxnSp>
+        <p:cxnSp>
+          <p:nvCxnSpPr>
+            <p:cNvPr id="31" name="Connecteur droit avec flèche 30"/>
+            <p:cNvCxnSpPr>
+              <a:stCxn id="27" idx="4"/>
+              <a:endCxn id="28" idx="0"/>
+            </p:cNvCxnSpPr>
+            <p:nvPr/>
+          </p:nvCxnSpPr>
+          <p:spPr>
+            <a:xfrm rot="5400000">
+              <a:off x="5640163" y="2595193"/>
+              <a:ext cx="227454" cy="1588"/>
+            </a:xfrm>
+            <a:prstGeom prst="straightConnector1">
+              <a:avLst/>
+            </a:prstGeom>
+            <a:ln w="22225">
+              <a:solidFill>
+                <a:schemeClr val="tx1"/>
+              </a:solidFill>
+              <a:tailEnd type="triangle" w="med" len="sm"/>
+            </a:ln>
+          </p:spPr>
+          <p:style>
+            <a:lnRef idx="1">
+              <a:schemeClr val="accent1"/>
+            </a:lnRef>
+            <a:fillRef idx="0">
+              <a:schemeClr val="accent1"/>
+            </a:fillRef>
+            <a:effectRef idx="0">
+              <a:schemeClr val="accent1"/>
+            </a:effectRef>
+            <a:fontRef idx="minor">
+              <a:schemeClr val="tx1"/>
+            </a:fontRef>
+          </p:style>
+        </p:cxnSp>
+        <p:cxnSp>
+          <p:nvCxnSpPr>
+            <p:cNvPr id="32" name="Connecteur droit avec flèche 31"/>
+            <p:cNvCxnSpPr>
+              <a:stCxn id="28" idx="2"/>
+              <a:endCxn id="29" idx="6"/>
+            </p:cNvCxnSpPr>
+            <p:nvPr/>
+          </p:nvCxnSpPr>
+          <p:spPr>
+            <a:xfrm rot="10800000">
+              <a:off x="4602480" y="2816932"/>
+              <a:ext cx="1043398" cy="1588"/>
+            </a:xfrm>
+            <a:prstGeom prst="straightConnector1">
+              <a:avLst/>
+            </a:prstGeom>
+            <a:ln w="22225">
+              <a:solidFill>
+                <a:schemeClr val="tx1"/>
+              </a:solidFill>
+              <a:tailEnd type="triangle" w="med" len="sm"/>
+            </a:ln>
+          </p:spPr>
+          <p:style>
+            <a:lnRef idx="1">
+              <a:schemeClr val="accent1"/>
+            </a:lnRef>
+            <a:fillRef idx="0">
+              <a:schemeClr val="accent1"/>
+            </a:fillRef>
+            <a:effectRef idx="0">
+              <a:schemeClr val="accent1"/>
+            </a:effectRef>
+            <a:fontRef idx="minor">
+              <a:schemeClr val="tx1"/>
+            </a:fontRef>
+          </p:style>
+        </p:cxnSp>
+        <p:sp>
+          <p:nvSpPr>
+            <p:cNvPr id="33" name="ZoneTexte 32"/>
+            <p:cNvSpPr txBox="1"/>
+            <p:nvPr/>
+          </p:nvSpPr>
+          <p:spPr>
+            <a:xfrm>
+              <a:off x="5580112" y="2455376"/>
+              <a:ext cx="159783" cy="215444"/>
+            </a:xfrm>
+            <a:prstGeom prst="rect">
+              <a:avLst/>
+            </a:prstGeom>
+            <a:noFill/>
+          </p:spPr>
+          <p:txBody>
+            <a:bodyPr wrap="none" lIns="18000" tIns="0" rIns="18000" bIns="0" rtlCol="0">
+              <a:spAutoFit/>
+            </a:bodyPr>
+            <a:lstStyle/>
+            <a:p>
+              <a:r>
+                <a:rPr lang="fr-BE" sz="1400" noProof="1" smtClean="0"/>
+                <a:t>…</a:t>
+              </a:r>
+              <a:endParaRPr lang="fr-BE" sz="1400" noProof="1"/>
+            </a:p>
+          </p:txBody>
+        </p:sp>
+        <p:sp>
+          <p:nvSpPr>
+            <p:cNvPr id="34" name="ZoneTexte 33"/>
+            <p:cNvSpPr txBox="1"/>
+            <p:nvPr/>
+          </p:nvSpPr>
+          <p:spPr>
+            <a:xfrm>
+              <a:off x="4860032" y="2273062"/>
+              <a:ext cx="617926" cy="184666"/>
+            </a:xfrm>
+            <a:prstGeom prst="rect">
+              <a:avLst/>
+            </a:prstGeom>
+            <a:solidFill>
+              <a:schemeClr val="bg1"/>
+            </a:solidFill>
+          </p:spPr>
+          <p:txBody>
+            <a:bodyPr wrap="none" lIns="0" tIns="0" rIns="0" bIns="0" rtlCol="0">
+              <a:spAutoFit/>
+            </a:bodyPr>
+            <a:lstStyle/>
+            <a:p>
+              <a:r>
+                <a:rPr lang="fr-BE" sz="1200" noProof="1" smtClean="0"/>
+                <a:t>Collect</a:t>
+              </a:r>
+              <a:r>
+                <a:rPr lang="fr-BE" sz="1200" baseline="-25000" noProof="1" smtClean="0"/>
+                <a:t>start</a:t>
+              </a:r>
+              <a:endParaRPr lang="fr-BE" sz="1200" baseline="-25000" noProof="1"/>
+            </a:p>
+          </p:txBody>
+        </p:sp>
+        <p:sp>
+          <p:nvSpPr>
+            <p:cNvPr id="35" name="ZoneTexte 34"/>
+            <p:cNvSpPr txBox="1"/>
+            <p:nvPr/>
+          </p:nvSpPr>
+          <p:spPr>
+            <a:xfrm>
+              <a:off x="4891323" y="2724160"/>
+              <a:ext cx="586635" cy="184666"/>
+            </a:xfrm>
+            <a:prstGeom prst="rect">
+              <a:avLst/>
+            </a:prstGeom>
+            <a:solidFill>
+              <a:schemeClr val="bg1"/>
+            </a:solidFill>
+          </p:spPr>
+          <p:txBody>
+            <a:bodyPr wrap="none" lIns="0" tIns="0" rIns="0" bIns="0" rtlCol="0">
+              <a:spAutoFit/>
+            </a:bodyPr>
+            <a:lstStyle/>
+            <a:p>
+              <a:r>
+                <a:rPr lang="fr-BE" sz="1200" noProof="1" smtClean="0"/>
+                <a:t>Collect</a:t>
+              </a:r>
+              <a:r>
+                <a:rPr lang="fr-BE" sz="1200" baseline="-25000" noProof="1" smtClean="0"/>
+                <a:t>end</a:t>
+              </a:r>
+              <a:endParaRPr lang="fr-BE" sz="1200" baseline="-25000" noProof="1"/>
+            </a:p>
+          </p:txBody>
+        </p:sp>
+        <p:cxnSp>
+          <p:nvCxnSpPr>
+            <p:cNvPr id="48" name="Connecteur droit avec flèche 7"/>
+            <p:cNvCxnSpPr>
+              <a:endCxn id="26" idx="1"/>
+            </p:cNvCxnSpPr>
+            <p:nvPr/>
+          </p:nvCxnSpPr>
+          <p:spPr>
+            <a:xfrm>
+              <a:off x="3851920" y="2132856"/>
+              <a:ext cx="247660" cy="164222"/>
+            </a:xfrm>
+            <a:prstGeom prst="straightConnector1">
+              <a:avLst/>
+            </a:prstGeom>
+            <a:ln w="22225">
+              <a:tailEnd type="triangle" w="med" len="lg"/>
+            </a:ln>
+          </p:spPr>
+          <p:style>
+            <a:lnRef idx="1">
+              <a:schemeClr val="dk1"/>
+            </a:lnRef>
+            <a:fillRef idx="0">
+              <a:schemeClr val="dk1"/>
+            </a:fillRef>
+            <a:effectRef idx="0">
+              <a:schemeClr val="dk1"/>
+            </a:effectRef>
+            <a:fontRef idx="minor">
+              <a:schemeClr val="tx1"/>
+            </a:fontRef>
+          </p:style>
+        </p:cxnSp>
+        <p:sp>
+          <p:nvSpPr>
+            <p:cNvPr id="50" name="Ellipse 49"/>
+            <p:cNvSpPr/>
+            <p:nvPr/>
+          </p:nvSpPr>
+          <p:spPr>
+            <a:xfrm flipH="1">
+              <a:off x="3848636" y="3561586"/>
+              <a:ext cx="216024" cy="216024"/>
+            </a:xfrm>
+            <a:prstGeom prst="ellipse">
+              <a:avLst/>
+            </a:prstGeom>
+            <a:ln w="22225"/>
+          </p:spPr>
+          <p:style>
+            <a:lnRef idx="2">
+              <a:schemeClr val="dk1"/>
+            </a:lnRef>
+            <a:fillRef idx="1">
+              <a:schemeClr val="lt1"/>
+            </a:fillRef>
+            <a:effectRef idx="0">
+              <a:schemeClr val="dk1"/>
+            </a:effectRef>
+            <a:fontRef idx="minor">
+              <a:schemeClr val="dk1"/>
+            </a:fontRef>
+          </p:style>
+          <p:txBody>
+            <a:bodyPr rtlCol="0" anchor="ctr"/>
+            <a:lstStyle/>
+            <a:p>
+              <a:pPr algn="ctr"/>
+              <a:endParaRPr lang="fr-BE" noProof="1"/>
+            </a:p>
+          </p:txBody>
+        </p:sp>
+        <p:sp>
+          <p:nvSpPr>
+            <p:cNvPr id="51" name="Ellipse 50"/>
+            <p:cNvSpPr/>
+            <p:nvPr/>
+          </p:nvSpPr>
+          <p:spPr>
+            <a:xfrm flipH="1">
+              <a:off x="2706034" y="3561586"/>
+              <a:ext cx="216024" cy="216024"/>
+            </a:xfrm>
+            <a:prstGeom prst="ellipse">
+              <a:avLst/>
+            </a:prstGeom>
+            <a:ln w="22225"/>
+          </p:spPr>
+          <p:style>
+            <a:lnRef idx="2">
+              <a:schemeClr val="dk1"/>
+            </a:lnRef>
+            <a:fillRef idx="1">
+              <a:schemeClr val="lt1"/>
+            </a:fillRef>
+            <a:effectRef idx="0">
+              <a:schemeClr val="dk1"/>
+            </a:effectRef>
+            <a:fontRef idx="minor">
+              <a:schemeClr val="dk1"/>
+            </a:fontRef>
+          </p:style>
+          <p:txBody>
+            <a:bodyPr rtlCol="0" anchor="ctr"/>
+            <a:lstStyle/>
+            <a:p>
+              <a:pPr algn="ctr"/>
+              <a:endParaRPr lang="fr-BE" noProof="1"/>
+            </a:p>
+          </p:txBody>
+        </p:sp>
+        <p:sp>
+          <p:nvSpPr>
+            <p:cNvPr id="52" name="Ellipse 51"/>
+            <p:cNvSpPr/>
+            <p:nvPr/>
+          </p:nvSpPr>
+          <p:spPr>
+            <a:xfrm flipH="1">
+              <a:off x="2706034" y="2780928"/>
+              <a:ext cx="216024" cy="216024"/>
+            </a:xfrm>
+            <a:prstGeom prst="ellipse">
+              <a:avLst/>
+            </a:prstGeom>
+            <a:ln w="22225"/>
+          </p:spPr>
+          <p:style>
+            <a:lnRef idx="2">
+              <a:schemeClr val="dk1"/>
+            </a:lnRef>
+            <a:fillRef idx="1">
+              <a:schemeClr val="lt1"/>
+            </a:fillRef>
+            <a:effectRef idx="0">
+              <a:schemeClr val="dk1"/>
+            </a:effectRef>
+            <a:fontRef idx="minor">
+              <a:schemeClr val="dk1"/>
+            </a:fontRef>
+          </p:style>
+          <p:txBody>
+            <a:bodyPr rtlCol="0" anchor="ctr"/>
+            <a:lstStyle/>
+            <a:p>
+              <a:pPr algn="ctr"/>
+              <a:endParaRPr lang="fr-BE" noProof="1"/>
+            </a:p>
+          </p:txBody>
+        </p:sp>
+        <p:cxnSp>
+          <p:nvCxnSpPr>
+            <p:cNvPr id="54" name="Connecteur droit avec flèche 53"/>
+            <p:cNvCxnSpPr>
+              <a:stCxn id="50" idx="6"/>
+              <a:endCxn id="51" idx="2"/>
+            </p:cNvCxnSpPr>
+            <p:nvPr/>
+          </p:nvCxnSpPr>
+          <p:spPr>
+            <a:xfrm rot="10800000">
+              <a:off x="2922058" y="3669598"/>
+              <a:ext cx="926578" cy="1588"/>
+            </a:xfrm>
+            <a:prstGeom prst="straightConnector1">
+              <a:avLst/>
+            </a:prstGeom>
+            <a:ln w="22225">
+              <a:solidFill>
+                <a:schemeClr val="tx1"/>
+              </a:solidFill>
+              <a:tailEnd type="triangle" w="med" len="sm"/>
+            </a:ln>
+          </p:spPr>
+          <p:style>
+            <a:lnRef idx="1">
+              <a:schemeClr val="accent1"/>
+            </a:lnRef>
+            <a:fillRef idx="0">
+              <a:schemeClr val="accent1"/>
+            </a:fillRef>
+            <a:effectRef idx="0">
+              <a:schemeClr val="accent1"/>
+            </a:effectRef>
+            <a:fontRef idx="minor">
+              <a:schemeClr val="tx1"/>
+            </a:fontRef>
+          </p:style>
+        </p:cxnSp>
+        <p:cxnSp>
+          <p:nvCxnSpPr>
+            <p:cNvPr id="55" name="Connecteur droit avec flèche 54"/>
+            <p:cNvCxnSpPr>
+              <a:stCxn id="51" idx="0"/>
+              <a:endCxn id="52" idx="4"/>
+            </p:cNvCxnSpPr>
+            <p:nvPr/>
+          </p:nvCxnSpPr>
+          <p:spPr>
+            <a:xfrm rot="5400000" flipH="1" flipV="1">
+              <a:off x="2531729" y="3279269"/>
+              <a:ext cx="564634" cy="1588"/>
+            </a:xfrm>
+            <a:prstGeom prst="straightConnector1">
+              <a:avLst/>
+            </a:prstGeom>
+            <a:ln w="22225">
+              <a:solidFill>
+                <a:schemeClr val="tx1"/>
+              </a:solidFill>
+              <a:tailEnd type="triangle" w="med" len="sm"/>
+            </a:ln>
+          </p:spPr>
+          <p:style>
+            <a:lnRef idx="1">
+              <a:schemeClr val="accent1"/>
+            </a:lnRef>
+            <a:fillRef idx="0">
+              <a:schemeClr val="accent1"/>
+            </a:fillRef>
+            <a:effectRef idx="0">
+              <a:schemeClr val="accent1"/>
+            </a:effectRef>
+            <a:fontRef idx="minor">
+              <a:schemeClr val="tx1"/>
+            </a:fontRef>
+          </p:style>
+        </p:cxnSp>
+        <p:cxnSp>
+          <p:nvCxnSpPr>
+            <p:cNvPr id="56" name="Connecteur droit avec flèche 55"/>
+            <p:cNvCxnSpPr>
+              <a:stCxn id="52" idx="2"/>
+              <a:endCxn id="26" idx="2"/>
+            </p:cNvCxnSpPr>
+            <p:nvPr/>
+          </p:nvCxnSpPr>
+          <p:spPr>
+            <a:xfrm flipV="1">
+              <a:off x="2922058" y="2373454"/>
+              <a:ext cx="1145886" cy="515486"/>
+            </a:xfrm>
+            <a:prstGeom prst="bentConnector3">
+              <a:avLst>
+                <a:gd name="adj1" fmla="val 50000"/>
+              </a:avLst>
+            </a:prstGeom>
+            <a:ln w="22225">
+              <a:solidFill>
+                <a:schemeClr val="tx1"/>
+              </a:solidFill>
+              <a:tailEnd type="triangle" w="med" len="sm"/>
+            </a:ln>
+          </p:spPr>
+          <p:style>
+            <a:lnRef idx="1">
+              <a:schemeClr val="accent1"/>
+            </a:lnRef>
+            <a:fillRef idx="0">
+              <a:schemeClr val="accent1"/>
+            </a:fillRef>
+            <a:effectRef idx="0">
+              <a:schemeClr val="accent1"/>
+            </a:effectRef>
+            <a:fontRef idx="minor">
+              <a:schemeClr val="tx1"/>
+            </a:fontRef>
+          </p:style>
+        </p:cxnSp>
+        <p:sp>
+          <p:nvSpPr>
+            <p:cNvPr id="57" name="ZoneTexte 56"/>
+            <p:cNvSpPr txBox="1"/>
+            <p:nvPr/>
+          </p:nvSpPr>
+          <p:spPr>
+            <a:xfrm flipH="1">
+              <a:off x="2843808" y="3141548"/>
+              <a:ext cx="159783" cy="215444"/>
+            </a:xfrm>
+            <a:prstGeom prst="rect">
+              <a:avLst/>
+            </a:prstGeom>
+            <a:noFill/>
+          </p:spPr>
+          <p:txBody>
+            <a:bodyPr wrap="none" lIns="18000" tIns="0" rIns="18000" bIns="0" rtlCol="0">
+              <a:spAutoFit/>
+            </a:bodyPr>
+            <a:lstStyle/>
+            <a:p>
+              <a:r>
+                <a:rPr lang="fr-BE" sz="1400" noProof="1" smtClean="0"/>
+                <a:t>…</a:t>
+              </a:r>
+              <a:endParaRPr lang="fr-BE" sz="1400" noProof="1"/>
+            </a:p>
+          </p:txBody>
+        </p:sp>
+        <p:sp>
+          <p:nvSpPr>
+            <p:cNvPr id="58" name="ZoneTexte 57"/>
+            <p:cNvSpPr txBox="1"/>
+            <p:nvPr/>
+          </p:nvSpPr>
+          <p:spPr>
+            <a:xfrm flipH="1">
+              <a:off x="3030251" y="3561586"/>
+              <a:ext cx="747962" cy="184666"/>
+            </a:xfrm>
+            <a:prstGeom prst="rect">
+              <a:avLst/>
+            </a:prstGeom>
+            <a:solidFill>
+              <a:schemeClr val="bg1"/>
+            </a:solidFill>
+          </p:spPr>
+          <p:txBody>
+            <a:bodyPr wrap="none" lIns="0" tIns="0" rIns="0" bIns="0" rtlCol="0">
+              <a:spAutoFit/>
+            </a:bodyPr>
+            <a:lstStyle/>
+            <a:p>
+              <a:r>
+                <a:rPr lang="fr-BE" sz="1200" noProof="1" smtClean="0"/>
+                <a:t>Arbitrate</a:t>
+              </a:r>
+              <a:r>
+                <a:rPr lang="fr-BE" sz="1200" baseline="-25000" noProof="1" smtClean="0"/>
+                <a:t>start</a:t>
+              </a:r>
+              <a:endParaRPr lang="fr-BE" sz="1200" baseline="-25000" noProof="1"/>
+            </a:p>
+          </p:txBody>
+        </p:sp>
+        <p:sp>
+          <p:nvSpPr>
+            <p:cNvPr id="59" name="ZoneTexte 58"/>
+            <p:cNvSpPr txBox="1"/>
+            <p:nvPr/>
+          </p:nvSpPr>
+          <p:spPr>
+            <a:xfrm flipH="1">
+              <a:off x="3205590" y="2492896"/>
+              <a:ext cx="718338" cy="184666"/>
+            </a:xfrm>
+            <a:prstGeom prst="rect">
+              <a:avLst/>
+            </a:prstGeom>
+            <a:solidFill>
+              <a:schemeClr val="bg1"/>
+            </a:solidFill>
+          </p:spPr>
+          <p:txBody>
+            <a:bodyPr wrap="none" lIns="0" tIns="0" rIns="0" bIns="0" rtlCol="0">
+              <a:spAutoFit/>
+            </a:bodyPr>
+            <a:lstStyle/>
+            <a:p>
+              <a:r>
+                <a:rPr lang="fr-BE" sz="1200" noProof="1" smtClean="0"/>
+                <a:t>Arbitrate</a:t>
+              </a:r>
+              <a:r>
+                <a:rPr lang="fr-BE" sz="1200" baseline="-25000" noProof="1" smtClean="0"/>
+                <a:t>end</a:t>
+              </a:r>
+              <a:endParaRPr lang="fr-BE" sz="1200" baseline="-25000" noProof="1"/>
+            </a:p>
+          </p:txBody>
+        </p:sp>
+        <p:sp>
+          <p:nvSpPr>
+            <p:cNvPr id="64" name="Ellipse 63"/>
+            <p:cNvSpPr/>
+            <p:nvPr/>
+          </p:nvSpPr>
+          <p:spPr>
+            <a:xfrm>
+              <a:off x="4932040" y="3561586"/>
+              <a:ext cx="216024" cy="216024"/>
+            </a:xfrm>
+            <a:prstGeom prst="ellipse">
+              <a:avLst/>
+            </a:prstGeom>
+            <a:ln w="22225"/>
+          </p:spPr>
+          <p:style>
+            <a:lnRef idx="2">
+              <a:schemeClr val="dk1"/>
+            </a:lnRef>
+            <a:fillRef idx="1">
+              <a:schemeClr val="lt1"/>
+            </a:fillRef>
+            <a:effectRef idx="0">
+              <a:schemeClr val="dk1"/>
+            </a:effectRef>
+            <a:fontRef idx="minor">
+              <a:schemeClr val="dk1"/>
+            </a:fontRef>
+          </p:style>
+          <p:txBody>
+            <a:bodyPr rtlCol="0" anchor="ctr"/>
+            <a:lstStyle/>
+            <a:p>
+              <a:pPr algn="ctr"/>
+              <a:endParaRPr lang="fr-BE" noProof="1"/>
+            </a:p>
+          </p:txBody>
+        </p:sp>
+        <p:sp>
+          <p:nvSpPr>
+            <p:cNvPr id="65" name="Ellipse 64"/>
+            <p:cNvSpPr/>
+            <p:nvPr/>
+          </p:nvSpPr>
+          <p:spPr>
+            <a:xfrm>
+              <a:off x="6084168" y="3561586"/>
+              <a:ext cx="216024" cy="216024"/>
+            </a:xfrm>
+            <a:prstGeom prst="ellipse">
+              <a:avLst/>
+            </a:prstGeom>
+            <a:ln w="22225"/>
+          </p:spPr>
+          <p:style>
+            <a:lnRef idx="2">
+              <a:schemeClr val="dk1"/>
+            </a:lnRef>
+            <a:fillRef idx="1">
+              <a:schemeClr val="lt1"/>
+            </a:fillRef>
+            <a:effectRef idx="0">
+              <a:schemeClr val="dk1"/>
+            </a:effectRef>
+            <a:fontRef idx="minor">
+              <a:schemeClr val="dk1"/>
+            </a:fontRef>
+          </p:style>
+          <p:txBody>
+            <a:bodyPr rtlCol="0" anchor="ctr"/>
+            <a:lstStyle/>
+            <a:p>
+              <a:pPr algn="ctr"/>
+              <a:endParaRPr lang="fr-BE" noProof="1"/>
+            </a:p>
+          </p:txBody>
+        </p:sp>
+        <p:sp>
+          <p:nvSpPr>
+            <p:cNvPr id="66" name="Ellipse 65"/>
+            <p:cNvSpPr/>
+            <p:nvPr/>
+          </p:nvSpPr>
+          <p:spPr>
+            <a:xfrm>
+              <a:off x="6084168" y="4005064"/>
+              <a:ext cx="216024" cy="216024"/>
+            </a:xfrm>
+            <a:prstGeom prst="ellipse">
+              <a:avLst/>
+            </a:prstGeom>
+            <a:ln w="22225"/>
+          </p:spPr>
+          <p:style>
+            <a:lnRef idx="2">
+              <a:schemeClr val="dk1"/>
+            </a:lnRef>
+            <a:fillRef idx="1">
+              <a:schemeClr val="lt1"/>
+            </a:fillRef>
+            <a:effectRef idx="0">
+              <a:schemeClr val="dk1"/>
+            </a:effectRef>
+            <a:fontRef idx="minor">
+              <a:schemeClr val="dk1"/>
+            </a:fontRef>
+          </p:style>
+          <p:txBody>
+            <a:bodyPr rtlCol="0" anchor="ctr"/>
+            <a:lstStyle/>
+            <a:p>
+              <a:pPr algn="ctr"/>
+              <a:endParaRPr lang="fr-BE" noProof="1"/>
+            </a:p>
+          </p:txBody>
+        </p:sp>
+        <p:sp>
+          <p:nvSpPr>
+            <p:cNvPr id="67" name="Ellipse 66"/>
+            <p:cNvSpPr/>
+            <p:nvPr/>
+          </p:nvSpPr>
+          <p:spPr>
+            <a:xfrm>
+              <a:off x="4932040" y="4005064"/>
+              <a:ext cx="216024" cy="216024"/>
+            </a:xfrm>
+            <a:prstGeom prst="ellipse">
+              <a:avLst/>
+            </a:prstGeom>
+            <a:ln w="22225"/>
+          </p:spPr>
+          <p:style>
+            <a:lnRef idx="2">
+              <a:schemeClr val="dk1"/>
+            </a:lnRef>
+            <a:fillRef idx="1">
+              <a:schemeClr val="lt1"/>
+            </a:fillRef>
+            <a:effectRef idx="0">
+              <a:schemeClr val="dk1"/>
+            </a:effectRef>
+            <a:fontRef idx="minor">
+              <a:schemeClr val="dk1"/>
+            </a:fontRef>
+          </p:style>
+          <p:txBody>
+            <a:bodyPr rtlCol="0" anchor="ctr"/>
+            <a:lstStyle/>
+            <a:p>
+              <a:pPr algn="ctr"/>
+              <a:endParaRPr lang="fr-BE" noProof="1"/>
+            </a:p>
+          </p:txBody>
+        </p:sp>
+        <p:cxnSp>
+          <p:nvCxnSpPr>
+            <p:cNvPr id="68" name="Connecteur droit avec flèche 67"/>
+            <p:cNvCxnSpPr>
+              <a:stCxn id="64" idx="6"/>
+              <a:endCxn id="65" idx="2"/>
+            </p:cNvCxnSpPr>
+            <p:nvPr/>
+          </p:nvCxnSpPr>
+          <p:spPr>
+            <a:xfrm>
+              <a:off x="5148064" y="3669598"/>
+              <a:ext cx="936104" cy="1588"/>
+            </a:xfrm>
+            <a:prstGeom prst="straightConnector1">
+              <a:avLst/>
+            </a:prstGeom>
+            <a:ln w="22225">
+              <a:solidFill>
+                <a:schemeClr val="tx1"/>
+              </a:solidFill>
+              <a:tailEnd type="triangle" w="med" len="sm"/>
+            </a:ln>
+          </p:spPr>
+          <p:style>
+            <a:lnRef idx="1">
+              <a:schemeClr val="accent1"/>
+            </a:lnRef>
+            <a:fillRef idx="0">
+              <a:schemeClr val="accent1"/>
+            </a:fillRef>
+            <a:effectRef idx="0">
+              <a:schemeClr val="accent1"/>
+            </a:effectRef>
+            <a:fontRef idx="minor">
+              <a:schemeClr val="tx1"/>
+            </a:fontRef>
+          </p:style>
+        </p:cxnSp>
+        <p:cxnSp>
+          <p:nvCxnSpPr>
+            <p:cNvPr id="69" name="Connecteur droit avec flèche 68"/>
+            <p:cNvCxnSpPr>
+              <a:stCxn id="65" idx="4"/>
+              <a:endCxn id="66" idx="0"/>
+            </p:cNvCxnSpPr>
+            <p:nvPr/>
+          </p:nvCxnSpPr>
+          <p:spPr>
+            <a:xfrm rot="5400000">
+              <a:off x="6078453" y="3891337"/>
+              <a:ext cx="227454" cy="1588"/>
+            </a:xfrm>
+            <a:prstGeom prst="straightConnector1">
+              <a:avLst/>
+            </a:prstGeom>
+            <a:ln w="22225">
+              <a:solidFill>
+                <a:schemeClr val="tx1"/>
+              </a:solidFill>
+              <a:tailEnd type="triangle" w="med" len="sm"/>
+            </a:ln>
+          </p:spPr>
+          <p:style>
+            <a:lnRef idx="1">
+              <a:schemeClr val="accent1"/>
+            </a:lnRef>
+            <a:fillRef idx="0">
+              <a:schemeClr val="accent1"/>
+            </a:fillRef>
+            <a:effectRef idx="0">
+              <a:schemeClr val="accent1"/>
+            </a:effectRef>
+            <a:fontRef idx="minor">
+              <a:schemeClr val="tx1"/>
+            </a:fontRef>
+          </p:style>
+        </p:cxnSp>
+        <p:cxnSp>
+          <p:nvCxnSpPr>
+            <p:cNvPr id="70" name="Connecteur droit avec flèche 69"/>
+            <p:cNvCxnSpPr>
+              <a:stCxn id="66" idx="2"/>
+              <a:endCxn id="67" idx="6"/>
+            </p:cNvCxnSpPr>
+            <p:nvPr/>
+          </p:nvCxnSpPr>
+          <p:spPr>
+            <a:xfrm rot="10800000">
+              <a:off x="5148064" y="4113076"/>
+              <a:ext cx="936104" cy="1588"/>
+            </a:xfrm>
+            <a:prstGeom prst="straightConnector1">
+              <a:avLst/>
+            </a:prstGeom>
+            <a:ln w="22225">
+              <a:solidFill>
+                <a:schemeClr val="tx1"/>
+              </a:solidFill>
+              <a:tailEnd type="triangle" w="med" len="sm"/>
+            </a:ln>
+          </p:spPr>
+          <p:style>
+            <a:lnRef idx="1">
+              <a:schemeClr val="accent1"/>
+            </a:lnRef>
+            <a:fillRef idx="0">
+              <a:schemeClr val="accent1"/>
+            </a:fillRef>
+            <a:effectRef idx="0">
+              <a:schemeClr val="accent1"/>
+            </a:effectRef>
+            <a:fontRef idx="minor">
+              <a:schemeClr val="tx1"/>
+            </a:fontRef>
+          </p:style>
+        </p:cxnSp>
+        <p:sp>
+          <p:nvSpPr>
+            <p:cNvPr id="71" name="ZoneTexte 70"/>
+            <p:cNvSpPr txBox="1"/>
+            <p:nvPr/>
+          </p:nvSpPr>
+          <p:spPr>
+            <a:xfrm>
+              <a:off x="5996393" y="3747710"/>
+              <a:ext cx="159783" cy="215444"/>
+            </a:xfrm>
+            <a:prstGeom prst="rect">
+              <a:avLst/>
+            </a:prstGeom>
+            <a:noFill/>
+          </p:spPr>
+          <p:txBody>
+            <a:bodyPr wrap="none" lIns="18000" tIns="0" rIns="18000" bIns="0" rtlCol="0">
+              <a:spAutoFit/>
+            </a:bodyPr>
+            <a:lstStyle/>
+            <a:p>
+              <a:r>
+                <a:rPr lang="fr-BE" sz="1400" noProof="1" smtClean="0"/>
+                <a:t>…</a:t>
+              </a:r>
+              <a:endParaRPr lang="fr-BE" sz="1400" noProof="1"/>
+            </a:p>
+          </p:txBody>
+        </p:sp>
+        <p:sp>
+          <p:nvSpPr>
+            <p:cNvPr id="72" name="ZoneTexte 71"/>
+            <p:cNvSpPr txBox="1"/>
+            <p:nvPr/>
+          </p:nvSpPr>
+          <p:spPr>
+            <a:xfrm>
+              <a:off x="5220072" y="3561586"/>
+              <a:ext cx="755784" cy="184666"/>
+            </a:xfrm>
+            <a:prstGeom prst="rect">
+              <a:avLst/>
+            </a:prstGeom>
+            <a:solidFill>
+              <a:schemeClr val="bg1"/>
+            </a:solidFill>
+          </p:spPr>
+          <p:txBody>
+            <a:bodyPr wrap="none" lIns="0" tIns="0" rIns="0" bIns="0" rtlCol="0">
+              <a:spAutoFit/>
+            </a:bodyPr>
+            <a:lstStyle/>
+            <a:p>
+              <a:r>
+                <a:rPr lang="fr-BE" sz="1200" noProof="1" smtClean="0"/>
+                <a:t>Schedule</a:t>
+              </a:r>
+              <a:r>
+                <a:rPr lang="fr-BE" sz="1200" baseline="-25000" noProof="1" smtClean="0"/>
+                <a:t>start</a:t>
+              </a:r>
+              <a:endParaRPr lang="fr-BE" sz="1200" baseline="-25000" noProof="1"/>
+            </a:p>
+          </p:txBody>
+        </p:sp>
+        <p:sp>
+          <p:nvSpPr>
+            <p:cNvPr id="73" name="ZoneTexte 72"/>
+            <p:cNvSpPr txBox="1"/>
+            <p:nvPr/>
+          </p:nvSpPr>
+          <p:spPr>
+            <a:xfrm>
+              <a:off x="5285999" y="4012684"/>
+              <a:ext cx="726161" cy="184666"/>
+            </a:xfrm>
+            <a:prstGeom prst="rect">
+              <a:avLst/>
+            </a:prstGeom>
+            <a:solidFill>
+              <a:schemeClr val="bg1"/>
+            </a:solidFill>
+          </p:spPr>
+          <p:txBody>
+            <a:bodyPr wrap="none" lIns="0" tIns="0" rIns="0" bIns="0" rtlCol="0">
+              <a:spAutoFit/>
+            </a:bodyPr>
+            <a:lstStyle/>
+            <a:p>
+              <a:r>
+                <a:rPr lang="fr-BE" sz="1200" noProof="1" smtClean="0"/>
+                <a:t>Schedule</a:t>
+              </a:r>
+              <a:r>
+                <a:rPr lang="fr-BE" sz="1200" baseline="-25000" noProof="1" smtClean="0"/>
+                <a:t>end</a:t>
+              </a:r>
+              <a:endParaRPr lang="fr-BE" sz="1200" baseline="-25000" noProof="1"/>
+            </a:p>
+          </p:txBody>
+        </p:sp>
+        <p:cxnSp>
+          <p:nvCxnSpPr>
+            <p:cNvPr id="74" name="Connecteur droit avec flèche 55"/>
+            <p:cNvCxnSpPr>
+              <a:stCxn id="29" idx="4"/>
+              <a:endCxn id="50" idx="0"/>
+            </p:cNvCxnSpPr>
+            <p:nvPr/>
+          </p:nvCxnSpPr>
+          <p:spPr>
+            <a:xfrm rot="5400000">
+              <a:off x="3907237" y="2974355"/>
+              <a:ext cx="636642" cy="537820"/>
+            </a:xfrm>
+            <a:prstGeom prst="bentConnector3">
+              <a:avLst>
+                <a:gd name="adj1" fmla="val 27259"/>
+              </a:avLst>
+            </a:prstGeom>
+            <a:ln w="22225">
+              <a:solidFill>
+                <a:schemeClr val="tx1"/>
+              </a:solidFill>
+              <a:tailEnd type="triangle" w="med" len="sm"/>
+            </a:ln>
+          </p:spPr>
+          <p:style>
+            <a:lnRef idx="1">
+              <a:schemeClr val="accent1"/>
+            </a:lnRef>
+            <a:fillRef idx="0">
+              <a:schemeClr val="accent1"/>
+            </a:fillRef>
+            <a:effectRef idx="0">
+              <a:schemeClr val="accent1"/>
+            </a:effectRef>
+            <a:fontRef idx="minor">
+              <a:schemeClr val="tx1"/>
+            </a:fontRef>
+          </p:style>
+        </p:cxnSp>
+        <p:cxnSp>
+          <p:nvCxnSpPr>
+            <p:cNvPr id="77" name="Connecteur droit avec flèche 55"/>
+            <p:cNvCxnSpPr>
+              <a:stCxn id="29" idx="4"/>
+              <a:endCxn id="64" idx="0"/>
+            </p:cNvCxnSpPr>
+            <p:nvPr/>
+          </p:nvCxnSpPr>
+          <p:spPr>
+            <a:xfrm rot="16200000" flipH="1">
+              <a:off x="4448939" y="2970473"/>
+              <a:ext cx="636642" cy="545584"/>
+            </a:xfrm>
+            <a:prstGeom prst="bentConnector3">
+              <a:avLst>
+                <a:gd name="adj1" fmla="val 27259"/>
+              </a:avLst>
+            </a:prstGeom>
+            <a:ln w="22225">
+              <a:solidFill>
+                <a:schemeClr val="tx1"/>
+              </a:solidFill>
+              <a:tailEnd type="triangle" w="med" len="sm"/>
+            </a:ln>
+          </p:spPr>
+          <p:style>
+            <a:lnRef idx="1">
+              <a:schemeClr val="accent1"/>
+            </a:lnRef>
+            <a:fillRef idx="0">
+              <a:schemeClr val="accent1"/>
+            </a:fillRef>
+            <a:effectRef idx="0">
+              <a:schemeClr val="accent1"/>
+            </a:effectRef>
+            <a:fontRef idx="minor">
+              <a:schemeClr val="tx1"/>
+            </a:fontRef>
+          </p:style>
+        </p:cxnSp>
+        <p:sp>
+          <p:nvSpPr>
+            <p:cNvPr id="86" name="ZoneTexte 85"/>
+            <p:cNvSpPr txBox="1"/>
+            <p:nvPr/>
+          </p:nvSpPr>
+          <p:spPr>
+            <a:xfrm flipH="1">
+              <a:off x="3621544" y="3178884"/>
+              <a:ext cx="664990" cy="215444"/>
+            </a:xfrm>
+            <a:prstGeom prst="rect">
+              <a:avLst/>
+            </a:prstGeom>
+            <a:solidFill>
+              <a:schemeClr val="bg1"/>
+            </a:solidFill>
+          </p:spPr>
+          <p:txBody>
+            <a:bodyPr wrap="none" lIns="0" tIns="0" rIns="0" bIns="0" rtlCol="0">
+              <a:spAutoFit/>
+            </a:bodyPr>
+            <a:lstStyle/>
+            <a:p>
+              <a:r>
+                <a:rPr lang="fr-BE" sz="1400" b="1" noProof="1" smtClean="0"/>
+                <a:t>[conflict]</a:t>
+              </a:r>
+              <a:endParaRPr lang="fr-BE" sz="1400" b="1" baseline="-25000" noProof="1"/>
+            </a:p>
+          </p:txBody>
+        </p:sp>
+        <p:sp>
+          <p:nvSpPr>
+            <p:cNvPr id="87" name="ZoneTexte 86"/>
+            <p:cNvSpPr txBox="1"/>
+            <p:nvPr/>
+          </p:nvSpPr>
+          <p:spPr>
+            <a:xfrm flipH="1">
+              <a:off x="4627116" y="3170381"/>
+              <a:ext cx="833305" cy="215444"/>
+            </a:xfrm>
+            <a:prstGeom prst="rect">
+              <a:avLst/>
+            </a:prstGeom>
+            <a:solidFill>
+              <a:schemeClr val="bg1"/>
+            </a:solidFill>
+          </p:spPr>
+          <p:txBody>
+            <a:bodyPr wrap="none" lIns="0" tIns="0" rIns="0" bIns="0" rtlCol="0">
+              <a:spAutoFit/>
+            </a:bodyPr>
+            <a:lstStyle/>
+            <a:p>
+              <a:r>
+                <a:rPr lang="fr-BE" sz="1400" b="1" noProof="1" smtClean="0"/>
+                <a:t>[</a:t>
+              </a:r>
+              <a:r>
+                <a:rPr lang="fr-BE" sz="1400" b="1" noProof="1" smtClean="0">
+                  <a:sym typeface="Symbol"/>
+                </a:rPr>
+                <a:t> </a:t>
+              </a:r>
+              <a:r>
+                <a:rPr lang="fr-BE" sz="1400" b="1" noProof="1" smtClean="0"/>
+                <a:t>conflict]</a:t>
+              </a:r>
+              <a:endParaRPr lang="fr-BE" sz="1400" b="1" baseline="-25000" noProof="1"/>
+            </a:p>
+          </p:txBody>
+        </p:sp>
+      </p:grpSp>
+      <p:grpSp>
+        <p:nvGrpSpPr>
+          <p:cNvPr id="157" name="Groupe 156"/>
+          <p:cNvGrpSpPr/>
+          <p:nvPr/>
+        </p:nvGrpSpPr>
+        <p:grpSpPr>
+          <a:xfrm>
+            <a:off x="2483768" y="5320258"/>
+            <a:ext cx="4464496" cy="1202303"/>
+            <a:chOff x="2483768" y="5320258"/>
+            <a:chExt cx="4464496" cy="1202303"/>
+          </a:xfrm>
+        </p:grpSpPr>
+        <p:sp>
+          <p:nvSpPr>
+            <p:cNvPr id="137" name="ZoneTexte 136"/>
+            <p:cNvSpPr txBox="1"/>
+            <p:nvPr/>
+          </p:nvSpPr>
+          <p:spPr>
+            <a:xfrm flipH="1">
+              <a:off x="3861445" y="6337895"/>
+              <a:ext cx="726161" cy="184666"/>
+            </a:xfrm>
+            <a:prstGeom prst="rect">
+              <a:avLst/>
+            </a:prstGeom>
+            <a:solidFill>
+              <a:schemeClr val="bg1"/>
+            </a:solidFill>
+          </p:spPr>
+          <p:txBody>
+            <a:bodyPr wrap="none" lIns="0" tIns="0" rIns="0" bIns="0" rtlCol="0">
+              <a:spAutoFit/>
+            </a:bodyPr>
+            <a:lstStyle/>
+            <a:p>
+              <a:r>
+                <a:rPr lang="fr-BE" sz="1200" noProof="1" smtClean="0"/>
+                <a:t>Schedule</a:t>
+              </a:r>
+              <a:r>
+                <a:rPr lang="fr-BE" sz="1200" baseline="-25000" noProof="1" smtClean="0"/>
+                <a:t>end</a:t>
+              </a:r>
+              <a:endParaRPr lang="fr-BE" sz="1200" baseline="-25000" noProof="1"/>
+            </a:p>
+          </p:txBody>
+        </p:sp>
+        <p:sp>
+          <p:nvSpPr>
+            <p:cNvPr id="126" name="ZoneTexte 125"/>
+            <p:cNvSpPr txBox="1"/>
+            <p:nvPr/>
+          </p:nvSpPr>
+          <p:spPr>
+            <a:xfrm flipH="1">
+              <a:off x="3933453" y="5920705"/>
+              <a:ext cx="718338" cy="184666"/>
+            </a:xfrm>
+            <a:prstGeom prst="rect">
+              <a:avLst/>
+            </a:prstGeom>
+            <a:solidFill>
+              <a:schemeClr val="bg1"/>
+            </a:solidFill>
+          </p:spPr>
+          <p:txBody>
+            <a:bodyPr wrap="none" lIns="0" tIns="0" rIns="0" bIns="0" rtlCol="0">
+              <a:spAutoFit/>
+            </a:bodyPr>
+            <a:lstStyle/>
+            <a:p>
+              <a:r>
+                <a:rPr lang="fr-BE" sz="1200" noProof="1" smtClean="0"/>
+                <a:t>Arbitrate</a:t>
+              </a:r>
+              <a:r>
+                <a:rPr lang="fr-BE" sz="1200" baseline="-25000" noProof="1" smtClean="0"/>
+                <a:t>end</a:t>
+              </a:r>
+              <a:endParaRPr lang="fr-BE" sz="1200" baseline="-25000" noProof="1"/>
+            </a:p>
+          </p:txBody>
+        </p:sp>
+        <p:sp>
+          <p:nvSpPr>
+            <p:cNvPr id="93" name="Ellipse 92"/>
+            <p:cNvSpPr/>
+            <p:nvPr/>
+          </p:nvSpPr>
+          <p:spPr>
+            <a:xfrm flipH="1">
+              <a:off x="2627784" y="5824314"/>
+              <a:ext cx="216024" cy="216024"/>
+            </a:xfrm>
+            <a:prstGeom prst="ellipse">
+              <a:avLst/>
+            </a:prstGeom>
+            <a:ln w="22225"/>
+          </p:spPr>
+          <p:style>
+            <a:lnRef idx="2">
+              <a:schemeClr val="dk1"/>
+            </a:lnRef>
+            <a:fillRef idx="1">
+              <a:schemeClr val="lt1"/>
+            </a:fillRef>
+            <a:effectRef idx="0">
+              <a:schemeClr val="dk1"/>
+            </a:effectRef>
+            <a:fontRef idx="minor">
+              <a:schemeClr val="dk1"/>
+            </a:fontRef>
+          </p:style>
+          <p:txBody>
+            <a:bodyPr rtlCol="0" anchor="ctr"/>
+            <a:lstStyle/>
+            <a:p>
+              <a:pPr algn="ctr"/>
+              <a:endParaRPr lang="fr-BE" noProof="1"/>
+            </a:p>
+          </p:txBody>
+        </p:sp>
+        <p:sp>
+          <p:nvSpPr>
+            <p:cNvPr id="94" name="Ellipse 93"/>
+            <p:cNvSpPr/>
+            <p:nvPr/>
+          </p:nvSpPr>
+          <p:spPr>
+            <a:xfrm flipH="1">
+              <a:off x="3347864" y="5464274"/>
+              <a:ext cx="216024" cy="216024"/>
+            </a:xfrm>
+            <a:prstGeom prst="ellipse">
+              <a:avLst/>
+            </a:prstGeom>
+            <a:ln w="22225"/>
+          </p:spPr>
+          <p:style>
+            <a:lnRef idx="2">
+              <a:schemeClr val="dk1"/>
+            </a:lnRef>
+            <a:fillRef idx="1">
+              <a:schemeClr val="lt1"/>
+            </a:fillRef>
+            <a:effectRef idx="0">
+              <a:schemeClr val="dk1"/>
+            </a:effectRef>
+            <a:fontRef idx="minor">
+              <a:schemeClr val="dk1"/>
+            </a:fontRef>
+          </p:style>
+          <p:txBody>
+            <a:bodyPr rtlCol="0" anchor="ctr"/>
+            <a:lstStyle/>
+            <a:p>
+              <a:pPr algn="ctr"/>
+              <a:endParaRPr lang="fr-BE" noProof="1"/>
+            </a:p>
+          </p:txBody>
+        </p:sp>
+        <p:sp>
+          <p:nvSpPr>
+            <p:cNvPr id="95" name="Ellipse 94"/>
+            <p:cNvSpPr/>
+            <p:nvPr/>
+          </p:nvSpPr>
+          <p:spPr>
+            <a:xfrm flipH="1">
+              <a:off x="3851920" y="5464274"/>
+              <a:ext cx="216024" cy="216024"/>
+            </a:xfrm>
+            <a:prstGeom prst="ellipse">
+              <a:avLst/>
+            </a:prstGeom>
+            <a:ln w="22225"/>
+          </p:spPr>
+          <p:style>
+            <a:lnRef idx="2">
+              <a:schemeClr val="dk1"/>
+            </a:lnRef>
+            <a:fillRef idx="1">
+              <a:schemeClr val="lt1"/>
+            </a:fillRef>
+            <a:effectRef idx="0">
+              <a:schemeClr val="dk1"/>
+            </a:effectRef>
+            <a:fontRef idx="minor">
+              <a:schemeClr val="dk1"/>
+            </a:fontRef>
+          </p:style>
+          <p:txBody>
+            <a:bodyPr rtlCol="0" anchor="ctr"/>
+            <a:lstStyle/>
+            <a:p>
+              <a:pPr algn="ctr"/>
+              <a:endParaRPr lang="fr-BE" noProof="1"/>
+            </a:p>
+          </p:txBody>
+        </p:sp>
+        <p:cxnSp>
+          <p:nvCxnSpPr>
+            <p:cNvPr id="96" name="Connecteur droit avec flèche 55"/>
+            <p:cNvCxnSpPr>
+              <a:stCxn id="93" idx="2"/>
+              <a:endCxn id="94" idx="6"/>
+            </p:cNvCxnSpPr>
+            <p:nvPr/>
+          </p:nvCxnSpPr>
+          <p:spPr>
+            <a:xfrm flipV="1">
+              <a:off x="2843808" y="5572286"/>
+              <a:ext cx="504056" cy="360040"/>
+            </a:xfrm>
+            <a:prstGeom prst="straightConnector1">
+              <a:avLst/>
+            </a:prstGeom>
+            <a:ln w="22225">
+              <a:solidFill>
+                <a:schemeClr val="tx1"/>
+              </a:solidFill>
+              <a:tailEnd type="triangle" w="med" len="sm"/>
+            </a:ln>
+          </p:spPr>
+          <p:style>
+            <a:lnRef idx="1">
+              <a:schemeClr val="accent1"/>
+            </a:lnRef>
+            <a:fillRef idx="0">
+              <a:schemeClr val="accent1"/>
+            </a:fillRef>
+            <a:effectRef idx="0">
+              <a:schemeClr val="accent1"/>
+            </a:effectRef>
+            <a:fontRef idx="minor">
+              <a:schemeClr val="tx1"/>
+            </a:fontRef>
+          </p:style>
+        </p:cxnSp>
+        <p:cxnSp>
+          <p:nvCxnSpPr>
+            <p:cNvPr id="99" name="Connecteur droit avec flèche 55"/>
+            <p:cNvCxnSpPr>
+              <a:stCxn id="94" idx="2"/>
+              <a:endCxn id="95" idx="6"/>
+            </p:cNvCxnSpPr>
+            <p:nvPr/>
+          </p:nvCxnSpPr>
+          <p:spPr>
+            <a:xfrm>
+              <a:off x="3563888" y="5572286"/>
+              <a:ext cx="288032" cy="1588"/>
+            </a:xfrm>
+            <a:prstGeom prst="curvedConnector3">
+              <a:avLst>
+                <a:gd name="adj1" fmla="val 50000"/>
+              </a:avLst>
+            </a:prstGeom>
+            <a:ln w="22225">
+              <a:solidFill>
+                <a:schemeClr val="tx1"/>
+              </a:solidFill>
+              <a:tailEnd type="triangle" w="med" len="sm"/>
+            </a:ln>
+          </p:spPr>
+          <p:style>
+            <a:lnRef idx="1">
+              <a:schemeClr val="accent1"/>
+            </a:lnRef>
+            <a:fillRef idx="0">
+              <a:schemeClr val="accent1"/>
+            </a:fillRef>
+            <a:effectRef idx="0">
+              <a:schemeClr val="accent1"/>
+            </a:effectRef>
+            <a:fontRef idx="minor">
+              <a:schemeClr val="tx1"/>
+            </a:fontRef>
+          </p:style>
+        </p:cxnSp>
+        <p:sp>
+          <p:nvSpPr>
+            <p:cNvPr id="102" name="ZoneTexte 101"/>
+            <p:cNvSpPr txBox="1"/>
+            <p:nvPr/>
+          </p:nvSpPr>
+          <p:spPr>
+            <a:xfrm>
+              <a:off x="2555776" y="5495632"/>
+              <a:ext cx="617926" cy="184666"/>
+            </a:xfrm>
+            <a:prstGeom prst="rect">
+              <a:avLst/>
+            </a:prstGeom>
+            <a:solidFill>
+              <a:schemeClr val="bg1"/>
+            </a:solidFill>
+          </p:spPr>
+          <p:txBody>
+            <a:bodyPr wrap="none" lIns="0" tIns="0" rIns="0" bIns="0" rtlCol="0">
+              <a:spAutoFit/>
+            </a:bodyPr>
+            <a:lstStyle/>
+            <a:p>
+              <a:r>
+                <a:rPr lang="fr-BE" sz="1200" noProof="1" smtClean="0"/>
+                <a:t>Collect</a:t>
+              </a:r>
+              <a:r>
+                <a:rPr lang="fr-BE" sz="1200" baseline="-25000" noProof="1" smtClean="0"/>
+                <a:t>start</a:t>
+              </a:r>
+              <a:endParaRPr lang="fr-BE" sz="1200" baseline="-25000" noProof="1"/>
+            </a:p>
+          </p:txBody>
+        </p:sp>
+        <p:sp>
+          <p:nvSpPr>
+            <p:cNvPr id="103" name="Ellipse 102"/>
+            <p:cNvSpPr/>
+            <p:nvPr/>
+          </p:nvSpPr>
+          <p:spPr>
+            <a:xfrm flipH="1">
+              <a:off x="4788024" y="5464274"/>
+              <a:ext cx="216024" cy="216024"/>
+            </a:xfrm>
+            <a:prstGeom prst="ellipse">
+              <a:avLst/>
+            </a:prstGeom>
+            <a:ln w="22225"/>
+          </p:spPr>
+          <p:style>
+            <a:lnRef idx="2">
+              <a:schemeClr val="dk1"/>
+            </a:lnRef>
+            <a:fillRef idx="1">
+              <a:schemeClr val="lt1"/>
+            </a:fillRef>
+            <a:effectRef idx="0">
+              <a:schemeClr val="dk1"/>
+            </a:effectRef>
+            <a:fontRef idx="minor">
+              <a:schemeClr val="dk1"/>
+            </a:fontRef>
+          </p:style>
+          <p:txBody>
+            <a:bodyPr rtlCol="0" anchor="ctr"/>
+            <a:lstStyle/>
+            <a:p>
+              <a:pPr algn="ctr"/>
+              <a:endParaRPr lang="fr-BE" noProof="1"/>
+            </a:p>
+          </p:txBody>
+        </p:sp>
+        <p:cxnSp>
+          <p:nvCxnSpPr>
+            <p:cNvPr id="104" name="Connecteur droit avec flèche 55"/>
+            <p:cNvCxnSpPr>
+              <a:stCxn id="95" idx="2"/>
+              <a:endCxn id="103" idx="6"/>
+            </p:cNvCxnSpPr>
+            <p:nvPr/>
+          </p:nvCxnSpPr>
+          <p:spPr>
+            <a:xfrm>
+              <a:off x="4067944" y="5572286"/>
+              <a:ext cx="720080" cy="1588"/>
+            </a:xfrm>
+            <a:prstGeom prst="curvedConnector3">
+              <a:avLst>
+                <a:gd name="adj1" fmla="val 50000"/>
+              </a:avLst>
+            </a:prstGeom>
+            <a:ln w="22225">
+              <a:solidFill>
+                <a:schemeClr val="tx1"/>
+              </a:solidFill>
+              <a:tailEnd type="triangle" w="med" len="sm"/>
+            </a:ln>
+          </p:spPr>
+          <p:style>
+            <a:lnRef idx="1">
+              <a:schemeClr val="accent1"/>
+            </a:lnRef>
+            <a:fillRef idx="0">
+              <a:schemeClr val="accent1"/>
+            </a:fillRef>
+            <a:effectRef idx="0">
+              <a:schemeClr val="accent1"/>
+            </a:effectRef>
+            <a:fontRef idx="minor">
+              <a:schemeClr val="tx1"/>
+            </a:fontRef>
+          </p:style>
+        </p:cxnSp>
+        <p:sp>
+          <p:nvSpPr>
+            <p:cNvPr id="107" name="ZoneTexte 106"/>
+            <p:cNvSpPr txBox="1"/>
+            <p:nvPr/>
+          </p:nvSpPr>
+          <p:spPr>
+            <a:xfrm>
+              <a:off x="4116681" y="5367883"/>
+              <a:ext cx="586635" cy="184666"/>
+            </a:xfrm>
+            <a:prstGeom prst="rect">
+              <a:avLst/>
+            </a:prstGeom>
+            <a:solidFill>
+              <a:schemeClr val="bg1"/>
+            </a:solidFill>
+          </p:spPr>
+          <p:txBody>
+            <a:bodyPr wrap="none" lIns="0" tIns="0" rIns="0" bIns="0" rtlCol="0">
+              <a:spAutoFit/>
+            </a:bodyPr>
+            <a:lstStyle/>
+            <a:p>
+              <a:r>
+                <a:rPr lang="fr-BE" sz="1200" noProof="1" smtClean="0"/>
+                <a:t>Collect</a:t>
+              </a:r>
+              <a:r>
+                <a:rPr lang="fr-BE" sz="1200" baseline="-25000" noProof="1" smtClean="0"/>
+                <a:t>end</a:t>
+              </a:r>
+              <a:endParaRPr lang="fr-BE" sz="1200" baseline="-25000" noProof="1"/>
+            </a:p>
+          </p:txBody>
+        </p:sp>
+        <p:sp>
+          <p:nvSpPr>
+            <p:cNvPr id="108" name="Ellipse 107"/>
+            <p:cNvSpPr/>
+            <p:nvPr/>
+          </p:nvSpPr>
+          <p:spPr>
+            <a:xfrm flipH="1">
+              <a:off x="5940152" y="5464274"/>
+              <a:ext cx="216024" cy="216024"/>
+            </a:xfrm>
+            <a:prstGeom prst="ellipse">
+              <a:avLst/>
+            </a:prstGeom>
+            <a:ln w="22225"/>
+          </p:spPr>
+          <p:style>
+            <a:lnRef idx="2">
+              <a:schemeClr val="dk1"/>
+            </a:lnRef>
+            <a:fillRef idx="1">
+              <a:schemeClr val="lt1"/>
+            </a:fillRef>
+            <a:effectRef idx="0">
+              <a:schemeClr val="dk1"/>
+            </a:effectRef>
+            <a:fontRef idx="minor">
+              <a:schemeClr val="dk1"/>
+            </a:fontRef>
+          </p:style>
+          <p:txBody>
+            <a:bodyPr rtlCol="0" anchor="ctr"/>
+            <a:lstStyle/>
+            <a:p>
+              <a:pPr algn="ctr"/>
+              <a:endParaRPr lang="fr-BE" noProof="1"/>
+            </a:p>
+          </p:txBody>
+        </p:sp>
+        <p:cxnSp>
+          <p:nvCxnSpPr>
+            <p:cNvPr id="109" name="Connecteur droit avec flèche 55"/>
+            <p:cNvCxnSpPr>
+              <a:stCxn id="103" idx="2"/>
+              <a:endCxn id="108" idx="6"/>
+            </p:cNvCxnSpPr>
+            <p:nvPr/>
+          </p:nvCxnSpPr>
+          <p:spPr>
+            <a:xfrm>
+              <a:off x="5004048" y="5572286"/>
+              <a:ext cx="936104" cy="1588"/>
+            </a:xfrm>
+            <a:prstGeom prst="curvedConnector3">
+              <a:avLst>
+                <a:gd name="adj1" fmla="val 50000"/>
+              </a:avLst>
+            </a:prstGeom>
+            <a:ln w="22225">
+              <a:solidFill>
+                <a:schemeClr val="tx1"/>
+              </a:solidFill>
+              <a:tailEnd type="triangle" w="med" len="sm"/>
+            </a:ln>
+          </p:spPr>
+          <p:style>
+            <a:lnRef idx="1">
+              <a:schemeClr val="accent1"/>
+            </a:lnRef>
+            <a:fillRef idx="0">
+              <a:schemeClr val="accent1"/>
+            </a:fillRef>
+            <a:effectRef idx="0">
+              <a:schemeClr val="accent1"/>
+            </a:effectRef>
+            <a:fontRef idx="minor">
+              <a:schemeClr val="tx1"/>
+            </a:fontRef>
+          </p:style>
+        </p:cxnSp>
+        <p:sp>
+          <p:nvSpPr>
+            <p:cNvPr id="111" name="ZoneTexte 110"/>
+            <p:cNvSpPr txBox="1"/>
+            <p:nvPr/>
+          </p:nvSpPr>
+          <p:spPr>
+            <a:xfrm flipH="1">
+              <a:off x="5042148" y="5367883"/>
+              <a:ext cx="747962" cy="184666"/>
+            </a:xfrm>
+            <a:prstGeom prst="rect">
+              <a:avLst/>
+            </a:prstGeom>
+            <a:solidFill>
+              <a:schemeClr val="bg1"/>
+            </a:solidFill>
+          </p:spPr>
+          <p:txBody>
+            <a:bodyPr wrap="none" lIns="0" tIns="0" rIns="0" bIns="0" rtlCol="0">
+              <a:spAutoFit/>
+            </a:bodyPr>
+            <a:lstStyle/>
+            <a:p>
+              <a:r>
+                <a:rPr lang="fr-BE" sz="1200" noProof="1" smtClean="0"/>
+                <a:t>Arbitrate</a:t>
+              </a:r>
+              <a:r>
+                <a:rPr lang="fr-BE" sz="1200" baseline="-25000" noProof="1" smtClean="0"/>
+                <a:t>start</a:t>
+              </a:r>
+              <a:endParaRPr lang="fr-BE" sz="1200" baseline="-25000" noProof="1"/>
+            </a:p>
+          </p:txBody>
+        </p:sp>
+        <p:sp>
+          <p:nvSpPr>
+            <p:cNvPr id="112" name="Ellipse 111"/>
+            <p:cNvSpPr/>
+            <p:nvPr/>
+          </p:nvSpPr>
+          <p:spPr>
+            <a:xfrm flipH="1">
+              <a:off x="5148064" y="5824314"/>
+              <a:ext cx="216024" cy="216024"/>
+            </a:xfrm>
+            <a:prstGeom prst="ellipse">
+              <a:avLst/>
+            </a:prstGeom>
+            <a:ln w="22225"/>
+          </p:spPr>
+          <p:style>
+            <a:lnRef idx="2">
+              <a:schemeClr val="dk1"/>
+            </a:lnRef>
+            <a:fillRef idx="1">
+              <a:schemeClr val="lt1"/>
+            </a:fillRef>
+            <a:effectRef idx="0">
+              <a:schemeClr val="dk1"/>
+            </a:effectRef>
+            <a:fontRef idx="minor">
+              <a:schemeClr val="dk1"/>
+            </a:fontRef>
+          </p:style>
+          <p:txBody>
+            <a:bodyPr rtlCol="0" anchor="ctr"/>
+            <a:lstStyle/>
+            <a:p>
+              <a:pPr algn="ctr"/>
+              <a:endParaRPr lang="fr-BE" noProof="1"/>
+            </a:p>
+          </p:txBody>
+        </p:sp>
+        <p:cxnSp>
+          <p:nvCxnSpPr>
+            <p:cNvPr id="113" name="Connecteur droit avec flèche 55"/>
+            <p:cNvCxnSpPr>
+              <a:stCxn id="108" idx="4"/>
+              <a:endCxn id="112" idx="2"/>
+            </p:cNvCxnSpPr>
+            <p:nvPr/>
+          </p:nvCxnSpPr>
+          <p:spPr>
+            <a:xfrm rot="5400000">
+              <a:off x="5580112" y="5464274"/>
+              <a:ext cx="252028" cy="684076"/>
+            </a:xfrm>
+            <a:prstGeom prst="curvedConnector2">
+              <a:avLst/>
+            </a:prstGeom>
+            <a:ln w="22225">
+              <a:solidFill>
+                <a:schemeClr val="tx1"/>
+              </a:solidFill>
+              <a:tailEnd type="triangle" w="med" len="sm"/>
+            </a:ln>
+          </p:spPr>
+          <p:style>
+            <a:lnRef idx="1">
+              <a:schemeClr val="accent1"/>
+            </a:lnRef>
+            <a:fillRef idx="0">
+              <a:schemeClr val="accent1"/>
+            </a:fillRef>
+            <a:effectRef idx="0">
+              <a:schemeClr val="accent1"/>
+            </a:effectRef>
+            <a:fontRef idx="minor">
+              <a:schemeClr val="tx1"/>
+            </a:fontRef>
+          </p:style>
+        </p:cxnSp>
+        <p:sp>
+          <p:nvSpPr>
+            <p:cNvPr id="116" name="ZoneTexte 115"/>
+            <p:cNvSpPr txBox="1"/>
+            <p:nvPr/>
+          </p:nvSpPr>
+          <p:spPr>
+            <a:xfrm flipH="1">
+              <a:off x="3635896" y="5320258"/>
+              <a:ext cx="159783" cy="215444"/>
+            </a:xfrm>
+            <a:prstGeom prst="rect">
+              <a:avLst/>
+            </a:prstGeom>
+            <a:noFill/>
+          </p:spPr>
+          <p:txBody>
+            <a:bodyPr wrap="none" lIns="18000" tIns="0" rIns="18000" bIns="0" rtlCol="0">
+              <a:spAutoFit/>
+            </a:bodyPr>
+            <a:lstStyle/>
+            <a:p>
+              <a:r>
+                <a:rPr lang="fr-BE" sz="1400" noProof="1" smtClean="0"/>
+                <a:t>…</a:t>
+              </a:r>
+              <a:endParaRPr lang="fr-BE" sz="1400" noProof="1"/>
+            </a:p>
+          </p:txBody>
+        </p:sp>
+        <p:sp>
+          <p:nvSpPr>
+            <p:cNvPr id="117" name="ZoneTexte 116"/>
+            <p:cNvSpPr txBox="1"/>
+            <p:nvPr/>
+          </p:nvSpPr>
+          <p:spPr>
+            <a:xfrm flipH="1">
+              <a:off x="5580112" y="5689823"/>
+              <a:ext cx="159783" cy="215444"/>
+            </a:xfrm>
+            <a:prstGeom prst="rect">
+              <a:avLst/>
+            </a:prstGeom>
+            <a:noFill/>
+          </p:spPr>
+          <p:txBody>
+            <a:bodyPr wrap="none" lIns="18000" tIns="0" rIns="18000" bIns="0" rtlCol="0">
+              <a:spAutoFit/>
+            </a:bodyPr>
+            <a:lstStyle/>
+            <a:p>
+              <a:r>
+                <a:rPr lang="fr-BE" sz="1400" noProof="1" smtClean="0"/>
+                <a:t>…</a:t>
+              </a:r>
+              <a:endParaRPr lang="fr-BE" sz="1400" noProof="1"/>
+            </a:p>
+          </p:txBody>
+        </p:sp>
+        <p:cxnSp>
+          <p:nvCxnSpPr>
+            <p:cNvPr id="118" name="Connecteur droit avec flèche 55"/>
+            <p:cNvCxnSpPr>
+              <a:stCxn id="112" idx="6"/>
+              <a:endCxn id="93" idx="2"/>
+            </p:cNvCxnSpPr>
+            <p:nvPr/>
+          </p:nvCxnSpPr>
+          <p:spPr>
+            <a:xfrm rot="10800000">
+              <a:off x="2843808" y="5932326"/>
+              <a:ext cx="2304256" cy="1588"/>
+            </a:xfrm>
+            <a:prstGeom prst="straightConnector1">
+              <a:avLst/>
+            </a:prstGeom>
+            <a:ln w="22225">
+              <a:solidFill>
+                <a:schemeClr val="tx1"/>
+              </a:solidFill>
+              <a:tailEnd type="triangle" w="med" len="sm"/>
+            </a:ln>
+          </p:spPr>
+          <p:style>
+            <a:lnRef idx="1">
+              <a:schemeClr val="accent1"/>
+            </a:lnRef>
+            <a:fillRef idx="0">
+              <a:schemeClr val="accent1"/>
+            </a:fillRef>
+            <a:effectRef idx="0">
+              <a:schemeClr val="accent1"/>
+            </a:effectRef>
+            <a:fontRef idx="minor">
+              <a:schemeClr val="tx1"/>
+            </a:fontRef>
+          </p:style>
+        </p:cxnSp>
+        <p:sp>
+          <p:nvSpPr>
+            <p:cNvPr id="132" name="Ellipse 131"/>
+            <p:cNvSpPr/>
+            <p:nvPr/>
+          </p:nvSpPr>
+          <p:spPr>
+            <a:xfrm flipH="1">
+              <a:off x="3275856" y="6237312"/>
+              <a:ext cx="216024" cy="216024"/>
+            </a:xfrm>
+            <a:prstGeom prst="ellipse">
+              <a:avLst/>
+            </a:prstGeom>
+            <a:ln w="22225"/>
+          </p:spPr>
+          <p:style>
+            <a:lnRef idx="2">
+              <a:schemeClr val="dk1"/>
+            </a:lnRef>
+            <a:fillRef idx="1">
+              <a:schemeClr val="lt1"/>
+            </a:fillRef>
+            <a:effectRef idx="0">
+              <a:schemeClr val="dk1"/>
+            </a:effectRef>
+            <a:fontRef idx="minor">
+              <a:schemeClr val="dk1"/>
+            </a:fontRef>
+          </p:style>
+          <p:txBody>
+            <a:bodyPr rtlCol="0" anchor="ctr"/>
+            <a:lstStyle/>
+            <a:p>
+              <a:pPr algn="ctr"/>
+              <a:endParaRPr lang="fr-BE" noProof="1"/>
+            </a:p>
+          </p:txBody>
+        </p:sp>
+        <p:sp>
+          <p:nvSpPr>
+            <p:cNvPr id="133" name="Ellipse 132"/>
+            <p:cNvSpPr/>
+            <p:nvPr/>
+          </p:nvSpPr>
+          <p:spPr>
+            <a:xfrm flipH="1">
+              <a:off x="5220072" y="6237312"/>
+              <a:ext cx="216024" cy="216024"/>
+            </a:xfrm>
+            <a:prstGeom prst="ellipse">
+              <a:avLst/>
+            </a:prstGeom>
+            <a:ln w="22225"/>
+          </p:spPr>
+          <p:style>
+            <a:lnRef idx="2">
+              <a:schemeClr val="dk1"/>
+            </a:lnRef>
+            <a:fillRef idx="1">
+              <a:schemeClr val="lt1"/>
+            </a:fillRef>
+            <a:effectRef idx="0">
+              <a:schemeClr val="dk1"/>
+            </a:effectRef>
+            <a:fontRef idx="minor">
+              <a:schemeClr val="dk1"/>
+            </a:fontRef>
+          </p:style>
+          <p:txBody>
+            <a:bodyPr rtlCol="0" anchor="ctr"/>
+            <a:lstStyle/>
+            <a:p>
+              <a:pPr algn="ctr"/>
+              <a:endParaRPr lang="fr-BE" noProof="1"/>
+            </a:p>
+          </p:txBody>
+        </p:sp>
+        <p:cxnSp>
+          <p:nvCxnSpPr>
+            <p:cNvPr id="134" name="Connecteur droit avec flèche 55"/>
+            <p:cNvCxnSpPr>
+              <a:stCxn id="140" idx="5"/>
+              <a:endCxn id="133" idx="2"/>
+            </p:cNvCxnSpPr>
+            <p:nvPr/>
+          </p:nvCxnSpPr>
+          <p:spPr>
+            <a:xfrm rot="5400000">
+              <a:off x="5598114" y="6043658"/>
+              <a:ext cx="139648" cy="463684"/>
+            </a:xfrm>
+            <a:prstGeom prst="curvedConnector2">
+              <a:avLst/>
+            </a:prstGeom>
+            <a:ln w="22225">
+              <a:solidFill>
+                <a:schemeClr val="tx1"/>
+              </a:solidFill>
+              <a:tailEnd type="triangle" w="med" len="sm"/>
+            </a:ln>
+          </p:spPr>
+          <p:style>
+            <a:lnRef idx="1">
+              <a:schemeClr val="accent1"/>
+            </a:lnRef>
+            <a:fillRef idx="0">
+              <a:schemeClr val="accent1"/>
+            </a:fillRef>
+            <a:effectRef idx="0">
+              <a:schemeClr val="accent1"/>
+            </a:effectRef>
+            <a:fontRef idx="minor">
+              <a:schemeClr val="tx1"/>
+            </a:fontRef>
+          </p:style>
+        </p:cxnSp>
+        <p:sp>
+          <p:nvSpPr>
+            <p:cNvPr id="135" name="ZoneTexte 134"/>
+            <p:cNvSpPr txBox="1"/>
+            <p:nvPr/>
+          </p:nvSpPr>
+          <p:spPr>
+            <a:xfrm flipH="1">
+              <a:off x="5652120" y="6231979"/>
+              <a:ext cx="159783" cy="215444"/>
+            </a:xfrm>
+            <a:prstGeom prst="rect">
+              <a:avLst/>
+            </a:prstGeom>
+            <a:noFill/>
+          </p:spPr>
+          <p:txBody>
+            <a:bodyPr wrap="none" lIns="18000" tIns="0" rIns="18000" bIns="0" rtlCol="0">
+              <a:spAutoFit/>
+            </a:bodyPr>
+            <a:lstStyle/>
+            <a:p>
+              <a:r>
+                <a:rPr lang="fr-BE" sz="1400" noProof="1" smtClean="0"/>
+                <a:t>…</a:t>
+              </a:r>
+              <a:endParaRPr lang="fr-BE" sz="1400" noProof="1"/>
+            </a:p>
+          </p:txBody>
+        </p:sp>
+        <p:cxnSp>
+          <p:nvCxnSpPr>
+            <p:cNvPr id="136" name="Connecteur droit avec flèche 55"/>
+            <p:cNvCxnSpPr>
+              <a:stCxn id="133" idx="6"/>
+              <a:endCxn id="132" idx="2"/>
+            </p:cNvCxnSpPr>
+            <p:nvPr/>
+          </p:nvCxnSpPr>
+          <p:spPr>
+            <a:xfrm rot="10800000">
+              <a:off x="3491880" y="6345324"/>
+              <a:ext cx="1728192" cy="1588"/>
+            </a:xfrm>
+            <a:prstGeom prst="straightConnector1">
+              <a:avLst/>
+            </a:prstGeom>
+            <a:ln w="22225">
+              <a:solidFill>
+                <a:schemeClr val="tx1"/>
+              </a:solidFill>
+              <a:tailEnd type="triangle" w="med" len="sm"/>
+            </a:ln>
+          </p:spPr>
+          <p:style>
+            <a:lnRef idx="1">
+              <a:schemeClr val="accent1"/>
+            </a:lnRef>
+            <a:fillRef idx="0">
+              <a:schemeClr val="accent1"/>
+            </a:fillRef>
+            <a:effectRef idx="0">
+              <a:schemeClr val="accent1"/>
+            </a:effectRef>
+            <a:fontRef idx="minor">
+              <a:schemeClr val="tx1"/>
+            </a:fontRef>
+          </p:style>
+        </p:cxnSp>
+        <p:sp>
+          <p:nvSpPr>
+            <p:cNvPr id="140" name="Ellipse 139"/>
+            <p:cNvSpPr/>
+            <p:nvPr/>
+          </p:nvSpPr>
+          <p:spPr>
+            <a:xfrm flipH="1">
+              <a:off x="5868144" y="6021288"/>
+              <a:ext cx="216024" cy="216024"/>
+            </a:xfrm>
+            <a:prstGeom prst="ellipse">
+              <a:avLst/>
+            </a:prstGeom>
+            <a:ln w="22225"/>
+          </p:spPr>
+          <p:style>
+            <a:lnRef idx="2">
+              <a:schemeClr val="dk1"/>
+            </a:lnRef>
+            <a:fillRef idx="1">
+              <a:schemeClr val="lt1"/>
+            </a:fillRef>
+            <a:effectRef idx="0">
+              <a:schemeClr val="dk1"/>
+            </a:effectRef>
+            <a:fontRef idx="minor">
+              <a:schemeClr val="dk1"/>
+            </a:fontRef>
+          </p:style>
+          <p:txBody>
+            <a:bodyPr rtlCol="0" anchor="ctr"/>
+            <a:lstStyle/>
+            <a:p>
+              <a:pPr algn="ctr"/>
+              <a:endParaRPr lang="fr-BE" noProof="1"/>
+            </a:p>
+          </p:txBody>
+        </p:sp>
+        <p:cxnSp>
+          <p:nvCxnSpPr>
+            <p:cNvPr id="142" name="Connecteur droit avec flèche 55"/>
+            <p:cNvCxnSpPr>
+              <a:stCxn id="108" idx="3"/>
+              <a:endCxn id="140" idx="1"/>
+            </p:cNvCxnSpPr>
+            <p:nvPr/>
+          </p:nvCxnSpPr>
+          <p:spPr>
+            <a:xfrm rot="5400000">
+              <a:off x="5886405" y="5814789"/>
+              <a:ext cx="404262" cy="72008"/>
+            </a:xfrm>
+            <a:prstGeom prst="curvedConnector3">
+              <a:avLst>
+                <a:gd name="adj1" fmla="val 50000"/>
+              </a:avLst>
+            </a:prstGeom>
+            <a:ln w="22225">
+              <a:solidFill>
+                <a:schemeClr val="tx1"/>
+              </a:solidFill>
+              <a:tailEnd type="triangle" w="med" len="sm"/>
+            </a:ln>
+          </p:spPr>
+          <p:style>
+            <a:lnRef idx="1">
+              <a:schemeClr val="accent1"/>
+            </a:lnRef>
+            <a:fillRef idx="0">
+              <a:schemeClr val="accent1"/>
+            </a:fillRef>
+            <a:effectRef idx="0">
+              <a:schemeClr val="accent1"/>
+            </a:effectRef>
+            <a:fontRef idx="minor">
+              <a:schemeClr val="tx1"/>
+            </a:fontRef>
+          </p:style>
+        </p:cxnSp>
+        <p:sp>
+          <p:nvSpPr>
+            <p:cNvPr id="147" name="ZoneTexte 146"/>
+            <p:cNvSpPr txBox="1"/>
+            <p:nvPr/>
+          </p:nvSpPr>
+          <p:spPr>
+            <a:xfrm flipH="1">
+              <a:off x="6192480" y="5805264"/>
+              <a:ext cx="755784" cy="184666"/>
+            </a:xfrm>
+            <a:prstGeom prst="rect">
+              <a:avLst/>
+            </a:prstGeom>
+            <a:solidFill>
+              <a:schemeClr val="bg1"/>
+            </a:solidFill>
+          </p:spPr>
+          <p:txBody>
+            <a:bodyPr wrap="none" lIns="0" tIns="0" rIns="0" bIns="0" rtlCol="0">
+              <a:spAutoFit/>
+            </a:bodyPr>
+            <a:lstStyle/>
+            <a:p>
+              <a:r>
+                <a:rPr lang="fr-BE" sz="1200" noProof="1" smtClean="0"/>
+                <a:t>Schedule</a:t>
+              </a:r>
+              <a:r>
+                <a:rPr lang="fr-BE" sz="1200" baseline="-25000" noProof="1" smtClean="0"/>
+                <a:t>start</a:t>
+              </a:r>
+              <a:endParaRPr lang="fr-BE" sz="1200" baseline="-25000" noProof="1"/>
+            </a:p>
+          </p:txBody>
+        </p:sp>
+        <p:cxnSp>
+          <p:nvCxnSpPr>
+            <p:cNvPr id="150" name="Connecteur droit avec flèche 7"/>
+            <p:cNvCxnSpPr>
+              <a:endCxn id="93" idx="5"/>
+            </p:cNvCxnSpPr>
+            <p:nvPr/>
+          </p:nvCxnSpPr>
+          <p:spPr>
+            <a:xfrm flipV="1">
+              <a:off x="2483768" y="6008702"/>
+              <a:ext cx="175652" cy="156602"/>
+            </a:xfrm>
+            <a:prstGeom prst="straightConnector1">
+              <a:avLst/>
+            </a:prstGeom>
+            <a:ln w="22225">
+              <a:tailEnd type="triangle" w="med" len="lg"/>
+            </a:ln>
+          </p:spPr>
+          <p:style>
+            <a:lnRef idx="1">
+              <a:schemeClr val="dk1"/>
+            </a:lnRef>
+            <a:fillRef idx="0">
+              <a:schemeClr val="dk1"/>
+            </a:fillRef>
+            <a:effectRef idx="0">
+              <a:schemeClr val="dk1"/>
+            </a:effectRef>
+            <a:fontRef idx="minor">
+              <a:schemeClr val="tx1"/>
+            </a:fontRef>
+          </p:style>
+        </p:cxnSp>
       </p:grpSp>
     </p:spTree>
   </p:cSld>
@@ -22353,10 +25331,6 @@
                   <a:rPr lang="fr-BE" sz="1000" noProof="1" smtClean="0"/>
                   <a:t>Initiate</a:t>
                 </a:r>
-                <a:r>
-                  <a:rPr lang="fr-BE" sz="1000" noProof="1" smtClean="0"/>
-                  <a:t/>
-                </a:r>
                 <a:br>
                   <a:rPr lang="fr-BE" sz="1000" noProof="1" smtClean="0"/>
                 </a:br>
@@ -22697,10 +25671,6 @@
                 <a:r>
                   <a:rPr lang="fr-BE" sz="1000" noProof="1" smtClean="0"/>
                   <a:t>Initiate</a:t>
-                </a:r>
-                <a:r>
-                  <a:rPr lang="fr-BE" sz="1000" noProof="1" smtClean="0"/>
-                  <a:t/>
                 </a:r>
                 <a:br>
                   <a:rPr lang="fr-BE" sz="1000" noProof="1" smtClean="0"/>

</xml_diff>

<commit_message>
Image for chapter 3's intro
</commit_message>
<xml_diff>
--- a/writing/images/train.pptx
+++ b/writing/images/train.pptx
@@ -5,7 +5,7 @@
     <p:sldMasterId id="2147483648" r:id="rId1"/>
   </p:sldMasterIdLst>
   <p:notesMasterIdLst>
-    <p:notesMasterId r:id="rId13"/>
+    <p:notesMasterId r:id="rId14"/>
   </p:notesMasterIdLst>
   <p:sldIdLst>
     <p:sldId id="256" r:id="rId2"/>
@@ -18,7 +18,8 @@
     <p:sldId id="265" r:id="rId9"/>
     <p:sldId id="267" r:id="rId10"/>
     <p:sldId id="266" r:id="rId11"/>
-    <p:sldId id="268" r:id="rId12"/>
+    <p:sldId id="269" r:id="rId12"/>
+    <p:sldId id="268" r:id="rId13"/>
   </p:sldIdLst>
   <p:sldSz cx="9144000" cy="6858000" type="screen4x3"/>
   <p:notesSz cx="6858000" cy="9144000"/>
@@ -203,7 +204,7 @@
             <a:fld id="{1A5CA47D-05BA-47C5-ACE1-040A60204EDF}" type="datetimeFigureOut">
               <a:rPr lang="fr-FR" smtClean="0"/>
               <a:pPr/>
-              <a:t>07/07/2011</a:t>
+              <a:t>08/07/2011</a:t>
             </a:fld>
             <a:endParaRPr lang="fr-BE"/>
           </a:p>
@@ -733,7 +734,7 @@
             <a:fld id="{68BDF4EC-5B70-45D8-B718-E56EB4C6B13E}" type="datetimeFigureOut">
               <a:rPr lang="fr-BE" smtClean="0"/>
               <a:pPr/>
-              <a:t>7/07/2011</a:t>
+              <a:t>8/07/2011</a:t>
             </a:fld>
             <a:endParaRPr lang="fr-BE"/>
           </a:p>
@@ -900,7 +901,7 @@
             <a:fld id="{68BDF4EC-5B70-45D8-B718-E56EB4C6B13E}" type="datetimeFigureOut">
               <a:rPr lang="fr-BE" smtClean="0"/>
               <a:pPr/>
-              <a:t>7/07/2011</a:t>
+              <a:t>8/07/2011</a:t>
             </a:fld>
             <a:endParaRPr lang="fr-BE"/>
           </a:p>
@@ -1077,7 +1078,7 @@
             <a:fld id="{68BDF4EC-5B70-45D8-B718-E56EB4C6B13E}" type="datetimeFigureOut">
               <a:rPr lang="fr-BE" smtClean="0"/>
               <a:pPr/>
-              <a:t>7/07/2011</a:t>
+              <a:t>8/07/2011</a:t>
             </a:fld>
             <a:endParaRPr lang="fr-BE"/>
           </a:p>
@@ -1244,7 +1245,7 @@
             <a:fld id="{68BDF4EC-5B70-45D8-B718-E56EB4C6B13E}" type="datetimeFigureOut">
               <a:rPr lang="fr-BE" smtClean="0"/>
               <a:pPr/>
-              <a:t>7/07/2011</a:t>
+              <a:t>8/07/2011</a:t>
             </a:fld>
             <a:endParaRPr lang="fr-BE"/>
           </a:p>
@@ -1487,7 +1488,7 @@
             <a:fld id="{68BDF4EC-5B70-45D8-B718-E56EB4C6B13E}" type="datetimeFigureOut">
               <a:rPr lang="fr-BE" smtClean="0"/>
               <a:pPr/>
-              <a:t>7/07/2011</a:t>
+              <a:t>8/07/2011</a:t>
             </a:fld>
             <a:endParaRPr lang="fr-BE"/>
           </a:p>
@@ -1772,7 +1773,7 @@
             <a:fld id="{68BDF4EC-5B70-45D8-B718-E56EB4C6B13E}" type="datetimeFigureOut">
               <a:rPr lang="fr-BE" smtClean="0"/>
               <a:pPr/>
-              <a:t>7/07/2011</a:t>
+              <a:t>8/07/2011</a:t>
             </a:fld>
             <a:endParaRPr lang="fr-BE"/>
           </a:p>
@@ -2191,7 +2192,7 @@
             <a:fld id="{68BDF4EC-5B70-45D8-B718-E56EB4C6B13E}" type="datetimeFigureOut">
               <a:rPr lang="fr-BE" smtClean="0"/>
               <a:pPr/>
-              <a:t>7/07/2011</a:t>
+              <a:t>8/07/2011</a:t>
             </a:fld>
             <a:endParaRPr lang="fr-BE"/>
           </a:p>
@@ -2306,7 +2307,7 @@
             <a:fld id="{68BDF4EC-5B70-45D8-B718-E56EB4C6B13E}" type="datetimeFigureOut">
               <a:rPr lang="fr-BE" smtClean="0"/>
               <a:pPr/>
-              <a:t>7/07/2011</a:t>
+              <a:t>8/07/2011</a:t>
             </a:fld>
             <a:endParaRPr lang="fr-BE"/>
           </a:p>
@@ -2398,7 +2399,7 @@
             <a:fld id="{68BDF4EC-5B70-45D8-B718-E56EB4C6B13E}" type="datetimeFigureOut">
               <a:rPr lang="fr-BE" smtClean="0"/>
               <a:pPr/>
-              <a:t>7/07/2011</a:t>
+              <a:t>8/07/2011</a:t>
             </a:fld>
             <a:endParaRPr lang="fr-BE"/>
           </a:p>
@@ -2672,7 +2673,7 @@
             <a:fld id="{68BDF4EC-5B70-45D8-B718-E56EB4C6B13E}" type="datetimeFigureOut">
               <a:rPr lang="fr-BE" smtClean="0"/>
               <a:pPr/>
-              <a:t>7/07/2011</a:t>
+              <a:t>8/07/2011</a:t>
             </a:fld>
             <a:endParaRPr lang="fr-BE"/>
           </a:p>
@@ -2922,7 +2923,7 @@
             <a:fld id="{68BDF4EC-5B70-45D8-B718-E56EB4C6B13E}" type="datetimeFigureOut">
               <a:rPr lang="fr-BE" smtClean="0"/>
               <a:pPr/>
-              <a:t>7/07/2011</a:t>
+              <a:t>8/07/2011</a:t>
             </a:fld>
             <a:endParaRPr lang="fr-BE"/>
           </a:p>
@@ -3132,7 +3133,7 @@
             <a:fld id="{68BDF4EC-5B70-45D8-B718-E56EB4C6B13E}" type="datetimeFigureOut">
               <a:rPr lang="fr-BE" smtClean="0"/>
               <a:pPr/>
-              <a:t>7/07/2011</a:t>
+              <a:t>8/07/2011</a:t>
             </a:fld>
             <a:endParaRPr lang="fr-BE"/>
           </a:p>
@@ -6568,13 +6569,13 @@
       </p:grpSpPr>
       <p:grpSp>
         <p:nvGrpSpPr>
-          <p:cNvPr id="158" name="Groupe 157"/>
+          <p:cNvPr id="4" name="Groupe 3"/>
           <p:cNvGrpSpPr/>
           <p:nvPr/>
         </p:nvGrpSpPr>
         <p:grpSpPr>
           <a:xfrm>
-            <a:off x="2866033" y="476672"/>
+            <a:off x="611560" y="404664"/>
             <a:ext cx="3699966" cy="1728192"/>
             <a:chOff x="2813855" y="476672"/>
             <a:chExt cx="3699966" cy="1728192"/>
@@ -7055,7 +7056,7 @@
           </p:grpSpPr>
           <p:sp>
             <p:nvSpPr>
-              <p:cNvPr id="17" name="Ellipse 16"/>
+              <p:cNvPr id="19" name="Ellipse 18"/>
               <p:cNvSpPr/>
               <p:nvPr/>
             </p:nvSpPr>
@@ -7095,7 +7096,7 @@
           </p:sp>
           <p:sp>
             <p:nvSpPr>
-              <p:cNvPr id="18" name="Ellipse 17"/>
+              <p:cNvPr id="20" name="Ellipse 19"/>
               <p:cNvSpPr/>
               <p:nvPr/>
             </p:nvSpPr>
@@ -7139,7 +7140,7 @@
         </p:grpSp>
         <p:sp>
           <p:nvSpPr>
-            <p:cNvPr id="19" name="ZoneTexte 18"/>
+            <p:cNvPr id="17" name="ZoneTexte 16"/>
             <p:cNvSpPr txBox="1"/>
             <p:nvPr/>
           </p:nvSpPr>
@@ -7171,7 +7172,7 @@
         </p:sp>
         <p:sp>
           <p:nvSpPr>
-            <p:cNvPr id="25" name="ZoneTexte 24"/>
+            <p:cNvPr id="18" name="ZoneTexte 17"/>
             <p:cNvSpPr txBox="1"/>
             <p:nvPr/>
           </p:nvSpPr>
@@ -7204,13 +7205,13 @@
       </p:grpSp>
       <p:grpSp>
         <p:nvGrpSpPr>
-          <p:cNvPr id="91" name="Groupe 90"/>
+          <p:cNvPr id="21" name="Groupe 20"/>
           <p:cNvGrpSpPr/>
           <p:nvPr/>
         </p:nvGrpSpPr>
         <p:grpSpPr>
           <a:xfrm>
-            <a:off x="2918937" y="2636912"/>
+            <a:off x="3171265" y="2636912"/>
             <a:ext cx="3594158" cy="2088232"/>
             <a:chOff x="2706034" y="2132856"/>
             <a:chExt cx="3594158" cy="2088232"/>
@@ -7218,7 +7219,7 @@
         </p:grpSpPr>
         <p:sp>
           <p:nvSpPr>
-            <p:cNvPr id="26" name="Ellipse 25"/>
+            <p:cNvPr id="22" name="Ellipse 21"/>
             <p:cNvSpPr/>
             <p:nvPr/>
           </p:nvSpPr>
@@ -7257,7 +7258,7 @@
         </p:sp>
         <p:sp>
           <p:nvSpPr>
-            <p:cNvPr id="27" name="Ellipse 26"/>
+            <p:cNvPr id="23" name="Ellipse 22"/>
             <p:cNvSpPr/>
             <p:nvPr/>
           </p:nvSpPr>
@@ -7296,7 +7297,7 @@
         </p:sp>
         <p:sp>
           <p:nvSpPr>
-            <p:cNvPr id="28" name="Ellipse 27"/>
+            <p:cNvPr id="24" name="Ellipse 23"/>
             <p:cNvSpPr/>
             <p:nvPr/>
           </p:nvSpPr>
@@ -7335,7 +7336,7 @@
         </p:sp>
         <p:sp>
           <p:nvSpPr>
-            <p:cNvPr id="29" name="Ellipse 28"/>
+            <p:cNvPr id="25" name="Ellipse 24"/>
             <p:cNvSpPr/>
             <p:nvPr/>
           </p:nvSpPr>
@@ -7374,10 +7375,10 @@
         </p:sp>
         <p:cxnSp>
           <p:nvCxnSpPr>
-            <p:cNvPr id="30" name="Connecteur droit avec flèche 29"/>
+            <p:cNvPr id="26" name="Connecteur droit avec flèche 25"/>
             <p:cNvCxnSpPr>
-              <a:stCxn id="26" idx="6"/>
-              <a:endCxn id="27" idx="2"/>
+              <a:stCxn id="22" idx="6"/>
+              <a:endCxn id="23" idx="2"/>
             </p:cNvCxnSpPr>
             <p:nvPr/>
           </p:nvCxnSpPr>
@@ -7413,10 +7414,10 @@
         </p:cxnSp>
         <p:cxnSp>
           <p:nvCxnSpPr>
-            <p:cNvPr id="31" name="Connecteur droit avec flèche 30"/>
+            <p:cNvPr id="27" name="Connecteur droit avec flèche 26"/>
             <p:cNvCxnSpPr>
-              <a:stCxn id="27" idx="4"/>
-              <a:endCxn id="28" idx="0"/>
+              <a:stCxn id="23" idx="4"/>
+              <a:endCxn id="24" idx="0"/>
             </p:cNvCxnSpPr>
             <p:nvPr/>
           </p:nvCxnSpPr>
@@ -7452,10 +7453,10 @@
         </p:cxnSp>
         <p:cxnSp>
           <p:nvCxnSpPr>
-            <p:cNvPr id="32" name="Connecteur droit avec flèche 31"/>
+            <p:cNvPr id="28" name="Connecteur droit avec flèche 27"/>
             <p:cNvCxnSpPr>
-              <a:stCxn id="28" idx="2"/>
-              <a:endCxn id="29" idx="6"/>
+              <a:stCxn id="24" idx="2"/>
+              <a:endCxn id="25" idx="6"/>
             </p:cNvCxnSpPr>
             <p:nvPr/>
           </p:nvCxnSpPr>
@@ -7491,7 +7492,7 @@
         </p:cxnSp>
         <p:sp>
           <p:nvSpPr>
-            <p:cNvPr id="33" name="ZoneTexte 32"/>
+            <p:cNvPr id="29" name="ZoneTexte 28"/>
             <p:cNvSpPr txBox="1"/>
             <p:nvPr/>
           </p:nvSpPr>
@@ -7521,7 +7522,7 @@
         </p:sp>
         <p:sp>
           <p:nvSpPr>
-            <p:cNvPr id="34" name="ZoneTexte 33"/>
+            <p:cNvPr id="30" name="ZoneTexte 29"/>
             <p:cNvSpPr txBox="1"/>
             <p:nvPr/>
           </p:nvSpPr>
@@ -7557,7 +7558,7 @@
         </p:sp>
         <p:sp>
           <p:nvSpPr>
-            <p:cNvPr id="35" name="ZoneTexte 34"/>
+            <p:cNvPr id="31" name="ZoneTexte 30"/>
             <p:cNvSpPr txBox="1"/>
             <p:nvPr/>
           </p:nvSpPr>
@@ -7593,9 +7594,9 @@
         </p:sp>
         <p:cxnSp>
           <p:nvCxnSpPr>
-            <p:cNvPr id="48" name="Connecteur droit avec flèche 7"/>
+            <p:cNvPr id="32" name="Connecteur droit avec flèche 7"/>
             <p:cNvCxnSpPr>
-              <a:endCxn id="26" idx="1"/>
+              <a:endCxn id="22" idx="1"/>
             </p:cNvCxnSpPr>
             <p:nvPr/>
           </p:nvCxnSpPr>
@@ -7628,7 +7629,7 @@
         </p:cxnSp>
         <p:sp>
           <p:nvSpPr>
-            <p:cNvPr id="50" name="Ellipse 49"/>
+            <p:cNvPr id="33" name="Ellipse 32"/>
             <p:cNvSpPr/>
             <p:nvPr/>
           </p:nvSpPr>
@@ -7667,7 +7668,7 @@
         </p:sp>
         <p:sp>
           <p:nvSpPr>
-            <p:cNvPr id="51" name="Ellipse 50"/>
+            <p:cNvPr id="34" name="Ellipse 33"/>
             <p:cNvSpPr/>
             <p:nvPr/>
           </p:nvSpPr>
@@ -7706,7 +7707,7 @@
         </p:sp>
         <p:sp>
           <p:nvSpPr>
-            <p:cNvPr id="52" name="Ellipse 51"/>
+            <p:cNvPr id="35" name="Ellipse 34"/>
             <p:cNvSpPr/>
             <p:nvPr/>
           </p:nvSpPr>
@@ -7745,10 +7746,10 @@
         </p:sp>
         <p:cxnSp>
           <p:nvCxnSpPr>
-            <p:cNvPr id="54" name="Connecteur droit avec flèche 53"/>
+            <p:cNvPr id="36" name="Connecteur droit avec flèche 35"/>
             <p:cNvCxnSpPr>
-              <a:stCxn id="50" idx="6"/>
-              <a:endCxn id="51" idx="2"/>
+              <a:stCxn id="33" idx="6"/>
+              <a:endCxn id="34" idx="2"/>
             </p:cNvCxnSpPr>
             <p:nvPr/>
           </p:nvCxnSpPr>
@@ -7784,10 +7785,10 @@
         </p:cxnSp>
         <p:cxnSp>
           <p:nvCxnSpPr>
-            <p:cNvPr id="55" name="Connecteur droit avec flèche 54"/>
+            <p:cNvPr id="37" name="Connecteur droit avec flèche 36"/>
             <p:cNvCxnSpPr>
-              <a:stCxn id="51" idx="0"/>
-              <a:endCxn id="52" idx="4"/>
+              <a:stCxn id="34" idx="0"/>
+              <a:endCxn id="35" idx="4"/>
             </p:cNvCxnSpPr>
             <p:nvPr/>
           </p:nvCxnSpPr>
@@ -7823,10 +7824,10 @@
         </p:cxnSp>
         <p:cxnSp>
           <p:nvCxnSpPr>
-            <p:cNvPr id="56" name="Connecteur droit avec flèche 55"/>
+            <p:cNvPr id="38" name="Connecteur droit avec flèche 55"/>
             <p:cNvCxnSpPr>
-              <a:stCxn id="52" idx="2"/>
-              <a:endCxn id="26" idx="2"/>
+              <a:stCxn id="35" idx="2"/>
+              <a:endCxn id="22" idx="2"/>
             </p:cNvCxnSpPr>
             <p:nvPr/>
           </p:nvCxnSpPr>
@@ -7864,7 +7865,7 @@
         </p:cxnSp>
         <p:sp>
           <p:nvSpPr>
-            <p:cNvPr id="57" name="ZoneTexte 56"/>
+            <p:cNvPr id="39" name="ZoneTexte 38"/>
             <p:cNvSpPr txBox="1"/>
             <p:nvPr/>
           </p:nvSpPr>
@@ -7894,7 +7895,7 @@
         </p:sp>
         <p:sp>
           <p:nvSpPr>
-            <p:cNvPr id="58" name="ZoneTexte 57"/>
+            <p:cNvPr id="40" name="ZoneTexte 39"/>
             <p:cNvSpPr txBox="1"/>
             <p:nvPr/>
           </p:nvSpPr>
@@ -7930,7 +7931,7 @@
         </p:sp>
         <p:sp>
           <p:nvSpPr>
-            <p:cNvPr id="59" name="ZoneTexte 58"/>
+            <p:cNvPr id="41" name="ZoneTexte 40"/>
             <p:cNvSpPr txBox="1"/>
             <p:nvPr/>
           </p:nvSpPr>
@@ -7966,7 +7967,7 @@
         </p:sp>
         <p:sp>
           <p:nvSpPr>
-            <p:cNvPr id="64" name="Ellipse 63"/>
+            <p:cNvPr id="42" name="Ellipse 41"/>
             <p:cNvSpPr/>
             <p:nvPr/>
           </p:nvSpPr>
@@ -8005,7 +8006,7 @@
         </p:sp>
         <p:sp>
           <p:nvSpPr>
-            <p:cNvPr id="65" name="Ellipse 64"/>
+            <p:cNvPr id="43" name="Ellipse 42"/>
             <p:cNvSpPr/>
             <p:nvPr/>
           </p:nvSpPr>
@@ -8044,7 +8045,7 @@
         </p:sp>
         <p:sp>
           <p:nvSpPr>
-            <p:cNvPr id="66" name="Ellipse 65"/>
+            <p:cNvPr id="44" name="Ellipse 43"/>
             <p:cNvSpPr/>
             <p:nvPr/>
           </p:nvSpPr>
@@ -8083,7 +8084,7 @@
         </p:sp>
         <p:sp>
           <p:nvSpPr>
-            <p:cNvPr id="67" name="Ellipse 66"/>
+            <p:cNvPr id="45" name="Ellipse 44"/>
             <p:cNvSpPr/>
             <p:nvPr/>
           </p:nvSpPr>
@@ -8122,10 +8123,10 @@
         </p:sp>
         <p:cxnSp>
           <p:nvCxnSpPr>
-            <p:cNvPr id="68" name="Connecteur droit avec flèche 67"/>
+            <p:cNvPr id="46" name="Connecteur droit avec flèche 45"/>
             <p:cNvCxnSpPr>
-              <a:stCxn id="64" idx="6"/>
-              <a:endCxn id="65" idx="2"/>
+              <a:stCxn id="42" idx="6"/>
+              <a:endCxn id="43" idx="2"/>
             </p:cNvCxnSpPr>
             <p:nvPr/>
           </p:nvCxnSpPr>
@@ -8161,10 +8162,10 @@
         </p:cxnSp>
         <p:cxnSp>
           <p:nvCxnSpPr>
-            <p:cNvPr id="69" name="Connecteur droit avec flèche 68"/>
+            <p:cNvPr id="47" name="Connecteur droit avec flèche 46"/>
             <p:cNvCxnSpPr>
-              <a:stCxn id="65" idx="4"/>
-              <a:endCxn id="66" idx="0"/>
+              <a:stCxn id="43" idx="4"/>
+              <a:endCxn id="44" idx="0"/>
             </p:cNvCxnSpPr>
             <p:nvPr/>
           </p:nvCxnSpPr>
@@ -8200,10 +8201,10 @@
         </p:cxnSp>
         <p:cxnSp>
           <p:nvCxnSpPr>
-            <p:cNvPr id="70" name="Connecteur droit avec flèche 69"/>
+            <p:cNvPr id="48" name="Connecteur droit avec flèche 47"/>
             <p:cNvCxnSpPr>
-              <a:stCxn id="66" idx="2"/>
-              <a:endCxn id="67" idx="6"/>
+              <a:stCxn id="44" idx="2"/>
+              <a:endCxn id="45" idx="6"/>
             </p:cNvCxnSpPr>
             <p:nvPr/>
           </p:nvCxnSpPr>
@@ -8239,7 +8240,7 @@
         </p:cxnSp>
         <p:sp>
           <p:nvSpPr>
-            <p:cNvPr id="71" name="ZoneTexte 70"/>
+            <p:cNvPr id="49" name="ZoneTexte 48"/>
             <p:cNvSpPr txBox="1"/>
             <p:nvPr/>
           </p:nvSpPr>
@@ -8269,7 +8270,7 @@
         </p:sp>
         <p:sp>
           <p:nvSpPr>
-            <p:cNvPr id="72" name="ZoneTexte 71"/>
+            <p:cNvPr id="50" name="ZoneTexte 49"/>
             <p:cNvSpPr txBox="1"/>
             <p:nvPr/>
           </p:nvSpPr>
@@ -8305,7 +8306,7 @@
         </p:sp>
         <p:sp>
           <p:nvSpPr>
-            <p:cNvPr id="73" name="ZoneTexte 72"/>
+            <p:cNvPr id="51" name="ZoneTexte 50"/>
             <p:cNvSpPr txBox="1"/>
             <p:nvPr/>
           </p:nvSpPr>
@@ -8341,10 +8342,10 @@
         </p:sp>
         <p:cxnSp>
           <p:nvCxnSpPr>
-            <p:cNvPr id="74" name="Connecteur droit avec flèche 55"/>
+            <p:cNvPr id="52" name="Connecteur droit avec flèche 55"/>
             <p:cNvCxnSpPr>
-              <a:stCxn id="29" idx="4"/>
-              <a:endCxn id="50" idx="0"/>
+              <a:stCxn id="25" idx="4"/>
+              <a:endCxn id="33" idx="0"/>
             </p:cNvCxnSpPr>
             <p:nvPr/>
           </p:nvCxnSpPr>
@@ -8382,10 +8383,10 @@
         </p:cxnSp>
         <p:cxnSp>
           <p:nvCxnSpPr>
-            <p:cNvPr id="77" name="Connecteur droit avec flèche 55"/>
+            <p:cNvPr id="53" name="Connecteur droit avec flèche 55"/>
             <p:cNvCxnSpPr>
-              <a:stCxn id="29" idx="4"/>
-              <a:endCxn id="64" idx="0"/>
+              <a:stCxn id="25" idx="4"/>
+              <a:endCxn id="42" idx="0"/>
             </p:cNvCxnSpPr>
             <p:nvPr/>
           </p:nvCxnSpPr>
@@ -8423,7 +8424,7 @@
         </p:cxnSp>
         <p:sp>
           <p:nvSpPr>
-            <p:cNvPr id="86" name="ZoneTexte 85"/>
+            <p:cNvPr id="54" name="ZoneTexte 53"/>
             <p:cNvSpPr txBox="1"/>
             <p:nvPr/>
           </p:nvSpPr>
@@ -8455,7 +8456,7 @@
         </p:sp>
         <p:sp>
           <p:nvSpPr>
-            <p:cNvPr id="87" name="ZoneTexte 86"/>
+            <p:cNvPr id="55" name="ZoneTexte 54"/>
             <p:cNvSpPr txBox="1"/>
             <p:nvPr/>
           </p:nvSpPr>
@@ -8498,27 +8499,27 @@
       </p:grpSp>
       <p:grpSp>
         <p:nvGrpSpPr>
-          <p:cNvPr id="157" name="Groupe 156"/>
+          <p:cNvPr id="56" name="Groupe 55"/>
           <p:cNvGrpSpPr/>
           <p:nvPr/>
         </p:nvGrpSpPr>
         <p:grpSpPr>
           <a:xfrm>
-            <a:off x="2483768" y="5320258"/>
-            <a:ext cx="4464496" cy="1202303"/>
+            <a:off x="2952120" y="5320258"/>
+            <a:ext cx="4068152" cy="1130295"/>
             <a:chOff x="2483768" y="5320258"/>
-            <a:chExt cx="4464496" cy="1202303"/>
+            <a:chExt cx="4068152" cy="1130295"/>
           </a:xfrm>
         </p:grpSpPr>
         <p:sp>
           <p:nvSpPr>
-            <p:cNvPr id="137" name="ZoneTexte 136"/>
+            <p:cNvPr id="57" name="ZoneTexte 56"/>
             <p:cNvSpPr txBox="1"/>
             <p:nvPr/>
           </p:nvSpPr>
           <p:spPr>
             <a:xfrm flipH="1">
-              <a:off x="3861445" y="6337895"/>
+              <a:off x="3501405" y="6265887"/>
               <a:ext cx="726161" cy="184666"/>
             </a:xfrm>
             <a:prstGeom prst="rect">
@@ -8548,7 +8549,7 @@
         </p:sp>
         <p:sp>
           <p:nvSpPr>
-            <p:cNvPr id="126" name="ZoneTexte 125"/>
+            <p:cNvPr id="58" name="ZoneTexte 57"/>
             <p:cNvSpPr txBox="1"/>
             <p:nvPr/>
           </p:nvSpPr>
@@ -8584,7 +8585,7 @@
         </p:sp>
         <p:sp>
           <p:nvSpPr>
-            <p:cNvPr id="93" name="Ellipse 92"/>
+            <p:cNvPr id="59" name="Ellipse 58"/>
             <p:cNvSpPr/>
             <p:nvPr/>
           </p:nvSpPr>
@@ -8623,7 +8624,7 @@
         </p:sp>
         <p:sp>
           <p:nvSpPr>
-            <p:cNvPr id="94" name="Ellipse 93"/>
+            <p:cNvPr id="60" name="Ellipse 59"/>
             <p:cNvSpPr/>
             <p:nvPr/>
           </p:nvSpPr>
@@ -8662,7 +8663,7 @@
         </p:sp>
         <p:sp>
           <p:nvSpPr>
-            <p:cNvPr id="95" name="Ellipse 94"/>
+            <p:cNvPr id="61" name="Ellipse 60"/>
             <p:cNvSpPr/>
             <p:nvPr/>
           </p:nvSpPr>
@@ -8701,10 +8702,10 @@
         </p:sp>
         <p:cxnSp>
           <p:nvCxnSpPr>
-            <p:cNvPr id="96" name="Connecteur droit avec flèche 55"/>
+            <p:cNvPr id="62" name="Connecteur droit avec flèche 55"/>
             <p:cNvCxnSpPr>
-              <a:stCxn id="93" idx="2"/>
-              <a:endCxn id="94" idx="6"/>
+              <a:stCxn id="59" idx="2"/>
+              <a:endCxn id="60" idx="6"/>
             </p:cNvCxnSpPr>
             <p:nvPr/>
           </p:nvCxnSpPr>
@@ -8740,10 +8741,10 @@
         </p:cxnSp>
         <p:cxnSp>
           <p:nvCxnSpPr>
-            <p:cNvPr id="99" name="Connecteur droit avec flèche 55"/>
+            <p:cNvPr id="63" name="Connecteur droit avec flèche 55"/>
             <p:cNvCxnSpPr>
-              <a:stCxn id="94" idx="2"/>
-              <a:endCxn id="95" idx="6"/>
+              <a:stCxn id="60" idx="2"/>
+              <a:endCxn id="61" idx="6"/>
             </p:cNvCxnSpPr>
             <p:nvPr/>
           </p:nvCxnSpPr>
@@ -8781,13 +8782,13 @@
         </p:cxnSp>
         <p:sp>
           <p:nvSpPr>
-            <p:cNvPr id="102" name="ZoneTexte 101"/>
+            <p:cNvPr id="64" name="ZoneTexte 63"/>
             <p:cNvSpPr txBox="1"/>
             <p:nvPr/>
           </p:nvSpPr>
           <p:spPr>
             <a:xfrm>
-              <a:off x="2555776" y="5495632"/>
+              <a:off x="2657930" y="5577165"/>
               <a:ext cx="617926" cy="184666"/>
             </a:xfrm>
             <a:prstGeom prst="rect">
@@ -8817,7 +8818,7 @@
         </p:sp>
         <p:sp>
           <p:nvSpPr>
-            <p:cNvPr id="103" name="Ellipse 102"/>
+            <p:cNvPr id="65" name="Ellipse 64"/>
             <p:cNvSpPr/>
             <p:nvPr/>
           </p:nvSpPr>
@@ -8856,10 +8857,10 @@
         </p:sp>
         <p:cxnSp>
           <p:nvCxnSpPr>
-            <p:cNvPr id="104" name="Connecteur droit avec flèche 55"/>
+            <p:cNvPr id="66" name="Connecteur droit avec flèche 55"/>
             <p:cNvCxnSpPr>
-              <a:stCxn id="95" idx="2"/>
-              <a:endCxn id="103" idx="6"/>
+              <a:stCxn id="61" idx="2"/>
+              <a:endCxn id="65" idx="6"/>
             </p:cNvCxnSpPr>
             <p:nvPr/>
           </p:nvCxnSpPr>
@@ -8897,7 +8898,7 @@
         </p:cxnSp>
         <p:sp>
           <p:nvSpPr>
-            <p:cNvPr id="107" name="ZoneTexte 106"/>
+            <p:cNvPr id="67" name="ZoneTexte 66"/>
             <p:cNvSpPr txBox="1"/>
             <p:nvPr/>
           </p:nvSpPr>
@@ -8933,7 +8934,7 @@
         </p:sp>
         <p:sp>
           <p:nvSpPr>
-            <p:cNvPr id="108" name="Ellipse 107"/>
+            <p:cNvPr id="68" name="Ellipse 67"/>
             <p:cNvSpPr/>
             <p:nvPr/>
           </p:nvSpPr>
@@ -8972,10 +8973,10 @@
         </p:sp>
         <p:cxnSp>
           <p:nvCxnSpPr>
-            <p:cNvPr id="109" name="Connecteur droit avec flèche 55"/>
+            <p:cNvPr id="69" name="Connecteur droit avec flèche 55"/>
             <p:cNvCxnSpPr>
-              <a:stCxn id="103" idx="2"/>
-              <a:endCxn id="108" idx="6"/>
+              <a:stCxn id="65" idx="2"/>
+              <a:endCxn id="68" idx="6"/>
             </p:cNvCxnSpPr>
             <p:nvPr/>
           </p:nvCxnSpPr>
@@ -9013,7 +9014,7 @@
         </p:cxnSp>
         <p:sp>
           <p:nvSpPr>
-            <p:cNvPr id="111" name="ZoneTexte 110"/>
+            <p:cNvPr id="70" name="ZoneTexte 69"/>
             <p:cNvSpPr txBox="1"/>
             <p:nvPr/>
           </p:nvSpPr>
@@ -9049,7 +9050,7 @@
         </p:sp>
         <p:sp>
           <p:nvSpPr>
-            <p:cNvPr id="112" name="Ellipse 111"/>
+            <p:cNvPr id="71" name="Ellipse 70"/>
             <p:cNvSpPr/>
             <p:nvPr/>
           </p:nvSpPr>
@@ -9088,10 +9089,10 @@
         </p:sp>
         <p:cxnSp>
           <p:nvCxnSpPr>
-            <p:cNvPr id="113" name="Connecteur droit avec flèche 55"/>
+            <p:cNvPr id="72" name="Connecteur droit avec flèche 55"/>
             <p:cNvCxnSpPr>
-              <a:stCxn id="108" idx="4"/>
-              <a:endCxn id="112" idx="2"/>
+              <a:stCxn id="68" idx="4"/>
+              <a:endCxn id="71" idx="2"/>
             </p:cNvCxnSpPr>
             <p:nvPr/>
           </p:nvCxnSpPr>
@@ -9127,7 +9128,7 @@
         </p:cxnSp>
         <p:sp>
           <p:nvSpPr>
-            <p:cNvPr id="116" name="ZoneTexte 115"/>
+            <p:cNvPr id="73" name="ZoneTexte 72"/>
             <p:cNvSpPr txBox="1"/>
             <p:nvPr/>
           </p:nvSpPr>
@@ -9157,7 +9158,7 @@
         </p:sp>
         <p:sp>
           <p:nvSpPr>
-            <p:cNvPr id="117" name="ZoneTexte 116"/>
+            <p:cNvPr id="74" name="ZoneTexte 73"/>
             <p:cNvSpPr txBox="1"/>
             <p:nvPr/>
           </p:nvSpPr>
@@ -9187,10 +9188,10 @@
         </p:sp>
         <p:cxnSp>
           <p:nvCxnSpPr>
-            <p:cNvPr id="118" name="Connecteur droit avec flèche 55"/>
+            <p:cNvPr id="75" name="Connecteur droit avec flèche 55"/>
             <p:cNvCxnSpPr>
-              <a:stCxn id="112" idx="6"/>
-              <a:endCxn id="93" idx="2"/>
+              <a:stCxn id="71" idx="6"/>
+              <a:endCxn id="59" idx="2"/>
             </p:cNvCxnSpPr>
             <p:nvPr/>
           </p:nvCxnSpPr>
@@ -9226,13 +9227,13 @@
         </p:cxnSp>
         <p:sp>
           <p:nvSpPr>
-            <p:cNvPr id="132" name="Ellipse 131"/>
+            <p:cNvPr id="76" name="Ellipse 75"/>
             <p:cNvSpPr/>
             <p:nvPr/>
           </p:nvSpPr>
           <p:spPr>
             <a:xfrm flipH="1">
-              <a:off x="3275856" y="6237312"/>
+              <a:off x="2915816" y="6165304"/>
               <a:ext cx="216024" cy="216024"/>
             </a:xfrm>
             <a:prstGeom prst="ellipse">
@@ -9265,13 +9266,13 @@
         </p:sp>
         <p:sp>
           <p:nvSpPr>
-            <p:cNvPr id="133" name="Ellipse 132"/>
+            <p:cNvPr id="77" name="Ellipse 76"/>
             <p:cNvSpPr/>
             <p:nvPr/>
           </p:nvSpPr>
           <p:spPr>
             <a:xfrm flipH="1">
-              <a:off x="5220072" y="6237312"/>
+              <a:off x="4860032" y="6165304"/>
               <a:ext cx="216024" cy="216024"/>
             </a:xfrm>
             <a:prstGeom prst="ellipse">
@@ -9304,20 +9305,22 @@
         </p:sp>
         <p:cxnSp>
           <p:nvCxnSpPr>
-            <p:cNvPr id="134" name="Connecteur droit avec flèche 55"/>
+            <p:cNvPr id="78" name="Connecteur droit avec flèche 55"/>
             <p:cNvCxnSpPr>
-              <a:stCxn id="140" idx="5"/>
-              <a:endCxn id="133" idx="2"/>
+              <a:stCxn id="81" idx="6"/>
+              <a:endCxn id="77" idx="2"/>
             </p:cNvCxnSpPr>
             <p:nvPr/>
           </p:nvCxnSpPr>
           <p:spPr>
-            <a:xfrm rot="5400000">
-              <a:off x="5598114" y="6043658"/>
-              <a:ext cx="139648" cy="463684"/>
-            </a:xfrm>
-            <a:prstGeom prst="curvedConnector2">
-              <a:avLst/>
+            <a:xfrm rot="10800000">
+              <a:off x="5076056" y="6273316"/>
+              <a:ext cx="432048" cy="1588"/>
+            </a:xfrm>
+            <a:prstGeom prst="curvedConnector3">
+              <a:avLst>
+                <a:gd name="adj1" fmla="val 50000"/>
+              </a:avLst>
             </a:prstGeom>
             <a:ln w="22225">
               <a:solidFill>
@@ -9343,13 +9346,13 @@
         </p:cxnSp>
         <p:sp>
           <p:nvSpPr>
-            <p:cNvPr id="135" name="ZoneTexte 134"/>
+            <p:cNvPr id="79" name="ZoneTexte 78"/>
             <p:cNvSpPr txBox="1"/>
             <p:nvPr/>
           </p:nvSpPr>
           <p:spPr>
             <a:xfrm flipH="1">
-              <a:off x="5652120" y="6231979"/>
+              <a:off x="5220072" y="6159971"/>
               <a:ext cx="159783" cy="215444"/>
             </a:xfrm>
             <a:prstGeom prst="rect">
@@ -9373,16 +9376,16 @@
         </p:sp>
         <p:cxnSp>
           <p:nvCxnSpPr>
-            <p:cNvPr id="136" name="Connecteur droit avec flèche 55"/>
+            <p:cNvPr id="80" name="Connecteur droit avec flèche 55"/>
             <p:cNvCxnSpPr>
-              <a:stCxn id="133" idx="6"/>
-              <a:endCxn id="132" idx="2"/>
+              <a:stCxn id="77" idx="6"/>
+              <a:endCxn id="76" idx="2"/>
             </p:cNvCxnSpPr>
             <p:nvPr/>
           </p:nvCxnSpPr>
           <p:spPr>
             <a:xfrm rot="10800000">
-              <a:off x="3491880" y="6345324"/>
+              <a:off x="3131840" y="6273316"/>
               <a:ext cx="1728192" cy="1588"/>
             </a:xfrm>
             <a:prstGeom prst="straightConnector1">
@@ -9412,13 +9415,13 @@
         </p:cxnSp>
         <p:sp>
           <p:nvSpPr>
-            <p:cNvPr id="140" name="Ellipse 139"/>
+            <p:cNvPr id="81" name="Ellipse 80"/>
             <p:cNvSpPr/>
             <p:nvPr/>
           </p:nvSpPr>
           <p:spPr>
             <a:xfrm flipH="1">
-              <a:off x="5868144" y="6021288"/>
+              <a:off x="5508104" y="6165304"/>
               <a:ext cx="216024" cy="216024"/>
             </a:xfrm>
             <a:prstGeom prst="ellipse">
@@ -9451,22 +9454,20 @@
         </p:sp>
         <p:cxnSp>
           <p:nvCxnSpPr>
-            <p:cNvPr id="142" name="Connecteur droit avec flèche 55"/>
+            <p:cNvPr id="82" name="Connecteur droit avec flèche 55"/>
             <p:cNvCxnSpPr>
-              <a:stCxn id="108" idx="3"/>
-              <a:endCxn id="140" idx="1"/>
+              <a:stCxn id="68" idx="3"/>
+              <a:endCxn id="81" idx="2"/>
             </p:cNvCxnSpPr>
             <p:nvPr/>
           </p:nvCxnSpPr>
           <p:spPr>
             <a:xfrm rot="5400000">
-              <a:off x="5886405" y="5814789"/>
-              <a:ext cx="404262" cy="72008"/>
-            </a:xfrm>
-            <a:prstGeom prst="curvedConnector3">
-              <a:avLst>
-                <a:gd name="adj1" fmla="val 50000"/>
-              </a:avLst>
+              <a:off x="5612007" y="5760783"/>
+              <a:ext cx="624654" cy="400412"/>
+            </a:xfrm>
+            <a:prstGeom prst="curvedConnector2">
+              <a:avLst/>
             </a:prstGeom>
             <a:ln w="22225">
               <a:solidFill>
@@ -9492,13 +9493,13 @@
         </p:cxnSp>
         <p:sp>
           <p:nvSpPr>
-            <p:cNvPr id="147" name="ZoneTexte 146"/>
+            <p:cNvPr id="83" name="ZoneTexte 82"/>
             <p:cNvSpPr txBox="1"/>
             <p:nvPr/>
           </p:nvSpPr>
           <p:spPr>
             <a:xfrm flipH="1">
-              <a:off x="6192480" y="5805264"/>
+              <a:off x="5796136" y="5915372"/>
               <a:ext cx="755784" cy="184666"/>
             </a:xfrm>
             <a:prstGeom prst="rect">
@@ -9528,9 +9529,9 @@
         </p:sp>
         <p:cxnSp>
           <p:nvCxnSpPr>
-            <p:cNvPr id="150" name="Connecteur droit avec flèche 7"/>
+            <p:cNvPr id="84" name="Connecteur droit avec flèche 7"/>
             <p:cNvCxnSpPr>
-              <a:endCxn id="93" idx="5"/>
+              <a:endCxn id="59" idx="5"/>
             </p:cNvCxnSpPr>
             <p:nvPr/>
           </p:nvCxnSpPr>
@@ -9561,6 +9562,506 @@
             </a:fontRef>
           </p:style>
         </p:cxnSp>
+      </p:grpSp>
+    </p:spTree>
+  </p:cSld>
+  <p:clrMapOvr>
+    <a:masterClrMapping/>
+  </p:clrMapOvr>
+</p:sld>
+</file>
+
+<file path=ppt/slides/slide12.xml><?xml version="1.0" encoding="utf-8"?>
+<p:sld xmlns:a="http://schemas.openxmlformats.org/drawingml/2006/main" xmlns:r="http://schemas.openxmlformats.org/officeDocument/2006/relationships" xmlns:p="http://schemas.openxmlformats.org/presentationml/2006/main">
+  <p:cSld>
+    <p:spTree>
+      <p:nvGrpSpPr>
+        <p:cNvPr id="1" name=""/>
+        <p:cNvGrpSpPr/>
+        <p:nvPr/>
+      </p:nvGrpSpPr>
+      <p:grpSpPr>
+        <a:xfrm>
+          <a:off x="0" y="0"/>
+          <a:ext cx="0" cy="0"/>
+          <a:chOff x="0" y="0"/>
+          <a:chExt cx="0" cy="0"/>
+        </a:xfrm>
+      </p:grpSpPr>
+      <p:grpSp>
+        <p:nvGrpSpPr>
+          <p:cNvPr id="119" name="Groupe 118"/>
+          <p:cNvGrpSpPr/>
+          <p:nvPr/>
+        </p:nvGrpSpPr>
+        <p:grpSpPr>
+          <a:xfrm>
+            <a:off x="500034" y="332656"/>
+            <a:ext cx="6448230" cy="6120680"/>
+            <a:chOff x="500034" y="332656"/>
+            <a:chExt cx="6448230" cy="6120680"/>
+          </a:xfrm>
+        </p:grpSpPr>
+        <p:sp>
+          <p:nvSpPr>
+            <p:cNvPr id="88" name="Rectangle 87"/>
+            <p:cNvSpPr/>
+            <p:nvPr/>
+          </p:nvSpPr>
+          <p:spPr>
+            <a:xfrm>
+              <a:off x="500034" y="332656"/>
+              <a:ext cx="6448230" cy="6120680"/>
+            </a:xfrm>
+            <a:prstGeom prst="rect">
+              <a:avLst/>
+            </a:prstGeom>
+            <a:solidFill>
+              <a:schemeClr val="bg1"/>
+            </a:solidFill>
+            <a:ln w="3175"/>
+          </p:spPr>
+          <p:style>
+            <a:lnRef idx="2">
+              <a:schemeClr val="dk1"/>
+            </a:lnRef>
+            <a:fillRef idx="1">
+              <a:schemeClr val="lt1"/>
+            </a:fillRef>
+            <a:effectRef idx="0">
+              <a:schemeClr val="dk1"/>
+            </a:effectRef>
+            <a:fontRef idx="minor">
+              <a:schemeClr val="dk1"/>
+            </a:fontRef>
+          </p:style>
+          <p:txBody>
+            <a:bodyPr rtlCol="0" anchor="ctr"/>
+            <a:lstStyle/>
+            <a:p>
+              <a:pPr algn="ctr"/>
+              <a:endParaRPr lang="fr-BE"/>
+            </a:p>
+          </p:txBody>
+        </p:sp>
+        <p:sp>
+          <p:nvSpPr>
+            <p:cNvPr id="90" name="ZoneTexte 89"/>
+            <p:cNvSpPr txBox="1"/>
+            <p:nvPr/>
+          </p:nvSpPr>
+          <p:spPr>
+            <a:xfrm>
+              <a:off x="683568" y="3093822"/>
+              <a:ext cx="2554867" cy="1077218"/>
+            </a:xfrm>
+            <a:prstGeom prst="rect">
+              <a:avLst/>
+            </a:prstGeom>
+            <a:noFill/>
+          </p:spPr>
+          <p:txBody>
+            <a:bodyPr wrap="none" rtlCol="0">
+              <a:spAutoFit/>
+            </a:bodyPr>
+            <a:lstStyle/>
+            <a:p>
+              <a:r>
+                <a:rPr lang="fr-BE" sz="2400" dirty="0" err="1" smtClean="0"/>
+                <a:t>Guarded</a:t>
+              </a:r>
+              <a:r>
+                <a:rPr lang="fr-BE" sz="2400" dirty="0" smtClean="0"/>
+                <a:t> LTS</a:t>
+              </a:r>
+              <a:endParaRPr lang="fr-BE" sz="2400" dirty="0" smtClean="0"/>
+            </a:p>
+            <a:p>
+              <a:pPr marL="360363" indent="-180975">
+                <a:buFont typeface="Arial" charset="0"/>
+                <a:buChar char="•"/>
+              </a:pPr>
+              <a:r>
+                <a:rPr lang="fr-BE" sz="2000" dirty="0" err="1" smtClean="0"/>
+                <a:t>Symbolic</a:t>
+              </a:r>
+              <a:r>
+                <a:rPr lang="fr-BE" sz="2000" dirty="0" smtClean="0"/>
+                <a:t> </a:t>
+              </a:r>
+              <a:r>
+                <a:rPr lang="fr-BE" sz="2000" dirty="0" err="1" smtClean="0"/>
+                <a:t>execution</a:t>
+              </a:r>
+              <a:r>
+                <a:rPr lang="fr-BE" sz="2000" dirty="0" smtClean="0"/>
+                <a:t/>
+              </a:r>
+              <a:br>
+                <a:rPr lang="fr-BE" sz="2000" dirty="0" smtClean="0"/>
+              </a:br>
+              <a:r>
+                <a:rPr lang="fr-BE" sz="2000" dirty="0" smtClean="0"/>
+                <a:t>analyses [Dam11]</a:t>
+              </a:r>
+              <a:endParaRPr lang="fr-BE" sz="2000" dirty="0" smtClean="0"/>
+            </a:p>
+          </p:txBody>
+        </p:sp>
+        <p:sp>
+          <p:nvSpPr>
+            <p:cNvPr id="97" name="Forme libre 96"/>
+            <p:cNvSpPr/>
+            <p:nvPr/>
+          </p:nvSpPr>
+          <p:spPr>
+            <a:xfrm>
+              <a:off x="4870270" y="1837809"/>
+              <a:ext cx="142876" cy="857256"/>
+            </a:xfrm>
+            <a:custGeom>
+              <a:avLst/>
+              <a:gdLst>
+                <a:gd name="connsiteX0" fmla="*/ 13855 w 417945"/>
+                <a:gd name="connsiteY0" fmla="*/ 0 h 1731818"/>
+                <a:gd name="connsiteX1" fmla="*/ 415636 w 417945"/>
+                <a:gd name="connsiteY1" fmla="*/ 831272 h 1731818"/>
+                <a:gd name="connsiteX2" fmla="*/ 0 w 417945"/>
+                <a:gd name="connsiteY2" fmla="*/ 1731818 h 1731818"/>
+              </a:gdLst>
+              <a:ahLst/>
+              <a:cxnLst>
+                <a:cxn ang="0">
+                  <a:pos x="connsiteX0" y="connsiteY0"/>
+                </a:cxn>
+                <a:cxn ang="0">
+                  <a:pos x="connsiteX1" y="connsiteY1"/>
+                </a:cxn>
+                <a:cxn ang="0">
+                  <a:pos x="connsiteX2" y="connsiteY2"/>
+                </a:cxn>
+              </a:cxnLst>
+              <a:rect l="l" t="t" r="r" b="b"/>
+              <a:pathLst>
+                <a:path w="417945" h="1731818">
+                  <a:moveTo>
+                    <a:pt x="13855" y="0"/>
+                  </a:moveTo>
+                  <a:cubicBezTo>
+                    <a:pt x="215900" y="271318"/>
+                    <a:pt x="417945" y="542636"/>
+                    <a:pt x="415636" y="831272"/>
+                  </a:cubicBezTo>
+                  <a:cubicBezTo>
+                    <a:pt x="413327" y="1119908"/>
+                    <a:pt x="206663" y="1425863"/>
+                    <a:pt x="0" y="1731818"/>
+                  </a:cubicBezTo>
+                </a:path>
+              </a:pathLst>
+            </a:custGeom>
+            <a:ln w="38100">
+              <a:tailEnd type="triangle" w="med" len="lg"/>
+            </a:ln>
+          </p:spPr>
+          <p:style>
+            <a:lnRef idx="2">
+              <a:schemeClr val="dk1"/>
+            </a:lnRef>
+            <a:fillRef idx="0">
+              <a:schemeClr val="dk1"/>
+            </a:fillRef>
+            <a:effectRef idx="1">
+              <a:schemeClr val="dk1"/>
+            </a:effectRef>
+            <a:fontRef idx="minor">
+              <a:schemeClr val="tx1"/>
+            </a:fontRef>
+          </p:style>
+          <p:txBody>
+            <a:bodyPr rtlCol="0" anchor="ctr"/>
+            <a:lstStyle/>
+            <a:p>
+              <a:pPr algn="ctr"/>
+              <a:endParaRPr lang="fr-BE"/>
+            </a:p>
+          </p:txBody>
+        </p:sp>
+        <p:sp>
+          <p:nvSpPr>
+            <p:cNvPr id="101" name="Forme libre 100"/>
+            <p:cNvSpPr/>
+            <p:nvPr/>
+          </p:nvSpPr>
+          <p:spPr>
+            <a:xfrm>
+              <a:off x="4870270" y="4293666"/>
+              <a:ext cx="142876" cy="857256"/>
+            </a:xfrm>
+            <a:custGeom>
+              <a:avLst/>
+              <a:gdLst>
+                <a:gd name="connsiteX0" fmla="*/ 13855 w 417945"/>
+                <a:gd name="connsiteY0" fmla="*/ 0 h 1731818"/>
+                <a:gd name="connsiteX1" fmla="*/ 415636 w 417945"/>
+                <a:gd name="connsiteY1" fmla="*/ 831272 h 1731818"/>
+                <a:gd name="connsiteX2" fmla="*/ 0 w 417945"/>
+                <a:gd name="connsiteY2" fmla="*/ 1731818 h 1731818"/>
+              </a:gdLst>
+              <a:ahLst/>
+              <a:cxnLst>
+                <a:cxn ang="0">
+                  <a:pos x="connsiteX0" y="connsiteY0"/>
+                </a:cxn>
+                <a:cxn ang="0">
+                  <a:pos x="connsiteX1" y="connsiteY1"/>
+                </a:cxn>
+                <a:cxn ang="0">
+                  <a:pos x="connsiteX2" y="connsiteY2"/>
+                </a:cxn>
+              </a:cxnLst>
+              <a:rect l="l" t="t" r="r" b="b"/>
+              <a:pathLst>
+                <a:path w="417945" h="1731818">
+                  <a:moveTo>
+                    <a:pt x="13855" y="0"/>
+                  </a:moveTo>
+                  <a:cubicBezTo>
+                    <a:pt x="215900" y="271318"/>
+                    <a:pt x="417945" y="542636"/>
+                    <a:pt x="415636" y="831272"/>
+                  </a:cubicBezTo>
+                  <a:cubicBezTo>
+                    <a:pt x="413327" y="1119908"/>
+                    <a:pt x="206663" y="1425863"/>
+                    <a:pt x="0" y="1731818"/>
+                  </a:cubicBezTo>
+                </a:path>
+              </a:pathLst>
+            </a:custGeom>
+            <a:ln w="38100">
+              <a:tailEnd type="triangle" w="med" len="lg"/>
+            </a:ln>
+          </p:spPr>
+          <p:style>
+            <a:lnRef idx="2">
+              <a:schemeClr val="dk1"/>
+            </a:lnRef>
+            <a:fillRef idx="0">
+              <a:schemeClr val="dk1"/>
+            </a:fillRef>
+            <a:effectRef idx="1">
+              <a:schemeClr val="dk1"/>
+            </a:effectRef>
+            <a:fontRef idx="minor">
+              <a:schemeClr val="tx1"/>
+            </a:fontRef>
+          </p:style>
+          <p:txBody>
+            <a:bodyPr rtlCol="0" anchor="ctr"/>
+            <a:lstStyle/>
+            <a:p>
+              <a:pPr algn="ctr"/>
+              <a:endParaRPr lang="fr-BE"/>
+            </a:p>
+          </p:txBody>
+        </p:sp>
+        <p:pic>
+          <p:nvPicPr>
+            <p:cNvPr id="105" name="Image 104" descr="g-hmsc.png"/>
+            <p:cNvPicPr>
+              <a:picLocks noChangeAspect="1"/>
+            </p:cNvPicPr>
+            <p:nvPr/>
+          </p:nvPicPr>
+          <p:blipFill>
+            <a:blip r:embed="rId2" cstate="print"/>
+            <a:stretch>
+              <a:fillRect/>
+            </a:stretch>
+          </p:blipFill>
+          <p:spPr>
+            <a:xfrm>
+              <a:off x="3317604" y="454964"/>
+              <a:ext cx="3248208" cy="1533876"/>
+            </a:xfrm>
+            <a:prstGeom prst="rect">
+              <a:avLst/>
+            </a:prstGeom>
+          </p:spPr>
+        </p:pic>
+        <p:pic>
+          <p:nvPicPr>
+            <p:cNvPr id="106" name="Image 105" descr="g-lts.png"/>
+            <p:cNvPicPr>
+              <a:picLocks noChangeAspect="1"/>
+            </p:cNvPicPr>
+            <p:nvPr/>
+          </p:nvPicPr>
+          <p:blipFill>
+            <a:blip r:embed="rId3" cstate="print"/>
+            <a:stretch>
+              <a:fillRect/>
+            </a:stretch>
+          </p:blipFill>
+          <p:spPr>
+            <a:xfrm>
+              <a:off x="3360064" y="2708920"/>
+              <a:ext cx="3163288" cy="1847022"/>
+            </a:xfrm>
+            <a:prstGeom prst="rect">
+              <a:avLst/>
+            </a:prstGeom>
+          </p:spPr>
+        </p:pic>
+        <p:pic>
+          <p:nvPicPr>
+            <p:cNvPr id="110" name="Image 109" descr="lts.png"/>
+            <p:cNvPicPr>
+              <a:picLocks noChangeAspect="1"/>
+            </p:cNvPicPr>
+            <p:nvPr/>
+          </p:nvPicPr>
+          <p:blipFill>
+            <a:blip r:embed="rId4" cstate="print"/>
+            <a:stretch>
+              <a:fillRect/>
+            </a:stretch>
+          </p:blipFill>
+          <p:spPr>
+            <a:xfrm>
+              <a:off x="3131840" y="5171346"/>
+              <a:ext cx="3619736" cy="1034968"/>
+            </a:xfrm>
+            <a:prstGeom prst="rect">
+              <a:avLst/>
+            </a:prstGeom>
+          </p:spPr>
+        </p:pic>
+        <p:sp>
+          <p:nvSpPr>
+            <p:cNvPr id="114" name="ZoneTexte 113"/>
+            <p:cNvSpPr txBox="1"/>
+            <p:nvPr/>
+          </p:nvSpPr>
+          <p:spPr>
+            <a:xfrm>
+              <a:off x="683568" y="4996333"/>
+              <a:ext cx="2259273" cy="1384995"/>
+            </a:xfrm>
+            <a:prstGeom prst="rect">
+              <a:avLst/>
+            </a:prstGeom>
+            <a:noFill/>
+          </p:spPr>
+          <p:txBody>
+            <a:bodyPr wrap="none" rtlCol="0">
+              <a:spAutoFit/>
+            </a:bodyPr>
+            <a:lstStyle/>
+            <a:p>
+              <a:r>
+                <a:rPr lang="fr-BE" sz="2400" dirty="0" smtClean="0"/>
+                <a:t>LTS</a:t>
+              </a:r>
+              <a:endParaRPr lang="fr-BE" sz="2400" dirty="0" smtClean="0"/>
+            </a:p>
+            <a:p>
+              <a:pPr marL="360363" indent="-180975">
+                <a:buFont typeface="Arial" charset="0"/>
+                <a:buChar char="•"/>
+              </a:pPr>
+              <a:r>
+                <a:rPr lang="fr-BE" sz="2000" dirty="0" smtClean="0"/>
+                <a:t>Trace-</a:t>
+              </a:r>
+              <a:r>
+                <a:rPr lang="fr-BE" sz="2000" dirty="0" err="1" smtClean="0"/>
+                <a:t>based</a:t>
+              </a:r>
+              <a:r>
+                <a:rPr lang="fr-BE" sz="2000" dirty="0" smtClean="0"/>
+                <a:t>  </a:t>
+              </a:r>
+              <a:br>
+                <a:rPr lang="fr-BE" sz="2000" dirty="0" smtClean="0"/>
+              </a:br>
+              <a:r>
+                <a:rPr lang="fr-BE" sz="2000" dirty="0" smtClean="0"/>
+                <a:t>model-</a:t>
+              </a:r>
+              <a:r>
+                <a:rPr lang="fr-BE" sz="2000" dirty="0" err="1" smtClean="0"/>
+                <a:t>checking</a:t>
+              </a:r>
+              <a:r>
+                <a:rPr lang="fr-BE" sz="2000" dirty="0" smtClean="0"/>
+                <a:t> </a:t>
+              </a:r>
+              <a:br>
+                <a:rPr lang="fr-BE" sz="2000" dirty="0" smtClean="0"/>
+              </a:br>
+              <a:r>
+                <a:rPr lang="fr-BE" sz="2000" dirty="0" smtClean="0"/>
+                <a:t>[Dam09, Gia03]</a:t>
+              </a:r>
+              <a:endParaRPr lang="fr-BE" sz="2000" dirty="0" smtClean="0"/>
+            </a:p>
+          </p:txBody>
+        </p:sp>
+        <p:sp>
+          <p:nvSpPr>
+            <p:cNvPr id="115" name="ZoneTexte 114"/>
+            <p:cNvSpPr txBox="1"/>
+            <p:nvPr/>
+          </p:nvSpPr>
+          <p:spPr>
+            <a:xfrm>
+              <a:off x="683568" y="837182"/>
+              <a:ext cx="2341218" cy="769441"/>
+            </a:xfrm>
+            <a:prstGeom prst="rect">
+              <a:avLst/>
+            </a:prstGeom>
+            <a:noFill/>
+          </p:spPr>
+          <p:txBody>
+            <a:bodyPr wrap="none" rtlCol="0">
+              <a:spAutoFit/>
+            </a:bodyPr>
+            <a:lstStyle/>
+            <a:p>
+              <a:r>
+                <a:rPr lang="fr-BE" sz="2400" dirty="0" err="1" smtClean="0"/>
+                <a:t>Guarded</a:t>
+              </a:r>
+              <a:r>
+                <a:rPr lang="fr-BE" sz="2400" dirty="0" smtClean="0"/>
+                <a:t> LTS</a:t>
+              </a:r>
+              <a:endParaRPr lang="fr-BE" sz="2400" dirty="0" smtClean="0"/>
+            </a:p>
+            <a:p>
+              <a:pPr marL="360363" indent="-180975">
+                <a:buFont typeface="Arial" charset="0"/>
+                <a:buChar char="•"/>
+              </a:pPr>
+              <a:r>
+                <a:rPr lang="fr-BE" sz="2000" dirty="0" err="1" smtClean="0"/>
+                <a:t>Process</a:t>
+              </a:r>
+              <a:r>
+                <a:rPr lang="fr-BE" sz="2000" dirty="0" smtClean="0"/>
+                <a:t> </a:t>
+              </a:r>
+              <a:r>
+                <a:rPr lang="fr-BE" sz="2000" dirty="0" err="1" smtClean="0"/>
+                <a:t>language</a:t>
+              </a:r>
+              <a:endParaRPr lang="fr-BE" sz="2000" dirty="0" smtClean="0"/>
+            </a:p>
+          </p:txBody>
+        </p:sp>
       </p:grpSp>
     </p:spTree>
   </p:cSld>
@@ -15900,15 +16401,96 @@
             <a:p>
               <a:pPr algn="ctr"/>
               <a:r>
-                <a:rPr lang="fr-BE" sz="1000" b="1" smtClean="0">
+                <a:rPr lang="fr-BE" sz="1000" b="1" dirty="0" err="1" smtClean="0">
                   <a:solidFill>
                     <a:schemeClr val="tx1"/>
                   </a:solidFill>
                   <a:latin typeface="+mj-lt"/>
                 </a:rPr>
-                <a:t>Maintain[Doors Closed While Moving]</a:t>
+                <a:t>Maintain</a:t>
               </a:r>
-              <a:endParaRPr lang="fr-BE" sz="1000" b="1">
+              <a:r>
+                <a:rPr lang="fr-BE" sz="1000" b="1" dirty="0" smtClean="0">
+                  <a:solidFill>
+                    <a:schemeClr val="tx1"/>
+                  </a:solidFill>
+                  <a:latin typeface="+mj-lt"/>
+                </a:rPr>
+                <a:t>[</a:t>
+              </a:r>
+              <a:r>
+                <a:rPr lang="fr-BE" sz="1000" b="1" dirty="0" err="1" smtClean="0">
+                  <a:solidFill>
+                    <a:schemeClr val="tx1"/>
+                  </a:solidFill>
+                  <a:latin typeface="+mj-lt"/>
+                </a:rPr>
+                <a:t>Doors</a:t>
+              </a:r>
+              <a:r>
+                <a:rPr lang="fr-BE" sz="1000" b="1" dirty="0" smtClean="0">
+                  <a:solidFill>
+                    <a:schemeClr val="tx1"/>
+                  </a:solidFill>
+                  <a:latin typeface="+mj-lt"/>
+                </a:rPr>
+                <a:t> </a:t>
+              </a:r>
+              <a:r>
+                <a:rPr lang="fr-BE" sz="1000" b="1" dirty="0" err="1" smtClean="0">
+                  <a:solidFill>
+                    <a:schemeClr val="tx1"/>
+                  </a:solidFill>
+                  <a:latin typeface="+mj-lt"/>
+                </a:rPr>
+                <a:t>Closed</a:t>
+              </a:r>
+              <a:r>
+                <a:rPr lang="fr-BE" sz="1000" b="1" dirty="0" smtClean="0">
+                  <a:solidFill>
+                    <a:schemeClr val="tx1"/>
+                  </a:solidFill>
+                  <a:latin typeface="+mj-lt"/>
+                </a:rPr>
+                <a:t> </a:t>
+              </a:r>
+              <a:r>
+                <a:rPr lang="fr-BE" sz="1000" b="1" dirty="0" err="1" smtClean="0">
+                  <a:solidFill>
+                    <a:schemeClr val="tx1"/>
+                  </a:solidFill>
+                  <a:latin typeface="+mj-lt"/>
+                </a:rPr>
+                <a:t>While</a:t>
+              </a:r>
+              <a:r>
+                <a:rPr lang="fr-BE" sz="1000" b="1" dirty="0" smtClean="0">
+                  <a:solidFill>
+                    <a:schemeClr val="tx1"/>
+                  </a:solidFill>
+                  <a:latin typeface="+mj-lt"/>
+                </a:rPr>
+                <a:t> </a:t>
+              </a:r>
+              <a:r>
+                <a:rPr lang="fr-BE" sz="1000" b="1" dirty="0" err="1" smtClean="0">
+                  <a:solidFill>
+                    <a:schemeClr val="tx1"/>
+                  </a:solidFill>
+                  <a:latin typeface="+mj-lt"/>
+                </a:rPr>
+                <a:t>Moving</a:t>
+              </a:r>
+              <a:r>
+                <a:rPr lang="fr-BE" sz="1000" b="1" dirty="0" smtClean="0">
+                  <a:solidFill>
+                    <a:schemeClr val="tx1"/>
+                  </a:solidFill>
+                  <a:latin typeface="+mj-lt"/>
+                </a:rPr>
+                <a:t>]</a:t>
+              </a:r>
+              <a:endParaRPr lang="fr-BE" sz="1000" b="1" dirty="0">
                 <a:solidFill>
                   <a:schemeClr val="tx1"/>
                 </a:solidFill>

</xml_diff>

<commit_message>
Added two images for the gisele tool
</commit_message>
<xml_diff>
--- a/writing/images/train.pptx
+++ b/writing/images/train.pptx
@@ -5,7 +5,7 @@
     <p:sldMasterId id="2147483648" r:id="rId1"/>
   </p:sldMasterIdLst>
   <p:notesMasterIdLst>
-    <p:notesMasterId r:id="rId19"/>
+    <p:notesMasterId r:id="rId21"/>
   </p:notesMasterIdLst>
   <p:sldIdLst>
     <p:sldId id="256" r:id="rId2"/>
@@ -25,6 +25,8 @@
     <p:sldId id="272" r:id="rId16"/>
     <p:sldId id="273" r:id="rId17"/>
     <p:sldId id="274" r:id="rId18"/>
+    <p:sldId id="275" r:id="rId19"/>
+    <p:sldId id="276" r:id="rId20"/>
   </p:sldIdLst>
   <p:sldSz cx="9144000" cy="6858000" type="screen4x3"/>
   <p:notesSz cx="6858000" cy="9144000"/>
@@ -209,7 +211,7 @@
             <a:fld id="{1A5CA47D-05BA-47C5-ACE1-040A60204EDF}" type="datetimeFigureOut">
               <a:rPr lang="fr-FR" smtClean="0"/>
               <a:pPr/>
-              <a:t>26/07/2011</a:t>
+              <a:t>17/08/2011</a:t>
             </a:fld>
             <a:endParaRPr lang="fr-BE"/>
           </a:p>
@@ -739,7 +741,7 @@
             <a:fld id="{68BDF4EC-5B70-45D8-B718-E56EB4C6B13E}" type="datetimeFigureOut">
               <a:rPr lang="fr-BE" smtClean="0"/>
               <a:pPr/>
-              <a:t>26/07/2011</a:t>
+              <a:t>17/08/2011</a:t>
             </a:fld>
             <a:endParaRPr lang="fr-BE"/>
           </a:p>
@@ -906,7 +908,7 @@
             <a:fld id="{68BDF4EC-5B70-45D8-B718-E56EB4C6B13E}" type="datetimeFigureOut">
               <a:rPr lang="fr-BE" smtClean="0"/>
               <a:pPr/>
-              <a:t>26/07/2011</a:t>
+              <a:t>17/08/2011</a:t>
             </a:fld>
             <a:endParaRPr lang="fr-BE"/>
           </a:p>
@@ -1083,7 +1085,7 @@
             <a:fld id="{68BDF4EC-5B70-45D8-B718-E56EB4C6B13E}" type="datetimeFigureOut">
               <a:rPr lang="fr-BE" smtClean="0"/>
               <a:pPr/>
-              <a:t>26/07/2011</a:t>
+              <a:t>17/08/2011</a:t>
             </a:fld>
             <a:endParaRPr lang="fr-BE"/>
           </a:p>
@@ -1250,7 +1252,7 @@
             <a:fld id="{68BDF4EC-5B70-45D8-B718-E56EB4C6B13E}" type="datetimeFigureOut">
               <a:rPr lang="fr-BE" smtClean="0"/>
               <a:pPr/>
-              <a:t>26/07/2011</a:t>
+              <a:t>17/08/2011</a:t>
             </a:fld>
             <a:endParaRPr lang="fr-BE"/>
           </a:p>
@@ -1493,7 +1495,7 @@
             <a:fld id="{68BDF4EC-5B70-45D8-B718-E56EB4C6B13E}" type="datetimeFigureOut">
               <a:rPr lang="fr-BE" smtClean="0"/>
               <a:pPr/>
-              <a:t>26/07/2011</a:t>
+              <a:t>17/08/2011</a:t>
             </a:fld>
             <a:endParaRPr lang="fr-BE"/>
           </a:p>
@@ -1778,7 +1780,7 @@
             <a:fld id="{68BDF4EC-5B70-45D8-B718-E56EB4C6B13E}" type="datetimeFigureOut">
               <a:rPr lang="fr-BE" smtClean="0"/>
               <a:pPr/>
-              <a:t>26/07/2011</a:t>
+              <a:t>17/08/2011</a:t>
             </a:fld>
             <a:endParaRPr lang="fr-BE"/>
           </a:p>
@@ -2197,7 +2199,7 @@
             <a:fld id="{68BDF4EC-5B70-45D8-B718-E56EB4C6B13E}" type="datetimeFigureOut">
               <a:rPr lang="fr-BE" smtClean="0"/>
               <a:pPr/>
-              <a:t>26/07/2011</a:t>
+              <a:t>17/08/2011</a:t>
             </a:fld>
             <a:endParaRPr lang="fr-BE"/>
           </a:p>
@@ -2312,7 +2314,7 @@
             <a:fld id="{68BDF4EC-5B70-45D8-B718-E56EB4C6B13E}" type="datetimeFigureOut">
               <a:rPr lang="fr-BE" smtClean="0"/>
               <a:pPr/>
-              <a:t>26/07/2011</a:t>
+              <a:t>17/08/2011</a:t>
             </a:fld>
             <a:endParaRPr lang="fr-BE"/>
           </a:p>
@@ -2404,7 +2406,7 @@
             <a:fld id="{68BDF4EC-5B70-45D8-B718-E56EB4C6B13E}" type="datetimeFigureOut">
               <a:rPr lang="fr-BE" smtClean="0"/>
               <a:pPr/>
-              <a:t>26/07/2011</a:t>
+              <a:t>17/08/2011</a:t>
             </a:fld>
             <a:endParaRPr lang="fr-BE"/>
           </a:p>
@@ -2678,7 +2680,7 @@
             <a:fld id="{68BDF4EC-5B70-45D8-B718-E56EB4C6B13E}" type="datetimeFigureOut">
               <a:rPr lang="fr-BE" smtClean="0"/>
               <a:pPr/>
-              <a:t>26/07/2011</a:t>
+              <a:t>17/08/2011</a:t>
             </a:fld>
             <a:endParaRPr lang="fr-BE"/>
           </a:p>
@@ -2928,7 +2930,7 @@
             <a:fld id="{68BDF4EC-5B70-45D8-B718-E56EB4C6B13E}" type="datetimeFigureOut">
               <a:rPr lang="fr-BE" smtClean="0"/>
               <a:pPr/>
-              <a:t>26/07/2011</a:t>
+              <a:t>17/08/2011</a:t>
             </a:fld>
             <a:endParaRPr lang="fr-BE"/>
           </a:p>
@@ -3138,7 +3140,7 @@
             <a:fld id="{68BDF4EC-5B70-45D8-B718-E56EB4C6B13E}" type="datetimeFigureOut">
               <a:rPr lang="fr-BE" smtClean="0"/>
               <a:pPr/>
-              <a:t>26/07/2011</a:t>
+              <a:t>17/08/2011</a:t>
             </a:fld>
             <a:endParaRPr lang="fr-BE"/>
           </a:p>
@@ -15639,13 +15641,6 @@
                 </a:rPr>
                 <a:t>Merging </a:t>
               </a:r>
-              <a:r>
-                <a:rPr lang="fr-BE" sz="1400" noProof="1" smtClean="0">
-                  <a:latin typeface="Arial" pitchFamily="34" charset="0"/>
-                  <a:cs typeface="Arial" pitchFamily="34" charset="0"/>
-                </a:rPr>
-                <a:t/>
-              </a:r>
               <a:br>
                 <a:rPr lang="fr-BE" sz="1400" noProof="1" smtClean="0">
                   <a:latin typeface="Arial" pitchFamily="34" charset="0"/>
@@ -15657,14 +15652,7 @@
                   <a:latin typeface="Arial" pitchFamily="34" charset="0"/>
                   <a:cs typeface="Arial" pitchFamily="34" charset="0"/>
                 </a:rPr>
-                <a:t>q=3 </a:t>
-              </a:r>
-              <a:r>
-                <a:rPr lang="fr-BE" sz="1400" noProof="1" smtClean="0">
-                  <a:latin typeface="Arial" pitchFamily="34" charset="0"/>
-                  <a:cs typeface="Arial" pitchFamily="34" charset="0"/>
-                </a:rPr>
-                <a:t>and q’=0</a:t>
+                <a:t>q=3 and q’=0</a:t>
               </a:r>
               <a:endParaRPr lang="fr-BE" sz="1400" noProof="1">
                 <a:latin typeface="Arial" pitchFamily="34" charset="0"/>
@@ -17272,6 +17260,1247 @@
             </a:fontRef>
           </p:style>
         </p:cxnSp>
+      </p:grpSp>
+    </p:spTree>
+  </p:cSld>
+  <p:clrMapOvr>
+    <a:masterClrMapping/>
+  </p:clrMapOvr>
+</p:sld>
+</file>
+
+<file path=ppt/slides/slide18.xml><?xml version="1.0" encoding="utf-8"?>
+<p:sld xmlns:a="http://schemas.openxmlformats.org/drawingml/2006/main" xmlns:r="http://schemas.openxmlformats.org/officeDocument/2006/relationships" xmlns:p="http://schemas.openxmlformats.org/presentationml/2006/main">
+  <p:cSld>
+    <p:spTree>
+      <p:nvGrpSpPr>
+        <p:cNvPr id="1" name=""/>
+        <p:cNvGrpSpPr/>
+        <p:nvPr/>
+      </p:nvGrpSpPr>
+      <p:grpSpPr>
+        <a:xfrm>
+          <a:off x="0" y="0"/>
+          <a:ext cx="0" cy="0"/>
+          <a:chOff x="0" y="0"/>
+          <a:chExt cx="0" cy="0"/>
+        </a:xfrm>
+      </p:grpSpPr>
+      <p:sp>
+        <p:nvSpPr>
+          <p:cNvPr id="15" name="Rectangle 14"/>
+          <p:cNvSpPr/>
+          <p:nvPr/>
+        </p:nvSpPr>
+        <p:spPr>
+          <a:xfrm>
+            <a:off x="179512" y="332656"/>
+            <a:ext cx="8784976" cy="6264696"/>
+          </a:xfrm>
+          <a:prstGeom prst="rect">
+            <a:avLst/>
+          </a:prstGeom>
+          <a:solidFill>
+            <a:schemeClr val="bg1"/>
+          </a:solidFill>
+          <a:ln w="3175"/>
+        </p:spPr>
+        <p:style>
+          <a:lnRef idx="2">
+            <a:schemeClr val="dk1"/>
+          </a:lnRef>
+          <a:fillRef idx="1">
+            <a:schemeClr val="lt1"/>
+          </a:fillRef>
+          <a:effectRef idx="0">
+            <a:schemeClr val="dk1"/>
+          </a:effectRef>
+          <a:fontRef idx="minor">
+            <a:schemeClr val="dk1"/>
+          </a:fontRef>
+        </p:style>
+        <p:txBody>
+          <a:bodyPr rtlCol="0" anchor="ctr"/>
+          <a:lstStyle/>
+          <a:p>
+            <a:pPr algn="ctr"/>
+            <a:endParaRPr lang="fr-BE"/>
+          </a:p>
+        </p:txBody>
+      </p:sp>
+      <p:pic>
+        <p:nvPicPr>
+          <p:cNvPr id="4" name="Image 4" descr="tool.png"/>
+          <p:cNvPicPr>
+            <a:picLocks noChangeAspect="1"/>
+          </p:cNvPicPr>
+          <p:nvPr/>
+        </p:nvPicPr>
+        <p:blipFill>
+          <a:blip r:embed="rId2" cstate="print"/>
+          <a:stretch>
+            <a:fillRect/>
+          </a:stretch>
+        </p:blipFill>
+        <p:spPr bwMode="auto">
+          <a:xfrm>
+            <a:off x="323528" y="476672"/>
+            <a:ext cx="8501062" cy="5616575"/>
+          </a:xfrm>
+          <a:prstGeom prst="rect">
+            <a:avLst/>
+          </a:prstGeom>
+          <a:ln w="31750">
+            <a:solidFill>
+              <a:schemeClr val="tx2"/>
+            </a:solidFill>
+          </a:ln>
+          <a:effectLst>
+            <a:outerShdw blurRad="292100" dist="139700" dir="2700000" algn="tl" rotWithShape="0">
+              <a:srgbClr val="333333">
+                <a:alpha val="65000"/>
+              </a:srgbClr>
+            </a:outerShdw>
+          </a:effectLst>
+        </p:spPr>
+      </p:pic>
+      <p:cxnSp>
+        <p:nvCxnSpPr>
+          <p:cNvPr id="6" name="Connecteur droit 15"/>
+          <p:cNvCxnSpPr>
+            <a:cxnSpLocks noChangeShapeType="1"/>
+          </p:cNvCxnSpPr>
+          <p:nvPr/>
+        </p:nvCxnSpPr>
+        <p:spPr bwMode="auto">
+          <a:xfrm flipV="1">
+            <a:off x="3635896" y="2924946"/>
+            <a:ext cx="1440160" cy="576062"/>
+          </a:xfrm>
+          <a:prstGeom prst="line">
+            <a:avLst/>
+          </a:prstGeom>
+          <a:noFill/>
+          <a:ln w="57150" algn="ctr">
+            <a:solidFill>
+              <a:schemeClr val="tx2"/>
+            </a:solidFill>
+            <a:prstDash val="sysDash"/>
+            <a:round/>
+            <a:headEnd/>
+            <a:tailEnd/>
+          </a:ln>
+        </p:spPr>
+      </p:cxnSp>
+      <p:cxnSp>
+        <p:nvCxnSpPr>
+          <p:cNvPr id="9" name="Connecteur droit 15"/>
+          <p:cNvCxnSpPr>
+            <a:cxnSpLocks noChangeShapeType="1"/>
+          </p:cNvCxnSpPr>
+          <p:nvPr/>
+        </p:nvCxnSpPr>
+        <p:spPr bwMode="auto">
+          <a:xfrm rot="16200000" flipH="1">
+            <a:off x="2984314" y="4368614"/>
+            <a:ext cx="2747268" cy="1444104"/>
+          </a:xfrm>
+          <a:prstGeom prst="line">
+            <a:avLst/>
+          </a:prstGeom>
+          <a:noFill/>
+          <a:ln w="57150" algn="ctr">
+            <a:solidFill>
+              <a:schemeClr val="tx2"/>
+            </a:solidFill>
+            <a:prstDash val="sysDash"/>
+            <a:round/>
+            <a:headEnd/>
+            <a:tailEnd/>
+          </a:ln>
+        </p:spPr>
+      </p:cxnSp>
+      <p:pic>
+        <p:nvPicPr>
+          <p:cNvPr id="5" name="Picture 9" descr="C:\Documents and Settings\blambeau\Mes documents\Downloads\guard_hmsc.png"/>
+          <p:cNvPicPr>
+            <a:picLocks noChangeAspect="1" noChangeArrowheads="1"/>
+          </p:cNvPicPr>
+          <p:nvPr/>
+        </p:nvPicPr>
+        <p:blipFill>
+          <a:blip r:embed="rId3" cstate="print"/>
+          <a:srcRect t="-2687"/>
+          <a:stretch>
+            <a:fillRect/>
+          </a:stretch>
+        </p:blipFill>
+        <p:spPr bwMode="auto">
+          <a:xfrm>
+            <a:off x="5076056" y="2924944"/>
+            <a:ext cx="2460625" cy="3541712"/>
+          </a:xfrm>
+          <a:prstGeom prst="rect">
+            <a:avLst/>
+          </a:prstGeom>
+          <a:solidFill>
+            <a:schemeClr val="bg1"/>
+          </a:solidFill>
+          <a:ln w="31750">
+            <a:solidFill>
+              <a:schemeClr val="tx2"/>
+            </a:solidFill>
+          </a:ln>
+          <a:effectLst>
+            <a:outerShdw blurRad="292100" dist="139700" dir="2700000" algn="tl" rotWithShape="0">
+              <a:srgbClr val="333333">
+                <a:alpha val="65000"/>
+              </a:srgbClr>
+            </a:outerShdw>
+          </a:effectLst>
+        </p:spPr>
+      </p:pic>
+    </p:spTree>
+  </p:cSld>
+  <p:clrMapOvr>
+    <a:masterClrMapping/>
+  </p:clrMapOvr>
+</p:sld>
+</file>
+
+<file path=ppt/slides/slide19.xml><?xml version="1.0" encoding="utf-8"?>
+<p:sld xmlns:a="http://schemas.openxmlformats.org/drawingml/2006/main" xmlns:r="http://schemas.openxmlformats.org/officeDocument/2006/relationships" xmlns:p="http://schemas.openxmlformats.org/presentationml/2006/main">
+  <p:cSld>
+    <p:spTree>
+      <p:nvGrpSpPr>
+        <p:cNvPr id="1" name=""/>
+        <p:cNvGrpSpPr/>
+        <p:nvPr/>
+      </p:nvGrpSpPr>
+      <p:grpSpPr>
+        <a:xfrm>
+          <a:off x="0" y="0"/>
+          <a:ext cx="0" cy="0"/>
+          <a:chOff x="0" y="0"/>
+          <a:chExt cx="0" cy="0"/>
+        </a:xfrm>
+      </p:grpSpPr>
+      <p:sp>
+        <p:nvSpPr>
+          <p:cNvPr id="93" name="Rectangle 92"/>
+          <p:cNvSpPr/>
+          <p:nvPr/>
+        </p:nvSpPr>
+        <p:spPr>
+          <a:xfrm>
+            <a:off x="179512" y="908720"/>
+            <a:ext cx="8784976" cy="5112568"/>
+          </a:xfrm>
+          <a:prstGeom prst="rect">
+            <a:avLst/>
+          </a:prstGeom>
+          <a:solidFill>
+            <a:schemeClr val="bg1"/>
+          </a:solidFill>
+          <a:ln w="3175"/>
+        </p:spPr>
+        <p:style>
+          <a:lnRef idx="2">
+            <a:schemeClr val="dk1"/>
+          </a:lnRef>
+          <a:fillRef idx="1">
+            <a:schemeClr val="lt1"/>
+          </a:fillRef>
+          <a:effectRef idx="0">
+            <a:schemeClr val="dk1"/>
+          </a:effectRef>
+          <a:fontRef idx="minor">
+            <a:schemeClr val="dk1"/>
+          </a:fontRef>
+        </p:style>
+        <p:txBody>
+          <a:bodyPr rtlCol="0" anchor="ctr"/>
+          <a:lstStyle/>
+          <a:p>
+            <a:pPr algn="ctr"/>
+            <a:endParaRPr lang="fr-BE"/>
+          </a:p>
+        </p:txBody>
+      </p:sp>
+      <p:grpSp>
+        <p:nvGrpSpPr>
+          <p:cNvPr id="92" name="Groupe 91"/>
+          <p:cNvGrpSpPr/>
+          <p:nvPr/>
+        </p:nvGrpSpPr>
+        <p:grpSpPr>
+          <a:xfrm>
+            <a:off x="323528" y="1124744"/>
+            <a:ext cx="8568952" cy="4689812"/>
+            <a:chOff x="323528" y="1124744"/>
+            <a:chExt cx="8568952" cy="4689812"/>
+          </a:xfrm>
+        </p:grpSpPr>
+        <p:sp>
+          <p:nvSpPr>
+            <p:cNvPr id="4" name="Rectangle à coins arrondis 3"/>
+            <p:cNvSpPr/>
+            <p:nvPr/>
+          </p:nvSpPr>
+          <p:spPr>
+            <a:xfrm>
+              <a:off x="4932040" y="2001638"/>
+              <a:ext cx="3960000" cy="648000"/>
+            </a:xfrm>
+            <a:prstGeom prst="roundRect">
+              <a:avLst/>
+            </a:prstGeom>
+          </p:spPr>
+          <p:style>
+            <a:lnRef idx="2">
+              <a:schemeClr val="dk1"/>
+            </a:lnRef>
+            <a:fillRef idx="1">
+              <a:schemeClr val="lt1"/>
+            </a:fillRef>
+            <a:effectRef idx="0">
+              <a:schemeClr val="dk1"/>
+            </a:effectRef>
+            <a:fontRef idx="minor">
+              <a:schemeClr val="dk1"/>
+            </a:fontRef>
+          </p:style>
+          <p:txBody>
+            <a:bodyPr rtlCol="0" anchor="ctr"/>
+            <a:lstStyle/>
+            <a:p>
+              <a:pPr algn="ctr"/>
+              <a:r>
+                <a:rPr lang="fr-BE" noProof="1" smtClean="0"/>
+                <a:t>Automaton</a:t>
+              </a:r>
+              <a:r>
+                <a:rPr lang="fr-BE" noProof="1" smtClean="0"/>
+                <a:t> </a:t>
+              </a:r>
+              <a:r>
+                <a:rPr lang="fr-BE" noProof="1" smtClean="0"/>
+                <a:t>Toolkit (LTS + g-LTS)</a:t>
+              </a:r>
+              <a:endParaRPr lang="fr-BE" noProof="1" smtClean="0"/>
+            </a:p>
+            <a:p>
+              <a:pPr algn="ctr"/>
+              <a:r>
+                <a:rPr lang="fr-BE" noProof="1" smtClean="0"/>
+                <a:t>(stamina)</a:t>
+              </a:r>
+              <a:endParaRPr lang="fr-BE" noProof="1"/>
+            </a:p>
+          </p:txBody>
+        </p:sp>
+        <p:sp>
+          <p:nvSpPr>
+            <p:cNvPr id="5" name="Rectangle à coins arrondis 4"/>
+            <p:cNvSpPr/>
+            <p:nvPr/>
+          </p:nvSpPr>
+          <p:spPr>
+            <a:xfrm>
+              <a:off x="4932040" y="2816968"/>
+              <a:ext cx="1512168" cy="648000"/>
+            </a:xfrm>
+            <a:prstGeom prst="roundRect">
+              <a:avLst/>
+            </a:prstGeom>
+          </p:spPr>
+          <p:style>
+            <a:lnRef idx="2">
+              <a:schemeClr val="dk1"/>
+            </a:lnRef>
+            <a:fillRef idx="1">
+              <a:schemeClr val="lt1"/>
+            </a:fillRef>
+            <a:effectRef idx="0">
+              <a:schemeClr val="dk1"/>
+            </a:effectRef>
+            <a:fontRef idx="minor">
+              <a:schemeClr val="dk1"/>
+            </a:fontRef>
+          </p:style>
+          <p:txBody>
+            <a:bodyPr rtlCol="0" anchor="ctr"/>
+            <a:lstStyle/>
+            <a:p>
+              <a:pPr algn="ctr"/>
+              <a:r>
+                <a:rPr lang="fr-BE" noProof="1" smtClean="0"/>
+                <a:t>Graph Toolkit </a:t>
+              </a:r>
+              <a:endParaRPr lang="fr-BE" noProof="1" smtClean="0"/>
+            </a:p>
+            <a:p>
+              <a:pPr algn="ctr"/>
+              <a:r>
+                <a:rPr lang="fr-BE" noProof="1" smtClean="0"/>
+                <a:t>(yargi)</a:t>
+              </a:r>
+              <a:endParaRPr lang="fr-BE" noProof="1"/>
+            </a:p>
+          </p:txBody>
+        </p:sp>
+        <p:sp>
+          <p:nvSpPr>
+            <p:cNvPr id="6" name="Rectangle à coins arrondis 5"/>
+            <p:cNvSpPr/>
+            <p:nvPr/>
+          </p:nvSpPr>
+          <p:spPr>
+            <a:xfrm>
+              <a:off x="323528" y="1124744"/>
+              <a:ext cx="1008112" cy="4032448"/>
+            </a:xfrm>
+            <a:prstGeom prst="roundRect">
+              <a:avLst/>
+            </a:prstGeom>
+          </p:spPr>
+          <p:style>
+            <a:lnRef idx="2">
+              <a:schemeClr val="dk1"/>
+            </a:lnRef>
+            <a:fillRef idx="1">
+              <a:schemeClr val="lt1"/>
+            </a:fillRef>
+            <a:effectRef idx="0">
+              <a:schemeClr val="dk1"/>
+            </a:effectRef>
+            <a:fontRef idx="minor">
+              <a:schemeClr val="dk1"/>
+            </a:fontRef>
+          </p:style>
+          <p:txBody>
+            <a:bodyPr rtlCol="0" anchor="ctr"/>
+            <a:lstStyle/>
+            <a:p>
+              <a:pPr algn="ctr"/>
+              <a:r>
+                <a:rPr lang="fr-BE" noProof="1" smtClean="0"/>
+                <a:t>Web GUI</a:t>
+              </a:r>
+            </a:p>
+          </p:txBody>
+        </p:sp>
+        <p:sp>
+          <p:nvSpPr>
+            <p:cNvPr id="7" name="Rectangle à coins arrondis 6"/>
+            <p:cNvSpPr/>
+            <p:nvPr/>
+          </p:nvSpPr>
+          <p:spPr>
+            <a:xfrm>
+              <a:off x="1619672" y="1124744"/>
+              <a:ext cx="1080120" cy="4032448"/>
+            </a:xfrm>
+            <a:prstGeom prst="roundRect">
+              <a:avLst/>
+            </a:prstGeom>
+          </p:spPr>
+          <p:style>
+            <a:lnRef idx="2">
+              <a:schemeClr val="dk1"/>
+            </a:lnRef>
+            <a:fillRef idx="1">
+              <a:schemeClr val="lt1"/>
+            </a:fillRef>
+            <a:effectRef idx="0">
+              <a:schemeClr val="dk1"/>
+            </a:effectRef>
+            <a:fontRef idx="minor">
+              <a:schemeClr val="dk1"/>
+            </a:fontRef>
+          </p:style>
+          <p:txBody>
+            <a:bodyPr rtlCol="0" anchor="ctr"/>
+            <a:lstStyle/>
+            <a:p>
+              <a:pPr algn="ctr"/>
+              <a:r>
+                <a:rPr lang="fr-BE" noProof="1" smtClean="0"/>
+                <a:t>Pathway</a:t>
+              </a:r>
+            </a:p>
+            <a:p>
+              <a:pPr algn="ctr"/>
+              <a:r>
+                <a:rPr lang="fr-BE" noProof="1" smtClean="0"/>
+                <a:t>Rich Model</a:t>
+              </a:r>
+            </a:p>
+          </p:txBody>
+        </p:sp>
+        <p:sp>
+          <p:nvSpPr>
+            <p:cNvPr id="8" name="Rectangle à coins arrondis 7"/>
+            <p:cNvSpPr/>
+            <p:nvPr/>
+          </p:nvSpPr>
+          <p:spPr>
+            <a:xfrm>
+              <a:off x="4932040" y="1124744"/>
+              <a:ext cx="3960440" cy="648000"/>
+            </a:xfrm>
+            <a:prstGeom prst="roundRect">
+              <a:avLst/>
+            </a:prstGeom>
+          </p:spPr>
+          <p:style>
+            <a:lnRef idx="2">
+              <a:schemeClr val="dk1"/>
+            </a:lnRef>
+            <a:fillRef idx="1">
+              <a:schemeClr val="lt1"/>
+            </a:fillRef>
+            <a:effectRef idx="0">
+              <a:schemeClr val="dk1"/>
+            </a:effectRef>
+            <a:fontRef idx="minor">
+              <a:schemeClr val="dk1"/>
+            </a:fontRef>
+          </p:style>
+          <p:txBody>
+            <a:bodyPr rtlCol="0" anchor="ctr"/>
+            <a:lstStyle/>
+            <a:p>
+              <a:pPr algn="ctr"/>
+              <a:r>
+                <a:rPr lang="fr-BE" noProof="1" smtClean="0"/>
+                <a:t>Binary Decision Diagrams  (Buddy)</a:t>
+              </a:r>
+              <a:endParaRPr lang="fr-BE" noProof="1"/>
+            </a:p>
+          </p:txBody>
+        </p:sp>
+        <p:sp>
+          <p:nvSpPr>
+            <p:cNvPr id="10" name="Rectangle à coins arrondis 9"/>
+            <p:cNvSpPr/>
+            <p:nvPr/>
+          </p:nvSpPr>
+          <p:spPr>
+            <a:xfrm>
+              <a:off x="6732286" y="3658680"/>
+              <a:ext cx="2159755" cy="648000"/>
+            </a:xfrm>
+            <a:prstGeom prst="roundRect">
+              <a:avLst/>
+            </a:prstGeom>
+          </p:spPr>
+          <p:style>
+            <a:lnRef idx="2">
+              <a:schemeClr val="dk1"/>
+            </a:lnRef>
+            <a:fillRef idx="1">
+              <a:schemeClr val="lt1"/>
+            </a:fillRef>
+            <a:effectRef idx="0">
+              <a:schemeClr val="dk1"/>
+            </a:effectRef>
+            <a:fontRef idx="minor">
+              <a:schemeClr val="dk1"/>
+            </a:fontRef>
+          </p:style>
+          <p:txBody>
+            <a:bodyPr rtlCol="0" anchor="ctr"/>
+            <a:lstStyle/>
+            <a:p>
+              <a:pPr algn="ctr"/>
+              <a:r>
+                <a:rPr lang="fr-BE" noProof="1" smtClean="0"/>
+                <a:t>Parsing &amp; AST Rewriting (anagram)</a:t>
+              </a:r>
+              <a:endParaRPr lang="fr-BE" noProof="1"/>
+            </a:p>
+          </p:txBody>
+        </p:sp>
+        <p:sp>
+          <p:nvSpPr>
+            <p:cNvPr id="11" name="Rectangle à coins arrondis 10"/>
+            <p:cNvSpPr/>
+            <p:nvPr/>
+          </p:nvSpPr>
+          <p:spPr>
+            <a:xfrm>
+              <a:off x="3059832" y="1124744"/>
+              <a:ext cx="1512168" cy="648000"/>
+            </a:xfrm>
+            <a:prstGeom prst="roundRect">
+              <a:avLst/>
+            </a:prstGeom>
+          </p:spPr>
+          <p:style>
+            <a:lnRef idx="2">
+              <a:schemeClr val="dk1"/>
+            </a:lnRef>
+            <a:fillRef idx="1">
+              <a:schemeClr val="lt1"/>
+            </a:fillRef>
+            <a:effectRef idx="0">
+              <a:schemeClr val="dk1"/>
+            </a:effectRef>
+            <a:fontRef idx="minor">
+              <a:schemeClr val="dk1"/>
+            </a:fontRef>
+          </p:style>
+          <p:txBody>
+            <a:bodyPr rtlCol="0" anchor="ctr"/>
+            <a:lstStyle/>
+            <a:p>
+              <a:pPr algn="ctr"/>
+              <a:r>
+                <a:rPr lang="fr-BE" noProof="1" smtClean="0"/>
+                <a:t>Pathway </a:t>
+              </a:r>
+            </a:p>
+            <a:p>
+              <a:pPr algn="ctr"/>
+              <a:r>
+                <a:rPr lang="fr-BE" noProof="1" smtClean="0"/>
+                <a:t>Analyser</a:t>
+              </a:r>
+            </a:p>
+          </p:txBody>
+        </p:sp>
+        <p:sp>
+          <p:nvSpPr>
+            <p:cNvPr id="12" name="Rectangle à coins arrondis 11"/>
+            <p:cNvSpPr/>
+            <p:nvPr/>
+          </p:nvSpPr>
+          <p:spPr>
+            <a:xfrm>
+              <a:off x="6732240" y="2816968"/>
+              <a:ext cx="2159985" cy="648000"/>
+            </a:xfrm>
+            <a:prstGeom prst="roundRect">
+              <a:avLst/>
+            </a:prstGeom>
+          </p:spPr>
+          <p:style>
+            <a:lnRef idx="2">
+              <a:schemeClr val="dk1"/>
+            </a:lnRef>
+            <a:fillRef idx="1">
+              <a:schemeClr val="lt1"/>
+            </a:fillRef>
+            <a:effectRef idx="0">
+              <a:schemeClr val="dk1"/>
+            </a:effectRef>
+            <a:fontRef idx="minor">
+              <a:schemeClr val="dk1"/>
+            </a:fontRef>
+          </p:style>
+          <p:txBody>
+            <a:bodyPr rtlCol="0" anchor="ctr"/>
+            <a:lstStyle/>
+            <a:p>
+              <a:pPr algn="ctr"/>
+              <a:r>
+                <a:rPr lang="fr-BE" noProof="1" smtClean="0"/>
+                <a:t>Graphviz dot </a:t>
+              </a:r>
+              <a:endParaRPr lang="fr-BE" noProof="1" smtClean="0"/>
+            </a:p>
+            <a:p>
+              <a:pPr algn="ctr"/>
+              <a:r>
+                <a:rPr lang="fr-BE" noProof="1" smtClean="0"/>
+                <a:t>(graphviz.org)</a:t>
+              </a:r>
+              <a:endParaRPr lang="fr-BE" noProof="1"/>
+            </a:p>
+          </p:txBody>
+        </p:sp>
+        <p:sp>
+          <p:nvSpPr>
+            <p:cNvPr id="13" name="Rectangle à coins arrondis 12"/>
+            <p:cNvSpPr/>
+            <p:nvPr/>
+          </p:nvSpPr>
+          <p:spPr>
+            <a:xfrm>
+              <a:off x="3059832" y="2816968"/>
+              <a:ext cx="1512168" cy="648000"/>
+            </a:xfrm>
+            <a:prstGeom prst="roundRect">
+              <a:avLst/>
+            </a:prstGeom>
+          </p:spPr>
+          <p:style>
+            <a:lnRef idx="2">
+              <a:schemeClr val="dk1"/>
+            </a:lnRef>
+            <a:fillRef idx="1">
+              <a:schemeClr val="lt1"/>
+            </a:fillRef>
+            <a:effectRef idx="0">
+              <a:schemeClr val="dk1"/>
+            </a:effectRef>
+            <a:fontRef idx="minor">
+              <a:schemeClr val="dk1"/>
+            </a:fontRef>
+          </p:style>
+          <p:txBody>
+            <a:bodyPr rtlCol="0" anchor="ctr"/>
+            <a:lstStyle/>
+            <a:p>
+              <a:pPr algn="ctr"/>
+              <a:r>
+                <a:rPr lang="fr-BE" noProof="1" smtClean="0"/>
+                <a:t>Pathway </a:t>
+              </a:r>
+            </a:p>
+            <a:p>
+              <a:pPr algn="ctr"/>
+              <a:r>
+                <a:rPr lang="fr-BE" noProof="1" smtClean="0"/>
+                <a:t>Converter</a:t>
+              </a:r>
+            </a:p>
+          </p:txBody>
+        </p:sp>
+        <p:cxnSp>
+          <p:nvCxnSpPr>
+            <p:cNvPr id="16" name="Connecteur en angle 15"/>
+            <p:cNvCxnSpPr>
+              <a:stCxn id="5" idx="3"/>
+              <a:endCxn id="12" idx="1"/>
+            </p:cNvCxnSpPr>
+            <p:nvPr/>
+          </p:nvCxnSpPr>
+          <p:spPr>
+            <a:xfrm>
+              <a:off x="6444208" y="3140968"/>
+              <a:ext cx="288032" cy="1588"/>
+            </a:xfrm>
+            <a:prstGeom prst="bentConnector3">
+              <a:avLst>
+                <a:gd name="adj1" fmla="val 50000"/>
+              </a:avLst>
+            </a:prstGeom>
+            <a:ln>
+              <a:tailEnd type="arrow"/>
+            </a:ln>
+          </p:spPr>
+          <p:style>
+            <a:lnRef idx="2">
+              <a:schemeClr val="dk1"/>
+            </a:lnRef>
+            <a:fillRef idx="0">
+              <a:schemeClr val="dk1"/>
+            </a:fillRef>
+            <a:effectRef idx="1">
+              <a:schemeClr val="dk1"/>
+            </a:effectRef>
+            <a:fontRef idx="minor">
+              <a:schemeClr val="tx1"/>
+            </a:fontRef>
+          </p:style>
+        </p:cxnSp>
+        <p:cxnSp>
+          <p:nvCxnSpPr>
+            <p:cNvPr id="17" name="Connecteur en angle 16"/>
+            <p:cNvCxnSpPr>
+              <a:stCxn id="13" idx="3"/>
+              <a:endCxn id="5" idx="1"/>
+            </p:cNvCxnSpPr>
+            <p:nvPr/>
+          </p:nvCxnSpPr>
+          <p:spPr>
+            <a:xfrm>
+              <a:off x="4572000" y="3140968"/>
+              <a:ext cx="360040" cy="1588"/>
+            </a:xfrm>
+            <a:prstGeom prst="bentConnector3">
+              <a:avLst>
+                <a:gd name="adj1" fmla="val 50000"/>
+              </a:avLst>
+            </a:prstGeom>
+            <a:ln>
+              <a:tailEnd type="arrow"/>
+            </a:ln>
+          </p:spPr>
+          <p:style>
+            <a:lnRef idx="2">
+              <a:schemeClr val="dk1"/>
+            </a:lnRef>
+            <a:fillRef idx="0">
+              <a:schemeClr val="dk1"/>
+            </a:fillRef>
+            <a:effectRef idx="1">
+              <a:schemeClr val="dk1"/>
+            </a:effectRef>
+            <a:fontRef idx="minor">
+              <a:schemeClr val="tx1"/>
+            </a:fontRef>
+          </p:style>
+        </p:cxnSp>
+        <p:cxnSp>
+          <p:nvCxnSpPr>
+            <p:cNvPr id="27" name="Connecteur en angle 26"/>
+            <p:cNvCxnSpPr>
+              <a:stCxn id="13" idx="2"/>
+              <a:endCxn id="64" idx="1"/>
+            </p:cNvCxnSpPr>
+            <p:nvPr/>
+          </p:nvCxnSpPr>
+          <p:spPr>
+            <a:xfrm rot="16200000" flipH="1">
+              <a:off x="4115122" y="3165762"/>
+              <a:ext cx="517712" cy="1116124"/>
+            </a:xfrm>
+            <a:prstGeom prst="bentConnector2">
+              <a:avLst/>
+            </a:prstGeom>
+            <a:ln>
+              <a:tailEnd type="arrow"/>
+            </a:ln>
+          </p:spPr>
+          <p:style>
+            <a:lnRef idx="2">
+              <a:schemeClr val="dk1"/>
+            </a:lnRef>
+            <a:fillRef idx="0">
+              <a:schemeClr val="dk1"/>
+            </a:fillRef>
+            <a:effectRef idx="1">
+              <a:schemeClr val="dk1"/>
+            </a:effectRef>
+            <a:fontRef idx="minor">
+              <a:schemeClr val="tx1"/>
+            </a:fontRef>
+          </p:style>
+        </p:cxnSp>
+        <p:cxnSp>
+          <p:nvCxnSpPr>
+            <p:cNvPr id="30" name="Connecteur en angle 26"/>
+            <p:cNvCxnSpPr>
+              <a:stCxn id="13" idx="0"/>
+            </p:cNvCxnSpPr>
+            <p:nvPr/>
+          </p:nvCxnSpPr>
+          <p:spPr>
+            <a:xfrm rot="5400000" flipH="1" flipV="1">
+              <a:off x="4211942" y="2096870"/>
+              <a:ext cx="324072" cy="1116124"/>
+            </a:xfrm>
+            <a:prstGeom prst="bentConnector2">
+              <a:avLst/>
+            </a:prstGeom>
+            <a:ln>
+              <a:tailEnd type="arrow"/>
+            </a:ln>
+          </p:spPr>
+          <p:style>
+            <a:lnRef idx="2">
+              <a:schemeClr val="dk1"/>
+            </a:lnRef>
+            <a:fillRef idx="0">
+              <a:schemeClr val="dk1"/>
+            </a:fillRef>
+            <a:effectRef idx="1">
+              <a:schemeClr val="dk1"/>
+            </a:effectRef>
+            <a:fontRef idx="minor">
+              <a:schemeClr val="tx1"/>
+            </a:fontRef>
+          </p:style>
+        </p:cxnSp>
+        <p:cxnSp>
+          <p:nvCxnSpPr>
+            <p:cNvPr id="34" name="Connecteur en angle 26"/>
+            <p:cNvCxnSpPr>
+              <a:stCxn id="11" idx="2"/>
+            </p:cNvCxnSpPr>
+            <p:nvPr/>
+          </p:nvCxnSpPr>
+          <p:spPr>
+            <a:xfrm rot="16200000" flipH="1">
+              <a:off x="4157918" y="1430742"/>
+              <a:ext cx="432120" cy="1116124"/>
+            </a:xfrm>
+            <a:prstGeom prst="bentConnector2">
+              <a:avLst/>
+            </a:prstGeom>
+            <a:ln>
+              <a:tailEnd type="arrow"/>
+            </a:ln>
+          </p:spPr>
+          <p:style>
+            <a:lnRef idx="2">
+              <a:schemeClr val="dk1"/>
+            </a:lnRef>
+            <a:fillRef idx="0">
+              <a:schemeClr val="dk1"/>
+            </a:fillRef>
+            <a:effectRef idx="1">
+              <a:schemeClr val="dk1"/>
+            </a:effectRef>
+            <a:fontRef idx="minor">
+              <a:schemeClr val="tx1"/>
+            </a:fontRef>
+          </p:style>
+        </p:cxnSp>
+        <p:cxnSp>
+          <p:nvCxnSpPr>
+            <p:cNvPr id="37" name="Connecteur en angle 26"/>
+            <p:cNvCxnSpPr>
+              <a:stCxn id="11" idx="3"/>
+              <a:endCxn id="8" idx="1"/>
+            </p:cNvCxnSpPr>
+            <p:nvPr/>
+          </p:nvCxnSpPr>
+          <p:spPr>
+            <a:xfrm>
+              <a:off x="4572000" y="1448744"/>
+              <a:ext cx="360040" cy="1588"/>
+            </a:xfrm>
+            <a:prstGeom prst="bentConnector3">
+              <a:avLst>
+                <a:gd name="adj1" fmla="val 50000"/>
+              </a:avLst>
+            </a:prstGeom>
+            <a:ln>
+              <a:tailEnd type="arrow"/>
+            </a:ln>
+          </p:spPr>
+          <p:style>
+            <a:lnRef idx="2">
+              <a:schemeClr val="dk1"/>
+            </a:lnRef>
+            <a:fillRef idx="0">
+              <a:schemeClr val="dk1"/>
+            </a:fillRef>
+            <a:effectRef idx="1">
+              <a:schemeClr val="dk1"/>
+            </a:effectRef>
+            <a:fontRef idx="minor">
+              <a:schemeClr val="tx1"/>
+            </a:fontRef>
+          </p:style>
+        </p:cxnSp>
+        <p:cxnSp>
+          <p:nvCxnSpPr>
+            <p:cNvPr id="46" name="Connecteur en angle 26"/>
+            <p:cNvCxnSpPr>
+              <a:endCxn id="11" idx="1"/>
+            </p:cNvCxnSpPr>
+            <p:nvPr/>
+          </p:nvCxnSpPr>
+          <p:spPr>
+            <a:xfrm>
+              <a:off x="2699657" y="1448744"/>
+              <a:ext cx="360175" cy="0"/>
+            </a:xfrm>
+            <a:prstGeom prst="bentConnector3">
+              <a:avLst>
+                <a:gd name="adj1" fmla="val 50000"/>
+              </a:avLst>
+            </a:prstGeom>
+            <a:ln>
+              <a:tailEnd type="arrow"/>
+            </a:ln>
+          </p:spPr>
+          <p:style>
+            <a:lnRef idx="2">
+              <a:schemeClr val="dk1"/>
+            </a:lnRef>
+            <a:fillRef idx="0">
+              <a:schemeClr val="dk1"/>
+            </a:fillRef>
+            <a:effectRef idx="1">
+              <a:schemeClr val="dk1"/>
+            </a:effectRef>
+            <a:fontRef idx="minor">
+              <a:schemeClr val="tx1"/>
+            </a:fontRef>
+          </p:style>
+        </p:cxnSp>
+        <p:cxnSp>
+          <p:nvCxnSpPr>
+            <p:cNvPr id="50" name="Connecteur en angle 26"/>
+            <p:cNvCxnSpPr>
+              <a:stCxn id="7" idx="3"/>
+              <a:endCxn id="13" idx="1"/>
+            </p:cNvCxnSpPr>
+            <p:nvPr/>
+          </p:nvCxnSpPr>
+          <p:spPr>
+            <a:xfrm>
+              <a:off x="2699792" y="3140968"/>
+              <a:ext cx="360040" cy="1588"/>
+            </a:xfrm>
+            <a:prstGeom prst="bentConnector3">
+              <a:avLst>
+                <a:gd name="adj1" fmla="val 50000"/>
+              </a:avLst>
+            </a:prstGeom>
+            <a:ln>
+              <a:tailEnd type="arrow"/>
+            </a:ln>
+          </p:spPr>
+          <p:style>
+            <a:lnRef idx="2">
+              <a:schemeClr val="dk1"/>
+            </a:lnRef>
+            <a:fillRef idx="0">
+              <a:schemeClr val="dk1"/>
+            </a:fillRef>
+            <a:effectRef idx="1">
+              <a:schemeClr val="dk1"/>
+            </a:effectRef>
+            <a:fontRef idx="minor">
+              <a:schemeClr val="tx1"/>
+            </a:fontRef>
+          </p:style>
+        </p:cxnSp>
+        <p:cxnSp>
+          <p:nvCxnSpPr>
+            <p:cNvPr id="52" name="Connecteur en angle 26"/>
+            <p:cNvCxnSpPr>
+              <a:endCxn id="56" idx="1"/>
+            </p:cNvCxnSpPr>
+            <p:nvPr/>
+          </p:nvCxnSpPr>
+          <p:spPr>
+            <a:xfrm>
+              <a:off x="2695575" y="4829175"/>
+              <a:ext cx="2236465" cy="0"/>
+            </a:xfrm>
+            <a:prstGeom prst="bentConnector3">
+              <a:avLst>
+                <a:gd name="adj1" fmla="val 50000"/>
+              </a:avLst>
+            </a:prstGeom>
+            <a:ln>
+              <a:tailEnd type="arrow"/>
+            </a:ln>
+          </p:spPr>
+          <p:style>
+            <a:lnRef idx="2">
+              <a:schemeClr val="dk1"/>
+            </a:lnRef>
+            <a:fillRef idx="0">
+              <a:schemeClr val="dk1"/>
+            </a:fillRef>
+            <a:effectRef idx="1">
+              <a:schemeClr val="dk1"/>
+            </a:effectRef>
+            <a:fontRef idx="minor">
+              <a:schemeClr val="tx1"/>
+            </a:fontRef>
+          </p:style>
+        </p:cxnSp>
+        <p:sp>
+          <p:nvSpPr>
+            <p:cNvPr id="56" name="Rectangle à coins arrondis 55"/>
+            <p:cNvSpPr/>
+            <p:nvPr/>
+          </p:nvSpPr>
+          <p:spPr>
+            <a:xfrm>
+              <a:off x="4932040" y="4509120"/>
+              <a:ext cx="3960440" cy="648000"/>
+            </a:xfrm>
+            <a:prstGeom prst="roundRect">
+              <a:avLst/>
+            </a:prstGeom>
+          </p:spPr>
+          <p:style>
+            <a:lnRef idx="2">
+              <a:schemeClr val="dk1"/>
+            </a:lnRef>
+            <a:fillRef idx="1">
+              <a:schemeClr val="lt1"/>
+            </a:fillRef>
+            <a:effectRef idx="0">
+              <a:schemeClr val="dk1"/>
+            </a:effectRef>
+            <a:fontRef idx="minor">
+              <a:schemeClr val="dk1"/>
+            </a:fontRef>
+          </p:style>
+          <p:txBody>
+            <a:bodyPr rtlCol="0" anchor="ctr"/>
+            <a:lstStyle/>
+            <a:p>
+              <a:pPr algn="ctr"/>
+              <a:r>
+                <a:rPr lang="fr-BE" noProof="1" smtClean="0"/>
+                <a:t>SQL Persistence (sqlite)</a:t>
+              </a:r>
+            </a:p>
+          </p:txBody>
+        </p:sp>
+        <p:sp>
+          <p:nvSpPr>
+            <p:cNvPr id="64" name="Rectangle à coins arrondis 63"/>
+            <p:cNvSpPr/>
+            <p:nvPr/>
+          </p:nvSpPr>
+          <p:spPr>
+            <a:xfrm>
+              <a:off x="4932040" y="3658680"/>
+              <a:ext cx="1512168" cy="648000"/>
+            </a:xfrm>
+            <a:prstGeom prst="roundRect">
+              <a:avLst/>
+            </a:prstGeom>
+          </p:spPr>
+          <p:style>
+            <a:lnRef idx="2">
+              <a:schemeClr val="dk1"/>
+            </a:lnRef>
+            <a:fillRef idx="1">
+              <a:schemeClr val="lt1"/>
+            </a:fillRef>
+            <a:effectRef idx="0">
+              <a:schemeClr val="dk1"/>
+            </a:effectRef>
+            <a:fontRef idx="minor">
+              <a:schemeClr val="dk1"/>
+            </a:fontRef>
+          </p:style>
+          <p:txBody>
+            <a:bodyPr rtlCol="0" anchor="ctr"/>
+            <a:lstStyle/>
+            <a:p>
+              <a:pPr algn="ctr"/>
+              <a:r>
+                <a:rPr lang="fr-BE" noProof="1" smtClean="0"/>
+                <a:t>Pathway language</a:t>
+              </a:r>
+              <a:endParaRPr lang="fr-BE" noProof="1"/>
+            </a:p>
+          </p:txBody>
+        </p:sp>
+        <p:cxnSp>
+          <p:nvCxnSpPr>
+            <p:cNvPr id="83" name="Connecteur en angle 82"/>
+            <p:cNvCxnSpPr>
+              <a:stCxn id="64" idx="3"/>
+              <a:endCxn id="10" idx="1"/>
+            </p:cNvCxnSpPr>
+            <p:nvPr/>
+          </p:nvCxnSpPr>
+          <p:spPr>
+            <a:xfrm>
+              <a:off x="6444208" y="3982680"/>
+              <a:ext cx="288078" cy="1588"/>
+            </a:xfrm>
+            <a:prstGeom prst="bentConnector3">
+              <a:avLst>
+                <a:gd name="adj1" fmla="val 50000"/>
+              </a:avLst>
+            </a:prstGeom>
+            <a:ln>
+              <a:tailEnd type="arrow"/>
+            </a:ln>
+          </p:spPr>
+          <p:style>
+            <a:lnRef idx="2">
+              <a:schemeClr val="dk1"/>
+            </a:lnRef>
+            <a:fillRef idx="0">
+              <a:schemeClr val="dk1"/>
+            </a:fillRef>
+            <a:effectRef idx="1">
+              <a:schemeClr val="dk1"/>
+            </a:effectRef>
+            <a:fontRef idx="minor">
+              <a:schemeClr val="tx1"/>
+            </a:fontRef>
+          </p:style>
+        </p:cxnSp>
+        <p:grpSp>
+          <p:nvGrpSpPr>
+            <p:cNvPr id="90" name="Groupe 89"/>
+            <p:cNvGrpSpPr/>
+            <p:nvPr/>
+          </p:nvGrpSpPr>
+          <p:grpSpPr>
+            <a:xfrm>
+              <a:off x="7740352" y="5445224"/>
+              <a:ext cx="1152128" cy="369332"/>
+              <a:chOff x="899592" y="5445224"/>
+              <a:chExt cx="1152128" cy="369332"/>
+            </a:xfrm>
+          </p:grpSpPr>
+          <p:cxnSp>
+            <p:nvCxnSpPr>
+              <p:cNvPr id="86" name="Connecteur en angle 26"/>
+              <p:cNvCxnSpPr/>
+              <p:nvPr/>
+            </p:nvCxnSpPr>
+            <p:spPr>
+              <a:xfrm>
+                <a:off x="899592" y="5805264"/>
+                <a:ext cx="1152128" cy="1588"/>
+              </a:xfrm>
+              <a:prstGeom prst="bentConnector3">
+                <a:avLst>
+                  <a:gd name="adj1" fmla="val 50000"/>
+                </a:avLst>
+              </a:prstGeom>
+              <a:ln>
+                <a:tailEnd type="arrow"/>
+              </a:ln>
+            </p:spPr>
+            <p:style>
+              <a:lnRef idx="2">
+                <a:schemeClr val="dk1"/>
+              </a:lnRef>
+              <a:fillRef idx="0">
+                <a:schemeClr val="dk1"/>
+              </a:fillRef>
+              <a:effectRef idx="1">
+                <a:schemeClr val="dk1"/>
+              </a:effectRef>
+              <a:fontRef idx="minor">
+                <a:schemeClr val="tx1"/>
+              </a:fontRef>
+            </p:style>
+          </p:cxnSp>
+          <p:sp>
+            <p:nvSpPr>
+              <p:cNvPr id="89" name="ZoneTexte 88"/>
+              <p:cNvSpPr txBox="1"/>
+              <p:nvPr/>
+            </p:nvSpPr>
+            <p:spPr>
+              <a:xfrm>
+                <a:off x="1187624" y="5445224"/>
+                <a:ext cx="537327" cy="369332"/>
+              </a:xfrm>
+              <a:prstGeom prst="rect">
+                <a:avLst/>
+              </a:prstGeom>
+              <a:noFill/>
+            </p:spPr>
+            <p:txBody>
+              <a:bodyPr wrap="none" rtlCol="0">
+                <a:spAutoFit/>
+              </a:bodyPr>
+              <a:lstStyle/>
+              <a:p>
+                <a:r>
+                  <a:rPr lang="fr-BE" dirty="0" smtClean="0"/>
+                  <a:t>Use</a:t>
+                </a:r>
+                <a:endParaRPr lang="fr-BE" dirty="0"/>
+              </a:p>
+            </p:txBody>
+          </p:sp>
+        </p:grpSp>
       </p:grpSp>
     </p:spTree>
   </p:cSld>
@@ -23633,25 +24862,7 @@
                   </a:solidFill>
                   <a:latin typeface="+mj-lt"/>
                 </a:rPr>
-                <a:t>Maintain</a:t>
-              </a:r>
-              <a:r>
-                <a:rPr lang="fr-BE" sz="1300" b="1" noProof="1" smtClean="0">
-                  <a:solidFill>
-                    <a:schemeClr val="tx1"/>
-                  </a:solidFill>
-                  <a:latin typeface="+mj-lt"/>
-                </a:rPr>
-                <a:t>[Doors Closed While </a:t>
-              </a:r>
-              <a:r>
-                <a:rPr lang="fr-BE" sz="1300" b="1" noProof="1" smtClean="0">
-                  <a:solidFill>
-                    <a:schemeClr val="tx1"/>
-                  </a:solidFill>
-                  <a:latin typeface="+mj-lt"/>
-                </a:rPr>
-                <a:t>Moving]</a:t>
+                <a:t>Maintain[Doors Closed While Moving]</a:t>
               </a:r>
               <a:endParaRPr lang="fr-BE" sz="1300" b="1" noProof="1">
                 <a:solidFill>
@@ -23713,25 +24924,7 @@
                   </a:solidFill>
                   <a:latin typeface="+mj-lt"/>
                 </a:rPr>
-                <a:t>Maintain</a:t>
-              </a:r>
-              <a:r>
-                <a:rPr lang="fr-BE" sz="1300" b="1" noProof="1" smtClean="0">
-                  <a:solidFill>
-                    <a:schemeClr val="tx1"/>
-                  </a:solidFill>
-                  <a:latin typeface="+mj-lt"/>
-                </a:rPr>
-                <a:t>[Safe </a:t>
-              </a:r>
-              <a:r>
-                <a:rPr lang="fr-BE" sz="1300" b="1" noProof="1" smtClean="0">
-                  <a:solidFill>
-                    <a:schemeClr val="tx1"/>
-                  </a:solidFill>
-                  <a:latin typeface="+mj-lt"/>
-                </a:rPr>
-                <a:t>Transportation]</a:t>
+                <a:t>Maintain[Safe Transportation]</a:t>
               </a:r>
               <a:endParaRPr lang="fr-BE" sz="1300" b="1" noProof="1">
                 <a:solidFill>
@@ -24016,19 +25209,7 @@
                 <a:rPr lang="fr-BE" sz="1300" b="1" noProof="1" smtClean="0">
                   <a:latin typeface="+mj-lt"/>
                 </a:rPr>
-                <a:t>Starting</a:t>
-              </a:r>
-              <a:r>
-                <a:rPr lang="fr-BE" sz="1300" b="1" noProof="1" smtClean="0">
-                  <a:latin typeface="+mj-lt"/>
-                </a:rPr>
-                <a:t> </a:t>
-              </a:r>
-              <a:r>
-                <a:rPr lang="fr-BE" sz="1300" b="1" noProof="1" smtClean="0">
-                  <a:latin typeface="+mj-lt"/>
-                </a:rPr>
-                <a:t>train</a:t>
+                <a:t>Starting train</a:t>
               </a:r>
               <a:endParaRPr lang="fr-BE" sz="1300" b="1" noProof="1">
                 <a:latin typeface="+mj-lt"/>
@@ -24075,13 +25256,7 @@
                 <a:rPr lang="fr-BE" sz="1300" b="1" noProof="1" smtClean="0">
                   <a:latin typeface="+mj-lt"/>
                 </a:rPr>
-                <a:t>Pressing </a:t>
-              </a:r>
-              <a:r>
-                <a:rPr lang="fr-BE" sz="1300" b="1" noProof="1" smtClean="0">
-                  <a:latin typeface="+mj-lt"/>
-                </a:rPr>
-                <a:t>alarm</a:t>
+                <a:t>Pressing alarm</a:t>
               </a:r>
               <a:endParaRPr lang="fr-BE" sz="1300" b="1" noProof="1">
                 <a:latin typeface="+mj-lt"/>
@@ -24128,13 +25303,7 @@
                 <a:rPr lang="fr-BE" sz="1300" b="1" noProof="1" smtClean="0">
                   <a:latin typeface="+mj-lt"/>
                 </a:rPr>
-                <a:t>Stopping</a:t>
-              </a:r>
-              <a:r>
-                <a:rPr lang="fr-BE" sz="1300" b="1" noProof="1" smtClean="0">
-                  <a:latin typeface="+mj-lt"/>
-                </a:rPr>
-                <a:t> &amp; </a:t>
+                <a:t>Stopping &amp; </a:t>
               </a:r>
               <a:br>
                 <a:rPr lang="fr-BE" sz="1300" b="1" noProof="1" smtClean="0">
@@ -24145,17 +25314,8 @@
                 <a:rPr lang="fr-BE" sz="1300" b="1" noProof="1" smtClean="0">
                   <a:latin typeface="+mj-lt"/>
                 </a:rPr>
-                <a:t>Opening </a:t>
-              </a:r>
-              <a:r>
-                <a:rPr lang="fr-BE" sz="1300" b="1" noProof="1" smtClean="0">
-                  <a:latin typeface="+mj-lt"/>
-                </a:rPr>
-                <a:t>doors</a:t>
-              </a:r>
-              <a:endParaRPr lang="fr-BE" sz="1300" b="1" noProof="1" smtClean="0">
-                <a:latin typeface="+mj-lt"/>
-              </a:endParaRPr>
+                <a:t>Opening doors</a:t>
+              </a:r>
             </a:p>
           </p:txBody>
         </p:sp>
@@ -24198,19 +25358,7 @@
                 <a:rPr lang="fr-BE" sz="1300" b="1" noProof="1" smtClean="0">
                   <a:latin typeface="+mj-lt"/>
                 </a:rPr>
-                <a:t>Closing</a:t>
-              </a:r>
-              <a:r>
-                <a:rPr lang="fr-BE" sz="1300" b="1" noProof="1" smtClean="0">
-                  <a:latin typeface="+mj-lt"/>
-                </a:rPr>
-                <a:t> </a:t>
-              </a:r>
-              <a:r>
-                <a:rPr lang="fr-BE" sz="1300" b="1" noProof="1" smtClean="0">
-                  <a:latin typeface="+mj-lt"/>
-                </a:rPr>
-                <a:t>doors</a:t>
+                <a:t>Closing doors</a:t>
               </a:r>
               <a:endParaRPr lang="fr-BE" sz="1300" b="1" noProof="1">
                 <a:latin typeface="+mj-lt"/>
@@ -24629,9 +25777,6 @@
                 </a:rPr>
                 <a:t>Engine</a:t>
               </a:r>
-              <a:endParaRPr lang="fr-BE" sz="1300" b="1" noProof="1" smtClean="0">
-                <a:latin typeface="+mj-lt"/>
-              </a:endParaRPr>
             </a:p>
           </p:txBody>
         </p:sp>
@@ -24676,9 +25821,6 @@
                 </a:rPr>
                 <a:t>Doors</a:t>
               </a:r>
-              <a:endParaRPr lang="fr-BE" sz="1300" b="1" noProof="1" smtClean="0">
-                <a:latin typeface="+mj-lt"/>
-              </a:endParaRPr>
             </a:p>
           </p:txBody>
         </p:sp>
@@ -25168,13 +26310,7 @@
                 <a:rPr lang="fr-BE" sz="1300" b="1" noProof="1" smtClean="0">
                   <a:latin typeface="+mj-lt"/>
                 </a:rPr>
-                <a:t>Collect</a:t>
-              </a:r>
-              <a:r>
-                <a:rPr lang="fr-BE" sz="1300" b="1" noProof="1" smtClean="0">
-                  <a:latin typeface="+mj-lt"/>
-                </a:rPr>
-                <a:t> </a:t>
+                <a:t>Collect </a:t>
               </a:r>
               <a:br>
                 <a:rPr lang="fr-BE" sz="1300" b="1" noProof="1" smtClean="0">
@@ -25232,13 +26368,7 @@
                 <a:rPr lang="fr-BE" sz="1300" b="1" noProof="1" smtClean="0">
                   <a:latin typeface="+mj-lt"/>
                 </a:rPr>
-                <a:t>Weaken</a:t>
-              </a:r>
-              <a:r>
-                <a:rPr lang="fr-BE" sz="1300" b="1" noProof="1" smtClean="0">
-                  <a:latin typeface="+mj-lt"/>
-                </a:rPr>
-                <a:t> </a:t>
+                <a:t>Weaken </a:t>
               </a:r>
               <a:br>
                 <a:rPr lang="fr-BE" sz="1300" b="1" noProof="1" smtClean="0">
@@ -25298,9 +26428,6 @@
                 </a:rPr>
                 <a:t>Schedule</a:t>
               </a:r>
-              <a:endParaRPr lang="fr-BE" sz="1300" b="1" noProof="1" smtClean="0">
-                <a:latin typeface="+mj-lt"/>
-              </a:endParaRPr>
             </a:p>
           </p:txBody>
         </p:sp>

</xml_diff>

<commit_message>
Added images about model-checker
</commit_message>
<xml_diff>
--- a/writing/images/train.pptx
+++ b/writing/images/train.pptx
@@ -5,7 +5,7 @@
     <p:sldMasterId id="2147483648" r:id="rId1"/>
   </p:sldMasterIdLst>
   <p:notesMasterIdLst>
-    <p:notesMasterId r:id="rId21"/>
+    <p:notesMasterId r:id="rId23"/>
   </p:notesMasterIdLst>
   <p:sldIdLst>
     <p:sldId id="256" r:id="rId2"/>
@@ -27,6 +27,8 @@
     <p:sldId id="274" r:id="rId18"/>
     <p:sldId id="275" r:id="rId19"/>
     <p:sldId id="276" r:id="rId20"/>
+    <p:sldId id="278" r:id="rId21"/>
+    <p:sldId id="279" r:id="rId22"/>
   </p:sldIdLst>
   <p:sldSz cx="9144000" cy="6858000" type="screen4x3"/>
   <p:notesSz cx="6858000" cy="9144000"/>
@@ -211,7 +213,7 @@
             <a:fld id="{1A5CA47D-05BA-47C5-ACE1-040A60204EDF}" type="datetimeFigureOut">
               <a:rPr lang="fr-FR" smtClean="0"/>
               <a:pPr/>
-              <a:t>17/08/2011</a:t>
+              <a:t>25/08/2011</a:t>
             </a:fld>
             <a:endParaRPr lang="fr-BE"/>
           </a:p>
@@ -741,7 +743,7 @@
             <a:fld id="{68BDF4EC-5B70-45D8-B718-E56EB4C6B13E}" type="datetimeFigureOut">
               <a:rPr lang="fr-BE" smtClean="0"/>
               <a:pPr/>
-              <a:t>17/08/2011</a:t>
+              <a:t>25/08/2011</a:t>
             </a:fld>
             <a:endParaRPr lang="fr-BE"/>
           </a:p>
@@ -908,7 +910,7 @@
             <a:fld id="{68BDF4EC-5B70-45D8-B718-E56EB4C6B13E}" type="datetimeFigureOut">
               <a:rPr lang="fr-BE" smtClean="0"/>
               <a:pPr/>
-              <a:t>17/08/2011</a:t>
+              <a:t>25/08/2011</a:t>
             </a:fld>
             <a:endParaRPr lang="fr-BE"/>
           </a:p>
@@ -1085,7 +1087,7 @@
             <a:fld id="{68BDF4EC-5B70-45D8-B718-E56EB4C6B13E}" type="datetimeFigureOut">
               <a:rPr lang="fr-BE" smtClean="0"/>
               <a:pPr/>
-              <a:t>17/08/2011</a:t>
+              <a:t>25/08/2011</a:t>
             </a:fld>
             <a:endParaRPr lang="fr-BE"/>
           </a:p>
@@ -1252,7 +1254,7 @@
             <a:fld id="{68BDF4EC-5B70-45D8-B718-E56EB4C6B13E}" type="datetimeFigureOut">
               <a:rPr lang="fr-BE" smtClean="0"/>
               <a:pPr/>
-              <a:t>17/08/2011</a:t>
+              <a:t>25/08/2011</a:t>
             </a:fld>
             <a:endParaRPr lang="fr-BE"/>
           </a:p>
@@ -1495,7 +1497,7 @@
             <a:fld id="{68BDF4EC-5B70-45D8-B718-E56EB4C6B13E}" type="datetimeFigureOut">
               <a:rPr lang="fr-BE" smtClean="0"/>
               <a:pPr/>
-              <a:t>17/08/2011</a:t>
+              <a:t>25/08/2011</a:t>
             </a:fld>
             <a:endParaRPr lang="fr-BE"/>
           </a:p>
@@ -1780,7 +1782,7 @@
             <a:fld id="{68BDF4EC-5B70-45D8-B718-E56EB4C6B13E}" type="datetimeFigureOut">
               <a:rPr lang="fr-BE" smtClean="0"/>
               <a:pPr/>
-              <a:t>17/08/2011</a:t>
+              <a:t>25/08/2011</a:t>
             </a:fld>
             <a:endParaRPr lang="fr-BE"/>
           </a:p>
@@ -2199,7 +2201,7 @@
             <a:fld id="{68BDF4EC-5B70-45D8-B718-E56EB4C6B13E}" type="datetimeFigureOut">
               <a:rPr lang="fr-BE" smtClean="0"/>
               <a:pPr/>
-              <a:t>17/08/2011</a:t>
+              <a:t>25/08/2011</a:t>
             </a:fld>
             <a:endParaRPr lang="fr-BE"/>
           </a:p>
@@ -2314,7 +2316,7 @@
             <a:fld id="{68BDF4EC-5B70-45D8-B718-E56EB4C6B13E}" type="datetimeFigureOut">
               <a:rPr lang="fr-BE" smtClean="0"/>
               <a:pPr/>
-              <a:t>17/08/2011</a:t>
+              <a:t>25/08/2011</a:t>
             </a:fld>
             <a:endParaRPr lang="fr-BE"/>
           </a:p>
@@ -2406,7 +2408,7 @@
             <a:fld id="{68BDF4EC-5B70-45D8-B718-E56EB4C6B13E}" type="datetimeFigureOut">
               <a:rPr lang="fr-BE" smtClean="0"/>
               <a:pPr/>
-              <a:t>17/08/2011</a:t>
+              <a:t>25/08/2011</a:t>
             </a:fld>
             <a:endParaRPr lang="fr-BE"/>
           </a:p>
@@ -2680,7 +2682,7 @@
             <a:fld id="{68BDF4EC-5B70-45D8-B718-E56EB4C6B13E}" type="datetimeFigureOut">
               <a:rPr lang="fr-BE" smtClean="0"/>
               <a:pPr/>
-              <a:t>17/08/2011</a:t>
+              <a:t>25/08/2011</a:t>
             </a:fld>
             <a:endParaRPr lang="fr-BE"/>
           </a:p>
@@ -2930,7 +2932,7 @@
             <a:fld id="{68BDF4EC-5B70-45D8-B718-E56EB4C6B13E}" type="datetimeFigureOut">
               <a:rPr lang="fr-BE" smtClean="0"/>
               <a:pPr/>
-              <a:t>17/08/2011</a:t>
+              <a:t>25/08/2011</a:t>
             </a:fld>
             <a:endParaRPr lang="fr-BE"/>
           </a:p>
@@ -3140,7 +3142,7 @@
             <a:fld id="{68BDF4EC-5B70-45D8-B718-E56EB4C6B13E}" type="datetimeFigureOut">
               <a:rPr lang="fr-BE" smtClean="0"/>
               <a:pPr/>
-              <a:t>17/08/2011</a:t>
+              <a:t>25/08/2011</a:t>
             </a:fld>
             <a:endParaRPr lang="fr-BE"/>
           </a:p>
@@ -17494,7 +17496,7 @@
         <p:spPr>
           <a:xfrm>
             <a:off x="179512" y="908720"/>
-            <a:ext cx="8784976" cy="5112568"/>
+            <a:ext cx="8784976" cy="4824536"/>
           </a:xfrm>
           <a:prstGeom prst="rect">
             <a:avLst/>
@@ -17536,9 +17538,9 @@
         <p:grpSpPr>
           <a:xfrm>
             <a:off x="323528" y="1124744"/>
-            <a:ext cx="8568952" cy="4689812"/>
+            <a:ext cx="8568952" cy="4464496"/>
             <a:chOff x="323528" y="1124744"/>
-            <a:chExt cx="8568952" cy="4689812"/>
+            <a:chExt cx="8568952" cy="4464496"/>
           </a:xfrm>
         </p:grpSpPr>
         <p:sp>
@@ -17577,23 +17579,22 @@
               <a:pPr algn="ctr"/>
               <a:r>
                 <a:rPr lang="fr-BE" noProof="1" smtClean="0"/>
-                <a:t>Automaton</a:t>
+                <a:t>Automaton </a:t>
               </a:r>
               <a:r>
                 <a:rPr lang="fr-BE" noProof="1" smtClean="0"/>
-                <a:t> </a:t>
+                <a:t>toolkit </a:t>
+              </a:r>
+              <a:br>
+                <a:rPr lang="fr-BE" noProof="1" smtClean="0"/>
+              </a:br>
+              <a:r>
+                <a:rPr lang="fr-BE" noProof="1" smtClean="0"/>
+                <a:t>(</a:t>
               </a:r>
               <a:r>
                 <a:rPr lang="fr-BE" noProof="1" smtClean="0"/>
-                <a:t>Toolkit (LTS + g-LTS)</a:t>
-              </a:r>
-              <a:endParaRPr lang="fr-BE" noProof="1" smtClean="0"/>
-            </a:p>
-            <a:p>
-              <a:pPr algn="ctr"/>
-              <a:r>
-                <a:rPr lang="fr-BE" noProof="1" smtClean="0"/>
-                <a:t>(stamina)</a:t>
+                <a:t>stamina)</a:t>
               </a:r>
               <a:endParaRPr lang="fr-BE" noProof="1"/>
             </a:p>
@@ -17637,7 +17638,6 @@
                 <a:rPr lang="fr-BE" noProof="1" smtClean="0"/>
                 <a:t>Graph Toolkit </a:t>
               </a:r>
-              <a:endParaRPr lang="fr-BE" noProof="1" smtClean="0"/>
             </a:p>
             <a:p>
               <a:pPr algn="ctr"/>
@@ -17726,15 +17726,16 @@
               <a:pPr algn="ctr"/>
               <a:r>
                 <a:rPr lang="fr-BE" noProof="1" smtClean="0"/>
-                <a:t>Pathway</a:t>
+                <a:t>Rich </a:t>
               </a:r>
             </a:p>
             <a:p>
               <a:pPr algn="ctr"/>
               <a:r>
                 <a:rPr lang="fr-BE" noProof="1" smtClean="0"/>
-                <a:t>Rich Model</a:t>
+                <a:t>Pathway Model</a:t>
               </a:r>
+              <a:endParaRPr lang="fr-BE" noProof="1" smtClean="0"/>
             </a:p>
           </p:txBody>
         </p:sp>
@@ -17774,7 +17775,22 @@
               <a:pPr algn="ctr"/>
               <a:r>
                 <a:rPr lang="fr-BE" noProof="1" smtClean="0"/>
-                <a:t>Binary Decision Diagrams  (Buddy)</a:t>
+                <a:t>Binary Decision Diagrams  </a:t>
+              </a:r>
+              <a:r>
+                <a:rPr lang="fr-BE" noProof="1" smtClean="0"/>
+                <a:t/>
+              </a:r>
+              <a:br>
+                <a:rPr lang="fr-BE" noProof="1" smtClean="0"/>
+              </a:br>
+              <a:r>
+                <a:rPr lang="fr-BE" noProof="1" smtClean="0"/>
+                <a:t>(</a:t>
+              </a:r>
+              <a:r>
+                <a:rPr lang="fr-BE" noProof="1" smtClean="0"/>
+                <a:t>Buddy)</a:t>
               </a:r>
               <a:endParaRPr lang="fr-BE" noProof="1"/>
             </a:p>
@@ -17816,7 +17832,15 @@
               <a:pPr algn="ctr"/>
               <a:r>
                 <a:rPr lang="fr-BE" noProof="1" smtClean="0"/>
-                <a:t>Parsing &amp; AST Rewriting (anagram)</a:t>
+                <a:t>Parsing &amp; AST </a:t>
+              </a:r>
+              <a:r>
+                <a:rPr lang="fr-BE" noProof="1" smtClean="0"/>
+                <a:t>rewriting </a:t>
+              </a:r>
+              <a:r>
+                <a:rPr lang="fr-BE" noProof="1" smtClean="0"/>
+                <a:t>(anagram)</a:t>
               </a:r>
               <a:endParaRPr lang="fr-BE" noProof="1"/>
             </a:p>
@@ -17858,15 +17882,16 @@
               <a:pPr algn="ctr"/>
               <a:r>
                 <a:rPr lang="fr-BE" noProof="1" smtClean="0"/>
-                <a:t>Pathway </a:t>
+                <a:t>Process</a:t>
               </a:r>
             </a:p>
             <a:p>
               <a:pPr algn="ctr"/>
               <a:r>
                 <a:rPr lang="fr-BE" noProof="1" smtClean="0"/>
-                <a:t>Analyser</a:t>
+                <a:t>analyzer</a:t>
               </a:r>
+              <a:endParaRPr lang="fr-BE" noProof="1" smtClean="0"/>
             </a:p>
           </p:txBody>
         </p:sp>
@@ -17908,7 +17933,6 @@
                 <a:rPr lang="fr-BE" noProof="1" smtClean="0"/>
                 <a:t>Graphviz dot </a:t>
               </a:r>
-              <a:endParaRPr lang="fr-BE" noProof="1" smtClean="0"/>
             </a:p>
             <a:p>
               <a:pPr algn="ctr"/>
@@ -17956,15 +17980,20 @@
               <a:pPr algn="ctr"/>
               <a:r>
                 <a:rPr lang="fr-BE" noProof="1" smtClean="0"/>
-                <a:t>Pathway </a:t>
+                <a:t>Process </a:t>
               </a:r>
             </a:p>
             <a:p>
               <a:pPr algn="ctr"/>
               <a:r>
                 <a:rPr lang="fr-BE" noProof="1" smtClean="0"/>
-                <a:t>Converter</a:t>
+                <a:t>r</a:t>
               </a:r>
+              <a:r>
+                <a:rPr lang="fr-BE" noProof="1" smtClean="0"/>
+                <a:t>ewriting</a:t>
+              </a:r>
+              <a:endParaRPr lang="fr-BE" noProof="1" smtClean="0"/>
             </a:p>
           </p:txBody>
         </p:sp>
@@ -18336,7 +18365,22 @@
               <a:pPr algn="ctr"/>
               <a:r>
                 <a:rPr lang="fr-BE" noProof="1" smtClean="0"/>
-                <a:t>SQL Persistence (sqlite)</a:t>
+                <a:t>SQL Persistence </a:t>
+              </a:r>
+              <a:r>
+                <a:rPr lang="fr-BE" noProof="1" smtClean="0"/>
+                <a:t/>
+              </a:r>
+              <a:br>
+                <a:rPr lang="fr-BE" noProof="1" smtClean="0"/>
+              </a:br>
+              <a:r>
+                <a:rPr lang="fr-BE" noProof="1" smtClean="0"/>
+                <a:t>(</a:t>
+              </a:r>
+              <a:r>
+                <a:rPr lang="fr-BE" noProof="1" smtClean="0"/>
+                <a:t>sqlite)</a:t>
               </a:r>
             </a:p>
           </p:txBody>
@@ -18377,7 +18421,14 @@
               <a:pPr algn="ctr"/>
               <a:r>
                 <a:rPr lang="fr-BE" noProof="1" smtClean="0"/>
-                <a:t>Pathway language</a:t>
+                <a:t>Process</a:t>
+              </a:r>
+              <a:br>
+                <a:rPr lang="fr-BE" noProof="1" smtClean="0"/>
+              </a:br>
+              <a:r>
+                <a:rPr lang="fr-BE" noProof="1" smtClean="0"/>
+                <a:t>language</a:t>
               </a:r>
               <a:endParaRPr lang="fr-BE" noProof="1"/>
             </a:p>
@@ -18429,9 +18480,9 @@
           </p:nvGrpSpPr>
           <p:grpSpPr>
             <a:xfrm>
-              <a:off x="7740352" y="5445224"/>
+              <a:off x="7740352" y="5219908"/>
               <a:ext cx="1152128" cy="369332"/>
-              <a:chOff x="899592" y="5445224"/>
+              <a:chOff x="899592" y="5219908"/>
               <a:chExt cx="1152128" cy="369332"/>
             </a:xfrm>
           </p:grpSpPr>
@@ -18443,7 +18494,7 @@
             </p:nvCxnSpPr>
             <p:spPr>
               <a:xfrm>
-                <a:off x="899592" y="5805264"/>
+                <a:off x="899592" y="5579948"/>
                 <a:ext cx="1152128" cy="1588"/>
               </a:xfrm>
               <a:prstGeom prst="bentConnector3">
@@ -18478,7 +18529,7 @@
             </p:nvSpPr>
             <p:spPr>
               <a:xfrm>
-                <a:off x="1187624" y="5445224"/>
+                <a:off x="1187624" y="5219908"/>
                 <a:ext cx="537327" cy="369332"/>
               </a:xfrm>
               <a:prstGeom prst="rect">
@@ -20337,6 +20388,3485 @@
             </a:p>
           </p:txBody>
         </p:sp>
+      </p:grpSp>
+    </p:spTree>
+  </p:cSld>
+  <p:clrMapOvr>
+    <a:masterClrMapping/>
+  </p:clrMapOvr>
+</p:sld>
+</file>
+
+<file path=ppt/slides/slide20.xml><?xml version="1.0" encoding="utf-8"?>
+<p:sld xmlns:a="http://schemas.openxmlformats.org/drawingml/2006/main" xmlns:r="http://schemas.openxmlformats.org/officeDocument/2006/relationships" xmlns:p="http://schemas.openxmlformats.org/presentationml/2006/main">
+  <p:cSld>
+    <p:spTree>
+      <p:nvGrpSpPr>
+        <p:cNvPr id="1" name=""/>
+        <p:cNvGrpSpPr/>
+        <p:nvPr/>
+      </p:nvGrpSpPr>
+      <p:grpSpPr>
+        <a:xfrm>
+          <a:off x="0" y="0"/>
+          <a:ext cx="0" cy="0"/>
+          <a:chOff x="0" y="0"/>
+          <a:chExt cx="0" cy="0"/>
+        </a:xfrm>
+      </p:grpSpPr>
+      <p:grpSp>
+        <p:nvGrpSpPr>
+          <p:cNvPr id="4" name="Groupe 3"/>
+          <p:cNvGrpSpPr/>
+          <p:nvPr/>
+        </p:nvGrpSpPr>
+        <p:grpSpPr>
+          <a:xfrm>
+            <a:off x="1187624" y="1412776"/>
+            <a:ext cx="6408712" cy="3672408"/>
+            <a:chOff x="1403648" y="1700808"/>
+            <a:chExt cx="6408712" cy="3672408"/>
+          </a:xfrm>
+        </p:grpSpPr>
+        <p:sp>
+          <p:nvSpPr>
+            <p:cNvPr id="5" name="Rectangle 4"/>
+            <p:cNvSpPr/>
+            <p:nvPr/>
+          </p:nvSpPr>
+          <p:spPr>
+            <a:xfrm>
+              <a:off x="1403648" y="1700808"/>
+              <a:ext cx="6408712" cy="3672408"/>
+            </a:xfrm>
+            <a:prstGeom prst="rect">
+              <a:avLst/>
+            </a:prstGeom>
+            <a:solidFill>
+              <a:schemeClr val="bg1"/>
+            </a:solidFill>
+            <a:ln w="3175"/>
+          </p:spPr>
+          <p:style>
+            <a:lnRef idx="2">
+              <a:schemeClr val="dk1"/>
+            </a:lnRef>
+            <a:fillRef idx="1">
+              <a:schemeClr val="lt1"/>
+            </a:fillRef>
+            <a:effectRef idx="0">
+              <a:schemeClr val="dk1"/>
+            </a:effectRef>
+            <a:fontRef idx="minor">
+              <a:schemeClr val="dk1"/>
+            </a:fontRef>
+          </p:style>
+          <p:txBody>
+            <a:bodyPr rtlCol="0" anchor="ctr"/>
+            <a:lstStyle/>
+            <a:p>
+              <a:pPr algn="ctr"/>
+              <a:endParaRPr lang="fr-BE"/>
+            </a:p>
+          </p:txBody>
+        </p:sp>
+        <p:sp>
+          <p:nvSpPr>
+            <p:cNvPr id="6" name="Rectangle à coins arrondis 5"/>
+            <p:cNvSpPr/>
+            <p:nvPr/>
+          </p:nvSpPr>
+          <p:spPr>
+            <a:xfrm>
+              <a:off x="4932040" y="3573016"/>
+              <a:ext cx="2664296" cy="648000"/>
+            </a:xfrm>
+            <a:prstGeom prst="roundRect">
+              <a:avLst/>
+            </a:prstGeom>
+          </p:spPr>
+          <p:style>
+            <a:lnRef idx="2">
+              <a:schemeClr val="dk1"/>
+            </a:lnRef>
+            <a:fillRef idx="1">
+              <a:schemeClr val="lt1"/>
+            </a:fillRef>
+            <a:effectRef idx="0">
+              <a:schemeClr val="dk1"/>
+            </a:effectRef>
+            <a:fontRef idx="minor">
+              <a:schemeClr val="dk1"/>
+            </a:fontRef>
+          </p:style>
+          <p:txBody>
+            <a:bodyPr rtlCol="0" anchor="ctr"/>
+            <a:lstStyle/>
+            <a:p>
+              <a:pPr algn="ctr"/>
+              <a:r>
+                <a:rPr lang="fr-BE" noProof="1" smtClean="0"/>
+                <a:t>Automaton </a:t>
+              </a:r>
+              <a:r>
+                <a:rPr lang="fr-BE" noProof="1" smtClean="0"/>
+                <a:t>Toolkit</a:t>
+              </a:r>
+              <a:endParaRPr lang="fr-BE" noProof="1" smtClean="0"/>
+            </a:p>
+            <a:p>
+              <a:pPr algn="ctr"/>
+              <a:r>
+                <a:rPr lang="fr-BE" noProof="1" smtClean="0"/>
+                <a:t>(Jail)</a:t>
+              </a:r>
+              <a:endParaRPr lang="fr-BE" noProof="1"/>
+            </a:p>
+          </p:txBody>
+        </p:sp>
+        <p:sp>
+          <p:nvSpPr>
+            <p:cNvPr id="7" name="Rectangle à coins arrondis 6"/>
+            <p:cNvSpPr/>
+            <p:nvPr/>
+          </p:nvSpPr>
+          <p:spPr>
+            <a:xfrm>
+              <a:off x="4932040" y="4509192"/>
+              <a:ext cx="2664296" cy="648000"/>
+            </a:xfrm>
+            <a:prstGeom prst="roundRect">
+              <a:avLst/>
+            </a:prstGeom>
+          </p:spPr>
+          <p:style>
+            <a:lnRef idx="2">
+              <a:schemeClr val="dk1"/>
+            </a:lnRef>
+            <a:fillRef idx="1">
+              <a:schemeClr val="lt1"/>
+            </a:fillRef>
+            <a:effectRef idx="0">
+              <a:schemeClr val="dk1"/>
+            </a:effectRef>
+            <a:fontRef idx="minor">
+              <a:schemeClr val="dk1"/>
+            </a:fontRef>
+          </p:style>
+          <p:txBody>
+            <a:bodyPr rtlCol="0" anchor="ctr"/>
+            <a:lstStyle/>
+            <a:p>
+              <a:pPr algn="ctr"/>
+              <a:r>
+                <a:rPr lang="fr-BE" noProof="1" smtClean="0"/>
+                <a:t>LTL2Buchi</a:t>
+              </a:r>
+              <a:endParaRPr lang="fr-BE" noProof="1" smtClean="0"/>
+            </a:p>
+          </p:txBody>
+        </p:sp>
+        <p:sp>
+          <p:nvSpPr>
+            <p:cNvPr id="8" name="Rectangle à coins arrondis 7"/>
+            <p:cNvSpPr/>
+            <p:nvPr/>
+          </p:nvSpPr>
+          <p:spPr>
+            <a:xfrm>
+              <a:off x="1619672" y="1916832"/>
+              <a:ext cx="1080120" cy="3240360"/>
+            </a:xfrm>
+            <a:prstGeom prst="roundRect">
+              <a:avLst/>
+            </a:prstGeom>
+          </p:spPr>
+          <p:style>
+            <a:lnRef idx="2">
+              <a:schemeClr val="dk1"/>
+            </a:lnRef>
+            <a:fillRef idx="1">
+              <a:schemeClr val="lt1"/>
+            </a:fillRef>
+            <a:effectRef idx="0">
+              <a:schemeClr val="dk1"/>
+            </a:effectRef>
+            <a:fontRef idx="minor">
+              <a:schemeClr val="dk1"/>
+            </a:fontRef>
+          </p:style>
+          <p:txBody>
+            <a:bodyPr rtlCol="0" anchor="ctr"/>
+            <a:lstStyle/>
+            <a:p>
+              <a:pPr algn="ctr"/>
+              <a:r>
+                <a:rPr lang="fr-BE" noProof="1" smtClean="0"/>
+                <a:t>Model</a:t>
+              </a:r>
+            </a:p>
+            <a:p>
+              <a:pPr algn="ctr"/>
+              <a:r>
+                <a:rPr lang="fr-BE" noProof="1" smtClean="0"/>
+                <a:t>Checker</a:t>
+              </a:r>
+            </a:p>
+          </p:txBody>
+        </p:sp>
+        <p:sp>
+          <p:nvSpPr>
+            <p:cNvPr id="9" name="Rectangle à coins arrondis 8"/>
+            <p:cNvSpPr/>
+            <p:nvPr/>
+          </p:nvSpPr>
+          <p:spPr>
+            <a:xfrm>
+              <a:off x="4932040" y="2636984"/>
+              <a:ext cx="2664592" cy="648000"/>
+            </a:xfrm>
+            <a:prstGeom prst="roundRect">
+              <a:avLst/>
+            </a:prstGeom>
+          </p:spPr>
+          <p:style>
+            <a:lnRef idx="2">
+              <a:schemeClr val="dk1"/>
+            </a:lnRef>
+            <a:fillRef idx="1">
+              <a:schemeClr val="lt1"/>
+            </a:fillRef>
+            <a:effectRef idx="0">
+              <a:schemeClr val="dk1"/>
+            </a:effectRef>
+            <a:fontRef idx="minor">
+              <a:schemeClr val="dk1"/>
+            </a:fontRef>
+          </p:style>
+          <p:txBody>
+            <a:bodyPr rtlCol="0" anchor="ctr"/>
+            <a:lstStyle/>
+            <a:p>
+              <a:pPr algn="ctr"/>
+              <a:r>
+                <a:rPr lang="fr-BE" noProof="1" smtClean="0"/>
+                <a:t>Binary Decision Diagrams  </a:t>
+              </a:r>
+              <a:endParaRPr lang="fr-BE" noProof="1" smtClean="0"/>
+            </a:p>
+            <a:p>
+              <a:pPr algn="ctr"/>
+              <a:r>
+                <a:rPr lang="fr-BE" noProof="1" smtClean="0"/>
+                <a:t>(JBuddy</a:t>
+              </a:r>
+              <a:r>
+                <a:rPr lang="fr-BE" noProof="1" smtClean="0"/>
+                <a:t>)</a:t>
+              </a:r>
+              <a:endParaRPr lang="fr-BE" noProof="1"/>
+            </a:p>
+          </p:txBody>
+        </p:sp>
+        <p:sp>
+          <p:nvSpPr>
+            <p:cNvPr id="10" name="Rectangle à coins arrondis 9"/>
+            <p:cNvSpPr/>
+            <p:nvPr/>
+          </p:nvSpPr>
+          <p:spPr>
+            <a:xfrm>
+              <a:off x="3059832" y="3112084"/>
+              <a:ext cx="1512168" cy="648000"/>
+            </a:xfrm>
+            <a:prstGeom prst="roundRect">
+              <a:avLst/>
+            </a:prstGeom>
+          </p:spPr>
+          <p:style>
+            <a:lnRef idx="2">
+              <a:schemeClr val="dk1"/>
+            </a:lnRef>
+            <a:fillRef idx="1">
+              <a:schemeClr val="lt1"/>
+            </a:fillRef>
+            <a:effectRef idx="0">
+              <a:schemeClr val="dk1"/>
+            </a:effectRef>
+            <a:fontRef idx="minor">
+              <a:schemeClr val="dk1"/>
+            </a:fontRef>
+          </p:style>
+          <p:txBody>
+            <a:bodyPr rtlCol="0" anchor="ctr"/>
+            <a:lstStyle/>
+            <a:p>
+              <a:pPr algn="ctr"/>
+              <a:r>
+                <a:rPr lang="fr-BE" noProof="1" smtClean="0"/>
+                <a:t>g-</a:t>
+              </a:r>
+              <a:r>
+                <a:rPr lang="fr-BE" noProof="1" smtClean="0"/>
+                <a:t>LTS</a:t>
+              </a:r>
+              <a:endParaRPr lang="fr-BE" noProof="1" smtClean="0"/>
+            </a:p>
+          </p:txBody>
+        </p:sp>
+        <p:sp>
+          <p:nvSpPr>
+            <p:cNvPr id="11" name="Rectangle à coins arrondis 10"/>
+            <p:cNvSpPr/>
+            <p:nvPr/>
+          </p:nvSpPr>
+          <p:spPr>
+            <a:xfrm>
+              <a:off x="3059832" y="4509192"/>
+              <a:ext cx="1512168" cy="648000"/>
+            </a:xfrm>
+            <a:prstGeom prst="roundRect">
+              <a:avLst/>
+            </a:prstGeom>
+          </p:spPr>
+          <p:style>
+            <a:lnRef idx="2">
+              <a:schemeClr val="dk1"/>
+            </a:lnRef>
+            <a:fillRef idx="1">
+              <a:schemeClr val="lt1"/>
+            </a:fillRef>
+            <a:effectRef idx="0">
+              <a:schemeClr val="dk1"/>
+            </a:effectRef>
+            <a:fontRef idx="minor">
+              <a:schemeClr val="dk1"/>
+            </a:fontRef>
+          </p:style>
+          <p:txBody>
+            <a:bodyPr rtlCol="0" anchor="ctr"/>
+            <a:lstStyle/>
+            <a:p>
+              <a:pPr algn="ctr"/>
+              <a:r>
+                <a:rPr lang="fr-BE" noProof="1" smtClean="0"/>
+                <a:t>FLTL</a:t>
+              </a:r>
+              <a:endParaRPr lang="fr-BE" noProof="1" smtClean="0"/>
+            </a:p>
+          </p:txBody>
+        </p:sp>
+        <p:cxnSp>
+          <p:nvCxnSpPr>
+            <p:cNvPr id="12" name="Connecteur en angle 11"/>
+            <p:cNvCxnSpPr>
+              <a:stCxn id="11" idx="3"/>
+              <a:endCxn id="7" idx="1"/>
+            </p:cNvCxnSpPr>
+            <p:nvPr/>
+          </p:nvCxnSpPr>
+          <p:spPr>
+            <a:xfrm>
+              <a:off x="4572000" y="4833192"/>
+              <a:ext cx="360040" cy="1588"/>
+            </a:xfrm>
+            <a:prstGeom prst="bentConnector3">
+              <a:avLst>
+                <a:gd name="adj1" fmla="val 50000"/>
+              </a:avLst>
+            </a:prstGeom>
+            <a:ln>
+              <a:tailEnd type="arrow"/>
+            </a:ln>
+          </p:spPr>
+          <p:style>
+            <a:lnRef idx="2">
+              <a:schemeClr val="dk1"/>
+            </a:lnRef>
+            <a:fillRef idx="0">
+              <a:schemeClr val="dk1"/>
+            </a:fillRef>
+            <a:effectRef idx="1">
+              <a:schemeClr val="dk1"/>
+            </a:effectRef>
+            <a:fontRef idx="minor">
+              <a:schemeClr val="tx1"/>
+            </a:fontRef>
+          </p:style>
+        </p:cxnSp>
+        <p:cxnSp>
+          <p:nvCxnSpPr>
+            <p:cNvPr id="13" name="Connecteur en angle 26"/>
+            <p:cNvCxnSpPr>
+              <a:stCxn id="10" idx="2"/>
+              <a:endCxn id="6" idx="1"/>
+            </p:cNvCxnSpPr>
+            <p:nvPr/>
+          </p:nvCxnSpPr>
+          <p:spPr>
+            <a:xfrm rot="16200000" flipH="1">
+              <a:off x="4305512" y="3270488"/>
+              <a:ext cx="136932" cy="1116124"/>
+            </a:xfrm>
+            <a:prstGeom prst="bentConnector2">
+              <a:avLst/>
+            </a:prstGeom>
+            <a:ln>
+              <a:tailEnd type="arrow"/>
+            </a:ln>
+          </p:spPr>
+          <p:style>
+            <a:lnRef idx="2">
+              <a:schemeClr val="dk1"/>
+            </a:lnRef>
+            <a:fillRef idx="0">
+              <a:schemeClr val="dk1"/>
+            </a:fillRef>
+            <a:effectRef idx="1">
+              <a:schemeClr val="dk1"/>
+            </a:effectRef>
+            <a:fontRef idx="minor">
+              <a:schemeClr val="tx1"/>
+            </a:fontRef>
+          </p:style>
+        </p:cxnSp>
+        <p:cxnSp>
+          <p:nvCxnSpPr>
+            <p:cNvPr id="14" name="Connecteur en angle 26"/>
+            <p:cNvCxnSpPr>
+              <a:stCxn id="10" idx="0"/>
+              <a:endCxn id="9" idx="1"/>
+            </p:cNvCxnSpPr>
+            <p:nvPr/>
+          </p:nvCxnSpPr>
+          <p:spPr>
+            <a:xfrm rot="5400000" flipH="1" flipV="1">
+              <a:off x="4298428" y="2478472"/>
+              <a:ext cx="151100" cy="1116124"/>
+            </a:xfrm>
+            <a:prstGeom prst="bentConnector2">
+              <a:avLst/>
+            </a:prstGeom>
+            <a:ln>
+              <a:tailEnd type="arrow"/>
+            </a:ln>
+          </p:spPr>
+          <p:style>
+            <a:lnRef idx="2">
+              <a:schemeClr val="dk1"/>
+            </a:lnRef>
+            <a:fillRef idx="0">
+              <a:schemeClr val="dk1"/>
+            </a:fillRef>
+            <a:effectRef idx="1">
+              <a:schemeClr val="dk1"/>
+            </a:effectRef>
+            <a:fontRef idx="minor">
+              <a:schemeClr val="tx1"/>
+            </a:fontRef>
+          </p:style>
+        </p:cxnSp>
+        <p:cxnSp>
+          <p:nvCxnSpPr>
+            <p:cNvPr id="15" name="Connecteur en angle 26"/>
+            <p:cNvCxnSpPr>
+              <a:endCxn id="10" idx="1"/>
+            </p:cNvCxnSpPr>
+            <p:nvPr/>
+          </p:nvCxnSpPr>
+          <p:spPr>
+            <a:xfrm>
+              <a:off x="2699657" y="3436084"/>
+              <a:ext cx="360175" cy="0"/>
+            </a:xfrm>
+            <a:prstGeom prst="bentConnector3">
+              <a:avLst>
+                <a:gd name="adj1" fmla="val 50000"/>
+              </a:avLst>
+            </a:prstGeom>
+            <a:ln>
+              <a:tailEnd type="arrow"/>
+            </a:ln>
+          </p:spPr>
+          <p:style>
+            <a:lnRef idx="2">
+              <a:schemeClr val="dk1"/>
+            </a:lnRef>
+            <a:fillRef idx="0">
+              <a:schemeClr val="dk1"/>
+            </a:fillRef>
+            <a:effectRef idx="1">
+              <a:schemeClr val="dk1"/>
+            </a:effectRef>
+            <a:fontRef idx="minor">
+              <a:schemeClr val="tx1"/>
+            </a:fontRef>
+          </p:style>
+        </p:cxnSp>
+        <p:cxnSp>
+          <p:nvCxnSpPr>
+            <p:cNvPr id="16" name="Connecteur en angle 26"/>
+            <p:cNvCxnSpPr>
+              <a:endCxn id="11" idx="1"/>
+            </p:cNvCxnSpPr>
+            <p:nvPr/>
+          </p:nvCxnSpPr>
+          <p:spPr>
+            <a:xfrm>
+              <a:off x="2699792" y="4833192"/>
+              <a:ext cx="360040" cy="1588"/>
+            </a:xfrm>
+            <a:prstGeom prst="bentConnector3">
+              <a:avLst>
+                <a:gd name="adj1" fmla="val 50000"/>
+              </a:avLst>
+            </a:prstGeom>
+            <a:ln>
+              <a:tailEnd type="arrow"/>
+            </a:ln>
+          </p:spPr>
+          <p:style>
+            <a:lnRef idx="2">
+              <a:schemeClr val="dk1"/>
+            </a:lnRef>
+            <a:fillRef idx="0">
+              <a:schemeClr val="dk1"/>
+            </a:fillRef>
+            <a:effectRef idx="1">
+              <a:schemeClr val="dk1"/>
+            </a:effectRef>
+            <a:fontRef idx="minor">
+              <a:schemeClr val="tx1"/>
+            </a:fontRef>
+          </p:style>
+        </p:cxnSp>
+        <p:grpSp>
+          <p:nvGrpSpPr>
+            <p:cNvPr id="17" name="Groupe 89"/>
+            <p:cNvGrpSpPr/>
+            <p:nvPr/>
+          </p:nvGrpSpPr>
+          <p:grpSpPr>
+            <a:xfrm>
+              <a:off x="6444208" y="1844824"/>
+              <a:ext cx="1152128" cy="369332"/>
+              <a:chOff x="899592" y="5445224"/>
+              <a:chExt cx="1152128" cy="369332"/>
+            </a:xfrm>
+          </p:grpSpPr>
+          <p:cxnSp>
+            <p:nvCxnSpPr>
+              <p:cNvPr id="20" name="Connecteur en angle 26"/>
+              <p:cNvCxnSpPr/>
+              <p:nvPr/>
+            </p:nvCxnSpPr>
+            <p:spPr>
+              <a:xfrm>
+                <a:off x="899592" y="5805264"/>
+                <a:ext cx="1152128" cy="1588"/>
+              </a:xfrm>
+              <a:prstGeom prst="bentConnector3">
+                <a:avLst>
+                  <a:gd name="adj1" fmla="val 50000"/>
+                </a:avLst>
+              </a:prstGeom>
+              <a:ln>
+                <a:tailEnd type="arrow"/>
+              </a:ln>
+            </p:spPr>
+            <p:style>
+              <a:lnRef idx="2">
+                <a:schemeClr val="dk1"/>
+              </a:lnRef>
+              <a:fillRef idx="0">
+                <a:schemeClr val="dk1"/>
+              </a:fillRef>
+              <a:effectRef idx="1">
+                <a:schemeClr val="dk1"/>
+              </a:effectRef>
+              <a:fontRef idx="minor">
+                <a:schemeClr val="tx1"/>
+              </a:fontRef>
+            </p:style>
+          </p:cxnSp>
+          <p:sp>
+            <p:nvSpPr>
+              <p:cNvPr id="21" name="ZoneTexte 20"/>
+              <p:cNvSpPr txBox="1"/>
+              <p:nvPr/>
+            </p:nvSpPr>
+            <p:spPr>
+              <a:xfrm>
+                <a:off x="1187624" y="5445224"/>
+                <a:ext cx="537327" cy="369332"/>
+              </a:xfrm>
+              <a:prstGeom prst="rect">
+                <a:avLst/>
+              </a:prstGeom>
+              <a:noFill/>
+            </p:spPr>
+            <p:txBody>
+              <a:bodyPr wrap="none" rtlCol="0">
+                <a:spAutoFit/>
+              </a:bodyPr>
+              <a:lstStyle/>
+              <a:p>
+                <a:r>
+                  <a:rPr lang="fr-BE" dirty="0" smtClean="0"/>
+                  <a:t>Use</a:t>
+                </a:r>
+                <a:endParaRPr lang="fr-BE" dirty="0"/>
+              </a:p>
+            </p:txBody>
+          </p:sp>
+        </p:grpSp>
+        <p:sp>
+          <p:nvSpPr>
+            <p:cNvPr id="18" name="Rectangle à coins arrondis 17"/>
+            <p:cNvSpPr/>
+            <p:nvPr/>
+          </p:nvSpPr>
+          <p:spPr>
+            <a:xfrm>
+              <a:off x="3059832" y="1916832"/>
+              <a:ext cx="1512168" cy="648000"/>
+            </a:xfrm>
+            <a:prstGeom prst="roundRect">
+              <a:avLst/>
+            </a:prstGeom>
+          </p:spPr>
+          <p:style>
+            <a:lnRef idx="2">
+              <a:schemeClr val="dk1"/>
+            </a:lnRef>
+            <a:fillRef idx="1">
+              <a:schemeClr val="lt1"/>
+            </a:fillRef>
+            <a:effectRef idx="0">
+              <a:schemeClr val="dk1"/>
+            </a:effectRef>
+            <a:fontRef idx="minor">
+              <a:schemeClr val="dk1"/>
+            </a:fontRef>
+          </p:style>
+          <p:txBody>
+            <a:bodyPr rtlCol="0" anchor="ctr"/>
+            <a:lstStyle/>
+            <a:p>
+              <a:pPr algn="ctr"/>
+              <a:r>
+                <a:rPr lang="fr-BE" noProof="1" smtClean="0"/>
+                <a:t>g</a:t>
+              </a:r>
+              <a:r>
+                <a:rPr lang="fr-BE" noProof="1" smtClean="0"/>
+                <a:t>-hMSC</a:t>
+              </a:r>
+              <a:endParaRPr lang="fr-BE" noProof="1" smtClean="0"/>
+            </a:p>
+          </p:txBody>
+        </p:sp>
+        <p:cxnSp>
+          <p:nvCxnSpPr>
+            <p:cNvPr id="19" name="Connecteur en angle 26"/>
+            <p:cNvCxnSpPr>
+              <a:endCxn id="18" idx="1"/>
+            </p:cNvCxnSpPr>
+            <p:nvPr/>
+          </p:nvCxnSpPr>
+          <p:spPr>
+            <a:xfrm flipV="1">
+              <a:off x="2699792" y="2240832"/>
+              <a:ext cx="360040" cy="0"/>
+            </a:xfrm>
+            <a:prstGeom prst="bentConnector3">
+              <a:avLst>
+                <a:gd name="adj1" fmla="val 50000"/>
+              </a:avLst>
+            </a:prstGeom>
+            <a:ln>
+              <a:tailEnd type="arrow"/>
+            </a:ln>
+          </p:spPr>
+          <p:style>
+            <a:lnRef idx="2">
+              <a:schemeClr val="dk1"/>
+            </a:lnRef>
+            <a:fillRef idx="0">
+              <a:schemeClr val="dk1"/>
+            </a:fillRef>
+            <a:effectRef idx="1">
+              <a:schemeClr val="dk1"/>
+            </a:effectRef>
+            <a:fontRef idx="minor">
+              <a:schemeClr val="tx1"/>
+            </a:fontRef>
+          </p:style>
+        </p:cxnSp>
+      </p:grpSp>
+    </p:spTree>
+  </p:cSld>
+  <p:clrMapOvr>
+    <a:masterClrMapping/>
+  </p:clrMapOvr>
+</p:sld>
+</file>
+
+<file path=ppt/slides/slide21.xml><?xml version="1.0" encoding="utf-8"?>
+<p:sld xmlns:a="http://schemas.openxmlformats.org/drawingml/2006/main" xmlns:r="http://schemas.openxmlformats.org/officeDocument/2006/relationships" xmlns:p="http://schemas.openxmlformats.org/presentationml/2006/main">
+  <p:cSld>
+    <p:spTree>
+      <p:nvGrpSpPr>
+        <p:cNvPr id="1" name=""/>
+        <p:cNvGrpSpPr/>
+        <p:nvPr/>
+      </p:nvGrpSpPr>
+      <p:grpSpPr>
+        <a:xfrm>
+          <a:off x="0" y="0"/>
+          <a:ext cx="0" cy="0"/>
+          <a:chOff x="0" y="0"/>
+          <a:chExt cx="0" cy="0"/>
+        </a:xfrm>
+      </p:grpSpPr>
+      <p:grpSp>
+        <p:nvGrpSpPr>
+          <p:cNvPr id="381" name="Groupe 380"/>
+          <p:cNvGrpSpPr/>
+          <p:nvPr/>
+        </p:nvGrpSpPr>
+        <p:grpSpPr>
+          <a:xfrm>
+            <a:off x="360040" y="836712"/>
+            <a:ext cx="8460432" cy="4608512"/>
+            <a:chOff x="0" y="836712"/>
+            <a:chExt cx="8460432" cy="4608512"/>
+          </a:xfrm>
+        </p:grpSpPr>
+        <p:sp>
+          <p:nvSpPr>
+            <p:cNvPr id="380" name="Rectangle 379"/>
+            <p:cNvSpPr/>
+            <p:nvPr/>
+          </p:nvSpPr>
+          <p:spPr>
+            <a:xfrm>
+              <a:off x="0" y="836712"/>
+              <a:ext cx="8460432" cy="4608512"/>
+            </a:xfrm>
+            <a:prstGeom prst="rect">
+              <a:avLst/>
+            </a:prstGeom>
+            <a:solidFill>
+              <a:schemeClr val="bg1"/>
+            </a:solidFill>
+            <a:ln w="3175"/>
+          </p:spPr>
+          <p:style>
+            <a:lnRef idx="2">
+              <a:schemeClr val="dk1"/>
+            </a:lnRef>
+            <a:fillRef idx="1">
+              <a:schemeClr val="lt1"/>
+            </a:fillRef>
+            <a:effectRef idx="0">
+              <a:schemeClr val="dk1"/>
+            </a:effectRef>
+            <a:fontRef idx="minor">
+              <a:schemeClr val="dk1"/>
+            </a:fontRef>
+          </p:style>
+          <p:txBody>
+            <a:bodyPr rtlCol="0" anchor="ctr"/>
+            <a:lstStyle/>
+            <a:p>
+              <a:pPr algn="ctr"/>
+              <a:endParaRPr lang="fr-BE"/>
+            </a:p>
+          </p:txBody>
+        </p:sp>
+        <p:grpSp>
+          <p:nvGrpSpPr>
+            <p:cNvPr id="378" name="Groupe 377"/>
+            <p:cNvGrpSpPr/>
+            <p:nvPr/>
+          </p:nvGrpSpPr>
+          <p:grpSpPr>
+            <a:xfrm>
+              <a:off x="179512" y="944824"/>
+              <a:ext cx="8094480" cy="4356384"/>
+              <a:chOff x="179512" y="944824"/>
+              <a:chExt cx="8094480" cy="4356384"/>
+            </a:xfrm>
+          </p:grpSpPr>
+          <p:cxnSp>
+            <p:nvCxnSpPr>
+              <p:cNvPr id="54" name="Connecteur droit avec flèche 53"/>
+              <p:cNvCxnSpPr>
+                <a:stCxn id="149" idx="6"/>
+                <a:endCxn id="161" idx="1"/>
+              </p:cNvCxnSpPr>
+              <p:nvPr/>
+            </p:nvCxnSpPr>
+            <p:spPr>
+              <a:xfrm>
+                <a:off x="5436184" y="1934784"/>
+                <a:ext cx="216056" cy="1588"/>
+              </a:xfrm>
+              <a:prstGeom prst="straightConnector1">
+                <a:avLst/>
+              </a:prstGeom>
+              <a:ln>
+                <a:tailEnd type="arrow"/>
+              </a:ln>
+            </p:spPr>
+            <p:style>
+              <a:lnRef idx="2">
+                <a:schemeClr val="dk1"/>
+              </a:lnRef>
+              <a:fillRef idx="0">
+                <a:schemeClr val="dk1"/>
+              </a:fillRef>
+              <a:effectRef idx="1">
+                <a:schemeClr val="dk1"/>
+              </a:effectRef>
+              <a:fontRef idx="minor">
+                <a:schemeClr val="tx1"/>
+              </a:fontRef>
+            </p:style>
+          </p:cxnSp>
+          <p:cxnSp>
+            <p:nvCxnSpPr>
+              <p:cNvPr id="86" name="Connecteur droit avec flèche 85"/>
+              <p:cNvCxnSpPr>
+                <a:stCxn id="128" idx="6"/>
+              </p:cNvCxnSpPr>
+              <p:nvPr/>
+            </p:nvCxnSpPr>
+            <p:spPr>
+              <a:xfrm>
+                <a:off x="2422264" y="2654864"/>
+                <a:ext cx="232520" cy="1588"/>
+              </a:xfrm>
+              <a:prstGeom prst="straightConnector1">
+                <a:avLst/>
+              </a:prstGeom>
+              <a:ln>
+                <a:tailEnd type="arrow"/>
+              </a:ln>
+            </p:spPr>
+            <p:style>
+              <a:lnRef idx="2">
+                <a:schemeClr val="dk1"/>
+              </a:lnRef>
+              <a:fillRef idx="0">
+                <a:schemeClr val="dk1"/>
+              </a:fillRef>
+              <a:effectRef idx="1">
+                <a:schemeClr val="dk1"/>
+              </a:effectRef>
+              <a:fontRef idx="minor">
+                <a:schemeClr val="tx1"/>
+              </a:fontRef>
+            </p:style>
+          </p:cxnSp>
+          <p:grpSp>
+            <p:nvGrpSpPr>
+              <p:cNvPr id="235" name="Groupe 234"/>
+              <p:cNvGrpSpPr/>
+              <p:nvPr/>
+            </p:nvGrpSpPr>
+            <p:grpSpPr>
+              <a:xfrm>
+                <a:off x="179512" y="1088824"/>
+                <a:ext cx="1116000" cy="612000"/>
+                <a:chOff x="206642" y="386696"/>
+                <a:chExt cx="1080000" cy="612000"/>
+              </a:xfrm>
+            </p:grpSpPr>
+            <p:sp>
+              <p:nvSpPr>
+                <p:cNvPr id="42" name="Rectangle 41"/>
+                <p:cNvSpPr/>
+                <p:nvPr/>
+              </p:nvSpPr>
+              <p:spPr>
+                <a:xfrm>
+                  <a:off x="206642" y="386696"/>
+                  <a:ext cx="1080000" cy="612000"/>
+                </a:xfrm>
+                <a:prstGeom prst="rect">
+                  <a:avLst/>
+                </a:prstGeom>
+                <a:noFill/>
+                <a:ln>
+                  <a:noFill/>
+                </a:ln>
+              </p:spPr>
+              <p:style>
+                <a:lnRef idx="2">
+                  <a:schemeClr val="accent1">
+                    <a:shade val="50000"/>
+                  </a:schemeClr>
+                </a:lnRef>
+                <a:fillRef idx="1">
+                  <a:schemeClr val="accent1"/>
+                </a:fillRef>
+                <a:effectRef idx="0">
+                  <a:schemeClr val="accent1"/>
+                </a:effectRef>
+                <a:fontRef idx="minor">
+                  <a:schemeClr val="lt1"/>
+                </a:fontRef>
+              </p:style>
+              <p:txBody>
+                <a:bodyPr rtlCol="0" anchor="ctr"/>
+                <a:lstStyle/>
+                <a:p>
+                  <a:pPr algn="ctr"/>
+                  <a:r>
+                    <a:rPr lang="fr-BE" noProof="1" smtClean="0">
+                      <a:solidFill>
+                        <a:schemeClr val="tx1"/>
+                      </a:solidFill>
+                    </a:rPr>
+                    <a:t>g</a:t>
+                  </a:r>
+                  <a:r>
+                    <a:rPr lang="fr-BE" noProof="1" smtClean="0">
+                      <a:solidFill>
+                        <a:schemeClr val="tx1"/>
+                      </a:solidFill>
+                    </a:rPr>
+                    <a:t>-hMSC  </a:t>
+                  </a:r>
+                  <a:endParaRPr lang="fr-BE" noProof="1" smtClean="0">
+                    <a:solidFill>
+                      <a:schemeClr val="tx1"/>
+                    </a:solidFill>
+                  </a:endParaRPr>
+                </a:p>
+                <a:p>
+                  <a:pPr algn="ctr"/>
+                  <a:r>
+                    <a:rPr lang="fr-BE" noProof="1" smtClean="0">
+                      <a:solidFill>
+                        <a:schemeClr val="tx1"/>
+                      </a:solidFill>
+                    </a:rPr>
+                    <a:t>model</a:t>
+                  </a:r>
+                  <a:endParaRPr lang="fr-BE" noProof="1">
+                    <a:solidFill>
+                      <a:schemeClr val="tx1"/>
+                    </a:solidFill>
+                  </a:endParaRPr>
+                </a:p>
+              </p:txBody>
+            </p:sp>
+            <p:cxnSp>
+              <p:nvCxnSpPr>
+                <p:cNvPr id="39" name="Connecteur droit 38"/>
+                <p:cNvCxnSpPr/>
+                <p:nvPr/>
+              </p:nvCxnSpPr>
+              <p:spPr>
+                <a:xfrm>
+                  <a:off x="206642" y="404664"/>
+                  <a:ext cx="1080000" cy="0"/>
+                </a:xfrm>
+                <a:prstGeom prst="line">
+                  <a:avLst/>
+                </a:prstGeom>
+              </p:spPr>
+              <p:style>
+                <a:lnRef idx="2">
+                  <a:schemeClr val="dk1"/>
+                </a:lnRef>
+                <a:fillRef idx="0">
+                  <a:schemeClr val="dk1"/>
+                </a:fillRef>
+                <a:effectRef idx="1">
+                  <a:schemeClr val="dk1"/>
+                </a:effectRef>
+                <a:fontRef idx="minor">
+                  <a:schemeClr val="tx1"/>
+                </a:fontRef>
+              </p:style>
+            </p:cxnSp>
+            <p:cxnSp>
+              <p:nvCxnSpPr>
+                <p:cNvPr id="40" name="Connecteur droit 39"/>
+                <p:cNvCxnSpPr/>
+                <p:nvPr/>
+              </p:nvCxnSpPr>
+              <p:spPr>
+                <a:xfrm>
+                  <a:off x="206642" y="980728"/>
+                  <a:ext cx="1080000" cy="0"/>
+                </a:xfrm>
+                <a:prstGeom prst="line">
+                  <a:avLst/>
+                </a:prstGeom>
+              </p:spPr>
+              <p:style>
+                <a:lnRef idx="2">
+                  <a:schemeClr val="dk1"/>
+                </a:lnRef>
+                <a:fillRef idx="0">
+                  <a:schemeClr val="dk1"/>
+                </a:fillRef>
+                <a:effectRef idx="1">
+                  <a:schemeClr val="dk1"/>
+                </a:effectRef>
+                <a:fontRef idx="minor">
+                  <a:schemeClr val="tx1"/>
+                </a:fontRef>
+              </p:style>
+            </p:cxnSp>
+          </p:grpSp>
+          <p:grpSp>
+            <p:nvGrpSpPr>
+              <p:cNvPr id="236" name="Groupe 235"/>
+              <p:cNvGrpSpPr/>
+              <p:nvPr/>
+            </p:nvGrpSpPr>
+            <p:grpSpPr>
+              <a:xfrm>
+                <a:off x="179512" y="2348864"/>
+                <a:ext cx="1116000" cy="612000"/>
+                <a:chOff x="206642" y="1610832"/>
+                <a:chExt cx="1080000" cy="612000"/>
+              </a:xfrm>
+            </p:grpSpPr>
+            <p:sp>
+              <p:nvSpPr>
+                <p:cNvPr id="85" name="Rectangle 84"/>
+                <p:cNvSpPr/>
+                <p:nvPr/>
+              </p:nvSpPr>
+              <p:spPr>
+                <a:xfrm>
+                  <a:off x="206642" y="1610832"/>
+                  <a:ext cx="1080000" cy="612000"/>
+                </a:xfrm>
+                <a:prstGeom prst="rect">
+                  <a:avLst/>
+                </a:prstGeom>
+                <a:noFill/>
+                <a:ln>
+                  <a:noFill/>
+                </a:ln>
+              </p:spPr>
+              <p:style>
+                <a:lnRef idx="2">
+                  <a:schemeClr val="accent1">
+                    <a:shade val="50000"/>
+                  </a:schemeClr>
+                </a:lnRef>
+                <a:fillRef idx="1">
+                  <a:schemeClr val="accent1"/>
+                </a:fillRef>
+                <a:effectRef idx="0">
+                  <a:schemeClr val="accent1"/>
+                </a:effectRef>
+                <a:fontRef idx="minor">
+                  <a:schemeClr val="lt1"/>
+                </a:fontRef>
+              </p:style>
+              <p:txBody>
+                <a:bodyPr lIns="0" rIns="0" rtlCol="0" anchor="ctr"/>
+                <a:lstStyle/>
+                <a:p>
+                  <a:pPr algn="ctr"/>
+                  <a:r>
+                    <a:rPr lang="fr-BE" noProof="1" smtClean="0">
+                      <a:solidFill>
+                        <a:schemeClr val="tx1"/>
+                      </a:solidFill>
+                    </a:rPr>
+                    <a:t>Fluent  </a:t>
+                  </a:r>
+                </a:p>
+                <a:p>
+                  <a:pPr algn="ctr"/>
+                  <a:r>
+                    <a:rPr lang="fr-BE" noProof="1" smtClean="0">
+                      <a:solidFill>
+                        <a:schemeClr val="tx1"/>
+                      </a:solidFill>
+                    </a:rPr>
+                    <a:t>definitions</a:t>
+                  </a:r>
+                  <a:endParaRPr lang="fr-BE" noProof="1">
+                    <a:solidFill>
+                      <a:schemeClr val="tx1"/>
+                    </a:solidFill>
+                  </a:endParaRPr>
+                </a:p>
+              </p:txBody>
+            </p:sp>
+            <p:cxnSp>
+              <p:nvCxnSpPr>
+                <p:cNvPr id="46" name="Connecteur droit 45"/>
+                <p:cNvCxnSpPr/>
+                <p:nvPr/>
+              </p:nvCxnSpPr>
+              <p:spPr>
+                <a:xfrm>
+                  <a:off x="206642" y="1628800"/>
+                  <a:ext cx="1080000" cy="0"/>
+                </a:xfrm>
+                <a:prstGeom prst="line">
+                  <a:avLst/>
+                </a:prstGeom>
+              </p:spPr>
+              <p:style>
+                <a:lnRef idx="2">
+                  <a:schemeClr val="dk1"/>
+                </a:lnRef>
+                <a:fillRef idx="0">
+                  <a:schemeClr val="dk1"/>
+                </a:fillRef>
+                <a:effectRef idx="1">
+                  <a:schemeClr val="dk1"/>
+                </a:effectRef>
+                <a:fontRef idx="minor">
+                  <a:schemeClr val="tx1"/>
+                </a:fontRef>
+              </p:style>
+            </p:cxnSp>
+            <p:cxnSp>
+              <p:nvCxnSpPr>
+                <p:cNvPr id="49" name="Connecteur droit 48"/>
+                <p:cNvCxnSpPr/>
+                <p:nvPr/>
+              </p:nvCxnSpPr>
+              <p:spPr>
+                <a:xfrm>
+                  <a:off x="206642" y="2204864"/>
+                  <a:ext cx="1080000" cy="0"/>
+                </a:xfrm>
+                <a:prstGeom prst="line">
+                  <a:avLst/>
+                </a:prstGeom>
+              </p:spPr>
+              <p:style>
+                <a:lnRef idx="2">
+                  <a:schemeClr val="dk1"/>
+                </a:lnRef>
+                <a:fillRef idx="0">
+                  <a:schemeClr val="dk1"/>
+                </a:fillRef>
+                <a:effectRef idx="1">
+                  <a:schemeClr val="dk1"/>
+                </a:effectRef>
+                <a:fontRef idx="minor">
+                  <a:schemeClr val="tx1"/>
+                </a:fontRef>
+              </p:style>
+            </p:cxnSp>
+          </p:grpSp>
+          <p:grpSp>
+            <p:nvGrpSpPr>
+              <p:cNvPr id="237" name="Groupe 236"/>
+              <p:cNvGrpSpPr/>
+              <p:nvPr/>
+            </p:nvGrpSpPr>
+            <p:grpSpPr>
+              <a:xfrm>
+                <a:off x="179512" y="4545224"/>
+                <a:ext cx="1116000" cy="612000"/>
+                <a:chOff x="206642" y="2780928"/>
+                <a:chExt cx="1080000" cy="612000"/>
+              </a:xfrm>
+            </p:grpSpPr>
+            <p:sp>
+              <p:nvSpPr>
+                <p:cNvPr id="44" name="Organigramme : Processus 43"/>
+                <p:cNvSpPr/>
+                <p:nvPr/>
+              </p:nvSpPr>
+              <p:spPr>
+                <a:xfrm>
+                  <a:off x="206642" y="2780928"/>
+                  <a:ext cx="1080000" cy="612000"/>
+                </a:xfrm>
+                <a:prstGeom prst="flowChartProcess">
+                  <a:avLst/>
+                </a:prstGeom>
+                <a:noFill/>
+                <a:ln>
+                  <a:noFill/>
+                </a:ln>
+              </p:spPr>
+              <p:style>
+                <a:lnRef idx="2">
+                  <a:schemeClr val="accent1">
+                    <a:shade val="50000"/>
+                  </a:schemeClr>
+                </a:lnRef>
+                <a:fillRef idx="1">
+                  <a:schemeClr val="accent1"/>
+                </a:fillRef>
+                <a:effectRef idx="0">
+                  <a:schemeClr val="accent1"/>
+                </a:effectRef>
+                <a:fontRef idx="minor">
+                  <a:schemeClr val="lt1"/>
+                </a:fontRef>
+              </p:style>
+              <p:txBody>
+                <a:bodyPr wrap="none" lIns="0" tIns="0" rIns="0" bIns="0" rtlCol="0" anchor="ctr"/>
+                <a:lstStyle/>
+                <a:p>
+                  <a:pPr algn="ctr"/>
+                  <a:r>
+                    <a:rPr lang="fr-BE" noProof="1" smtClean="0">
+                      <a:solidFill>
+                        <a:schemeClr val="tx1"/>
+                      </a:solidFill>
+                    </a:rPr>
+                    <a:t>FLTL </a:t>
+                  </a:r>
+                  <a:r>
+                    <a:rPr lang="fr-BE" noProof="1" smtClean="0">
+                      <a:solidFill>
+                        <a:schemeClr val="tx1"/>
+                      </a:solidFill>
+                    </a:rPr>
+                    <a:t>(</a:t>
+                  </a:r>
+                  <a:r>
+                    <a:rPr lang="fr-BE" noProof="1" smtClean="0">
+                      <a:solidFill>
+                        <a:schemeClr val="tx1"/>
+                      </a:solidFill>
+                      <a:sym typeface="Symbol"/>
+                    </a:rPr>
+                    <a:t></a:t>
+                  </a:r>
+                  <a:r>
+                    <a:rPr lang="fr-BE" noProof="1" smtClean="0">
+                      <a:solidFill>
+                        <a:schemeClr val="tx1"/>
+                      </a:solidFill>
+                      <a:sym typeface="Symbol"/>
+                    </a:rPr>
+                    <a:t>) </a:t>
+                  </a:r>
+                  <a:r>
+                    <a:rPr lang="fr-BE" noProof="1" smtClean="0">
+                      <a:solidFill>
+                        <a:schemeClr val="tx1"/>
+                      </a:solidFill>
+                      <a:sym typeface="Symbol"/>
+                    </a:rPr>
+                    <a:t/>
+                  </a:r>
+                  <a:br>
+                    <a:rPr lang="fr-BE" noProof="1" smtClean="0">
+                      <a:solidFill>
+                        <a:schemeClr val="tx1"/>
+                      </a:solidFill>
+                      <a:sym typeface="Symbol"/>
+                    </a:rPr>
+                  </a:br>
+                  <a:r>
+                    <a:rPr lang="fr-BE" noProof="1" smtClean="0">
+                      <a:solidFill>
+                        <a:schemeClr val="tx1"/>
+                      </a:solidFill>
+                    </a:rPr>
+                    <a:t>Property </a:t>
+                  </a:r>
+                  <a:endParaRPr lang="fr-BE" noProof="1">
+                    <a:solidFill>
+                      <a:schemeClr val="tx1"/>
+                    </a:solidFill>
+                  </a:endParaRPr>
+                </a:p>
+              </p:txBody>
+            </p:sp>
+            <p:cxnSp>
+              <p:nvCxnSpPr>
+                <p:cNvPr id="52" name="Connecteur droit 51"/>
+                <p:cNvCxnSpPr/>
+                <p:nvPr/>
+              </p:nvCxnSpPr>
+              <p:spPr>
+                <a:xfrm>
+                  <a:off x="206642" y="2798896"/>
+                  <a:ext cx="1080000" cy="0"/>
+                </a:xfrm>
+                <a:prstGeom prst="line">
+                  <a:avLst/>
+                </a:prstGeom>
+              </p:spPr>
+              <p:style>
+                <a:lnRef idx="2">
+                  <a:schemeClr val="dk1"/>
+                </a:lnRef>
+                <a:fillRef idx="0">
+                  <a:schemeClr val="dk1"/>
+                </a:fillRef>
+                <a:effectRef idx="1">
+                  <a:schemeClr val="dk1"/>
+                </a:effectRef>
+                <a:fontRef idx="minor">
+                  <a:schemeClr val="tx1"/>
+                </a:fontRef>
+              </p:style>
+            </p:cxnSp>
+            <p:cxnSp>
+              <p:nvCxnSpPr>
+                <p:cNvPr id="53" name="Connecteur droit 52"/>
+                <p:cNvCxnSpPr/>
+                <p:nvPr/>
+              </p:nvCxnSpPr>
+              <p:spPr>
+                <a:xfrm>
+                  <a:off x="206642" y="3374960"/>
+                  <a:ext cx="1080000" cy="0"/>
+                </a:xfrm>
+                <a:prstGeom prst="line">
+                  <a:avLst/>
+                </a:prstGeom>
+              </p:spPr>
+              <p:style>
+                <a:lnRef idx="2">
+                  <a:schemeClr val="dk1"/>
+                </a:lnRef>
+                <a:fillRef idx="0">
+                  <a:schemeClr val="dk1"/>
+                </a:fillRef>
+                <a:effectRef idx="1">
+                  <a:schemeClr val="dk1"/>
+                </a:effectRef>
+                <a:fontRef idx="minor">
+                  <a:schemeClr val="tx1"/>
+                </a:fontRef>
+              </p:style>
+            </p:cxnSp>
+          </p:grpSp>
+          <p:sp>
+            <p:nvSpPr>
+              <p:cNvPr id="94" name="Ellipse 93"/>
+              <p:cNvSpPr/>
+              <p:nvPr/>
+            </p:nvSpPr>
+            <p:spPr>
+              <a:xfrm>
+                <a:off x="1522264" y="944824"/>
+                <a:ext cx="900000" cy="900000"/>
+              </a:xfrm>
+              <a:prstGeom prst="ellipse">
+                <a:avLst/>
+              </a:prstGeom>
+            </p:spPr>
+            <p:style>
+              <a:lnRef idx="2">
+                <a:schemeClr val="dk1"/>
+              </a:lnRef>
+              <a:fillRef idx="1">
+                <a:schemeClr val="lt1"/>
+              </a:fillRef>
+              <a:effectRef idx="0">
+                <a:schemeClr val="dk1"/>
+              </a:effectRef>
+              <a:fontRef idx="minor">
+                <a:schemeClr val="dk1"/>
+              </a:fontRef>
+            </p:style>
+            <p:txBody>
+              <a:bodyPr wrap="none" lIns="0" tIns="0" rIns="0" bIns="0" rtlCol="0" anchor="ctr"/>
+              <a:lstStyle/>
+              <a:p>
+                <a:pPr algn="ctr"/>
+                <a:r>
+                  <a:rPr lang="fr-BE" sz="1600" dirty="0" err="1" smtClean="0"/>
+                  <a:t>Algo</a:t>
+                </a:r>
+                <a:endParaRPr lang="fr-BE" sz="1600" dirty="0" smtClean="0"/>
+              </a:p>
+              <a:p>
+                <a:pPr algn="ctr"/>
+                <a:r>
+                  <a:rPr lang="fr-BE" sz="1600" dirty="0" smtClean="0"/>
+                  <a:t>Chap. 3</a:t>
+                </a:r>
+              </a:p>
+            </p:txBody>
+          </p:sp>
+          <p:cxnSp>
+            <p:nvCxnSpPr>
+              <p:cNvPr id="96" name="Connecteur droit avec flèche 95"/>
+              <p:cNvCxnSpPr>
+                <a:endCxn id="94" idx="2"/>
+              </p:cNvCxnSpPr>
+              <p:nvPr/>
+            </p:nvCxnSpPr>
+            <p:spPr>
+              <a:xfrm>
+                <a:off x="1270112" y="1394824"/>
+                <a:ext cx="252152" cy="1588"/>
+              </a:xfrm>
+              <a:prstGeom prst="straightConnector1">
+                <a:avLst/>
+              </a:prstGeom>
+              <a:ln>
+                <a:tailEnd type="arrow"/>
+              </a:ln>
+            </p:spPr>
+            <p:style>
+              <a:lnRef idx="2">
+                <a:schemeClr val="dk1"/>
+              </a:lnRef>
+              <a:fillRef idx="0">
+                <a:schemeClr val="dk1"/>
+              </a:fillRef>
+              <a:effectRef idx="1">
+                <a:schemeClr val="dk1"/>
+              </a:effectRef>
+              <a:fontRef idx="minor">
+                <a:schemeClr val="tx1"/>
+              </a:fontRef>
+            </p:style>
+          </p:cxnSp>
+          <p:grpSp>
+            <p:nvGrpSpPr>
+              <p:cNvPr id="240" name="Groupe 239"/>
+              <p:cNvGrpSpPr/>
+              <p:nvPr/>
+            </p:nvGrpSpPr>
+            <p:grpSpPr>
+              <a:xfrm>
+                <a:off x="2654784" y="1088824"/>
+                <a:ext cx="1188000" cy="612000"/>
+                <a:chOff x="2843928" y="386696"/>
+                <a:chExt cx="1080000" cy="612000"/>
+              </a:xfrm>
+            </p:grpSpPr>
+            <p:sp>
+              <p:nvSpPr>
+                <p:cNvPr id="104" name="Rectangle 103"/>
+                <p:cNvSpPr/>
+                <p:nvPr/>
+              </p:nvSpPr>
+              <p:spPr>
+                <a:xfrm>
+                  <a:off x="2843928" y="386696"/>
+                  <a:ext cx="1080000" cy="612000"/>
+                </a:xfrm>
+                <a:prstGeom prst="rect">
+                  <a:avLst/>
+                </a:prstGeom>
+                <a:noFill/>
+                <a:ln>
+                  <a:noFill/>
+                </a:ln>
+              </p:spPr>
+              <p:style>
+                <a:lnRef idx="2">
+                  <a:schemeClr val="accent1">
+                    <a:shade val="50000"/>
+                  </a:schemeClr>
+                </a:lnRef>
+                <a:fillRef idx="1">
+                  <a:schemeClr val="accent1"/>
+                </a:fillRef>
+                <a:effectRef idx="0">
+                  <a:schemeClr val="accent1"/>
+                </a:effectRef>
+                <a:fontRef idx="minor">
+                  <a:schemeClr val="lt1"/>
+                </a:fontRef>
+              </p:style>
+              <p:txBody>
+                <a:bodyPr rtlCol="0" anchor="ctr"/>
+                <a:lstStyle/>
+                <a:p>
+                  <a:pPr algn="ctr"/>
+                  <a:r>
+                    <a:rPr lang="fr-BE" noProof="1" smtClean="0">
+                      <a:solidFill>
+                        <a:schemeClr val="tx1"/>
+                      </a:solidFill>
+                    </a:rPr>
+                    <a:t>Model</a:t>
+                  </a:r>
+                </a:p>
+                <a:p>
+                  <a:pPr algn="ctr"/>
+                  <a:r>
+                    <a:rPr lang="fr-BE" noProof="1" smtClean="0">
+                      <a:solidFill>
+                        <a:schemeClr val="tx1"/>
+                      </a:solidFill>
+                    </a:rPr>
+                    <a:t>g</a:t>
+                  </a:r>
+                  <a:r>
+                    <a:rPr lang="fr-BE" noProof="1" smtClean="0">
+                      <a:solidFill>
+                        <a:schemeClr val="tx1"/>
+                      </a:solidFill>
+                    </a:rPr>
+                    <a:t>-LTS</a:t>
+                  </a:r>
+                  <a:endParaRPr lang="fr-BE" noProof="1" smtClean="0">
+                    <a:solidFill>
+                      <a:schemeClr val="tx1"/>
+                    </a:solidFill>
+                  </a:endParaRPr>
+                </a:p>
+              </p:txBody>
+            </p:sp>
+            <p:cxnSp>
+              <p:nvCxnSpPr>
+                <p:cNvPr id="107" name="Connecteur droit 106"/>
+                <p:cNvCxnSpPr/>
+                <p:nvPr/>
+              </p:nvCxnSpPr>
+              <p:spPr>
+                <a:xfrm>
+                  <a:off x="2843928" y="404664"/>
+                  <a:ext cx="1080000" cy="0"/>
+                </a:xfrm>
+                <a:prstGeom prst="line">
+                  <a:avLst/>
+                </a:prstGeom>
+              </p:spPr>
+              <p:style>
+                <a:lnRef idx="2">
+                  <a:schemeClr val="dk1"/>
+                </a:lnRef>
+                <a:fillRef idx="0">
+                  <a:schemeClr val="dk1"/>
+                </a:fillRef>
+                <a:effectRef idx="1">
+                  <a:schemeClr val="dk1"/>
+                </a:effectRef>
+                <a:fontRef idx="minor">
+                  <a:schemeClr val="tx1"/>
+                </a:fontRef>
+              </p:style>
+            </p:cxnSp>
+            <p:cxnSp>
+              <p:nvCxnSpPr>
+                <p:cNvPr id="108" name="Connecteur droit 107"/>
+                <p:cNvCxnSpPr/>
+                <p:nvPr/>
+              </p:nvCxnSpPr>
+              <p:spPr>
+                <a:xfrm>
+                  <a:off x="2843928" y="980728"/>
+                  <a:ext cx="1080000" cy="0"/>
+                </a:xfrm>
+                <a:prstGeom prst="line">
+                  <a:avLst/>
+                </a:prstGeom>
+              </p:spPr>
+              <p:style>
+                <a:lnRef idx="2">
+                  <a:schemeClr val="dk1"/>
+                </a:lnRef>
+                <a:fillRef idx="0">
+                  <a:schemeClr val="dk1"/>
+                </a:fillRef>
+                <a:effectRef idx="1">
+                  <a:schemeClr val="dk1"/>
+                </a:effectRef>
+                <a:fontRef idx="minor">
+                  <a:schemeClr val="tx1"/>
+                </a:fontRef>
+              </p:style>
+            </p:cxnSp>
+          </p:grpSp>
+          <p:cxnSp>
+            <p:nvCxnSpPr>
+              <p:cNvPr id="109" name="Connecteur droit avec flèche 108"/>
+              <p:cNvCxnSpPr>
+                <a:stCxn id="94" idx="6"/>
+              </p:cNvCxnSpPr>
+              <p:nvPr/>
+            </p:nvCxnSpPr>
+            <p:spPr>
+              <a:xfrm>
+                <a:off x="2422264" y="1394824"/>
+                <a:ext cx="252128" cy="1588"/>
+              </a:xfrm>
+              <a:prstGeom prst="straightConnector1">
+                <a:avLst/>
+              </a:prstGeom>
+              <a:ln>
+                <a:tailEnd type="arrow"/>
+              </a:ln>
+            </p:spPr>
+            <p:style>
+              <a:lnRef idx="2">
+                <a:schemeClr val="dk1"/>
+              </a:lnRef>
+              <a:fillRef idx="0">
+                <a:schemeClr val="dk1"/>
+              </a:fillRef>
+              <a:effectRef idx="1">
+                <a:schemeClr val="dk1"/>
+              </a:effectRef>
+              <a:fontRef idx="minor">
+                <a:schemeClr val="tx1"/>
+              </a:fontRef>
+            </p:style>
+          </p:cxnSp>
+          <p:sp>
+            <p:nvSpPr>
+              <p:cNvPr id="128" name="Ellipse 127"/>
+              <p:cNvSpPr/>
+              <p:nvPr/>
+            </p:nvSpPr>
+            <p:spPr>
+              <a:xfrm>
+                <a:off x="1522264" y="2204864"/>
+                <a:ext cx="900000" cy="900000"/>
+              </a:xfrm>
+              <a:prstGeom prst="ellipse">
+                <a:avLst/>
+              </a:prstGeom>
+            </p:spPr>
+            <p:style>
+              <a:lnRef idx="2">
+                <a:schemeClr val="dk1"/>
+              </a:lnRef>
+              <a:fillRef idx="1">
+                <a:schemeClr val="lt1"/>
+              </a:fillRef>
+              <a:effectRef idx="0">
+                <a:schemeClr val="dk1"/>
+              </a:effectRef>
+              <a:fontRef idx="minor">
+                <a:schemeClr val="dk1"/>
+              </a:fontRef>
+            </p:style>
+            <p:txBody>
+              <a:bodyPr lIns="0" tIns="0" rIns="0" bIns="0" rtlCol="0" anchor="ctr"/>
+              <a:lstStyle/>
+              <a:p>
+                <a:pPr algn="ctr"/>
+                <a:r>
+                  <a:rPr lang="fr-BE" sz="1600" dirty="0" err="1" smtClean="0"/>
+                  <a:t>Def</a:t>
+                </a:r>
+                <a:r>
+                  <a:rPr lang="fr-BE" sz="1600" dirty="0" smtClean="0"/>
+                  <a:t>. 3.1</a:t>
+                </a:r>
+                <a:endParaRPr lang="fr-BE" sz="1600" dirty="0"/>
+              </a:p>
+            </p:txBody>
+          </p:sp>
+          <p:cxnSp>
+            <p:nvCxnSpPr>
+              <p:cNvPr id="129" name="Connecteur droit avec flèche 128"/>
+              <p:cNvCxnSpPr>
+                <a:endCxn id="128" idx="2"/>
+              </p:cNvCxnSpPr>
+              <p:nvPr/>
+            </p:nvCxnSpPr>
+            <p:spPr>
+              <a:xfrm>
+                <a:off x="1295512" y="2654864"/>
+                <a:ext cx="226752" cy="1588"/>
+              </a:xfrm>
+              <a:prstGeom prst="straightConnector1">
+                <a:avLst/>
+              </a:prstGeom>
+              <a:ln>
+                <a:tailEnd type="arrow"/>
+              </a:ln>
+            </p:spPr>
+            <p:style>
+              <a:lnRef idx="2">
+                <a:schemeClr val="dk1"/>
+              </a:lnRef>
+              <a:fillRef idx="0">
+                <a:schemeClr val="dk1"/>
+              </a:fillRef>
+              <a:effectRef idx="1">
+                <a:schemeClr val="dk1"/>
+              </a:effectRef>
+              <a:fontRef idx="minor">
+                <a:schemeClr val="tx1"/>
+              </a:fontRef>
+            </p:style>
+          </p:cxnSp>
+          <p:grpSp>
+            <p:nvGrpSpPr>
+              <p:cNvPr id="241" name="Groupe 240"/>
+              <p:cNvGrpSpPr/>
+              <p:nvPr/>
+            </p:nvGrpSpPr>
+            <p:grpSpPr>
+              <a:xfrm>
+                <a:off x="2654784" y="2348864"/>
+                <a:ext cx="1188000" cy="612000"/>
+                <a:chOff x="2843928" y="1610832"/>
+                <a:chExt cx="1080000" cy="612000"/>
+              </a:xfrm>
+            </p:grpSpPr>
+            <p:sp>
+              <p:nvSpPr>
+                <p:cNvPr id="141" name="Rectangle 140"/>
+                <p:cNvSpPr/>
+                <p:nvPr/>
+              </p:nvSpPr>
+              <p:spPr>
+                <a:xfrm>
+                  <a:off x="2843928" y="1610832"/>
+                  <a:ext cx="1080000" cy="612000"/>
+                </a:xfrm>
+                <a:prstGeom prst="rect">
+                  <a:avLst/>
+                </a:prstGeom>
+                <a:noFill/>
+                <a:ln>
+                  <a:noFill/>
+                </a:ln>
+              </p:spPr>
+              <p:style>
+                <a:lnRef idx="2">
+                  <a:schemeClr val="accent1">
+                    <a:shade val="50000"/>
+                  </a:schemeClr>
+                </a:lnRef>
+                <a:fillRef idx="1">
+                  <a:schemeClr val="accent1"/>
+                </a:fillRef>
+                <a:effectRef idx="0">
+                  <a:schemeClr val="accent1"/>
+                </a:effectRef>
+                <a:fontRef idx="minor">
+                  <a:schemeClr val="lt1"/>
+                </a:fontRef>
+              </p:style>
+              <p:txBody>
+                <a:bodyPr lIns="0" tIns="0" rIns="0" bIns="0" rtlCol="0" anchor="ctr"/>
+                <a:lstStyle/>
+                <a:p>
+                  <a:pPr algn="ctr"/>
+                  <a:r>
+                    <a:rPr lang="fr-BE" noProof="1" smtClean="0">
+                      <a:solidFill>
+                        <a:schemeClr val="tx1"/>
+                      </a:solidFill>
+                    </a:rPr>
+                    <a:t>Fluent  </a:t>
+                  </a:r>
+                </a:p>
+                <a:p>
+                  <a:pPr algn="ctr"/>
+                  <a:r>
+                    <a:rPr lang="fr-BE" noProof="1" smtClean="0">
+                      <a:solidFill>
+                        <a:schemeClr val="tx1"/>
+                      </a:solidFill>
+                    </a:rPr>
+                    <a:t>automata</a:t>
+                  </a:r>
+                  <a:endParaRPr lang="fr-BE" noProof="1">
+                    <a:solidFill>
+                      <a:schemeClr val="tx1"/>
+                    </a:solidFill>
+                  </a:endParaRPr>
+                </a:p>
+              </p:txBody>
+            </p:sp>
+            <p:cxnSp>
+              <p:nvCxnSpPr>
+                <p:cNvPr id="143" name="Connecteur droit 142"/>
+                <p:cNvCxnSpPr/>
+                <p:nvPr/>
+              </p:nvCxnSpPr>
+              <p:spPr>
+                <a:xfrm>
+                  <a:off x="2843928" y="1628800"/>
+                  <a:ext cx="1080000" cy="0"/>
+                </a:xfrm>
+                <a:prstGeom prst="line">
+                  <a:avLst/>
+                </a:prstGeom>
+              </p:spPr>
+              <p:style>
+                <a:lnRef idx="2">
+                  <a:schemeClr val="dk1"/>
+                </a:lnRef>
+                <a:fillRef idx="0">
+                  <a:schemeClr val="dk1"/>
+                </a:fillRef>
+                <a:effectRef idx="1">
+                  <a:schemeClr val="dk1"/>
+                </a:effectRef>
+                <a:fontRef idx="minor">
+                  <a:schemeClr val="tx1"/>
+                </a:fontRef>
+              </p:style>
+            </p:cxnSp>
+            <p:cxnSp>
+              <p:nvCxnSpPr>
+                <p:cNvPr id="144" name="Connecteur droit 143"/>
+                <p:cNvCxnSpPr/>
+                <p:nvPr/>
+              </p:nvCxnSpPr>
+              <p:spPr>
+                <a:xfrm>
+                  <a:off x="2843928" y="2204864"/>
+                  <a:ext cx="1080000" cy="0"/>
+                </a:xfrm>
+                <a:prstGeom prst="line">
+                  <a:avLst/>
+                </a:prstGeom>
+              </p:spPr>
+              <p:style>
+                <a:lnRef idx="2">
+                  <a:schemeClr val="dk1"/>
+                </a:lnRef>
+                <a:fillRef idx="0">
+                  <a:schemeClr val="dk1"/>
+                </a:fillRef>
+                <a:effectRef idx="1">
+                  <a:schemeClr val="dk1"/>
+                </a:effectRef>
+                <a:fontRef idx="minor">
+                  <a:schemeClr val="tx1"/>
+                </a:fontRef>
+              </p:style>
+            </p:cxnSp>
+          </p:grpSp>
+          <p:sp>
+            <p:nvSpPr>
+              <p:cNvPr id="149" name="Ellipse 148"/>
+              <p:cNvSpPr/>
+              <p:nvPr/>
+            </p:nvSpPr>
+            <p:spPr>
+              <a:xfrm>
+                <a:off x="4536184" y="1484784"/>
+                <a:ext cx="900000" cy="900000"/>
+              </a:xfrm>
+              <a:prstGeom prst="ellipse">
+                <a:avLst/>
+              </a:prstGeom>
+            </p:spPr>
+            <p:style>
+              <a:lnRef idx="2">
+                <a:schemeClr val="dk1"/>
+              </a:lnRef>
+              <a:fillRef idx="1">
+                <a:schemeClr val="lt1"/>
+              </a:fillRef>
+              <a:effectRef idx="0">
+                <a:schemeClr val="dk1"/>
+              </a:effectRef>
+              <a:fontRef idx="minor">
+                <a:schemeClr val="dk1"/>
+              </a:fontRef>
+            </p:style>
+            <p:txBody>
+              <a:bodyPr lIns="0" tIns="0" rIns="0" bIns="0" rtlCol="0" anchor="ctr"/>
+              <a:lstStyle/>
+              <a:p>
+                <a:pPr algn="ctr"/>
+                <a:r>
+                  <a:rPr lang="fr-BE" sz="1600" dirty="0" smtClean="0"/>
+                  <a:t>g</a:t>
+                </a:r>
+                <a:r>
+                  <a:rPr lang="fr-BE" sz="1600" dirty="0" smtClean="0"/>
+                  <a:t>-LTS </a:t>
+                </a:r>
+                <a:r>
+                  <a:rPr lang="fr-BE" sz="1600" dirty="0" smtClean="0">
+                    <a:latin typeface="Arial" pitchFamily="34" charset="0"/>
+                    <a:cs typeface="Arial" pitchFamily="34" charset="0"/>
+                  </a:rPr>
+                  <a:t> ||</a:t>
+                </a:r>
+                <a:r>
+                  <a:rPr lang="fr-BE" sz="1600" dirty="0" smtClean="0"/>
+                  <a:t/>
+                </a:r>
+                <a:br>
+                  <a:rPr lang="fr-BE" sz="1600" dirty="0" smtClean="0"/>
+                </a:br>
+                <a:r>
+                  <a:rPr lang="fr-BE" sz="1600" dirty="0" smtClean="0"/>
+                  <a:t>+</a:t>
+                </a:r>
+                <a:r>
+                  <a:rPr lang="fr-BE" sz="1600" dirty="0" err="1" smtClean="0"/>
+                  <a:t>hiding</a:t>
+                </a:r>
+                <a:endParaRPr lang="fr-BE" sz="1600" dirty="0"/>
+              </a:p>
+            </p:txBody>
+          </p:sp>
+          <p:cxnSp>
+            <p:nvCxnSpPr>
+              <p:cNvPr id="150" name="Connecteur droit avec flèche 149"/>
+              <p:cNvCxnSpPr>
+                <a:stCxn id="104" idx="3"/>
+                <a:endCxn id="358" idx="0"/>
+              </p:cNvCxnSpPr>
+              <p:nvPr/>
+            </p:nvCxnSpPr>
+            <p:spPr>
+              <a:xfrm>
+                <a:off x="3842784" y="1394824"/>
+                <a:ext cx="315168" cy="522008"/>
+              </a:xfrm>
+              <a:prstGeom prst="bentConnector2">
+                <a:avLst/>
+              </a:prstGeom>
+              <a:ln>
+                <a:tailEnd type="none"/>
+              </a:ln>
+            </p:spPr>
+            <p:style>
+              <a:lnRef idx="2">
+                <a:schemeClr val="dk1"/>
+              </a:lnRef>
+              <a:fillRef idx="0">
+                <a:schemeClr val="dk1"/>
+              </a:fillRef>
+              <a:effectRef idx="1">
+                <a:schemeClr val="dk1"/>
+              </a:effectRef>
+              <a:fontRef idx="minor">
+                <a:schemeClr val="tx1"/>
+              </a:fontRef>
+            </p:style>
+          </p:cxnSp>
+          <p:cxnSp>
+            <p:nvCxnSpPr>
+              <p:cNvPr id="155" name="Connecteur droit avec flèche 154"/>
+              <p:cNvCxnSpPr>
+                <a:stCxn id="374" idx="6"/>
+                <a:endCxn id="358" idx="4"/>
+              </p:cNvCxnSpPr>
+              <p:nvPr/>
+            </p:nvCxnSpPr>
+            <p:spPr>
+              <a:xfrm flipV="1">
+                <a:off x="3806201" y="1952832"/>
+                <a:ext cx="351751" cy="612072"/>
+              </a:xfrm>
+              <a:prstGeom prst="bentConnector2">
+                <a:avLst/>
+              </a:prstGeom>
+              <a:ln>
+                <a:tailEnd type="none"/>
+              </a:ln>
+            </p:spPr>
+            <p:style>
+              <a:lnRef idx="2">
+                <a:schemeClr val="dk1"/>
+              </a:lnRef>
+              <a:fillRef idx="0">
+                <a:schemeClr val="dk1"/>
+              </a:fillRef>
+              <a:effectRef idx="1">
+                <a:schemeClr val="dk1"/>
+              </a:effectRef>
+              <a:fontRef idx="minor">
+                <a:schemeClr val="tx1"/>
+              </a:fontRef>
+            </p:style>
+          </p:cxnSp>
+          <p:grpSp>
+            <p:nvGrpSpPr>
+              <p:cNvPr id="245" name="Groupe 244"/>
+              <p:cNvGrpSpPr/>
+              <p:nvPr/>
+            </p:nvGrpSpPr>
+            <p:grpSpPr>
+              <a:xfrm>
+                <a:off x="5652240" y="1628784"/>
+                <a:ext cx="1080000" cy="612000"/>
+                <a:chOff x="5724128" y="962760"/>
+                <a:chExt cx="1080000" cy="612000"/>
+              </a:xfrm>
+            </p:grpSpPr>
+            <p:sp>
+              <p:nvSpPr>
+                <p:cNvPr id="161" name="Rectangle 160"/>
+                <p:cNvSpPr/>
+                <p:nvPr/>
+              </p:nvSpPr>
+              <p:spPr>
+                <a:xfrm>
+                  <a:off x="5724128" y="962760"/>
+                  <a:ext cx="1080000" cy="612000"/>
+                </a:xfrm>
+                <a:prstGeom prst="rect">
+                  <a:avLst/>
+                </a:prstGeom>
+                <a:noFill/>
+                <a:ln>
+                  <a:noFill/>
+                </a:ln>
+              </p:spPr>
+              <p:style>
+                <a:lnRef idx="2">
+                  <a:schemeClr val="accent1">
+                    <a:shade val="50000"/>
+                  </a:schemeClr>
+                </a:lnRef>
+                <a:fillRef idx="1">
+                  <a:schemeClr val="accent1"/>
+                </a:fillRef>
+                <a:effectRef idx="0">
+                  <a:schemeClr val="accent1"/>
+                </a:effectRef>
+                <a:fontRef idx="minor">
+                  <a:schemeClr val="lt1"/>
+                </a:fontRef>
+              </p:style>
+              <p:txBody>
+                <a:bodyPr rtlCol="0" anchor="ctr"/>
+                <a:lstStyle/>
+                <a:p>
+                  <a:pPr algn="ctr"/>
+                  <a:r>
+                    <a:rPr lang="fr-BE" noProof="1" smtClean="0">
+                      <a:solidFill>
+                        <a:schemeClr val="tx1"/>
+                      </a:solidFill>
+                    </a:rPr>
+                    <a:t>Model</a:t>
+                  </a:r>
+                </a:p>
+                <a:p>
+                  <a:pPr algn="ctr"/>
+                  <a:r>
+                    <a:rPr lang="fr-BE" noProof="1" smtClean="0">
+                      <a:solidFill>
+                        <a:schemeClr val="tx1"/>
+                      </a:solidFill>
+                    </a:rPr>
+                    <a:t>LTS</a:t>
+                  </a:r>
+                  <a:endParaRPr lang="fr-BE" noProof="1">
+                    <a:solidFill>
+                      <a:schemeClr val="tx1"/>
+                    </a:solidFill>
+                  </a:endParaRPr>
+                </a:p>
+              </p:txBody>
+            </p:sp>
+            <p:cxnSp>
+              <p:nvCxnSpPr>
+                <p:cNvPr id="164" name="Connecteur droit 163"/>
+                <p:cNvCxnSpPr/>
+                <p:nvPr/>
+              </p:nvCxnSpPr>
+              <p:spPr>
+                <a:xfrm>
+                  <a:off x="5724128" y="980728"/>
+                  <a:ext cx="1080000" cy="0"/>
+                </a:xfrm>
+                <a:prstGeom prst="line">
+                  <a:avLst/>
+                </a:prstGeom>
+              </p:spPr>
+              <p:style>
+                <a:lnRef idx="2">
+                  <a:schemeClr val="dk1"/>
+                </a:lnRef>
+                <a:fillRef idx="0">
+                  <a:schemeClr val="dk1"/>
+                </a:fillRef>
+                <a:effectRef idx="1">
+                  <a:schemeClr val="dk1"/>
+                </a:effectRef>
+                <a:fontRef idx="minor">
+                  <a:schemeClr val="tx1"/>
+                </a:fontRef>
+              </p:style>
+            </p:cxnSp>
+            <p:cxnSp>
+              <p:nvCxnSpPr>
+                <p:cNvPr id="165" name="Connecteur droit 164"/>
+                <p:cNvCxnSpPr/>
+                <p:nvPr/>
+              </p:nvCxnSpPr>
+              <p:spPr>
+                <a:xfrm>
+                  <a:off x="5724128" y="1556792"/>
+                  <a:ext cx="1080000" cy="0"/>
+                </a:xfrm>
+                <a:prstGeom prst="line">
+                  <a:avLst/>
+                </a:prstGeom>
+              </p:spPr>
+              <p:style>
+                <a:lnRef idx="2">
+                  <a:schemeClr val="dk1"/>
+                </a:lnRef>
+                <a:fillRef idx="0">
+                  <a:schemeClr val="dk1"/>
+                </a:fillRef>
+                <a:effectRef idx="1">
+                  <a:schemeClr val="dk1"/>
+                </a:effectRef>
+                <a:fontRef idx="minor">
+                  <a:schemeClr val="tx1"/>
+                </a:fontRef>
+              </p:style>
+            </p:cxnSp>
+          </p:grpSp>
+          <p:sp>
+            <p:nvSpPr>
+              <p:cNvPr id="182" name="Ellipse 181"/>
+              <p:cNvSpPr/>
+              <p:nvPr/>
+            </p:nvSpPr>
+            <p:spPr>
+              <a:xfrm>
+                <a:off x="1522264" y="4401208"/>
+                <a:ext cx="900000" cy="900000"/>
+              </a:xfrm>
+              <a:prstGeom prst="ellipse">
+                <a:avLst/>
+              </a:prstGeom>
+            </p:spPr>
+            <p:style>
+              <a:lnRef idx="2">
+                <a:schemeClr val="dk1"/>
+              </a:lnRef>
+              <a:fillRef idx="1">
+                <a:schemeClr val="lt1"/>
+              </a:fillRef>
+              <a:effectRef idx="0">
+                <a:schemeClr val="dk1"/>
+              </a:effectRef>
+              <a:fontRef idx="minor">
+                <a:schemeClr val="dk1"/>
+              </a:fontRef>
+            </p:style>
+            <p:txBody>
+              <a:bodyPr wrap="none" lIns="0" tIns="0" rIns="0" bIns="0" rtlCol="0" anchor="ctr"/>
+              <a:lstStyle/>
+              <a:p>
+                <a:pPr algn="ctr"/>
+                <a:r>
+                  <a:rPr lang="fr-BE" sz="1600" dirty="0" smtClean="0"/>
+                  <a:t>LTL2</a:t>
+                </a:r>
+                <a:br>
+                  <a:rPr lang="fr-BE" sz="1600" dirty="0" smtClean="0"/>
+                </a:br>
+                <a:r>
+                  <a:rPr lang="fr-BE" sz="1600" dirty="0" err="1" smtClean="0"/>
+                  <a:t>Buchi</a:t>
+                </a:r>
+                <a:endParaRPr lang="fr-BE" sz="1600" dirty="0"/>
+              </a:p>
+            </p:txBody>
+          </p:sp>
+          <p:grpSp>
+            <p:nvGrpSpPr>
+              <p:cNvPr id="242" name="Groupe 241"/>
+              <p:cNvGrpSpPr/>
+              <p:nvPr/>
+            </p:nvGrpSpPr>
+            <p:grpSpPr>
+              <a:xfrm>
+                <a:off x="2654784" y="4545224"/>
+                <a:ext cx="1188000" cy="612000"/>
+                <a:chOff x="2843928" y="2780928"/>
+                <a:chExt cx="1080000" cy="612000"/>
+              </a:xfrm>
+            </p:grpSpPr>
+            <p:sp>
+              <p:nvSpPr>
+                <p:cNvPr id="184" name="Rectangle 183"/>
+                <p:cNvSpPr/>
+                <p:nvPr/>
+              </p:nvSpPr>
+              <p:spPr>
+                <a:xfrm>
+                  <a:off x="2843928" y="2780928"/>
+                  <a:ext cx="1080000" cy="612000"/>
+                </a:xfrm>
+                <a:prstGeom prst="rect">
+                  <a:avLst/>
+                </a:prstGeom>
+                <a:noFill/>
+                <a:ln>
+                  <a:noFill/>
+                </a:ln>
+              </p:spPr>
+              <p:style>
+                <a:lnRef idx="2">
+                  <a:schemeClr val="accent1">
+                    <a:shade val="50000"/>
+                  </a:schemeClr>
+                </a:lnRef>
+                <a:fillRef idx="1">
+                  <a:schemeClr val="accent1"/>
+                </a:fillRef>
+                <a:effectRef idx="0">
+                  <a:schemeClr val="accent1"/>
+                </a:effectRef>
+                <a:fontRef idx="minor">
+                  <a:schemeClr val="lt1"/>
+                </a:fontRef>
+              </p:style>
+              <p:txBody>
+                <a:bodyPr wrap="none" lIns="0" tIns="0" rIns="0" bIns="0" rtlCol="0" anchor="ctr"/>
+                <a:lstStyle/>
+                <a:p>
+                  <a:pPr algn="ctr"/>
+                  <a:r>
+                    <a:rPr lang="fr-BE" noProof="1" smtClean="0">
+                      <a:solidFill>
+                        <a:schemeClr val="tx1"/>
+                      </a:solidFill>
+                    </a:rPr>
+                    <a:t>Buchi</a:t>
+                  </a:r>
+                  <a:r>
+                    <a:rPr lang="fr-BE" noProof="1" smtClean="0">
+                      <a:solidFill>
+                        <a:schemeClr val="tx1"/>
+                      </a:solidFill>
+                    </a:rPr>
+                    <a:t> </a:t>
+                  </a:r>
+                  <a:r>
+                    <a:rPr lang="fr-BE" noProof="1" smtClean="0">
+                      <a:solidFill>
+                        <a:schemeClr val="tx1"/>
+                      </a:solidFill>
+                    </a:rPr>
+                    <a:t>(</a:t>
+                  </a:r>
+                  <a:r>
+                    <a:rPr lang="fr-BE" noProof="1" smtClean="0">
+                      <a:solidFill>
+                        <a:schemeClr val="tx1"/>
+                      </a:solidFill>
+                      <a:sym typeface="Symbol"/>
+                    </a:rPr>
+                    <a:t></a:t>
+                  </a:r>
+                  <a:r>
+                    <a:rPr lang="fr-BE" noProof="1" smtClean="0">
+                      <a:solidFill>
+                        <a:schemeClr val="tx1"/>
+                      </a:solidFill>
+                    </a:rPr>
+                    <a:t>)</a:t>
+                  </a:r>
+                  <a:endParaRPr lang="fr-BE" noProof="1" smtClean="0">
+                    <a:solidFill>
+                      <a:schemeClr val="tx1"/>
+                    </a:solidFill>
+                  </a:endParaRPr>
+                </a:p>
+                <a:p>
+                  <a:pPr algn="ctr"/>
+                  <a:r>
+                    <a:rPr lang="fr-BE" noProof="1" smtClean="0">
+                      <a:solidFill>
+                        <a:schemeClr val="tx1"/>
+                      </a:solidFill>
+                    </a:rPr>
+                    <a:t>automaton</a:t>
+                  </a:r>
+                  <a:endParaRPr lang="fr-BE" noProof="1">
+                    <a:solidFill>
+                      <a:schemeClr val="tx1"/>
+                    </a:solidFill>
+                  </a:endParaRPr>
+                </a:p>
+              </p:txBody>
+            </p:sp>
+            <p:cxnSp>
+              <p:nvCxnSpPr>
+                <p:cNvPr id="186" name="Connecteur droit 185"/>
+                <p:cNvCxnSpPr/>
+                <p:nvPr/>
+              </p:nvCxnSpPr>
+              <p:spPr>
+                <a:xfrm>
+                  <a:off x="2843928" y="2798896"/>
+                  <a:ext cx="1080000" cy="0"/>
+                </a:xfrm>
+                <a:prstGeom prst="line">
+                  <a:avLst/>
+                </a:prstGeom>
+              </p:spPr>
+              <p:style>
+                <a:lnRef idx="2">
+                  <a:schemeClr val="dk1"/>
+                </a:lnRef>
+                <a:fillRef idx="0">
+                  <a:schemeClr val="dk1"/>
+                </a:fillRef>
+                <a:effectRef idx="1">
+                  <a:schemeClr val="dk1"/>
+                </a:effectRef>
+                <a:fontRef idx="minor">
+                  <a:schemeClr val="tx1"/>
+                </a:fontRef>
+              </p:style>
+            </p:cxnSp>
+            <p:cxnSp>
+              <p:nvCxnSpPr>
+                <p:cNvPr id="187" name="Connecteur droit 186"/>
+                <p:cNvCxnSpPr/>
+                <p:nvPr/>
+              </p:nvCxnSpPr>
+              <p:spPr>
+                <a:xfrm>
+                  <a:off x="2843928" y="3374960"/>
+                  <a:ext cx="1080000" cy="0"/>
+                </a:xfrm>
+                <a:prstGeom prst="line">
+                  <a:avLst/>
+                </a:prstGeom>
+              </p:spPr>
+              <p:style>
+                <a:lnRef idx="2">
+                  <a:schemeClr val="dk1"/>
+                </a:lnRef>
+                <a:fillRef idx="0">
+                  <a:schemeClr val="dk1"/>
+                </a:fillRef>
+                <a:effectRef idx="1">
+                  <a:schemeClr val="dk1"/>
+                </a:effectRef>
+                <a:fontRef idx="minor">
+                  <a:schemeClr val="tx1"/>
+                </a:fontRef>
+              </p:style>
+            </p:cxnSp>
+          </p:grpSp>
+          <p:cxnSp>
+            <p:nvCxnSpPr>
+              <p:cNvPr id="188" name="Connecteur droit avec flèche 187"/>
+              <p:cNvCxnSpPr>
+                <a:endCxn id="182" idx="2"/>
+              </p:cNvCxnSpPr>
+              <p:nvPr/>
+            </p:nvCxnSpPr>
+            <p:spPr>
+              <a:xfrm flipV="1">
+                <a:off x="1295512" y="4851208"/>
+                <a:ext cx="226752" cy="16"/>
+              </a:xfrm>
+              <a:prstGeom prst="bentConnector3">
+                <a:avLst>
+                  <a:gd name="adj1" fmla="val 50000"/>
+                </a:avLst>
+              </a:prstGeom>
+              <a:ln>
+                <a:tailEnd type="arrow"/>
+              </a:ln>
+            </p:spPr>
+            <p:style>
+              <a:lnRef idx="2">
+                <a:schemeClr val="dk1"/>
+              </a:lnRef>
+              <a:fillRef idx="0">
+                <a:schemeClr val="dk1"/>
+              </a:fillRef>
+              <a:effectRef idx="1">
+                <a:schemeClr val="dk1"/>
+              </a:effectRef>
+              <a:fontRef idx="minor">
+                <a:schemeClr val="tx1"/>
+              </a:fontRef>
+            </p:style>
+          </p:cxnSp>
+          <p:grpSp>
+            <p:nvGrpSpPr>
+              <p:cNvPr id="243" name="Groupe 242"/>
+              <p:cNvGrpSpPr/>
+              <p:nvPr/>
+            </p:nvGrpSpPr>
+            <p:grpSpPr>
+              <a:xfrm>
+                <a:off x="2654784" y="3609088"/>
+                <a:ext cx="1188000" cy="612000"/>
+                <a:chOff x="2771800" y="3861048"/>
+                <a:chExt cx="1152000" cy="612000"/>
+              </a:xfrm>
+            </p:grpSpPr>
+            <p:sp>
+              <p:nvSpPr>
+                <p:cNvPr id="196" name="Rectangle 195"/>
+                <p:cNvSpPr/>
+                <p:nvPr/>
+              </p:nvSpPr>
+              <p:spPr>
+                <a:xfrm>
+                  <a:off x="2771800" y="3861048"/>
+                  <a:ext cx="1152000" cy="612000"/>
+                </a:xfrm>
+                <a:prstGeom prst="rect">
+                  <a:avLst/>
+                </a:prstGeom>
+                <a:noFill/>
+                <a:ln>
+                  <a:noFill/>
+                </a:ln>
+              </p:spPr>
+              <p:style>
+                <a:lnRef idx="2">
+                  <a:schemeClr val="accent1">
+                    <a:shade val="50000"/>
+                  </a:schemeClr>
+                </a:lnRef>
+                <a:fillRef idx="1">
+                  <a:schemeClr val="accent1"/>
+                </a:fillRef>
+                <a:effectRef idx="0">
+                  <a:schemeClr val="accent1"/>
+                </a:effectRef>
+                <a:fontRef idx="minor">
+                  <a:schemeClr val="lt1"/>
+                </a:fontRef>
+              </p:style>
+              <p:txBody>
+                <a:bodyPr wrap="none" lIns="0" tIns="0" rIns="0" bIns="0" rtlCol="0" anchor="ctr"/>
+                <a:lstStyle/>
+                <a:p>
+                  <a:pPr algn="ctr"/>
+                  <a:r>
+                    <a:rPr lang="fr-BE" noProof="1" smtClean="0">
+                      <a:solidFill>
+                        <a:schemeClr val="tx1"/>
+                      </a:solidFill>
+                    </a:rPr>
+                    <a:t>Synchronizer</a:t>
+                  </a:r>
+                  <a:endParaRPr lang="fr-BE" noProof="1" smtClean="0">
+                    <a:solidFill>
+                      <a:schemeClr val="tx1"/>
+                    </a:solidFill>
+                  </a:endParaRPr>
+                </a:p>
+                <a:p>
+                  <a:pPr algn="ctr"/>
+                  <a:r>
+                    <a:rPr lang="fr-BE" noProof="1" smtClean="0">
+                      <a:solidFill>
+                        <a:schemeClr val="tx1"/>
+                      </a:solidFill>
+                    </a:rPr>
+                    <a:t>automaton</a:t>
+                  </a:r>
+                  <a:endParaRPr lang="fr-BE" noProof="1">
+                    <a:solidFill>
+                      <a:schemeClr val="tx1"/>
+                    </a:solidFill>
+                  </a:endParaRPr>
+                </a:p>
+              </p:txBody>
+            </p:sp>
+            <p:cxnSp>
+              <p:nvCxnSpPr>
+                <p:cNvPr id="198" name="Connecteur droit 197"/>
+                <p:cNvCxnSpPr/>
+                <p:nvPr/>
+              </p:nvCxnSpPr>
+              <p:spPr>
+                <a:xfrm>
+                  <a:off x="2771800" y="3879016"/>
+                  <a:ext cx="1152000" cy="0"/>
+                </a:xfrm>
+                <a:prstGeom prst="line">
+                  <a:avLst/>
+                </a:prstGeom>
+              </p:spPr>
+              <p:style>
+                <a:lnRef idx="2">
+                  <a:schemeClr val="dk1"/>
+                </a:lnRef>
+                <a:fillRef idx="0">
+                  <a:schemeClr val="dk1"/>
+                </a:fillRef>
+                <a:effectRef idx="1">
+                  <a:schemeClr val="dk1"/>
+                </a:effectRef>
+                <a:fontRef idx="minor">
+                  <a:schemeClr val="tx1"/>
+                </a:fontRef>
+              </p:style>
+            </p:cxnSp>
+            <p:cxnSp>
+              <p:nvCxnSpPr>
+                <p:cNvPr id="199" name="Connecteur droit 198"/>
+                <p:cNvCxnSpPr/>
+                <p:nvPr/>
+              </p:nvCxnSpPr>
+              <p:spPr>
+                <a:xfrm>
+                  <a:off x="2771800" y="4455080"/>
+                  <a:ext cx="1152000" cy="0"/>
+                </a:xfrm>
+                <a:prstGeom prst="line">
+                  <a:avLst/>
+                </a:prstGeom>
+              </p:spPr>
+              <p:style>
+                <a:lnRef idx="2">
+                  <a:schemeClr val="dk1"/>
+                </a:lnRef>
+                <a:fillRef idx="0">
+                  <a:schemeClr val="dk1"/>
+                </a:fillRef>
+                <a:effectRef idx="1">
+                  <a:schemeClr val="dk1"/>
+                </a:effectRef>
+                <a:fontRef idx="minor">
+                  <a:schemeClr val="tx1"/>
+                </a:fontRef>
+              </p:style>
+            </p:cxnSp>
+          </p:grpSp>
+          <p:sp>
+            <p:nvSpPr>
+              <p:cNvPr id="200" name="Ellipse 199"/>
+              <p:cNvSpPr/>
+              <p:nvPr/>
+            </p:nvSpPr>
+            <p:spPr>
+              <a:xfrm>
+                <a:off x="4536184" y="3465104"/>
+                <a:ext cx="900000" cy="900000"/>
+              </a:xfrm>
+              <a:prstGeom prst="ellipse">
+                <a:avLst/>
+              </a:prstGeom>
+            </p:spPr>
+            <p:style>
+              <a:lnRef idx="2">
+                <a:schemeClr val="dk1"/>
+              </a:lnRef>
+              <a:fillRef idx="1">
+                <a:schemeClr val="lt1"/>
+              </a:fillRef>
+              <a:effectRef idx="0">
+                <a:schemeClr val="dk1"/>
+              </a:effectRef>
+              <a:fontRef idx="minor">
+                <a:schemeClr val="dk1"/>
+              </a:fontRef>
+            </p:style>
+            <p:txBody>
+              <a:bodyPr lIns="0" tIns="0" rIns="0" bIns="0" rtlCol="0" anchor="ctr"/>
+              <a:lstStyle/>
+              <a:p>
+                <a:pPr algn="ctr"/>
+                <a:r>
+                  <a:rPr lang="fr-BE" sz="1600" dirty="0" smtClean="0"/>
+                  <a:t>g</a:t>
+                </a:r>
+                <a:r>
+                  <a:rPr lang="fr-BE" sz="1600" dirty="0" smtClean="0"/>
+                  <a:t>-LTS </a:t>
+                </a:r>
+                <a:r>
+                  <a:rPr lang="fr-BE" sz="1600" dirty="0" smtClean="0">
+                    <a:latin typeface="Arial" pitchFamily="34" charset="0"/>
+                    <a:cs typeface="Arial" pitchFamily="34" charset="0"/>
+                  </a:rPr>
+                  <a:t> ||</a:t>
+                </a:r>
+                <a:r>
+                  <a:rPr lang="fr-BE" sz="1600" dirty="0" smtClean="0"/>
+                  <a:t/>
+                </a:r>
+                <a:br>
+                  <a:rPr lang="fr-BE" sz="1600" dirty="0" smtClean="0"/>
+                </a:br>
+                <a:r>
+                  <a:rPr lang="fr-BE" sz="1600" dirty="0" smtClean="0"/>
+                  <a:t>+</a:t>
+                </a:r>
+                <a:r>
+                  <a:rPr lang="fr-BE" sz="1600" dirty="0" err="1" smtClean="0"/>
+                  <a:t>hiding</a:t>
+                </a:r>
+                <a:endParaRPr lang="fr-BE" sz="1600" dirty="0"/>
+              </a:p>
+            </p:txBody>
+          </p:sp>
+          <p:cxnSp>
+            <p:nvCxnSpPr>
+              <p:cNvPr id="201" name="Connecteur droit avec flèche 200"/>
+              <p:cNvCxnSpPr>
+                <a:stCxn id="376" idx="6"/>
+                <a:endCxn id="359" idx="0"/>
+              </p:cNvCxnSpPr>
+              <p:nvPr/>
+            </p:nvCxnSpPr>
+            <p:spPr>
+              <a:xfrm>
+                <a:off x="3806201" y="2780928"/>
+                <a:ext cx="351751" cy="1116128"/>
+              </a:xfrm>
+              <a:prstGeom prst="bentConnector2">
+                <a:avLst/>
+              </a:prstGeom>
+              <a:ln>
+                <a:tailEnd type="none"/>
+              </a:ln>
+            </p:spPr>
+            <p:style>
+              <a:lnRef idx="2">
+                <a:schemeClr val="dk1"/>
+              </a:lnRef>
+              <a:fillRef idx="0">
+                <a:schemeClr val="dk1"/>
+              </a:fillRef>
+              <a:effectRef idx="1">
+                <a:schemeClr val="dk1"/>
+              </a:effectRef>
+              <a:fontRef idx="minor">
+                <a:schemeClr val="tx1"/>
+              </a:fontRef>
+            </p:style>
+          </p:cxnSp>
+          <p:cxnSp>
+            <p:nvCxnSpPr>
+              <p:cNvPr id="204" name="Connecteur droit avec flèche 203"/>
+              <p:cNvCxnSpPr>
+                <a:stCxn id="184" idx="3"/>
+                <a:endCxn id="359" idx="4"/>
+              </p:cNvCxnSpPr>
+              <p:nvPr/>
+            </p:nvCxnSpPr>
+            <p:spPr>
+              <a:xfrm flipV="1">
+                <a:off x="3842784" y="3933056"/>
+                <a:ext cx="315168" cy="918168"/>
+              </a:xfrm>
+              <a:prstGeom prst="bentConnector2">
+                <a:avLst/>
+              </a:prstGeom>
+              <a:ln>
+                <a:tailEnd type="none"/>
+              </a:ln>
+            </p:spPr>
+            <p:style>
+              <a:lnRef idx="2">
+                <a:schemeClr val="dk1"/>
+              </a:lnRef>
+              <a:fillRef idx="0">
+                <a:schemeClr val="dk1"/>
+              </a:fillRef>
+              <a:effectRef idx="1">
+                <a:schemeClr val="dk1"/>
+              </a:effectRef>
+              <a:fontRef idx="minor">
+                <a:schemeClr val="tx1"/>
+              </a:fontRef>
+            </p:style>
+          </p:cxnSp>
+          <p:cxnSp>
+            <p:nvCxnSpPr>
+              <p:cNvPr id="207" name="Connecteur droit avec flèche 206"/>
+              <p:cNvCxnSpPr>
+                <a:stCxn id="359" idx="6"/>
+                <a:endCxn id="200" idx="2"/>
+              </p:cNvCxnSpPr>
+              <p:nvPr/>
+            </p:nvCxnSpPr>
+            <p:spPr>
+              <a:xfrm>
+                <a:off x="4175952" y="3915056"/>
+                <a:ext cx="360232" cy="48"/>
+              </a:xfrm>
+              <a:prstGeom prst="straightConnector1">
+                <a:avLst/>
+              </a:prstGeom>
+              <a:ln>
+                <a:tailEnd type="arrow"/>
+              </a:ln>
+            </p:spPr>
+            <p:style>
+              <a:lnRef idx="2">
+                <a:schemeClr val="dk1"/>
+              </a:lnRef>
+              <a:fillRef idx="0">
+                <a:schemeClr val="dk1"/>
+              </a:fillRef>
+              <a:effectRef idx="1">
+                <a:schemeClr val="dk1"/>
+              </a:effectRef>
+              <a:fontRef idx="minor">
+                <a:schemeClr val="tx1"/>
+              </a:fontRef>
+            </p:style>
+          </p:cxnSp>
+          <p:grpSp>
+            <p:nvGrpSpPr>
+              <p:cNvPr id="246" name="Groupe 245"/>
+              <p:cNvGrpSpPr/>
+              <p:nvPr/>
+            </p:nvGrpSpPr>
+            <p:grpSpPr>
+              <a:xfrm>
+                <a:off x="5652240" y="3609104"/>
+                <a:ext cx="1080000" cy="612000"/>
+                <a:chOff x="5688124" y="2708920"/>
+                <a:chExt cx="1080000" cy="612000"/>
+              </a:xfrm>
+            </p:grpSpPr>
+            <p:sp>
+              <p:nvSpPr>
+                <p:cNvPr id="211" name="Rectangle 210"/>
+                <p:cNvSpPr/>
+                <p:nvPr/>
+              </p:nvSpPr>
+              <p:spPr>
+                <a:xfrm>
+                  <a:off x="5688124" y="2708920"/>
+                  <a:ext cx="1080000" cy="612000"/>
+                </a:xfrm>
+                <a:prstGeom prst="rect">
+                  <a:avLst/>
+                </a:prstGeom>
+                <a:noFill/>
+                <a:ln>
+                  <a:noFill/>
+                </a:ln>
+              </p:spPr>
+              <p:style>
+                <a:lnRef idx="2">
+                  <a:schemeClr val="accent1">
+                    <a:shade val="50000"/>
+                  </a:schemeClr>
+                </a:lnRef>
+                <a:fillRef idx="1">
+                  <a:schemeClr val="accent1"/>
+                </a:fillRef>
+                <a:effectRef idx="0">
+                  <a:schemeClr val="accent1"/>
+                </a:effectRef>
+                <a:fontRef idx="minor">
+                  <a:schemeClr val="lt1"/>
+                </a:fontRef>
+              </p:style>
+              <p:txBody>
+                <a:bodyPr wrap="none" lIns="0" tIns="0" rIns="0" bIns="0" rtlCol="0" anchor="ctr"/>
+                <a:lstStyle/>
+                <a:p>
+                  <a:pPr algn="ctr"/>
+                  <a:r>
+                    <a:rPr lang="fr-BE" noProof="1" smtClean="0">
+                      <a:solidFill>
+                        <a:schemeClr val="tx1"/>
+                      </a:solidFill>
+                    </a:rPr>
+                    <a:t>Tester</a:t>
+                  </a:r>
+                </a:p>
+                <a:p>
+                  <a:pPr algn="ctr"/>
+                  <a:r>
+                    <a:rPr lang="fr-BE" noProof="1" smtClean="0">
+                      <a:solidFill>
+                        <a:schemeClr val="tx1"/>
+                      </a:solidFill>
+                    </a:rPr>
+                    <a:t>automaton</a:t>
+                  </a:r>
+                  <a:endParaRPr lang="fr-BE" noProof="1">
+                    <a:solidFill>
+                      <a:schemeClr val="tx1"/>
+                    </a:solidFill>
+                  </a:endParaRPr>
+                </a:p>
+              </p:txBody>
+            </p:sp>
+            <p:cxnSp>
+              <p:nvCxnSpPr>
+                <p:cNvPr id="213" name="Connecteur droit 212"/>
+                <p:cNvCxnSpPr/>
+                <p:nvPr/>
+              </p:nvCxnSpPr>
+              <p:spPr>
+                <a:xfrm>
+                  <a:off x="5688124" y="2726888"/>
+                  <a:ext cx="1080000" cy="0"/>
+                </a:xfrm>
+                <a:prstGeom prst="line">
+                  <a:avLst/>
+                </a:prstGeom>
+              </p:spPr>
+              <p:style>
+                <a:lnRef idx="2">
+                  <a:schemeClr val="dk1"/>
+                </a:lnRef>
+                <a:fillRef idx="0">
+                  <a:schemeClr val="dk1"/>
+                </a:fillRef>
+                <a:effectRef idx="1">
+                  <a:schemeClr val="dk1"/>
+                </a:effectRef>
+                <a:fontRef idx="minor">
+                  <a:schemeClr val="tx1"/>
+                </a:fontRef>
+              </p:style>
+            </p:cxnSp>
+            <p:cxnSp>
+              <p:nvCxnSpPr>
+                <p:cNvPr id="214" name="Connecteur droit 213"/>
+                <p:cNvCxnSpPr/>
+                <p:nvPr/>
+              </p:nvCxnSpPr>
+              <p:spPr>
+                <a:xfrm>
+                  <a:off x="5688124" y="3302952"/>
+                  <a:ext cx="1080000" cy="0"/>
+                </a:xfrm>
+                <a:prstGeom prst="line">
+                  <a:avLst/>
+                </a:prstGeom>
+              </p:spPr>
+              <p:style>
+                <a:lnRef idx="2">
+                  <a:schemeClr val="dk1"/>
+                </a:lnRef>
+                <a:fillRef idx="0">
+                  <a:schemeClr val="dk1"/>
+                </a:fillRef>
+                <a:effectRef idx="1">
+                  <a:schemeClr val="dk1"/>
+                </a:effectRef>
+                <a:fontRef idx="minor">
+                  <a:schemeClr val="tx1"/>
+                </a:fontRef>
+              </p:style>
+            </p:cxnSp>
+          </p:grpSp>
+          <p:cxnSp>
+            <p:nvCxnSpPr>
+              <p:cNvPr id="215" name="Connecteur droit avec flèche 214"/>
+              <p:cNvCxnSpPr>
+                <a:stCxn id="200" idx="6"/>
+                <a:endCxn id="211" idx="1"/>
+              </p:cNvCxnSpPr>
+              <p:nvPr/>
+            </p:nvCxnSpPr>
+            <p:spPr>
+              <a:xfrm>
+                <a:off x="5436184" y="3915104"/>
+                <a:ext cx="216056" cy="1588"/>
+              </a:xfrm>
+              <a:prstGeom prst="bentConnector3">
+                <a:avLst>
+                  <a:gd name="adj1" fmla="val 50000"/>
+                </a:avLst>
+              </a:prstGeom>
+              <a:ln>
+                <a:tailEnd type="arrow"/>
+              </a:ln>
+            </p:spPr>
+            <p:style>
+              <a:lnRef idx="2">
+                <a:schemeClr val="dk1"/>
+              </a:lnRef>
+              <a:fillRef idx="0">
+                <a:schemeClr val="dk1"/>
+              </a:fillRef>
+              <a:effectRef idx="1">
+                <a:schemeClr val="dk1"/>
+              </a:effectRef>
+              <a:fontRef idx="minor">
+                <a:schemeClr val="tx1"/>
+              </a:fontRef>
+            </p:style>
+          </p:cxnSp>
+          <p:grpSp>
+            <p:nvGrpSpPr>
+              <p:cNvPr id="247" name="Groupe 246"/>
+              <p:cNvGrpSpPr/>
+              <p:nvPr/>
+            </p:nvGrpSpPr>
+            <p:grpSpPr>
+              <a:xfrm>
+                <a:off x="6977992" y="2605568"/>
+                <a:ext cx="1296000" cy="612000"/>
+                <a:chOff x="7463402" y="1844824"/>
+                <a:chExt cx="1296000" cy="612000"/>
+              </a:xfrm>
+            </p:grpSpPr>
+            <p:sp>
+              <p:nvSpPr>
+                <p:cNvPr id="219" name="Rectangle 218"/>
+                <p:cNvSpPr/>
+                <p:nvPr/>
+              </p:nvSpPr>
+              <p:spPr>
+                <a:xfrm>
+                  <a:off x="7463402" y="1844824"/>
+                  <a:ext cx="1296000" cy="612000"/>
+                </a:xfrm>
+                <a:prstGeom prst="rect">
+                  <a:avLst/>
+                </a:prstGeom>
+                <a:noFill/>
+                <a:ln>
+                  <a:noFill/>
+                </a:ln>
+              </p:spPr>
+              <p:style>
+                <a:lnRef idx="2">
+                  <a:schemeClr val="accent1">
+                    <a:shade val="50000"/>
+                  </a:schemeClr>
+                </a:lnRef>
+                <a:fillRef idx="1">
+                  <a:schemeClr val="accent1"/>
+                </a:fillRef>
+                <a:effectRef idx="0">
+                  <a:schemeClr val="accent1"/>
+                </a:effectRef>
+                <a:fontRef idx="minor">
+                  <a:schemeClr val="lt1"/>
+                </a:fontRef>
+              </p:style>
+              <p:txBody>
+                <a:bodyPr wrap="none" lIns="0" tIns="0" rIns="0" bIns="0" rtlCol="0" anchor="ctr"/>
+                <a:lstStyle/>
+                <a:p>
+                  <a:pPr algn="ctr"/>
+                  <a:r>
+                    <a:rPr lang="fr-BE" noProof="1" smtClean="0">
+                      <a:solidFill>
+                        <a:schemeClr val="tx1"/>
+                      </a:solidFill>
+                    </a:rPr>
+                    <a:t>Search space </a:t>
+                  </a:r>
+                  <a:br>
+                    <a:rPr lang="fr-BE" noProof="1" smtClean="0">
+                      <a:solidFill>
+                        <a:schemeClr val="tx1"/>
+                      </a:solidFill>
+                    </a:rPr>
+                  </a:br>
+                  <a:r>
+                    <a:rPr lang="fr-BE" noProof="1" smtClean="0">
+                      <a:solidFill>
+                        <a:schemeClr val="tx1"/>
+                      </a:solidFill>
+                    </a:rPr>
+                    <a:t>automaton</a:t>
+                  </a:r>
+                  <a:endParaRPr lang="fr-BE" noProof="1">
+                    <a:solidFill>
+                      <a:schemeClr val="tx1"/>
+                    </a:solidFill>
+                  </a:endParaRPr>
+                </a:p>
+              </p:txBody>
+            </p:sp>
+            <p:cxnSp>
+              <p:nvCxnSpPr>
+                <p:cNvPr id="221" name="Connecteur droit 220"/>
+                <p:cNvCxnSpPr/>
+                <p:nvPr/>
+              </p:nvCxnSpPr>
+              <p:spPr>
+                <a:xfrm>
+                  <a:off x="7463402" y="1862792"/>
+                  <a:ext cx="1296000" cy="0"/>
+                </a:xfrm>
+                <a:prstGeom prst="line">
+                  <a:avLst/>
+                </a:prstGeom>
+              </p:spPr>
+              <p:style>
+                <a:lnRef idx="2">
+                  <a:schemeClr val="dk1"/>
+                </a:lnRef>
+                <a:fillRef idx="0">
+                  <a:schemeClr val="dk1"/>
+                </a:fillRef>
+                <a:effectRef idx="1">
+                  <a:schemeClr val="dk1"/>
+                </a:effectRef>
+                <a:fontRef idx="minor">
+                  <a:schemeClr val="tx1"/>
+                </a:fontRef>
+              </p:style>
+            </p:cxnSp>
+            <p:cxnSp>
+              <p:nvCxnSpPr>
+                <p:cNvPr id="222" name="Connecteur droit 221"/>
+                <p:cNvCxnSpPr/>
+                <p:nvPr/>
+              </p:nvCxnSpPr>
+              <p:spPr>
+                <a:xfrm>
+                  <a:off x="7463402" y="2438856"/>
+                  <a:ext cx="1296000" cy="0"/>
+                </a:xfrm>
+                <a:prstGeom prst="line">
+                  <a:avLst/>
+                </a:prstGeom>
+              </p:spPr>
+              <p:style>
+                <a:lnRef idx="2">
+                  <a:schemeClr val="dk1"/>
+                </a:lnRef>
+                <a:fillRef idx="0">
+                  <a:schemeClr val="dk1"/>
+                </a:fillRef>
+                <a:effectRef idx="1">
+                  <a:schemeClr val="dk1"/>
+                </a:effectRef>
+                <a:fontRef idx="minor">
+                  <a:schemeClr val="tx1"/>
+                </a:fontRef>
+              </p:style>
+            </p:cxnSp>
+          </p:grpSp>
+          <p:sp>
+            <p:nvSpPr>
+              <p:cNvPr id="248" name="Ellipse 247"/>
+              <p:cNvSpPr/>
+              <p:nvPr/>
+            </p:nvSpPr>
+            <p:spPr>
+              <a:xfrm>
+                <a:off x="5742240" y="2461568"/>
+                <a:ext cx="900000" cy="900000"/>
+              </a:xfrm>
+              <a:prstGeom prst="ellipse">
+                <a:avLst/>
+              </a:prstGeom>
+            </p:spPr>
+            <p:style>
+              <a:lnRef idx="2">
+                <a:schemeClr val="dk1"/>
+              </a:lnRef>
+              <a:fillRef idx="1">
+                <a:schemeClr val="lt1"/>
+              </a:fillRef>
+              <a:effectRef idx="0">
+                <a:schemeClr val="dk1"/>
+              </a:effectRef>
+              <a:fontRef idx="minor">
+                <a:schemeClr val="dk1"/>
+              </a:fontRef>
+            </p:style>
+            <p:txBody>
+              <a:bodyPr lIns="0" tIns="0" rIns="0" bIns="0" rtlCol="0" anchor="ctr"/>
+              <a:lstStyle/>
+              <a:p>
+                <a:pPr algn="ctr"/>
+                <a:r>
+                  <a:rPr lang="fr-BE" sz="1600" dirty="0" smtClean="0"/>
+                  <a:t>LTS </a:t>
+                </a:r>
+                <a:r>
+                  <a:rPr lang="fr-BE" sz="1600" dirty="0" smtClean="0">
+                    <a:latin typeface="Arial" pitchFamily="34" charset="0"/>
+                    <a:cs typeface="Arial" pitchFamily="34" charset="0"/>
+                  </a:rPr>
+                  <a:t> ||</a:t>
+                </a:r>
+                <a:endParaRPr lang="fr-BE" sz="1600" dirty="0"/>
+              </a:p>
+            </p:txBody>
+          </p:sp>
+          <p:cxnSp>
+            <p:nvCxnSpPr>
+              <p:cNvPr id="254" name="Connecteur droit avec flèche 253"/>
+              <p:cNvCxnSpPr>
+                <a:endCxn id="248" idx="0"/>
+              </p:cNvCxnSpPr>
+              <p:nvPr/>
+            </p:nvCxnSpPr>
+            <p:spPr>
+              <a:xfrm rot="5400000">
+                <a:off x="6081848" y="2351176"/>
+                <a:ext cx="220784" cy="1588"/>
+              </a:xfrm>
+              <a:prstGeom prst="straightConnector1">
+                <a:avLst/>
+              </a:prstGeom>
+              <a:ln>
+                <a:tailEnd type="arrow"/>
+              </a:ln>
+            </p:spPr>
+            <p:style>
+              <a:lnRef idx="2">
+                <a:schemeClr val="dk1"/>
+              </a:lnRef>
+              <a:fillRef idx="0">
+                <a:schemeClr val="dk1"/>
+              </a:fillRef>
+              <a:effectRef idx="1">
+                <a:schemeClr val="dk1"/>
+              </a:effectRef>
+              <a:fontRef idx="minor">
+                <a:schemeClr val="tx1"/>
+              </a:fontRef>
+            </p:style>
+          </p:cxnSp>
+          <p:cxnSp>
+            <p:nvCxnSpPr>
+              <p:cNvPr id="258" name="Connecteur droit avec flèche 257"/>
+              <p:cNvCxnSpPr>
+                <a:endCxn id="248" idx="4"/>
+              </p:cNvCxnSpPr>
+              <p:nvPr/>
+            </p:nvCxnSpPr>
+            <p:spPr>
+              <a:xfrm rot="5400000" flipH="1" flipV="1">
+                <a:off x="6067678" y="3485336"/>
+                <a:ext cx="248330" cy="794"/>
+              </a:xfrm>
+              <a:prstGeom prst="straightConnector1">
+                <a:avLst/>
+              </a:prstGeom>
+              <a:ln>
+                <a:tailEnd type="arrow"/>
+              </a:ln>
+            </p:spPr>
+            <p:style>
+              <a:lnRef idx="2">
+                <a:schemeClr val="dk1"/>
+              </a:lnRef>
+              <a:fillRef idx="0">
+                <a:schemeClr val="dk1"/>
+              </a:fillRef>
+              <a:effectRef idx="1">
+                <a:schemeClr val="dk1"/>
+              </a:effectRef>
+              <a:fontRef idx="minor">
+                <a:schemeClr val="tx1"/>
+              </a:fontRef>
+            </p:style>
+          </p:cxnSp>
+          <p:cxnSp>
+            <p:nvCxnSpPr>
+              <p:cNvPr id="261" name="Connecteur droit avec flèche 260"/>
+              <p:cNvCxnSpPr>
+                <a:stCxn id="248" idx="6"/>
+                <a:endCxn id="219" idx="1"/>
+              </p:cNvCxnSpPr>
+              <p:nvPr/>
+            </p:nvCxnSpPr>
+            <p:spPr>
+              <a:xfrm>
+                <a:off x="6642240" y="2911568"/>
+                <a:ext cx="335752" cy="1588"/>
+              </a:xfrm>
+              <a:prstGeom prst="straightConnector1">
+                <a:avLst/>
+              </a:prstGeom>
+              <a:ln>
+                <a:tailEnd type="arrow"/>
+              </a:ln>
+            </p:spPr>
+            <p:style>
+              <a:lnRef idx="2">
+                <a:schemeClr val="dk1"/>
+              </a:lnRef>
+              <a:fillRef idx="0">
+                <a:schemeClr val="dk1"/>
+              </a:fillRef>
+              <a:effectRef idx="1">
+                <a:schemeClr val="dk1"/>
+              </a:effectRef>
+              <a:fontRef idx="minor">
+                <a:schemeClr val="tx1"/>
+              </a:fontRef>
+            </p:style>
+          </p:cxnSp>
+          <p:cxnSp>
+            <p:nvCxnSpPr>
+              <p:cNvPr id="192" name="Connecteur droit avec flèche 191"/>
+              <p:cNvCxnSpPr>
+                <a:stCxn id="182" idx="6"/>
+              </p:cNvCxnSpPr>
+              <p:nvPr/>
+            </p:nvCxnSpPr>
+            <p:spPr>
+              <a:xfrm>
+                <a:off x="2422264" y="4851208"/>
+                <a:ext cx="232520" cy="16"/>
+              </a:xfrm>
+              <a:prstGeom prst="bentConnector3">
+                <a:avLst>
+                  <a:gd name="adj1" fmla="val 50000"/>
+                </a:avLst>
+              </a:prstGeom>
+              <a:ln>
+                <a:tailEnd type="arrow"/>
+              </a:ln>
+            </p:spPr>
+            <p:style>
+              <a:lnRef idx="2">
+                <a:schemeClr val="dk1"/>
+              </a:lnRef>
+              <a:fillRef idx="0">
+                <a:schemeClr val="dk1"/>
+              </a:fillRef>
+              <a:effectRef idx="1">
+                <a:schemeClr val="dk1"/>
+              </a:effectRef>
+              <a:fontRef idx="minor">
+                <a:schemeClr val="tx1"/>
+              </a:fontRef>
+            </p:style>
+          </p:cxnSp>
+          <p:sp>
+            <p:nvSpPr>
+              <p:cNvPr id="358" name="Ellipse 357"/>
+              <p:cNvSpPr/>
+              <p:nvPr/>
+            </p:nvSpPr>
+            <p:spPr>
+              <a:xfrm>
+                <a:off x="4139952" y="1916832"/>
+                <a:ext cx="36000" cy="36000"/>
+              </a:xfrm>
+              <a:prstGeom prst="ellipse">
+                <a:avLst/>
+              </a:prstGeom>
+            </p:spPr>
+            <p:style>
+              <a:lnRef idx="2">
+                <a:schemeClr val="dk1">
+                  <a:shade val="50000"/>
+                </a:schemeClr>
+              </a:lnRef>
+              <a:fillRef idx="1">
+                <a:schemeClr val="dk1"/>
+              </a:fillRef>
+              <a:effectRef idx="0">
+                <a:schemeClr val="dk1"/>
+              </a:effectRef>
+              <a:fontRef idx="minor">
+                <a:schemeClr val="lt1"/>
+              </a:fontRef>
+            </p:style>
+            <p:txBody>
+              <a:bodyPr rtlCol="0" anchor="ctr"/>
+              <a:lstStyle/>
+              <a:p>
+                <a:pPr algn="ctr"/>
+                <a:endParaRPr lang="fr-BE"/>
+              </a:p>
+            </p:txBody>
+          </p:sp>
+          <p:sp>
+            <p:nvSpPr>
+              <p:cNvPr id="359" name="Ellipse 358"/>
+              <p:cNvSpPr/>
+              <p:nvPr/>
+            </p:nvSpPr>
+            <p:spPr>
+              <a:xfrm>
+                <a:off x="4139952" y="3897056"/>
+                <a:ext cx="36000" cy="36000"/>
+              </a:xfrm>
+              <a:prstGeom prst="ellipse">
+                <a:avLst/>
+              </a:prstGeom>
+            </p:spPr>
+            <p:style>
+              <a:lnRef idx="2">
+                <a:schemeClr val="dk1">
+                  <a:shade val="50000"/>
+                </a:schemeClr>
+              </a:lnRef>
+              <a:fillRef idx="1">
+                <a:schemeClr val="dk1"/>
+              </a:fillRef>
+              <a:effectRef idx="0">
+                <a:schemeClr val="dk1"/>
+              </a:effectRef>
+              <a:fontRef idx="minor">
+                <a:schemeClr val="lt1"/>
+              </a:fontRef>
+            </p:style>
+            <p:txBody>
+              <a:bodyPr rtlCol="0" anchor="ctr"/>
+              <a:lstStyle/>
+              <a:p>
+                <a:pPr algn="ctr"/>
+                <a:endParaRPr lang="fr-BE"/>
+              </a:p>
+            </p:txBody>
+          </p:sp>
+          <p:cxnSp>
+            <p:nvCxnSpPr>
+              <p:cNvPr id="362" name="Connecteur droit avec flèche 149"/>
+              <p:cNvCxnSpPr>
+                <a:stCxn id="358" idx="6"/>
+                <a:endCxn id="149" idx="2"/>
+              </p:cNvCxnSpPr>
+              <p:nvPr/>
+            </p:nvCxnSpPr>
+            <p:spPr>
+              <a:xfrm flipV="1">
+                <a:off x="4175952" y="1934784"/>
+                <a:ext cx="360232" cy="48"/>
+              </a:xfrm>
+              <a:prstGeom prst="bentConnector3">
+                <a:avLst>
+                  <a:gd name="adj1" fmla="val 50000"/>
+                </a:avLst>
+              </a:prstGeom>
+              <a:ln>
+                <a:tailEnd type="arrow"/>
+              </a:ln>
+            </p:spPr>
+            <p:style>
+              <a:lnRef idx="2">
+                <a:schemeClr val="dk1"/>
+              </a:lnRef>
+              <a:fillRef idx="0">
+                <a:schemeClr val="dk1"/>
+              </a:fillRef>
+              <a:effectRef idx="1">
+                <a:schemeClr val="dk1"/>
+              </a:effectRef>
+              <a:fontRef idx="minor">
+                <a:schemeClr val="tx1"/>
+              </a:fontRef>
+            </p:style>
+          </p:cxnSp>
+          <p:cxnSp>
+            <p:nvCxnSpPr>
+              <p:cNvPr id="371" name="Connecteur droit avec flèche 200"/>
+              <p:cNvCxnSpPr>
+                <a:stCxn id="196" idx="3"/>
+                <a:endCxn id="359" idx="2"/>
+              </p:cNvCxnSpPr>
+              <p:nvPr/>
+            </p:nvCxnSpPr>
+            <p:spPr>
+              <a:xfrm flipV="1">
+                <a:off x="3842784" y="3915056"/>
+                <a:ext cx="297168" cy="32"/>
+              </a:xfrm>
+              <a:prstGeom prst="bentConnector3">
+                <a:avLst>
+                  <a:gd name="adj1" fmla="val 50000"/>
+                </a:avLst>
+              </a:prstGeom>
+              <a:ln>
+                <a:tailEnd type="none"/>
+              </a:ln>
+            </p:spPr>
+            <p:style>
+              <a:lnRef idx="2">
+                <a:schemeClr val="dk1"/>
+              </a:lnRef>
+              <a:fillRef idx="0">
+                <a:schemeClr val="dk1"/>
+              </a:fillRef>
+              <a:effectRef idx="1">
+                <a:schemeClr val="dk1"/>
+              </a:effectRef>
+              <a:fontRef idx="minor">
+                <a:schemeClr val="tx1"/>
+              </a:fontRef>
+            </p:style>
+          </p:cxnSp>
+          <p:sp>
+            <p:nvSpPr>
+              <p:cNvPr id="374" name="Ellipse 373"/>
+              <p:cNvSpPr/>
+              <p:nvPr/>
+            </p:nvSpPr>
+            <p:spPr>
+              <a:xfrm flipV="1">
+                <a:off x="3806201" y="2564904"/>
+                <a:ext cx="0" cy="0"/>
+              </a:xfrm>
+              <a:prstGeom prst="ellipse">
+                <a:avLst/>
+              </a:prstGeom>
+            </p:spPr>
+            <p:style>
+              <a:lnRef idx="2">
+                <a:schemeClr val="dk1">
+                  <a:shade val="50000"/>
+                </a:schemeClr>
+              </a:lnRef>
+              <a:fillRef idx="1">
+                <a:schemeClr val="dk1"/>
+              </a:fillRef>
+              <a:effectRef idx="0">
+                <a:schemeClr val="dk1"/>
+              </a:effectRef>
+              <a:fontRef idx="minor">
+                <a:schemeClr val="lt1"/>
+              </a:fontRef>
+            </p:style>
+            <p:txBody>
+              <a:bodyPr rtlCol="0" anchor="ctr"/>
+              <a:lstStyle/>
+              <a:p>
+                <a:pPr algn="ctr"/>
+                <a:endParaRPr lang="fr-BE"/>
+              </a:p>
+            </p:txBody>
+          </p:sp>
+          <p:sp>
+            <p:nvSpPr>
+              <p:cNvPr id="376" name="Ellipse 375"/>
+              <p:cNvSpPr/>
+              <p:nvPr/>
+            </p:nvSpPr>
+            <p:spPr>
+              <a:xfrm flipV="1">
+                <a:off x="3806201" y="2780928"/>
+                <a:ext cx="0" cy="0"/>
+              </a:xfrm>
+              <a:prstGeom prst="ellipse">
+                <a:avLst/>
+              </a:prstGeom>
+            </p:spPr>
+            <p:style>
+              <a:lnRef idx="2">
+                <a:schemeClr val="dk1">
+                  <a:shade val="50000"/>
+                </a:schemeClr>
+              </a:lnRef>
+              <a:fillRef idx="1">
+                <a:schemeClr val="dk1"/>
+              </a:fillRef>
+              <a:effectRef idx="0">
+                <a:schemeClr val="dk1"/>
+              </a:effectRef>
+              <a:fontRef idx="minor">
+                <a:schemeClr val="lt1"/>
+              </a:fontRef>
+            </p:style>
+            <p:txBody>
+              <a:bodyPr rtlCol="0" anchor="ctr"/>
+              <a:lstStyle/>
+              <a:p>
+                <a:pPr algn="ctr"/>
+                <a:endParaRPr lang="fr-BE"/>
+              </a:p>
+            </p:txBody>
+          </p:sp>
+        </p:grpSp>
       </p:grpSp>
     </p:spTree>
   </p:cSld>

</xml_diff>

<commit_message>
Enhanced images in Chapter 3
</commit_message>
<xml_diff>
--- a/writing/images/train.pptx
+++ b/writing/images/train.pptx
@@ -213,7 +213,7 @@
             <a:fld id="{1A5CA47D-05BA-47C5-ACE1-040A60204EDF}" type="datetimeFigureOut">
               <a:rPr lang="fr-FR" smtClean="0"/>
               <a:pPr/>
-              <a:t>25/08/2011</a:t>
+              <a:t>06/09/2011</a:t>
             </a:fld>
             <a:endParaRPr lang="fr-BE"/>
           </a:p>
@@ -743,7 +743,7 @@
             <a:fld id="{68BDF4EC-5B70-45D8-B718-E56EB4C6B13E}" type="datetimeFigureOut">
               <a:rPr lang="fr-BE" smtClean="0"/>
               <a:pPr/>
-              <a:t>25/08/2011</a:t>
+              <a:t>6/09/2011</a:t>
             </a:fld>
             <a:endParaRPr lang="fr-BE"/>
           </a:p>
@@ -910,7 +910,7 @@
             <a:fld id="{68BDF4EC-5B70-45D8-B718-E56EB4C6B13E}" type="datetimeFigureOut">
               <a:rPr lang="fr-BE" smtClean="0"/>
               <a:pPr/>
-              <a:t>25/08/2011</a:t>
+              <a:t>6/09/2011</a:t>
             </a:fld>
             <a:endParaRPr lang="fr-BE"/>
           </a:p>
@@ -1087,7 +1087,7 @@
             <a:fld id="{68BDF4EC-5B70-45D8-B718-E56EB4C6B13E}" type="datetimeFigureOut">
               <a:rPr lang="fr-BE" smtClean="0"/>
               <a:pPr/>
-              <a:t>25/08/2011</a:t>
+              <a:t>6/09/2011</a:t>
             </a:fld>
             <a:endParaRPr lang="fr-BE"/>
           </a:p>
@@ -1254,7 +1254,7 @@
             <a:fld id="{68BDF4EC-5B70-45D8-B718-E56EB4C6B13E}" type="datetimeFigureOut">
               <a:rPr lang="fr-BE" smtClean="0"/>
               <a:pPr/>
-              <a:t>25/08/2011</a:t>
+              <a:t>6/09/2011</a:t>
             </a:fld>
             <a:endParaRPr lang="fr-BE"/>
           </a:p>
@@ -1497,7 +1497,7 @@
             <a:fld id="{68BDF4EC-5B70-45D8-B718-E56EB4C6B13E}" type="datetimeFigureOut">
               <a:rPr lang="fr-BE" smtClean="0"/>
               <a:pPr/>
-              <a:t>25/08/2011</a:t>
+              <a:t>6/09/2011</a:t>
             </a:fld>
             <a:endParaRPr lang="fr-BE"/>
           </a:p>
@@ -1782,7 +1782,7 @@
             <a:fld id="{68BDF4EC-5B70-45D8-B718-E56EB4C6B13E}" type="datetimeFigureOut">
               <a:rPr lang="fr-BE" smtClean="0"/>
               <a:pPr/>
-              <a:t>25/08/2011</a:t>
+              <a:t>6/09/2011</a:t>
             </a:fld>
             <a:endParaRPr lang="fr-BE"/>
           </a:p>
@@ -2201,7 +2201,7 @@
             <a:fld id="{68BDF4EC-5B70-45D8-B718-E56EB4C6B13E}" type="datetimeFigureOut">
               <a:rPr lang="fr-BE" smtClean="0"/>
               <a:pPr/>
-              <a:t>25/08/2011</a:t>
+              <a:t>6/09/2011</a:t>
             </a:fld>
             <a:endParaRPr lang="fr-BE"/>
           </a:p>
@@ -2316,7 +2316,7 @@
             <a:fld id="{68BDF4EC-5B70-45D8-B718-E56EB4C6B13E}" type="datetimeFigureOut">
               <a:rPr lang="fr-BE" smtClean="0"/>
               <a:pPr/>
-              <a:t>25/08/2011</a:t>
+              <a:t>6/09/2011</a:t>
             </a:fld>
             <a:endParaRPr lang="fr-BE"/>
           </a:p>
@@ -2408,7 +2408,7 @@
             <a:fld id="{68BDF4EC-5B70-45D8-B718-E56EB4C6B13E}" type="datetimeFigureOut">
               <a:rPr lang="fr-BE" smtClean="0"/>
               <a:pPr/>
-              <a:t>25/08/2011</a:t>
+              <a:t>6/09/2011</a:t>
             </a:fld>
             <a:endParaRPr lang="fr-BE"/>
           </a:p>
@@ -2682,7 +2682,7 @@
             <a:fld id="{68BDF4EC-5B70-45D8-B718-E56EB4C6B13E}" type="datetimeFigureOut">
               <a:rPr lang="fr-BE" smtClean="0"/>
               <a:pPr/>
-              <a:t>25/08/2011</a:t>
+              <a:t>6/09/2011</a:t>
             </a:fld>
             <a:endParaRPr lang="fr-BE"/>
           </a:p>
@@ -2932,7 +2932,7 @@
             <a:fld id="{68BDF4EC-5B70-45D8-B718-E56EB4C6B13E}" type="datetimeFigureOut">
               <a:rPr lang="fr-BE" smtClean="0"/>
               <a:pPr/>
-              <a:t>25/08/2011</a:t>
+              <a:t>6/09/2011</a:t>
             </a:fld>
             <a:endParaRPr lang="fr-BE"/>
           </a:p>
@@ -3142,7 +3142,7 @@
             <a:fld id="{68BDF4EC-5B70-45D8-B718-E56EB4C6B13E}" type="datetimeFigureOut">
               <a:rPr lang="fr-BE" smtClean="0"/>
               <a:pPr/>
-              <a:t>25/08/2011</a:t>
+              <a:t>6/09/2011</a:t>
             </a:fld>
             <a:endParaRPr lang="fr-BE"/>
           </a:p>
@@ -6578,16 +6578,16 @@
       </p:grpSpPr>
       <p:grpSp>
         <p:nvGrpSpPr>
-          <p:cNvPr id="4" name="Groupe 3"/>
+          <p:cNvPr id="97" name="Groupe 96"/>
           <p:cNvGrpSpPr/>
           <p:nvPr/>
         </p:nvGrpSpPr>
         <p:grpSpPr>
           <a:xfrm>
-            <a:off x="611560" y="404664"/>
-            <a:ext cx="3699966" cy="1728192"/>
-            <a:chOff x="2813855" y="476672"/>
-            <a:chExt cx="3699966" cy="1728192"/>
+            <a:off x="2051720" y="116632"/>
+            <a:ext cx="4104456" cy="1728192"/>
+            <a:chOff x="467544" y="404664"/>
+            <a:chExt cx="4104456" cy="1728192"/>
           </a:xfrm>
         </p:grpSpPr>
         <p:sp>
@@ -6598,7 +6598,7 @@
           </p:nvSpPr>
           <p:spPr>
             <a:xfrm>
-              <a:off x="4128239" y="762424"/>
+              <a:off x="1997952" y="690416"/>
               <a:ext cx="1043640" cy="396000"/>
             </a:xfrm>
             <a:prstGeom prst="roundRect">
@@ -6626,18 +6626,18 @@
             <a:p>
               <a:pPr algn="ctr"/>
               <a:r>
-                <a:rPr lang="fr-BE" sz="1200" dirty="0" err="1" smtClean="0">
+                <a:rPr lang="fr-BE" sz="1600" dirty="0" err="1" smtClean="0">
                   <a:latin typeface="+mj-lt"/>
                 </a:rPr>
                 <a:t>Collect</a:t>
               </a:r>
               <a:r>
-                <a:rPr lang="fr-BE" sz="1200" dirty="0" smtClean="0">
+                <a:rPr lang="fr-BE" sz="1600" dirty="0" smtClean="0">
                   <a:latin typeface="+mj-lt"/>
                 </a:rPr>
                 <a:t> </a:t>
               </a:r>
-              <a:endParaRPr lang="fr-BE" sz="1200" dirty="0">
+              <a:endParaRPr lang="fr-BE" sz="1600" dirty="0">
                 <a:latin typeface="+mj-lt"/>
               </a:endParaRPr>
             </a:p>
@@ -6651,7 +6651,7 @@
           </p:nvSpPr>
           <p:spPr>
             <a:xfrm>
-              <a:off x="2813855" y="1392801"/>
+              <a:off x="467544" y="1320793"/>
               <a:ext cx="984448" cy="396000"/>
             </a:xfrm>
             <a:prstGeom prst="roundRect">
@@ -6679,12 +6679,12 @@
             <a:p>
               <a:pPr algn="ctr"/>
               <a:r>
-                <a:rPr lang="fr-BE" sz="1200" dirty="0" err="1" smtClean="0">
+                <a:rPr lang="fr-BE" sz="1600" dirty="0" err="1" smtClean="0">
                   <a:latin typeface="+mj-lt"/>
                 </a:rPr>
                 <a:t>Abritrate</a:t>
               </a:r>
-              <a:endParaRPr lang="fr-BE" sz="1200" dirty="0">
+              <a:endParaRPr lang="fr-BE" sz="1600" dirty="0">
                 <a:latin typeface="+mj-lt"/>
               </a:endParaRPr>
             </a:p>
@@ -6698,7 +6698,7 @@
           </p:nvSpPr>
           <p:spPr>
             <a:xfrm>
-              <a:off x="5470181" y="1392801"/>
+              <a:off x="3528360" y="1320793"/>
               <a:ext cx="1043640" cy="396000"/>
             </a:xfrm>
             <a:prstGeom prst="roundRect">
@@ -6726,7 +6726,7 @@
             <a:p>
               <a:pPr algn="ctr"/>
               <a:r>
-                <a:rPr lang="fr-BE" sz="1200" dirty="0" smtClean="0">
+                <a:rPr lang="fr-BE" sz="1600" dirty="0" smtClean="0">
                   <a:latin typeface="+mj-lt"/>
                 </a:rPr>
                 <a:t>Schedule</a:t>
@@ -6745,7 +6745,7 @@
           </p:nvCxnSpPr>
           <p:spPr>
             <a:xfrm rot="5400000">
-              <a:off x="4558887" y="1249596"/>
+              <a:off x="2428600" y="1177588"/>
               <a:ext cx="182344" cy="1588"/>
             </a:xfrm>
             <a:prstGeom prst="straightConnector1">
@@ -6780,7 +6780,7 @@
           </p:nvCxnSpPr>
           <p:spPr>
             <a:xfrm rot="5400000">
-              <a:off x="5873856" y="1906718"/>
+              <a:off x="3932035" y="1834710"/>
               <a:ext cx="236063" cy="228"/>
             </a:xfrm>
             <a:prstGeom prst="straightConnector1">
@@ -6816,8 +6816,8 @@
           </p:nvCxnSpPr>
           <p:spPr>
             <a:xfrm>
-              <a:off x="5029003" y="1590801"/>
-              <a:ext cx="441178" cy="1588"/>
+              <a:off x="2987824" y="1518793"/>
+              <a:ext cx="540536" cy="1588"/>
             </a:xfrm>
             <a:prstGeom prst="straightConnector1">
               <a:avLst/>
@@ -6852,8 +6852,8 @@
           </p:nvCxnSpPr>
           <p:spPr>
             <a:xfrm rot="10800000">
-              <a:off x="3798303" y="1590801"/>
-              <a:ext cx="472812" cy="1588"/>
+              <a:off x="1451992" y="1518793"/>
+              <a:ext cx="599728" cy="1588"/>
             </a:xfrm>
             <a:prstGeom prst="bentConnector3">
               <a:avLst>
@@ -6887,7 +6887,7 @@
           </p:nvSpPr>
           <p:spPr>
             <a:xfrm>
-              <a:off x="4614059" y="476672"/>
+              <a:off x="2483772" y="404664"/>
               <a:ext cx="72000" cy="72000"/>
             </a:xfrm>
             <a:prstGeom prst="ellipse">
@@ -6933,7 +6933,7 @@
           </p:nvCxnSpPr>
           <p:spPr>
             <a:xfrm rot="5400000">
-              <a:off x="4543183" y="655548"/>
+              <a:off x="2412896" y="583540"/>
               <a:ext cx="213752" cy="1588"/>
             </a:xfrm>
             <a:prstGeom prst="straightConnector1">
@@ -6966,8 +6966,8 @@
           </p:nvSpPr>
           <p:spPr>
             <a:xfrm>
-              <a:off x="4271115" y="1340768"/>
-              <a:ext cx="757888" cy="500066"/>
+              <a:off x="2051720" y="1268760"/>
+              <a:ext cx="936104" cy="500066"/>
             </a:xfrm>
             <a:prstGeom prst="diamond">
               <a:avLst/>
@@ -6996,18 +6996,18 @@
             <a:p>
               <a:pPr algn="ctr"/>
               <a:r>
-                <a:rPr lang="fr-BE" sz="1200" dirty="0" err="1" smtClean="0">
+                <a:rPr lang="fr-BE" sz="1400" dirty="0" err="1" smtClean="0">
                   <a:latin typeface="+mj-lt"/>
                 </a:rPr>
                 <a:t>Conflict</a:t>
               </a:r>
               <a:r>
-                <a:rPr lang="fr-BE" sz="1200" dirty="0" smtClean="0">
+                <a:rPr lang="fr-BE" sz="1400" dirty="0" smtClean="0">
                   <a:latin typeface="+mj-lt"/>
                 </a:rPr>
                 <a:t>?</a:t>
               </a:r>
-              <a:endParaRPr lang="fr-BE" sz="1200" dirty="0">
+              <a:endParaRPr lang="fr-BE" sz="1400" dirty="0">
                 <a:latin typeface="+mj-lt"/>
               </a:endParaRPr>
             </a:p>
@@ -7024,8 +7024,8 @@
           </p:nvCxnSpPr>
           <p:spPr>
             <a:xfrm rot="5400000" flipH="1" flipV="1">
-              <a:off x="3500971" y="765533"/>
-              <a:ext cx="432377" cy="822160"/>
+              <a:off x="1262672" y="585513"/>
+              <a:ext cx="432377" cy="1038184"/>
             </a:xfrm>
             <a:prstGeom prst="bentConnector2">
               <a:avLst/>
@@ -7057,7 +7057,7 @@
           </p:nvGrpSpPr>
           <p:grpSpPr>
             <a:xfrm>
-              <a:off x="5901773" y="2024864"/>
+              <a:off x="3959952" y="1952856"/>
               <a:ext cx="180000" cy="180000"/>
               <a:chOff x="2786050" y="6143644"/>
               <a:chExt cx="180000" cy="180000"/>
@@ -7155,8 +7155,8 @@
           </p:nvSpPr>
           <p:spPr>
             <a:xfrm>
-              <a:off x="3981223" y="1498468"/>
-              <a:ext cx="241279" cy="184666"/>
+              <a:off x="1627655" y="1382918"/>
+              <a:ext cx="309568" cy="246221"/>
             </a:xfrm>
             <a:prstGeom prst="rect">
               <a:avLst/>
@@ -7172,10 +7172,10 @@
             <a:lstStyle/>
             <a:p>
               <a:r>
-                <a:rPr lang="fr-BE" sz="1200" dirty="0" err="1" smtClean="0"/>
+                <a:rPr lang="fr-BE" sz="1600" dirty="0" err="1" smtClean="0"/>
                 <a:t>yes</a:t>
               </a:r>
-              <a:endParaRPr lang="fr-BE" sz="1200" dirty="0"/>
+              <a:endParaRPr lang="fr-BE" sz="1600" dirty="0"/>
             </a:p>
           </p:txBody>
         </p:sp>
@@ -7187,8 +7187,8 @@
           </p:nvSpPr>
           <p:spPr>
             <a:xfrm>
-              <a:off x="5096031" y="1484784"/>
-              <a:ext cx="198255" cy="184666"/>
+              <a:off x="3131840" y="1391005"/>
+              <a:ext cx="252757" cy="246221"/>
             </a:xfrm>
             <a:prstGeom prst="rect">
               <a:avLst/>
@@ -7204,37 +7204,73 @@
             <a:lstStyle/>
             <a:p>
               <a:r>
-                <a:rPr lang="fr-BE" sz="1200" dirty="0" smtClean="0"/>
+                <a:rPr lang="fr-BE" sz="1600" dirty="0" smtClean="0"/>
                 <a:t>no</a:t>
               </a:r>
-              <a:endParaRPr lang="fr-BE" sz="1200" dirty="0"/>
+              <a:endParaRPr lang="fr-BE" sz="1600" dirty="0"/>
             </a:p>
           </p:txBody>
         </p:sp>
       </p:grpSp>
       <p:grpSp>
         <p:nvGrpSpPr>
-          <p:cNvPr id="21" name="Groupe 20"/>
+          <p:cNvPr id="98" name="Groupe 97"/>
           <p:cNvGrpSpPr/>
           <p:nvPr/>
         </p:nvGrpSpPr>
         <p:grpSpPr>
           <a:xfrm>
-            <a:off x="3171265" y="2636912"/>
-            <a:ext cx="3594158" cy="2088232"/>
-            <a:chOff x="2706034" y="2132856"/>
-            <a:chExt cx="3594158" cy="2088232"/>
+            <a:off x="2123728" y="1988840"/>
+            <a:ext cx="4201756" cy="2104278"/>
+            <a:chOff x="2114203" y="2204864"/>
+            <a:chExt cx="4201756" cy="2104278"/>
           </a:xfrm>
         </p:grpSpPr>
         <p:sp>
           <p:nvSpPr>
+            <p:cNvPr id="40" name="ZoneTexte 39"/>
+            <p:cNvSpPr txBox="1"/>
+            <p:nvPr/>
+          </p:nvSpPr>
+          <p:spPr>
+            <a:xfrm flipH="1">
+              <a:off x="2416712" y="3789040"/>
+              <a:ext cx="1003160" cy="246221"/>
+            </a:xfrm>
+            <a:prstGeom prst="rect">
+              <a:avLst/>
+            </a:prstGeom>
+            <a:solidFill>
+              <a:schemeClr val="bg1"/>
+            </a:solidFill>
+          </p:spPr>
+          <p:txBody>
+            <a:bodyPr wrap="none" lIns="0" tIns="0" rIns="0" bIns="0" rtlCol="0">
+              <a:spAutoFit/>
+            </a:bodyPr>
+            <a:lstStyle/>
+            <a:p>
+              <a:r>
+                <a:rPr lang="fr-BE" sz="1600" noProof="1" smtClean="0"/>
+                <a:t>Arbitrate</a:t>
+              </a:r>
+              <a:r>
+                <a:rPr lang="fr-BE" sz="1600" baseline="-25000" noProof="1" smtClean="0"/>
+                <a:t>start</a:t>
+              </a:r>
+              <a:endParaRPr lang="fr-BE" sz="1600" baseline="-25000" noProof="1"/>
+            </a:p>
+          </p:txBody>
+        </p:sp>
+        <p:sp>
+          <p:nvSpPr>
             <p:cNvPr id="22" name="Ellipse 21"/>
             <p:cNvSpPr/>
             <p:nvPr/>
           </p:nvSpPr>
           <p:spPr>
             <a:xfrm>
-              <a:off x="4067944" y="2265442"/>
+              <a:off x="3629654" y="2337450"/>
               <a:ext cx="216024" cy="216024"/>
             </a:xfrm>
             <a:prstGeom prst="ellipse">
@@ -7273,7 +7309,7 @@
           </p:nvSpPr>
           <p:spPr>
             <a:xfrm>
-              <a:off x="5645878" y="2265442"/>
+              <a:off x="5207588" y="2337450"/>
               <a:ext cx="216024" cy="216024"/>
             </a:xfrm>
             <a:prstGeom prst="ellipse">
@@ -7312,7 +7348,7 @@
           </p:nvSpPr>
           <p:spPr>
             <a:xfrm>
-              <a:off x="5645878" y="2708920"/>
+              <a:off x="5207588" y="2780928"/>
               <a:ext cx="216024" cy="216024"/>
             </a:xfrm>
             <a:prstGeom prst="ellipse">
@@ -7351,7 +7387,7 @@
           </p:nvSpPr>
           <p:spPr>
             <a:xfrm>
-              <a:off x="4386456" y="2708920"/>
+              <a:off x="3948166" y="2780928"/>
               <a:ext cx="216024" cy="216024"/>
             </a:xfrm>
             <a:prstGeom prst="ellipse">
@@ -7393,7 +7429,7 @@
           </p:nvCxnSpPr>
           <p:spPr>
             <a:xfrm>
-              <a:off x="4283968" y="2373454"/>
+              <a:off x="3845678" y="2445462"/>
               <a:ext cx="1361910" cy="1588"/>
             </a:xfrm>
             <a:prstGeom prst="straightConnector1">
@@ -7432,7 +7468,7 @@
           </p:nvCxnSpPr>
           <p:spPr>
             <a:xfrm rot="5400000">
-              <a:off x="5640163" y="2595193"/>
+              <a:off x="5201873" y="2667201"/>
               <a:ext cx="227454" cy="1588"/>
             </a:xfrm>
             <a:prstGeom prst="straightConnector1">
@@ -7471,7 +7507,7 @@
           </p:nvCxnSpPr>
           <p:spPr>
             <a:xfrm rot="10800000">
-              <a:off x="4602480" y="2816932"/>
+              <a:off x="4164190" y="2888940"/>
               <a:ext cx="1043398" cy="1588"/>
             </a:xfrm>
             <a:prstGeom prst="straightConnector1">
@@ -7507,7 +7543,7 @@
           </p:nvSpPr>
           <p:spPr>
             <a:xfrm>
-              <a:off x="5580112" y="2455376"/>
+              <a:off x="5141822" y="2527384"/>
               <a:ext cx="159783" cy="215444"/>
             </a:xfrm>
             <a:prstGeom prst="rect">
@@ -7537,8 +7573,8 @@
           </p:nvSpPr>
           <p:spPr>
             <a:xfrm>
-              <a:off x="4860032" y="2273062"/>
-              <a:ext cx="617926" cy="184666"/>
+              <a:off x="4211960" y="2318683"/>
+              <a:ext cx="825547" cy="246221"/>
             </a:xfrm>
             <a:prstGeom prst="rect">
               <a:avLst/>
@@ -7554,14 +7590,14 @@
             <a:lstStyle/>
             <a:p>
               <a:r>
-                <a:rPr lang="fr-BE" sz="1200" noProof="1" smtClean="0"/>
+                <a:rPr lang="fr-BE" sz="1600" noProof="1" smtClean="0"/>
                 <a:t>Collect</a:t>
               </a:r>
               <a:r>
-                <a:rPr lang="fr-BE" sz="1200" baseline="-25000" noProof="1" smtClean="0"/>
+                <a:rPr lang="fr-BE" sz="1600" baseline="-25000" noProof="1" smtClean="0"/>
                 <a:t>start</a:t>
               </a:r>
-              <a:endParaRPr lang="fr-BE" sz="1200" baseline="-25000" noProof="1"/>
+              <a:endParaRPr lang="fr-BE" sz="1600" baseline="-25000" noProof="1"/>
             </a:p>
           </p:txBody>
         </p:sp>
@@ -7573,8 +7609,8 @@
           </p:nvSpPr>
           <p:spPr>
             <a:xfrm>
-              <a:off x="4891323" y="2724160"/>
-              <a:ext cx="586635" cy="184666"/>
+              <a:off x="4304830" y="2752462"/>
+              <a:ext cx="778483" cy="246221"/>
             </a:xfrm>
             <a:prstGeom prst="rect">
               <a:avLst/>
@@ -7590,14 +7626,14 @@
             <a:lstStyle/>
             <a:p>
               <a:r>
-                <a:rPr lang="fr-BE" sz="1200" noProof="1" smtClean="0"/>
+                <a:rPr lang="fr-BE" sz="1600" noProof="1" smtClean="0"/>
                 <a:t>Collect</a:t>
               </a:r>
               <a:r>
-                <a:rPr lang="fr-BE" sz="1200" baseline="-25000" noProof="1" smtClean="0"/>
+                <a:rPr lang="fr-BE" sz="1600" baseline="-25000" noProof="1" smtClean="0"/>
                 <a:t>end</a:t>
               </a:r>
-              <a:endParaRPr lang="fr-BE" sz="1200" baseline="-25000" noProof="1"/>
+              <a:endParaRPr lang="fr-BE" sz="1600" baseline="-25000" noProof="1"/>
             </a:p>
           </p:txBody>
         </p:sp>
@@ -7611,7 +7647,7 @@
           </p:nvCxnSpPr>
           <p:spPr>
             <a:xfrm>
-              <a:off x="3851920" y="2132856"/>
+              <a:off x="3413630" y="2204864"/>
               <a:ext cx="247660" cy="164222"/>
             </a:xfrm>
             <a:prstGeom prst="straightConnector1">
@@ -7644,7 +7680,7 @@
           </p:nvSpPr>
           <p:spPr>
             <a:xfrm flipH="1">
-              <a:off x="3848636" y="3561586"/>
+              <a:off x="3410346" y="3633594"/>
               <a:ext cx="216024" cy="216024"/>
             </a:xfrm>
             <a:prstGeom prst="ellipse">
@@ -7683,7 +7719,7 @@
           </p:nvSpPr>
           <p:spPr>
             <a:xfrm flipH="1">
-              <a:off x="2706034" y="3561586"/>
+              <a:off x="2114203" y="3633594"/>
               <a:ext cx="216024" cy="216024"/>
             </a:xfrm>
             <a:prstGeom prst="ellipse">
@@ -7722,7 +7758,7 @@
           </p:nvSpPr>
           <p:spPr>
             <a:xfrm flipH="1">
-              <a:off x="2706034" y="2780928"/>
+              <a:off x="2114203" y="2852936"/>
               <a:ext cx="216024" cy="216024"/>
             </a:xfrm>
             <a:prstGeom prst="ellipse">
@@ -7764,8 +7800,8 @@
           </p:nvCxnSpPr>
           <p:spPr>
             <a:xfrm rot="10800000">
-              <a:off x="2922058" y="3669598"/>
-              <a:ext cx="926578" cy="1588"/>
+              <a:off x="2330228" y="3741606"/>
+              <a:ext cx="1080119" cy="1588"/>
             </a:xfrm>
             <a:prstGeom prst="straightConnector1">
               <a:avLst/>
@@ -7803,7 +7839,7 @@
           </p:nvCxnSpPr>
           <p:spPr>
             <a:xfrm rot="5400000" flipH="1" flipV="1">
-              <a:off x="2531729" y="3279269"/>
+              <a:off x="1939898" y="3351277"/>
               <a:ext cx="564634" cy="1588"/>
             </a:xfrm>
             <a:prstGeom prst="straightConnector1">
@@ -7842,8 +7878,8 @@
           </p:nvCxnSpPr>
           <p:spPr>
             <a:xfrm flipV="1">
-              <a:off x="2922058" y="2373454"/>
-              <a:ext cx="1145886" cy="515486"/>
+              <a:off x="2330227" y="2445462"/>
+              <a:ext cx="1299427" cy="515486"/>
             </a:xfrm>
             <a:prstGeom prst="bentConnector3">
               <a:avLst>
@@ -7880,7 +7916,7 @@
           </p:nvSpPr>
           <p:spPr>
             <a:xfrm flipH="1">
-              <a:off x="2843808" y="3141548"/>
+              <a:off x="2251977" y="3213556"/>
               <a:ext cx="159783" cy="215444"/>
             </a:xfrm>
             <a:prstGeom prst="rect">
@@ -7904,14 +7940,14 @@
         </p:sp>
         <p:sp>
           <p:nvSpPr>
-            <p:cNvPr id="40" name="ZoneTexte 39"/>
+            <p:cNvPr id="41" name="ZoneTexte 40"/>
             <p:cNvSpPr txBox="1"/>
             <p:nvPr/>
           </p:nvSpPr>
           <p:spPr>
             <a:xfrm flipH="1">
-              <a:off x="3030251" y="3561586"/>
-              <a:ext cx="747962" cy="184666"/>
+              <a:off x="2767300" y="2564904"/>
+              <a:ext cx="958276" cy="246221"/>
             </a:xfrm>
             <a:prstGeom prst="rect">
               <a:avLst/>
@@ -7927,50 +7963,14 @@
             <a:lstStyle/>
             <a:p>
               <a:r>
-                <a:rPr lang="fr-BE" sz="1200" noProof="1" smtClean="0"/>
+                <a:rPr lang="fr-BE" sz="1600" noProof="1" smtClean="0"/>
                 <a:t>Arbitrate</a:t>
               </a:r>
               <a:r>
-                <a:rPr lang="fr-BE" sz="1200" baseline="-25000" noProof="1" smtClean="0"/>
-                <a:t>start</a:t>
-              </a:r>
-              <a:endParaRPr lang="fr-BE" sz="1200" baseline="-25000" noProof="1"/>
-            </a:p>
-          </p:txBody>
-        </p:sp>
-        <p:sp>
-          <p:nvSpPr>
-            <p:cNvPr id="41" name="ZoneTexte 40"/>
-            <p:cNvSpPr txBox="1"/>
-            <p:nvPr/>
-          </p:nvSpPr>
-          <p:spPr>
-            <a:xfrm flipH="1">
-              <a:off x="3205590" y="2492896"/>
-              <a:ext cx="718338" cy="184666"/>
-            </a:xfrm>
-            <a:prstGeom prst="rect">
-              <a:avLst/>
-            </a:prstGeom>
-            <a:solidFill>
-              <a:schemeClr val="bg1"/>
-            </a:solidFill>
-          </p:spPr>
-          <p:txBody>
-            <a:bodyPr wrap="none" lIns="0" tIns="0" rIns="0" bIns="0" rtlCol="0">
-              <a:spAutoFit/>
-            </a:bodyPr>
-            <a:lstStyle/>
-            <a:p>
-              <a:r>
-                <a:rPr lang="fr-BE" sz="1200" noProof="1" smtClean="0"/>
-                <a:t>Arbitrate</a:t>
-              </a:r>
-              <a:r>
-                <a:rPr lang="fr-BE" sz="1200" baseline="-25000" noProof="1" smtClean="0"/>
+                <a:rPr lang="fr-BE" sz="1600" baseline="-25000" noProof="1" smtClean="0"/>
                 <a:t>end</a:t>
               </a:r>
-              <a:endParaRPr lang="fr-BE" sz="1200" baseline="-25000" noProof="1"/>
+              <a:endParaRPr lang="fr-BE" sz="1600" baseline="-25000" noProof="1"/>
             </a:p>
           </p:txBody>
         </p:sp>
@@ -7982,7 +7982,7 @@
           </p:nvSpPr>
           <p:spPr>
             <a:xfrm>
-              <a:off x="4932040" y="3561586"/>
+              <a:off x="4493750" y="3633594"/>
               <a:ext cx="216024" cy="216024"/>
             </a:xfrm>
             <a:prstGeom prst="ellipse">
@@ -8021,7 +8021,7 @@
           </p:nvSpPr>
           <p:spPr>
             <a:xfrm>
-              <a:off x="6084168" y="3561586"/>
+              <a:off x="5940152" y="3633594"/>
               <a:ext cx="216024" cy="216024"/>
             </a:xfrm>
             <a:prstGeom prst="ellipse">
@@ -8060,7 +8060,7 @@
           </p:nvSpPr>
           <p:spPr>
             <a:xfrm>
-              <a:off x="6084168" y="4005064"/>
+              <a:off x="5940152" y="4077072"/>
               <a:ext cx="216024" cy="216024"/>
             </a:xfrm>
             <a:prstGeom prst="ellipse">
@@ -8099,7 +8099,7 @@
           </p:nvSpPr>
           <p:spPr>
             <a:xfrm>
-              <a:off x="4932040" y="4005064"/>
+              <a:off x="4493750" y="4077072"/>
               <a:ext cx="216024" cy="216024"/>
             </a:xfrm>
             <a:prstGeom prst="ellipse">
@@ -8141,8 +8141,8 @@
           </p:nvCxnSpPr>
           <p:spPr>
             <a:xfrm>
-              <a:off x="5148064" y="3669598"/>
-              <a:ext cx="936104" cy="1588"/>
+              <a:off x="4709774" y="3741606"/>
+              <a:ext cx="1230378" cy="1588"/>
             </a:xfrm>
             <a:prstGeom prst="straightConnector1">
               <a:avLst/>
@@ -8180,7 +8180,7 @@
           </p:nvCxnSpPr>
           <p:spPr>
             <a:xfrm rot="5400000">
-              <a:off x="6078453" y="3891337"/>
+              <a:off x="5934437" y="3963345"/>
               <a:ext cx="227454" cy="1588"/>
             </a:xfrm>
             <a:prstGeom prst="straightConnector1">
@@ -8219,8 +8219,8 @@
           </p:nvCxnSpPr>
           <p:spPr>
             <a:xfrm rot="10800000">
-              <a:off x="5148064" y="4113076"/>
-              <a:ext cx="936104" cy="1588"/>
+              <a:off x="4709774" y="4185084"/>
+              <a:ext cx="1230378" cy="1588"/>
             </a:xfrm>
             <a:prstGeom prst="straightConnector1">
               <a:avLst/>
@@ -8255,7 +8255,7 @@
           </p:nvSpPr>
           <p:spPr>
             <a:xfrm>
-              <a:off x="5996393" y="3747710"/>
+              <a:off x="6156176" y="3861048"/>
               <a:ext cx="159783" cy="215444"/>
             </a:xfrm>
             <a:prstGeom prst="rect">
@@ -8285,8 +8285,8 @@
           </p:nvSpPr>
           <p:spPr>
             <a:xfrm>
-              <a:off x="5220072" y="3561586"/>
-              <a:ext cx="755784" cy="184666"/>
+              <a:off x="4814075" y="3611823"/>
+              <a:ext cx="1011495" cy="246221"/>
             </a:xfrm>
             <a:prstGeom prst="rect">
               <a:avLst/>
@@ -8302,14 +8302,14 @@
             <a:lstStyle/>
             <a:p>
               <a:r>
-                <a:rPr lang="fr-BE" sz="1200" noProof="1" smtClean="0"/>
+                <a:rPr lang="fr-BE" sz="1600" noProof="1" smtClean="0"/>
                 <a:t>Schedule</a:t>
               </a:r>
               <a:r>
-                <a:rPr lang="fr-BE" sz="1200" baseline="-25000" noProof="1" smtClean="0"/>
+                <a:rPr lang="fr-BE" sz="1600" baseline="-25000" noProof="1" smtClean="0"/>
                 <a:t>start</a:t>
               </a:r>
-              <a:endParaRPr lang="fr-BE" sz="1200" baseline="-25000" noProof="1"/>
+              <a:endParaRPr lang="fr-BE" sz="1600" baseline="-25000" noProof="1"/>
             </a:p>
           </p:txBody>
         </p:sp>
@@ -8321,8 +8321,8 @@
           </p:nvSpPr>
           <p:spPr>
             <a:xfrm>
-              <a:off x="5285999" y="4012684"/>
-              <a:ext cx="726161" cy="184666"/>
+              <a:off x="4836517" y="4062921"/>
+              <a:ext cx="966611" cy="246221"/>
             </a:xfrm>
             <a:prstGeom prst="rect">
               <a:avLst/>
@@ -8338,14 +8338,14 @@
             <a:lstStyle/>
             <a:p>
               <a:r>
-                <a:rPr lang="fr-BE" sz="1200" noProof="1" smtClean="0"/>
+                <a:rPr lang="fr-BE" sz="1600" noProof="1" smtClean="0"/>
                 <a:t>Schedule</a:t>
               </a:r>
               <a:r>
-                <a:rPr lang="fr-BE" sz="1200" baseline="-25000" noProof="1" smtClean="0"/>
+                <a:rPr lang="fr-BE" sz="1600" baseline="-25000" noProof="1" smtClean="0"/>
                 <a:t>end</a:t>
               </a:r>
-              <a:endParaRPr lang="fr-BE" sz="1200" baseline="-25000" noProof="1"/>
+              <a:endParaRPr lang="fr-BE" sz="1600" baseline="-25000" noProof="1"/>
             </a:p>
           </p:txBody>
         </p:sp>
@@ -8360,7 +8360,7 @@
           </p:nvCxnSpPr>
           <p:spPr>
             <a:xfrm rot="5400000">
-              <a:off x="3907237" y="2974355"/>
+              <a:off x="3468947" y="3046363"/>
               <a:ext cx="636642" cy="537820"/>
             </a:xfrm>
             <a:prstGeom prst="bentConnector3">
@@ -8401,7 +8401,7 @@
           </p:nvCxnSpPr>
           <p:spPr>
             <a:xfrm rot="16200000" flipH="1">
-              <a:off x="4448939" y="2970473"/>
+              <a:off x="4010649" y="3042481"/>
               <a:ext cx="636642" cy="545584"/>
             </a:xfrm>
             <a:prstGeom prst="bentConnector3">
@@ -8439,8 +8439,8 @@
           </p:nvSpPr>
           <p:spPr>
             <a:xfrm flipH="1">
-              <a:off x="3621544" y="3178884"/>
-              <a:ext cx="664990" cy="215444"/>
+              <a:off x="3183254" y="3250892"/>
+              <a:ext cx="762516" cy="246221"/>
             </a:xfrm>
             <a:prstGeom prst="rect">
               <a:avLst/>
@@ -8456,10 +8456,10 @@
             <a:lstStyle/>
             <a:p>
               <a:r>
-                <a:rPr lang="fr-BE" sz="1400" b="1" noProof="1" smtClean="0"/>
+                <a:rPr lang="fr-BE" sz="1600" b="1" noProof="1" smtClean="0"/>
                 <a:t>[conflict]</a:t>
               </a:r>
-              <a:endParaRPr lang="fr-BE" sz="1400" b="1" baseline="-25000" noProof="1"/>
+              <a:endParaRPr lang="fr-BE" sz="1600" b="1" baseline="-25000" noProof="1"/>
             </a:p>
           </p:txBody>
         </p:sp>
@@ -8471,8 +8471,8 @@
           </p:nvSpPr>
           <p:spPr>
             <a:xfrm flipH="1">
-              <a:off x="4627116" y="3170381"/>
-              <a:ext cx="833305" cy="215444"/>
+              <a:off x="4188826" y="3242389"/>
+              <a:ext cx="954877" cy="246221"/>
             </a:xfrm>
             <a:prstGeom prst="rect">
               <a:avLst/>
@@ -8488,20 +8488,20 @@
             <a:lstStyle/>
             <a:p>
               <a:r>
-                <a:rPr lang="fr-BE" sz="1400" b="1" noProof="1" smtClean="0"/>
+                <a:rPr lang="fr-BE" sz="1600" b="1" noProof="1" smtClean="0"/>
                 <a:t>[</a:t>
               </a:r>
               <a:r>
-                <a:rPr lang="fr-BE" sz="1400" b="1" noProof="1" smtClean="0">
+                <a:rPr lang="fr-BE" sz="1600" b="1" noProof="1" smtClean="0">
                   <a:sym typeface="Symbol"/>
                 </a:rPr>
                 <a:t> </a:t>
               </a:r>
               <a:r>
-                <a:rPr lang="fr-BE" sz="1400" b="1" noProof="1" smtClean="0"/>
+                <a:rPr lang="fr-BE" sz="1600" b="1" noProof="1" smtClean="0"/>
                 <a:t>conflict]</a:t>
               </a:r>
-              <a:endParaRPr lang="fr-BE" sz="1400" b="1" baseline="-25000" noProof="1"/>
+              <a:endParaRPr lang="fr-BE" sz="1600" b="1" baseline="-25000" noProof="1"/>
             </a:p>
           </p:txBody>
         </p:sp>
@@ -8514,84 +8514,12 @@
         </p:nvGrpSpPr>
         <p:grpSpPr>
           <a:xfrm>
-            <a:off x="2952120" y="5320258"/>
-            <a:ext cx="4068152" cy="1130295"/>
-            <a:chOff x="2483768" y="5320258"/>
-            <a:chExt cx="4068152" cy="1130295"/>
+            <a:off x="2162277" y="4746915"/>
+            <a:ext cx="4573346" cy="1047900"/>
+            <a:chOff x="2378301" y="5342029"/>
+            <a:chExt cx="4573346" cy="1047900"/>
           </a:xfrm>
         </p:grpSpPr>
-        <p:sp>
-          <p:nvSpPr>
-            <p:cNvPr id="57" name="ZoneTexte 56"/>
-            <p:cNvSpPr txBox="1"/>
-            <p:nvPr/>
-          </p:nvSpPr>
-          <p:spPr>
-            <a:xfrm flipH="1">
-              <a:off x="3501405" y="6265887"/>
-              <a:ext cx="726161" cy="184666"/>
-            </a:xfrm>
-            <a:prstGeom prst="rect">
-              <a:avLst/>
-            </a:prstGeom>
-            <a:solidFill>
-              <a:schemeClr val="bg1"/>
-            </a:solidFill>
-          </p:spPr>
-          <p:txBody>
-            <a:bodyPr wrap="none" lIns="0" tIns="0" rIns="0" bIns="0" rtlCol="0">
-              <a:spAutoFit/>
-            </a:bodyPr>
-            <a:lstStyle/>
-            <a:p>
-              <a:r>
-                <a:rPr lang="fr-BE" sz="1200" noProof="1" smtClean="0"/>
-                <a:t>Schedule</a:t>
-              </a:r>
-              <a:r>
-                <a:rPr lang="fr-BE" sz="1200" baseline="-25000" noProof="1" smtClean="0"/>
-                <a:t>end</a:t>
-              </a:r>
-              <a:endParaRPr lang="fr-BE" sz="1200" baseline="-25000" noProof="1"/>
-            </a:p>
-          </p:txBody>
-        </p:sp>
-        <p:sp>
-          <p:nvSpPr>
-            <p:cNvPr id="58" name="ZoneTexte 57"/>
-            <p:cNvSpPr txBox="1"/>
-            <p:nvPr/>
-          </p:nvSpPr>
-          <p:spPr>
-            <a:xfrm flipH="1">
-              <a:off x="3933453" y="5920705"/>
-              <a:ext cx="718338" cy="184666"/>
-            </a:xfrm>
-            <a:prstGeom prst="rect">
-              <a:avLst/>
-            </a:prstGeom>
-            <a:solidFill>
-              <a:schemeClr val="bg1"/>
-            </a:solidFill>
-          </p:spPr>
-          <p:txBody>
-            <a:bodyPr wrap="none" lIns="0" tIns="0" rIns="0" bIns="0" rtlCol="0">
-              <a:spAutoFit/>
-            </a:bodyPr>
-            <a:lstStyle/>
-            <a:p>
-              <a:r>
-                <a:rPr lang="fr-BE" sz="1200" noProof="1" smtClean="0"/>
-                <a:t>Arbitrate</a:t>
-              </a:r>
-              <a:r>
-                <a:rPr lang="fr-BE" sz="1200" baseline="-25000" noProof="1" smtClean="0"/>
-                <a:t>end</a:t>
-              </a:r>
-              <a:endParaRPr lang="fr-BE" sz="1200" baseline="-25000" noProof="1"/>
-            </a:p>
-          </p:txBody>
-        </p:sp>
         <p:sp>
           <p:nvSpPr>
             <p:cNvPr id="59" name="Ellipse 58"/>
@@ -8713,15 +8641,15 @@
           <p:nvCxnSpPr>
             <p:cNvPr id="62" name="Connecteur droit avec flèche 55"/>
             <p:cNvCxnSpPr>
-              <a:stCxn id="59" idx="2"/>
+              <a:stCxn id="59" idx="1"/>
               <a:endCxn id="60" idx="6"/>
             </p:cNvCxnSpPr>
             <p:nvPr/>
           </p:nvCxnSpPr>
           <p:spPr>
-            <a:xfrm flipV="1">
-              <a:off x="2843808" y="5572286"/>
-              <a:ext cx="504056" cy="360040"/>
+            <a:xfrm rot="5400000" flipH="1" flipV="1">
+              <a:off x="2938186" y="5446272"/>
+              <a:ext cx="283664" cy="535692"/>
             </a:xfrm>
             <a:prstGeom prst="straightConnector1">
               <a:avLst/>
@@ -8797,8 +8725,8 @@
           </p:nvSpPr>
           <p:spPr>
             <a:xfrm>
-              <a:off x="2657930" y="5577165"/>
-              <a:ext cx="617926" cy="184666"/>
+              <a:off x="2378301" y="5536282"/>
+              <a:ext cx="825547" cy="246221"/>
             </a:xfrm>
             <a:prstGeom prst="rect">
               <a:avLst/>
@@ -8814,14 +8742,14 @@
             <a:lstStyle/>
             <a:p>
               <a:r>
-                <a:rPr lang="fr-BE" sz="1200" noProof="1" smtClean="0"/>
+                <a:rPr lang="fr-BE" sz="1600" noProof="1" smtClean="0"/>
                 <a:t>Collect</a:t>
               </a:r>
               <a:r>
-                <a:rPr lang="fr-BE" sz="1200" baseline="-25000" noProof="1" smtClean="0"/>
+                <a:rPr lang="fr-BE" sz="1600" baseline="-25000" noProof="1" smtClean="0"/>
                 <a:t>start</a:t>
               </a:r>
-              <a:endParaRPr lang="fr-BE" sz="1200" baseline="-25000" noProof="1"/>
+              <a:endParaRPr lang="fr-BE" sz="1600" baseline="-25000" noProof="1"/>
             </a:p>
           </p:txBody>
         </p:sp>
@@ -8833,7 +8761,7 @@
           </p:nvSpPr>
           <p:spPr>
             <a:xfrm flipH="1">
-              <a:off x="4788024" y="5464274"/>
+              <a:off x="5076056" y="5464274"/>
               <a:ext cx="216024" cy="216024"/>
             </a:xfrm>
             <a:prstGeom prst="ellipse">
@@ -8876,7 +8804,7 @@
           <p:spPr>
             <a:xfrm>
               <a:off x="4067944" y="5572286"/>
-              <a:ext cx="720080" cy="1588"/>
+              <a:ext cx="1008112" cy="1588"/>
             </a:xfrm>
             <a:prstGeom prst="curvedConnector3">
               <a:avLst>
@@ -8913,8 +8841,8 @@
           </p:nvSpPr>
           <p:spPr>
             <a:xfrm>
-              <a:off x="4116681" y="5367883"/>
-              <a:ext cx="586635" cy="184666"/>
+              <a:off x="4175328" y="5449760"/>
+              <a:ext cx="778483" cy="246221"/>
             </a:xfrm>
             <a:prstGeom prst="rect">
               <a:avLst/>
@@ -8930,14 +8858,14 @@
             <a:lstStyle/>
             <a:p>
               <a:r>
-                <a:rPr lang="fr-BE" sz="1200" noProof="1" smtClean="0"/>
+                <a:rPr lang="fr-BE" sz="1600" noProof="1" smtClean="0"/>
                 <a:t>Collect</a:t>
               </a:r>
               <a:r>
-                <a:rPr lang="fr-BE" sz="1200" baseline="-25000" noProof="1" smtClean="0"/>
+                <a:rPr lang="fr-BE" sz="1600" baseline="-25000" noProof="1" smtClean="0"/>
                 <a:t>end</a:t>
               </a:r>
-              <a:endParaRPr lang="fr-BE" sz="1200" baseline="-25000" noProof="1"/>
+              <a:endParaRPr lang="fr-BE" sz="1600" baseline="-25000" noProof="1"/>
             </a:p>
           </p:txBody>
         </p:sp>
@@ -8949,7 +8877,7 @@
           </p:nvSpPr>
           <p:spPr>
             <a:xfrm flipH="1">
-              <a:off x="5940152" y="5464274"/>
+              <a:off x="6588224" y="5464274"/>
               <a:ext cx="216024" cy="216024"/>
             </a:xfrm>
             <a:prstGeom prst="ellipse">
@@ -8991,8 +8919,8 @@
           </p:nvCxnSpPr>
           <p:spPr>
             <a:xfrm>
-              <a:off x="5004048" y="5572286"/>
-              <a:ext cx="936104" cy="1588"/>
+              <a:off x="5292080" y="5572286"/>
+              <a:ext cx="1296144" cy="1588"/>
             </a:xfrm>
             <a:prstGeom prst="curvedConnector3">
               <a:avLst>
@@ -9029,8 +8957,8 @@
           </p:nvSpPr>
           <p:spPr>
             <a:xfrm flipH="1">
-              <a:off x="5042148" y="5367883"/>
-              <a:ext cx="747962" cy="184666"/>
+              <a:off x="5404763" y="5455848"/>
+              <a:ext cx="1003160" cy="246221"/>
             </a:xfrm>
             <a:prstGeom prst="rect">
               <a:avLst/>
@@ -9046,14 +8974,14 @@
             <a:lstStyle/>
             <a:p>
               <a:r>
-                <a:rPr lang="fr-BE" sz="1200" noProof="1" smtClean="0"/>
+                <a:rPr lang="fr-BE" sz="1600" noProof="1" smtClean="0"/>
                 <a:t>Arbitrate</a:t>
               </a:r>
               <a:r>
-                <a:rPr lang="fr-BE" sz="1200" baseline="-25000" noProof="1" smtClean="0"/>
+                <a:rPr lang="fr-BE" sz="1600" baseline="-25000" noProof="1" smtClean="0"/>
                 <a:t>start</a:t>
               </a:r>
-              <a:endParaRPr lang="fr-BE" sz="1200" baseline="-25000" noProof="1"/>
+              <a:endParaRPr lang="fr-BE" sz="1600" baseline="-25000" noProof="1"/>
             </a:p>
           </p:txBody>
         </p:sp>
@@ -9107,8 +9035,8 @@
           </p:nvCxnSpPr>
           <p:spPr>
             <a:xfrm rot="5400000">
-              <a:off x="5580112" y="5464274"/>
-              <a:ext cx="252028" cy="684076"/>
+              <a:off x="5904148" y="5140238"/>
+              <a:ext cx="252028" cy="1332148"/>
             </a:xfrm>
             <a:prstGeom prst="curvedConnector2">
               <a:avLst/>
@@ -9143,7 +9071,7 @@
           </p:nvSpPr>
           <p:spPr>
             <a:xfrm flipH="1">
-              <a:off x="3635896" y="5320258"/>
+              <a:off x="3635896" y="5342029"/>
               <a:ext cx="159783" cy="215444"/>
             </a:xfrm>
             <a:prstGeom prst="rect">
@@ -9173,7 +9101,7 @@
           </p:nvSpPr>
           <p:spPr>
             <a:xfrm flipH="1">
-              <a:off x="5580112" y="5689823"/>
+              <a:off x="5580112" y="5824894"/>
               <a:ext cx="159783" cy="215444"/>
             </a:xfrm>
             <a:prstGeom prst="rect">
@@ -9281,7 +9209,7 @@
           </p:nvSpPr>
           <p:spPr>
             <a:xfrm flipH="1">
-              <a:off x="4860032" y="6165304"/>
+              <a:off x="4788024" y="6165304"/>
               <a:ext cx="216024" cy="216024"/>
             </a:xfrm>
             <a:prstGeom prst="ellipse">
@@ -9323,7 +9251,7 @@
           </p:nvCxnSpPr>
           <p:spPr>
             <a:xfrm rot="10800000">
-              <a:off x="5076056" y="6273316"/>
+              <a:off x="5004048" y="6273316"/>
               <a:ext cx="432048" cy="1588"/>
             </a:xfrm>
             <a:prstGeom prst="curvedConnector3">
@@ -9361,7 +9289,7 @@
           </p:nvSpPr>
           <p:spPr>
             <a:xfrm flipH="1">
-              <a:off x="5220072" y="6159971"/>
+              <a:off x="5162578" y="6174485"/>
               <a:ext cx="159783" cy="215444"/>
             </a:xfrm>
             <a:prstGeom prst="rect">
@@ -9395,7 +9323,7 @@
           <p:spPr>
             <a:xfrm rot="10800000">
               <a:off x="3131840" y="6273316"/>
-              <a:ext cx="1728192" cy="1588"/>
+              <a:ext cx="1656184" cy="1588"/>
             </a:xfrm>
             <a:prstGeom prst="straightConnector1">
               <a:avLst/>
@@ -9430,7 +9358,7 @@
           </p:nvSpPr>
           <p:spPr>
             <a:xfrm flipH="1">
-              <a:off x="5508104" y="6165304"/>
+              <a:off x="5436096" y="6165304"/>
               <a:ext cx="216024" cy="216024"/>
             </a:xfrm>
             <a:prstGeom prst="ellipse">
@@ -9472,8 +9400,8 @@
           </p:nvCxnSpPr>
           <p:spPr>
             <a:xfrm rot="5400000">
-              <a:off x="5612007" y="5760783"/>
-              <a:ext cx="624654" cy="400412"/>
+              <a:off x="5900039" y="5400743"/>
+              <a:ext cx="624654" cy="1120492"/>
             </a:xfrm>
             <a:prstGeom prst="curvedConnector2">
               <a:avLst/>
@@ -9508,8 +9436,8 @@
           </p:nvSpPr>
           <p:spPr>
             <a:xfrm flipH="1">
-              <a:off x="5796136" y="5915372"/>
-              <a:ext cx="755784" cy="184666"/>
+              <a:off x="5940152" y="6040338"/>
+              <a:ext cx="1011495" cy="246221"/>
             </a:xfrm>
             <a:prstGeom prst="rect">
               <a:avLst/>
@@ -9525,14 +9453,14 @@
             <a:lstStyle/>
             <a:p>
               <a:r>
-                <a:rPr lang="fr-BE" sz="1200" noProof="1" smtClean="0"/>
+                <a:rPr lang="fr-BE" sz="1600" noProof="1" smtClean="0"/>
                 <a:t>Schedule</a:t>
               </a:r>
               <a:r>
-                <a:rPr lang="fr-BE" sz="1200" baseline="-25000" noProof="1" smtClean="0"/>
+                <a:rPr lang="fr-BE" sz="1600" baseline="-25000" noProof="1" smtClean="0"/>
                 <a:t>start</a:t>
               </a:r>
-              <a:endParaRPr lang="fr-BE" sz="1200" baseline="-25000" noProof="1"/>
+              <a:endParaRPr lang="fr-BE" sz="1600" baseline="-25000" noProof="1"/>
             </a:p>
           </p:txBody>
         </p:sp>
@@ -9571,6 +9499,78 @@
             </a:fontRef>
           </p:style>
         </p:cxnSp>
+        <p:sp>
+          <p:nvSpPr>
+            <p:cNvPr id="58" name="ZoneTexte 57"/>
+            <p:cNvSpPr txBox="1"/>
+            <p:nvPr/>
+          </p:nvSpPr>
+          <p:spPr>
+            <a:xfrm flipH="1">
+              <a:off x="3571145" y="5795848"/>
+              <a:ext cx="958276" cy="246221"/>
+            </a:xfrm>
+            <a:prstGeom prst="rect">
+              <a:avLst/>
+            </a:prstGeom>
+            <a:solidFill>
+              <a:schemeClr val="bg1"/>
+            </a:solidFill>
+          </p:spPr>
+          <p:txBody>
+            <a:bodyPr wrap="none" lIns="0" tIns="0" rIns="0" bIns="0" rtlCol="0">
+              <a:spAutoFit/>
+            </a:bodyPr>
+            <a:lstStyle/>
+            <a:p>
+              <a:r>
+                <a:rPr lang="fr-BE" sz="1600" noProof="1" smtClean="0"/>
+                <a:t>Arbitrate</a:t>
+              </a:r>
+              <a:r>
+                <a:rPr lang="fr-BE" sz="1600" baseline="-25000" noProof="1" smtClean="0"/>
+                <a:t>end</a:t>
+              </a:r>
+              <a:endParaRPr lang="fr-BE" sz="1600" baseline="-25000" noProof="1"/>
+            </a:p>
+          </p:txBody>
+        </p:sp>
+        <p:sp>
+          <p:nvSpPr>
+            <p:cNvPr id="57" name="ZoneTexte 56"/>
+            <p:cNvSpPr txBox="1"/>
+            <p:nvPr/>
+          </p:nvSpPr>
+          <p:spPr>
+            <a:xfrm flipH="1">
+              <a:off x="3605389" y="6141374"/>
+              <a:ext cx="966611" cy="246221"/>
+            </a:xfrm>
+            <a:prstGeom prst="rect">
+              <a:avLst/>
+            </a:prstGeom>
+            <a:solidFill>
+              <a:schemeClr val="bg1"/>
+            </a:solidFill>
+          </p:spPr>
+          <p:txBody>
+            <a:bodyPr wrap="none" lIns="0" tIns="0" rIns="0" bIns="0" rtlCol="0">
+              <a:spAutoFit/>
+            </a:bodyPr>
+            <a:lstStyle/>
+            <a:p>
+              <a:r>
+                <a:rPr lang="fr-BE" sz="1600" noProof="1" smtClean="0"/>
+                <a:t>Schedule</a:t>
+              </a:r>
+              <a:r>
+                <a:rPr lang="fr-BE" sz="1600" baseline="-25000" noProof="1" smtClean="0"/>
+                <a:t>end</a:t>
+              </a:r>
+              <a:endParaRPr lang="fr-BE" sz="1600" baseline="-25000" noProof="1"/>
+            </a:p>
+          </p:txBody>
+        </p:sp>
       </p:grpSp>
     </p:spTree>
   </p:cSld>
@@ -9599,16 +9599,16 @@
       </p:grpSpPr>
       <p:grpSp>
         <p:nvGrpSpPr>
-          <p:cNvPr id="119" name="Groupe 118"/>
+          <p:cNvPr id="15" name="Groupe 14"/>
           <p:cNvGrpSpPr/>
           <p:nvPr/>
         </p:nvGrpSpPr>
         <p:grpSpPr>
           <a:xfrm>
-            <a:off x="500034" y="332656"/>
-            <a:ext cx="6448230" cy="6120680"/>
-            <a:chOff x="500034" y="332656"/>
-            <a:chExt cx="6448230" cy="6120680"/>
+            <a:off x="500034" y="288032"/>
+            <a:ext cx="7312326" cy="6453336"/>
+            <a:chOff x="500034" y="288032"/>
+            <a:chExt cx="7312326" cy="6453336"/>
           </a:xfrm>
         </p:grpSpPr>
         <p:sp>
@@ -9619,8 +9619,8 @@
           </p:nvSpPr>
           <p:spPr>
             <a:xfrm>
-              <a:off x="500034" y="332656"/>
-              <a:ext cx="6448230" cy="6120680"/>
+              <a:off x="500034" y="288032"/>
+              <a:ext cx="7312326" cy="6453336"/>
             </a:xfrm>
             <a:prstGeom prst="rect">
               <a:avLst/>
@@ -9661,8 +9661,8 @@
           </p:nvSpPr>
           <p:spPr>
             <a:xfrm>
-              <a:off x="683568" y="3093822"/>
-              <a:ext cx="2554867" cy="1077218"/>
+              <a:off x="683568" y="3185046"/>
+              <a:ext cx="2138278" cy="1384995"/>
             </a:xfrm>
             <a:prstGeom prst="rect">
               <a:avLst/>
@@ -9690,28 +9690,24 @@
                 <a:buChar char="•"/>
               </a:pPr>
               <a:r>
-                <a:rPr lang="fr-BE" sz="2000" dirty="0" err="1" smtClean="0"/>
-                <a:t>Symbolic</a:t>
+                <a:rPr lang="fr-BE" sz="2000" smtClean="0"/>
+                <a:t>Analyses based</a:t>
               </a:r>
+              <a:br>
+                <a:rPr lang="fr-BE" sz="2000" smtClean="0"/>
+              </a:br>
               <a:r>
-                <a:rPr lang="fr-BE" sz="2000" dirty="0" smtClean="0"/>
-                <a:t> </a:t>
+                <a:rPr lang="fr-BE" sz="2000" smtClean="0"/>
+                <a:t>on symbolic </a:t>
               </a:r>
+              <a:br>
+                <a:rPr lang="fr-BE" sz="2000" smtClean="0"/>
+              </a:br>
               <a:r>
-                <a:rPr lang="fr-BE" sz="2000" dirty="0" err="1" smtClean="0"/>
+                <a:rPr lang="fr-BE" sz="2000" smtClean="0"/>
                 <a:t>execution</a:t>
               </a:r>
-              <a:r>
-                <a:rPr lang="fr-BE" sz="2000" dirty="0" smtClean="0"/>
-                <a:t/>
-              </a:r>
-              <a:br>
-                <a:rPr lang="fr-BE" sz="2000" dirty="0" smtClean="0"/>
-              </a:br>
-              <a:r>
-                <a:rPr lang="fr-BE" sz="2000" dirty="0" smtClean="0"/>
-                <a:t>analyses [Dam11]</a:t>
-              </a:r>
+              <a:endParaRPr lang="fr-BE" sz="2000" dirty="0" smtClean="0"/>
             </a:p>
           </p:txBody>
         </p:sp>
@@ -9723,7 +9719,7 @@
           </p:nvSpPr>
           <p:spPr>
             <a:xfrm>
-              <a:off x="4870270" y="1837809"/>
+              <a:off x="5260838" y="1988840"/>
               <a:ext cx="142876" cy="857256"/>
             </a:xfrm>
             <a:custGeom>
@@ -9802,7 +9798,7 @@
           </p:nvSpPr>
           <p:spPr>
             <a:xfrm>
-              <a:off x="4870270" y="4293666"/>
+              <a:off x="5260838" y="4509120"/>
               <a:ext cx="142876" cy="857256"/>
             </a:xfrm>
             <a:custGeom>
@@ -9873,78 +9869,6 @@
             </a:p>
           </p:txBody>
         </p:sp>
-        <p:pic>
-          <p:nvPicPr>
-            <p:cNvPr id="105" name="Image 104" descr="g-hmsc.png"/>
-            <p:cNvPicPr>
-              <a:picLocks noChangeAspect="1"/>
-            </p:cNvPicPr>
-            <p:nvPr/>
-          </p:nvPicPr>
-          <p:blipFill>
-            <a:blip r:embed="rId2" cstate="print"/>
-            <a:stretch>
-              <a:fillRect/>
-            </a:stretch>
-          </p:blipFill>
-          <p:spPr>
-            <a:xfrm>
-              <a:off x="3317604" y="454964"/>
-              <a:ext cx="3248208" cy="1533876"/>
-            </a:xfrm>
-            <a:prstGeom prst="rect">
-              <a:avLst/>
-            </a:prstGeom>
-          </p:spPr>
-        </p:pic>
-        <p:pic>
-          <p:nvPicPr>
-            <p:cNvPr id="106" name="Image 105" descr="g-lts.png"/>
-            <p:cNvPicPr>
-              <a:picLocks noChangeAspect="1"/>
-            </p:cNvPicPr>
-            <p:nvPr/>
-          </p:nvPicPr>
-          <p:blipFill>
-            <a:blip r:embed="rId3" cstate="print"/>
-            <a:stretch>
-              <a:fillRect/>
-            </a:stretch>
-          </p:blipFill>
-          <p:spPr>
-            <a:xfrm>
-              <a:off x="3360064" y="2708920"/>
-              <a:ext cx="3163288" cy="1847022"/>
-            </a:xfrm>
-            <a:prstGeom prst="rect">
-              <a:avLst/>
-            </a:prstGeom>
-          </p:spPr>
-        </p:pic>
-        <p:pic>
-          <p:nvPicPr>
-            <p:cNvPr id="110" name="Image 109" descr="lts.png"/>
-            <p:cNvPicPr>
-              <a:picLocks noChangeAspect="1"/>
-            </p:cNvPicPr>
-            <p:nvPr/>
-          </p:nvPicPr>
-          <p:blipFill>
-            <a:blip r:embed="rId4" cstate="print"/>
-            <a:stretch>
-              <a:fillRect/>
-            </a:stretch>
-          </p:blipFill>
-          <p:spPr>
-            <a:xfrm>
-              <a:off x="3131840" y="5171346"/>
-              <a:ext cx="3619736" cy="1034968"/>
-            </a:xfrm>
-            <a:prstGeom prst="rect">
-              <a:avLst/>
-            </a:prstGeom>
-          </p:spPr>
-        </p:pic>
         <p:sp>
           <p:nvSpPr>
             <p:cNvPr id="114" name="ZoneTexte 113"/>
@@ -9953,8 +9877,8 @@
           </p:nvSpPr>
           <p:spPr>
             <a:xfrm>
-              <a:off x="683568" y="4996333"/>
-              <a:ext cx="2259273" cy="1384995"/>
+              <a:off x="683568" y="5431903"/>
+              <a:ext cx="2259273" cy="1077218"/>
             </a:xfrm>
             <a:prstGeom prst="rect">
               <a:avLst/>
@@ -9993,24 +9917,18 @@
                 <a:rPr lang="fr-BE" sz="2000" dirty="0" smtClean="0"/>
               </a:br>
               <a:r>
-                <a:rPr lang="fr-BE" sz="2000" dirty="0" smtClean="0"/>
+                <a:rPr lang="fr-BE" sz="2000" smtClean="0"/>
                 <a:t>model-</a:t>
               </a:r>
               <a:r>
-                <a:rPr lang="fr-BE" sz="2000" dirty="0" err="1" smtClean="0"/>
+                <a:rPr lang="fr-BE" sz="2000" err="1" smtClean="0"/>
                 <a:t>checking</a:t>
               </a:r>
               <a:r>
-                <a:rPr lang="fr-BE" sz="2000" dirty="0" smtClean="0"/>
+                <a:rPr lang="fr-BE" sz="2000" smtClean="0"/>
                 <a:t> </a:t>
               </a:r>
-              <a:br>
-                <a:rPr lang="fr-BE" sz="2000" dirty="0" smtClean="0"/>
-              </a:br>
-              <a:r>
-                <a:rPr lang="fr-BE" sz="2000" dirty="0" smtClean="0"/>
-                <a:t>[Dam09, Gia03]</a:t>
-              </a:r>
+              <a:endParaRPr lang="fr-BE" sz="2000" dirty="0" smtClean="0"/>
             </a:p>
           </p:txBody>
         </p:sp>
@@ -10022,8 +9940,8 @@
           </p:nvSpPr>
           <p:spPr>
             <a:xfrm>
-              <a:off x="683568" y="837182"/>
-              <a:ext cx="2341218" cy="769441"/>
+              <a:off x="683568" y="782017"/>
+              <a:ext cx="2375394" cy="1077218"/>
             </a:xfrm>
             <a:prstGeom prst="rect">
               <a:avLst/>
@@ -10037,13 +9955,18 @@
             <a:lstStyle/>
             <a:p>
               <a:r>
-                <a:rPr lang="fr-BE" sz="2400" dirty="0" err="1" smtClean="0"/>
+                <a:rPr lang="fr-BE" sz="2400" err="1" smtClean="0"/>
                 <a:t>Guarded</a:t>
               </a:r>
               <a:r>
-                <a:rPr lang="fr-BE" sz="2400" dirty="0" smtClean="0"/>
-                <a:t> LTS</a:t>
+                <a:rPr lang="fr-BE" sz="2400" smtClean="0"/>
+                <a:t> </a:t>
               </a:r>
+              <a:r>
+                <a:rPr lang="fr-BE" sz="2400" smtClean="0"/>
+                <a:t>hMSC</a:t>
+              </a:r>
+              <a:endParaRPr lang="fr-BE" sz="2400" dirty="0" smtClean="0"/>
             </a:p>
             <a:p>
               <a:pPr marL="360363" indent="-180975">
@@ -10051,21 +9974,98 @@
                 <a:buChar char="•"/>
               </a:pPr>
               <a:r>
-                <a:rPr lang="fr-BE" sz="2000" dirty="0" err="1" smtClean="0"/>
-                <a:t>Process</a:t>
+                <a:rPr lang="fr-BE" sz="2000" smtClean="0"/>
+                <a:t>Process modeling</a:t>
               </a:r>
+              <a:br>
+                <a:rPr lang="fr-BE" sz="2000" smtClean="0"/>
+              </a:br>
               <a:r>
-                <a:rPr lang="fr-BE" sz="2000" dirty="0" smtClean="0"/>
-                <a:t> </a:t>
-              </a:r>
-              <a:r>
-                <a:rPr lang="fr-BE" sz="2000" dirty="0" err="1" smtClean="0"/>
+                <a:rPr lang="fr-BE" sz="2000" smtClean="0"/>
                 <a:t>language</a:t>
               </a:r>
               <a:endParaRPr lang="fr-BE" sz="2000" dirty="0" smtClean="0"/>
             </a:p>
           </p:txBody>
         </p:sp>
+        <p:pic>
+          <p:nvPicPr>
+            <p:cNvPr id="1026" name="Picture 2" descr="D:\blambeau\thesis\writing\src\3-deductive\images\g-hmsc.png"/>
+            <p:cNvPicPr>
+              <a:picLocks noChangeAspect="1" noChangeArrowheads="1"/>
+            </p:cNvPicPr>
+            <p:nvPr/>
+          </p:nvPicPr>
+          <p:blipFill>
+            <a:blip r:embed="rId2" cstate="print"/>
+            <a:srcRect/>
+            <a:stretch>
+              <a:fillRect/>
+            </a:stretch>
+          </p:blipFill>
+          <p:spPr bwMode="auto">
+            <a:xfrm>
+              <a:off x="3262970" y="436389"/>
+              <a:ext cx="4138613" cy="1768475"/>
+            </a:xfrm>
+            <a:prstGeom prst="rect">
+              <a:avLst/>
+            </a:prstGeom>
+            <a:noFill/>
+          </p:spPr>
+        </p:pic>
+        <p:pic>
+          <p:nvPicPr>
+            <p:cNvPr id="1027" name="Picture 3" descr="D:\blambeau\thesis\writing\src\3-deductive\images\g-lts.png"/>
+            <p:cNvPicPr>
+              <a:picLocks noChangeAspect="1" noChangeArrowheads="1"/>
+            </p:cNvPicPr>
+            <p:nvPr/>
+          </p:nvPicPr>
+          <p:blipFill>
+            <a:blip r:embed="rId3" cstate="print"/>
+            <a:srcRect/>
+            <a:stretch>
+              <a:fillRect/>
+            </a:stretch>
+          </p:blipFill>
+          <p:spPr bwMode="auto">
+            <a:xfrm>
+              <a:off x="3174864" y="2813918"/>
+              <a:ext cx="4314825" cy="2127250"/>
+            </a:xfrm>
+            <a:prstGeom prst="rect">
+              <a:avLst/>
+            </a:prstGeom>
+            <a:noFill/>
+          </p:spPr>
+        </p:pic>
+        <p:pic>
+          <p:nvPicPr>
+            <p:cNvPr id="1028" name="Picture 4" descr="D:\blambeau\thesis\writing\src\3-deductive\images\lts.png"/>
+            <p:cNvPicPr>
+              <a:picLocks noChangeAspect="1" noChangeArrowheads="1"/>
+            </p:cNvPicPr>
+            <p:nvPr/>
+          </p:nvPicPr>
+          <p:blipFill>
+            <a:blip r:embed="rId4" cstate="print"/>
+            <a:srcRect/>
+            <a:stretch>
+              <a:fillRect/>
+            </a:stretch>
+          </p:blipFill>
+          <p:spPr bwMode="auto">
+            <a:xfrm>
+              <a:off x="2951820" y="5415681"/>
+              <a:ext cx="4760913" cy="1109663"/>
+            </a:xfrm>
+            <a:prstGeom prst="rect">
+              <a:avLst/>
+            </a:prstGeom>
+            <a:noFill/>
+          </p:spPr>
+        </p:pic>
       </p:grpSp>
     </p:spTree>
   </p:cSld>
@@ -17579,22 +17579,14 @@
               <a:pPr algn="ctr"/>
               <a:r>
                 <a:rPr lang="fr-BE" noProof="1" smtClean="0"/>
-                <a:t>Automaton </a:t>
-              </a:r>
-              <a:r>
-                <a:rPr lang="fr-BE" noProof="1" smtClean="0"/>
-                <a:t>toolkit </a:t>
+                <a:t>Automaton toolkit </a:t>
               </a:r>
               <a:br>
                 <a:rPr lang="fr-BE" noProof="1" smtClean="0"/>
               </a:br>
               <a:r>
                 <a:rPr lang="fr-BE" noProof="1" smtClean="0"/>
-                <a:t>(</a:t>
-              </a:r>
-              <a:r>
-                <a:rPr lang="fr-BE" noProof="1" smtClean="0"/>
-                <a:t>stamina)</a:t>
+                <a:t>(stamina)</a:t>
               </a:r>
               <a:endParaRPr lang="fr-BE" noProof="1"/>
             </a:p>
@@ -17735,7 +17727,6 @@
                 <a:rPr lang="fr-BE" noProof="1" smtClean="0"/>
                 <a:t>Pathway Model</a:t>
               </a:r>
-              <a:endParaRPr lang="fr-BE" noProof="1" smtClean="0"/>
             </a:p>
           </p:txBody>
         </p:sp>
@@ -17777,20 +17768,12 @@
                 <a:rPr lang="fr-BE" noProof="1" smtClean="0"/>
                 <a:t>Binary Decision Diagrams  </a:t>
               </a:r>
-              <a:r>
-                <a:rPr lang="fr-BE" noProof="1" smtClean="0"/>
-                <a:t/>
-              </a:r>
               <a:br>
                 <a:rPr lang="fr-BE" noProof="1" smtClean="0"/>
               </a:br>
               <a:r>
                 <a:rPr lang="fr-BE" noProof="1" smtClean="0"/>
-                <a:t>(</a:t>
-              </a:r>
-              <a:r>
-                <a:rPr lang="fr-BE" noProof="1" smtClean="0"/>
-                <a:t>Buddy)</a:t>
+                <a:t>(Buddy)</a:t>
               </a:r>
               <a:endParaRPr lang="fr-BE" noProof="1"/>
             </a:p>
@@ -17832,15 +17815,7 @@
               <a:pPr algn="ctr"/>
               <a:r>
                 <a:rPr lang="fr-BE" noProof="1" smtClean="0"/>
-                <a:t>Parsing &amp; AST </a:t>
-              </a:r>
-              <a:r>
-                <a:rPr lang="fr-BE" noProof="1" smtClean="0"/>
-                <a:t>rewriting </a:t>
-              </a:r>
-              <a:r>
-                <a:rPr lang="fr-BE" noProof="1" smtClean="0"/>
-                <a:t>(anagram)</a:t>
+                <a:t>Parsing &amp; AST rewriting (anagram)</a:t>
               </a:r>
               <a:endParaRPr lang="fr-BE" noProof="1"/>
             </a:p>
@@ -17891,7 +17866,6 @@
                 <a:rPr lang="fr-BE" noProof="1" smtClean="0"/>
                 <a:t>analyzer</a:t>
               </a:r>
-              <a:endParaRPr lang="fr-BE" noProof="1" smtClean="0"/>
             </a:p>
           </p:txBody>
         </p:sp>
@@ -17987,13 +17961,8 @@
               <a:pPr algn="ctr"/>
               <a:r>
                 <a:rPr lang="fr-BE" noProof="1" smtClean="0"/>
-                <a:t>r</a:t>
+                <a:t>rewriting</a:t>
               </a:r>
-              <a:r>
-                <a:rPr lang="fr-BE" noProof="1" smtClean="0"/>
-                <a:t>ewriting</a:t>
-              </a:r>
-              <a:endParaRPr lang="fr-BE" noProof="1" smtClean="0"/>
             </a:p>
           </p:txBody>
         </p:sp>
@@ -18367,20 +18336,12 @@
                 <a:rPr lang="fr-BE" noProof="1" smtClean="0"/>
                 <a:t>SQL Persistence </a:t>
               </a:r>
-              <a:r>
-                <a:rPr lang="fr-BE" noProof="1" smtClean="0"/>
-                <a:t/>
-              </a:r>
               <a:br>
                 <a:rPr lang="fr-BE" noProof="1" smtClean="0"/>
               </a:br>
               <a:r>
                 <a:rPr lang="fr-BE" noProof="1" smtClean="0"/>
-                <a:t>(</a:t>
-              </a:r>
-              <a:r>
-                <a:rPr lang="fr-BE" noProof="1" smtClean="0"/>
-                <a:t>sqlite)</a:t>
+                <a:t>(sqlite)</a:t>
               </a:r>
             </a:p>
           </p:txBody>
@@ -20506,13 +20467,8 @@
               <a:pPr algn="ctr"/>
               <a:r>
                 <a:rPr lang="fr-BE" noProof="1" smtClean="0"/>
-                <a:t>Automaton </a:t>
+                <a:t>Automaton Toolkit</a:t>
               </a:r>
-              <a:r>
-                <a:rPr lang="fr-BE" noProof="1" smtClean="0"/>
-                <a:t>Toolkit</a:t>
-              </a:r>
-              <a:endParaRPr lang="fr-BE" noProof="1" smtClean="0"/>
             </a:p>
             <a:p>
               <a:pPr algn="ctr"/>
@@ -20562,7 +20518,6 @@
                 <a:rPr lang="fr-BE" noProof="1" smtClean="0"/>
                 <a:t>LTL2Buchi</a:t>
               </a:r>
-              <a:endParaRPr lang="fr-BE" noProof="1" smtClean="0"/>
             </a:p>
           </p:txBody>
         </p:sp>
@@ -20652,17 +20607,12 @@
                 <a:rPr lang="fr-BE" noProof="1" smtClean="0"/>
                 <a:t>Binary Decision Diagrams  </a:t>
               </a:r>
-              <a:endParaRPr lang="fr-BE" noProof="1" smtClean="0"/>
             </a:p>
             <a:p>
               <a:pPr algn="ctr"/>
               <a:r>
                 <a:rPr lang="fr-BE" noProof="1" smtClean="0"/>
-                <a:t>(JBuddy</a:t>
-              </a:r>
-              <a:r>
-                <a:rPr lang="fr-BE" noProof="1" smtClean="0"/>
-                <a:t>)</a:t>
+                <a:t>(JBuddy)</a:t>
               </a:r>
               <a:endParaRPr lang="fr-BE" noProof="1"/>
             </a:p>
@@ -20704,13 +20654,8 @@
               <a:pPr algn="ctr"/>
               <a:r>
                 <a:rPr lang="fr-BE" noProof="1" smtClean="0"/>
-                <a:t>g-</a:t>
+                <a:t>g-LTS</a:t>
               </a:r>
-              <a:r>
-                <a:rPr lang="fr-BE" noProof="1" smtClean="0"/>
-                <a:t>LTS</a:t>
-              </a:r>
-              <a:endParaRPr lang="fr-BE" noProof="1" smtClean="0"/>
             </a:p>
           </p:txBody>
         </p:sp>
@@ -20752,7 +20697,6 @@
                 <a:rPr lang="fr-BE" noProof="1" smtClean="0"/>
                 <a:t>FLTL</a:t>
               </a:r>
-              <a:endParaRPr lang="fr-BE" noProof="1" smtClean="0"/>
             </a:p>
           </p:txBody>
         </p:sp>
@@ -21056,13 +21000,8 @@
               <a:pPr algn="ctr"/>
               <a:r>
                 <a:rPr lang="fr-BE" noProof="1" smtClean="0"/>
-                <a:t>g</a:t>
+                <a:t>g-hMSC</a:t>
               </a:r>
-              <a:r>
-                <a:rPr lang="fr-BE" noProof="1" smtClean="0"/>
-                <a:t>-hMSC</a:t>
-              </a:r>
-              <a:endParaRPr lang="fr-BE" noProof="1" smtClean="0"/>
             </a:p>
           </p:txBody>
         </p:sp>
@@ -21330,21 +21269,8 @@
                         <a:schemeClr val="tx1"/>
                       </a:solidFill>
                     </a:rPr>
-                    <a:t>g</a:t>
+                    <a:t>g-hMSC  </a:t>
                   </a:r>
-                  <a:r>
-                    <a:rPr lang="fr-BE" noProof="1" smtClean="0">
-                      <a:solidFill>
-                        <a:schemeClr val="tx1"/>
-                      </a:solidFill>
-                    </a:rPr>
-                    <a:t>-hMSC  </a:t>
-                  </a:r>
-                  <a:endParaRPr lang="fr-BE" noProof="1" smtClean="0">
-                    <a:solidFill>
-                      <a:schemeClr val="tx1"/>
-                    </a:solidFill>
-                  </a:endParaRPr>
                 </a:p>
                 <a:p>
                   <a:pPr algn="ctr"/>
@@ -21627,15 +21553,7 @@
                         <a:schemeClr val="tx1"/>
                       </a:solidFill>
                     </a:rPr>
-                    <a:t>FLTL </a:t>
-                  </a:r>
-                  <a:r>
-                    <a:rPr lang="fr-BE" noProof="1" smtClean="0">
-                      <a:solidFill>
-                        <a:schemeClr val="tx1"/>
-                      </a:solidFill>
-                    </a:rPr>
-                    <a:t>(</a:t>
+                    <a:t>FLTL (</a:t>
                   </a:r>
                   <a:r>
                     <a:rPr lang="fr-BE" noProof="1" smtClean="0">
@@ -21644,25 +21562,7 @@
                       </a:solidFill>
                       <a:sym typeface="Symbol"/>
                     </a:rPr>
-                    <a:t></a:t>
-                  </a:r>
-                  <a:r>
-                    <a:rPr lang="fr-BE" noProof="1" smtClean="0">
-                      <a:solidFill>
-                        <a:schemeClr val="tx1"/>
-                      </a:solidFill>
-                      <a:sym typeface="Symbol"/>
-                    </a:rPr>
-                    <a:t>) </a:t>
-                  </a:r>
-                  <a:r>
-                    <a:rPr lang="fr-BE" noProof="1" smtClean="0">
-                      <a:solidFill>
-                        <a:schemeClr val="tx1"/>
-                      </a:solidFill>
-                      <a:sym typeface="Symbol"/>
-                    </a:rPr>
-                    <a:t/>
+                    <a:t>) </a:t>
                   </a:r>
                   <a:br>
                     <a:rPr lang="fr-BE" noProof="1" smtClean="0">
@@ -21904,21 +21804,8 @@
                         <a:schemeClr val="tx1"/>
                       </a:solidFill>
                     </a:rPr>
-                    <a:t>g</a:t>
+                    <a:t>g-LTS</a:t>
                   </a:r>
-                  <a:r>
-                    <a:rPr lang="fr-BE" noProof="1" smtClean="0">
-                      <a:solidFill>
-                        <a:schemeClr val="tx1"/>
-                      </a:solidFill>
-                    </a:rPr>
-                    <a:t>-LTS</a:t>
-                  </a:r>
-                  <a:endParaRPr lang="fr-BE" noProof="1" smtClean="0">
-                    <a:solidFill>
-                      <a:schemeClr val="tx1"/>
-                    </a:solidFill>
-                  </a:endParaRPr>
                 </a:p>
               </p:txBody>
             </p:sp>
@@ -22277,11 +22164,7 @@
                 <a:pPr algn="ctr"/>
                 <a:r>
                   <a:rPr lang="fr-BE" sz="1600" dirty="0" smtClean="0"/>
-                  <a:t>g</a:t>
-                </a:r>
-                <a:r>
-                  <a:rPr lang="fr-BE" sz="1600" dirty="0" smtClean="0"/>
-                  <a:t>-LTS </a:t>
+                  <a:t>g-LTS </a:t>
                 </a:r>
                 <a:r>
                   <a:rPr lang="fr-BE" sz="1600" dirty="0" smtClean="0">
@@ -22632,23 +22515,7 @@
                         <a:schemeClr val="tx1"/>
                       </a:solidFill>
                     </a:rPr>
-                    <a:t>Buchi</a:t>
-                  </a:r>
-                  <a:r>
-                    <a:rPr lang="fr-BE" noProof="1" smtClean="0">
-                      <a:solidFill>
-                        <a:schemeClr val="tx1"/>
-                      </a:solidFill>
-                    </a:rPr>
-                    <a:t> </a:t>
-                  </a:r>
-                  <a:r>
-                    <a:rPr lang="fr-BE" noProof="1" smtClean="0">
-                      <a:solidFill>
-                        <a:schemeClr val="tx1"/>
-                      </a:solidFill>
-                    </a:rPr>
-                    <a:t>(</a:t>
+                    <a:t>Buchi (</a:t>
                   </a:r>
                   <a:r>
                     <a:rPr lang="fr-BE" noProof="1" smtClean="0">
@@ -22667,11 +22534,6 @@
                     </a:rPr>
                     <a:t>)</a:t>
                   </a:r>
-                  <a:endParaRPr lang="fr-BE" noProof="1" smtClean="0">
-                    <a:solidFill>
-                      <a:schemeClr val="tx1"/>
-                    </a:solidFill>
-                  </a:endParaRPr>
                 </a:p>
                 <a:p>
                   <a:pPr algn="ctr"/>
@@ -22851,11 +22713,6 @@
                     </a:rPr>
                     <a:t>Synchronizer</a:t>
                   </a:r>
-                  <a:endParaRPr lang="fr-BE" noProof="1" smtClean="0">
-                    <a:solidFill>
-                      <a:schemeClr val="tx1"/>
-                    </a:solidFill>
-                  </a:endParaRPr>
                 </a:p>
                 <a:p>
                   <a:pPr algn="ctr"/>
@@ -22972,11 +22829,7 @@
                 <a:pPr algn="ctr"/>
                 <a:r>
                   <a:rPr lang="fr-BE" sz="1600" dirty="0" smtClean="0"/>
-                  <a:t>g</a:t>
-                </a:r>
-                <a:r>
-                  <a:rPr lang="fr-BE" sz="1600" dirty="0" smtClean="0"/>
-                  <a:t>-LTS </a:t>
+                  <a:t>g-LTS </a:t>
                 </a:r>
                 <a:r>
                   <a:rPr lang="fr-BE" sz="1600" dirty="0" smtClean="0">

</xml_diff>

<commit_message>
Updated g-hMSC -> g-LTS image (2)
</commit_message>
<xml_diff>
--- a/writing/images/train.pptx
+++ b/writing/images/train.pptx
@@ -33853,10 +33853,10 @@
         </p:nvGrpSpPr>
         <p:grpSpPr>
           <a:xfrm>
-            <a:off x="611560" y="548680"/>
-            <a:ext cx="8208912" cy="5472608"/>
-            <a:chOff x="611560" y="548680"/>
-            <a:chExt cx="8208912" cy="5472608"/>
+            <a:off x="611560" y="188640"/>
+            <a:ext cx="8208912" cy="5832648"/>
+            <a:chOff x="611560" y="188640"/>
+            <a:chExt cx="8208912" cy="5832648"/>
           </a:xfrm>
         </p:grpSpPr>
         <p:sp>
@@ -33867,8 +33867,8 @@
           </p:nvSpPr>
           <p:spPr>
             <a:xfrm>
-              <a:off x="611560" y="548680"/>
-              <a:ext cx="8208912" cy="5472608"/>
+              <a:off x="611560" y="188640"/>
+              <a:ext cx="8208912" cy="5832648"/>
             </a:xfrm>
             <a:prstGeom prst="rect">
               <a:avLst/>

</xml_diff>

<commit_message>
Updated g-hMSC -> g-LTS image (4)
</commit_message>
<xml_diff>
--- a/writing/images/train.pptx
+++ b/writing/images/train.pptx
@@ -4809,7 +4809,7 @@
         </p:nvGrpSpPr>
         <p:grpSpPr>
           <a:xfrm>
-            <a:off x="2051720" y="548680"/>
+            <a:off x="179512" y="116632"/>
             <a:ext cx="3744416" cy="2088232"/>
             <a:chOff x="2051720" y="548680"/>
             <a:chExt cx="3744416" cy="2088232"/>
@@ -5648,7 +5648,7 @@
         </p:nvGrpSpPr>
         <p:grpSpPr>
           <a:xfrm>
-            <a:off x="1619672" y="3356992"/>
+            <a:off x="179512" y="2348880"/>
             <a:ext cx="5256584" cy="2160240"/>
             <a:chOff x="1619672" y="3356992"/>
             <a:chExt cx="5256584" cy="2160240"/>
@@ -6547,6 +6547,500 @@
                 <a:t>end</a:t>
               </a:r>
               <a:endParaRPr lang="fr-BE" sz="1100" baseline="-25000" noProof="1"/>
+            </a:p>
+          </p:txBody>
+        </p:sp>
+      </p:grpSp>
+      <p:grpSp>
+        <p:nvGrpSpPr>
+          <p:cNvPr id="86" name="Groupe 85"/>
+          <p:cNvGrpSpPr/>
+          <p:nvPr/>
+        </p:nvGrpSpPr>
+        <p:grpSpPr>
+          <a:xfrm>
+            <a:off x="1331640" y="5013176"/>
+            <a:ext cx="4752528" cy="1656184"/>
+            <a:chOff x="1331640" y="5013176"/>
+            <a:chExt cx="4752528" cy="1656184"/>
+          </a:xfrm>
+        </p:grpSpPr>
+        <p:sp>
+          <p:nvSpPr>
+            <p:cNvPr id="85" name="Rectangle 84"/>
+            <p:cNvSpPr/>
+            <p:nvPr/>
+          </p:nvSpPr>
+          <p:spPr>
+            <a:xfrm>
+              <a:off x="1331640" y="5013176"/>
+              <a:ext cx="4752528" cy="1656184"/>
+            </a:xfrm>
+            <a:prstGeom prst="rect">
+              <a:avLst/>
+            </a:prstGeom>
+            <a:ln w="9525"/>
+          </p:spPr>
+          <p:style>
+            <a:lnRef idx="2">
+              <a:schemeClr val="dk1"/>
+            </a:lnRef>
+            <a:fillRef idx="1">
+              <a:schemeClr val="lt1"/>
+            </a:fillRef>
+            <a:effectRef idx="0">
+              <a:schemeClr val="dk1"/>
+            </a:effectRef>
+            <a:fontRef idx="minor">
+              <a:schemeClr val="dk1"/>
+            </a:fontRef>
+          </p:style>
+          <p:txBody>
+            <a:bodyPr rtlCol="0" anchor="ctr"/>
+            <a:lstStyle/>
+            <a:p>
+              <a:pPr algn="ctr"/>
+              <a:endParaRPr lang="fr-BE"/>
+            </a:p>
+          </p:txBody>
+        </p:sp>
+        <p:sp>
+          <p:nvSpPr>
+            <p:cNvPr id="75" name="Forme libre 74"/>
+            <p:cNvSpPr/>
+            <p:nvPr/>
+          </p:nvSpPr>
+          <p:spPr>
+            <a:xfrm>
+              <a:off x="2843808" y="5157192"/>
+              <a:ext cx="3121660" cy="1419860"/>
+            </a:xfrm>
+            <a:custGeom>
+              <a:avLst/>
+              <a:gdLst>
+                <a:gd name="connsiteX0" fmla="*/ 615950 w 3121660"/>
+                <a:gd name="connsiteY0" fmla="*/ 88900 h 1419860"/>
+                <a:gd name="connsiteX1" fmla="*/ 143510 w 3121660"/>
+                <a:gd name="connsiteY1" fmla="*/ 294640 h 1419860"/>
+                <a:gd name="connsiteX2" fmla="*/ 44450 w 3121660"/>
+                <a:gd name="connsiteY2" fmla="*/ 668020 h 1419860"/>
+                <a:gd name="connsiteX3" fmla="*/ 410210 w 3121660"/>
+                <a:gd name="connsiteY3" fmla="*/ 1148080 h 1419860"/>
+                <a:gd name="connsiteX4" fmla="*/ 1781810 w 3121660"/>
+                <a:gd name="connsiteY4" fmla="*/ 1170940 h 1419860"/>
+                <a:gd name="connsiteX5" fmla="*/ 2909570 w 3121660"/>
+                <a:gd name="connsiteY5" fmla="*/ 1300480 h 1419860"/>
+                <a:gd name="connsiteX6" fmla="*/ 3054350 w 3121660"/>
+                <a:gd name="connsiteY6" fmla="*/ 454660 h 1419860"/>
+                <a:gd name="connsiteX7" fmla="*/ 2734310 w 3121660"/>
+                <a:gd name="connsiteY7" fmla="*/ 35560 h 1419860"/>
+                <a:gd name="connsiteX8" fmla="*/ 1652270 w 3121660"/>
+                <a:gd name="connsiteY8" fmla="*/ 241300 h 1419860"/>
+                <a:gd name="connsiteX9" fmla="*/ 1217930 w 3121660"/>
+                <a:gd name="connsiteY9" fmla="*/ 43180 h 1419860"/>
+                <a:gd name="connsiteX10" fmla="*/ 615950 w 3121660"/>
+                <a:gd name="connsiteY10" fmla="*/ 88900 h 1419860"/>
+              </a:gdLst>
+              <a:ahLst/>
+              <a:cxnLst>
+                <a:cxn ang="0">
+                  <a:pos x="connsiteX0" y="connsiteY0"/>
+                </a:cxn>
+                <a:cxn ang="0">
+                  <a:pos x="connsiteX1" y="connsiteY1"/>
+                </a:cxn>
+                <a:cxn ang="0">
+                  <a:pos x="connsiteX2" y="connsiteY2"/>
+                </a:cxn>
+                <a:cxn ang="0">
+                  <a:pos x="connsiteX3" y="connsiteY3"/>
+                </a:cxn>
+                <a:cxn ang="0">
+                  <a:pos x="connsiteX4" y="connsiteY4"/>
+                </a:cxn>
+                <a:cxn ang="0">
+                  <a:pos x="connsiteX5" y="connsiteY5"/>
+                </a:cxn>
+                <a:cxn ang="0">
+                  <a:pos x="connsiteX6" y="connsiteY6"/>
+                </a:cxn>
+                <a:cxn ang="0">
+                  <a:pos x="connsiteX7" y="connsiteY7"/>
+                </a:cxn>
+                <a:cxn ang="0">
+                  <a:pos x="connsiteX8" y="connsiteY8"/>
+                </a:cxn>
+                <a:cxn ang="0">
+                  <a:pos x="connsiteX9" y="connsiteY9"/>
+                </a:cxn>
+                <a:cxn ang="0">
+                  <a:pos x="connsiteX10" y="connsiteY10"/>
+                </a:cxn>
+              </a:cxnLst>
+              <a:rect l="l" t="t" r="r" b="b"/>
+              <a:pathLst>
+                <a:path w="3121660" h="1419860">
+                  <a:moveTo>
+                    <a:pt x="615950" y="88900"/>
+                  </a:moveTo>
+                  <a:cubicBezTo>
+                    <a:pt x="436880" y="130810"/>
+                    <a:pt x="238760" y="198120"/>
+                    <a:pt x="143510" y="294640"/>
+                  </a:cubicBezTo>
+                  <a:cubicBezTo>
+                    <a:pt x="48260" y="391160"/>
+                    <a:pt x="0" y="525780"/>
+                    <a:pt x="44450" y="668020"/>
+                  </a:cubicBezTo>
+                  <a:cubicBezTo>
+                    <a:pt x="88900" y="810260"/>
+                    <a:pt x="120650" y="1064260"/>
+                    <a:pt x="410210" y="1148080"/>
+                  </a:cubicBezTo>
+                  <a:cubicBezTo>
+                    <a:pt x="699770" y="1231900"/>
+                    <a:pt x="1365250" y="1145540"/>
+                    <a:pt x="1781810" y="1170940"/>
+                  </a:cubicBezTo>
+                  <a:cubicBezTo>
+                    <a:pt x="2198370" y="1196340"/>
+                    <a:pt x="2697480" y="1419860"/>
+                    <a:pt x="2909570" y="1300480"/>
+                  </a:cubicBezTo>
+                  <a:cubicBezTo>
+                    <a:pt x="3121660" y="1181100"/>
+                    <a:pt x="3083560" y="665480"/>
+                    <a:pt x="3054350" y="454660"/>
+                  </a:cubicBezTo>
+                  <a:cubicBezTo>
+                    <a:pt x="3025140" y="243840"/>
+                    <a:pt x="2967990" y="71120"/>
+                    <a:pt x="2734310" y="35560"/>
+                  </a:cubicBezTo>
+                  <a:cubicBezTo>
+                    <a:pt x="2500630" y="0"/>
+                    <a:pt x="1905000" y="240030"/>
+                    <a:pt x="1652270" y="241300"/>
+                  </a:cubicBezTo>
+                  <a:cubicBezTo>
+                    <a:pt x="1399540" y="242570"/>
+                    <a:pt x="1393190" y="67310"/>
+                    <a:pt x="1217930" y="43180"/>
+                  </a:cubicBezTo>
+                  <a:cubicBezTo>
+                    <a:pt x="1042670" y="19050"/>
+                    <a:pt x="795020" y="46990"/>
+                    <a:pt x="615950" y="88900"/>
+                  </a:cubicBezTo>
+                  <a:close/>
+                </a:path>
+              </a:pathLst>
+            </a:custGeom>
+            <a:ln>
+              <a:prstDash val="sysDash"/>
+            </a:ln>
+          </p:spPr>
+          <p:style>
+            <a:lnRef idx="2">
+              <a:schemeClr val="dk1"/>
+            </a:lnRef>
+            <a:fillRef idx="1">
+              <a:schemeClr val="lt1"/>
+            </a:fillRef>
+            <a:effectRef idx="0">
+              <a:schemeClr val="dk1"/>
+            </a:effectRef>
+            <a:fontRef idx="minor">
+              <a:schemeClr val="dk1"/>
+            </a:fontRef>
+          </p:style>
+          <p:txBody>
+            <a:bodyPr rtlCol="0" anchor="ctr"/>
+            <a:lstStyle/>
+            <a:p>
+              <a:pPr algn="ctr"/>
+              <a:r>
+                <a:rPr lang="fr-BE" smtClean="0"/>
+                <a:t>...</a:t>
+              </a:r>
+              <a:endParaRPr lang="fr-BE"/>
+            </a:p>
+          </p:txBody>
+        </p:sp>
+        <p:sp>
+          <p:nvSpPr>
+            <p:cNvPr id="58" name="Ellipse 57"/>
+            <p:cNvSpPr/>
+            <p:nvPr/>
+          </p:nvSpPr>
+          <p:spPr>
+            <a:xfrm>
+              <a:off x="1667011" y="5588967"/>
+              <a:ext cx="568436" cy="568436"/>
+            </a:xfrm>
+            <a:prstGeom prst="ellipse">
+              <a:avLst/>
+            </a:prstGeom>
+          </p:spPr>
+          <p:style>
+            <a:lnRef idx="2">
+              <a:schemeClr val="dk1"/>
+            </a:lnRef>
+            <a:fillRef idx="1">
+              <a:schemeClr val="lt1"/>
+            </a:fillRef>
+            <a:effectRef idx="0">
+              <a:schemeClr val="dk1"/>
+            </a:effectRef>
+            <a:fontRef idx="minor">
+              <a:schemeClr val="dk1"/>
+            </a:fontRef>
+          </p:style>
+          <p:txBody>
+            <a:bodyPr wrap="none" bIns="108000" rtlCol="0" anchor="ctr"/>
+            <a:lstStyle/>
+            <a:p>
+              <a:pPr algn="ctr"/>
+              <a:r>
+                <a:rPr lang="fr-BE" noProof="1" smtClean="0"/>
+                <a:t>q</a:t>
+              </a:r>
+              <a:r>
+                <a:rPr lang="fr-BE" baseline="-25000" noProof="1" smtClean="0"/>
+                <a:t>start</a:t>
+              </a:r>
+              <a:endParaRPr lang="fr-BE" baseline="-25000" noProof="1"/>
+            </a:p>
+          </p:txBody>
+        </p:sp>
+        <p:cxnSp>
+          <p:nvCxnSpPr>
+            <p:cNvPr id="60" name="Connecteur droit avec flèche 7"/>
+            <p:cNvCxnSpPr>
+              <a:endCxn id="58" idx="1"/>
+            </p:cNvCxnSpPr>
+            <p:nvPr/>
+          </p:nvCxnSpPr>
+          <p:spPr>
+            <a:xfrm>
+              <a:off x="1475656" y="5448901"/>
+              <a:ext cx="274601" cy="223311"/>
+            </a:xfrm>
+            <a:prstGeom prst="straightConnector1">
+              <a:avLst/>
+            </a:prstGeom>
+            <a:ln w="19050">
+              <a:tailEnd type="triangle" w="med" len="lg"/>
+            </a:ln>
+          </p:spPr>
+          <p:style>
+            <a:lnRef idx="1">
+              <a:schemeClr val="dk1"/>
+            </a:lnRef>
+            <a:fillRef idx="0">
+              <a:schemeClr val="dk1"/>
+            </a:fillRef>
+            <a:effectRef idx="0">
+              <a:schemeClr val="dk1"/>
+            </a:effectRef>
+            <a:fontRef idx="minor">
+              <a:schemeClr val="tx1"/>
+            </a:fontRef>
+          </p:style>
+        </p:cxnSp>
+        <p:sp>
+          <p:nvSpPr>
+            <p:cNvPr id="65" name="Ellipse 64"/>
+            <p:cNvSpPr/>
+            <p:nvPr/>
+          </p:nvSpPr>
+          <p:spPr>
+            <a:xfrm>
+              <a:off x="3131840" y="5693185"/>
+              <a:ext cx="360000" cy="360000"/>
+            </a:xfrm>
+            <a:prstGeom prst="ellipse">
+              <a:avLst/>
+            </a:prstGeom>
+          </p:spPr>
+          <p:style>
+            <a:lnRef idx="2">
+              <a:schemeClr val="dk1"/>
+            </a:lnRef>
+            <a:fillRef idx="1">
+              <a:schemeClr val="lt1"/>
+            </a:fillRef>
+            <a:effectRef idx="0">
+              <a:schemeClr val="dk1"/>
+            </a:effectRef>
+            <a:fontRef idx="minor">
+              <a:schemeClr val="dk1"/>
+            </a:fontRef>
+          </p:style>
+          <p:txBody>
+            <a:bodyPr wrap="none" bIns="108000" rtlCol="0" anchor="ctr"/>
+            <a:lstStyle/>
+            <a:p>
+              <a:pPr algn="ctr"/>
+              <a:r>
+                <a:rPr lang="fr-BE" noProof="1" smtClean="0"/>
+                <a:t>q</a:t>
+              </a:r>
+              <a:r>
+                <a:rPr lang="fr-BE" baseline="-25000" noProof="1" smtClean="0"/>
+                <a:t>0</a:t>
+              </a:r>
+              <a:endParaRPr lang="fr-BE" baseline="-25000" noProof="1"/>
+            </a:p>
+          </p:txBody>
+        </p:sp>
+        <p:cxnSp>
+          <p:nvCxnSpPr>
+            <p:cNvPr id="69" name="Connecteur droit avec flèche 7"/>
+            <p:cNvCxnSpPr>
+              <a:stCxn id="58" idx="6"/>
+              <a:endCxn id="65" idx="2"/>
+            </p:cNvCxnSpPr>
+            <p:nvPr/>
+          </p:nvCxnSpPr>
+          <p:spPr>
+            <a:xfrm>
+              <a:off x="2235447" y="5873185"/>
+              <a:ext cx="896393" cy="1588"/>
+            </a:xfrm>
+            <a:prstGeom prst="straightConnector1">
+              <a:avLst/>
+            </a:prstGeom>
+            <a:ln w="19050">
+              <a:tailEnd type="triangle" w="med" len="lg"/>
+            </a:ln>
+          </p:spPr>
+          <p:style>
+            <a:lnRef idx="1">
+              <a:schemeClr val="dk1"/>
+            </a:lnRef>
+            <a:fillRef idx="0">
+              <a:schemeClr val="dk1"/>
+            </a:fillRef>
+            <a:effectRef idx="0">
+              <a:schemeClr val="dk1"/>
+            </a:effectRef>
+            <a:fontRef idx="minor">
+              <a:schemeClr val="tx1"/>
+            </a:fontRef>
+          </p:style>
+        </p:cxnSp>
+        <p:sp>
+          <p:nvSpPr>
+            <p:cNvPr id="63" name="ZoneTexte 62"/>
+            <p:cNvSpPr txBox="1"/>
+            <p:nvPr/>
+          </p:nvSpPr>
+          <p:spPr>
+            <a:xfrm>
+              <a:off x="2341371" y="5736411"/>
+              <a:ext cx="448841" cy="276999"/>
+            </a:xfrm>
+            <a:prstGeom prst="rect">
+              <a:avLst/>
+            </a:prstGeom>
+            <a:solidFill>
+              <a:schemeClr val="lt1"/>
+            </a:solidFill>
+          </p:spPr>
+          <p:txBody>
+            <a:bodyPr wrap="none" lIns="0" tIns="0" rIns="0" bIns="0" rtlCol="0">
+              <a:spAutoFit/>
+            </a:bodyPr>
+            <a:lstStyle/>
+            <a:p>
+              <a:r>
+                <a:rPr lang="fr-BE" noProof="1" smtClean="0"/>
+                <a:t>[ </a:t>
+              </a:r>
+              <a:r>
+                <a:rPr lang="fr-BE" noProof="1" smtClean="0"/>
+                <a:t>C</a:t>
+              </a:r>
+              <a:r>
+                <a:rPr lang="fr-BE" baseline="-25000" noProof="1" smtClean="0"/>
+                <a:t>0</a:t>
+              </a:r>
+              <a:r>
+                <a:rPr lang="fr-BE" noProof="1" smtClean="0"/>
+                <a:t> </a:t>
+              </a:r>
+              <a:r>
+                <a:rPr lang="fr-BE" noProof="1" smtClean="0"/>
+                <a:t>]</a:t>
+              </a:r>
+              <a:endParaRPr lang="fr-BE" noProof="1"/>
+            </a:p>
+          </p:txBody>
+        </p:sp>
+        <p:cxnSp>
+          <p:nvCxnSpPr>
+            <p:cNvPr id="76" name="Connecteur droit avec flèche 7"/>
+            <p:cNvCxnSpPr/>
+            <p:nvPr/>
+          </p:nvCxnSpPr>
+          <p:spPr>
+            <a:xfrm>
+              <a:off x="3491882" y="5805266"/>
+              <a:ext cx="720078" cy="144014"/>
+            </a:xfrm>
+            <a:prstGeom prst="curvedConnector3">
+              <a:avLst>
+                <a:gd name="adj1" fmla="val 50000"/>
+              </a:avLst>
+            </a:prstGeom>
+            <a:ln w="19050">
+              <a:tailEnd type="triangle" w="med" len="lg"/>
+            </a:ln>
+          </p:spPr>
+          <p:style>
+            <a:lnRef idx="1">
+              <a:schemeClr val="dk1"/>
+            </a:lnRef>
+            <a:fillRef idx="0">
+              <a:schemeClr val="dk1"/>
+            </a:fillRef>
+            <a:effectRef idx="0">
+              <a:schemeClr val="dk1"/>
+            </a:effectRef>
+            <a:fontRef idx="minor">
+              <a:schemeClr val="tx1"/>
+            </a:fontRef>
+          </p:style>
+        </p:cxnSp>
+        <p:sp>
+          <p:nvSpPr>
+            <p:cNvPr id="84" name="ZoneTexte 83"/>
+            <p:cNvSpPr txBox="1"/>
+            <p:nvPr/>
+          </p:nvSpPr>
+          <p:spPr>
+            <a:xfrm>
+              <a:off x="5394568" y="5983188"/>
+              <a:ext cx="410690" cy="523220"/>
+            </a:xfrm>
+            <a:prstGeom prst="rect">
+              <a:avLst/>
+            </a:prstGeom>
+            <a:noFill/>
+          </p:spPr>
+          <p:txBody>
+            <a:bodyPr wrap="none" rtlCol="0">
+              <a:spAutoFit/>
+            </a:bodyPr>
+            <a:lstStyle/>
+            <a:p>
+              <a:r>
+                <a:rPr lang="fr-BE" sz="2800" smtClean="0"/>
+                <a:t>G</a:t>
+              </a:r>
+              <a:endParaRPr lang="fr-BE" sz="2800"/>
             </a:p>
           </p:txBody>
         </p:sp>

</xml_diff>

<commit_message>
Fixed overview image in Chapter 4
</commit_message>
<xml_diff>
--- a/writing/images/train.pptx
+++ b/writing/images/train.pptx
@@ -214,7 +214,7 @@
             <a:fld id="{1A5CA47D-05BA-47C5-ACE1-040A60204EDF}" type="datetimeFigureOut">
               <a:rPr lang="fr-FR" smtClean="0"/>
               <a:pPr/>
-              <a:t>06/09/2011</a:t>
+              <a:t>08/09/2011</a:t>
             </a:fld>
             <a:endParaRPr lang="fr-BE"/>
           </a:p>
@@ -744,7 +744,7 @@
             <a:fld id="{68BDF4EC-5B70-45D8-B718-E56EB4C6B13E}" type="datetimeFigureOut">
               <a:rPr lang="fr-BE" smtClean="0"/>
               <a:pPr/>
-              <a:t>6/09/2011</a:t>
+              <a:t>8/09/2011</a:t>
             </a:fld>
             <a:endParaRPr lang="fr-BE"/>
           </a:p>
@@ -911,7 +911,7 @@
             <a:fld id="{68BDF4EC-5B70-45D8-B718-E56EB4C6B13E}" type="datetimeFigureOut">
               <a:rPr lang="fr-BE" smtClean="0"/>
               <a:pPr/>
-              <a:t>6/09/2011</a:t>
+              <a:t>8/09/2011</a:t>
             </a:fld>
             <a:endParaRPr lang="fr-BE"/>
           </a:p>
@@ -1088,7 +1088,7 @@
             <a:fld id="{68BDF4EC-5B70-45D8-B718-E56EB4C6B13E}" type="datetimeFigureOut">
               <a:rPr lang="fr-BE" smtClean="0"/>
               <a:pPr/>
-              <a:t>6/09/2011</a:t>
+              <a:t>8/09/2011</a:t>
             </a:fld>
             <a:endParaRPr lang="fr-BE"/>
           </a:p>
@@ -1255,7 +1255,7 @@
             <a:fld id="{68BDF4EC-5B70-45D8-B718-E56EB4C6B13E}" type="datetimeFigureOut">
               <a:rPr lang="fr-BE" smtClean="0"/>
               <a:pPr/>
-              <a:t>6/09/2011</a:t>
+              <a:t>8/09/2011</a:t>
             </a:fld>
             <a:endParaRPr lang="fr-BE"/>
           </a:p>
@@ -1498,7 +1498,7 @@
             <a:fld id="{68BDF4EC-5B70-45D8-B718-E56EB4C6B13E}" type="datetimeFigureOut">
               <a:rPr lang="fr-BE" smtClean="0"/>
               <a:pPr/>
-              <a:t>6/09/2011</a:t>
+              <a:t>8/09/2011</a:t>
             </a:fld>
             <a:endParaRPr lang="fr-BE"/>
           </a:p>
@@ -1783,7 +1783,7 @@
             <a:fld id="{68BDF4EC-5B70-45D8-B718-E56EB4C6B13E}" type="datetimeFigureOut">
               <a:rPr lang="fr-BE" smtClean="0"/>
               <a:pPr/>
-              <a:t>6/09/2011</a:t>
+              <a:t>8/09/2011</a:t>
             </a:fld>
             <a:endParaRPr lang="fr-BE"/>
           </a:p>
@@ -2202,7 +2202,7 @@
             <a:fld id="{68BDF4EC-5B70-45D8-B718-E56EB4C6B13E}" type="datetimeFigureOut">
               <a:rPr lang="fr-BE" smtClean="0"/>
               <a:pPr/>
-              <a:t>6/09/2011</a:t>
+              <a:t>8/09/2011</a:t>
             </a:fld>
             <a:endParaRPr lang="fr-BE"/>
           </a:p>
@@ -2317,7 +2317,7 @@
             <a:fld id="{68BDF4EC-5B70-45D8-B718-E56EB4C6B13E}" type="datetimeFigureOut">
               <a:rPr lang="fr-BE" smtClean="0"/>
               <a:pPr/>
-              <a:t>6/09/2011</a:t>
+              <a:t>8/09/2011</a:t>
             </a:fld>
             <a:endParaRPr lang="fr-BE"/>
           </a:p>
@@ -2409,7 +2409,7 @@
             <a:fld id="{68BDF4EC-5B70-45D8-B718-E56EB4C6B13E}" type="datetimeFigureOut">
               <a:rPr lang="fr-BE" smtClean="0"/>
               <a:pPr/>
-              <a:t>6/09/2011</a:t>
+              <a:t>8/09/2011</a:t>
             </a:fld>
             <a:endParaRPr lang="fr-BE"/>
           </a:p>
@@ -2683,7 +2683,7 @@
             <a:fld id="{68BDF4EC-5B70-45D8-B718-E56EB4C6B13E}" type="datetimeFigureOut">
               <a:rPr lang="fr-BE" smtClean="0"/>
               <a:pPr/>
-              <a:t>6/09/2011</a:t>
+              <a:t>8/09/2011</a:t>
             </a:fld>
             <a:endParaRPr lang="fr-BE"/>
           </a:p>
@@ -2933,7 +2933,7 @@
             <a:fld id="{68BDF4EC-5B70-45D8-B718-E56EB4C6B13E}" type="datetimeFigureOut">
               <a:rPr lang="fr-BE" smtClean="0"/>
               <a:pPr/>
-              <a:t>6/09/2011</a:t>
+              <a:t>8/09/2011</a:t>
             </a:fld>
             <a:endParaRPr lang="fr-BE"/>
           </a:p>
@@ -3143,7 +3143,7 @@
             <a:fld id="{68BDF4EC-5B70-45D8-B718-E56EB4C6B13E}" type="datetimeFigureOut">
               <a:rPr lang="fr-BE" smtClean="0"/>
               <a:pPr/>
-              <a:t>6/09/2011</a:t>
+              <a:t>8/09/2011</a:t>
             </a:fld>
             <a:endParaRPr lang="fr-BE"/>
           </a:p>
@@ -7251,11 +7251,7 @@
             <a:p>
               <a:r>
                 <a:rPr lang="fr-BE" noProof="1" smtClean="0"/>
-                <a:t>[ </a:t>
-              </a:r>
-              <a:r>
-                <a:rPr lang="fr-BE" noProof="1" smtClean="0"/>
-                <a:t>C</a:t>
+                <a:t>[ C</a:t>
               </a:r>
               <a:r>
                 <a:rPr lang="fr-BE" baseline="-25000" noProof="1" smtClean="0"/>
@@ -7269,13 +7265,7 @@
                 <a:rPr lang="fr-BE" noProof="1" smtClean="0">
                   <a:sym typeface="Symbol"/>
                 </a:rPr>
-                <a:t> </a:t>
-              </a:r>
-              <a:r>
-                <a:rPr lang="fr-BE" noProof="1" smtClean="0">
-                  <a:sym typeface="Symbol"/>
-                </a:rPr>
-                <a:t>Fl</a:t>
+                <a:t> Fl</a:t>
               </a:r>
               <a:r>
                 <a:rPr lang="fr-BE" baseline="-25000" noProof="1" smtClean="0">
@@ -7287,13 +7277,7 @@
                 <a:rPr lang="fr-BE" noProof="1" smtClean="0">
                   <a:sym typeface="Symbol"/>
                 </a:rPr>
-                <a:t>  </a:t>
-              </a:r>
-              <a:r>
-                <a:rPr lang="fr-BE" noProof="1" smtClean="0">
-                  <a:sym typeface="Symbol"/>
-                </a:rPr>
-                <a:t>Fl</a:t>
+                <a:t>  Fl</a:t>
               </a:r>
               <a:r>
                 <a:rPr lang="fr-BE" baseline="-25000" noProof="1" smtClean="0">
@@ -7305,19 +7289,7 @@
                 <a:rPr lang="fr-BE" noProof="1" smtClean="0">
                   <a:sym typeface="Symbol"/>
                 </a:rPr>
-                <a:t> </a:t>
-              </a:r>
-              <a:r>
-                <a:rPr lang="fr-BE" noProof="1" smtClean="0">
-                  <a:sym typeface="Symbol"/>
-                </a:rPr>
-                <a:t> </a:t>
-              </a:r>
-              <a:r>
-                <a:rPr lang="fr-BE" noProof="1" smtClean="0">
-                  <a:sym typeface="Symbol"/>
-                </a:rPr>
-                <a:t>...</a:t>
+                <a:t>  ...</a:t>
               </a:r>
               <a:r>
                 <a:rPr lang="fr-BE" noProof="1" smtClean="0"/>
@@ -7484,11 +7456,7 @@
             <a:p>
               <a:r>
                 <a:rPr lang="fr-BE" noProof="1" smtClean="0"/>
-                <a:t>[ </a:t>
-              </a:r>
-              <a:r>
-                <a:rPr lang="fr-BE" noProof="1" smtClean="0"/>
-                <a:t>C</a:t>
+                <a:t>[ C</a:t>
               </a:r>
               <a:r>
                 <a:rPr lang="fr-BE" baseline="-25000" noProof="1" smtClean="0"/>
@@ -7502,13 +7470,7 @@
                 <a:rPr lang="fr-BE" noProof="1" smtClean="0">
                   <a:sym typeface="Symbol"/>
                 </a:rPr>
-                <a:t> </a:t>
-              </a:r>
-              <a:r>
-                <a:rPr lang="fr-BE" noProof="1" smtClean="0">
-                  <a:sym typeface="Symbol"/>
-                </a:rPr>
-                <a:t>Fl</a:t>
+                <a:t> Fl</a:t>
               </a:r>
               <a:r>
                 <a:rPr lang="fr-BE" baseline="-25000" noProof="1" smtClean="0">
@@ -7520,19 +7482,7 @@
                 <a:rPr lang="fr-BE" noProof="1" smtClean="0">
                   <a:sym typeface="Symbol"/>
                 </a:rPr>
-                <a:t> </a:t>
-              </a:r>
-              <a:r>
-                <a:rPr lang="fr-BE" noProof="1" smtClean="0">
-                  <a:sym typeface="Symbol"/>
-                </a:rPr>
-                <a:t> </a:t>
-              </a:r>
-              <a:r>
-                <a:rPr lang="fr-BE" noProof="1" smtClean="0">
-                  <a:sym typeface="Symbol"/>
-                </a:rPr>
-                <a:t>Fl</a:t>
+                <a:t>  Fl</a:t>
               </a:r>
               <a:r>
                 <a:rPr lang="fr-BE" baseline="-25000" noProof="1" smtClean="0">
@@ -7544,19 +7494,7 @@
                 <a:rPr lang="fr-BE" noProof="1" smtClean="0">
                   <a:sym typeface="Symbol"/>
                 </a:rPr>
-                <a:t> </a:t>
-              </a:r>
-              <a:r>
-                <a:rPr lang="fr-BE" noProof="1" smtClean="0">
-                  <a:sym typeface="Symbol"/>
-                </a:rPr>
-                <a:t> </a:t>
-              </a:r>
-              <a:r>
-                <a:rPr lang="fr-BE" noProof="1" smtClean="0">
-                  <a:sym typeface="Symbol"/>
-                </a:rPr>
-                <a:t>...</a:t>
+                <a:t>  ...</a:t>
               </a:r>
               <a:r>
                 <a:rPr lang="fr-BE" noProof="1" smtClean="0"/>
@@ -8601,11 +8539,7 @@
                 <a:p>
                   <a:r>
                     <a:rPr lang="fr-BE" noProof="1" smtClean="0"/>
-                    <a:t>[ </a:t>
-                  </a:r>
-                  <a:r>
-                    <a:rPr lang="fr-BE" noProof="1" smtClean="0"/>
-                    <a:t>Fl</a:t>
+                    <a:t>[ Fl</a:t>
                   </a:r>
                   <a:r>
                     <a:rPr lang="fr-BE" baseline="-25000" noProof="1" smtClean="0"/>
@@ -9196,11 +9130,7 @@
                 <a:p>
                   <a:r>
                     <a:rPr lang="fr-BE" noProof="1" smtClean="0"/>
-                    <a:t>[ </a:t>
-                  </a:r>
-                  <a:r>
-                    <a:rPr lang="fr-BE" noProof="1" smtClean="0"/>
-                    <a:t>Fl</a:t>
+                    <a:t>[ Fl</a:t>
                   </a:r>
                   <a:r>
                     <a:rPr lang="fr-BE" baseline="-25000" noProof="1" smtClean="0"/>
@@ -9336,11 +9266,7 @@
                 </a:r>
                 <a:r>
                   <a:rPr lang="fr-BE" baseline="-25000" noProof="1" smtClean="0"/>
-                  <a:t>t</a:t>
-                </a:r>
-                <a:r>
-                  <a:rPr lang="fr-BE" baseline="-25000" noProof="1" smtClean="0"/>
-                  <a:t>1</a:t>
+                  <a:t>t1</a:t>
                 </a:r>
                 <a:r>
                   <a:rPr lang="fr-BE" noProof="1" smtClean="0"/>
@@ -9424,11 +9350,7 @@
             <a:p>
               <a:r>
                 <a:rPr lang="fr-BE" noProof="1" smtClean="0"/>
-                <a:t>[ </a:t>
-              </a:r>
-              <a:r>
-                <a:rPr lang="fr-BE" noProof="1" smtClean="0"/>
-                <a:t>C</a:t>
+                <a:t>[ C</a:t>
               </a:r>
               <a:r>
                 <a:rPr lang="fr-BE" baseline="-25000" noProof="1" smtClean="0"/>
@@ -9442,13 +9364,7 @@
                 <a:rPr lang="fr-BE" noProof="1" smtClean="0">
                   <a:sym typeface="Symbol"/>
                 </a:rPr>
-                <a:t> </a:t>
-              </a:r>
-              <a:r>
-                <a:rPr lang="fr-BE" noProof="1" smtClean="0">
-                  <a:sym typeface="Symbol"/>
-                </a:rPr>
-                <a:t>Fl</a:t>
+                <a:t> Fl</a:t>
               </a:r>
               <a:r>
                 <a:rPr lang="fr-BE" baseline="-25000" noProof="1" smtClean="0">
@@ -9460,19 +9376,7 @@
                 <a:rPr lang="fr-BE" noProof="1" smtClean="0">
                   <a:sym typeface="Symbol"/>
                 </a:rPr>
-                <a:t> </a:t>
-              </a:r>
-              <a:r>
-                <a:rPr lang="fr-BE" noProof="1" smtClean="0">
-                  <a:sym typeface="Symbol"/>
-                </a:rPr>
-                <a:t> </a:t>
-              </a:r>
-              <a:r>
-                <a:rPr lang="fr-BE" noProof="1" smtClean="0">
-                  <a:sym typeface="Symbol"/>
-                </a:rPr>
-                <a:t>Fl</a:t>
+                <a:t>  Fl</a:t>
               </a:r>
               <a:r>
                 <a:rPr lang="fr-BE" baseline="-25000" noProof="1" smtClean="0">
@@ -9484,19 +9388,7 @@
                 <a:rPr lang="fr-BE" noProof="1" smtClean="0">
                   <a:sym typeface="Symbol"/>
                 </a:rPr>
-                <a:t> </a:t>
-              </a:r>
-              <a:r>
-                <a:rPr lang="fr-BE" noProof="1" smtClean="0">
-                  <a:sym typeface="Symbol"/>
-                </a:rPr>
-                <a:t> </a:t>
-              </a:r>
-              <a:r>
-                <a:rPr lang="fr-BE" noProof="1" smtClean="0">
-                  <a:sym typeface="Symbol"/>
-                </a:rPr>
-                <a:t>...</a:t>
+                <a:t>  ...</a:t>
               </a:r>
               <a:r>
                 <a:rPr lang="fr-BE" noProof="1" smtClean="0"/>
@@ -33455,16 +33347,16 @@
       </p:grpSp>
       <p:grpSp>
         <p:nvGrpSpPr>
-          <p:cNvPr id="90" name="Groupe 89"/>
+          <p:cNvPr id="66" name="Groupe 65"/>
           <p:cNvGrpSpPr/>
           <p:nvPr/>
         </p:nvGrpSpPr>
         <p:grpSpPr>
           <a:xfrm>
-            <a:off x="323528" y="4929784"/>
-            <a:ext cx="4824536" cy="1019496"/>
-            <a:chOff x="899592" y="4869805"/>
-            <a:chExt cx="4824536" cy="1019496"/>
+            <a:off x="323528" y="5372904"/>
+            <a:ext cx="4800204" cy="1018699"/>
+            <a:chOff x="323528" y="5372904"/>
+            <a:chExt cx="4800204" cy="1018699"/>
           </a:xfrm>
         </p:grpSpPr>
         <p:pic>
@@ -33484,7 +33376,7 @@
           </p:blipFill>
           <p:spPr bwMode="auto">
             <a:xfrm>
-              <a:off x="899592" y="4870204"/>
+              <a:off x="323528" y="5372904"/>
               <a:ext cx="3389090" cy="1018699"/>
             </a:xfrm>
             <a:prstGeom prst="rect">
@@ -33493,73 +33385,6 @@
             <a:noFill/>
           </p:spPr>
         </p:pic>
-        <p:grpSp>
-          <p:nvGrpSpPr>
-            <p:cNvPr id="89" name="Groupe 88"/>
-            <p:cNvGrpSpPr/>
-            <p:nvPr/>
-          </p:nvGrpSpPr>
-          <p:grpSpPr>
-            <a:xfrm>
-              <a:off x="4683522" y="4869805"/>
-              <a:ext cx="1040606" cy="1019496"/>
-              <a:chOff x="4683522" y="4870450"/>
-              <a:chExt cx="1040606" cy="1019496"/>
-            </a:xfrm>
-          </p:grpSpPr>
-          <p:pic>
-            <p:nvPicPr>
-              <p:cNvPr id="2058" name="Picture 10" descr="C:\Users\blambeau\Documents\thesis\writing\src\2-framework\images\open-close.png"/>
-              <p:cNvPicPr>
-                <a:picLocks noChangeAspect="1" noChangeArrowheads="1"/>
-              </p:cNvPicPr>
-              <p:nvPr/>
-            </p:nvPicPr>
-            <p:blipFill>
-              <a:blip r:embed="rId3" cstate="print"/>
-              <a:srcRect/>
-              <a:stretch>
-                <a:fillRect/>
-              </a:stretch>
-            </p:blipFill>
-            <p:spPr bwMode="auto">
-              <a:xfrm>
-                <a:off x="4683522" y="4870450"/>
-                <a:ext cx="1040606" cy="455676"/>
-              </a:xfrm>
-              <a:prstGeom prst="rect">
-                <a:avLst/>
-              </a:prstGeom>
-              <a:noFill/>
-            </p:spPr>
-          </p:pic>
-          <p:pic>
-            <p:nvPicPr>
-              <p:cNvPr id="2059" name="Picture 11" descr="C:\Users\blambeau\Documents\thesis\writing\src\2-framework\images\start-stop-2.png"/>
-              <p:cNvPicPr>
-                <a:picLocks noChangeAspect="1" noChangeArrowheads="1"/>
-              </p:cNvPicPr>
-              <p:nvPr/>
-            </p:nvPicPr>
-            <p:blipFill>
-              <a:blip r:embed="rId4" cstate="print"/>
-              <a:srcRect/>
-              <a:stretch>
-                <a:fillRect/>
-              </a:stretch>
-            </p:blipFill>
-            <p:spPr bwMode="auto">
-              <a:xfrm>
-                <a:off x="4719241" y="5445224"/>
-                <a:ext cx="974884" cy="444722"/>
-              </a:xfrm>
-              <a:prstGeom prst="rect">
-                <a:avLst/>
-              </a:prstGeom>
-              <a:noFill/>
-            </p:spPr>
-          </p:pic>
-        </p:grpSp>
         <p:sp>
           <p:nvSpPr>
             <p:cNvPr id="88" name="ZoneTexte 87"/>
@@ -33568,7 +33393,7 @@
           </p:nvSpPr>
           <p:spPr>
             <a:xfrm>
-              <a:off x="4355976" y="5117943"/>
+              <a:off x="3779912" y="5620643"/>
               <a:ext cx="386644" cy="523220"/>
             </a:xfrm>
             <a:prstGeom prst="rect">
@@ -33596,6 +33421,73 @@
             </a:p>
           </p:txBody>
         </p:sp>
+        <p:grpSp>
+          <p:nvGrpSpPr>
+            <p:cNvPr id="64" name="Groupe 63"/>
+            <p:cNvGrpSpPr/>
+            <p:nvPr/>
+          </p:nvGrpSpPr>
+          <p:grpSpPr>
+            <a:xfrm>
+              <a:off x="4148132" y="5397589"/>
+              <a:ext cx="975600" cy="969328"/>
+              <a:chOff x="4140512" y="5504558"/>
+              <a:chExt cx="975600" cy="969328"/>
+            </a:xfrm>
+          </p:grpSpPr>
+          <p:pic>
+            <p:nvPicPr>
+              <p:cNvPr id="2059" name="Picture 11" descr="C:\Users\blambeau\Documents\thesis\writing\src\2-framework\images\start-stop-2.png"/>
+              <p:cNvPicPr>
+                <a:picLocks noChangeAspect="1" noChangeArrowheads="1"/>
+              </p:cNvPicPr>
+              <p:nvPr/>
+            </p:nvPicPr>
+            <p:blipFill>
+              <a:blip r:embed="rId3" cstate="print"/>
+              <a:srcRect/>
+              <a:stretch>
+                <a:fillRect/>
+              </a:stretch>
+            </p:blipFill>
+            <p:spPr bwMode="auto">
+              <a:xfrm>
+                <a:off x="4140870" y="5504558"/>
+                <a:ext cx="974884" cy="444722"/>
+              </a:xfrm>
+              <a:prstGeom prst="rect">
+                <a:avLst/>
+              </a:prstGeom>
+              <a:noFill/>
+            </p:spPr>
+          </p:pic>
+          <p:pic>
+            <p:nvPicPr>
+              <p:cNvPr id="1026" name="Picture 2" descr="D:\blambeau\thesis\writing\src\2-framework\images\alarm-prop.png"/>
+              <p:cNvPicPr>
+                <a:picLocks noChangeAspect="1" noChangeArrowheads="1"/>
+              </p:cNvPicPr>
+              <p:nvPr/>
+            </p:nvPicPr>
+            <p:blipFill>
+              <a:blip r:embed="rId4" cstate="print"/>
+              <a:srcRect/>
+              <a:stretch>
+                <a:fillRect/>
+              </a:stretch>
+            </p:blipFill>
+            <p:spPr bwMode="auto">
+              <a:xfrm>
+                <a:off x="4140512" y="6021288"/>
+                <a:ext cx="975600" cy="452598"/>
+              </a:xfrm>
+              <a:prstGeom prst="rect">
+                <a:avLst/>
+              </a:prstGeom>
+              <a:noFill/>
+            </p:spPr>
+          </p:pic>
+        </p:grpSp>
       </p:grpSp>
     </p:spTree>
   </p:cSld>
@@ -34478,7 +34370,7 @@
       </p:grpSpPr>
       <p:grpSp>
         <p:nvGrpSpPr>
-          <p:cNvPr id="30" name="Groupe 29"/>
+          <p:cNvPr id="21" name="Groupe 20"/>
           <p:cNvGrpSpPr/>
           <p:nvPr/>
         </p:nvGrpSpPr>
@@ -34566,7 +34458,7 @@
           </p:nvSpPr>
           <p:spPr>
             <a:xfrm>
-              <a:off x="987901" y="3544311"/>
+              <a:off x="987901" y="3400295"/>
               <a:ext cx="1540165" cy="461665"/>
             </a:xfrm>
             <a:prstGeom prst="rect">
@@ -34595,7 +34487,7 @@
           </p:nvSpPr>
           <p:spPr>
             <a:xfrm>
-              <a:off x="987901" y="5752793"/>
+              <a:off x="987901" y="5847655"/>
               <a:ext cx="1503105" cy="461665"/>
             </a:xfrm>
             <a:prstGeom prst="rect">
@@ -34621,303 +34513,392 @@
             </a:p>
           </p:txBody>
         </p:sp>
-        <p:sp>
-          <p:nvSpPr>
-            <p:cNvPr id="25" name="ZoneTexte 24"/>
-            <p:cNvSpPr txBox="1"/>
-            <p:nvPr/>
-          </p:nvSpPr>
-          <p:spPr>
-            <a:xfrm>
-              <a:off x="4387326" y="2190439"/>
-              <a:ext cx="2776962" cy="707886"/>
-            </a:xfrm>
-            <a:prstGeom prst="rect">
-              <a:avLst/>
-            </a:prstGeom>
-            <a:noFill/>
-          </p:spPr>
-          <p:txBody>
-            <a:bodyPr wrap="square" rtlCol="0">
-              <a:spAutoFit/>
-            </a:bodyPr>
-            <a:lstStyle/>
-            <a:p>
-              <a:r>
-                <a:rPr lang="fr-BE" sz="2000" i="1" dirty="0" err="1" smtClean="0"/>
-                <a:t>Generalization</a:t>
-              </a:r>
-              <a:endParaRPr lang="fr-BE" sz="2000" i="1" dirty="0" smtClean="0"/>
-            </a:p>
-            <a:p>
-              <a:r>
-                <a:rPr lang="fr-BE" sz="2000" i="1" dirty="0" smtClean="0"/>
-                <a:t>(</a:t>
-              </a:r>
-              <a:r>
-                <a:rPr lang="fr-BE" sz="2000" i="1" dirty="0" err="1" smtClean="0"/>
-                <a:t>grammar</a:t>
-              </a:r>
-              <a:r>
-                <a:rPr lang="fr-BE" sz="2000" i="1" dirty="0" smtClean="0"/>
-                <a:t> induction)</a:t>
-              </a:r>
-              <a:endParaRPr lang="fr-BE" sz="2000" i="1" dirty="0"/>
-            </a:p>
-          </p:txBody>
-        </p:sp>
-        <p:sp>
-          <p:nvSpPr>
-            <p:cNvPr id="26" name="ZoneTexte 25"/>
-            <p:cNvSpPr txBox="1"/>
-            <p:nvPr/>
-          </p:nvSpPr>
-          <p:spPr>
-            <a:xfrm>
-              <a:off x="4387326" y="4487680"/>
-              <a:ext cx="3281018" cy="707886"/>
-            </a:xfrm>
-            <a:prstGeom prst="rect">
-              <a:avLst/>
-            </a:prstGeom>
-            <a:noFill/>
-          </p:spPr>
-          <p:txBody>
-            <a:bodyPr wrap="square" rtlCol="0">
-              <a:spAutoFit/>
-            </a:bodyPr>
-            <a:lstStyle/>
-            <a:p>
-              <a:r>
-                <a:rPr lang="fr-BE" sz="2000" i="1" dirty="0" err="1" smtClean="0"/>
-                <a:t>Decomposition</a:t>
-              </a:r>
-              <a:endParaRPr lang="fr-BE" sz="2000" i="1" dirty="0" smtClean="0"/>
-            </a:p>
-            <a:p>
-              <a:r>
-                <a:rPr lang="fr-BE" sz="2000" i="1" dirty="0" smtClean="0"/>
-                <a:t>(</a:t>
-              </a:r>
-              <a:r>
-                <a:rPr lang="fr-BE" sz="2000" i="1" dirty="0" err="1" smtClean="0"/>
-                <a:t>hiding</a:t>
-              </a:r>
-              <a:r>
-                <a:rPr lang="fr-BE" sz="2000" i="1" dirty="0" smtClean="0"/>
-                <a:t> + </a:t>
-              </a:r>
-              <a:r>
-                <a:rPr lang="fr-BE" sz="2000" i="1" dirty="0" err="1" smtClean="0"/>
-                <a:t>determ</a:t>
-              </a:r>
-              <a:r>
-                <a:rPr lang="fr-BE" sz="2000" i="1" dirty="0" smtClean="0"/>
-                <a:t>. + </a:t>
-              </a:r>
-              <a:r>
-                <a:rPr lang="fr-BE" sz="2000" i="1" dirty="0" err="1" smtClean="0"/>
-                <a:t>minimize</a:t>
-              </a:r>
-              <a:r>
-                <a:rPr lang="fr-BE" sz="2000" i="1" dirty="0" smtClean="0"/>
-                <a:t>)</a:t>
-              </a:r>
-              <a:endParaRPr lang="fr-BE" sz="2000" i="1" dirty="0"/>
-            </a:p>
-          </p:txBody>
-        </p:sp>
-        <p:sp>
-          <p:nvSpPr>
-            <p:cNvPr id="22" name="Forme libre 21"/>
-            <p:cNvSpPr/>
-            <p:nvPr/>
-          </p:nvSpPr>
-          <p:spPr>
-            <a:xfrm>
-              <a:off x="3958699" y="2132856"/>
-              <a:ext cx="142876" cy="857256"/>
-            </a:xfrm>
-            <a:custGeom>
-              <a:avLst/>
-              <a:gdLst>
-                <a:gd name="connsiteX0" fmla="*/ 13855 w 417945"/>
-                <a:gd name="connsiteY0" fmla="*/ 0 h 1731818"/>
-                <a:gd name="connsiteX1" fmla="*/ 415636 w 417945"/>
-                <a:gd name="connsiteY1" fmla="*/ 831272 h 1731818"/>
-                <a:gd name="connsiteX2" fmla="*/ 0 w 417945"/>
-                <a:gd name="connsiteY2" fmla="*/ 1731818 h 1731818"/>
-              </a:gdLst>
-              <a:ahLst/>
-              <a:cxnLst>
-                <a:cxn ang="0">
-                  <a:pos x="connsiteX0" y="connsiteY0"/>
-                </a:cxn>
-                <a:cxn ang="0">
-                  <a:pos x="connsiteX1" y="connsiteY1"/>
-                </a:cxn>
-                <a:cxn ang="0">
-                  <a:pos x="connsiteX2" y="connsiteY2"/>
-                </a:cxn>
-              </a:cxnLst>
-              <a:rect l="l" t="t" r="r" b="b"/>
-              <a:pathLst>
-                <a:path w="417945" h="1731818">
-                  <a:moveTo>
-                    <a:pt x="13855" y="0"/>
-                  </a:moveTo>
-                  <a:cubicBezTo>
-                    <a:pt x="215900" y="271318"/>
-                    <a:pt x="417945" y="542636"/>
-                    <a:pt x="415636" y="831272"/>
-                  </a:cubicBezTo>
-                  <a:cubicBezTo>
-                    <a:pt x="413327" y="1119908"/>
-                    <a:pt x="206663" y="1425863"/>
-                    <a:pt x="0" y="1731818"/>
-                  </a:cubicBezTo>
-                </a:path>
-              </a:pathLst>
-            </a:custGeom>
-            <a:ln w="38100">
-              <a:tailEnd type="triangle" w="med" len="lg"/>
-            </a:ln>
-          </p:spPr>
-          <p:style>
-            <a:lnRef idx="2">
-              <a:schemeClr val="dk1"/>
-            </a:lnRef>
-            <a:fillRef idx="0">
-              <a:schemeClr val="dk1"/>
-            </a:fillRef>
-            <a:effectRef idx="1">
-              <a:schemeClr val="dk1"/>
-            </a:effectRef>
-            <a:fontRef idx="minor">
-              <a:schemeClr val="tx1"/>
-            </a:fontRef>
-          </p:style>
-          <p:txBody>
-            <a:bodyPr rtlCol="0" anchor="ctr"/>
-            <a:lstStyle/>
-            <a:p>
-              <a:pPr algn="ctr"/>
-              <a:endParaRPr lang="fr-BE"/>
-            </a:p>
-          </p:txBody>
-        </p:sp>
-        <p:sp>
-          <p:nvSpPr>
-            <p:cNvPr id="34" name="Forme libre 33"/>
-            <p:cNvSpPr/>
-            <p:nvPr/>
-          </p:nvSpPr>
-          <p:spPr>
-            <a:xfrm>
-              <a:off x="3958698" y="4416242"/>
-              <a:ext cx="142876" cy="857256"/>
-            </a:xfrm>
-            <a:custGeom>
-              <a:avLst/>
-              <a:gdLst>
-                <a:gd name="connsiteX0" fmla="*/ 13855 w 417945"/>
-                <a:gd name="connsiteY0" fmla="*/ 0 h 1731818"/>
-                <a:gd name="connsiteX1" fmla="*/ 415636 w 417945"/>
-                <a:gd name="connsiteY1" fmla="*/ 831272 h 1731818"/>
-                <a:gd name="connsiteX2" fmla="*/ 0 w 417945"/>
-                <a:gd name="connsiteY2" fmla="*/ 1731818 h 1731818"/>
-              </a:gdLst>
-              <a:ahLst/>
-              <a:cxnLst>
-                <a:cxn ang="0">
-                  <a:pos x="connsiteX0" y="connsiteY0"/>
-                </a:cxn>
-                <a:cxn ang="0">
-                  <a:pos x="connsiteX1" y="connsiteY1"/>
-                </a:cxn>
-                <a:cxn ang="0">
-                  <a:pos x="connsiteX2" y="connsiteY2"/>
-                </a:cxn>
-              </a:cxnLst>
-              <a:rect l="l" t="t" r="r" b="b"/>
-              <a:pathLst>
-                <a:path w="417945" h="1731818">
-                  <a:moveTo>
-                    <a:pt x="13855" y="0"/>
-                  </a:moveTo>
-                  <a:cubicBezTo>
-                    <a:pt x="215900" y="271318"/>
-                    <a:pt x="417945" y="542636"/>
-                    <a:pt x="415636" y="831272"/>
-                  </a:cubicBezTo>
-                  <a:cubicBezTo>
-                    <a:pt x="413327" y="1119908"/>
-                    <a:pt x="206663" y="1425863"/>
-                    <a:pt x="0" y="1731818"/>
-                  </a:cubicBezTo>
-                </a:path>
-              </a:pathLst>
-            </a:custGeom>
-            <a:ln w="38100">
-              <a:tailEnd type="triangle" w="med" len="lg"/>
-            </a:ln>
-          </p:spPr>
-          <p:style>
-            <a:lnRef idx="2">
-              <a:schemeClr val="dk1"/>
-            </a:lnRef>
-            <a:fillRef idx="0">
-              <a:schemeClr val="dk1"/>
-            </a:fillRef>
-            <a:effectRef idx="1">
-              <a:schemeClr val="dk1"/>
-            </a:effectRef>
-            <a:fontRef idx="minor">
-              <a:schemeClr val="tx1"/>
-            </a:fontRef>
-          </p:style>
-          <p:txBody>
-            <a:bodyPr rtlCol="0" anchor="ctr"/>
-            <a:lstStyle/>
-            <a:p>
-              <a:pPr algn="ctr"/>
-              <a:endParaRPr lang="fr-BE"/>
-            </a:p>
-          </p:txBody>
-        </p:sp>
         <p:grpSp>
           <p:nvGrpSpPr>
-            <p:cNvPr id="29" name="Groupe 28"/>
+            <p:cNvPr id="20" name="Groupe 19"/>
             <p:cNvGrpSpPr/>
             <p:nvPr/>
           </p:nvGrpSpPr>
           <p:grpSpPr>
             <a:xfrm>
-              <a:off x="3263059" y="210774"/>
-              <a:ext cx="3851419" cy="1798282"/>
-              <a:chOff x="3203848" y="210774"/>
-              <a:chExt cx="3851419" cy="1798282"/>
+              <a:off x="2774449" y="210774"/>
+              <a:ext cx="5037911" cy="6264737"/>
+              <a:chOff x="3280680" y="210774"/>
+              <a:chExt cx="5037911" cy="6264737"/>
             </a:xfrm>
           </p:grpSpPr>
+          <p:sp>
+            <p:nvSpPr>
+              <p:cNvPr id="25" name="ZoneTexte 24"/>
+              <p:cNvSpPr txBox="1"/>
+              <p:nvPr/>
+            </p:nvSpPr>
+            <p:spPr>
+              <a:xfrm>
+                <a:off x="4897270" y="2084523"/>
+                <a:ext cx="2776962" cy="615553"/>
+              </a:xfrm>
+              <a:prstGeom prst="rect">
+                <a:avLst/>
+              </a:prstGeom>
+              <a:noFill/>
+            </p:spPr>
+            <p:txBody>
+              <a:bodyPr wrap="square" lIns="0" tIns="0" rIns="0" bIns="0" rtlCol="0">
+                <a:spAutoFit/>
+              </a:bodyPr>
+              <a:lstStyle/>
+              <a:p>
+                <a:r>
+                  <a:rPr lang="fr-BE" sz="2000" i="1" dirty="0" err="1" smtClean="0"/>
+                  <a:t>Generalization</a:t>
+                </a:r>
+                <a:endParaRPr lang="fr-BE" sz="2000" i="1" dirty="0" smtClean="0"/>
+              </a:p>
+              <a:p>
+                <a:r>
+                  <a:rPr lang="fr-BE" sz="2000" i="1" dirty="0" smtClean="0"/>
+                  <a:t>(</a:t>
+                </a:r>
+                <a:r>
+                  <a:rPr lang="fr-BE" sz="2000" i="1" dirty="0" err="1" smtClean="0"/>
+                  <a:t>grammar</a:t>
+                </a:r>
+                <a:r>
+                  <a:rPr lang="fr-BE" sz="2000" i="1" dirty="0" smtClean="0"/>
+                  <a:t> induction)</a:t>
+                </a:r>
+                <a:endParaRPr lang="fr-BE" sz="2000" i="1" dirty="0"/>
+              </a:p>
+            </p:txBody>
+          </p:sp>
+          <p:sp>
+            <p:nvSpPr>
+              <p:cNvPr id="26" name="ZoneTexte 25"/>
+              <p:cNvSpPr txBox="1"/>
+              <p:nvPr/>
+            </p:nvSpPr>
+            <p:spPr>
+              <a:xfrm>
+                <a:off x="4897270" y="4469631"/>
+                <a:ext cx="3421321" cy="553998"/>
+              </a:xfrm>
+              <a:prstGeom prst="rect">
+                <a:avLst/>
+              </a:prstGeom>
+              <a:noFill/>
+            </p:spPr>
+            <p:txBody>
+              <a:bodyPr wrap="none" lIns="0" tIns="0" rIns="0" bIns="0" rtlCol="0">
+                <a:spAutoFit/>
+              </a:bodyPr>
+              <a:lstStyle/>
+              <a:p>
+                <a:r>
+                  <a:rPr lang="fr-BE" sz="2000" i="1" dirty="0" err="1" smtClean="0"/>
+                  <a:t>Decomposition</a:t>
+                </a:r>
+                <a:endParaRPr lang="fr-BE" sz="2000" i="1" dirty="0" smtClean="0"/>
+              </a:p>
+              <a:p>
+                <a:r>
+                  <a:rPr lang="fr-BE" sz="1600" i="1" smtClean="0"/>
+                  <a:t>(</a:t>
+                </a:r>
+                <a:r>
+                  <a:rPr lang="fr-BE" sz="1600" i="1" smtClean="0"/>
+                  <a:t>hiding + determ</a:t>
+                </a:r>
+                <a:r>
+                  <a:rPr lang="fr-BE" sz="1600" i="1" smtClean="0"/>
+                  <a:t>inization</a:t>
+                </a:r>
+                <a:r>
+                  <a:rPr lang="fr-BE" sz="1600" i="1" smtClean="0"/>
+                  <a:t> </a:t>
+                </a:r>
+                <a:r>
+                  <a:rPr lang="fr-BE" sz="1600" i="1" smtClean="0"/>
+                  <a:t>+</a:t>
+                </a:r>
+                <a:r>
+                  <a:rPr lang="fr-BE" sz="1600" i="1" smtClean="0"/>
+                  <a:t> minimization)</a:t>
+                </a:r>
+                <a:endParaRPr lang="fr-BE" sz="1600" i="1" dirty="0"/>
+              </a:p>
+            </p:txBody>
+          </p:sp>
+          <p:sp>
+            <p:nvSpPr>
+              <p:cNvPr id="22" name="Forme libre 21"/>
+              <p:cNvSpPr/>
+              <p:nvPr/>
+            </p:nvSpPr>
+            <p:spPr>
+              <a:xfrm>
+                <a:off x="4572001" y="2026940"/>
+                <a:ext cx="142876" cy="857256"/>
+              </a:xfrm>
+              <a:custGeom>
+                <a:avLst/>
+                <a:gdLst>
+                  <a:gd name="connsiteX0" fmla="*/ 13855 w 417945"/>
+                  <a:gd name="connsiteY0" fmla="*/ 0 h 1731818"/>
+                  <a:gd name="connsiteX1" fmla="*/ 415636 w 417945"/>
+                  <a:gd name="connsiteY1" fmla="*/ 831272 h 1731818"/>
+                  <a:gd name="connsiteX2" fmla="*/ 0 w 417945"/>
+                  <a:gd name="connsiteY2" fmla="*/ 1731818 h 1731818"/>
+                </a:gdLst>
+                <a:ahLst/>
+                <a:cxnLst>
+                  <a:cxn ang="0">
+                    <a:pos x="connsiteX0" y="connsiteY0"/>
+                  </a:cxn>
+                  <a:cxn ang="0">
+                    <a:pos x="connsiteX1" y="connsiteY1"/>
+                  </a:cxn>
+                  <a:cxn ang="0">
+                    <a:pos x="connsiteX2" y="connsiteY2"/>
+                  </a:cxn>
+                </a:cxnLst>
+                <a:rect l="l" t="t" r="r" b="b"/>
+                <a:pathLst>
+                  <a:path w="417945" h="1731818">
+                    <a:moveTo>
+                      <a:pt x="13855" y="0"/>
+                    </a:moveTo>
+                    <a:cubicBezTo>
+                      <a:pt x="215900" y="271318"/>
+                      <a:pt x="417945" y="542636"/>
+                      <a:pt x="415636" y="831272"/>
+                    </a:cubicBezTo>
+                    <a:cubicBezTo>
+                      <a:pt x="413327" y="1119908"/>
+                      <a:pt x="206663" y="1425863"/>
+                      <a:pt x="0" y="1731818"/>
+                    </a:cubicBezTo>
+                  </a:path>
+                </a:pathLst>
+              </a:custGeom>
+              <a:ln w="38100">
+                <a:tailEnd type="triangle" w="med" len="lg"/>
+              </a:ln>
+            </p:spPr>
+            <p:style>
+              <a:lnRef idx="2">
+                <a:schemeClr val="dk1"/>
+              </a:lnRef>
+              <a:fillRef idx="0">
+                <a:schemeClr val="dk1"/>
+              </a:fillRef>
+              <a:effectRef idx="1">
+                <a:schemeClr val="dk1"/>
+              </a:effectRef>
+              <a:fontRef idx="minor">
+                <a:schemeClr val="tx1"/>
+              </a:fontRef>
+            </p:style>
+            <p:txBody>
+              <a:bodyPr rtlCol="0" anchor="ctr"/>
+              <a:lstStyle/>
+              <a:p>
+                <a:pPr algn="ctr"/>
+                <a:endParaRPr lang="fr-BE"/>
+              </a:p>
+            </p:txBody>
+          </p:sp>
+          <p:sp>
+            <p:nvSpPr>
+              <p:cNvPr id="34" name="Forme libre 33"/>
+              <p:cNvSpPr/>
+              <p:nvPr/>
+            </p:nvSpPr>
+            <p:spPr>
+              <a:xfrm>
+                <a:off x="4572000" y="4416242"/>
+                <a:ext cx="142876" cy="857256"/>
+              </a:xfrm>
+              <a:custGeom>
+                <a:avLst/>
+                <a:gdLst>
+                  <a:gd name="connsiteX0" fmla="*/ 13855 w 417945"/>
+                  <a:gd name="connsiteY0" fmla="*/ 0 h 1731818"/>
+                  <a:gd name="connsiteX1" fmla="*/ 415636 w 417945"/>
+                  <a:gd name="connsiteY1" fmla="*/ 831272 h 1731818"/>
+                  <a:gd name="connsiteX2" fmla="*/ 0 w 417945"/>
+                  <a:gd name="connsiteY2" fmla="*/ 1731818 h 1731818"/>
+                </a:gdLst>
+                <a:ahLst/>
+                <a:cxnLst>
+                  <a:cxn ang="0">
+                    <a:pos x="connsiteX0" y="connsiteY0"/>
+                  </a:cxn>
+                  <a:cxn ang="0">
+                    <a:pos x="connsiteX1" y="connsiteY1"/>
+                  </a:cxn>
+                  <a:cxn ang="0">
+                    <a:pos x="connsiteX2" y="connsiteY2"/>
+                  </a:cxn>
+                </a:cxnLst>
+                <a:rect l="l" t="t" r="r" b="b"/>
+                <a:pathLst>
+                  <a:path w="417945" h="1731818">
+                    <a:moveTo>
+                      <a:pt x="13855" y="0"/>
+                    </a:moveTo>
+                    <a:cubicBezTo>
+                      <a:pt x="215900" y="271318"/>
+                      <a:pt x="417945" y="542636"/>
+                      <a:pt x="415636" y="831272"/>
+                    </a:cubicBezTo>
+                    <a:cubicBezTo>
+                      <a:pt x="413327" y="1119908"/>
+                      <a:pt x="206663" y="1425863"/>
+                      <a:pt x="0" y="1731818"/>
+                    </a:cubicBezTo>
+                  </a:path>
+                </a:pathLst>
+              </a:custGeom>
+              <a:ln w="38100">
+                <a:tailEnd type="triangle" w="med" len="lg"/>
+              </a:ln>
+            </p:spPr>
+            <p:style>
+              <a:lnRef idx="2">
+                <a:schemeClr val="dk1"/>
+              </a:lnRef>
+              <a:fillRef idx="0">
+                <a:schemeClr val="dk1"/>
+              </a:fillRef>
+              <a:effectRef idx="1">
+                <a:schemeClr val="dk1"/>
+              </a:effectRef>
+              <a:fontRef idx="minor">
+                <a:schemeClr val="tx1"/>
+              </a:fontRef>
+            </p:style>
+            <p:txBody>
+              <a:bodyPr rtlCol="0" anchor="ctr"/>
+              <a:lstStyle/>
+              <a:p>
+                <a:pPr algn="ctr"/>
+                <a:endParaRPr lang="fr-BE"/>
+              </a:p>
+            </p:txBody>
+          </p:sp>
+          <p:grpSp>
+            <p:nvGrpSpPr>
+              <p:cNvPr id="29" name="Groupe 28"/>
+              <p:cNvGrpSpPr/>
+              <p:nvPr/>
+            </p:nvGrpSpPr>
+            <p:grpSpPr>
+              <a:xfrm>
+                <a:off x="3762415" y="210774"/>
+                <a:ext cx="3851419" cy="1798282"/>
+                <a:chOff x="3203848" y="210774"/>
+                <a:chExt cx="3851419" cy="1798282"/>
+              </a:xfrm>
+            </p:grpSpPr>
+            <p:pic>
+              <p:nvPicPr>
+                <p:cNvPr id="27" name="Picture 2" descr="C:\Users\blambeau\Documents\thesis\writing\src\2-framework\images\simple-scenario.png"/>
+                <p:cNvPicPr>
+                  <a:picLocks noChangeAspect="1" noChangeArrowheads="1"/>
+                </p:cNvPicPr>
+                <p:nvPr/>
+              </p:nvPicPr>
+              <p:blipFill>
+                <a:blip r:embed="rId2" cstate="print"/>
+                <a:srcRect b="79463"/>
+                <a:stretch>
+                  <a:fillRect/>
+                </a:stretch>
+              </p:blipFill>
+              <p:spPr bwMode="auto">
+                <a:xfrm>
+                  <a:off x="3311942" y="210774"/>
+                  <a:ext cx="3743325" cy="344280"/>
+                </a:xfrm>
+                <a:prstGeom prst="rect">
+                  <a:avLst/>
+                </a:prstGeom>
+                <a:noFill/>
+              </p:spPr>
+            </p:pic>
+            <p:pic>
+              <p:nvPicPr>
+                <p:cNvPr id="24" name="Picture 2" descr="C:\Users\blambeau\Documents\thesis\writing\src\2-framework\images\simple-scenario.png"/>
+                <p:cNvPicPr>
+                  <a:picLocks noChangeAspect="1" noChangeArrowheads="1"/>
+                </p:cNvPicPr>
+                <p:nvPr/>
+              </p:nvPicPr>
+              <p:blipFill>
+                <a:blip r:embed="rId2" cstate="print"/>
+                <a:srcRect b="79463"/>
+                <a:stretch>
+                  <a:fillRect/>
+                </a:stretch>
+              </p:blipFill>
+              <p:spPr bwMode="auto">
+                <a:xfrm>
+                  <a:off x="3261342" y="275272"/>
+                  <a:ext cx="3743325" cy="344280"/>
+                </a:xfrm>
+                <a:prstGeom prst="rect">
+                  <a:avLst/>
+                </a:prstGeom>
+                <a:noFill/>
+              </p:spPr>
+            </p:pic>
+            <p:pic>
+              <p:nvPicPr>
+                <p:cNvPr id="3074" name="Picture 2" descr="C:\Users\blambeau\Documents\thesis\writing\src\2-framework\images\simple-scenario.png"/>
+                <p:cNvPicPr>
+                  <a:picLocks noChangeAspect="1" noChangeArrowheads="1"/>
+                </p:cNvPicPr>
+                <p:nvPr/>
+              </p:nvPicPr>
+              <p:blipFill>
+                <a:blip r:embed="rId2" cstate="print"/>
+                <a:srcRect/>
+                <a:stretch>
+                  <a:fillRect/>
+                </a:stretch>
+              </p:blipFill>
+              <p:spPr bwMode="auto">
+                <a:xfrm>
+                  <a:off x="3203848" y="332656"/>
+                  <a:ext cx="3743325" cy="1676400"/>
+                </a:xfrm>
+                <a:prstGeom prst="rect">
+                  <a:avLst/>
+                </a:prstGeom>
+                <a:noFill/>
+              </p:spPr>
+            </p:pic>
+          </p:grpSp>
           <p:pic>
             <p:nvPicPr>
-              <p:cNvPr id="27" name="Picture 2" descr="C:\Users\blambeau\Documents\thesis\writing\src\2-framework\images\simple-scenario.png"/>
+              <p:cNvPr id="17" name="Picture 3" descr="D:\blambeau\thesis\writing\src\2-framework\images\composed.png"/>
               <p:cNvPicPr>
                 <a:picLocks noChangeAspect="1" noChangeArrowheads="1"/>
               </p:cNvPicPr>
               <p:nvPr/>
             </p:nvPicPr>
             <p:blipFill>
-              <a:blip r:embed="rId2" cstate="print"/>
-              <a:srcRect b="79463"/>
+              <a:blip r:embed="rId3" cstate="print"/>
+              <a:srcRect/>
               <a:stretch>
                 <a:fillRect/>
               </a:stretch>
             </p:blipFill>
             <p:spPr bwMode="auto">
               <a:xfrm>
-                <a:off x="3311942" y="210774"/>
-                <a:ext cx="3743325" cy="344280"/>
+                <a:off x="3373652" y="2924943"/>
+                <a:ext cx="4628944" cy="1224000"/>
               </a:xfrm>
               <a:prstGeom prst="rect">
                 <a:avLst/>
@@ -34927,40 +34908,14 @@
           </p:pic>
           <p:pic>
             <p:nvPicPr>
-              <p:cNvPr id="24" name="Picture 2" descr="C:\Users\blambeau\Documents\thesis\writing\src\2-framework\images\simple-scenario.png"/>
+              <p:cNvPr id="2050" name="Picture 2" descr="D:\blambeau\thesis\writing\src\2-framework\images\composed-system.png"/>
               <p:cNvPicPr>
                 <a:picLocks noChangeAspect="1" noChangeArrowheads="1"/>
               </p:cNvPicPr>
               <p:nvPr/>
             </p:nvPicPr>
             <p:blipFill>
-              <a:blip r:embed="rId2" cstate="print"/>
-              <a:srcRect b="79463"/>
-              <a:stretch>
-                <a:fillRect/>
-              </a:stretch>
-            </p:blipFill>
-            <p:spPr bwMode="auto">
-              <a:xfrm>
-                <a:off x="3261342" y="275272"/>
-                <a:ext cx="3743325" cy="344280"/>
-              </a:xfrm>
-              <a:prstGeom prst="rect">
-                <a:avLst/>
-              </a:prstGeom>
-              <a:noFill/>
-            </p:spPr>
-          </p:pic>
-          <p:pic>
-            <p:nvPicPr>
-              <p:cNvPr id="3074" name="Picture 2" descr="C:\Users\blambeau\Documents\thesis\writing\src\2-framework\images\simple-scenario.png"/>
-              <p:cNvPicPr>
-                <a:picLocks noChangeAspect="1" noChangeArrowheads="1"/>
-              </p:cNvPicPr>
-              <p:nvPr/>
-            </p:nvPicPr>
-            <p:blipFill>
-              <a:blip r:embed="rId2" cstate="print"/>
+              <a:blip r:embed="rId4" cstate="print"/>
               <a:srcRect/>
               <a:stretch>
                 <a:fillRect/>
@@ -34968,8 +34923,8 @@
             </p:blipFill>
             <p:spPr bwMode="auto">
               <a:xfrm>
-                <a:off x="3203848" y="332656"/>
-                <a:ext cx="3743325" cy="1676400"/>
+                <a:off x="3280680" y="5445224"/>
+                <a:ext cx="4814888" cy="1030287"/>
               </a:xfrm>
               <a:prstGeom prst="rect">
                 <a:avLst/>
@@ -34978,58 +34933,6 @@
             </p:spPr>
           </p:pic>
         </p:grpSp>
-        <p:pic>
-          <p:nvPicPr>
-            <p:cNvPr id="3076" name="Picture 4" descr="C:\Users\blambeau\Documents\thesis\writing\src\2-framework\images\composed.png"/>
-            <p:cNvPicPr>
-              <a:picLocks noChangeAspect="1" noChangeArrowheads="1"/>
-            </p:cNvPicPr>
-            <p:nvPr/>
-          </p:nvPicPr>
-          <p:blipFill>
-            <a:blip r:embed="rId3" cstate="print"/>
-            <a:srcRect/>
-            <a:stretch>
-              <a:fillRect/>
-            </a:stretch>
-          </p:blipFill>
-          <p:spPr bwMode="auto">
-            <a:xfrm>
-              <a:off x="2812729" y="2996952"/>
-              <a:ext cx="4752079" cy="1224136"/>
-            </a:xfrm>
-            <a:prstGeom prst="rect">
-              <a:avLst/>
-            </a:prstGeom>
-            <a:noFill/>
-          </p:spPr>
-        </p:pic>
-        <p:pic>
-          <p:nvPicPr>
-            <p:cNvPr id="3077" name="Picture 5" descr="C:\Users\blambeau\Documents\thesis\writing\src\2-framework\images\composed-system.png"/>
-            <p:cNvPicPr>
-              <a:picLocks noChangeAspect="1" noChangeArrowheads="1"/>
-            </p:cNvPicPr>
-            <p:nvPr/>
-          </p:nvPicPr>
-          <p:blipFill>
-            <a:blip r:embed="rId4" cstate="print"/>
-            <a:srcRect/>
-            <a:stretch>
-              <a:fillRect/>
-            </a:stretch>
-          </p:blipFill>
-          <p:spPr bwMode="auto">
-            <a:xfrm>
-              <a:off x="2771800" y="5373216"/>
-              <a:ext cx="4833937" cy="1030287"/>
-            </a:xfrm>
-            <a:prstGeom prst="rect">
-              <a:avLst/>
-            </a:prstGeom>
-            <a:noFill/>
-          </p:spPr>
-        </p:pic>
       </p:grpSp>
     </p:spTree>
   </p:cSld>

</xml_diff>